<commit_message>
[Upload] 학습 결과 확인용 Sample Image 업로드
</commit_message>
<xml_diff>
--- a/model/type/ssd/doc/1. Architecture.pptx
+++ b/model/type/ssd/doc/1. Architecture.pptx
@@ -5,9 +5,10 @@
     <p:sldMasterId id="2147483648" r:id="rId5"/>
   </p:sldMasterIdLst>
   <p:sldIdLst>
-    <p:sldId id="257" r:id="rId6"/>
-    <p:sldId id="256" r:id="rId7"/>
-    <p:sldId id="258" r:id="rId8"/>
+    <p:sldId id="259" r:id="rId6"/>
+    <p:sldId id="257" r:id="rId7"/>
+    <p:sldId id="256" r:id="rId8"/>
+    <p:sldId id="258" r:id="rId9"/>
   </p:sldIdLst>
   <p:sldSz cx="12192000" cy="6858000"/>
   <p:notesSz cx="6858000" cy="12192000"/>
@@ -238,7 +239,7 @@
             <a:spLocks noGrp="1" noChangeArrowheads="1"/>
             <a:extLst>
               <a:ext uri="smNativeData">
-                <pr:smNativeData xmlns:pr="smNativeData" xmlns="smNativeData" val="SMDATA_15_ucsbZBMAAAAlAAAAZAAAAA8BAAAAkAAAAEgAAACQAAAASAAAAAAAAAABAAAAAAAAAAEAAABQAAAAAAAAAAAA4D8AAAAAAADgPwAAAAAAAOA/AAAAAAAA4D8AAAAAAADgPwAAAAAAAOA/AAAAAAAA4D8AAAAAAADgPwAAAAAAAOA/AAAAAAAA4D8CAAAAjAAAAAAAAAAAAAAAu+DjDP///wgAAAAAAAAAAAAAAAAAAAAAAAAAAAAAAAAAAAAAZAAAAAEAAABAAAAAAAAAAAAAAAAAAAAAAAAAAAAAAAAAAAAAAAAAAAAAAAAAAAAAAAAAAAAAAAAAAAAAAAAAAAAAAAAAAAAAAAAAAAAAAAAAAAAAAAAAAAAAAAAAAAAAFAAAADwAAAAAAAAAAAAAAAAAAAkUAAAAAQAAABQAAAAUAAAAFAAAAAEAAAAAAAAAZAAAAGQAAAAAAAAAZAAAAGQAAAAVAAAAYAAAAAAAAAAAAAAADwAAACADAAAAAAAAAAAAAAEAAACgMgAAVgcAAKr4//8BAAAAf39/AAEAAABkAAAAAAAAABQAAABAHwAAAAAAACYAAAAAAAAAwOD//wAAAAAmAAAAZAAAABYAAABMAAAAAAAAAAAAAAAEAAAAAAAAAAEAAACAgIAKAAAAACgAAAAoAAAAZAAAAGQAAAAAAAAAzMzMAAAAAABQAAAAUAAAAGQAAABkAAAAAAAAABcAAAAUAAAAAAAAAAAAAAD/fwAA/38AAAAAAAAJAAAABAAAAAAAAAAeAAAAaAAAAAAAAAAAAAAAAAAAAAAAAAAAAAAAECcAABAnAAAAAAAAAAAAAAAAAAAAAAAAAAAAAAAAAAAAAAAAAAAAABQAAAAAAAAAwMD/AAAAAABkAAAAMgAAAAAAAABkAAAAAAAAAH9/fwAKAAAAIgAAABgAAAAAAAAAAAAAAAAAAAAAAAAAAAAAAAAAAAAkAAAAJAAAAAAAAAAHAAAAAAAAAAAAAAAAAAAAAAAAAAAAAAAAAAAAf39/ACUAAABYAAAAAAAAAAAAAAAAAAAAAAAAAAAAAAAAAAAAAAAAAAAAAAAAAAAAAAAAAAAAAAA/AAAAAAAAAKCGAQAAAAAAAAAAAAAAAAAMAAAAAQAAAAAAAAAAAAAAAAAAAB8AAABUAAAAAAAABQAAAAEAAAAAAAAAAAAAAAAAAAAAAAAAAAAAAAAAAAAAAAAAAAAAAAJ/f38AAAAAA8zMzADAwP8Af39/AAAAAAAAAAAAAAAAAAAAAAAAAAAAIQAAABgAAAAUAAAAoAUAABoNAABgRQAAJhYAABAAAAAmAAAACAAAAAEAAAAAAAAA"/>
+                <pr:smNativeData xmlns:pr="smNativeData" xmlns="smNativeData" val="SMDATA_15_NygcZBMAAAAlAAAAZAAAAA8BAAAAkAAAAEgAAACQAAAASAAAAAAAAAABAAAAAAAAAAEAAABQAAAAAAAAAAAA4D8AAAAAAADgPwAAAAAAAOA/AAAAAAAA4D8AAAAAAADgPwAAAAAAAOA/AAAAAAAA4D8AAAAAAADgPwAAAAAAAOA/AAAAAAAA4D8CAAAAjAAAAAAAAAAAAAAAu+DjDP///wgAAAAAAAAAAAAAAAAAAAAAAAAAAAAAAAAAAAAAZAAAAAEAAABAAAAAAAAAAAAAAAAAAAAAAAAAAAAAAAAAAAAAAAAAAAAAAAAAAAAAAAAAAAAAAAAAAAAAAAAAAAAAAAAAAAAAAAAAAAAAAAAAAAAAAAAAAAAAAAAAAAAAFAAAADwAAAAAAAAAAAAAAAAAAAkUAAAAAQAAABQAAAAUAAAAFAAAAAEAAAAAAAAAZAAAAGQAAAAAAAAAZAAAAGQAAAAVAAAAYAAAAAAAAAAAAAAADwAAACADAAAAAAAAAAAAAAEAAACgMgAAVgcAAKr4//8BAAAAf39/AAEAAABkAAAAAAAAABQAAABAHwAAAAAAACYAAAAAAAAAwOD//wAAAAAmAAAAZAAAABYAAABMAAAAAAAAAAAAAAAEAAAAAAAAAAEAAACAgIAKAAAAACgAAAAoAAAAZAAAAGQAAAAAAAAAzMzMAAAAAABQAAAAUAAAAGQAAABkAAAAAAAAABcAAAAUAAAAAAAAAAAAAAD/fwAA/38AAAAAAAAJAAAABAAAAAAAAAAeAAAAaAAAAAAAAAAAAAAAAAAAAAAAAAAAAAAAECcAABAnAAAAAAAAAAAAAAAAAAAAAAAAAAAAAAAAAAAAAAAAAAAAABQAAAAAAAAAwMD/AAAAAABkAAAAMgAAAAAAAABkAAAAAAAAAH9/fwAKAAAAIgAAABgAAAAAAAAAAAAAAAAAAAAAAAAAAAAAAAAAAAAkAAAAJAAAAAAAAAAHAAAAAAAAAAAAAAAAAAAAAAAAAAAAAAAAAAAAf39/ACUAAABYAAAAAAAAAAAAAAAAAAAAAAAAAAAAAAAAAAAAAAAAAAAAAAAAAAAAAAAAAAAAAAA/AAAAAAAAAKCGAQAAAAAAAAAAAAAAAAAMAAAAAQAAAAAAAAAAAAAAAAAAAB8AAABUAAAAAAAABQAAAAEAAAAAAAAAAAAAAAAAAAAAAAAAAAAAAAAAAAAAAAAAAAAAAAJ/f38AAAAAA8zMzADAwP8Af39/AAAAAAAAAAAAAAAAAAAAAAAAAAAAIQAAABgAAAAUAAAAoAUAABoNAABgRQAAJhYAABAAAAAmAAAACAAAAAEAAAAAAAAA"/>
               </a:ext>
             </a:extLst>
           </p:cNvSpPr>
@@ -270,7 +271,7 @@
             <a:spLocks noGrp="1" noChangeArrowheads="1"/>
             <a:extLst>
               <a:ext uri="smNativeData">
-                <pr:smNativeData xmlns:pr="smNativeData" xmlns="smNativeData" val="SMDATA_15_ucsbZBMAAAAlAAAAZAAAAA8BAAAAkAAAAEgAAACQAAAASAAAAAAAAAAAAAAAAAAAAAEAAABQAAAAAAAAAAAA4D8AAAAAAADgPwAAAAAAAOA/AAAAAAAA4D8AAAAAAADgPwAAAAAAAOA/AAAAAAAA4D8AAAAAAADgPwAAAAAAAOA/AAAAAAAA4D8CAAAAjAAAAAAAAAAAAAAAu+DjDP///wgAAAAAAAAAAAAAAAAAAAAAAAAAAAAAAAAAAAAAZAAAAAEAAABAAAAAAAAAAAAAAAAAAAAAAAAAAAAAAAAAAAAAAAAAAAAAAAAAAAAAAAAAAAAAAAAAAAAAAAAAAAAAAAAAAAAAAAAAAAAAAAAAAAAAAAAAAAAAAAAAAAAAFAAAADwAAAAAAAAAAAAAAAAAAAkUAAAAAQAAABQAAAAUAAAAFAAAAAEAAAAAAAAAZAAAAGQAAAAAAAAAZAAAAGQAAAAVAAAAYAAAAAAAAAAAAAAADwAAACADAAAAAAAAAAAAAAEAAACgMgAAVgcAAKr4//8BAAAAf39/AAEAAABkAAAAAAAAABQAAABAHwAAAAAAACYAAAAAAAAAwOD//wAAAAAmAAAAZAAAABYAAABMAAAAAAAAAAAAAAAEAAAAAAAAAAEAAACAgIAKAAAAACgAAAAoAAAAZAAAAGQAAAAAAAAAzMzMAAAAAABQAAAAUAAAAGQAAABkAAAAAAAAABcAAAAUAAAAAAAAAAAAAAD/fwAA/38AAAAAAAAJAAAABAAAAAAAAAAeAAAAaAAAAAAAAAAAAAAAAAAAAAAAAAAAAAAAECcAABAnAAAAAAAAAAAAAAAAAAAAAAAAAAAAAAAAAAAAAAAAAAAAABQAAAAAAAAAwMD/AAAAAABkAAAAMgAAAAAAAABkAAAAAAAAAH9/fwAKAAAAIgAAABgAAAAAAAAAAAAAAAAAAAAAAAAAAAAAAAAAAAAkAAAAJAAAAAAAAAAHAAAAAAAAAAAAAAAAAAAAAAAAAAAAAAAAAAAAf39/ACUAAABYAAAAAAAAAAAAAAAAAAAAAAAAAAAAAAAAAAAAAAAAAAAAAAAAAAAAAAAAAAAAAAA/AAAAAAAAAKCGAQAAAAAAAAAAAAAAAAAMAAAAAQAAAAAAAAAAAAAAAAAAAB8AAABUAAAAAAAABQAAAAEAAAAAAAAAAAAAAAAAAAAAAAAAAAAAAAAAAAAAAAAAAAAAAAJ/f38AAAAAA8zMzADAwP8Af39/AAAAAAAAAAAAAAAAAAAAAAAAAAAAIQAAABgAAAAUAAAAQAsAAOgXAADAPwAAsCIAABAAAAAmAAAACAAAAAGAAAAAAAAA"/>
+                <pr:smNativeData xmlns:pr="smNativeData" xmlns="smNativeData" val="SMDATA_15_NygcZBMAAAAlAAAAZAAAAA8BAAAAkAAAAEgAAACQAAAASAAAAAAAAAAAAAAAAAAAAAEAAABQAAAAAAAAAAAA4D8AAAAAAADgPwAAAAAAAOA/AAAAAAAA4D8AAAAAAADgPwAAAAAAAOA/AAAAAAAA4D8AAAAAAADgPwAAAAAAAOA/AAAAAAAA4D8CAAAAjAAAAAAAAAAAAAAAu+DjDP///wgAAAAAAAAAAAAAAAAAAAAAAAAAAAAAAAAAAAAAZAAAAAEAAABAAAAAAAAAAAAAAAAAAAAAAAAAAAAAAAAAAAAAAAAAAAAAAAAAAAAAAAAAAAAAAAAAAAAAAAAAAAAAAAAAAAAAAAAAAAAAAAAAAAAAAAAAAAAAAAAAAAAAFAAAADwAAAAAAAAAAAAAAAAAAAkUAAAAAQAAABQAAAAUAAAAFAAAAAEAAAAAAAAAZAAAAGQAAAAAAAAAZAAAAGQAAAAVAAAAYAAAAAAAAAAAAAAADwAAACADAAAAAAAAAAAAAAEAAACgMgAAVgcAAKr4//8BAAAAf39/AAEAAABkAAAAAAAAABQAAABAHwAAAAAAACYAAAAAAAAAwOD//wAAAAAmAAAAZAAAABYAAABMAAAAAAAAAAAAAAAEAAAAAAAAAAEAAACAgIAKAAAAACgAAAAoAAAAZAAAAGQAAAAAAAAAzMzMAAAAAABQAAAAUAAAAGQAAABkAAAAAAAAABcAAAAUAAAAAAAAAAAAAAD/fwAA/38AAAAAAAAJAAAABAAAAAAAAAAeAAAAaAAAAAAAAAAAAAAAAAAAAAAAAAAAAAAAECcAABAnAAAAAAAAAAAAAAAAAAAAAAAAAAAAAAAAAAAAAAAAAAAAABQAAAAAAAAAwMD/AAAAAABkAAAAMgAAAAAAAABkAAAAAAAAAH9/fwAKAAAAIgAAABgAAAAAAAAAAAAAAAAAAAAAAAAAAAAAAAAAAAAkAAAAJAAAAAAAAAAHAAAAAAAAAAAAAAAAAAAAAAAAAAAAAAAAAAAAf39/ACUAAABYAAAAAAAAAAAAAAAAAAAAAAAAAAAAAAAAAAAAAAAAAAAAAAAAAAAAAAAAAAAAAAA/AAAAAAAAAKCGAQAAAAAAAAAAAAAAAAAMAAAAAQAAAAAAAAAAAAAAAAAAAB8AAABUAAAAAAAABQAAAAEAAAAAAAAAAAAAAAAAAAAAAAAAAAAAAAAAAAAAAAAAAAAAAAJ/f38AAAAAA8zMzADAwP8Af39/AAAAAAAAAAAAAAAAAAAAAAAAAAAAIQAAABgAAAAUAAAAQAsAAOgXAADAPwAAsCIAABAAAAAmAAAACAAAAAGAAAAAAAAA"/>
               </a:ext>
             </a:extLst>
           </p:cNvSpPr>
@@ -330,7 +331,7 @@
             <a:spLocks noGrp="1" noChangeArrowheads="1"/>
             <a:extLst>
               <a:ext uri="smNativeData">
-                <pr:smNativeData xmlns:pr="smNativeData" xmlns="smNativeData" val="SMDATA_15_ucsbZBMAAAAlAAAAZAAAAA8BAAAAkAAAAEgAAACQAAAASAAAAAAAAAABAAAAAAAAAAEAAABQAAAAAAAAAAAA4D8AAAAAAADgPwAAAAAAAOA/AAAAAAAA4D8AAAAAAADgPwAAAAAAAOA/AAAAAAAA4D8AAAAAAADgPwAAAAAAAOA/AAAAAAAA4D8CAAAAjAAAAAAAAAAAAAAAu+DjDP///wgAAAAAAAAAAAAAAAAAAAAAAAAAAAAAAAAAAAAAZAAAAAEAAABAAAAAAAAAAAAAAAAAAAAAAAAAAAAAAAAAAAAAAAAAAAAAAAAAAAAAAAAAAAAAAAAAAAAAAAAAAAAAAAAAAAAAAAAAAAAAAAAAAAAAAAAAAAAAAAAAAAAAFAAAADwAAAAAAAAAAAAAAAAAAAkUAAAAAQAAABQAAAAUAAAAFAAAAAEAAAAAAAAAZAAAAGQAAAAAAAAAZAAAAGQAAAAVAAAAYAAAAAAAAAAAAAAADwAAACADAAAAAAAAAAAAAAEAAACgMgAAVgcAAKr4//8BAAAAf39/AAEAAABkAAAAAAAAABQAAABAHwAAAAAAACYAAAAAAAAAwOD//wAAAAAmAAAAZAAAABYAAABMAAAAAAAAAAAAAAAEAAAAAAAAAAEAAACAgIAKAAAAACgAAAAoAAAAZAAAAGQAAAAAAAAAzMzMAAAAAABQAAAAUAAAAGQAAABkAAAAAAAAABcAAAAUAAAAAAAAAAAAAAD/fwAA/38AAAAAAAAJAAAABAAAAAAAAAAeAAAAaAAAAAAAAAAAAAAAAAAAAAAAAAAAAAAAECcAABAnAAAAAAAAAAAAAAAAAAAAAAAAAAAAAAAAAAAAAAAAAAAAABQAAAAAAAAAwMD/AAAAAABkAAAAMgAAAAAAAABkAAAAAAAAAH9/fwAKAAAAIgAAABgAAAAAAAAAAAAAAAAAAAAAAAAAAAAAAAAAAAAkAAAAJAAAAAAAAAAHAAAAAAAAAAAAAAAAAAAAAAAAAAAAAAAAAAAAf39/ACUAAABYAAAAAAAAAAAAAAAAAAAAAAAAAAAAAAAAAAAAAAAAAAAAAAAAAAAAAAAAAAAAAAA/AAAAAAAAAKCGAQAAAAAAAAAAAAAAAAAMAAAAAQAAAAAAAAAAAAAAAAAAAB8AAABUAAAAAAAABQAAAAEAAAAAAAAAAAAAAAAAAAAAAAAAAAAAAAAAAAAAAAAAAAAAAAJ/f38AAAAAA8zMzADAwP8Af39/AAAAAAAAAAAAAAAAAAAAAAAAAAAAIQAAABgAAAAUAAAAwAMAABsnAAA/FQAAWSkAABAAAAAmAAAACAAAAAAAAAAAAAAA"/>
+                <pr:smNativeData xmlns:pr="smNativeData" xmlns="smNativeData" val="SMDATA_15_NygcZBMAAAAlAAAAZAAAAA8BAAAAkAAAAEgAAACQAAAASAAAAAAAAAABAAAAAAAAAAEAAABQAAAAAAAAAAAA4D8AAAAAAADgPwAAAAAAAOA/AAAAAAAA4D8AAAAAAADgPwAAAAAAAOA/AAAAAAAA4D8AAAAAAADgPwAAAAAAAOA/AAAAAAAA4D8CAAAAjAAAAAAAAAAAAAAAu+DjDP///wgAAAAAAAAAAAAAAAAAAAAAAAAAAAAAAAAAAAAAZAAAAAEAAABAAAAAAAAAAAAAAAAAAAAAAAAAAAAAAAAAAAAAAAAAAAAAAAAAAAAAAAAAAAAAAAAAAAAAAAAAAAAAAAAAAAAAAAAAAAAAAAAAAAAAAAAAAAAAAAAAAAAAFAAAADwAAAAAAAAAAAAAAAAAAAkUAAAAAQAAABQAAAAUAAAAFAAAAAEAAAAAAAAAZAAAAGQAAAAAAAAAZAAAAGQAAAAVAAAAYAAAAAAAAAAAAAAADwAAACADAAAAAAAAAAAAAAEAAACgMgAAVgcAAKr4//8BAAAAf39/AAEAAABkAAAAAAAAABQAAABAHwAAAAAAACYAAAAAAAAAwOD//wAAAAAmAAAAZAAAABYAAABMAAAAAAAAAAAAAAAEAAAAAAAAAAEAAACAgIAKAAAAACgAAAAoAAAAZAAAAGQAAAAAAAAAzMzMAAAAAABQAAAAUAAAAGQAAABkAAAAAAAAABcAAAAUAAAAAAAAAAAAAAD/fwAA/38AAAAAAAAJAAAABAAAAAAAAAAeAAAAaAAAAAAAAAAAAAAAAAAAAAAAAAAAAAAAECcAABAnAAAAAAAAAAAAAAAAAAAAAAAAAAAAAAAAAAAAAAAAAAAAABQAAAAAAAAAwMD/AAAAAABkAAAAMgAAAAAAAABkAAAAAAAAAH9/fwAKAAAAIgAAABgAAAAAAAAAAAAAAAAAAAAAAAAAAAAAAAAAAAAkAAAAJAAAAAAAAAAHAAAAAAAAAAAAAAAAAAAAAAAAAAAAAAAAAAAAf39/ACUAAABYAAAAAAAAAAAAAAAAAAAAAAAAAAAAAAAAAAAAAAAAAAAAAAAAAAAAAAAAAAAAAAA/AAAAAAAAAKCGAQAAAAAAAAAAAAAAAAAMAAAAAQAAAAAAAAAAAAAAAAAAAB8AAABUAAAAAAAABQAAAAEAAAAAAAAAAAAAAAAAAAAAAAAAAAAAAAAAAAAAAAAAAAAAAAJ/f38AAAAAA8zMzADAwP8Af39/AAAAAAAAAAAAAAAAAAAAAAAAAAAAIQAAABgAAAAUAAAAwAMAABsnAAA/FQAAWSkAABAAAAAmAAAACAAAAAAAAAAAAAAA"/>
               </a:ext>
             </a:extLst>
           </p:cNvSpPr>
@@ -344,7 +345,7 @@
           <a:lstStyle/>
           <a:p>
             <a:pPr/>
-            <a:fld id="{3A26C953-1DD7-733F-999E-EB6A87D06FBE}" type="datetime1">
+            <a:fld id="{39DFD48A-C4D4-8A22-9A67-32779A296C67}" type="datetime1">
               <a:t/>
             </a:fld>
           </a:p>
@@ -357,7 +358,7 @@
             <a:spLocks noGrp="1" noChangeArrowheads="1"/>
             <a:extLst>
               <a:ext uri="smNativeData">
-                <pr:smNativeData xmlns:pr="smNativeData" xmlns="smNativeData" val="SMDATA_15_ucsbZBMAAAAlAAAAZAAAAA8BAAAAkAAAAEgAAACQAAAASAAAAAAAAAABAAAAAAAAAAEAAABQAAAAAAAAAAAA4D8AAAAAAADgPwAAAAAAAOA/AAAAAAAA4D8AAAAAAADgPwAAAAAAAOA/AAAAAAAA4D8AAAAAAADgPwAAAAAAAOA/AAAAAAAA4D8CAAAAjAAAAAAAAAAAAAAAu+DjDP///wgAAAAAAAAAAAAAAAAAAAAAAAAAAAAAAAAAAAAAZAAAAAEAAABAAAAAAAAAAAAAAAAAAAAAAAAAAAAAAAAAAAAAAAAAAAAAAAAAAAAAAAAAAAAAAAAAAAAAAAAAAAAAAAAAAAAAAAAAAAAAAAAAAAAAAAAAAAAAAAAAAAAAFAAAADwAAAAAAAAAAAAAAAAAAAkUAAAAAQAAABQAAAAUAAAAFAAAAAEAAAAAAAAAZAAAAGQAAAAAAAAAZAAAAGQAAAAVAAAAYAAAAAAAAAAAAAAADwAAACADAAAAAAAAAAAAAAEAAACgMgAAVgcAAKr4//8BAAAAf39/AAEAAABkAAAAAAAAABQAAABAHwAAAAAAACYAAAAAAAAAwOD//wAAAAAmAAAAZAAAABYAAABMAAAAAAAAAAAAAAAEAAAAAAAAAAEAAACAgIAKAAAAACgAAAAoAAAAZAAAAGQAAAAAAAAAzMzMAAAAAABQAAAAUAAAAGQAAABkAAAAAAAAABcAAAAUAAAAAAAAAAAAAAD/fwAA/38AAAAAAAAJAAAABAAAAAAAAAAeAAAAaAAAAAAAAAAAAAAAAAAAAAAAAAAAAAAAECcAABAnAAAAAAAAAAAAAAAAAAAAAAAAAAAAAAAAAAAAAAAAAAAAABQAAAAAAAAAwMD/AAAAAABkAAAAMgAAAAAAAABkAAAAAAAAAH9/fwAKAAAAIgAAABgAAAAAAAAAAAAAAAAAAAAAAAAAAAAAAAAAAAAkAAAAJAAAAAAAAAAHAAAAAAAAAAAAAAAAAAAAAAAAAAAAAAAAAAAAf39/ACUAAABYAAAAAAAAAAAAAAAAAAAAAAAAAAAAAAAAAAAAAAAAAAAAAAAAAAAAAAAAAAAAAAA/AAAAAAAAAKCGAQAAAAAAAAAAAAAAAAAMAAAAAQAAAAAAAAAAAAAAAAAAAB8AAABUAAAAAAAABQAAAAEAAAAAAAAAAAAAAAAAAAAAAAAAAAAAAAAAAAAAAAAAAAAAAAJ/f38AAAAAA8zMzADAwP8Af39/AAAAAAAAAAAAAAAAAAAAAAAAAAAAIQAAABgAAAAUAAAAoRkAABsnAABfMQAAWSkAABAAAAAmAAAACAAAAAAAAAAAAAAA"/>
+                <pr:smNativeData xmlns:pr="smNativeData" xmlns="smNativeData" val="SMDATA_15_NygcZBMAAAAlAAAAZAAAAA8BAAAAkAAAAEgAAACQAAAASAAAAAAAAAABAAAAAAAAAAEAAABQAAAAAAAAAAAA4D8AAAAAAADgPwAAAAAAAOA/AAAAAAAA4D8AAAAAAADgPwAAAAAAAOA/AAAAAAAA4D8AAAAAAADgPwAAAAAAAOA/AAAAAAAA4D8CAAAAjAAAAAAAAAAAAAAAu+DjDP///wgAAAAAAAAAAAAAAAAAAAAAAAAAAAAAAAAAAAAAZAAAAAEAAABAAAAAAAAAAAAAAAAAAAAAAAAAAAAAAAAAAAAAAAAAAAAAAAAAAAAAAAAAAAAAAAAAAAAAAAAAAAAAAAAAAAAAAAAAAAAAAAAAAAAAAAAAAAAAAAAAAAAAFAAAADwAAAAAAAAAAAAAAAAAAAkUAAAAAQAAABQAAAAUAAAAFAAAAAEAAAAAAAAAZAAAAGQAAAAAAAAAZAAAAGQAAAAVAAAAYAAAAAAAAAAAAAAADwAAACADAAAAAAAAAAAAAAEAAACgMgAAVgcAAKr4//8BAAAAf39/AAEAAABkAAAAAAAAABQAAABAHwAAAAAAACYAAAAAAAAAwOD//wAAAAAmAAAAZAAAABYAAABMAAAAAAAAAAAAAAAEAAAAAAAAAAEAAACAgIAKAAAAACgAAAAoAAAAZAAAAGQAAAAAAAAAzMzMAAAAAABQAAAAUAAAAGQAAABkAAAAAAAAABcAAAAUAAAAAAAAAAAAAAD/fwAA/38AAAAAAAAJAAAABAAAAAAAAAAeAAAAaAAAAAAAAAAAAAAAAAAAAAAAAAAAAAAAECcAABAnAAAAAAAAAAAAAAAAAAAAAAAAAAAAAAAAAAAAAAAAAAAAABQAAAAAAAAAwMD/AAAAAABkAAAAMgAAAAAAAABkAAAAAAAAAH9/fwAKAAAAIgAAABgAAAAAAAAAAAAAAAAAAAAAAAAAAAAAAAAAAAAkAAAAJAAAAAAAAAAHAAAAAAAAAAAAAAAAAAAAAAAAAAAAAAAAAAAAf39/ACUAAABYAAAAAAAAAAAAAAAAAAAAAAAAAAAAAAAAAAAAAAAAAAAAAAAAAAAAAAAAAAAAAAA/AAAAAAAAAKCGAQAAAAAAAAAAAAAAAAAMAAAAAQAAAAAAAAAAAAAAAAAAAB8AAABUAAAAAAAABQAAAAEAAAAAAAAAAAAAAAAAAAAAAAAAAAAAAAAAAAAAAAAAAAAAAAJ/f38AAAAAA8zMzADAwP8Af39/AAAAAAAAAAAAAAAAAAAAAAAAAAAAIQAAABgAAAAUAAAAoRkAABsnAABfMQAAWSkAABAAAAAmAAAACAAAAAAAAAAAAAAA"/>
               </a:ext>
             </a:extLst>
           </p:cNvSpPr>
@@ -384,7 +385,7 @@
             <a:spLocks noGrp="1" noChangeArrowheads="1"/>
             <a:extLst>
               <a:ext uri="smNativeData">
-                <pr:smNativeData xmlns:pr="smNativeData" xmlns="smNativeData" val="SMDATA_15_ucsbZBMAAAAlAAAAZAAAAA8BAAAAkAAAAEgAAACQAAAASAAAAAAAAAABAAAAAAAAAAEAAABQAAAAAAAAAAAA4D8AAAAAAADgPwAAAAAAAOA/AAAAAAAA4D8AAAAAAADgPwAAAAAAAOA/AAAAAAAA4D8AAAAAAADgPwAAAAAAAOA/AAAAAAAA4D8CAAAAjAAAAAAAAAAAAAAAu+DjDP///wgAAAAAAAAAAAAAAAAAAAAAAAAAAAAAAAAAAAAAZAAAAAEAAABAAAAAAAAAAAAAAAAAAAAAAAAAAAAAAAAAAAAAAAAAAAAAAAAAAAAAAAAAAAAAAAAAAAAAAAAAAAAAAAAAAAAAAAAAAAAAAAAAAAAAAAAAAAAAAAAAAAAAFAAAADwAAAAAAAAAAAAAAAAAAAkUAAAAAQAAABQAAAAUAAAAFAAAAAEAAAAAAAAAZAAAAGQAAAAAAAAAZAAAAGQAAAAVAAAAYAAAAAAAAAAAAAAADwAAACADAAAAAAAAAAAAAAEAAACgMgAAVgcAAKr4//8BAAAAf39/AAEAAABkAAAAAAAAABQAAABAHwAAAAAAACYAAAAAAAAAwOD//wAAAAAmAAAAZAAAABYAAABMAAAAAAAAAAAAAAAEAAAAAAAAAAEAAACAgIAKAAAAACgAAAAoAAAAZAAAAGQAAAAAAAAAzMzMAAAAAABQAAAAUAAAAGQAAABkAAAAAAAAABcAAAAUAAAAAAAAAAAAAAD/fwAA/38AAAAAAAAJAAAABAAAAHsAfAAeAAAAaAAAAAAAAAAAAAAAAAAAAAAAAAAAAAAAECcAABAnAAAAAAAAAAAAAAAAAAAAAAAAAAAAAAAAAAAAAAAAAAAAABQAAAAAAAAAwMD/AAAAAABkAAAAMgAAAAAAAABkAAAAAAAAAH9/fwAKAAAAIgAAABgAAAAAAAAAAAAAAAAAAAAAAAAAAAAAAAAAAAAkAAAAJAAAAAAAAAAHAAAAAAAAAAAAAAAAAAAAAAAAAAAAAAAAAAAAf39/ACUAAABYAAAAAAAAAAAAAAAAAAAAAAAAAAAAAAAAAAAAAAAAAAAAAAAAAAAAAAAAAAAAAAA/AAAAAAAAAKCGAQAAAAAAAAAAAAAAAAAMAAAAAQAAAAAAAAAAAAAAAAAAAB8AAABUAAAAAAAABQAAAAEAAAAAAAAAAAAAAAAAAAAAAAAAAAAAAAAAAAAAAAAAAAAAAAJ/f38AAAAAA8zMzADAwP8Af39/AAAAAAAAAAAAAAAAAAAAAAAAAAAAIQAAABgAAAAUAAAAwTUAABsnAABARwAAWSkAABAAAAAmAAAACAAAAAAAAAAAAAAA"/>
+                <pr:smNativeData xmlns:pr="smNativeData" xmlns="smNativeData" val="SMDATA_15_NygcZBMAAAAlAAAAZAAAAA8BAAAAkAAAAEgAAACQAAAASAAAAAAAAAABAAAAAAAAAAEAAABQAAAAAAAAAAAA4D8AAAAAAADgPwAAAAAAAOA/AAAAAAAA4D8AAAAAAADgPwAAAAAAAOA/AAAAAAAA4D8AAAAAAADgPwAAAAAAAOA/AAAAAAAA4D8CAAAAjAAAAAAAAAAAAAAAu+DjDP///wgAAAAAAAAAAAAAAAAAAAAAAAAAAAAAAAAAAAAAZAAAAAEAAABAAAAAAAAAAAAAAAAAAAAAAAAAAAAAAAAAAAAAAAAAAAAAAAAAAAAAAAAAAAAAAAAAAAAAAAAAAAAAAAAAAAAAAAAAAAAAAAAAAAAAAAAAAAAAAAAAAAAAFAAAADwAAAAAAAAAAAAAAAAAAAkUAAAAAQAAABQAAAAUAAAAFAAAAAEAAAAAAAAAZAAAAGQAAAAAAAAAZAAAAGQAAAAVAAAAYAAAAAAAAAAAAAAADwAAACADAAAAAAAAAAAAAAEAAACgMgAAVgcAAKr4//8BAAAAf39/AAEAAABkAAAAAAAAABQAAABAHwAAAAAAACYAAAAAAAAAwOD//wAAAAAmAAAAZAAAABYAAABMAAAAAAAAAAAAAAAEAAAAAAAAAAEAAACAgIAKAAAAACgAAAAoAAAAZAAAAGQAAAAAAAAAzMzMAAAAAABQAAAAUAAAAGQAAABkAAAAAAAAABcAAAAUAAAAAAAAAAAAAAD/fwAA/38AAAAAAAAJAAAABAAAAHsAfAAeAAAAaAAAAAAAAAAAAAAAAAAAAAAAAAAAAAAAECcAABAnAAAAAAAAAAAAAAAAAAAAAAAAAAAAAAAAAAAAAAAAAAAAABQAAAAAAAAAwMD/AAAAAABkAAAAMgAAAAAAAABkAAAAAAAAAH9/fwAKAAAAIgAAABgAAAAAAAAAAAAAAAAAAAAAAAAAAAAAAAAAAAAkAAAAJAAAAAAAAAAHAAAAAAAAAAAAAAAAAAAAAAAAAAAAAAAAAAAAf39/ACUAAABYAAAAAAAAAAAAAAAAAAAAAAAAAAAAAAAAAAAAAAAAAAAAAAAAAAAAAAAAAAAAAAA/AAAAAAAAAKCGAQAAAAAAAAAAAAAAAAAMAAAAAQAAAAAAAAAAAAAAAAAAAB8AAABUAAAAAAAABQAAAAEAAAAAAAAAAAAAAAAAAAAAAAAAAAAAAAAAAAAAAAAAAAAAAAJ/f38AAAAAA8zMzADAwP8Af39/AAAAAAAAAAAAAAAAAAAAAAAAAAAAIQAAABgAAAAUAAAAwTUAABsnAABARwAAWSkAABAAAAAmAAAACAAAAAAAAAAAAAAA"/>
               </a:ext>
             </a:extLst>
           </p:cNvSpPr>
@@ -398,7 +399,7 @@
           <a:lstStyle/>
           <a:p>
             <a:pPr/>
-            <a:fld id="{3A26F446-08D7-7302-999E-FE57BAD06FAB}" type="slidenum">
+            <a:fld id="{39DFFC71-3FD4-8A0A-9A67-C95FB2296C9C}" type="slidenum">
               <a:t/>
             </a:fld>
           </a:p>
@@ -436,7 +437,7 @@
             <a:spLocks noGrp="1" noChangeArrowheads="1"/>
             <a:extLst>
               <a:ext uri="smNativeData">
-                <pr:smNativeData xmlns:pr="smNativeData" xmlns="smNativeData" val="SMDATA_15_ucsbZBMAAAAlAAAAZAAAAA8BAAAAkAAAAEgAAACQAAAASAAAAAAAAAABAAAAAAAAAAEAAABQAAAAAAAAAAAA4D8AAAAAAADgPwAAAAAAAOA/AAAAAAAA4D8AAAAAAADgPwAAAAAAAOA/AAAAAAAA4D8AAAAAAADgPwAAAAAAAOA/AAAAAAAA4D8CAAAAjAAAAAAAAAAAAAAAu+DjDP///wgAAAAAAAAAAAAAAAAAAAAAAAAAAAAAAAAAAAAAZAAAAAEAAABAAAAAAAAAAAAAAAAAAAAAAAAAAAAAAAAAAAAAAAAAAAAAAAAAAAAAAAAAAAAAAAAAAAAAAAAAAAAAAAAAAAAAAAAAAAAAAAAAAAAAAAAAAAAAAAAAAAAAFAAAADwAAAAAAAAAAAAAAAAAAAkUAAAAAQAAABQAAAAUAAAAFAAAAAEAAAAAAAAAZAAAAGQAAAAAAAAAZAAAAGQAAAAVAAAAYAAAAAAAAAAAAAAADwAAACADAAAAAAAAAAAAAAEAAACgMgAAVgcAAKr4//8BAAAAf39/AAEAAABkAAAAAAAAABQAAABAHwAAAAAAACYAAAAAAAAAwOD//wAAAAAmAAAAZAAAABYAAABMAAAAAAAAAAAAAAAEAAAAAAAAAAEAAACAgIAKAAAAACgAAAAoAAAAZAAAAGQAAAAAAAAAzMzMAAAAAABQAAAAUAAAAGQAAABkAAAAAAAAABcAAAAUAAAAAAAAAAAAAAD/fwAA/38AAAAAAAAJAAAABAAAAG49IjEeAAAAaAAAAAAAAAAAAAAAAAAAAAAAAAAAAAAAECcAABAnAAAAAAAAAAAAAAAAAAAAAAAAAAAAAAAAAAAAAAAAAAAAABQAAAAAAAAAwMD/AAAAAABkAAAAMgAAAAAAAABkAAAAAAAAAH9/fwAKAAAAIgAAABgAAAAAAAAAAAAAAAAAAAAAAAAAAAAAAAAAAAAkAAAAJAAAAAAAAAAHAAAAAAAAAAAAAAAAAAAAAAAAAAAAAAAAAAAAf39/ACUAAABYAAAAAAAAAAAAAAAAAAAAAAAAAAAAAAAAAAAAAAAAAAAAAAAAAAAAAAAAAAAAAAA/AAAAAAAAAKCGAQAAAAAAAAAAAAAAAAAMAAAAAQAAAAAAAAAAAAAAAAAAAB8AAABUAAAAAAAABQAAAAEAAAAAAAAAAAAAAAAAAAAAAAAAAAAAAAAAAAAAAAAAAAAAAAJ/f38AAAAAA8zMzADAwP8Af39/AAAAAAAAAAAAAAAAAAAAAAAAAAAAIQAAABgAAAAUAAAAwAMAALABAABARwAAuAgAABAAAAAmAAAACAAAAAAAAAAAAAAA"/>
+                <pr:smNativeData xmlns:pr="smNativeData" xmlns="smNativeData" val="SMDATA_15_NygcZBMAAAAlAAAAZAAAAA8BAAAAkAAAAEgAAACQAAAASAAAAAAAAAABAAAAAAAAAAEAAABQAAAAAAAAAAAA4D8AAAAAAADgPwAAAAAAAOA/AAAAAAAA4D8AAAAAAADgPwAAAAAAAOA/AAAAAAAA4D8AAAAAAADgPwAAAAAAAOA/AAAAAAAA4D8CAAAAjAAAAAAAAAAAAAAAu+DjDP///wgAAAAAAAAAAAAAAAAAAAAAAAAAAAAAAAAAAAAAZAAAAAEAAABAAAAAAAAAAAAAAAAAAAAAAAAAAAAAAAAAAAAAAAAAAAAAAAAAAAAAAAAAAAAAAAAAAAAAAAAAAAAAAAAAAAAAAAAAAAAAAAAAAAAAAAAAAAAAAAAAAAAAFAAAADwAAAAAAAAAAAAAAAAAAAkUAAAAAQAAABQAAAAUAAAAFAAAAAEAAAAAAAAAZAAAAGQAAAAAAAAAZAAAAGQAAAAVAAAAYAAAAAAAAAAAAAAADwAAACADAAAAAAAAAAAAAAEAAACgMgAAVgcAAKr4//8BAAAAf39/AAEAAABkAAAAAAAAABQAAABAHwAAAAAAACYAAAAAAAAAwOD//wAAAAAmAAAAZAAAABYAAABMAAAAAAAAAAAAAAAEAAAAAAAAAAEAAACAgIAKAAAAACgAAAAoAAAAZAAAAGQAAAAAAAAAzMzMAAAAAABQAAAAUAAAAGQAAABkAAAAAAAAABcAAAAUAAAAAAAAAAAAAAD/fwAA/38AAAAAAAAJAAAABAAAAG49IjEeAAAAaAAAAAAAAAAAAAAAAAAAAAAAAAAAAAAAECcAABAnAAAAAAAAAAAAAAAAAAAAAAAAAAAAAAAAAAAAAAAAAAAAABQAAAAAAAAAwMD/AAAAAABkAAAAMgAAAAAAAABkAAAAAAAAAH9/fwAKAAAAIgAAABgAAAAAAAAAAAAAAAAAAAAAAAAAAAAAAAAAAAAkAAAAJAAAAAAAAAAHAAAAAAAAAAAAAAAAAAAAAAAAAAAAAAAAAAAAf39/ACUAAABYAAAAAAAAAAAAAAAAAAAAAAAAAAAAAAAAAAAAAAAAAAAAAAAAAAAAAAAAAAAAAAA/AAAAAAAAAKCGAQAAAAAAAAAAAAAAAAAMAAAAAQAAAAAAAAAAAAAAAAAAAB8AAABUAAAAAAAABQAAAAEAAAAAAAAAAAAAAAAAAAAAAAAAAAAAAAAAAAAAAAAAAAAAAAJ/f38AAAAAA8zMzADAwP8Af39/AAAAAAAAAAAAAAAAAAAAAAAAAAAAIQAAABgAAAAUAAAAwAMAALABAABARwAAuAgAABAAAAAmAAAACAAAAAAAAAAAAAAA"/>
               </a:ext>
             </a:extLst>
           </p:cNvSpPr>
@@ -463,7 +464,7 @@
             <a:spLocks noGrp="1" noChangeArrowheads="1"/>
             <a:extLst>
               <a:ext uri="smNativeData">
-                <pr:smNativeData xmlns:pr="smNativeData" xmlns="smNativeData" val="SMDATA_15_ucsbZBMAAAAlAAAAZAAAAA8BAAAAkAAAAEgAAACQAAAASAAAAAAAAAAAAAAAAQAAAAEAAABQAAAAAAAAAAAA4D8AAAAAAADgPwAAAAAAAOA/AAAAAAAA4D8AAAAAAADgPwAAAAAAAOA/AAAAAAAA4D8AAAAAAADgPwAAAAAAAOA/AAAAAAAA4D8CAAAAjAAAAAAAAAAAAAAAu+DjDP///wgAAAAAAAAAAAAAAAAAAAAAAAAAAAAAAAAAAAAAZAAAAAEAAABAAAAAAAAAAAAAAAAAAAAAAAAAAAAAAAAAAAAAAAAAAAAAAAAAAAAAAAAAAAAAAAAAAAAAAAAAAAAAAAAAAAAAAAAAAAAAAAAAAAAAAAAAAAAAAAAAAAAAFAAAADwAAAAAAAAAAAAAAAAAAAkUAAAAAQAAABQAAAAUAAAAFAAAAAEAAAAAAAAAZAAAAGQAAAAAAAAAZAAAAGQAAAAVAAAAYAAAAAAAAAAAAAAADwAAACADAAAAAAAAAAAAAAEAAACgMgAAVgcAAKr4//8BAAAAf39/AAEAAABkAAAAAAAAABQAAABAHwAAAAAAACYAAAAAAAAAwOD//wAAAAAmAAAAZAAAABYAAABMAAAAAAAAAAAAAAAEAAAAAAAAAAEAAACAgIAKAAAAACgAAAAoAAAAZAAAAGQAAAAAAAAAzMzMAAAAAABQAAAAUAAAAGQAAABkAAAAAAAAABcAAAAUAAAAAAAAAAAAAAD/fwAA/38AAAAAAAAJAAAABAAAAAAAAAAeAAAAaAAAAAAAAAAAAAAAAAAAAAAAAAAAAAAAECcAABAnAAAAAAAAAAAAAAAAAAAAAAAAAAAAAAAAAAAAAAAAAAAAABQAAAAAAAAAwMD/AAAAAABkAAAAMgAAAAAAAABkAAAAAAAAAH9/fwAKAAAAIgAAABgAAAAAAAAAAAAAAAAAAAAAAAAAAAAAAAAAAAAkAAAAJAAAAAAAAAAHAAAAAAAAAAAAAAAAAAAAAAAAAAAAAAAAAAAAf39/ACUAAABYAAAAAAAAAAAAAAAAAAAAAAAAAAAAAAAAAAAAAAAAAAAAAAAAAAAAAAAAAAAAAAA/AAAAAAAAAKCGAQAAAAAAAAAAAAAAAAAMAAAAAQAAAAAAAAAAAAAAAAAAAB8AAABUAAAAAAAABQAAAAEAAAAAAAAAAAAAAAAAAAAAAAAAAAAAAAAAAAAAAAAAAAAAAAJ/f38AAAAAA8zMzADAwP8Af39/AAAAAAAAAAAAAAAAAAAAAAAAAAAAIQAAABgAAAAUAAAAwAMAANgJAABARwAAsCUAABAAAAAmAAAACAAAAAIAAAAAAAAA"/>
+                <pr:smNativeData xmlns:pr="smNativeData" xmlns="smNativeData" val="SMDATA_15_NygcZBMAAAAlAAAAZAAAAA8BAAAAkAAAAEgAAACQAAAASAAAAAAAAAAAAAAAAQAAAAEAAABQAAAAAAAAAAAA4D8AAAAAAADgPwAAAAAAAOA/AAAAAAAA4D8AAAAAAADgPwAAAAAAAOA/AAAAAAAA4D8AAAAAAADgPwAAAAAAAOA/AAAAAAAA4D8CAAAAjAAAAAAAAAAAAAAAu+DjDP///wgAAAAAAAAAAAAAAAAAAAAAAAAAAAAAAAAAAAAAZAAAAAEAAABAAAAAAAAAAAAAAAAAAAAAAAAAAAAAAAAAAAAAAAAAAAAAAAAAAAAAAAAAAAAAAAAAAAAAAAAAAAAAAAAAAAAAAAAAAAAAAAAAAAAAAAAAAAAAAAAAAAAAFAAAADwAAAAAAAAAAAAAAAAAAAkUAAAAAQAAABQAAAAUAAAAFAAAAAEAAAAAAAAAZAAAAGQAAAAAAAAAZAAAAGQAAAAVAAAAYAAAAAAAAAAAAAAADwAAACADAAAAAAAAAAAAAAEAAACgMgAAVgcAAKr4//8BAAAAf39/AAEAAABkAAAAAAAAABQAAABAHwAAAAAAACYAAAAAAAAAwOD//wAAAAAmAAAAZAAAABYAAABMAAAAAAAAAAAAAAAEAAAAAAAAAAEAAACAgIAKAAAAACgAAAAoAAAAZAAAAGQAAAAAAAAAzMzMAAAAAABQAAAAUAAAAGQAAABkAAAAAAAAABcAAAAUAAAAAAAAAAAAAAD/fwAA/38AAAAAAAAJAAAABAAAAAAAAAAeAAAAaAAAAAAAAAAAAAAAAAAAAAAAAAAAAAAAECcAABAnAAAAAAAAAAAAAAAAAAAAAAAAAAAAAAAAAAAAAAAAAAAAABQAAAAAAAAAwMD/AAAAAABkAAAAMgAAAAAAAABkAAAAAAAAAH9/fwAKAAAAIgAAABgAAAAAAAAAAAAAAAAAAAAAAAAAAAAAAAAAAAAkAAAAJAAAAAAAAAAHAAAAAAAAAAAAAAAAAAAAAAAAAAAAAAAAAAAAf39/ACUAAABYAAAAAAAAAAAAAAAAAAAAAAAAAAAAAAAAAAAAAAAAAAAAAAAAAAAAAAAAAAAAAAA/AAAAAAAAAKCGAQAAAAAAAAAAAAAAAAAMAAAAAQAAAAAAAAAAAAAAAAAAAB8AAABUAAAAAAAABQAAAAEAAAAAAAAAAAAAAAAAAAAAAAAAAAAAAAAAAAAAAAAAAAAAAAJ/f38AAAAAA8zMzADAwP8Af39/AAAAAAAAAAAAAAAAAAAAAAAAAAAAIQAAABgAAAAUAAAAwAMAANgJAABARwAAsCUAABAAAAAmAAAACAAAAAIAAAAAAAAA"/>
               </a:ext>
             </a:extLst>
           </p:cNvSpPr>
@@ -518,7 +519,7 @@
             <a:spLocks noGrp="1" noChangeArrowheads="1"/>
             <a:extLst>
               <a:ext uri="smNativeData">
-                <pr:smNativeData xmlns:pr="smNativeData" xmlns="smNativeData" val="SMDATA_15_ucsbZBMAAAAlAAAAZAAAAA8BAAAAkAAAAEgAAACQAAAASAAAAAAAAAABAAAAAAAAAAEAAABQAAAAAAAAAAAA4D8AAAAAAADgPwAAAAAAAOA/AAAAAAAA4D8AAAAAAADgPwAAAAAAAOA/AAAAAAAA4D8AAAAAAADgPwAAAAAAAOA/AAAAAAAA4D8CAAAAjAAAAAAAAAAAAAAAu+DjDP///wgAAAAAAAAAAAAAAAAAAAAAAAAAAAAAAAAAAAAAZAAAAAEAAABAAAAAAAAAAAAAAAAAAAAAAAAAAAAAAAAAAAAAAAAAAAAAAAAAAAAAAAAAAAAAAAAAAAAAAAAAAAAAAAAAAAAAAAAAAAAAAAAAAAAAAAAAAAAAAAAAAAAAFAAAADwAAAAAAAAAAAAAAAAAAAkUAAAAAQAAABQAAAAUAAAAFAAAAAEAAAAAAAAAZAAAAGQAAAAAAAAAZAAAAGQAAAAVAAAAYAAAAAAAAAAAAAAADwAAACADAAAAAAAAAAAAAAEAAACgMgAAVgcAAKr4//8BAAAAf39/AAEAAABkAAAAAAAAABQAAABAHwAAAAAAACYAAAAAAAAAwOD//wAAAAAmAAAAZAAAABYAAABMAAAAAAAAAAAAAAAEAAAAAAAAAAEAAACAgIAKAAAAACgAAAAoAAAAZAAAAGQAAAAAAAAAzMzMAAAAAABQAAAAUAAAAGQAAABkAAAAAAAAABcAAAAUAAAAAAAAAAAAAAD/fwAA/38AAAAAAAAJAAAABAAAAAAAAAAeAAAAaAAAAAAAAAAAAAAAAAAAAAAAAAAAAAAAECcAABAnAAAAAAAAAAAAAAAAAAAAAAAAAAAAAAAAAAAAAAAAAAAAABQAAAAAAAAAwMD/AAAAAABkAAAAMgAAAAAAAABkAAAAAAAAAH9/fwAKAAAAIgAAABgAAAAAAAAAAAAAAAAAAAAAAAAAAAAAAAAAAAAkAAAAJAAAAAAAAAAHAAAAAAAAAAAAAAAAAAAAAAAAAAAAAAAAAAAAf39/ACUAAABYAAAAAAAAAAAAAAAAAAAAAAAAAAAAAAAAAAAAAAAAAAAAAAAAAAAAAAAAAAAAAAA/AAAAAAAAAKCGAQAAAAAAAAAAAAAAAAAMAAAAAQAAAAAAAAAAAAAAAAAAAB8AAABUAAAAAAAABQAAAAEAAAAAAAAAAAAAAAAAAAAAAAAAAAAAAAAAAAAAAAAAAAAAAAJ/f38AAAAAA8zMzADAwP8Af39/AAAAAAAAAAAAAAAAAAAAAAAAAAAAIQAAABgAAAAUAAAAwAMAABsnAAA/FQAAWSkAABAAAAAmAAAACAAAAAAAAAAAAAAA"/>
+                <pr:smNativeData xmlns:pr="smNativeData" xmlns="smNativeData" val="SMDATA_15_NygcZBMAAAAlAAAAZAAAAA8BAAAAkAAAAEgAAACQAAAASAAAAAAAAAABAAAAAAAAAAEAAABQAAAAAAAAAAAA4D8AAAAAAADgPwAAAAAAAOA/AAAAAAAA4D8AAAAAAADgPwAAAAAAAOA/AAAAAAAA4D8AAAAAAADgPwAAAAAAAOA/AAAAAAAA4D8CAAAAjAAAAAAAAAAAAAAAu+DjDP///wgAAAAAAAAAAAAAAAAAAAAAAAAAAAAAAAAAAAAAZAAAAAEAAABAAAAAAAAAAAAAAAAAAAAAAAAAAAAAAAAAAAAAAAAAAAAAAAAAAAAAAAAAAAAAAAAAAAAAAAAAAAAAAAAAAAAAAAAAAAAAAAAAAAAAAAAAAAAAAAAAAAAAFAAAADwAAAAAAAAAAAAAAAAAAAkUAAAAAQAAABQAAAAUAAAAFAAAAAEAAAAAAAAAZAAAAGQAAAAAAAAAZAAAAGQAAAAVAAAAYAAAAAAAAAAAAAAADwAAACADAAAAAAAAAAAAAAEAAACgMgAAVgcAAKr4//8BAAAAf39/AAEAAABkAAAAAAAAABQAAABAHwAAAAAAACYAAAAAAAAAwOD//wAAAAAmAAAAZAAAABYAAABMAAAAAAAAAAAAAAAEAAAAAAAAAAEAAACAgIAKAAAAACgAAAAoAAAAZAAAAGQAAAAAAAAAzMzMAAAAAABQAAAAUAAAAGQAAABkAAAAAAAAABcAAAAUAAAAAAAAAAAAAAD/fwAA/38AAAAAAAAJAAAABAAAAAAAAAAeAAAAaAAAAAAAAAAAAAAAAAAAAAAAAAAAAAAAECcAABAnAAAAAAAAAAAAAAAAAAAAAAAAAAAAAAAAAAAAAAAAAAAAABQAAAAAAAAAwMD/AAAAAABkAAAAMgAAAAAAAABkAAAAAAAAAH9/fwAKAAAAIgAAABgAAAAAAAAAAAAAAAAAAAAAAAAAAAAAAAAAAAAkAAAAJAAAAAAAAAAHAAAAAAAAAAAAAAAAAAAAAAAAAAAAAAAAAAAAf39/ACUAAABYAAAAAAAAAAAAAAAAAAAAAAAAAAAAAAAAAAAAAAAAAAAAAAAAAAAAAAAAAAAAAAA/AAAAAAAAAKCGAQAAAAAAAAAAAAAAAAAMAAAAAQAAAAAAAAAAAAAAAAAAAB8AAABUAAAAAAAABQAAAAEAAAAAAAAAAAAAAAAAAAAAAAAAAAAAAAAAAAAAAAAAAAAAAAJ/f38AAAAAA8zMzADAwP8Af39/AAAAAAAAAAAAAAAAAAAAAAAAAAAAIQAAABgAAAAUAAAAwAMAABsnAAA/FQAAWSkAABAAAAAmAAAACAAAAAAAAAAAAAAA"/>
               </a:ext>
             </a:extLst>
           </p:cNvSpPr>
@@ -532,7 +533,7 @@
           <a:lstStyle/>
           <a:p>
             <a:pPr/>
-            <a:fld id="{3A2697FC-B2D7-7361-999E-4434D9D06F11}" type="datetime1">
+            <a:fld id="{39DF89DC-92D4-8A7F-9A67-642AC7296C31}" type="datetime1">
               <a:t/>
             </a:fld>
           </a:p>
@@ -545,7 +546,7 @@
             <a:spLocks noGrp="1" noChangeArrowheads="1"/>
             <a:extLst>
               <a:ext uri="smNativeData">
-                <pr:smNativeData xmlns:pr="smNativeData" xmlns="smNativeData" val="SMDATA_15_ucsbZBMAAAAlAAAAZAAAAA8BAAAAkAAAAEgAAACQAAAASAAAAAAAAAABAAAAAAAAAAEAAABQAAAAAAAAAAAA4D8AAAAAAADgPwAAAAAAAOA/AAAAAAAA4D8AAAAAAADgPwAAAAAAAOA/AAAAAAAA4D8AAAAAAADgPwAAAAAAAOA/AAAAAAAA4D8CAAAAjAAAAAAAAAAAAAAAu+DjDP///wgAAAAAAAAAAAAAAAAAAAAAAAAAAAAAAAAAAAAAZAAAAAEAAABAAAAAAAAAAAAAAAAAAAAAAAAAAAAAAAAAAAAAAAAAAAAAAAAAAAAAAAAAAAAAAAAAAAAAAAAAAAAAAAAAAAAAAAAAAAAAAAAAAAAAAAAAAAAAAAAAAAAAFAAAADwAAAAAAAAAAAAAAAAAAAkUAAAAAQAAABQAAAAUAAAAFAAAAAEAAAAAAAAAZAAAAGQAAAAAAAAAZAAAAGQAAAAVAAAAYAAAAAAAAAAAAAAADwAAACADAAAAAAAAAAAAAAEAAACgMgAAVgcAAKr4//8BAAAAf39/AAEAAABkAAAAAAAAABQAAABAHwAAAAAAACYAAAAAAAAAwOD//wAAAAAmAAAAZAAAABYAAABMAAAAAAAAAAAAAAAEAAAAAAAAAAEAAACAgIAKAAAAACgAAAAoAAAAZAAAAGQAAAAAAAAAzMzMAAAAAABQAAAAUAAAAGQAAABkAAAAAAAAABcAAAAUAAAAAAAAAAAAAAD/fwAA/38AAAAAAAAJAAAABAAAAGE6c3AeAAAAaAAAAAAAAAAAAAAAAAAAAAAAAAAAAAAAECcAABAnAAAAAAAAAAAAAAAAAAAAAAAAAAAAAAAAAAAAAAAAAAAAABQAAAAAAAAAwMD/AAAAAABkAAAAMgAAAAAAAABkAAAAAAAAAH9/fwAKAAAAIgAAABgAAAAAAAAAAAAAAAAAAAAAAAAAAAAAAAAAAAAkAAAAJAAAAAAAAAAHAAAAAAAAAAAAAAAAAAAAAAAAAAAAAAAAAAAAf39/ACUAAABYAAAAAAAAAAAAAAAAAAAAAAAAAAAAAAAAAAAAAAAAAAAAAAAAAAAAAAAAAAAAAAA/AAAAAAAAAKCGAQAAAAAAAAAAAAAAAAAMAAAAAQAAAAAAAAAAAAAAAAAAAB8AAABUAAAAAAAABQAAAAEAAAAAAAAAAAAAAAAAAAAAAAAAAAAAAAAAAAAAAAAAAAAAAAJ/f38AAAAAA8zMzADAwP8Af39/AAAAAAAAAAAAAAAAAAAAAAAAAAAAIQAAABgAAAAUAAAAoRkAABsnAABfMQAAWSkAABAAAAAmAAAACAAAAAAAAAAAAAAA"/>
+                <pr:smNativeData xmlns:pr="smNativeData" xmlns="smNativeData" val="SMDATA_15_NygcZBMAAAAlAAAAZAAAAA8BAAAAkAAAAEgAAACQAAAASAAAAAAAAAABAAAAAAAAAAEAAABQAAAAAAAAAAAA4D8AAAAAAADgPwAAAAAAAOA/AAAAAAAA4D8AAAAAAADgPwAAAAAAAOA/AAAAAAAA4D8AAAAAAADgPwAAAAAAAOA/AAAAAAAA4D8CAAAAjAAAAAAAAAAAAAAAu+DjDP///wgAAAAAAAAAAAAAAAAAAAAAAAAAAAAAAAAAAAAAZAAAAAEAAABAAAAAAAAAAAAAAAAAAAAAAAAAAAAAAAAAAAAAAAAAAAAAAAAAAAAAAAAAAAAAAAAAAAAAAAAAAAAAAAAAAAAAAAAAAAAAAAAAAAAAAAAAAAAAAAAAAAAAFAAAADwAAAAAAAAAAAAAAAAAAAkUAAAAAQAAABQAAAAUAAAAFAAAAAEAAAAAAAAAZAAAAGQAAAAAAAAAZAAAAGQAAAAVAAAAYAAAAAAAAAAAAAAADwAAACADAAAAAAAAAAAAAAEAAACgMgAAVgcAAKr4//8BAAAAf39/AAEAAABkAAAAAAAAABQAAABAHwAAAAAAACYAAAAAAAAAwOD//wAAAAAmAAAAZAAAABYAAABMAAAAAAAAAAAAAAAEAAAAAAAAAAEAAACAgIAKAAAAACgAAAAoAAAAZAAAAGQAAAAAAAAAzMzMAAAAAABQAAAAUAAAAGQAAABkAAAAAAAAABcAAAAUAAAAAAAAAAAAAAD/fwAA/38AAAAAAAAJAAAABAAAAGE6c3AeAAAAaAAAAAAAAAAAAAAAAAAAAAAAAAAAAAAAECcAABAnAAAAAAAAAAAAAAAAAAAAAAAAAAAAAAAAAAAAAAAAAAAAABQAAAAAAAAAwMD/AAAAAABkAAAAMgAAAAAAAABkAAAAAAAAAH9/fwAKAAAAIgAAABgAAAAAAAAAAAAAAAAAAAAAAAAAAAAAAAAAAAAkAAAAJAAAAAAAAAAHAAAAAAAAAAAAAAAAAAAAAAAAAAAAAAAAAAAAf39/ACUAAABYAAAAAAAAAAAAAAAAAAAAAAAAAAAAAAAAAAAAAAAAAAAAAAAAAAAAAAAAAAAAAAA/AAAAAAAAAKCGAQAAAAAAAAAAAAAAAAAMAAAAAQAAAAAAAAAAAAAAAAAAAB8AAABUAAAAAAAABQAAAAEAAAAAAAAAAAAAAAAAAAAAAAAAAAAAAAAAAAAAAAAAAAAAAAJ/f38AAAAAA8zMzADAwP8Af39/AAAAAAAAAAAAAAAAAAAAAAAAAAAAIQAAABgAAAAUAAAAoRkAABsnAABfMQAAWSkAABAAAAAmAAAACAAAAAAAAAAAAAAA"/>
               </a:ext>
             </a:extLst>
           </p:cNvSpPr>
@@ -572,7 +573,7 @@
             <a:spLocks noGrp="1" noChangeArrowheads="1"/>
             <a:extLst>
               <a:ext uri="smNativeData">
-                <pr:smNativeData xmlns:pr="smNativeData" xmlns="smNativeData" val="SMDATA_15_ucsbZBMAAAAlAAAAZAAAAA8BAAAAkAAAAEgAAACQAAAASAAAAAAAAAABAAAAAAAAAAEAAABQAAAAAAAAAAAA4D8AAAAAAADgPwAAAAAAAOA/AAAAAAAA4D8AAAAAAADgPwAAAAAAAOA/AAAAAAAA4D8AAAAAAADgPwAAAAAAAOA/AAAAAAAA4D8CAAAAjAAAAAAAAAAAAAAAu+DjDP///wgAAAAAAAAAAAAAAAAAAAAAAAAAAAAAAAAAAAAAZAAAAAEAAABAAAAAAAAAAAAAAAAAAAAAAAAAAAAAAAAAAAAAAAAAAAAAAAAAAAAAAAAAAAAAAAAAAAAAAAAAAAAAAAAAAAAAAAAAAAAAAAAAAAAAAAAAAAAAAAAAAAAAFAAAADwAAAAAAAAAAAAAAAAAAAkUAAAAAQAAABQAAAAUAAAAFAAAAAEAAAAAAAAAZAAAAGQAAAAAAAAAZAAAAGQAAAAVAAAAYAAAAAAAAAAAAAAADwAAACADAAAAAAAAAAAAAAEAAACgMgAAVgcAAKr4//8BAAAAf39/AAEAAABkAAAAAAAAABQAAABAHwAAAAAAACYAAAAAAAAAwOD//wAAAAAmAAAAZAAAABYAAABMAAAAAAAAAAAAAAAEAAAAAAAAAAEAAACAgIAKAAAAACgAAAAoAAAAZAAAAGQAAAAAAAAAzMzMAAAAAABQAAAAUAAAAGQAAABkAAAAAAAAABcAAAAUAAAAAAAAAAAAAAD/fwAA/38AAAAAAAAJAAAABAAAAAAAAAAeAAAAaAAAAAAAAAAAAAAAAAAAAAAAAAAAAAAAECcAABAnAAAAAAAAAAAAAAAAAAAAAAAAAAAAAAAAAAAAAAAAAAAAABQAAAAAAAAAwMD/AAAAAABkAAAAMgAAAAAAAABkAAAAAAAAAH9/fwAKAAAAIgAAABgAAAAAAAAAAAAAAAAAAAAAAAAAAAAAAAAAAAAkAAAAJAAAAAAAAAAHAAAAAAAAAAAAAAAAAAAAAAAAAAAAAAAAAAAAf39/ACUAAABYAAAAAAAAAAAAAAAAAAAAAAAAAAAAAAAAAAAAAAAAAAAAAAAAAAAAAAAAAAAAAAA/AAAAAAAAAKCGAQAAAAAAAAAAAAAAAAAMAAAAAQAAAAAAAAAAAAAAAAAAAB8AAABUAAAAAAAABQAAAAEAAAAAAAAAAAAAAAAAAAAAAAAAAAAAAAAAAAAAAAAAAAAAAAJ/f38AAAAAA8zMzADAwP8Af39/AAAAAAAAAAAAAAAAAAAAAAAAAAAAIQAAABgAAAAUAAAAwTUAABsnAABARwAAWSkAABAAAAAmAAAACAAAAAAAAAAAAAAA"/>
+                <pr:smNativeData xmlns:pr="smNativeData" xmlns="smNativeData" val="SMDATA_15_NygcZBMAAAAlAAAAZAAAAA8BAAAAkAAAAEgAAACQAAAASAAAAAAAAAABAAAAAAAAAAEAAABQAAAAAAAAAAAA4D8AAAAAAADgPwAAAAAAAOA/AAAAAAAA4D8AAAAAAADgPwAAAAAAAOA/AAAAAAAA4D8AAAAAAADgPwAAAAAAAOA/AAAAAAAA4D8CAAAAjAAAAAAAAAAAAAAAu+DjDP///wgAAAAAAAAAAAAAAAAAAAAAAAAAAAAAAAAAAAAAZAAAAAEAAABAAAAAAAAAAAAAAAAAAAAAAAAAAAAAAAAAAAAAAAAAAAAAAAAAAAAAAAAAAAAAAAAAAAAAAAAAAAAAAAAAAAAAAAAAAAAAAAAAAAAAAAAAAAAAAAAAAAAAFAAAADwAAAAAAAAAAAAAAAAAAAkUAAAAAQAAABQAAAAUAAAAFAAAAAEAAAAAAAAAZAAAAGQAAAAAAAAAZAAAAGQAAAAVAAAAYAAAAAAAAAAAAAAADwAAACADAAAAAAAAAAAAAAEAAACgMgAAVgcAAKr4//8BAAAAf39/AAEAAABkAAAAAAAAABQAAABAHwAAAAAAACYAAAAAAAAAwOD//wAAAAAmAAAAZAAAABYAAABMAAAAAAAAAAAAAAAEAAAAAAAAAAEAAACAgIAKAAAAACgAAAAoAAAAZAAAAGQAAAAAAAAAzMzMAAAAAABQAAAAUAAAAGQAAABkAAAAAAAAABcAAAAUAAAAAAAAAAAAAAD/fwAA/38AAAAAAAAJAAAABAAAAAAAAAAeAAAAaAAAAAAAAAAAAAAAAAAAAAAAAAAAAAAAECcAABAnAAAAAAAAAAAAAAAAAAAAAAAAAAAAAAAAAAAAAAAAAAAAABQAAAAAAAAAwMD/AAAAAABkAAAAMgAAAAAAAABkAAAAAAAAAH9/fwAKAAAAIgAAABgAAAAAAAAAAAAAAAAAAAAAAAAAAAAAAAAAAAAkAAAAJAAAAAAAAAAHAAAAAAAAAAAAAAAAAAAAAAAAAAAAAAAAAAAAf39/ACUAAABYAAAAAAAAAAAAAAAAAAAAAAAAAAAAAAAAAAAAAAAAAAAAAAAAAAAAAAAAAAAAAAA/AAAAAAAAAKCGAQAAAAAAAAAAAAAAAAAMAAAAAQAAAAAAAAAAAAAAAAAAAB8AAABUAAAAAAAABQAAAAEAAAAAAAAAAAAAAAAAAAAAAAAAAAAAAAAAAAAAAAAAAAAAAAJ/f38AAAAAA8zMzADAwP8Af39/AAAAAAAAAAAAAAAAAAAAAAAAAAAAIQAAABgAAAAUAAAAwTUAABsnAABARwAAWSkAABAAAAAmAAAACAAAAAAAAAAAAAAA"/>
               </a:ext>
             </a:extLst>
           </p:cNvSpPr>
@@ -586,7 +587,7 @@
           <a:lstStyle/>
           <a:p>
             <a:pPr/>
-            <a:fld id="{3A26ED51-1FD7-731B-999E-E94EA3D06FBC}" type="slidenum">
+            <a:fld id="{39DF9F79-37D4-8A69-9A67-C13CD1296C94}" type="slidenum">
               <a:t/>
             </a:fld>
           </a:p>
@@ -624,7 +625,7 @@
             <a:spLocks noGrp="1" noChangeArrowheads="1"/>
             <a:extLst>
               <a:ext uri="smNativeData">
-                <pr:smNativeData xmlns:pr="smNativeData" xmlns="smNativeData" val="SMDATA_15_ucsbZBMAAAAlAAAAZAAAAA8BAAAAkAAAAEgAAACQAAAASAAAAAAAAAACAAAAAQAAAAEAAABQAAAAAAAAAAAA4D8AAAAAAADgPwAAAAAAAOA/AAAAAAAA4D8AAAAAAADgPwAAAAAAAOA/AAAAAAAA4D8AAAAAAADgPwAAAAAAAOA/AAAAAAAA4D8CAAAAjAAAAAAAAAAAAAAAu+DjDP///wgAAAAAAAAAAAAAAAAAAAAAAAAAAAAAAAAAAAAAZAAAAAEAAABAAAAAAAAAAAAAAAAAAAAAAAAAAAAAAAAAAAAAAAAAAAAAAAAAAAAAAAAAAAAAAAAAAAAAAAAAAAAAAAAAAAAAAAAAAAAAAAAAAAAAAAAAAAAAAAAAAAAAFAAAADwAAAAAAAAAAAAAAAAAAAkUAAAAAQAAABQAAAAUAAAAFAAAAAEAAAAAAAAAZAAAAGQAAAAAAAAAZAAAAGQAAAAVAAAAYAAAAAAAAAAAAAAADwAAACADAAAAAAAAAAAAAAEAAACgMgAAVgcAAKr4//8BAAAAf39/AAEAAABkAAAAAAAAABQAAABAHwAAAAAAACYAAAAAAAAAwOD//wAAAAAmAAAAZAAAABYAAABMAAAAAAAAAAAAAAAEAAAAAAAAAAEAAACAgIAKAAAAACgAAAAoAAAAZAAAAGQAAAAAAAAAzMzMAAAAAABQAAAAUAAAAGQAAABkAAAAAAAAABcAAAAUAAAAAAAAAAAAAAD/fwAA/38AAAAAAAAJAAAABAAAAAAAAAAeAAAAaAAAAAAAAAAAAAAAAAAAAAAAAAAAAAAAECcAABAnAAAAAAAAAAAAAAAAAAAAAAAAAAAAAAAAAAAAAAAAAAAAABQAAAAAAAAAwMD/AAAAAABkAAAAMgAAAAAAAABkAAAAAAAAAH9/fwAKAAAAIgAAABgAAAAAAAAAAAAAAAAAAAAAAAAAAAAAAAAAAAAkAAAAJAAAAAAAAAAHAAAAAAAAAAAAAAAAAAAAAAAAAAAAAAAAAAAAf39/ACUAAABYAAAAAAAAAAAAAAAAAAAAAAAAAAAAAAAAAAAAAAAAAAAAAAAAAAAAAAAAAAAAAAA/AAAAAAAAAKCGAQAAAAAAAAAAAAAAAAAMAAAAAQAAAAAAAAAAAAAAAAAAAB8AAABUAAAAAAAABQAAAAEAAAAAAAAAAAAAAAAAAAAAAAAAAAAAAAAAAAAAAAAAAAAAAAJ/f38AAAAAA8zMzADAwP8Af39/AAAAAAAAAAAAAAAAAAAAAAAAAAAAIQAAABgAAAAUAAAAYDYAALABAABARwAAsCUAABAAAAAmAAAACAAAAIMAAAAAAAAA"/>
+                <pr:smNativeData xmlns:pr="smNativeData" xmlns="smNativeData" val="SMDATA_15_NygcZBMAAAAlAAAAZAAAAA8BAAAAkAAAAEgAAACQAAAASAAAAAAAAAACAAAAAQAAAAEAAABQAAAAAAAAAAAA4D8AAAAAAADgPwAAAAAAAOA/AAAAAAAA4D8AAAAAAADgPwAAAAAAAOA/AAAAAAAA4D8AAAAAAADgPwAAAAAAAOA/AAAAAAAA4D8CAAAAjAAAAAAAAAAAAAAAu+DjDP///wgAAAAAAAAAAAAAAAAAAAAAAAAAAAAAAAAAAAAAZAAAAAEAAABAAAAAAAAAAAAAAAAAAAAAAAAAAAAAAAAAAAAAAAAAAAAAAAAAAAAAAAAAAAAAAAAAAAAAAAAAAAAAAAAAAAAAAAAAAAAAAAAAAAAAAAAAAAAAAAAAAAAAFAAAADwAAAAAAAAAAAAAAAAAAAkUAAAAAQAAABQAAAAUAAAAFAAAAAEAAAAAAAAAZAAAAGQAAAAAAAAAZAAAAGQAAAAVAAAAYAAAAAAAAAAAAAAADwAAACADAAAAAAAAAAAAAAEAAACgMgAAVgcAAKr4//8BAAAAf39/AAEAAABkAAAAAAAAABQAAABAHwAAAAAAACYAAAAAAAAAwOD//wAAAAAmAAAAZAAAABYAAABMAAAAAAAAAAAAAAAEAAAAAAAAAAEAAACAgIAKAAAAACgAAAAoAAAAZAAAAGQAAAAAAAAAzMzMAAAAAABQAAAAUAAAAGQAAABkAAAAAAAAABcAAAAUAAAAAAAAAAAAAAD/fwAA/38AAAAAAAAJAAAABAAAAAAAAAAeAAAAaAAAAAAAAAAAAAAAAAAAAAAAAAAAAAAAECcAABAnAAAAAAAAAAAAAAAAAAAAAAAAAAAAAAAAAAAAAAAAAAAAABQAAAAAAAAAwMD/AAAAAABkAAAAMgAAAAAAAABkAAAAAAAAAH9/fwAKAAAAIgAAABgAAAAAAAAAAAAAAAAAAAAAAAAAAAAAAAAAAAAkAAAAJAAAAAAAAAAHAAAAAAAAAAAAAAAAAAAAAAAAAAAAAAAAAAAAf39/ACUAAABYAAAAAAAAAAAAAAAAAAAAAAAAAAAAAAAAAAAAAAAAAAAAAAAAAAAAAAAAAAAAAAA/AAAAAAAAAKCGAQAAAAAAAAAAAAAAAAAMAAAAAQAAAAAAAAAAAAAAAAAAAB8AAABUAAAAAAAABQAAAAEAAAAAAAAAAAAAAAAAAAAAAAAAAAAAAAAAAAAAAAAAAAAAAAJ/f38AAAAAA8zMzADAwP8Af39/AAAAAAAAAAAAAAAAAAAAAAAAAAAAIQAAABgAAAAUAAAAYDYAALABAABARwAAsCUAABAAAAAmAAAACAAAAIMAAAAAAAAA"/>
               </a:ext>
             </a:extLst>
           </p:cNvSpPr>
@@ -660,7 +661,7 @@
             <a:spLocks noGrp="1" noChangeArrowheads="1"/>
             <a:extLst>
               <a:ext uri="smNativeData">
-                <pr:smNativeData xmlns:pr="smNativeData" xmlns="smNativeData" val="SMDATA_15_ucsbZBMAAAAlAAAAZAAAAA8BAAAAkAAAAEgAAACQAAAASAAAAAAAAAAAAAAAAQAAAAEAAABQAAAAAAAAAAAA4D8AAAAAAADgPwAAAAAAAOA/AAAAAAAA4D8AAAAAAADgPwAAAAAAAOA/AAAAAAAA4D8AAAAAAADgPwAAAAAAAOA/AAAAAAAA4D8CAAAAjAAAAAAAAAAAAAAAu+DjDP///wgAAAAAAAAAAAAAAAAAAAAAAAAAAAAAAAAAAAAAZAAAAAEAAABAAAAAAAAAAAAAAAAAAAAAAAAAAAAAAAAAAAAAAAAAAAAAAAAAAAAAAAAAAAAAAAAAAAAAAAAAAAAAAAAAAAAAAAAAAAAAAAAAAAAAAAAAAAAAAAAAAAAAFAAAADwAAAAAAAAAAAAAAAAAAAkUAAAAAQAAABQAAAAUAAAAFAAAAAEAAAAAAAAAZAAAAGQAAAAAAAAAZAAAAGQAAAAVAAAAYAAAAAAAAAAAAAAADwAAACADAAAAAAAAAAAAAAEAAACgMgAAVgcAAKr4//8BAAAAf39/AAEAAABkAAAAAAAAABQAAABAHwAAAAAAACYAAAAAAAAAwOD//wAAAAAmAAAAZAAAABYAAABMAAAAAAAAAAAAAAAEAAAAAAAAAAEAAACAgIAKAAAAACgAAAAoAAAAZAAAAGQAAAAAAAAAzMzMAAAAAABQAAAAUAAAAGQAAABkAAAAAAAAABcAAAAUAAAAAAAAAAAAAAD/fwAA/38AAAAAAAAJAAAABAAAAAAAAAAeAAAAaAAAAAAAAAAAAAAAAAAAAAAAAAAAAAAAECcAABAnAAAAAAAAAAAAAAAAAAAAAAAAAAAAAAAAAAAAAAAAAAAAABQAAAAAAAAAwMD/AAAAAABkAAAAMgAAAAAAAABkAAAAAAAAAH9/fwAKAAAAIgAAABgAAAAAAAAAAAAAAAAAAAAAAAAAAAAAAAAAAAAkAAAAJAAAAAAAAAAHAAAAAAAAAAAAAAAAAAAAAAAAAAAAAAAAAAAAf39/ACUAAABYAAAAAAAAAAAAAAAAAAAAAAAAAAAAAAAAAAAAAAAAAAAAAAAAAAAAAAAAAAAAAAA/AAAAAAAAAKCGAQAAAAAAAAAAAAAAAAAMAAAAAQAAAAAAAAAAAAAAAAAAAB8AAABUAAAAAAAABQAAAAEAAAAAAAAAAAAAAAAAAAAAAAAAAAAAAAAAAAAAAAAAAAAAAAJ/f38AAAAAA8zMzADAwP8Af39/AAAAAAAAAAAAAAAAAAAAAAAAAAAAIQAAABgAAAAUAAAAwAMAALABAAAfNQAAsCUAABAAAAAmAAAACAAAAAMAAAAAAAAA"/>
+                <pr:smNativeData xmlns:pr="smNativeData" xmlns="smNativeData" val="SMDATA_15_NygcZBMAAAAlAAAAZAAAAA8BAAAAkAAAAEgAAACQAAAASAAAAAAAAAAAAAAAAQAAAAEAAABQAAAAAAAAAAAA4D8AAAAAAADgPwAAAAAAAOA/AAAAAAAA4D8AAAAAAADgPwAAAAAAAOA/AAAAAAAA4D8AAAAAAADgPwAAAAAAAOA/AAAAAAAA4D8CAAAAjAAAAAAAAAAAAAAAu+DjDP///wgAAAAAAAAAAAAAAAAAAAAAAAAAAAAAAAAAAAAAZAAAAAEAAABAAAAAAAAAAAAAAAAAAAAAAAAAAAAAAAAAAAAAAAAAAAAAAAAAAAAAAAAAAAAAAAAAAAAAAAAAAAAAAAAAAAAAAAAAAAAAAAAAAAAAAAAAAAAAAAAAAAAAFAAAADwAAAAAAAAAAAAAAAAAAAkUAAAAAQAAABQAAAAUAAAAFAAAAAEAAAAAAAAAZAAAAGQAAAAAAAAAZAAAAGQAAAAVAAAAYAAAAAAAAAAAAAAADwAAACADAAAAAAAAAAAAAAEAAACgMgAAVgcAAKr4//8BAAAAf39/AAEAAABkAAAAAAAAABQAAABAHwAAAAAAACYAAAAAAAAAwOD//wAAAAAmAAAAZAAAABYAAABMAAAAAAAAAAAAAAAEAAAAAAAAAAEAAACAgIAKAAAAACgAAAAoAAAAZAAAAGQAAAAAAAAAzMzMAAAAAABQAAAAUAAAAGQAAABkAAAAAAAAABcAAAAUAAAAAAAAAAAAAAD/fwAA/38AAAAAAAAJAAAABAAAAAAAAAAeAAAAaAAAAAAAAAAAAAAAAAAAAAAAAAAAAAAAECcAABAnAAAAAAAAAAAAAAAAAAAAAAAAAAAAAAAAAAAAAAAAAAAAABQAAAAAAAAAwMD/AAAAAABkAAAAMgAAAAAAAABkAAAAAAAAAH9/fwAKAAAAIgAAABgAAAAAAAAAAAAAAAAAAAAAAAAAAAAAAAAAAAAkAAAAJAAAAAAAAAAHAAAAAAAAAAAAAAAAAAAAAAAAAAAAAAAAAAAAf39/ACUAAABYAAAAAAAAAAAAAAAAAAAAAAAAAAAAAAAAAAAAAAAAAAAAAAAAAAAAAAAAAAAAAAA/AAAAAAAAAKCGAQAAAAAAAAAAAAAAAAAMAAAAAQAAAAAAAAAAAAAAAAAAAB8AAABUAAAAAAAABQAAAAEAAAAAAAAAAAAAAAAAAAAAAAAAAAAAAAAAAAAAAAAAAAAAAAJ/f38AAAAAA8zMzADAwP8Af39/AAAAAAAAAAAAAAAAAAAAAAAAAAAAIQAAABgAAAAUAAAAwAMAALABAAAfNQAAsCUAABAAAAAmAAAACAAAAAMAAAAAAAAA"/>
               </a:ext>
             </a:extLst>
           </p:cNvSpPr>
@@ -720,7 +721,7 @@
             <a:spLocks noGrp="1" noChangeArrowheads="1"/>
             <a:extLst>
               <a:ext uri="smNativeData">
-                <pr:smNativeData xmlns:pr="smNativeData" xmlns="smNativeData" val="SMDATA_15_ucsbZBMAAAAlAAAAZAAAAA8BAAAAkAAAAEgAAACQAAAASAAAAAAAAAABAAAAAAAAAAEAAABQAAAAAAAAAAAA4D8AAAAAAADgPwAAAAAAAOA/AAAAAAAA4D8AAAAAAADgPwAAAAAAAOA/AAAAAAAA4D8AAAAAAADgPwAAAAAAAOA/AAAAAAAA4D8CAAAAjAAAAAAAAAAAAAAAu+DjDP///wgAAAAAAAAAAAAAAAAAAAAAAAAAAAAAAAAAAAAAZAAAAAEAAABAAAAAAAAAAAAAAAAAAAAAAAAAAAAAAAAAAAAAAAAAAAAAAAAAAAAAAAAAAAAAAAAAAAAAAAAAAAAAAAAAAAAAAAAAAAAAAAAAAAAAAAAAAAAAAAAAAAAAFAAAADwAAAAAAAAAAAAAAAAAAAkUAAAAAQAAABQAAAAUAAAAFAAAAAEAAAAAAAAAZAAAAGQAAAAAAAAAZAAAAGQAAAAVAAAAYAAAAAAAAAAAAAAADwAAACADAAAAAAAAAAAAAAEAAACgMgAAVgcAAKr4//8BAAAAf39/AAEAAABkAAAAAAAAABQAAABAHwAAAAAAACYAAAAAAAAAwOD//wAAAAAmAAAAZAAAABYAAABMAAAAAAAAAAAAAAAEAAAAAAAAAAEAAACAgIAKAAAAACgAAAAoAAAAZAAAAGQAAAAAAAAAzMzMAAAAAABQAAAAUAAAAGQAAABkAAAAAAAAABcAAAAUAAAAAAAAAAAAAAD/fwAA/38AAAAAAAAJAAAABAAAAAAAAAAeAAAAaAAAAAAAAAAAAAAAAAAAAAAAAAAAAAAAECcAABAnAAAAAAAAAAAAAAAAAAAAAAAAAAAAAAAAAAAAAAAAAAAAABQAAAAAAAAAwMD/AAAAAABkAAAAMgAAAAAAAABkAAAAAAAAAH9/fwAKAAAAIgAAABgAAAAAAAAAAAAAAAAAAAAAAAAAAAAAAAAAAAAkAAAAJAAAAAAAAAAHAAAAAAAAAAAAAAAAAAAAAAAAAAAAAAAAAAAAf39/ACUAAABYAAAAAAAAAAAAAAAAAAAAAAAAAAAAAAAAAAAAAAAAAAAAAAAAAAAAAAAAAAAAAAA/AAAAAAAAAKCGAQAAAAAAAAAAAAAAAAAMAAAAAQAAAAAAAAAAAAAAAAAAAB8AAABUAAAAAAAABQAAAAEAAAAAAAAAAAAAAAAAAAAAAAAAAAAAAAAAAAAAAAAAAAAAAAJ/f38AAAAAA8zMzADAwP8Af39/AAAAAAAAAAAAAAAAAAAAAAAAAAAAIQAAABgAAAAUAAAAwAMAABsnAAA/FQAAWSkAABAAAAAmAAAACAAAAAAAAAAAAAAA"/>
+                <pr:smNativeData xmlns:pr="smNativeData" xmlns="smNativeData" val="SMDATA_15_NygcZBMAAAAlAAAAZAAAAA8BAAAAkAAAAEgAAACQAAAASAAAAAAAAAABAAAAAAAAAAEAAABQAAAAAAAAAAAA4D8AAAAAAADgPwAAAAAAAOA/AAAAAAAA4D8AAAAAAADgPwAAAAAAAOA/AAAAAAAA4D8AAAAAAADgPwAAAAAAAOA/AAAAAAAA4D8CAAAAjAAAAAAAAAAAAAAAu+DjDP///wgAAAAAAAAAAAAAAAAAAAAAAAAAAAAAAAAAAAAAZAAAAAEAAABAAAAAAAAAAAAAAAAAAAAAAAAAAAAAAAAAAAAAAAAAAAAAAAAAAAAAAAAAAAAAAAAAAAAAAAAAAAAAAAAAAAAAAAAAAAAAAAAAAAAAAAAAAAAAAAAAAAAAFAAAADwAAAAAAAAAAAAAAAAAAAkUAAAAAQAAABQAAAAUAAAAFAAAAAEAAAAAAAAAZAAAAGQAAAAAAAAAZAAAAGQAAAAVAAAAYAAAAAAAAAAAAAAADwAAACADAAAAAAAAAAAAAAEAAACgMgAAVgcAAKr4//8BAAAAf39/AAEAAABkAAAAAAAAABQAAABAHwAAAAAAACYAAAAAAAAAwOD//wAAAAAmAAAAZAAAABYAAABMAAAAAAAAAAAAAAAEAAAAAAAAAAEAAACAgIAKAAAAACgAAAAoAAAAZAAAAGQAAAAAAAAAzMzMAAAAAABQAAAAUAAAAGQAAABkAAAAAAAAABcAAAAUAAAAAAAAAAAAAAD/fwAA/38AAAAAAAAJAAAABAAAAAAAAAAeAAAAaAAAAAAAAAAAAAAAAAAAAAAAAAAAAAAAECcAABAnAAAAAAAAAAAAAAAAAAAAAAAAAAAAAAAAAAAAAAAAAAAAABQAAAAAAAAAwMD/AAAAAABkAAAAMgAAAAAAAABkAAAAAAAAAH9/fwAKAAAAIgAAABgAAAAAAAAAAAAAAAAAAAAAAAAAAAAAAAAAAAAkAAAAJAAAAAAAAAAHAAAAAAAAAAAAAAAAAAAAAAAAAAAAAAAAAAAAf39/ACUAAABYAAAAAAAAAAAAAAAAAAAAAAAAAAAAAAAAAAAAAAAAAAAAAAAAAAAAAAAAAAAAAAA/AAAAAAAAAKCGAQAAAAAAAAAAAAAAAAAMAAAAAQAAAAAAAAAAAAAAAAAAAB8AAABUAAAAAAAABQAAAAEAAAAAAAAAAAAAAAAAAAAAAAAAAAAAAAAAAAAAAAAAAAAAAAJ/f38AAAAAA8zMzADAwP8Af39/AAAAAAAAAAAAAAAAAAAAAAAAAAAAIQAAABgAAAAUAAAAwAMAABsnAAA/FQAAWSkAABAAAAAmAAAACAAAAAAAAAAAAAAA"/>
               </a:ext>
             </a:extLst>
           </p:cNvSpPr>
@@ -734,7 +735,7 @@
           <a:lstStyle/>
           <a:p>
             <a:pPr/>
-            <a:fld id="{3A26D96B-25D7-732F-999E-D37A97D06F86}" type="datetime1">
+            <a:fld id="{39DFD2D7-99D4-8A24-9A67-6F719C296C3A}" type="datetime1">
               <a:t/>
             </a:fld>
           </a:p>
@@ -747,7 +748,7 @@
             <a:spLocks noGrp="1" noChangeArrowheads="1"/>
             <a:extLst>
               <a:ext uri="smNativeData">
-                <pr:smNativeData xmlns:pr="smNativeData" xmlns="smNativeData" val="SMDATA_15_ucsbZBMAAAAlAAAAZAAAAA8BAAAAkAAAAEgAAACQAAAASAAAAAAAAAABAAAAAAAAAAEAAABQAAAAAAAAAAAA4D8AAAAAAADgPwAAAAAAAOA/AAAAAAAA4D8AAAAAAADgPwAAAAAAAOA/AAAAAAAA4D8AAAAAAADgPwAAAAAAAOA/AAAAAAAA4D8CAAAAjAAAAAAAAAAAAAAAu+DjDP///wgAAAAAAAAAAAAAAAAAAAAAAAAAAAAAAAAAAAAAZAAAAAEAAABAAAAAAAAAAAAAAAAAAAAAAAAAAAAAAAAAAAAAAAAAAAAAAAAAAAAAAAAAAAAAAAAAAAAAAAAAAAAAAAAAAAAAAAAAAAAAAAAAAAAAAAAAAAAAAAAAAAAAFAAAADwAAAAAAAAAAAAAAAAAAAkUAAAAAQAAABQAAAAUAAAAFAAAAAEAAAAAAAAAZAAAAGQAAAAAAAAAZAAAAGQAAAAVAAAAYAAAAAAAAAAAAAAADwAAACADAAAAAAAAAAAAAAEAAACgMgAAVgcAAKr4//8BAAAAf39/AAEAAABkAAAAAAAAABQAAABAHwAAAAAAACYAAAAAAAAAwOD//wAAAAAmAAAAZAAAABYAAABMAAAAAAAAAAAAAAAEAAAAAAAAAAEAAACAgIAKAAAAACgAAAAoAAAAZAAAAGQAAAAAAAAAzMzMAAAAAABQAAAAUAAAAGQAAABkAAAAAAAAABcAAAAUAAAAAAAAAAAAAAD/fwAA/38AAAAAAAAJAAAABAAAAAAAAAAeAAAAaAAAAAAAAAAAAAAAAAAAAAAAAAAAAAAAECcAABAnAAAAAAAAAAAAAAAAAAAAAAAAAAAAAAAAAAAAAAAAAAAAABQAAAAAAAAAwMD/AAAAAABkAAAAMgAAAAAAAABkAAAAAAAAAH9/fwAKAAAAIgAAABgAAAAAAAAAAAAAAAAAAAAAAAAAAAAAAAAAAAAkAAAAJAAAAAAAAAAHAAAAAAAAAAAAAAAAAAAAAAAAAAAAAAAAAAAAf39/ACUAAABYAAAAAAAAAAAAAAAAAAAAAAAAAAAAAAAAAAAAAAAAAAAAAAAAAAAAAAAAAAAAAAA/AAAAAAAAAKCGAQAAAAAAAAAAAAAAAAAMAAAAAQAAAAAAAAAAAAAAAAAAAB8AAABUAAAAAAAABQAAAAEAAAAAAAAAAAAAAAAAAAAAAAAAAAAAAAAAAAAAAAAAAAAAAAJ/f38AAAAAA8zMzADAwP8Af39/AAAAAAAAAAAAAAAAAAAAAAAAAAAAIQAAABgAAAAUAAAAoRkAABsnAABfMQAAWSkAABAAAAAmAAAACAAAAAAAAAAAAAAA"/>
+                <pr:smNativeData xmlns:pr="smNativeData" xmlns="smNativeData" val="SMDATA_15_NygcZBMAAAAlAAAAZAAAAA8BAAAAkAAAAEgAAACQAAAASAAAAAAAAAABAAAAAAAAAAEAAABQAAAAAAAAAAAA4D8AAAAAAADgPwAAAAAAAOA/AAAAAAAA4D8AAAAAAADgPwAAAAAAAOA/AAAAAAAA4D8AAAAAAADgPwAAAAAAAOA/AAAAAAAA4D8CAAAAjAAAAAAAAAAAAAAAu+DjDP///wgAAAAAAAAAAAAAAAAAAAAAAAAAAAAAAAAAAAAAZAAAAAEAAABAAAAAAAAAAAAAAAAAAAAAAAAAAAAAAAAAAAAAAAAAAAAAAAAAAAAAAAAAAAAAAAAAAAAAAAAAAAAAAAAAAAAAAAAAAAAAAAAAAAAAAAAAAAAAAAAAAAAAFAAAADwAAAAAAAAAAAAAAAAAAAkUAAAAAQAAABQAAAAUAAAAFAAAAAEAAAAAAAAAZAAAAGQAAAAAAAAAZAAAAGQAAAAVAAAAYAAAAAAAAAAAAAAADwAAACADAAAAAAAAAAAAAAEAAACgMgAAVgcAAKr4//8BAAAAf39/AAEAAABkAAAAAAAAABQAAABAHwAAAAAAACYAAAAAAAAAwOD//wAAAAAmAAAAZAAAABYAAABMAAAAAAAAAAAAAAAEAAAAAAAAAAEAAACAgIAKAAAAACgAAAAoAAAAZAAAAGQAAAAAAAAAzMzMAAAAAABQAAAAUAAAAGQAAABkAAAAAAAAABcAAAAUAAAAAAAAAAAAAAD/fwAA/38AAAAAAAAJAAAABAAAAAAAAAAeAAAAaAAAAAAAAAAAAAAAAAAAAAAAAAAAAAAAECcAABAnAAAAAAAAAAAAAAAAAAAAAAAAAAAAAAAAAAAAAAAAAAAAABQAAAAAAAAAwMD/AAAAAABkAAAAMgAAAAAAAABkAAAAAAAAAH9/fwAKAAAAIgAAABgAAAAAAAAAAAAAAAAAAAAAAAAAAAAAAAAAAAAkAAAAJAAAAAAAAAAHAAAAAAAAAAAAAAAAAAAAAAAAAAAAAAAAAAAAf39/ACUAAABYAAAAAAAAAAAAAAAAAAAAAAAAAAAAAAAAAAAAAAAAAAAAAAAAAAAAAAAAAAAAAAA/AAAAAAAAAKCGAQAAAAAAAAAAAAAAAAAMAAAAAQAAAAAAAAAAAAAAAAAAAB8AAABUAAAAAAAABQAAAAEAAAAAAAAAAAAAAAAAAAAAAAAAAAAAAAAAAAAAAAAAAAAAAAJ/f38AAAAAA8zMzADAwP8Af39/AAAAAAAAAAAAAAAAAAAAAAAAAAAAIQAAABgAAAAUAAAAoRkAABsnAABfMQAAWSkAABAAAAAmAAAACAAAAAAAAAAAAAAA"/>
               </a:ext>
             </a:extLst>
           </p:cNvSpPr>
@@ -774,7 +775,7 @@
             <a:spLocks noGrp="1" noChangeArrowheads="1"/>
             <a:extLst>
               <a:ext uri="smNativeData">
-                <pr:smNativeData xmlns:pr="smNativeData" xmlns="smNativeData" val="SMDATA_15_ucsbZBMAAAAlAAAAZAAAAA8BAAAAkAAAAEgAAACQAAAASAAAAAAAAAABAAAAAAAAAAEAAABQAAAAAAAAAAAA4D8AAAAAAADgPwAAAAAAAOA/AAAAAAAA4D8AAAAAAADgPwAAAAAAAOA/AAAAAAAA4D8AAAAAAADgPwAAAAAAAOA/AAAAAAAA4D8CAAAAjAAAAAAAAAAAAAAAu+DjDP///wgAAAAAAAAAAAAAAAAAAAAAAAAAAAAAAAAAAAAAZAAAAAEAAABAAAAAAAAAAAAAAAAAAAAAAAAAAAAAAAAAAAAAAAAAAAAAAAAAAAAAAAAAAAAAAAAAAAAAAAAAAAAAAAAAAAAAAAAAAAAAAAAAAAAAAAAAAAAAAAAAAAAAFAAAADwAAAAAAAAAAAAAAAAAAAkUAAAAAQAAABQAAAAUAAAAFAAAAAEAAAAAAAAAZAAAAGQAAAAAAAAAZAAAAGQAAAAVAAAAYAAAAAAAAAAAAAAADwAAACADAAAAAAAAAAAAAAEAAACgMgAAVgcAAKr4//8BAAAAf39/AAEAAABkAAAAAAAAABQAAABAHwAAAAAAACYAAAAAAAAAwOD//wAAAAAmAAAAZAAAABYAAABMAAAAAAAAAAAAAAAEAAAAAAAAAAEAAACAgIAKAAAAACgAAAAoAAAAZAAAAGQAAAAAAAAAzMzMAAAAAABQAAAAUAAAAGQAAABkAAAAAAAAABcAAAAUAAAAAAAAAAAAAAD/fwAA/38AAAAAAAAJAAAABAAAAAAAAAAeAAAAaAAAAAAAAAAAAAAAAAAAAAAAAAAAAAAAECcAABAnAAAAAAAAAAAAAAAAAAAAAAAAAAAAAAAAAAAAAAAAAAAAABQAAAAAAAAAwMD/AAAAAABkAAAAMgAAAAAAAABkAAAAAAAAAH9/fwAKAAAAIgAAABgAAAAAAAAAAAAAAAAAAAAAAAAAAAAAAAAAAAAkAAAAJAAAAAAAAAAHAAAAAAAAAAAAAAAAAAAAAAAAAAAAAAAAAAAAf39/ACUAAABYAAAAAAAAAAAAAAAAAAAAAAAAAAAAAAAAAAAAAAAAAAAAAAAAAAAAAAAAAAAAAAA/AAAAAAAAAKCGAQAAAAAAAAAAAAAAAAAMAAAAAQAAAAAAAAAAAAAAAAAAAB8AAABUAAAAAAAABQAAAAEAAAAAAAAAAAAAAAAAAAAAAAAAAAAAAAAAAAAAAAAAAAAAAAJ/f38AAAAAA8zMzADAwP8Af39/AAAAAAAAAAAAAAAAAAAAAAAAAAAAIQAAABgAAAAUAAAAwTUAABsnAABARwAAWSkAABAAAAAmAAAACAAAAAAAAAAAAAAA"/>
+                <pr:smNativeData xmlns:pr="smNativeData" xmlns="smNativeData" val="SMDATA_15_NygcZBMAAAAlAAAAZAAAAA8BAAAAkAAAAEgAAACQAAAASAAAAAAAAAABAAAAAAAAAAEAAABQAAAAAAAAAAAA4D8AAAAAAADgPwAAAAAAAOA/AAAAAAAA4D8AAAAAAADgPwAAAAAAAOA/AAAAAAAA4D8AAAAAAADgPwAAAAAAAOA/AAAAAAAA4D8CAAAAjAAAAAAAAAAAAAAAu+DjDP///wgAAAAAAAAAAAAAAAAAAAAAAAAAAAAAAAAAAAAAZAAAAAEAAABAAAAAAAAAAAAAAAAAAAAAAAAAAAAAAAAAAAAAAAAAAAAAAAAAAAAAAAAAAAAAAAAAAAAAAAAAAAAAAAAAAAAAAAAAAAAAAAAAAAAAAAAAAAAAAAAAAAAAFAAAADwAAAAAAAAAAAAAAAAAAAkUAAAAAQAAABQAAAAUAAAAFAAAAAEAAAAAAAAAZAAAAGQAAAAAAAAAZAAAAGQAAAAVAAAAYAAAAAAAAAAAAAAADwAAACADAAAAAAAAAAAAAAEAAACgMgAAVgcAAKr4//8BAAAAf39/AAEAAABkAAAAAAAAABQAAABAHwAAAAAAACYAAAAAAAAAwOD//wAAAAAmAAAAZAAAABYAAABMAAAAAAAAAAAAAAAEAAAAAAAAAAEAAACAgIAKAAAAACgAAAAoAAAAZAAAAGQAAAAAAAAAzMzMAAAAAABQAAAAUAAAAGQAAABkAAAAAAAAABcAAAAUAAAAAAAAAAAAAAD/fwAA/38AAAAAAAAJAAAABAAAAAAAAAAeAAAAaAAAAAAAAAAAAAAAAAAAAAAAAAAAAAAAECcAABAnAAAAAAAAAAAAAAAAAAAAAAAAAAAAAAAAAAAAAAAAAAAAABQAAAAAAAAAwMD/AAAAAABkAAAAMgAAAAAAAABkAAAAAAAAAH9/fwAKAAAAIgAAABgAAAAAAAAAAAAAAAAAAAAAAAAAAAAAAAAAAAAkAAAAJAAAAAAAAAAHAAAAAAAAAAAAAAAAAAAAAAAAAAAAAAAAAAAAf39/ACUAAABYAAAAAAAAAAAAAAAAAAAAAAAAAAAAAAAAAAAAAAAAAAAAAAAAAAAAAAAAAAAAAAA/AAAAAAAAAKCGAQAAAAAAAAAAAAAAAAAMAAAAAQAAAAAAAAAAAAAAAAAAAB8AAABUAAAAAAAABQAAAAEAAAAAAAAAAAAAAAAAAAAAAAAAAAAAAAAAAAAAAAAAAAAAAAJ/f38AAAAAA8zMzADAwP8Af39/AAAAAAAAAAAAAAAAAAAAAAAAAAAAIQAAABgAAAAUAAAAwTUAABsnAABARwAAWSkAABAAAAAmAAAACAAAAAAAAAAAAAAA"/>
               </a:ext>
             </a:extLst>
           </p:cNvSpPr>
@@ -788,7 +789,7 @@
           <a:lstStyle/>
           <a:p>
             <a:pPr/>
-            <a:fld id="{3A26A5E0-AED7-7353-999E-5806EBD06F0D}" type="slidenum">
+            <a:fld id="{39DF9B09-47D4-8A6D-9A67-B138D5296CE4}" type="slidenum">
               <a:t/>
             </a:fld>
           </a:p>
@@ -826,7 +827,7 @@
             <a:spLocks noGrp="1" noChangeArrowheads="1"/>
             <a:extLst>
               <a:ext uri="smNativeData">
-                <pr:smNativeData xmlns:pr="smNativeData" xmlns="smNativeData" val="SMDATA_15_ucsbZBMAAAAlAAAAZAAAAA8BAAAAkAAAAEgAAACQAAAASAAAAAAAAAABAAAAAAAAAAEAAABQAAAAAAAAAAAA4D8AAAAAAADgPwAAAAAAAOA/AAAAAAAA4D8AAAAAAADgPwAAAAAAAOA/AAAAAAAA4D8AAAAAAADgPwAAAAAAAOA/AAAAAAAA4D8CAAAAjAAAAAAAAAAAAAAAu+DjDP///wgAAAAAAAAAAAAAAAAAAAAAAAAAAAAAAAAAAAAAZAAAAAEAAABAAAAAAAAAAAAAAAAAAAAAAAAAAAAAAAAAAAAAAAAAAAAAAAAAAAAAAAAAAAAAAAAAAAAAAAAAAAAAAAAAAAAAAAAAAAAAAAAAAAAAAAAAAAAAAAAAAAAAFAAAADwAAAAAAAAAAAAAAAAAAAkUAAAAAQAAABQAAAAUAAAAFAAAAAEAAAAAAAAAZAAAAGQAAAAAAAAAZAAAAGQAAAAVAAAAYAAAAAAAAAAAAAAADwAAACADAAAAAAAAAAAAAAEAAACgMgAAVgcAAKr4//8BAAAAf39/AAEAAABkAAAAAAAAABQAAABAHwAAAAAAACYAAAAAAAAAwOD//wAAAAAmAAAAZAAAABYAAABMAAAAAAAAAAAAAAAEAAAAAAAAAAEAAACAgIAKAAAAACgAAAAoAAAAZAAAAGQAAAAAAAAAzMzMAAAAAABQAAAAUAAAAGQAAABkAAAAAAAAABcAAAAUAAAAAAAAAAAAAAD/fwAA/38AAAAAAAAJAAAABAAAAAAAAAAeAAAAaAAAAAAAAAAAAAAAAAAAAAAAAAAAAAAAECcAABAnAAAAAAAAAAAAAAAAAAAAAAAAAAAAAAAAAAAAAAAAAAAAABQAAAAAAAAAwMD/AAAAAABkAAAAMgAAAAAAAABkAAAAAAAAAH9/fwAKAAAAIgAAABgAAAAAAAAAAAAAAAAAAAAAAAAAAAAAAAAAAAAkAAAAJAAAAAAAAAAHAAAAAAAAAAAAAAAAAAAAAAAAAAAAAAAAAAAAf39/ACUAAABYAAAAAAAAAAAAAAAAAAAAAAAAAAAAAAAAAAAAAAAAAAAAAAAAAAAAAAAAAAAAAAA/AAAAAAAAAKCGAQAAAAAAAAAAAAAAAAAMAAAAAQAAAAAAAAAAAAAAAAAAAB8AAABUAAAAAAAABQAAAAEAAAAAAAAAAAAAAAAAAAAAAAAAAAAAAAAAAAAAAAAAAAAAAAJ/f38AAAAAA8zMzADAwP8Af39/AAAAAAAAAAAAAAAAAAAAAAAAAAAAIQAAABgAAAAUAAAAwAMAALABAABARwAAuAgAABAAAAAmAAAACAAAAAAAAAAAAAAA"/>
+                <pr:smNativeData xmlns:pr="smNativeData" xmlns="smNativeData" val="SMDATA_15_NygcZBMAAAAlAAAAZAAAAA8BAAAAkAAAAEgAAACQAAAASAAAAAAAAAABAAAAAAAAAAEAAABQAAAAAAAAAAAA4D8AAAAAAADgPwAAAAAAAOA/AAAAAAAA4D8AAAAAAADgPwAAAAAAAOA/AAAAAAAA4D8AAAAAAADgPwAAAAAAAOA/AAAAAAAA4D8CAAAAjAAAAAAAAAAAAAAAu+DjDP///wgAAAAAAAAAAAAAAAAAAAAAAAAAAAAAAAAAAAAAZAAAAAEAAABAAAAAAAAAAAAAAAAAAAAAAAAAAAAAAAAAAAAAAAAAAAAAAAAAAAAAAAAAAAAAAAAAAAAAAAAAAAAAAAAAAAAAAAAAAAAAAAAAAAAAAAAAAAAAAAAAAAAAFAAAADwAAAAAAAAAAAAAAAAAAAkUAAAAAQAAABQAAAAUAAAAFAAAAAEAAAAAAAAAZAAAAGQAAAAAAAAAZAAAAGQAAAAVAAAAYAAAAAAAAAAAAAAADwAAACADAAAAAAAAAAAAAAEAAACgMgAAVgcAAKr4//8BAAAAf39/AAEAAABkAAAAAAAAABQAAABAHwAAAAAAACYAAAAAAAAAwOD//wAAAAAmAAAAZAAAABYAAABMAAAAAAAAAAAAAAAEAAAAAAAAAAEAAACAgIAKAAAAACgAAAAoAAAAZAAAAGQAAAAAAAAAzMzMAAAAAABQAAAAUAAAAGQAAABkAAAAAAAAABcAAAAUAAAAAAAAAAAAAAD/fwAA/38AAAAAAAAJAAAABAAAAAAAAAAeAAAAaAAAAAAAAAAAAAAAAAAAAAAAAAAAAAAAECcAABAnAAAAAAAAAAAAAAAAAAAAAAAAAAAAAAAAAAAAAAAAAAAAABQAAAAAAAAAwMD/AAAAAABkAAAAMgAAAAAAAABkAAAAAAAAAH9/fwAKAAAAIgAAABgAAAAAAAAAAAAAAAAAAAAAAAAAAAAAAAAAAAAkAAAAJAAAAAAAAAAHAAAAAAAAAAAAAAAAAAAAAAAAAAAAAAAAAAAAf39/ACUAAABYAAAAAAAAAAAAAAAAAAAAAAAAAAAAAAAAAAAAAAAAAAAAAAAAAAAAAAAAAAAAAAA/AAAAAAAAAKCGAQAAAAAAAAAAAAAAAAAMAAAAAQAAAAAAAAAAAAAAAAAAAB8AAABUAAAAAAAABQAAAAEAAAAAAAAAAAAAAAAAAAAAAAAAAAAAAAAAAAAAAAAAAAAAAAJ/f38AAAAAA8zMzADAwP8Af39/AAAAAAAAAAAAAAAAAAAAAAAAAAAAIQAAABgAAAAUAAAAwAMAALABAABARwAAuAgAABAAAAAmAAAACAAAAAAAAAAAAAAA"/>
               </a:ext>
             </a:extLst>
           </p:cNvSpPr>
@@ -853,7 +854,7 @@
             <a:spLocks noGrp="1" noChangeArrowheads="1"/>
             <a:extLst>
               <a:ext uri="smNativeData">
-                <pr:smNativeData xmlns:pr="smNativeData" xmlns="smNativeData" val="SMDATA_15_ucsbZBMAAAAlAAAAZAAAAA8BAAAAkAAAAEgAAACQAAAASAAAAAAAAAAAAAAAAAAAAAEAAABQAAAAAAAAAAAA4D8AAAAAAADgPwAAAAAAAOA/AAAAAAAA4D8AAAAAAADgPwAAAAAAAOA/AAAAAAAA4D8AAAAAAADgPwAAAAAAAOA/AAAAAAAA4D8CAAAAjAAAAAAAAAAAAAAAu+DjDP///wgAAAAAAAAAAAAAAAAAAAAAAAAAAAAAAAAAAAAAZAAAAAEAAABAAAAAAAAAAAAAAAAAAAAAAAAAAAAAAAAAAAAAAAAAAAAAAAAAAAAAAAAAAAAAAAAAAAAAAAAAAAAAAAAAAAAAAAAAAAAAAAAAAAAAAAAAAAAAAAAAAAAAFAAAADwAAAAAAAAAAAAAAAAAAAkUAAAAAQAAABQAAAAUAAAAFAAAAAEAAAAAAAAAZAAAAGQAAAAAAAAAZAAAAGQAAAAVAAAAYAAAAAAAAAAAAAAADwAAACADAAAAAAAAAAAAAAEAAACgMgAAVgcAAKr4//8BAAAAf39/AAEAAABkAAAAAAAAABQAAABAHwAAAAAAACYAAAAAAAAAwOD//wAAAAAmAAAAZAAAABYAAABMAAAAAAAAAAAAAAAEAAAAAAAAAAEAAACAgIAKAAAAACgAAAAoAAAAZAAAAGQAAAAAAAAAzMzMAAAAAABQAAAAUAAAAGQAAABkAAAAAAAAABcAAAAUAAAAAAAAAAAAAAD/fwAA/38AAAAAAAAJAAAABAAAAAAAAAAeAAAAaAAAAAAAAAAAAAAAAAAAAAAAAAAAAAAAECcAABAnAAAAAAAAAAAAAAAAAAAAAAAAAAAAAAAAAAAAAAAAAAAAABQAAAAAAAAAwMD/AAAAAABkAAAAMgAAAAAAAABkAAAAAAAAAH9/fwAKAAAAIgAAABgAAAAAAAAAAAAAAAAAAAAAAAAAAAAAAAAAAAAkAAAAJAAAAAAAAAAHAAAAAAAAAAAAAAAAAAAAAAAAAAAAAAAAAAAAf39/ACUAAABYAAAAAAAAAAAAAAAAAAAAAAAAAAAAAAAAAAAAAAAAAAAAAAAAAAAAAAAAAAAAAAA/AAAAAAAAAKCGAQAAAAAAAAAAAAAAAAAMAAAAAQAAAAAAAAAAAAAAAAAAAB8AAABUAAAAAAAABQAAAAEAAAAAAAAAAAAAAAAAAAAAAAAAAAAAAAAAAAAAAAAAAAAAAAJ/f38AAAAAA8zMzADAwP8Af39/AAAAAAAAAAAAAAAAAAAAAAAAAAAAIQAAABgAAAAUAAAAwAMAANgJAABARwAAsCUAABAAAAAmAAAACAAAAAAAAAAAAAAA"/>
+                <pr:smNativeData xmlns:pr="smNativeData" xmlns="smNativeData" val="SMDATA_15_NygcZBMAAAAlAAAAZAAAAA8BAAAAkAAAAEgAAACQAAAASAAAAAAAAAAAAAAAAAAAAAEAAABQAAAAAAAAAAAA4D8AAAAAAADgPwAAAAAAAOA/AAAAAAAA4D8AAAAAAADgPwAAAAAAAOA/AAAAAAAA4D8AAAAAAADgPwAAAAAAAOA/AAAAAAAA4D8CAAAAjAAAAAAAAAAAAAAAu+DjDP///wgAAAAAAAAAAAAAAAAAAAAAAAAAAAAAAAAAAAAAZAAAAAEAAABAAAAAAAAAAAAAAAAAAAAAAAAAAAAAAAAAAAAAAAAAAAAAAAAAAAAAAAAAAAAAAAAAAAAAAAAAAAAAAAAAAAAAAAAAAAAAAAAAAAAAAAAAAAAAAAAAAAAAFAAAADwAAAAAAAAAAAAAAAAAAAkUAAAAAQAAABQAAAAUAAAAFAAAAAEAAAAAAAAAZAAAAGQAAAAAAAAAZAAAAGQAAAAVAAAAYAAAAAAAAAAAAAAADwAAACADAAAAAAAAAAAAAAEAAACgMgAAVgcAAKr4//8BAAAAf39/AAEAAABkAAAAAAAAABQAAABAHwAAAAAAACYAAAAAAAAAwOD//wAAAAAmAAAAZAAAABYAAABMAAAAAAAAAAAAAAAEAAAAAAAAAAEAAACAgIAKAAAAACgAAAAoAAAAZAAAAGQAAAAAAAAAzMzMAAAAAABQAAAAUAAAAGQAAABkAAAAAAAAABcAAAAUAAAAAAAAAAAAAAD/fwAA/38AAAAAAAAJAAAABAAAAAAAAAAeAAAAaAAAAAAAAAAAAAAAAAAAAAAAAAAAAAAAECcAABAnAAAAAAAAAAAAAAAAAAAAAAAAAAAAAAAAAAAAAAAAAAAAABQAAAAAAAAAwMD/AAAAAABkAAAAMgAAAAAAAABkAAAAAAAAAH9/fwAKAAAAIgAAABgAAAAAAAAAAAAAAAAAAAAAAAAAAAAAAAAAAAAkAAAAJAAAAAAAAAAHAAAAAAAAAAAAAAAAAAAAAAAAAAAAAAAAAAAAf39/ACUAAABYAAAAAAAAAAAAAAAAAAAAAAAAAAAAAAAAAAAAAAAAAAAAAAAAAAAAAAAAAAAAAAA/AAAAAAAAAKCGAQAAAAAAAAAAAAAAAAAMAAAAAQAAAAAAAAAAAAAAAAAAAB8AAABUAAAAAAAABQAAAAEAAAAAAAAAAAAAAAAAAAAAAAAAAAAAAAAAAAAAAAAAAAAAAAJ/f38AAAAAA8zMzADAwP8Af39/AAAAAAAAAAAAAAAAAAAAAAAAAAAAIQAAABgAAAAUAAAAwAMAANgJAABARwAAsCUAABAAAAAmAAAACAAAAAAAAAAAAAAA"/>
               </a:ext>
             </a:extLst>
           </p:cNvSpPr>
@@ -904,7 +905,7 @@
             <a:spLocks noGrp="1" noChangeArrowheads="1"/>
             <a:extLst>
               <a:ext uri="smNativeData">
-                <pr:smNativeData xmlns:pr="smNativeData" xmlns="smNativeData" val="SMDATA_15_ucsbZBMAAAAlAAAAZAAAAA8BAAAAkAAAAEgAAACQAAAASAAAAAAAAAABAAAAAAAAAAEAAABQAAAAAAAAAAAA4D8AAAAAAADgPwAAAAAAAOA/AAAAAAAA4D8AAAAAAADgPwAAAAAAAOA/AAAAAAAA4D8AAAAAAADgPwAAAAAAAOA/AAAAAAAA4D8CAAAAjAAAAAAAAAAAAAAAu+DjDP///wgAAAAAAAAAAAAAAAAAAAAAAAAAAAAAAAAAAAAAZAAAAAEAAABAAAAAAAAAAAAAAAAAAAAAAAAAAAAAAAAAAAAAAAAAAAAAAAAAAAAAAAAAAAAAAAAAAAAAAAAAAAAAAAAAAAAAAAAAAAAAAAAAAAAAAAAAAAAAAAAAAAAAFAAAADwAAAAAAAAAAAAAAAAAAAkUAAAAAQAAABQAAAAUAAAAFAAAAAEAAAAAAAAAZAAAAGQAAAAAAAAAZAAAAGQAAAAVAAAAYAAAAAAAAAAAAAAADwAAACADAAAAAAAAAAAAAAEAAACgMgAAVgcAAKr4//8BAAAAf39/AAEAAABkAAAAAAAAABQAAABAHwAAAAAAACYAAAAAAAAAwOD//wAAAAAmAAAAZAAAABYAAABMAAAAAAAAAAAAAAAEAAAAAAAAAAEAAACAgIAKAAAAACgAAAAoAAAAZAAAAGQAAAAAAAAAzMzMAAAAAABQAAAAUAAAAGQAAABkAAAAAAAAABcAAAAUAAAAAAAAAAAAAAD/fwAA/38AAAAAAAAJAAAABAAAANw7IAEeAAAAaAAAAAAAAAAAAAAAAAAAAAAAAAAAAAAAECcAABAnAAAAAAAAAAAAAAAAAAAAAAAAAAAAAAAAAAAAAAAAAAAAABQAAAAAAAAAwMD/AAAAAABkAAAAMgAAAAAAAABkAAAAAAAAAH9/fwAKAAAAIgAAABgAAAAAAAAAAAAAAAAAAAAAAAAAAAAAAAAAAAAkAAAAJAAAAAAAAAAHAAAAAAAAAAAAAAAAAAAAAAAAAAAAAAAAAAAAf39/ACUAAABYAAAAAAAAAAAAAAAAAAAAAAAAAAAAAAAAAAAAAAAAAAAAAAAAAAAAAAAAAAAAAAA/AAAAAAAAAKCGAQAAAAAAAAAAAAAAAAAMAAAAAQAAAAAAAAAAAAAAAAAAAB8AAABUAAAAAAAABQAAAAEAAAAAAAAAAAAAAAAAAAAAAAAAAAAAAAAAAAAAAAAAAAAAAAJ/f38AAAAAA8zMzADAwP8Af39/AAAAAAAAAAAAAAAAAAAAAAAAAAAAIQAAABgAAAAUAAAAwAMAABsnAAA/FQAAWSkAABAAAAAmAAAACAAAAAAAAAAAAAAA"/>
+                <pr:smNativeData xmlns:pr="smNativeData" xmlns="smNativeData" val="SMDATA_15_NygcZBMAAAAlAAAAZAAAAA8BAAAAkAAAAEgAAACQAAAASAAAAAAAAAABAAAAAAAAAAEAAABQAAAAAAAAAAAA4D8AAAAAAADgPwAAAAAAAOA/AAAAAAAA4D8AAAAAAADgPwAAAAAAAOA/AAAAAAAA4D8AAAAAAADgPwAAAAAAAOA/AAAAAAAA4D8CAAAAjAAAAAAAAAAAAAAAu+DjDP///wgAAAAAAAAAAAAAAAAAAAAAAAAAAAAAAAAAAAAAZAAAAAEAAABAAAAAAAAAAAAAAAAAAAAAAAAAAAAAAAAAAAAAAAAAAAAAAAAAAAAAAAAAAAAAAAAAAAAAAAAAAAAAAAAAAAAAAAAAAAAAAAAAAAAAAAAAAAAAAAAAAAAAFAAAADwAAAAAAAAAAAAAAAAAAAkUAAAAAQAAABQAAAAUAAAAFAAAAAEAAAAAAAAAZAAAAGQAAAAAAAAAZAAAAGQAAAAVAAAAYAAAAAAAAAAAAAAADwAAACADAAAAAAAAAAAAAAEAAACgMgAAVgcAAKr4//8BAAAAf39/AAEAAABkAAAAAAAAABQAAABAHwAAAAAAACYAAAAAAAAAwOD//wAAAAAmAAAAZAAAABYAAABMAAAAAAAAAAAAAAAEAAAAAAAAAAEAAACAgIAKAAAAACgAAAAoAAAAZAAAAGQAAAAAAAAAzMzMAAAAAABQAAAAUAAAAGQAAABkAAAAAAAAABcAAAAUAAAAAAAAAAAAAAD/fwAA/38AAAAAAAAJAAAABAAAANw7IAEeAAAAaAAAAAAAAAAAAAAAAAAAAAAAAAAAAAAAECcAABAnAAAAAAAAAAAAAAAAAAAAAAAAAAAAAAAAAAAAAAAAAAAAABQAAAAAAAAAwMD/AAAAAABkAAAAMgAAAAAAAABkAAAAAAAAAH9/fwAKAAAAIgAAABgAAAAAAAAAAAAAAAAAAAAAAAAAAAAAAAAAAAAkAAAAJAAAAAAAAAAHAAAAAAAAAAAAAAAAAAAAAAAAAAAAAAAAAAAAf39/ACUAAABYAAAAAAAAAAAAAAAAAAAAAAAAAAAAAAAAAAAAAAAAAAAAAAAAAAAAAAAAAAAAAAA/AAAAAAAAAKCGAQAAAAAAAAAAAAAAAAAMAAAAAQAAAAAAAAAAAAAAAAAAAB8AAABUAAAAAAAABQAAAAEAAAAAAAAAAAAAAAAAAAAAAAAAAAAAAAAAAAAAAAAAAAAAAAJ/f38AAAAAA8zMzADAwP8Af39/AAAAAAAAAAAAAAAAAAAAAAAAAAAAIQAAABgAAAAUAAAAwAMAABsnAAA/FQAAWSkAABAAAAAmAAAACAAAAAAAAAAAAAAA"/>
               </a:ext>
             </a:extLst>
           </p:cNvSpPr>
@@ -918,7 +919,7 @@
           <a:lstStyle/>
           <a:p>
             <a:pPr/>
-            <a:fld id="{3A26DC5B-15D7-732A-999E-E37F92D06FB6}" type="datetime1">
+            <a:fld id="{39DFC2B2-FCD4-8A34-9A67-0A618C296C5F}" type="datetime1">
               <a:t/>
             </a:fld>
           </a:p>
@@ -931,7 +932,7 @@
             <a:spLocks noGrp="1" noChangeArrowheads="1"/>
             <a:extLst>
               <a:ext uri="smNativeData">
-                <pr:smNativeData xmlns:pr="smNativeData" xmlns="smNativeData" val="SMDATA_15_ucsbZBMAAAAlAAAAZAAAAA8BAAAAkAAAAEgAAACQAAAASAAAAAAAAAABAAAAAAAAAAEAAABQAAAAAAAAAAAA4D8AAAAAAADgPwAAAAAAAOA/AAAAAAAA4D8AAAAAAADgPwAAAAAAAOA/AAAAAAAA4D8AAAAAAADgPwAAAAAAAOA/AAAAAAAA4D8CAAAAjAAAAAAAAAAAAAAAu+DjDP///wgAAAAAAAAAAAAAAAAAAAAAAAAAAAAAAAAAAAAAZAAAAAEAAABAAAAAAAAAAAAAAAAAAAAAAAAAAAAAAAAAAAAAAAAAAAAAAAAAAAAAAAAAAAAAAAAAAAAAAAAAAAAAAAAAAAAAAAAAAAAAAAAAAAAAAAAAAAAAAAAAAAAAFAAAADwAAAAAAAAAAAAAAAAAAAkUAAAAAQAAABQAAAAUAAAAFAAAAAEAAAAAAAAAZAAAAGQAAAAAAAAAZAAAAGQAAAAVAAAAYAAAAAAAAAAAAAAADwAAACADAAAAAAAAAAAAAAEAAACgMgAAVgcAAKr4//8BAAAAf39/AAEAAABkAAAAAAAAABQAAABAHwAAAAAAACYAAAAAAAAAwOD//wAAAAAmAAAAZAAAABYAAABMAAAAAAAAAAAAAAAEAAAAAAAAAAEAAACAgIAKAAAAACgAAAAoAAAAZAAAAGQAAAAAAAAAzMzMAAAAAABQAAAAUAAAAGQAAABkAAAAAAAAABcAAAAUAAAAAAAAAAAAAAD/fwAA/38AAAAAAAAJAAAABAAAANw7IAEeAAAAaAAAAAAAAAAAAAAAAAAAAAAAAAAAAAAAECcAABAnAAAAAAAAAAAAAAAAAAAAAAAAAAAAAAAAAAAAAAAAAAAAABQAAAAAAAAAwMD/AAAAAABkAAAAMgAAAAAAAABkAAAAAAAAAH9/fwAKAAAAIgAAABgAAAAAAAAAAAAAAAAAAAAAAAAAAAAAAAAAAAAkAAAAJAAAAAAAAAAHAAAAAAAAAAAAAAAAAAAAAAAAAAAAAAAAAAAAf39/ACUAAABYAAAAAAAAAAAAAAAAAAAAAAAAAAAAAAAAAAAAAAAAAAAAAAAAAAAAAAAAAAAAAAA/AAAAAAAAAKCGAQAAAAAAAAAAAAAAAAAMAAAAAQAAAAAAAAAAAAAAAAAAAB8AAABUAAAAAAAABQAAAAEAAAAAAAAAAAAAAAAAAAAAAAAAAAAAAAAAAAAAAAAAAAAAAAJ/f38AAAAAA8zMzADAwP8Af39/AAAAAAAAAAAAAAAAAAAAAAAAAAAAIQAAABgAAAAUAAAAoRkAABsnAABfMQAAWSkAABAAAAAmAAAACAAAAAAAAAAAAAAA"/>
+                <pr:smNativeData xmlns:pr="smNativeData" xmlns="smNativeData" val="SMDATA_15_NygcZBMAAAAlAAAAZAAAAA8BAAAAkAAAAEgAAACQAAAASAAAAAAAAAABAAAAAAAAAAEAAABQAAAAAAAAAAAA4D8AAAAAAADgPwAAAAAAAOA/AAAAAAAA4D8AAAAAAADgPwAAAAAAAOA/AAAAAAAA4D8AAAAAAADgPwAAAAAAAOA/AAAAAAAA4D8CAAAAjAAAAAAAAAAAAAAAu+DjDP///wgAAAAAAAAAAAAAAAAAAAAAAAAAAAAAAAAAAAAAZAAAAAEAAABAAAAAAAAAAAAAAAAAAAAAAAAAAAAAAAAAAAAAAAAAAAAAAAAAAAAAAAAAAAAAAAAAAAAAAAAAAAAAAAAAAAAAAAAAAAAAAAAAAAAAAAAAAAAAAAAAAAAAFAAAADwAAAAAAAAAAAAAAAAAAAkUAAAAAQAAABQAAAAUAAAAFAAAAAEAAAAAAAAAZAAAAGQAAAAAAAAAZAAAAGQAAAAVAAAAYAAAAAAAAAAAAAAADwAAACADAAAAAAAAAAAAAAEAAACgMgAAVgcAAKr4//8BAAAAf39/AAEAAABkAAAAAAAAABQAAABAHwAAAAAAACYAAAAAAAAAwOD//wAAAAAmAAAAZAAAABYAAABMAAAAAAAAAAAAAAAEAAAAAAAAAAEAAACAgIAKAAAAACgAAAAoAAAAZAAAAGQAAAAAAAAAzMzMAAAAAABQAAAAUAAAAGQAAABkAAAAAAAAABcAAAAUAAAAAAAAAAAAAAD/fwAA/38AAAAAAAAJAAAABAAAANw7IAEeAAAAaAAAAAAAAAAAAAAAAAAAAAAAAAAAAAAAECcAABAnAAAAAAAAAAAAAAAAAAAAAAAAAAAAAAAAAAAAAAAAAAAAABQAAAAAAAAAwMD/AAAAAABkAAAAMgAAAAAAAABkAAAAAAAAAH9/fwAKAAAAIgAAABgAAAAAAAAAAAAAAAAAAAAAAAAAAAAAAAAAAAAkAAAAJAAAAAAAAAAHAAAAAAAAAAAAAAAAAAAAAAAAAAAAAAAAAAAAf39/ACUAAABYAAAAAAAAAAAAAAAAAAAAAAAAAAAAAAAAAAAAAAAAAAAAAAAAAAAAAAAAAAAAAAA/AAAAAAAAAKCGAQAAAAAAAAAAAAAAAAAMAAAAAQAAAAAAAAAAAAAAAAAAAB8AAABUAAAAAAAABQAAAAEAAAAAAAAAAAAAAAAAAAAAAAAAAAAAAAAAAAAAAAAAAAAAAAJ/f38AAAAAA8zMzADAwP8Af39/AAAAAAAAAAAAAAAAAAAAAAAAAAAAIQAAABgAAAAUAAAAoRkAABsnAABfMQAAWSkAABAAAAAmAAAACAAAAAAAAAAAAAAA"/>
               </a:ext>
             </a:extLst>
           </p:cNvSpPr>
@@ -958,7 +959,7 @@
             <a:spLocks noGrp="1" noChangeArrowheads="1"/>
             <a:extLst>
               <a:ext uri="smNativeData">
-                <pr:smNativeData xmlns:pr="smNativeData" xmlns="smNativeData" val="SMDATA_15_ucsbZBMAAAAlAAAAZAAAAA8BAAAAkAAAAEgAAACQAAAASAAAAAAAAAABAAAAAAAAAAEAAABQAAAAAAAAAAAA4D8AAAAAAADgPwAAAAAAAOA/AAAAAAAA4D8AAAAAAADgPwAAAAAAAOA/AAAAAAAA4D8AAAAAAADgPwAAAAAAAOA/AAAAAAAA4D8CAAAAjAAAAAAAAAAAAAAAu+DjDP///wgAAAAAAAAAAAAAAAAAAAAAAAAAAAAAAAAAAAAAZAAAAAEAAABAAAAAAAAAAAAAAAAAAAAAAAAAAAAAAAAAAAAAAAAAAAAAAAAAAAAAAAAAAAAAAAAAAAAAAAAAAAAAAAAAAAAAAAAAAAAAAAAAAAAAAAAAAAAAAAAAAAAAFAAAADwAAAAAAAAAAAAAAAAAAAkUAAAAAQAAABQAAAAUAAAAFAAAAAEAAAAAAAAAZAAAAGQAAAAAAAAAZAAAAGQAAAAVAAAAYAAAAAAAAAAAAAAADwAAACADAAAAAAAAAAAAAAEAAACgMgAAVgcAAKr4//8BAAAAf39/AAEAAABkAAAAAAAAABQAAABAHwAAAAAAACYAAAAAAAAAwOD//wAAAAAmAAAAZAAAABYAAABMAAAAAAAAAAAAAAAEAAAAAAAAAAEAAACAgIAKAAAAACgAAAAoAAAAZAAAAGQAAAAAAAAAzMzMAAAAAABQAAAAUAAAAGQAAABkAAAAAAAAABcAAAAUAAAAAAAAAAAAAAD/fwAA/38AAAAAAAAJAAAABAAAAAAAAAAeAAAAaAAAAAAAAAAAAAAAAAAAAAAAAAAAAAAAECcAABAnAAAAAAAAAAAAAAAAAAAAAAAAAAAAAAAAAAAAAAAAAAAAABQAAAAAAAAAwMD/AAAAAABkAAAAMgAAAAAAAABkAAAAAAAAAH9/fwAKAAAAIgAAABgAAAAAAAAAAAAAAAAAAAAAAAAAAAAAAAAAAAAkAAAAJAAAAAAAAAAHAAAAAAAAAAAAAAAAAAAAAAAAAAAAAAAAAAAAf39/ACUAAABYAAAAAAAAAAAAAAAAAAAAAAAAAAAAAAAAAAAAAAAAAAAAAAAAAAAAAAAAAAAAAAA/AAAAAAAAAKCGAQAAAAAAAAAAAAAAAAAMAAAAAQAAAAAAAAAAAAAAAAAAAB8AAABUAAAAAAAABQAAAAEAAAAAAAAAAAAAAAAAAAAAAAAAAAAAAAAAAAAAAAAAAAAAAAJ/f38AAAAAA8zMzADAwP8Af39/AAAAAAAAAAAAAAAAAAAAAAAAAAAAIQAAABgAAAAUAAAAwTUAABsnAABARwAAWSkAABAAAAAmAAAACAAAAAAAAAAAAAAA"/>
+                <pr:smNativeData xmlns:pr="smNativeData" xmlns="smNativeData" val="SMDATA_15_NygcZBMAAAAlAAAAZAAAAA8BAAAAkAAAAEgAAACQAAAASAAAAAAAAAABAAAAAAAAAAEAAABQAAAAAAAAAAAA4D8AAAAAAADgPwAAAAAAAOA/AAAAAAAA4D8AAAAAAADgPwAAAAAAAOA/AAAAAAAA4D8AAAAAAADgPwAAAAAAAOA/AAAAAAAA4D8CAAAAjAAAAAAAAAAAAAAAu+DjDP///wgAAAAAAAAAAAAAAAAAAAAAAAAAAAAAAAAAAAAAZAAAAAEAAABAAAAAAAAAAAAAAAAAAAAAAAAAAAAAAAAAAAAAAAAAAAAAAAAAAAAAAAAAAAAAAAAAAAAAAAAAAAAAAAAAAAAAAAAAAAAAAAAAAAAAAAAAAAAAAAAAAAAAFAAAADwAAAAAAAAAAAAAAAAAAAkUAAAAAQAAABQAAAAUAAAAFAAAAAEAAAAAAAAAZAAAAGQAAAAAAAAAZAAAAGQAAAAVAAAAYAAAAAAAAAAAAAAADwAAACADAAAAAAAAAAAAAAEAAACgMgAAVgcAAKr4//8BAAAAf39/AAEAAABkAAAAAAAAABQAAABAHwAAAAAAACYAAAAAAAAAwOD//wAAAAAmAAAAZAAAABYAAABMAAAAAAAAAAAAAAAEAAAAAAAAAAEAAACAgIAKAAAAACgAAAAoAAAAZAAAAGQAAAAAAAAAzMzMAAAAAABQAAAAUAAAAGQAAABkAAAAAAAAABcAAAAUAAAAAAAAAAAAAAD/fwAA/38AAAAAAAAJAAAABAAAAAAAAAAeAAAAaAAAAAAAAAAAAAAAAAAAAAAAAAAAAAAAECcAABAnAAAAAAAAAAAAAAAAAAAAAAAAAAAAAAAAAAAAAAAAAAAAABQAAAAAAAAAwMD/AAAAAABkAAAAMgAAAAAAAABkAAAAAAAAAH9/fwAKAAAAIgAAABgAAAAAAAAAAAAAAAAAAAAAAAAAAAAAAAAAAAAkAAAAJAAAAAAAAAAHAAAAAAAAAAAAAAAAAAAAAAAAAAAAAAAAAAAAf39/ACUAAABYAAAAAAAAAAAAAAAAAAAAAAAAAAAAAAAAAAAAAAAAAAAAAAAAAAAAAAAAAAAAAAA/AAAAAAAAAKCGAQAAAAAAAAAAAAAAAAAMAAAAAQAAAAAAAAAAAAAAAAAAAB8AAABUAAAAAAAABQAAAAEAAAAAAAAAAAAAAAAAAAAAAAAAAAAAAAAAAAAAAAAAAAAAAAJ/f38AAAAAA8zMzADAwP8Af39/AAAAAAAAAAAAAAAAAAAAAAAAAAAAIQAAABgAAAAUAAAAwTUAABsnAABARwAAWSkAABAAAAAmAAAACAAAAAAAAAAAAAAA"/>
               </a:ext>
             </a:extLst>
           </p:cNvSpPr>
@@ -972,7 +973,7 @@
           <a:lstStyle/>
           <a:p>
             <a:pPr/>
-            <a:fld id="{3A26E1F6-B8D7-7317-999E-4E42AFD06F1B}" type="slidenum">
+            <a:fld id="{39DF82CD-83D4-8A74-9A67-7521CC296C20}" type="slidenum">
               <a:t/>
             </a:fld>
           </a:p>
@@ -1010,7 +1011,7 @@
             <a:spLocks noGrp="1" noChangeArrowheads="1"/>
             <a:extLst>
               <a:ext uri="smNativeData">
-                <pr:smNativeData xmlns:pr="smNativeData" xmlns="smNativeData" val="SMDATA_15_ucsbZBMAAAAlAAAAZAAAAA8BAAAAkAAAAEgAAACQAAAASAAAAAAAAAAAAAAAAAAAAAEAAABQAAAAAAAAAAAA4D8AAAAAAADgPwAAAAAAAOA/AAAAAAAA4D8AAAAAAADgPwAAAAAAAOA/AAAAAAAA4D8AAAAAAADgPwAAAAAAAOA/AAAAAAAA4D8CAAAAjAAAAAAAAAAAAAAAu+DjDP///wgAAAAAAAAAAAAAAAAAAAAAAAAAAAAAAAAAAAAAZAAAAAEAAABAAAAAAAAAAAAAAAAAAAAAAAAAAAAAAAAAAAAAAAAAAAAAAAAAAAAAAAAAAAAAAAAAAAAAAAAAAAAAAAAAAAAAAAAAAAAAAAAAAAAAAAAAAAAAAAAAAAAAFAAAADwAAAAAAAAAAAAAAAAAAAkUAAAAAQAAABQAAAAUAAAAFAAAAAEAAAAAAAAAZAAAAGQAAAAAAAAAZAAAAGQAAAAVAAAAYAAAAAAAAAAAAAAADwAAACADAAAAAAAAAAAAAAEAAACgMgAAVgcAAKr4//8BAAAAf39/AAEAAABkAAAAAAAAABQAAABAHwAAAAAAACYAAAAAAAAAwOD//wAAAAAmAAAAZAAAABYAAABMAAAAAAAAAAAAAAAEAAAAAAAAAAEAAACAgIAKAAAAACgAAAAoAAAAZAAAAGQAAAAAAAAAzMzMAAAAAABQAAAAUAAAAGQAAABkAAAAAAAAABcAAAAUAAAAAAAAAAAAAAD/fwAA/38AAAAAAAAJAAAABAAAANw7IAEeAAAAaAAAAAAAAAAAAAAAAAAAAAAAAAAAAAAAECcAABAnAAAAAAAAAAAAAAAAAAAAAAAAAAAAAAAAAAAAAAAAAAAAABQAAAAAAAAAwMD/AAAAAABkAAAAMgAAAAAAAABkAAAAAAAAAH9/fwAKAAAAIgAAABgAAAAAAAAAAAAAAAAAAAAAAAAAAAAAAAAAAAAkAAAAJAAAAAAAAAAHAAAAAAAAAAAAAAAAAAAAAAAAAAAAAAAAAAAAf39/ACUAAABYAAAAAAAAAAAAAAAAAAAAAAAAAAAAAAAAAAAAAAAAAAAAAAAAAAAAAAAAAAAAAAA/AAAAAAAAAKCGAQAAAAAAAAAAAAAAAAAMAAAAAQAAAAAAAAAAAAAAAAAAAB8AAABUAAAAAAAABQAAAAEAAAAAAAAAAAAAAAAAAAAAAAAAAAAAAAAAAAAAAAAAAAAAAAJ/f38AAAAAA8zMzADAwP8Af39/AAAAAAAAAAAAAAAAAAAAAAAAAAAAIQAAABgAAAAUAAAA7QUAABwbAACtRQAAfSMAABAAAAAmAAAACAAAAIGAAAAAAAAA"/>
+                <pr:smNativeData xmlns:pr="smNativeData" xmlns="smNativeData" val="SMDATA_15_NygcZBMAAAAlAAAAZAAAAA8BAAAAkAAAAEgAAACQAAAASAAAAAAAAAAAAAAAAAAAAAEAAABQAAAAAAAAAAAA4D8AAAAAAADgPwAAAAAAAOA/AAAAAAAA4D8AAAAAAADgPwAAAAAAAOA/AAAAAAAA4D8AAAAAAADgPwAAAAAAAOA/AAAAAAAA4D8CAAAAjAAAAAAAAAAAAAAAu+DjDP///wgAAAAAAAAAAAAAAAAAAAAAAAAAAAAAAAAAAAAAZAAAAAEAAABAAAAAAAAAAAAAAAAAAAAAAAAAAAAAAAAAAAAAAAAAAAAAAAAAAAAAAAAAAAAAAAAAAAAAAAAAAAAAAAAAAAAAAAAAAAAAAAAAAAAAAAAAAAAAAAAAAAAAFAAAADwAAAAAAAAAAAAAAAAAAAkUAAAAAQAAABQAAAAUAAAAFAAAAAEAAAAAAAAAZAAAAGQAAAAAAAAAZAAAAGQAAAAVAAAAYAAAAAAAAAAAAAAADwAAACADAAAAAAAAAAAAAAEAAACgMgAAVgcAAKr4//8BAAAAf39/AAEAAABkAAAAAAAAABQAAABAHwAAAAAAACYAAAAAAAAAwOD//wAAAAAmAAAAZAAAABYAAABMAAAAAAAAAAAAAAAEAAAAAAAAAAEAAACAgIAKAAAAACgAAAAoAAAAZAAAAGQAAAAAAAAAzMzMAAAAAABQAAAAUAAAAGQAAABkAAAAAAAAABcAAAAUAAAAAAAAAAAAAAD/fwAA/38AAAAAAAAJAAAABAAAANw7IAEeAAAAaAAAAAAAAAAAAAAAAAAAAAAAAAAAAAAAECcAABAnAAAAAAAAAAAAAAAAAAAAAAAAAAAAAAAAAAAAAAAAAAAAABQAAAAAAAAAwMD/AAAAAABkAAAAMgAAAAAAAABkAAAAAAAAAH9/fwAKAAAAIgAAABgAAAAAAAAAAAAAAAAAAAAAAAAAAAAAAAAAAAAkAAAAJAAAAAAAAAAHAAAAAAAAAAAAAAAAAAAAAAAAAAAAAAAAAAAAf39/ACUAAABYAAAAAAAAAAAAAAAAAAAAAAAAAAAAAAAAAAAAAAAAAAAAAAAAAAAAAAAAAAAAAAA/AAAAAAAAAKCGAQAAAAAAAAAAAAAAAAAMAAAAAQAAAAAAAAAAAAAAAAAAAB8AAABUAAAAAAAABQAAAAEAAAAAAAAAAAAAAAAAAAAAAAAAAAAAAAAAAAAAAAAAAAAAAAJ/f38AAAAAA8zMzADAwP8Af39/AAAAAAAAAAAAAAAAAAAAAAAAAAAAIQAAABgAAAAUAAAA7QUAABwbAACtRQAAfSMAABAAAAAmAAAACAAAAIGAAAAAAAAA"/>
               </a:ext>
             </a:extLst>
           </p:cNvSpPr>
@@ -1050,7 +1051,7 @@
             <a:spLocks noGrp="1" noChangeArrowheads="1"/>
             <a:extLst>
               <a:ext uri="smNativeData">
-                <pr:smNativeData xmlns:pr="smNativeData" xmlns="smNativeData" val="SMDATA_15_ucsbZBMAAAAlAAAAZAAAAA8BAAAAkAAAAEgAAACQAAAASAAAAAAAAAACAAAAAAAAAAEAAABQAAAAAAAAAAAA4D8AAAAAAADgPwAAAAAAAOA/AAAAAAAA4D8AAAAAAADgPwAAAAAAAOA/AAAAAAAA4D8AAAAAAADgPwAAAAAAAOA/AAAAAAAA4D8CAAAAjAAAAAAAAAAAAAAAu+DjDP///wgAAAAAAAAAAAAAAAAAAAAAAAAAAAAAAAAAAAAAZAAAAAEAAABAAAAAAAAAAAAAAAAAAAAAAAAAAAAAAAAAAAAAAAAAAAAAAAAAAAAAAAAAAAAAAAAAAAAAAAAAAAAAAAAAAAAAAAAAAAAAAAAAAAAAAAAAAAAAAAAAAAAAFAAAADwAAAAAAAAAAAAAAAAAAAkUAAAAAQAAABQAAAAUAAAAFAAAAAEAAAAAAAAAZAAAAGQAAAAAAAAAZAAAAGQAAAAVAAAAYAAAAAAAAAAAAAAADwAAACADAAAAAAAAAAAAAAEAAACgMgAAVgcAAKr4//8BAAAAf39/AAEAAABkAAAAAAAAABQAAABAHwAAAAAAACYAAAAAAAAAwOD//wAAAAAmAAAAZAAAABYAAABMAAAAAAAAAAAAAAAEAAAAAAAAAAEAAACAgIAKAAAAACgAAAAoAAAAZAAAAGQAAAAAAAAAzMzMAAAAAABQAAAAUAAAAGQAAABkAAAAAAAAABcAAAAUAAAAAAAAAAAAAAD/fwAA/38AAAAAAAAJAAAABAAAANw7IAEeAAAAaAAAAAAAAAAAAAAAAAAAAAAAAAAAAAAAECcAABAnAAAAAAAAAAAAAAAAAAAAAAAAAAAAAAAAAAAAAAAAAAAAABQAAAAAAAAAwMD/AAAAAABkAAAAMgAAAAAAAABkAAAAAAAAAH9/fwAKAAAAIgAAABgAAAAAAAAAAAAAAAAAAAAAAAAAAAAAAAAAAAAkAAAAJAAAAAAAAAAHAAAAAAAAAAAAAAAAAAAAAAAAAAAAAAAAAAAAf39/ACUAAABYAAAAAAAAAAAAAAAAAAAAAAAAAAAAAAAAAAAAAAAAAAAAAAAAAAAAAAAAAAAAAAA/AAAAAAAAAKCGAQAAAAAAAAAAAAAAAAAMAAAAAQAAAAAAAAAAAAAAAAAAAB8AAABUAAAAAAAABQAAAAEAAAAAAAAAAAAAAAAAAAAAAAAAAAAAAAAAAAAAAAAAAAAAAAJ/f38AAAAAA8zMzADAwP8Af39/AAAAAAAAAAAAAAAAAAAAAAAAAAAAIQAAABgAAAAUAAAA7QUAAOERAACtRQAAHBsAABAAAAAmAAAACAAAAIGAAAAAAAAA"/>
+                <pr:smNativeData xmlns:pr="smNativeData" xmlns="smNativeData" val="SMDATA_15_NygcZBMAAAAlAAAAZAAAAA8BAAAAkAAAAEgAAACQAAAASAAAAAAAAAACAAAAAAAAAAEAAABQAAAAAAAAAAAA4D8AAAAAAADgPwAAAAAAAOA/AAAAAAAA4D8AAAAAAADgPwAAAAAAAOA/AAAAAAAA4D8AAAAAAADgPwAAAAAAAOA/AAAAAAAA4D8CAAAAjAAAAAAAAAAAAAAAu+DjDP///wgAAAAAAAAAAAAAAAAAAAAAAAAAAAAAAAAAAAAAZAAAAAEAAABAAAAAAAAAAAAAAAAAAAAAAAAAAAAAAAAAAAAAAAAAAAAAAAAAAAAAAAAAAAAAAAAAAAAAAAAAAAAAAAAAAAAAAAAAAAAAAAAAAAAAAAAAAAAAAAAAAAAAFAAAADwAAAAAAAAAAAAAAAAAAAkUAAAAAQAAABQAAAAUAAAAFAAAAAEAAAAAAAAAZAAAAGQAAAAAAAAAZAAAAGQAAAAVAAAAYAAAAAAAAAAAAAAADwAAACADAAAAAAAAAAAAAAEAAACgMgAAVgcAAKr4//8BAAAAf39/AAEAAABkAAAAAAAAABQAAABAHwAAAAAAACYAAAAAAAAAwOD//wAAAAAmAAAAZAAAABYAAABMAAAAAAAAAAAAAAAEAAAAAAAAAAEAAACAgIAKAAAAACgAAAAoAAAAZAAAAGQAAAAAAAAAzMzMAAAAAABQAAAAUAAAAGQAAABkAAAAAAAAABcAAAAUAAAAAAAAAAAAAAD/fwAA/38AAAAAAAAJAAAABAAAANw7IAEeAAAAaAAAAAAAAAAAAAAAAAAAAAAAAAAAAAAAECcAABAnAAAAAAAAAAAAAAAAAAAAAAAAAAAAAAAAAAAAAAAAAAAAABQAAAAAAAAAwMD/AAAAAABkAAAAMgAAAAAAAABkAAAAAAAAAH9/fwAKAAAAIgAAABgAAAAAAAAAAAAAAAAAAAAAAAAAAAAAAAAAAAAkAAAAJAAAAAAAAAAHAAAAAAAAAAAAAAAAAAAAAAAAAAAAAAAAAAAAf39/ACUAAABYAAAAAAAAAAAAAAAAAAAAAAAAAAAAAAAAAAAAAAAAAAAAAAAAAAAAAAAAAAAAAAA/AAAAAAAAAKCGAQAAAAAAAAAAAAAAAAAMAAAAAQAAAAAAAAAAAAAAAAAAAB8AAABUAAAAAAAABQAAAAEAAAAAAAAAAAAAAAAAAAAAAAAAAAAAAAAAAAAAAAAAAAAAAAJ/f38AAAAAA8zMzADAwP8Af39/AAAAAAAAAAAAAAAAAAAAAAAAAAAAIQAAABgAAAAUAAAA7QUAAOERAACtRQAAHBsAABAAAAAmAAAACAAAAIGAAAAAAAAA"/>
               </a:ext>
             </a:extLst>
           </p:cNvSpPr>
@@ -1123,7 +1124,7 @@
             <a:spLocks noGrp="1" noChangeArrowheads="1"/>
             <a:extLst>
               <a:ext uri="smNativeData">
-                <pr:smNativeData xmlns:pr="smNativeData" xmlns="smNativeData" val="SMDATA_15_ucsbZBMAAAAlAAAAZAAAAA8BAAAAkAAAAEgAAACQAAAASAAAAAAAAAABAAAAAAAAAAEAAABQAAAAAAAAAAAA4D8AAAAAAADgPwAAAAAAAOA/AAAAAAAA4D8AAAAAAADgPwAAAAAAAOA/AAAAAAAA4D8AAAAAAADgPwAAAAAAAOA/AAAAAAAA4D8CAAAAjAAAAAAAAAAAAAAAu+DjDP///wgAAAAAAAAAAAAAAAAAAAAAAAAAAAAAAAAAAAAAZAAAAAEAAABAAAAAAAAAAAAAAAAAAAAAAAAAAAAAAAAAAAAAAAAAAAAAAAAAAAAAAAAAAAAAAAAAAAAAAAAAAAAAAAAAAAAAAAAAAAAAAAAAAAAAAAAAAAAAAAAAAAAAFAAAADwAAAAAAAAAAAAAAAAAAAkUAAAAAQAAABQAAAAUAAAAFAAAAAEAAAAAAAAAZAAAAGQAAAAAAAAAZAAAAGQAAAAVAAAAYAAAAAAAAAAAAAAADwAAACADAAAAAAAAAAAAAAEAAACgMgAAVgcAAKr4//8BAAAAf39/AAEAAABkAAAAAAAAABQAAABAHwAAAAAAACYAAAAAAAAAwOD//wAAAAAmAAAAZAAAABYAAABMAAAAAAAAAAAAAAAEAAAAAAAAAAEAAACAgIAKAAAAACgAAAAoAAAAZAAAAGQAAAAAAAAAzMzMAAAAAABQAAAAUAAAAGQAAABkAAAAAAAAABcAAAAUAAAAAAAAAAAAAAD/fwAA/38AAAAAAAAJAAAABAAAAAAAAAAeAAAAaAAAAAAAAAAAAAAAAAAAAAAAAAAAAAAAECcAABAnAAAAAAAAAAAAAAAAAAAAAAAAAAAAAAAAAAAAAAAAAAAAABQAAAAAAAAAwMD/AAAAAABkAAAAMgAAAAAAAABkAAAAAAAAAH9/fwAKAAAAIgAAABgAAAAAAAAAAAAAAAAAAAAAAAAAAAAAAAAAAAAkAAAAJAAAAAAAAAAHAAAAAAAAAAAAAAAAAAAAAAAAAAAAAAAAAAAAf39/ACUAAABYAAAAAAAAAAAAAAAAAAAAAAAAAAAAAAAAAAAAAAAAAAAAAAAAAAAAAAAAAAAAAAA/AAAAAAAAAKCGAQAAAAAAAAAAAAAAAAAMAAAAAQAAAAAAAAAAAAAAAAAAAB8AAABUAAAAAAAABQAAAAEAAAAAAAAAAAAAAAAAAAAAAAAAAAAAAAAAAAAAAAAAAAAAAAJ/f38AAAAAA8zMzADAwP8Af39/AAAAAAAAAAAAAAAAAAAAAAAAAAAAIQAAABgAAAAUAAAAwAMAABsnAAA/FQAAWSkAABAAAAAmAAAACAAAAAAAAAAAAAAA"/>
+                <pr:smNativeData xmlns:pr="smNativeData" xmlns="smNativeData" val="SMDATA_15_NygcZBMAAAAlAAAAZAAAAA8BAAAAkAAAAEgAAACQAAAASAAAAAAAAAABAAAAAAAAAAEAAABQAAAAAAAAAAAA4D8AAAAAAADgPwAAAAAAAOA/AAAAAAAA4D8AAAAAAADgPwAAAAAAAOA/AAAAAAAA4D8AAAAAAADgPwAAAAAAAOA/AAAAAAAA4D8CAAAAjAAAAAAAAAAAAAAAu+DjDP///wgAAAAAAAAAAAAAAAAAAAAAAAAAAAAAAAAAAAAAZAAAAAEAAABAAAAAAAAAAAAAAAAAAAAAAAAAAAAAAAAAAAAAAAAAAAAAAAAAAAAAAAAAAAAAAAAAAAAAAAAAAAAAAAAAAAAAAAAAAAAAAAAAAAAAAAAAAAAAAAAAAAAAFAAAADwAAAAAAAAAAAAAAAAAAAkUAAAAAQAAABQAAAAUAAAAFAAAAAEAAAAAAAAAZAAAAGQAAAAAAAAAZAAAAGQAAAAVAAAAYAAAAAAAAAAAAAAADwAAACADAAAAAAAAAAAAAAEAAACgMgAAVgcAAKr4//8BAAAAf39/AAEAAABkAAAAAAAAABQAAABAHwAAAAAAACYAAAAAAAAAwOD//wAAAAAmAAAAZAAAABYAAABMAAAAAAAAAAAAAAAEAAAAAAAAAAEAAACAgIAKAAAAACgAAAAoAAAAZAAAAGQAAAAAAAAAzMzMAAAAAABQAAAAUAAAAGQAAABkAAAAAAAAABcAAAAUAAAAAAAAAAAAAAD/fwAA/38AAAAAAAAJAAAABAAAAAAAAAAeAAAAaAAAAAAAAAAAAAAAAAAAAAAAAAAAAAAAECcAABAnAAAAAAAAAAAAAAAAAAAAAAAAAAAAAAAAAAAAAAAAAAAAABQAAAAAAAAAwMD/AAAAAABkAAAAMgAAAAAAAABkAAAAAAAAAH9/fwAKAAAAIgAAABgAAAAAAAAAAAAAAAAAAAAAAAAAAAAAAAAAAAAkAAAAJAAAAAAAAAAHAAAAAAAAAAAAAAAAAAAAAAAAAAAAAAAAAAAAf39/ACUAAABYAAAAAAAAAAAAAAAAAAAAAAAAAAAAAAAAAAAAAAAAAAAAAAAAAAAAAAAAAAAAAAA/AAAAAAAAAKCGAQAAAAAAAAAAAAAAAAAMAAAAAQAAAAAAAAAAAAAAAAAAAB8AAABUAAAAAAAABQAAAAEAAAAAAAAAAAAAAAAAAAAAAAAAAAAAAAAAAAAAAAAAAAAAAAJ/f38AAAAAA8zMzADAwP8Af39/AAAAAAAAAAAAAAAAAAAAAAAAAAAAIQAAABgAAAAUAAAAwAMAABsnAAA/FQAAWSkAABAAAAAmAAAACAAAAAAAAAAAAAAA"/>
               </a:ext>
             </a:extLst>
           </p:cNvSpPr>
@@ -1137,7 +1138,7 @@
           <a:lstStyle/>
           <a:p>
             <a:pPr/>
-            <a:fld id="{3A26DD3E-70D7-732B-999E-867E93D06FD3}" type="datetime1">
+            <a:fld id="{39DF85B4-FAD4-8A73-9A67-0C26CB296C59}" type="datetime1">
               <a:t/>
             </a:fld>
           </a:p>
@@ -1150,7 +1151,7 @@
             <a:spLocks noGrp="1" noChangeArrowheads="1"/>
             <a:extLst>
               <a:ext uri="smNativeData">
-                <pr:smNativeData xmlns:pr="smNativeData" xmlns="smNativeData" val="SMDATA_15_ucsbZBMAAAAlAAAAZAAAAA8BAAAAkAAAAEgAAACQAAAASAAAAAAAAAABAAAAAAAAAAEAAABQAAAAAAAAAAAA4D8AAAAAAADgPwAAAAAAAOA/AAAAAAAA4D8AAAAAAADgPwAAAAAAAOA/AAAAAAAA4D8AAAAAAADgPwAAAAAAAOA/AAAAAAAA4D8CAAAAjAAAAAAAAAAAAAAAu+DjDP///wgAAAAAAAAAAAAAAAAAAAAAAAAAAAAAAAAAAAAAZAAAAAEAAABAAAAAAAAAAAAAAAAAAAAAAAAAAAAAAAAAAAAAAAAAAAAAAAAAAAAAAAAAAAAAAAAAAAAAAAAAAAAAAAAAAAAAAAAAAAAAAAAAAAAAAAAAAAAAAAAAAAAAFAAAADwAAAAAAAAAAAAAAAAAAAkUAAAAAQAAABQAAAAUAAAAFAAAAAEAAAAAAAAAZAAAAGQAAAAAAAAAZAAAAGQAAAAVAAAAYAAAAAAAAAAAAAAADwAAACADAAAAAAAAAAAAAAEAAACgMgAAVgcAAKr4//8BAAAAf39/AAEAAABkAAAAAAAAABQAAABAHwAAAAAAACYAAAAAAAAAwOD//wAAAAAmAAAAZAAAABYAAABMAAAAAAAAAAAAAAAEAAAAAAAAAAEAAACAgIAKAAAAACgAAAAoAAAAZAAAAGQAAAAAAAAAzMzMAAAAAABQAAAAUAAAAGQAAABkAAAAAAAAABcAAAAUAAAAAAAAAAAAAAD/fwAA/38AAAAAAAAJAAAABAAAANw7IAEeAAAAaAAAAAAAAAAAAAAAAAAAAAAAAAAAAAAAECcAABAnAAAAAAAAAAAAAAAAAAAAAAAAAAAAAAAAAAAAAAAAAAAAABQAAAAAAAAAwMD/AAAAAABkAAAAMgAAAAAAAABkAAAAAAAAAH9/fwAKAAAAIgAAABgAAAAAAAAAAAAAAAAAAAAAAAAAAAAAAAAAAAAkAAAAJAAAAAAAAAAHAAAAAAAAAAAAAAAAAAAAAAAAAAAAAAAAAAAAf39/ACUAAABYAAAAAAAAAAAAAAAAAAAAAAAAAAAAAAAAAAAAAAAAAAAAAAAAAAAAAAAAAAAAAAA/AAAAAAAAAKCGAQAAAAAAAAAAAAAAAAAMAAAAAQAAAAAAAAAAAAAAAAAAAB8AAABUAAAAAAAABQAAAAEAAAAAAAAAAAAAAAAAAAAAAAAAAAAAAAAAAAAAAAAAAAAAAAJ/f38AAAAAA8zMzADAwP8Af39/AAAAAAAAAAAAAAAAAAAAAAAAAAAAIQAAABgAAAAUAAAAoRkAABsnAABfMQAAWSkAABAAAAAmAAAACAAAAAAAAAAAAAAA"/>
+                <pr:smNativeData xmlns:pr="smNativeData" xmlns="smNativeData" val="SMDATA_15_NygcZBMAAAAlAAAAZAAAAA8BAAAAkAAAAEgAAACQAAAASAAAAAAAAAABAAAAAAAAAAEAAABQAAAAAAAAAAAA4D8AAAAAAADgPwAAAAAAAOA/AAAAAAAA4D8AAAAAAADgPwAAAAAAAOA/AAAAAAAA4D8AAAAAAADgPwAAAAAAAOA/AAAAAAAA4D8CAAAAjAAAAAAAAAAAAAAAu+DjDP///wgAAAAAAAAAAAAAAAAAAAAAAAAAAAAAAAAAAAAAZAAAAAEAAABAAAAAAAAAAAAAAAAAAAAAAAAAAAAAAAAAAAAAAAAAAAAAAAAAAAAAAAAAAAAAAAAAAAAAAAAAAAAAAAAAAAAAAAAAAAAAAAAAAAAAAAAAAAAAAAAAAAAAFAAAADwAAAAAAAAAAAAAAAAAAAkUAAAAAQAAABQAAAAUAAAAFAAAAAEAAAAAAAAAZAAAAGQAAAAAAAAAZAAAAGQAAAAVAAAAYAAAAAAAAAAAAAAADwAAACADAAAAAAAAAAAAAAEAAACgMgAAVgcAAKr4//8BAAAAf39/AAEAAABkAAAAAAAAABQAAABAHwAAAAAAACYAAAAAAAAAwOD//wAAAAAmAAAAZAAAABYAAABMAAAAAAAAAAAAAAAEAAAAAAAAAAEAAACAgIAKAAAAACgAAAAoAAAAZAAAAGQAAAAAAAAAzMzMAAAAAABQAAAAUAAAAGQAAABkAAAAAAAAABcAAAAUAAAAAAAAAAAAAAD/fwAA/38AAAAAAAAJAAAABAAAANw7IAEeAAAAaAAAAAAAAAAAAAAAAAAAAAAAAAAAAAAAECcAABAnAAAAAAAAAAAAAAAAAAAAAAAAAAAAAAAAAAAAAAAAAAAAABQAAAAAAAAAwMD/AAAAAABkAAAAMgAAAAAAAABkAAAAAAAAAH9/fwAKAAAAIgAAABgAAAAAAAAAAAAAAAAAAAAAAAAAAAAAAAAAAAAkAAAAJAAAAAAAAAAHAAAAAAAAAAAAAAAAAAAAAAAAAAAAAAAAAAAAf39/ACUAAABYAAAAAAAAAAAAAAAAAAAAAAAAAAAAAAAAAAAAAAAAAAAAAAAAAAAAAAAAAAAAAAA/AAAAAAAAAKCGAQAAAAAAAAAAAAAAAAAMAAAAAQAAAAAAAAAAAAAAAAAAAB8AAABUAAAAAAAABQAAAAEAAAAAAAAAAAAAAAAAAAAAAAAAAAAAAAAAAAAAAAAAAAAAAAJ/f38AAAAAA8zMzADAwP8Af39/AAAAAAAAAAAAAAAAAAAAAAAAAAAAIQAAABgAAAAUAAAAoRkAABsnAABfMQAAWSkAABAAAAAmAAAACAAAAAAAAAAAAAAA"/>
               </a:ext>
             </a:extLst>
           </p:cNvSpPr>
@@ -1177,7 +1178,7 @@
             <a:spLocks noGrp="1" noChangeArrowheads="1"/>
             <a:extLst>
               <a:ext uri="smNativeData">
-                <pr:smNativeData xmlns:pr="smNativeData" xmlns="smNativeData" val="SMDATA_15_ucsbZBMAAAAlAAAAZAAAAA8BAAAAkAAAAEgAAACQAAAASAAAAAAAAAABAAAAAAAAAAEAAABQAAAAAAAAAAAA4D8AAAAAAADgPwAAAAAAAOA/AAAAAAAA4D8AAAAAAADgPwAAAAAAAOA/AAAAAAAA4D8AAAAAAADgPwAAAAAAAOA/AAAAAAAA4D8CAAAAjAAAAAAAAAAAAAAAu+DjDP///wgAAAAAAAAAAAAAAAAAAAAAAAAAAAAAAAAAAAAAZAAAAAEAAABAAAAAAAAAAAAAAAAAAAAAAAAAAAAAAAAAAAAAAAAAAAAAAAAAAAAAAAAAAAAAAAAAAAAAAAAAAAAAAAAAAAAAAAAAAAAAAAAAAAAAAAAAAAAAAAAAAAAAFAAAADwAAAAAAAAAAAAAAAAAAAkUAAAAAQAAABQAAAAUAAAAFAAAAAEAAAAAAAAAZAAAAGQAAAAAAAAAZAAAAGQAAAAVAAAAYAAAAAAAAAAAAAAADwAAACADAAAAAAAAAAAAAAEAAACgMgAAVgcAAKr4//8BAAAAf39/AAEAAABkAAAAAAAAABQAAABAHwAAAAAAACYAAAAAAAAAwOD//wAAAAAmAAAAZAAAABYAAABMAAAAAAAAAAAAAAAEAAAAAAAAAAEAAACAgIAKAAAAACgAAAAoAAAAZAAAAGQAAAAAAAAAzMzMAAAAAABQAAAAUAAAAGQAAABkAAAAAAAAABcAAAAUAAAAAAAAAAAAAAD/fwAA/38AAAAAAAAJAAAABAAAANw7IAEeAAAAaAAAAAAAAAAAAAAAAAAAAAAAAAAAAAAAECcAABAnAAAAAAAAAAAAAAAAAAAAAAAAAAAAAAAAAAAAAAAAAAAAABQAAAAAAAAAwMD/AAAAAABkAAAAMgAAAAAAAABkAAAAAAAAAH9/fwAKAAAAIgAAABgAAAAAAAAAAAAAAAAAAAAAAAAAAAAAAAAAAAAkAAAAJAAAAAAAAAAHAAAAAAAAAAAAAAAAAAAAAAAAAAAAAAAAAAAAf39/ACUAAABYAAAAAAAAAAAAAAAAAAAAAAAAAAAAAAAAAAAAAAAAAAAAAAAAAAAAAAAAAAAAAAA/AAAAAAAAAKCGAQAAAAAAAAAAAAAAAAAMAAAAAQAAAAAAAAAAAAAAAAAAAB8AAABUAAAAAAAABQAAAAEAAAAAAAAAAAAAAAAAAAAAAAAAAAAAAAAAAAAAAAAAAAAAAAJ/f38AAAAAA8zMzADAwP8Af39/AAAAAAAAAAAAAAAAAAAAAAAAAAAAIQAAABgAAAAUAAAAwTUAABsnAABARwAAWSkAABAAAAAmAAAACAAAAAAAAAAAAAAA"/>
+                <pr:smNativeData xmlns:pr="smNativeData" xmlns="smNativeData" val="SMDATA_15_NygcZBMAAAAlAAAAZAAAAA8BAAAAkAAAAEgAAACQAAAASAAAAAAAAAABAAAAAAAAAAEAAABQAAAAAAAAAAAA4D8AAAAAAADgPwAAAAAAAOA/AAAAAAAA4D8AAAAAAADgPwAAAAAAAOA/AAAAAAAA4D8AAAAAAADgPwAAAAAAAOA/AAAAAAAA4D8CAAAAjAAAAAAAAAAAAAAAu+DjDP///wgAAAAAAAAAAAAAAAAAAAAAAAAAAAAAAAAAAAAAZAAAAAEAAABAAAAAAAAAAAAAAAAAAAAAAAAAAAAAAAAAAAAAAAAAAAAAAAAAAAAAAAAAAAAAAAAAAAAAAAAAAAAAAAAAAAAAAAAAAAAAAAAAAAAAAAAAAAAAAAAAAAAAFAAAADwAAAAAAAAAAAAAAAAAAAkUAAAAAQAAABQAAAAUAAAAFAAAAAEAAAAAAAAAZAAAAGQAAAAAAAAAZAAAAGQAAAAVAAAAYAAAAAAAAAAAAAAADwAAACADAAAAAAAAAAAAAAEAAACgMgAAVgcAAKr4//8BAAAAf39/AAEAAABkAAAAAAAAABQAAABAHwAAAAAAACYAAAAAAAAAwOD//wAAAAAmAAAAZAAAABYAAABMAAAAAAAAAAAAAAAEAAAAAAAAAAEAAACAgIAKAAAAACgAAAAoAAAAZAAAAGQAAAAAAAAAzMzMAAAAAABQAAAAUAAAAGQAAABkAAAAAAAAABcAAAAUAAAAAAAAAAAAAAD/fwAA/38AAAAAAAAJAAAABAAAANw7IAEeAAAAaAAAAAAAAAAAAAAAAAAAAAAAAAAAAAAAECcAABAnAAAAAAAAAAAAAAAAAAAAAAAAAAAAAAAAAAAAAAAAAAAAABQAAAAAAAAAwMD/AAAAAABkAAAAMgAAAAAAAABkAAAAAAAAAH9/fwAKAAAAIgAAABgAAAAAAAAAAAAAAAAAAAAAAAAAAAAAAAAAAAAkAAAAJAAAAAAAAAAHAAAAAAAAAAAAAAAAAAAAAAAAAAAAAAAAAAAAf39/ACUAAABYAAAAAAAAAAAAAAAAAAAAAAAAAAAAAAAAAAAAAAAAAAAAAAAAAAAAAAAAAAAAAAA/AAAAAAAAAKCGAQAAAAAAAAAAAAAAAAAMAAAAAQAAAAAAAAAAAAAAAAAAAB8AAABUAAAAAAAABQAAAAEAAAAAAAAAAAAAAAAAAAAAAAAAAAAAAAAAAAAAAAAAAAAAAAJ/f38AAAAAA8zMzADAwP8Af39/AAAAAAAAAAAAAAAAAAAAAAAAAAAAIQAAABgAAAAUAAAAwTUAABsnAABARwAAWSkAABAAAAAmAAAACAAAAAAAAAAAAAAA"/>
               </a:ext>
             </a:extLst>
           </p:cNvSpPr>
@@ -1191,7 +1192,7 @@
           <a:lstStyle/>
           <a:p>
             <a:pPr/>
-            <a:fld id="{3A26DBE3-ADD7-732D-999E-5B7895D06F0E}" type="slidenum">
+            <a:fld id="{39DFD61C-52D4-8A20-9A67-A47598296CF1}" type="slidenum">
               <a:t/>
             </a:fld>
           </a:p>
@@ -1229,7 +1230,7 @@
             <a:spLocks noGrp="1" noChangeArrowheads="1"/>
             <a:extLst>
               <a:ext uri="smNativeData">
-                <pr:smNativeData xmlns:pr="smNativeData" xmlns="smNativeData" val="SMDATA_15_ucsbZBMAAAAlAAAAZAAAAA8BAAAAkAAAAEgAAACQAAAASAAAAAAAAAABAAAAAAAAAAEAAABQAAAAAAAAAAAA4D8AAAAAAADgPwAAAAAAAOA/AAAAAAAA4D8AAAAAAADgPwAAAAAAAOA/AAAAAAAA4D8AAAAAAADgPwAAAAAAAOA/AAAAAAAA4D8CAAAAjAAAAAAAAAAAAAAAu+DjDP///wgAAAAAAAAAAAAAAAAAAAAAAAAAAAAAAAAAAAAAZAAAAAEAAABAAAAAAAAAAAAAAAAAAAAAAAAAAAAAAAAAAAAAAAAAAAAAAAAAAAAAAAAAAAAAAAAAAAAAAAAAAAAAAAAAAAAAAAAAAAAAAAAAAAAAAAAAAAAAAAAAAAAAFAAAADwAAAAAAAAAAAAAAAAAAAkUAAAAAQAAABQAAAAUAAAAFAAAAAEAAAAAAAAAZAAAAGQAAAAAAAAAZAAAAGQAAAAVAAAAYAAAAAAAAAAAAAAADwAAACADAAAAAAAAAAAAAAEAAACgMgAAVgcAAKr4//8BAAAAf39/AAEAAABkAAAAAAAAABQAAABAHwAAAAAAACYAAAAAAAAAwOD//wAAAAAmAAAAZAAAABYAAABMAAAAAAAAAAAAAAAEAAAAAAAAAAEAAACAgIAKAAAAACgAAAAoAAAAZAAAAGQAAAAAAAAAzMzMAAAAAABQAAAAUAAAAGQAAABkAAAAAAAAABcAAAAUAAAAAAAAAAAAAAD/fwAA/38AAAAAAAAJAAAABAAAANw7IAEeAAAAaAAAAAAAAAAAAAAAAAAAAAAAAAAAAAAAECcAABAnAAAAAAAAAAAAAAAAAAAAAAAAAAAAAAAAAAAAAAAAAAAAABQAAAAAAAAAwMD/AAAAAABkAAAAMgAAAAAAAABkAAAAAAAAAH9/fwAKAAAAIgAAABgAAAAAAAAAAAAAAAAAAAAAAAAAAAAAAAAAAAAkAAAAJAAAAAAAAAAHAAAAAAAAAAAAAAAAAAAAAAAAAAAAAAAAAAAAf39/ACUAAABYAAAAAAAAAAAAAAAAAAAAAAAAAAAAAAAAAAAAAAAAAAAAAAAAAAAAAAAAAAAAAAA/AAAAAAAAAKCGAQAAAAAAAAAAAAAAAAAMAAAAAQAAAAAAAAAAAAAAAAAAAB8AAABUAAAAAAAABQAAAAEAAAAAAAAAAAAAAAAAAAAAAAAAAAAAAAAAAAAAAAAAAAAAAAJ/f38AAAAAA8zMzADAwP8Af39/AAAAAAAAAAAAAAAAAAAAAAAAAAAAIQAAABgAAAAUAAAAwAMAALABAABARwAAuAgAABAAAAAmAAAACAAAAAAAAAAAAAAA"/>
+                <pr:smNativeData xmlns:pr="smNativeData" xmlns="smNativeData" val="SMDATA_15_NygcZBMAAAAlAAAAZAAAAA8BAAAAkAAAAEgAAACQAAAASAAAAAAAAAABAAAAAAAAAAEAAABQAAAAAAAAAAAA4D8AAAAAAADgPwAAAAAAAOA/AAAAAAAA4D8AAAAAAADgPwAAAAAAAOA/AAAAAAAA4D8AAAAAAADgPwAAAAAAAOA/AAAAAAAA4D8CAAAAjAAAAAAAAAAAAAAAu+DjDP///wgAAAAAAAAAAAAAAAAAAAAAAAAAAAAAAAAAAAAAZAAAAAEAAABAAAAAAAAAAAAAAAAAAAAAAAAAAAAAAAAAAAAAAAAAAAAAAAAAAAAAAAAAAAAAAAAAAAAAAAAAAAAAAAAAAAAAAAAAAAAAAAAAAAAAAAAAAAAAAAAAAAAAFAAAADwAAAAAAAAAAAAAAAAAAAkUAAAAAQAAABQAAAAUAAAAFAAAAAEAAAAAAAAAZAAAAGQAAAAAAAAAZAAAAGQAAAAVAAAAYAAAAAAAAAAAAAAADwAAACADAAAAAAAAAAAAAAEAAACgMgAAVgcAAKr4//8BAAAAf39/AAEAAABkAAAAAAAAABQAAABAHwAAAAAAACYAAAAAAAAAwOD//wAAAAAmAAAAZAAAABYAAABMAAAAAAAAAAAAAAAEAAAAAAAAAAEAAACAgIAKAAAAACgAAAAoAAAAZAAAAGQAAAAAAAAAzMzMAAAAAABQAAAAUAAAAGQAAABkAAAAAAAAABcAAAAUAAAAAAAAAAAAAAD/fwAA/38AAAAAAAAJAAAABAAAANw7IAEeAAAAaAAAAAAAAAAAAAAAAAAAAAAAAAAAAAAAECcAABAnAAAAAAAAAAAAAAAAAAAAAAAAAAAAAAAAAAAAAAAAAAAAABQAAAAAAAAAwMD/AAAAAABkAAAAMgAAAAAAAABkAAAAAAAAAH9/fwAKAAAAIgAAABgAAAAAAAAAAAAAAAAAAAAAAAAAAAAAAAAAAAAkAAAAJAAAAAAAAAAHAAAAAAAAAAAAAAAAAAAAAAAAAAAAAAAAAAAAf39/ACUAAABYAAAAAAAAAAAAAAAAAAAAAAAAAAAAAAAAAAAAAAAAAAAAAAAAAAAAAAAAAAAAAAA/AAAAAAAAAKCGAQAAAAAAAAAAAAAAAAAMAAAAAQAAAAAAAAAAAAAAAAAAAB8AAABUAAAAAAAABQAAAAEAAAAAAAAAAAAAAAAAAAAAAAAAAAAAAAAAAAAAAAAAAAAAAAJ/f38AAAAAA8zMzADAwP8Af39/AAAAAAAAAAAAAAAAAAAAAAAAAAAAIQAAABgAAAAUAAAAwAMAALABAABARwAAuAgAABAAAAAmAAAACAAAAAAAAAAAAAAA"/>
               </a:ext>
             </a:extLst>
           </p:cNvSpPr>
@@ -1256,7 +1257,7 @@
             <a:spLocks noGrp="1" noChangeArrowheads="1"/>
             <a:extLst>
               <a:ext uri="smNativeData">
-                <pr:smNativeData xmlns:pr="smNativeData" xmlns="smNativeData" val="SMDATA_15_ucsbZBMAAAAlAAAAZAAAAA8BAAAAkAAAAEgAAACQAAAASAAAAAAAAAAAAAAAAAAAAAEAAABQAAAAAAAAAAAA4D8AAAAAAADgPwAAAAAAAOA/AAAAAAAA4D8AAAAAAADgPwAAAAAAAOA/AAAAAAAA4D8AAAAAAADgPwAAAAAAAOA/AAAAAAAA4D8CAAAAjAAAAAAAAAAAAAAAu+DjDP///wgAAAAAAAAAAAAAAAAAAAAAAAAAAAAAAAAAAAAAZAAAAAEAAABAAAAAAAAAAAAAAAAAAAAAAAAAAAAAAAAAAAAAAAAAAAAAAAAAAAAAAAAAAAAAAAAAAAAAAAAAAAAAAAAAAAAAAAAAAAAAAAAAAAAAAAAAAAAAAAAAAAAAFAAAADwAAAAAAAAAAAAAAAAAAAkUAAAAAQAAABQAAAAUAAAAFAAAAAEAAAAAAAAAZAAAAGQAAAAAAAAAZAAAAGQAAAAVAAAAYAAAAAAAAAAAAAAADwAAACADAAAAAAAAAAAAAAEAAACgMgAAVgcAAKr4//8BAAAAf39/AAEAAABkAAAAAAAAABQAAABAHwAAAAAAACYAAAAAAAAAwOD//wAAAAAmAAAAZAAAABYAAABMAAAAAAAAAAAAAAAEAAAAAAAAAAEAAACAgIAKAAAAACgAAAAoAAAAZAAAAGQAAAAAAAAAzMzMAAAAAABQAAAAUAAAAGQAAABkAAAAAAAAABcAAAAUAAAAAAAAAAAAAAD/fwAA/38AAAAAAAAJAAAABAAAANw7IAEeAAAAaAAAAAAAAAAAAAAAAAAAAAAAAAAAAAAAECcAABAnAAAAAAAAAAAAAAAAAAAAAAAAAAAAAAAAAAAAAAAAAAAAABQAAAAAAAAAwMD/AAAAAABkAAAAMgAAAAAAAABkAAAAAAAAAH9/fwAKAAAAIgAAABgAAAAAAAAAAAAAAAAAAAAAAAAAAAAAAAAAAAAkAAAAJAAAAAAAAAAHAAAAAAAAAAAAAAAAAAAAAAAAAAAAAAAAAAAAf39/ACUAAABYAAAAAAAAAAAAAAAAAAAAAAAAAAAAAAAAAAAAAAAAAAAAAAAAAAAAAAAAAAAAAAA/AAAAAAAAAKCGAQAAAAAAAAAAAAAAAAAMAAAAAQAAAAAAAAAAAAAAAAAAAB8AAABUAAAAAAAABQAAAAEAAAAAAAAAAAAAAAAAAAAAAAAAAAAAAAAAAAAAAAAAAAAAAAJ/f38AAAAAA8zMzADAwP8Af39/AAAAAAAAAAAAAAAAAAAAAAAAAAAAIQAAABgAAAAUAAAAwAMAANgJAADhJAAAsCUAABAAAAAmAAAACAAAAAGAAAAAAAAA"/>
+                <pr:smNativeData xmlns:pr="smNativeData" xmlns="smNativeData" val="SMDATA_15_NygcZBMAAAAlAAAAZAAAAA8BAAAAkAAAAEgAAACQAAAASAAAAAAAAAAAAAAAAAAAAAEAAABQAAAAAAAAAAAA4D8AAAAAAADgPwAAAAAAAOA/AAAAAAAA4D8AAAAAAADgPwAAAAAAAOA/AAAAAAAA4D8AAAAAAADgPwAAAAAAAOA/AAAAAAAA4D8CAAAAjAAAAAAAAAAAAAAAu+DjDP///wgAAAAAAAAAAAAAAAAAAAAAAAAAAAAAAAAAAAAAZAAAAAEAAABAAAAAAAAAAAAAAAAAAAAAAAAAAAAAAAAAAAAAAAAAAAAAAAAAAAAAAAAAAAAAAAAAAAAAAAAAAAAAAAAAAAAAAAAAAAAAAAAAAAAAAAAAAAAAAAAAAAAAFAAAADwAAAAAAAAAAAAAAAAAAAkUAAAAAQAAABQAAAAUAAAAFAAAAAEAAAAAAAAAZAAAAGQAAAAAAAAAZAAAAGQAAAAVAAAAYAAAAAAAAAAAAAAADwAAACADAAAAAAAAAAAAAAEAAACgMgAAVgcAAKr4//8BAAAAf39/AAEAAABkAAAAAAAAABQAAABAHwAAAAAAACYAAAAAAAAAwOD//wAAAAAmAAAAZAAAABYAAABMAAAAAAAAAAAAAAAEAAAAAAAAAAEAAACAgIAKAAAAACgAAAAoAAAAZAAAAGQAAAAAAAAAzMzMAAAAAABQAAAAUAAAAGQAAABkAAAAAAAAABcAAAAUAAAAAAAAAAAAAAD/fwAA/38AAAAAAAAJAAAABAAAANw7IAEeAAAAaAAAAAAAAAAAAAAAAAAAAAAAAAAAAAAAECcAABAnAAAAAAAAAAAAAAAAAAAAAAAAAAAAAAAAAAAAAAAAAAAAABQAAAAAAAAAwMD/AAAAAABkAAAAMgAAAAAAAABkAAAAAAAAAH9/fwAKAAAAIgAAABgAAAAAAAAAAAAAAAAAAAAAAAAAAAAAAAAAAAAkAAAAJAAAAAAAAAAHAAAAAAAAAAAAAAAAAAAAAAAAAAAAAAAAAAAAf39/ACUAAABYAAAAAAAAAAAAAAAAAAAAAAAAAAAAAAAAAAAAAAAAAAAAAAAAAAAAAAAAAAAAAAA/AAAAAAAAAKCGAQAAAAAAAAAAAAAAAAAMAAAAAQAAAAAAAAAAAAAAAAAAAB8AAABUAAAAAAAABQAAAAEAAAAAAAAAAAAAAAAAAAAAAAAAAAAAAAAAAAAAAAAAAAAAAAJ/f38AAAAAA8zMzADAwP8Af39/AAAAAAAAAAAAAAAAAAAAAAAAAAAAIQAAABgAAAAUAAAAwAMAANgJAADhJAAAsCUAABAAAAAmAAAACAAAAAGAAAAAAAAA"/>
               </a:ext>
             </a:extLst>
           </p:cNvSpPr>
@@ -1340,7 +1341,7 @@
             <a:spLocks noGrp="1" noChangeArrowheads="1"/>
             <a:extLst>
               <a:ext uri="smNativeData">
-                <pr:smNativeData xmlns:pr="smNativeData" xmlns="smNativeData" val="SMDATA_15_ucsbZBMAAAAlAAAAZAAAAA8BAAAAkAAAAEgAAACQAAAASAAAAAAAAAAAAAAAAAAAAAEAAABQAAAAAAAAAAAA4D8AAAAAAADgPwAAAAAAAOA/AAAAAAAA4D8AAAAAAADgPwAAAAAAAOA/AAAAAAAA4D8AAAAAAADgPwAAAAAAAOA/AAAAAAAA4D8CAAAAjAAAAAAAAAAAAAAAu+DjDP///wgAAAAAAAAAAAAAAAAAAAAAAAAAAAAAAAAAAAAAZAAAAAEAAABAAAAAAAAAAAAAAAAAAAAAAAAAAAAAAAAAAAAAAAAAAAAAAAAAAAAAAAAAAAAAAAAAAAAAAAAAAAAAAAAAAAAAAAAAAAAAAAAAAAAAAAAAAAAAAAAAAAAAFAAAADwAAAAAAAAAAAAAAAAAAAkUAAAAAQAAABQAAAAUAAAAFAAAAAEAAAAAAAAAZAAAAGQAAAAAAAAAZAAAAGQAAAAVAAAAYAAAAAAAAAAAAAAADwAAACADAAAAAAAAAAAAAAEAAACgMgAAVgcAAKr4//8BAAAAf39/AAEAAABkAAAAAAAAABQAAABAHwAAAAAAACYAAAAAAAAAwOD//wAAAAAmAAAAZAAAABYAAABMAAAAAAAAAAAAAAAEAAAAAAAAAAEAAACAgIAKAAAAACgAAAAoAAAAZAAAAGQAAAAAAAAAzMzMAAAAAABQAAAAUAAAAGQAAABkAAAAAAAAABcAAAAUAAAAAAAAAAAAAAD/fwAA/38AAAAAAAAJAAAABAAAANw7IAEeAAAAaAAAAAAAAAAAAAAAAAAAAAAAAAAAAAAAECcAABAnAAAAAAAAAAAAAAAAAAAAAAAAAAAAAAAAAAAAAAAAAAAAABQAAAAAAAAAwMD/AAAAAABkAAAAMgAAAAAAAABkAAAAAAAAAH9/fwAKAAAAIgAAABgAAAAAAAAAAAAAAAAAAAAAAAAAAAAAAAAAAAAkAAAAJAAAAAAAAAAHAAAAAAAAAAAAAAAAAAAAAAAAAAAAAAAAAAAAf39/ACUAAABYAAAAAAAAAAAAAAAAAAAAAAAAAAAAAAAAAAAAAAAAAAAAAAAAAAAAAAAAAAAAAAA/AAAAAAAAAKCGAQAAAAAAAAAAAAAAAAAMAAAAAQAAAAAAAAAAAAAAAAAAAB8AAABUAAAAAAAABQAAAAEAAAAAAAAAAAAAAAAAAAAAAAAAAAAAAAAAAAAAAAAAAAAAAAJ/f38AAAAAA8zMzADAwP8Af39/AAAAAAAAAAAAAAAAAAAAAAAAAAAAIQAAABgAAAAUAAAAHyYAANgJAABARwAAsCUAABAAAAAmAAAACAAAAAGAAAAAAAAA"/>
+                <pr:smNativeData xmlns:pr="smNativeData" xmlns="smNativeData" val="SMDATA_15_NygcZBMAAAAlAAAAZAAAAA8BAAAAkAAAAEgAAACQAAAASAAAAAAAAAAAAAAAAAAAAAEAAABQAAAAAAAAAAAA4D8AAAAAAADgPwAAAAAAAOA/AAAAAAAA4D8AAAAAAADgPwAAAAAAAOA/AAAAAAAA4D8AAAAAAADgPwAAAAAAAOA/AAAAAAAA4D8CAAAAjAAAAAAAAAAAAAAAu+DjDP///wgAAAAAAAAAAAAAAAAAAAAAAAAAAAAAAAAAAAAAZAAAAAEAAABAAAAAAAAAAAAAAAAAAAAAAAAAAAAAAAAAAAAAAAAAAAAAAAAAAAAAAAAAAAAAAAAAAAAAAAAAAAAAAAAAAAAAAAAAAAAAAAAAAAAAAAAAAAAAAAAAAAAAFAAAADwAAAAAAAAAAAAAAAAAAAkUAAAAAQAAABQAAAAUAAAAFAAAAAEAAAAAAAAAZAAAAGQAAAAAAAAAZAAAAGQAAAAVAAAAYAAAAAAAAAAAAAAADwAAACADAAAAAAAAAAAAAAEAAACgMgAAVgcAAKr4//8BAAAAf39/AAEAAABkAAAAAAAAABQAAABAHwAAAAAAACYAAAAAAAAAwOD//wAAAAAmAAAAZAAAABYAAABMAAAAAAAAAAAAAAAEAAAAAAAAAAEAAACAgIAKAAAAACgAAAAoAAAAZAAAAGQAAAAAAAAAzMzMAAAAAABQAAAAUAAAAGQAAABkAAAAAAAAABcAAAAUAAAAAAAAAAAAAAD/fwAA/38AAAAAAAAJAAAABAAAANw7IAEeAAAAaAAAAAAAAAAAAAAAAAAAAAAAAAAAAAAAECcAABAnAAAAAAAAAAAAAAAAAAAAAAAAAAAAAAAAAAAAAAAAAAAAABQAAAAAAAAAwMD/AAAAAABkAAAAMgAAAAAAAABkAAAAAAAAAH9/fwAKAAAAIgAAABgAAAAAAAAAAAAAAAAAAAAAAAAAAAAAAAAAAAAkAAAAJAAAAAAAAAAHAAAAAAAAAAAAAAAAAAAAAAAAAAAAAAAAAAAAf39/ACUAAABYAAAAAAAAAAAAAAAAAAAAAAAAAAAAAAAAAAAAAAAAAAAAAAAAAAAAAAAAAAAAAAA/AAAAAAAAAKCGAQAAAAAAAAAAAAAAAAAMAAAAAQAAAAAAAAAAAAAAAAAAAB8AAABUAAAAAAAABQAAAAEAAAAAAAAAAAAAAAAAAAAAAAAAAAAAAAAAAAAAAAAAAAAAAAJ/f38AAAAAA8zMzADAwP8Af39/AAAAAAAAAAAAAAAAAAAAAAAAAAAAIQAAABgAAAAUAAAAHyYAANgJAABARwAAsCUAABAAAAAmAAAACAAAAAGAAAAAAAAA"/>
               </a:ext>
             </a:extLst>
           </p:cNvSpPr>
@@ -1424,7 +1425,7 @@
             <a:spLocks noGrp="1" noChangeArrowheads="1"/>
             <a:extLst>
               <a:ext uri="smNativeData">
-                <pr:smNativeData xmlns:pr="smNativeData" xmlns="smNativeData" val="SMDATA_15_ucsbZBMAAAAlAAAAZAAAAA8BAAAAkAAAAEgAAACQAAAASAAAAAAAAAABAAAAAAAAAAEAAABQAAAAAAAAAAAA4D8AAAAAAADgPwAAAAAAAOA/AAAAAAAA4D8AAAAAAADgPwAAAAAAAOA/AAAAAAAA4D8AAAAAAADgPwAAAAAAAOA/AAAAAAAA4D8CAAAAjAAAAAAAAAAAAAAAu+DjDP///wgAAAAAAAAAAAAAAAAAAAAAAAAAAAAAAAAAAAAAZAAAAAEAAABAAAAAAAAAAAAAAAAAAAAAAAAAAAAAAAAAAAAAAAAAAAAAAAAAAAAAAAAAAAAAAAAAAAAAAAAAAAAAAAAAAAAAAAAAAAAAAAAAAAAAAAAAAAAAAAAAAAAAFAAAADwAAAAAAAAAAAAAAAAAAAkUAAAAAQAAABQAAAAUAAAAFAAAAAEAAAAAAAAAZAAAAGQAAAAAAAAAZAAAAGQAAAAVAAAAYAAAAAAAAAAAAAAADwAAACADAAAAAAAAAAAAAAEAAACgMgAAVgcAAKr4//8BAAAAf39/AAEAAABkAAAAAAAAABQAAABAHwAAAAAAACYAAAAAAAAAwOD//wAAAAAmAAAAZAAAABYAAABMAAAAAAAAAAAAAAAEAAAAAAAAAAEAAACAgIAKAAAAACgAAAAoAAAAZAAAAGQAAAAAAAAAzMzMAAAAAABQAAAAUAAAAGQAAABkAAAAAAAAABcAAAAUAAAAAAAAAAAAAAD/fwAA/38AAAAAAAAJAAAABAAAANw7IAEeAAAAaAAAAAAAAAAAAAAAAAAAAAAAAAAAAAAAECcAABAnAAAAAAAAAAAAAAAAAAAAAAAAAAAAAAAAAAAAAAAAAAAAABQAAAAAAAAAwMD/AAAAAABkAAAAMgAAAAAAAABkAAAAAAAAAH9/fwAKAAAAIgAAABgAAAAAAAAAAAAAAAAAAAAAAAAAAAAAAAAAAAAkAAAAJAAAAAAAAAAHAAAAAAAAAAAAAAAAAAAAAAAAAAAAAAAAAAAAf39/ACUAAABYAAAAAAAAAAAAAAAAAAAAAAAAAAAAAAAAAAAAAAAAAAAAAAAAAAAAAAAAAAAAAAA/AAAAAAAAAKCGAQAAAAAAAAAAAAAAAAAMAAAAAQAAAAAAAAAAAAAAAAAAAB8AAABUAAAAAAAABQAAAAEAAAAAAAAAAAAAAAAAAAAAAAAAAAAAAAAAAAAAAAAAAAAAAAJ/f38AAAAAA8zMzADAwP8Af39/AAAAAAAAAAAAAAAAAAAAAAAAAAAAIQAAABgAAAAUAAAAwAMAABsnAAA/FQAAWSkAABAAAAAmAAAACAAAAAAAAAAAAAAA"/>
+                <pr:smNativeData xmlns:pr="smNativeData" xmlns="smNativeData" val="SMDATA_15_NygcZBMAAAAlAAAAZAAAAA8BAAAAkAAAAEgAAACQAAAASAAAAAAAAAABAAAAAAAAAAEAAABQAAAAAAAAAAAA4D8AAAAAAADgPwAAAAAAAOA/AAAAAAAA4D8AAAAAAADgPwAAAAAAAOA/AAAAAAAA4D8AAAAAAADgPwAAAAAAAOA/AAAAAAAA4D8CAAAAjAAAAAAAAAAAAAAAu+DjDP///wgAAAAAAAAAAAAAAAAAAAAAAAAAAAAAAAAAAAAAZAAAAAEAAABAAAAAAAAAAAAAAAAAAAAAAAAAAAAAAAAAAAAAAAAAAAAAAAAAAAAAAAAAAAAAAAAAAAAAAAAAAAAAAAAAAAAAAAAAAAAAAAAAAAAAAAAAAAAAAAAAAAAAFAAAADwAAAAAAAAAAAAAAAAAAAkUAAAAAQAAABQAAAAUAAAAFAAAAAEAAAAAAAAAZAAAAGQAAAAAAAAAZAAAAGQAAAAVAAAAYAAAAAAAAAAAAAAADwAAACADAAAAAAAAAAAAAAEAAACgMgAAVgcAAKr4//8BAAAAf39/AAEAAABkAAAAAAAAABQAAABAHwAAAAAAACYAAAAAAAAAwOD//wAAAAAmAAAAZAAAABYAAABMAAAAAAAAAAAAAAAEAAAAAAAAAAEAAACAgIAKAAAAACgAAAAoAAAAZAAAAGQAAAAAAAAAzMzMAAAAAABQAAAAUAAAAGQAAABkAAAAAAAAABcAAAAUAAAAAAAAAAAAAAD/fwAA/38AAAAAAAAJAAAABAAAANw7IAEeAAAAaAAAAAAAAAAAAAAAAAAAAAAAAAAAAAAAECcAABAnAAAAAAAAAAAAAAAAAAAAAAAAAAAAAAAAAAAAAAAAAAAAABQAAAAAAAAAwMD/AAAAAABkAAAAMgAAAAAAAABkAAAAAAAAAH9/fwAKAAAAIgAAABgAAAAAAAAAAAAAAAAAAAAAAAAAAAAAAAAAAAAkAAAAJAAAAAAAAAAHAAAAAAAAAAAAAAAAAAAAAAAAAAAAAAAAAAAAf39/ACUAAABYAAAAAAAAAAAAAAAAAAAAAAAAAAAAAAAAAAAAAAAAAAAAAAAAAAAAAAAAAAAAAAA/AAAAAAAAAKCGAQAAAAAAAAAAAAAAAAAMAAAAAQAAAAAAAAAAAAAAAAAAAB8AAABUAAAAAAAABQAAAAEAAAAAAAAAAAAAAAAAAAAAAAAAAAAAAAAAAAAAAAAAAAAAAAJ/f38AAAAAA8zMzADAwP8Af39/AAAAAAAAAAAAAAAAAAAAAAAAAAAAIQAAABgAAAAUAAAAwAMAABsnAAA/FQAAWSkAABAAAAAmAAAACAAAAAAAAAAAAAAA"/>
               </a:ext>
             </a:extLst>
           </p:cNvSpPr>
@@ -1438,7 +1439,7 @@
           <a:lstStyle/>
           <a:p>
             <a:pPr/>
-            <a:fld id="{3A2682F8-B6D7-7374-999E-4021CCD06F15}" type="datetime1">
+            <a:fld id="{39DFC06E-20D4-8A36-9A67-D6638E296C83}" type="datetime1">
               <a:t/>
             </a:fld>
           </a:p>
@@ -1451,7 +1452,7 @@
             <a:spLocks noGrp="1" noChangeArrowheads="1"/>
             <a:extLst>
               <a:ext uri="smNativeData">
-                <pr:smNativeData xmlns:pr="smNativeData" xmlns="smNativeData" val="SMDATA_15_ucsbZBMAAAAlAAAAZAAAAA8BAAAAkAAAAEgAAACQAAAASAAAAAAAAAABAAAAAAAAAAEAAABQAAAAAAAAAAAA4D8AAAAAAADgPwAAAAAAAOA/AAAAAAAA4D8AAAAAAADgPwAAAAAAAOA/AAAAAAAA4D8AAAAAAADgPwAAAAAAAOA/AAAAAAAA4D8CAAAAjAAAAAAAAAAAAAAAu+DjDP///wgAAAAAAAAAAAAAAAAAAAAAAAAAAAAAAAAAAAAAZAAAAAEAAABAAAAAAAAAAAAAAAAAAAAAAAAAAAAAAAAAAAAAAAAAAAAAAAAAAAAAAAAAAAAAAAAAAAAAAAAAAAAAAAAAAAAAAAAAAAAAAAAAAAAAAAAAAAAAAAAAAAAAFAAAADwAAAAAAAAAAAAAAAAAAAkUAAAAAQAAABQAAAAUAAAAFAAAAAEAAAAAAAAAZAAAAGQAAAAAAAAAZAAAAGQAAAAVAAAAYAAAAAAAAAAAAAAADwAAACADAAAAAAAAAAAAAAEAAACgMgAAVgcAAKr4//8BAAAAf39/AAEAAABkAAAAAAAAABQAAABAHwAAAAAAACYAAAAAAAAAwOD//wAAAAAmAAAAZAAAABYAAABMAAAAAAAAAAAAAAAEAAAAAAAAAAEAAACAgIAKAAAAACgAAAAoAAAAZAAAAGQAAAAAAAAAzMzMAAAAAABQAAAAUAAAAGQAAABkAAAAAAAAABcAAAAUAAAAAAAAAAAAAAD/fwAA/38AAAAAAAAJAAAABAAAANw7IAEeAAAAaAAAAAAAAAAAAAAAAAAAAAAAAAAAAAAAECcAABAnAAAAAAAAAAAAAAAAAAAAAAAAAAAAAAAAAAAAAAAAAAAAABQAAAAAAAAAwMD/AAAAAABkAAAAMgAAAAAAAABkAAAAAAAAAH9/fwAKAAAAIgAAABgAAAAAAAAAAAAAAAAAAAAAAAAAAAAAAAAAAAAkAAAAJAAAAAAAAAAHAAAAAAAAAAAAAAAAAAAAAAAAAAAAAAAAAAAAf39/ACUAAABYAAAAAAAAAAAAAAAAAAAAAAAAAAAAAAAAAAAAAAAAAAAAAAAAAAAAAAAAAAAAAAA/AAAAAAAAAKCGAQAAAAAAAAAAAAAAAAAMAAAAAQAAAAAAAAAAAAAAAAAAAB8AAABUAAAAAAAABQAAAAEAAAAAAAAAAAAAAAAAAAAAAAAAAAAAAAAAAAAAAAAAAAAAAAJ/f38AAAAAA8zMzADAwP8Af39/AAAAAAAAAAAAAAAAAAAAAAAAAAAAIQAAABgAAAAUAAAAoRkAABsnAABfMQAAWSkAABAAAAAmAAAACAAAAAAAAAAAAAAA"/>
+                <pr:smNativeData xmlns:pr="smNativeData" xmlns="smNativeData" val="SMDATA_15_NygcZBMAAAAlAAAAZAAAAA8BAAAAkAAAAEgAAACQAAAASAAAAAAAAAABAAAAAAAAAAEAAABQAAAAAAAAAAAA4D8AAAAAAADgPwAAAAAAAOA/AAAAAAAA4D8AAAAAAADgPwAAAAAAAOA/AAAAAAAA4D8AAAAAAADgPwAAAAAAAOA/AAAAAAAA4D8CAAAAjAAAAAAAAAAAAAAAu+DjDP///wgAAAAAAAAAAAAAAAAAAAAAAAAAAAAAAAAAAAAAZAAAAAEAAABAAAAAAAAAAAAAAAAAAAAAAAAAAAAAAAAAAAAAAAAAAAAAAAAAAAAAAAAAAAAAAAAAAAAAAAAAAAAAAAAAAAAAAAAAAAAAAAAAAAAAAAAAAAAAAAAAAAAAFAAAADwAAAAAAAAAAAAAAAAAAAkUAAAAAQAAABQAAAAUAAAAFAAAAAEAAAAAAAAAZAAAAGQAAAAAAAAAZAAAAGQAAAAVAAAAYAAAAAAAAAAAAAAADwAAACADAAAAAAAAAAAAAAEAAACgMgAAVgcAAKr4//8BAAAAf39/AAEAAABkAAAAAAAAABQAAABAHwAAAAAAACYAAAAAAAAAwOD//wAAAAAmAAAAZAAAABYAAABMAAAAAAAAAAAAAAAEAAAAAAAAAAEAAACAgIAKAAAAACgAAAAoAAAAZAAAAGQAAAAAAAAAzMzMAAAAAABQAAAAUAAAAGQAAABkAAAAAAAAABcAAAAUAAAAAAAAAAAAAAD/fwAA/38AAAAAAAAJAAAABAAAANw7IAEeAAAAaAAAAAAAAAAAAAAAAAAAAAAAAAAAAAAAECcAABAnAAAAAAAAAAAAAAAAAAAAAAAAAAAAAAAAAAAAAAAAAAAAABQAAAAAAAAAwMD/AAAAAABkAAAAMgAAAAAAAABkAAAAAAAAAH9/fwAKAAAAIgAAABgAAAAAAAAAAAAAAAAAAAAAAAAAAAAAAAAAAAAkAAAAJAAAAAAAAAAHAAAAAAAAAAAAAAAAAAAAAAAAAAAAAAAAAAAAf39/ACUAAABYAAAAAAAAAAAAAAAAAAAAAAAAAAAAAAAAAAAAAAAAAAAAAAAAAAAAAAAAAAAAAAA/AAAAAAAAAKCGAQAAAAAAAAAAAAAAAAAMAAAAAQAAAAAAAAAAAAAAAAAAAB8AAABUAAAAAAAABQAAAAEAAAAAAAAAAAAAAAAAAAAAAAAAAAAAAAAAAAAAAAAAAAAAAAJ/f38AAAAAA8zMzADAwP8Af39/AAAAAAAAAAAAAAAAAAAAAAAAAAAAIQAAABgAAAAUAAAAoRkAABsnAABfMQAAWSkAABAAAAAmAAAACAAAAAAAAAAAAAAA"/>
               </a:ext>
             </a:extLst>
           </p:cNvSpPr>
@@ -1478,7 +1479,7 @@
             <a:spLocks noGrp="1" noChangeArrowheads="1"/>
             <a:extLst>
               <a:ext uri="smNativeData">
-                <pr:smNativeData xmlns:pr="smNativeData" xmlns="smNativeData" val="SMDATA_15_ucsbZBMAAAAlAAAAZAAAAA8BAAAAkAAAAEgAAACQAAAASAAAAAAAAAABAAAAAAAAAAEAAABQAAAAAAAAAAAA4D8AAAAAAADgPwAAAAAAAOA/AAAAAAAA4D8AAAAAAADgPwAAAAAAAOA/AAAAAAAA4D8AAAAAAADgPwAAAAAAAOA/AAAAAAAA4D8CAAAAjAAAAAAAAAAAAAAAu+DjDP///wgAAAAAAAAAAAAAAAAAAAAAAAAAAAAAAAAAAAAAZAAAAAEAAABAAAAAAAAAAAAAAAAAAAAAAAAAAAAAAAAAAAAAAAAAAAAAAAAAAAAAAAAAAAAAAAAAAAAAAAAAAAAAAAAAAAAAAAAAAAAAAAAAAAAAAAAAAAAAAAAAAAAAFAAAADwAAAAAAAAAAAAAAAAAAAkUAAAAAQAAABQAAAAUAAAAFAAAAAEAAAAAAAAAZAAAAGQAAAAAAAAAZAAAAGQAAAAVAAAAYAAAAAAAAAAAAAAADwAAACADAAAAAAAAAAAAAAEAAACgMgAAVgcAAKr4//8BAAAAf39/AAEAAABkAAAAAAAAABQAAABAHwAAAAAAACYAAAAAAAAAwOD//wAAAAAmAAAAZAAAABYAAABMAAAAAAAAAAAAAAAEAAAAAAAAAAEAAACAgIAKAAAAACgAAAAoAAAAZAAAAGQAAAAAAAAAzMzMAAAAAABQAAAAUAAAAGQAAABkAAAAAAAAABcAAAAUAAAAAAAAAAAAAAD/fwAA/38AAAAAAAAJAAAABAAAANw7IAEeAAAAaAAAAAAAAAAAAAAAAAAAAAAAAAAAAAAAECcAABAnAAAAAAAAAAAAAAAAAAAAAAAAAAAAAAAAAAAAAAAAAAAAABQAAAAAAAAAwMD/AAAAAABkAAAAMgAAAAAAAABkAAAAAAAAAH9/fwAKAAAAIgAAABgAAAAAAAAAAAAAAAAAAAAAAAAAAAAAAAAAAAAkAAAAJAAAAAAAAAAHAAAAAAAAAAAAAAAAAAAAAAAAAAAAAAAAAAAAf39/ACUAAABYAAAAAAAAAAAAAAAAAAAAAAAAAAAAAAAAAAAAAAAAAAAAAAAAAAAAAAAAAAAAAAA/AAAAAAAAAKCGAQAAAAAAAAAAAAAAAAAMAAAAAQAAAAAAAAAAAAAAAAAAAB8AAABUAAAAAAAABQAAAAEAAAAAAAAAAAAAAAAAAAAAAAAAAAAAAAAAAAAAAAAAAAAAAAJ/f38AAAAAA8zMzADAwP8Af39/AAAAAAAAAAAAAAAAAAAAAAAAAAAAIQAAABgAAAAUAAAAwTUAABsnAABARwAAWSkAABAAAAAmAAAACAAAAAAAAAAAAAAA"/>
+                <pr:smNativeData xmlns:pr="smNativeData" xmlns="smNativeData" val="SMDATA_15_NygcZBMAAAAlAAAAZAAAAA8BAAAAkAAAAEgAAACQAAAASAAAAAAAAAABAAAAAAAAAAEAAABQAAAAAAAAAAAA4D8AAAAAAADgPwAAAAAAAOA/AAAAAAAA4D8AAAAAAADgPwAAAAAAAOA/AAAAAAAA4D8AAAAAAADgPwAAAAAAAOA/AAAAAAAA4D8CAAAAjAAAAAAAAAAAAAAAu+DjDP///wgAAAAAAAAAAAAAAAAAAAAAAAAAAAAAAAAAAAAAZAAAAAEAAABAAAAAAAAAAAAAAAAAAAAAAAAAAAAAAAAAAAAAAAAAAAAAAAAAAAAAAAAAAAAAAAAAAAAAAAAAAAAAAAAAAAAAAAAAAAAAAAAAAAAAAAAAAAAAAAAAAAAAFAAAADwAAAAAAAAAAAAAAAAAAAkUAAAAAQAAABQAAAAUAAAAFAAAAAEAAAAAAAAAZAAAAGQAAAAAAAAAZAAAAGQAAAAVAAAAYAAAAAAAAAAAAAAADwAAACADAAAAAAAAAAAAAAEAAACgMgAAVgcAAKr4//8BAAAAf39/AAEAAABkAAAAAAAAABQAAABAHwAAAAAAACYAAAAAAAAAwOD//wAAAAAmAAAAZAAAABYAAABMAAAAAAAAAAAAAAAEAAAAAAAAAAEAAACAgIAKAAAAACgAAAAoAAAAZAAAAGQAAAAAAAAAzMzMAAAAAABQAAAAUAAAAGQAAABkAAAAAAAAABcAAAAUAAAAAAAAAAAAAAD/fwAA/38AAAAAAAAJAAAABAAAANw7IAEeAAAAaAAAAAAAAAAAAAAAAAAAAAAAAAAAAAAAECcAABAnAAAAAAAAAAAAAAAAAAAAAAAAAAAAAAAAAAAAAAAAAAAAABQAAAAAAAAAwMD/AAAAAABkAAAAMgAAAAAAAABkAAAAAAAAAH9/fwAKAAAAIgAAABgAAAAAAAAAAAAAAAAAAAAAAAAAAAAAAAAAAAAkAAAAJAAAAAAAAAAHAAAAAAAAAAAAAAAAAAAAAAAAAAAAAAAAAAAAf39/ACUAAABYAAAAAAAAAAAAAAAAAAAAAAAAAAAAAAAAAAAAAAAAAAAAAAAAAAAAAAAAAAAAAAA/AAAAAAAAAKCGAQAAAAAAAAAAAAAAAAAMAAAAAQAAAAAAAAAAAAAAAAAAAB8AAABUAAAAAAAABQAAAAEAAAAAAAAAAAAAAAAAAAAAAAAAAAAAAAAAAAAAAAAAAAAAAAJ/f38AAAAAA8zMzADAwP8Af39/AAAAAAAAAAAAAAAAAAAAAAAAAAAAIQAAABgAAAAUAAAAwTUAABsnAABARwAAWSkAABAAAAAmAAAACAAAAAAAAAAAAAAA"/>
               </a:ext>
             </a:extLst>
           </p:cNvSpPr>
@@ -1492,7 +1493,7 @@
           <a:lstStyle/>
           <a:p>
             <a:pPr/>
-            <a:fld id="{3A269C33-7DD7-736A-999E-8B3FD2D06FDE}" type="slidenum">
+            <a:fld id="{39DFB484-CAD4-8A42-9A67-3C17FA296C69}" type="slidenum">
               <a:t/>
             </a:fld>
           </a:p>
@@ -1530,7 +1531,7 @@
             <a:spLocks noGrp="1" noChangeArrowheads="1"/>
             <a:extLst>
               <a:ext uri="smNativeData">
-                <pr:smNativeData xmlns:pr="smNativeData" xmlns="smNativeData" val="SMDATA_15_ucsbZBMAAAAlAAAAZAAAAA8BAAAAkAAAAEgAAACQAAAASAAAAAAAAAABAAAAAAAAAAEAAABQAAAAAAAAAAAA4D8AAAAAAADgPwAAAAAAAOA/AAAAAAAA4D8AAAAAAADgPwAAAAAAAOA/AAAAAAAA4D8AAAAAAADgPwAAAAAAAOA/AAAAAAAA4D8CAAAAjAAAAAAAAAAAAAAAu+DjDP///wgAAAAAAAAAAAAAAAAAAAAAAAAAAAAAAAAAAAAAZAAAAAEAAABAAAAAAAAAAAAAAAAAAAAAAAAAAAAAAAAAAAAAAAAAAAAAAAAAAAAAAAAAAAAAAAAAAAAAAAAAAAAAAAAAAAAAAAAAAAAAAAAAAAAAAAAAAAAAAAAAAAAAFAAAADwAAAAAAAAAAAAAAAAAAAkUAAAAAQAAABQAAAAUAAAAFAAAAAEAAAAAAAAAZAAAAGQAAAAAAAAAZAAAAGQAAAAVAAAAYAAAAAAAAAAAAAAADwAAACADAAAAAAAAAAAAAAEAAACgMgAAVgcAAKr4//8BAAAAf39/AAEAAABkAAAAAAAAABQAAABAHwAAAAAAACYAAAAAAAAAwOD//wAAAAAmAAAAZAAAABYAAABMAAAAAAAAAAAAAAAEAAAAAAAAAAEAAACAgIAKAAAAACgAAAAoAAAAZAAAAGQAAAAAAAAAzMzMAAAAAABQAAAAUAAAAGQAAABkAAAAAAAAABcAAAAUAAAAAAAAAAAAAAD/fwAA/38AAAAAAAAJAAAABAAAANw7IAEeAAAAaAAAAAAAAAAAAAAAAAAAAAAAAAAAAAAAECcAABAnAAAAAAAAAAAAAAAAAAAAAAAAAAAAAAAAAAAAAAAAAAAAABQAAAAAAAAAwMD/AAAAAABkAAAAMgAAAAAAAABkAAAAAAAAAH9/fwAKAAAAIgAAABgAAAAAAAAAAAAAAAAAAAAAAAAAAAAAAAAAAAAkAAAAJAAAAAAAAAAHAAAAAAAAAAAAAAAAAAAAAAAAAAAAAAAAAAAAf39/ACUAAABYAAAAAAAAAAAAAAAAAAAAAAAAAAAAAAAAAAAAAAAAAAAAAAAAAAAAAAAAAAAAAAA/AAAAAAAAAKCGAQAAAAAAAAAAAAAAAAAMAAAAAQAAAAAAAAAAAAAAAAAAAB8AAABUAAAAAAAABQAAAAEAAAAAAAAAAAAAAAAAAAAAAAAAAAAAAAAAAAAAAAAAAAAAAAJ/f38AAAAAA8zMzADAwP8Af39/AAAAAAAAAAAAAAAAAAAAAAAAAAAAIQAAABgAAAAUAAAAwAMAALABAABARwAAuAgAABAAAAAmAAAACAAAAAAAAAAAAAAA"/>
+                <pr:smNativeData xmlns:pr="smNativeData" xmlns="smNativeData" val="SMDATA_15_NygcZBMAAAAlAAAAZAAAAA8BAAAAkAAAAEgAAACQAAAASAAAAAAAAAABAAAAAAAAAAEAAABQAAAAAAAAAAAA4D8AAAAAAADgPwAAAAAAAOA/AAAAAAAA4D8AAAAAAADgPwAAAAAAAOA/AAAAAAAA4D8AAAAAAADgPwAAAAAAAOA/AAAAAAAA4D8CAAAAjAAAAAAAAAAAAAAAu+DjDP///wgAAAAAAAAAAAAAAAAAAAAAAAAAAAAAAAAAAAAAZAAAAAEAAABAAAAAAAAAAAAAAAAAAAAAAAAAAAAAAAAAAAAAAAAAAAAAAAAAAAAAAAAAAAAAAAAAAAAAAAAAAAAAAAAAAAAAAAAAAAAAAAAAAAAAAAAAAAAAAAAAAAAAFAAAADwAAAAAAAAAAAAAAAAAAAkUAAAAAQAAABQAAAAUAAAAFAAAAAEAAAAAAAAAZAAAAGQAAAAAAAAAZAAAAGQAAAAVAAAAYAAAAAAAAAAAAAAADwAAACADAAAAAAAAAAAAAAEAAACgMgAAVgcAAKr4//8BAAAAf39/AAEAAABkAAAAAAAAABQAAABAHwAAAAAAACYAAAAAAAAAwOD//wAAAAAmAAAAZAAAABYAAABMAAAAAAAAAAAAAAAEAAAAAAAAAAEAAACAgIAKAAAAACgAAAAoAAAAZAAAAGQAAAAAAAAAzMzMAAAAAABQAAAAUAAAAGQAAABkAAAAAAAAABcAAAAUAAAAAAAAAAAAAAD/fwAA/38AAAAAAAAJAAAABAAAANw7IAEeAAAAaAAAAAAAAAAAAAAAAAAAAAAAAAAAAAAAECcAABAnAAAAAAAAAAAAAAAAAAAAAAAAAAAAAAAAAAAAAAAAAAAAABQAAAAAAAAAwMD/AAAAAABkAAAAMgAAAAAAAABkAAAAAAAAAH9/fwAKAAAAIgAAABgAAAAAAAAAAAAAAAAAAAAAAAAAAAAAAAAAAAAkAAAAJAAAAAAAAAAHAAAAAAAAAAAAAAAAAAAAAAAAAAAAAAAAAAAAf39/ACUAAABYAAAAAAAAAAAAAAAAAAAAAAAAAAAAAAAAAAAAAAAAAAAAAAAAAAAAAAAAAAAAAAA/AAAAAAAAAKCGAQAAAAAAAAAAAAAAAAAMAAAAAQAAAAAAAAAAAAAAAAAAAB8AAABUAAAAAAAABQAAAAEAAAAAAAAAAAAAAAAAAAAAAAAAAAAAAAAAAAAAAAAAAAAAAAJ/f38AAAAAA8zMzADAwP8Af39/AAAAAAAAAAAAAAAAAAAAAAAAAAAAIQAAABgAAAAUAAAAwAMAALABAABARwAAuAgAABAAAAAmAAAACAAAAAAAAAAAAAAA"/>
               </a:ext>
             </a:extLst>
           </p:cNvSpPr>
@@ -1557,7 +1558,7 @@
             <a:spLocks noGrp="1" noChangeArrowheads="1"/>
             <a:extLst>
               <a:ext uri="smNativeData">
-                <pr:smNativeData xmlns:pr="smNativeData" xmlns="smNativeData" val="SMDATA_15_ucsbZBMAAAAlAAAAZAAAAA8BAAAAkAAAAEgAAACQAAAASAAAAAAAAAACAAAAAAAAAAEAAABQAAAAAAAAAAAA4D8AAAAAAADgPwAAAAAAAOA/AAAAAAAA4D8AAAAAAADgPwAAAAAAAOA/AAAAAAAA4D8AAAAAAADgPwAAAAAAAOA/AAAAAAAA4D8CAAAAjAAAAAAAAAAAAAAAu+DjDP///wgAAAAAAAAAAAAAAAAAAAAAAAAAAAAAAAAAAAAAZAAAAAEAAABAAAAAAAAAAAAAAAAAAAAAAAAAAAAAAAAAAAAAAAAAAAAAAAAAAAAAAAAAAAAAAAAAAAAAAAAAAAAAAAAAAAAAAAAAAAAAAAAAAAAAAAAAAAAAAAAAAAAAFAAAADwAAAAAAAAAAAAAAAAAAAkUAAAAAQAAABQAAAAUAAAAFAAAAAEAAAAAAAAAZAAAAGQAAAAAAAAAZAAAAGQAAAAVAAAAYAAAAAAAAAAAAAAADwAAACADAAAAAAAAAAAAAAEAAACgMgAAVgcAAKr4//8BAAAAf39/AAEAAABkAAAAAAAAABQAAABAHwAAAAAAACYAAAAAAAAAwOD//wAAAAAmAAAAZAAAABYAAABMAAAAAAAAAAAAAAAEAAAAAAAAAAEAAACAgIAKAAAAACgAAAAoAAAAZAAAAGQAAAAAAAAAzMzMAAAAAABQAAAAUAAAAGQAAABkAAAAAAAAABcAAAAUAAAAAAAAAAAAAAD/fwAA/38AAAAAAAAJAAAABAAAANw7IAEeAAAAaAAAAAAAAAAAAAAAAAAAAAAAAAAAAAAAECcAABAnAAAAAAAAAAAAAAAAAAAAAAAAAAAAAAAAAAAAAAAAAAAAABQAAAAAAAAAwMD/AAAAAABkAAAAMgAAAAAAAABkAAAAAAAAAH9/fwAKAAAAIgAAABgAAAAAAAAAAAAAAAAAAAAAAAAAAAAAAAAAAAAkAAAAJAAAAAAAAAAHAAAAAAAAAAAAAAAAAAAAAAAAAAAAAAAAAAAAf39/ACUAAABYAAAAAAAAAAAAAAAAAAAAAAAAAAAAAAAAAAAAAAAAAAAAAAAAAAAAAAAAAAAAAAA/AAAAAAAAAKCGAQAAAAAAAAAAAAAAAAAMAAAAAQAAAAAAAAAAAAAAAAAAAB8AAABUAAAAAAAABQAAAAEAAAAAAAAAAAAAAAAAAAAAAAAAAAAAAAAAAAAAAAAAAAAAAAJ/f38AAAAAA8zMzADAwP8Af39/AAAAAAAAAAAAAAAAAAAAAAAAAAAAIQAAABgAAAAUAAAAwAMAAHEJAADjJAAAYQ0AABAAAAAmAAAACAAAAIGAAAAAAAAA"/>
+                <pr:smNativeData xmlns:pr="smNativeData" xmlns="smNativeData" val="SMDATA_15_NygcZBMAAAAlAAAAZAAAAA8BAAAAkAAAAEgAAACQAAAASAAAAAAAAAACAAAAAAAAAAEAAABQAAAAAAAAAAAA4D8AAAAAAADgPwAAAAAAAOA/AAAAAAAA4D8AAAAAAADgPwAAAAAAAOA/AAAAAAAA4D8AAAAAAADgPwAAAAAAAOA/AAAAAAAA4D8CAAAAjAAAAAAAAAAAAAAAu+DjDP///wgAAAAAAAAAAAAAAAAAAAAAAAAAAAAAAAAAAAAAZAAAAAEAAABAAAAAAAAAAAAAAAAAAAAAAAAAAAAAAAAAAAAAAAAAAAAAAAAAAAAAAAAAAAAAAAAAAAAAAAAAAAAAAAAAAAAAAAAAAAAAAAAAAAAAAAAAAAAAAAAAAAAAFAAAADwAAAAAAAAAAAAAAAAAAAkUAAAAAQAAABQAAAAUAAAAFAAAAAEAAAAAAAAAZAAAAGQAAAAAAAAAZAAAAGQAAAAVAAAAYAAAAAAAAAAAAAAADwAAACADAAAAAAAAAAAAAAEAAACgMgAAVgcAAKr4//8BAAAAf39/AAEAAABkAAAAAAAAABQAAABAHwAAAAAAACYAAAAAAAAAwOD//wAAAAAmAAAAZAAAABYAAABMAAAAAAAAAAAAAAAEAAAAAAAAAAEAAACAgIAKAAAAACgAAAAoAAAAZAAAAGQAAAAAAAAAzMzMAAAAAABQAAAAUAAAAGQAAABkAAAAAAAAABcAAAAUAAAAAAAAAAAAAAD/fwAA/38AAAAAAAAJAAAABAAAANw7IAEeAAAAaAAAAAAAAAAAAAAAAAAAAAAAAAAAAAAAECcAABAnAAAAAAAAAAAAAAAAAAAAAAAAAAAAAAAAAAAAAAAAAAAAABQAAAAAAAAAwMD/AAAAAABkAAAAMgAAAAAAAABkAAAAAAAAAH9/fwAKAAAAIgAAABgAAAAAAAAAAAAAAAAAAAAAAAAAAAAAAAAAAAAkAAAAJAAAAAAAAAAHAAAAAAAAAAAAAAAAAAAAAAAAAAAAAAAAAAAAf39/ACUAAABYAAAAAAAAAAAAAAAAAAAAAAAAAAAAAAAAAAAAAAAAAAAAAAAAAAAAAAAAAAAAAAA/AAAAAAAAAKCGAQAAAAAAAAAAAAAAAAAMAAAAAQAAAAAAAAAAAAAAAAAAAB8AAABUAAAAAAAABQAAAAEAAAAAAAAAAAAAAAAAAAAAAAAAAAAAAAAAAAAAAAAAAAAAAAJ/f38AAAAAA8zMzADAwP8Af39/AAAAAAAAAAAAAAAAAAAAAAAAAAAAIQAAABgAAAAUAAAAwAMAAHEJAADjJAAAYQ0AABAAAAAmAAAACAAAAIGAAAAAAAAA"/>
               </a:ext>
             </a:extLst>
           </p:cNvSpPr>
@@ -1630,7 +1631,7 @@
             <a:spLocks noGrp="1" noChangeArrowheads="1"/>
             <a:extLst>
               <a:ext uri="smNativeData">
-                <pr:smNativeData xmlns:pr="smNativeData" xmlns="smNativeData" val="SMDATA_15_ucsbZBMAAAAlAAAAZAAAAA8BAAAAkAAAAEgAAACQAAAASAAAAAAAAAAAAAAAAAAAAAEAAABQAAAAAAAAAAAA4D8AAAAAAADgPwAAAAAAAOA/AAAAAAAA4D8AAAAAAADgPwAAAAAAAOA/AAAAAAAA4D8AAAAAAADgPwAAAAAAAOA/AAAAAAAA4D8CAAAAjAAAAAAAAAAAAAAAu+DjDP///wgAAAAAAAAAAAAAAAAAAAAAAAAAAAAAAAAAAAAAZAAAAAEAAABAAAAAAAAAAAAAAAAAAAAAAAAAAAAAAAAAAAAAAAAAAAAAAAAAAAAAAAAAAAAAAAAAAAAAAAAAAAAAAAAAAAAAAAAAAAAAAAAAAAAAAAAAAAAAAAAAAAAAFAAAADwAAAAAAAAAAAAAAAAAAAkUAAAAAQAAABQAAAAUAAAAFAAAAAEAAAAAAAAAZAAAAGQAAAAAAAAAZAAAAGQAAAAVAAAAYAAAAAAAAAAAAAAADwAAACADAAAAAAAAAAAAAAEAAACgMgAAVgcAAKr4//8BAAAAf39/AAEAAABkAAAAAAAAABQAAABAHwAAAAAAACYAAAAAAAAAwOD//wAAAAAmAAAAZAAAABYAAABMAAAAAAAAAAAAAAAEAAAAAAAAAAEAAACAgIAKAAAAACgAAAAoAAAAZAAAAGQAAAAAAAAAzMzMAAAAAABQAAAAUAAAAGQAAABkAAAAAAAAABcAAAAUAAAAAAAAAAAAAAD/fwAA/38AAAAAAAAJAAAABAAAANw7IAEeAAAAaAAAAAAAAAAAAAAAAAAAAAAAAAAAAAAAECcAABAnAAAAAAAAAAAAAAAAAAAAAAAAAAAAAAAAAAAAAAAAAAAAABQAAAAAAAAAwMD/AAAAAABkAAAAMgAAAAAAAABkAAAAAAAAAH9/fwAKAAAAIgAAABgAAAAAAAAAAAAAAAAAAAAAAAAAAAAAAAAAAAAkAAAAJAAAAAAAAAAHAAAAAAAAAAAAAAAAAAAAAAAAAAAAAAAAAAAAf39/ACUAAABYAAAAAAAAAAAAAAAAAAAAAAAAAAAAAAAAAAAAAAAAAAAAAAAAAAAAAAAAAAAAAAA/AAAAAAAAAKCGAQAAAAAAAAAAAAAAAAAMAAAAAQAAAAAAAAAAAAAAAAAAAB8AAABUAAAAAAAABQAAAAEAAAAAAAAAAAAAAAAAAAAAAAAAAAAAAAAAAAAAAAAAAAAAAAJ/f38AAAAAA8zMzADAwP8Af39/AAAAAAAAAAAAAAAAAAAAAAAAAAAAIQAAABgAAAAUAAAAwAMAAGENAADjJAAAsCUAABAAAAAmAAAACAAAAAGAAAAAAAAA"/>
+                <pr:smNativeData xmlns:pr="smNativeData" xmlns="smNativeData" val="SMDATA_15_NygcZBMAAAAlAAAAZAAAAA8BAAAAkAAAAEgAAACQAAAASAAAAAAAAAAAAAAAAAAAAAEAAABQAAAAAAAAAAAA4D8AAAAAAADgPwAAAAAAAOA/AAAAAAAA4D8AAAAAAADgPwAAAAAAAOA/AAAAAAAA4D8AAAAAAADgPwAAAAAAAOA/AAAAAAAA4D8CAAAAjAAAAAAAAAAAAAAAu+DjDP///wgAAAAAAAAAAAAAAAAAAAAAAAAAAAAAAAAAAAAAZAAAAAEAAABAAAAAAAAAAAAAAAAAAAAAAAAAAAAAAAAAAAAAAAAAAAAAAAAAAAAAAAAAAAAAAAAAAAAAAAAAAAAAAAAAAAAAAAAAAAAAAAAAAAAAAAAAAAAAAAAAAAAAFAAAADwAAAAAAAAAAAAAAAAAAAkUAAAAAQAAABQAAAAUAAAAFAAAAAEAAAAAAAAAZAAAAGQAAAAAAAAAZAAAAGQAAAAVAAAAYAAAAAAAAAAAAAAADwAAACADAAAAAAAAAAAAAAEAAACgMgAAVgcAAKr4//8BAAAAf39/AAEAAABkAAAAAAAAABQAAABAHwAAAAAAACYAAAAAAAAAwOD//wAAAAAmAAAAZAAAABYAAABMAAAAAAAAAAAAAAAEAAAAAAAAAAEAAACAgIAKAAAAACgAAAAoAAAAZAAAAGQAAAAAAAAAzMzMAAAAAABQAAAAUAAAAGQAAABkAAAAAAAAABcAAAAUAAAAAAAAAAAAAAD/fwAA/38AAAAAAAAJAAAABAAAANw7IAEeAAAAaAAAAAAAAAAAAAAAAAAAAAAAAAAAAAAAECcAABAnAAAAAAAAAAAAAAAAAAAAAAAAAAAAAAAAAAAAAAAAAAAAABQAAAAAAAAAwMD/AAAAAABkAAAAMgAAAAAAAABkAAAAAAAAAH9/fwAKAAAAIgAAABgAAAAAAAAAAAAAAAAAAAAAAAAAAAAAAAAAAAAkAAAAJAAAAAAAAAAHAAAAAAAAAAAAAAAAAAAAAAAAAAAAAAAAAAAAf39/ACUAAABYAAAAAAAAAAAAAAAAAAAAAAAAAAAAAAAAAAAAAAAAAAAAAAAAAAAAAAAAAAAAAAA/AAAAAAAAAKCGAQAAAAAAAAAAAAAAAAAMAAAAAQAAAAAAAAAAAAAAAAAAAB8AAABUAAAAAAAABQAAAAEAAAAAAAAAAAAAAAAAAAAAAAAAAAAAAAAAAAAAAAAAAAAAAAJ/f38AAAAAA8zMzADAwP8Af39/AAAAAAAAAAAAAAAAAAAAAAAAAAAAIQAAABgAAAAUAAAAwAMAAGENAADjJAAAsCUAABAAAAAmAAAACAAAAAGAAAAAAAAA"/>
               </a:ext>
             </a:extLst>
           </p:cNvSpPr>
@@ -1714,7 +1715,7 @@
             <a:spLocks noGrp="1" noChangeArrowheads="1"/>
             <a:extLst>
               <a:ext uri="smNativeData">
-                <pr:smNativeData xmlns:pr="smNativeData" xmlns="smNativeData" val="SMDATA_15_ucsbZBMAAAAlAAAAZAAAAA8BAAAAkAAAAEgAAACQAAAASAAAAAAAAAACAAAAAAAAAAEAAABQAAAAAAAAAAAA4D8AAAAAAADgPwAAAAAAAOA/AAAAAAAA4D8AAAAAAADgPwAAAAAAAOA/AAAAAAAA4D8AAAAAAADgPwAAAAAAAOA/AAAAAAAA4D8CAAAAjAAAAAAAAAAAAAAAu+DjDP///wgAAAAAAAAAAAAAAAAAAAAAAAAAAAAAAAAAAAAAZAAAAAEAAABAAAAAAAAAAAAAAAAAAAAAAAAAAAAAAAAAAAAAAAAAAAAAAAAAAAAAAAAAAAAAAAAAAAAAAAAAAAAAAAAAAAAAAAAAAAAAAAAAAAAAAAAAAAAAAAAAAAAAFAAAADwAAAAAAAAAAAAAAAAAAAkUAAAAAQAAABQAAAAUAAAAFAAAAAEAAAAAAAAAZAAAAGQAAAAAAAAAZAAAAGQAAAAVAAAAYAAAAAAAAAAAAAAADwAAACADAAAAAAAAAAAAAAEAAACgMgAAVgcAAKr4//8BAAAAf39/AAEAAABkAAAAAAAAABQAAABAHwAAAAAAACYAAAAAAAAAwOD//wAAAAAmAAAAZAAAABYAAABMAAAAAAAAAAAAAAAEAAAAAAAAAAEAAACAgIAKAAAAACgAAAAoAAAAZAAAAGQAAAAAAAAAzMzMAAAAAABQAAAAUAAAAGQAAABkAAAAAAAAABcAAAAUAAAAAAAAAAAAAAD/fwAA/38AAAAAAAAJAAAABAAAANw7IAEeAAAAaAAAAAAAAAAAAAAAAAAAAAAAAAAAAAAAECcAABAnAAAAAAAAAAAAAAAAAAAAAAAAAAAAAAAAAAAAAAAAAAAAABQAAAAAAAAAwMD/AAAAAABkAAAAMgAAAAAAAABkAAAAAAAAAH9/fwAKAAAAIgAAABgAAAAAAAAAAAAAAAAAAAAAAAAAAAAAAAAAAAAkAAAAJAAAAAAAAAAHAAAAAAAAAAAAAAAAAAAAAAAAAAAAAAAAAAAAf39/ACUAAABYAAAAAAAAAAAAAAAAAAAAAAAAAAAAAAAAAAAAAAAAAAAAAAAAAAAAAAAAAAAAAAA/AAAAAAAAAKCGAQAAAAAAAAAAAAAAAAAMAAAAAQAAAAAAAAAAAAAAAAAAAB8AAABUAAAAAAAABQAAAAEAAAAAAAAAAAAAAAAAAAAAAAAAAAAAAAAAAAAAAAAAAAAAAAJ/f38AAAAAA8zMzADAwP8Af39/AAAAAAAAAAAAAAAAAAAAAAAAAAAAIQAAABgAAAAUAAAAHSYAAHEJAABARwAAYQ0AABAAAAAmAAAACAAAAIGAAAAAAAAA"/>
+                <pr:smNativeData xmlns:pr="smNativeData" xmlns="smNativeData" val="SMDATA_15_NygcZBMAAAAlAAAAZAAAAA8BAAAAkAAAAEgAAACQAAAASAAAAAAAAAACAAAAAAAAAAEAAABQAAAAAAAAAAAA4D8AAAAAAADgPwAAAAAAAOA/AAAAAAAA4D8AAAAAAADgPwAAAAAAAOA/AAAAAAAA4D8AAAAAAADgPwAAAAAAAOA/AAAAAAAA4D8CAAAAjAAAAAAAAAAAAAAAu+DjDP///wgAAAAAAAAAAAAAAAAAAAAAAAAAAAAAAAAAAAAAZAAAAAEAAABAAAAAAAAAAAAAAAAAAAAAAAAAAAAAAAAAAAAAAAAAAAAAAAAAAAAAAAAAAAAAAAAAAAAAAAAAAAAAAAAAAAAAAAAAAAAAAAAAAAAAAAAAAAAAAAAAAAAAFAAAADwAAAAAAAAAAAAAAAAAAAkUAAAAAQAAABQAAAAUAAAAFAAAAAEAAAAAAAAAZAAAAGQAAAAAAAAAZAAAAGQAAAAVAAAAYAAAAAAAAAAAAAAADwAAACADAAAAAAAAAAAAAAEAAACgMgAAVgcAAKr4//8BAAAAf39/AAEAAABkAAAAAAAAABQAAABAHwAAAAAAACYAAAAAAAAAwOD//wAAAAAmAAAAZAAAABYAAABMAAAAAAAAAAAAAAAEAAAAAAAAAAEAAACAgIAKAAAAACgAAAAoAAAAZAAAAGQAAAAAAAAAzMzMAAAAAABQAAAAUAAAAGQAAABkAAAAAAAAABcAAAAUAAAAAAAAAAAAAAD/fwAA/38AAAAAAAAJAAAABAAAANw7IAEeAAAAaAAAAAAAAAAAAAAAAAAAAAAAAAAAAAAAECcAABAnAAAAAAAAAAAAAAAAAAAAAAAAAAAAAAAAAAAAAAAAAAAAABQAAAAAAAAAwMD/AAAAAABkAAAAMgAAAAAAAABkAAAAAAAAAH9/fwAKAAAAIgAAABgAAAAAAAAAAAAAAAAAAAAAAAAAAAAAAAAAAAAkAAAAJAAAAAAAAAAHAAAAAAAAAAAAAAAAAAAAAAAAAAAAAAAAAAAAf39/ACUAAABYAAAAAAAAAAAAAAAAAAAAAAAAAAAAAAAAAAAAAAAAAAAAAAAAAAAAAAAAAAAAAAA/AAAAAAAAAKCGAQAAAAAAAAAAAAAAAAAMAAAAAQAAAAAAAAAAAAAAAAAAAB8AAABUAAAAAAAABQAAAAEAAAAAAAAAAAAAAAAAAAAAAAAAAAAAAAAAAAAAAAAAAAAAAAJ/f38AAAAAA8zMzADAwP8Af39/AAAAAAAAAAAAAAAAAAAAAAAAAAAAIQAAABgAAAAUAAAAHSYAAHEJAABARwAAYQ0AABAAAAAmAAAACAAAAIGAAAAAAAAA"/>
               </a:ext>
             </a:extLst>
           </p:cNvSpPr>
@@ -1787,7 +1788,7 @@
             <a:spLocks noGrp="1" noChangeArrowheads="1"/>
             <a:extLst>
               <a:ext uri="smNativeData">
-                <pr:smNativeData xmlns:pr="smNativeData" xmlns="smNativeData" val="SMDATA_15_ucsbZBMAAAAlAAAAZAAAAA8BAAAAkAAAAEgAAACQAAAASAAAAAAAAAAAAAAAAAAAAAEAAABQAAAAAAAAAAAA4D8AAAAAAADgPwAAAAAAAOA/AAAAAAAA4D8AAAAAAADgPwAAAAAAAOA/AAAAAAAA4D8AAAAAAADgPwAAAAAAAOA/AAAAAAAA4D8CAAAAjAAAAAAAAAAAAAAAu+DjDP///wgAAAAAAAAAAAAAAAAAAAAAAAAAAAAAAAAAAAAAZAAAAAEAAABAAAAAAAAAAAAAAAAAAAAAAAAAAAAAAAAAAAAAAAAAAAAAAAAAAAAAAAAAAAAAAAAAAAAAAAAAAAAAAAAAAAAAAAAAAAAAAAAAAAAAAAAAAAAAAAAAAAAAFAAAADwAAAAAAAAAAAAAAAAAAAkUAAAAAQAAABQAAAAUAAAAFAAAAAEAAAAAAAAAZAAAAGQAAAAAAAAAZAAAAGQAAAAVAAAAYAAAAAAAAAAAAAAADwAAACADAAAAAAAAAAAAAAEAAACgMgAAVgcAAKr4//8BAAAAf39/AAEAAABkAAAAAAAAABQAAABAHwAAAAAAACYAAAAAAAAAwOD//wAAAAAmAAAAZAAAABYAAABMAAAAAAAAAAAAAAAEAAAAAAAAAAEAAACAgIAKAAAAACgAAAAoAAAAZAAAAGQAAAAAAAAAzMzMAAAAAABQAAAAUAAAAGQAAABkAAAAAAAAABcAAAAUAAAAAAAAAAAAAAD/fwAA/38AAAAAAAAJAAAABAAAANw7IAEeAAAAaAAAAAAAAAAAAAAAAAAAAAAAAAAAAAAAECcAABAnAAAAAAAAAAAAAAAAAAAAAAAAAAAAAAAAAAAAAAAAAAAAABQAAAAAAAAAwMD/AAAAAABkAAAAMgAAAAAAAABkAAAAAAAAAH9/fwAKAAAAIgAAABgAAAAAAAAAAAAAAAAAAAAAAAAAAAAAAAAAAAAkAAAAJAAAAAAAAAAHAAAAAAAAAAAAAAAAAAAAAAAAAAAAAAAAAAAAf39/ACUAAABYAAAAAAAAAAAAAAAAAAAAAAAAAAAAAAAAAAAAAAAAAAAAAAAAAAAAAAAAAAAAAAA/AAAAAAAAAKCGAQAAAAAAAAAAAAAAAAAMAAAAAQAAAAAAAAAAAAAAAAAAAB8AAABUAAAAAAAABQAAAAEAAAAAAAAAAAAAAAAAAAAAAAAAAAAAAAAAAAAAAAAAAAAAAAJ/f38AAAAAA8zMzADAwP8Af39/AAAAAAAAAAAAAAAAAAAAAAAAAAAAIQAAABgAAAAUAAAAHSYAAGENAABARwAAsCUAABAAAAAmAAAACAAAAAGAAAAAAAAA"/>
+                <pr:smNativeData xmlns:pr="smNativeData" xmlns="smNativeData" val="SMDATA_15_NygcZBMAAAAlAAAAZAAAAA8BAAAAkAAAAEgAAACQAAAASAAAAAAAAAAAAAAAAAAAAAEAAABQAAAAAAAAAAAA4D8AAAAAAADgPwAAAAAAAOA/AAAAAAAA4D8AAAAAAADgPwAAAAAAAOA/AAAAAAAA4D8AAAAAAADgPwAAAAAAAOA/AAAAAAAA4D8CAAAAjAAAAAAAAAAAAAAAu+DjDP///wgAAAAAAAAAAAAAAAAAAAAAAAAAAAAAAAAAAAAAZAAAAAEAAABAAAAAAAAAAAAAAAAAAAAAAAAAAAAAAAAAAAAAAAAAAAAAAAAAAAAAAAAAAAAAAAAAAAAAAAAAAAAAAAAAAAAAAAAAAAAAAAAAAAAAAAAAAAAAAAAAAAAAFAAAADwAAAAAAAAAAAAAAAAAAAkUAAAAAQAAABQAAAAUAAAAFAAAAAEAAAAAAAAAZAAAAGQAAAAAAAAAZAAAAGQAAAAVAAAAYAAAAAAAAAAAAAAADwAAACADAAAAAAAAAAAAAAEAAACgMgAAVgcAAKr4//8BAAAAf39/AAEAAABkAAAAAAAAABQAAABAHwAAAAAAACYAAAAAAAAAwOD//wAAAAAmAAAAZAAAABYAAABMAAAAAAAAAAAAAAAEAAAAAAAAAAEAAACAgIAKAAAAACgAAAAoAAAAZAAAAGQAAAAAAAAAzMzMAAAAAABQAAAAUAAAAGQAAABkAAAAAAAAABcAAAAUAAAAAAAAAAAAAAD/fwAA/38AAAAAAAAJAAAABAAAANw7IAEeAAAAaAAAAAAAAAAAAAAAAAAAAAAAAAAAAAAAECcAABAnAAAAAAAAAAAAAAAAAAAAAAAAAAAAAAAAAAAAAAAAAAAAABQAAAAAAAAAwMD/AAAAAABkAAAAMgAAAAAAAABkAAAAAAAAAH9/fwAKAAAAIgAAABgAAAAAAAAAAAAAAAAAAAAAAAAAAAAAAAAAAAAkAAAAJAAAAAAAAAAHAAAAAAAAAAAAAAAAAAAAAAAAAAAAAAAAAAAAf39/ACUAAABYAAAAAAAAAAAAAAAAAAAAAAAAAAAAAAAAAAAAAAAAAAAAAAAAAAAAAAAAAAAAAAA/AAAAAAAAAKCGAQAAAAAAAAAAAAAAAAAMAAAAAQAAAAAAAAAAAAAAAAAAAB8AAABUAAAAAAAABQAAAAEAAAAAAAAAAAAAAAAAAAAAAAAAAAAAAAAAAAAAAAAAAAAAAAJ/f38AAAAAA8zMzADAwP8Af39/AAAAAAAAAAAAAAAAAAAAAAAAAAAAIQAAABgAAAAUAAAAHSYAAGENAABARwAAsCUAABAAAAAmAAAACAAAAAGAAAAAAAAA"/>
               </a:ext>
             </a:extLst>
           </p:cNvSpPr>
@@ -1871,7 +1872,7 @@
             <a:spLocks noGrp="1" noChangeArrowheads="1"/>
             <a:extLst>
               <a:ext uri="smNativeData">
-                <pr:smNativeData xmlns:pr="smNativeData" xmlns="smNativeData" val="SMDATA_15_ucsbZBMAAAAlAAAAZAAAAA8BAAAAkAAAAEgAAACQAAAASAAAAAAAAAABAAAAAAAAAAEAAABQAAAAAAAAAAAA4D8AAAAAAADgPwAAAAAAAOA/AAAAAAAA4D8AAAAAAADgPwAAAAAAAOA/AAAAAAAA4D8AAAAAAADgPwAAAAAAAOA/AAAAAAAA4D8CAAAAjAAAAAAAAAAAAAAAu+DjDP///wgAAAAAAAAAAAAAAAAAAAAAAAAAAAAAAAAAAAAAZAAAAAEAAABAAAAAAAAAAAAAAAAAAAAAAAAAAAAAAAAAAAAAAAAAAAAAAAAAAAAAAAAAAAAAAAAAAAAAAAAAAAAAAAAAAAAAAAAAAAAAAAAAAAAAAAAAAAAAAAAAAAAAFAAAADwAAAAAAAAAAAAAAAAAAAkUAAAAAQAAABQAAAAUAAAAFAAAAAEAAAAAAAAAZAAAAGQAAAAAAAAAZAAAAGQAAAAVAAAAYAAAAAAAAAAAAAAADwAAACADAAAAAAAAAAAAAAEAAACgMgAAVgcAAKr4//8BAAAAf39/AAEAAABkAAAAAAAAABQAAABAHwAAAAAAACYAAAAAAAAAwOD//wAAAAAmAAAAZAAAABYAAABMAAAAAAAAAAAAAAAEAAAAAAAAAAEAAACAgIAKAAAAACgAAAAoAAAAZAAAAGQAAAAAAAAAzMzMAAAAAABQAAAAUAAAAGQAAABkAAAAAAAAABcAAAAUAAAAAAAAAAAAAAD/fwAA/38AAAAAAAAJAAAABAAAANw7IAEeAAAAaAAAAAAAAAAAAAAAAAAAAAAAAAAAAAAAECcAABAnAAAAAAAAAAAAAAAAAAAAAAAAAAAAAAAAAAAAAAAAAAAAABQAAAAAAAAAwMD/AAAAAABkAAAAMgAAAAAAAABkAAAAAAAAAH9/fwAKAAAAIgAAABgAAAAAAAAAAAAAAAAAAAAAAAAAAAAAAAAAAAAkAAAAJAAAAAAAAAAHAAAAAAAAAAAAAAAAAAAAAAAAAAAAAAAAAAAAf39/ACUAAABYAAAAAAAAAAAAAAAAAAAAAAAAAAAAAAAAAAAAAAAAAAAAAAAAAAAAAAAAAAAAAAA/AAAAAAAAAKCGAQAAAAAAAAAAAAAAAAAMAAAAAQAAAAAAAAAAAAAAAAAAAB8AAABUAAAAAAAABQAAAAEAAAAAAAAAAAAAAAAAAAAAAAAAAAAAAAAAAAAAAAAAAAAAAAJ/f38AAAAAA8zMzADAwP8Af39/AAAAAAAAAAAAAAAAAAAAAAAAAAAAIQAAABgAAAAUAAAAwAMAABsnAAA/FQAAWSkAABAAAAAmAAAACAAAAAAAAAAAAAAA"/>
+                <pr:smNativeData xmlns:pr="smNativeData" xmlns="smNativeData" val="SMDATA_15_NygcZBMAAAAlAAAAZAAAAA8BAAAAkAAAAEgAAACQAAAASAAAAAAAAAABAAAAAAAAAAEAAABQAAAAAAAAAAAA4D8AAAAAAADgPwAAAAAAAOA/AAAAAAAA4D8AAAAAAADgPwAAAAAAAOA/AAAAAAAA4D8AAAAAAADgPwAAAAAAAOA/AAAAAAAA4D8CAAAAjAAAAAAAAAAAAAAAu+DjDP///wgAAAAAAAAAAAAAAAAAAAAAAAAAAAAAAAAAAAAAZAAAAAEAAABAAAAAAAAAAAAAAAAAAAAAAAAAAAAAAAAAAAAAAAAAAAAAAAAAAAAAAAAAAAAAAAAAAAAAAAAAAAAAAAAAAAAAAAAAAAAAAAAAAAAAAAAAAAAAAAAAAAAAFAAAADwAAAAAAAAAAAAAAAAAAAkUAAAAAQAAABQAAAAUAAAAFAAAAAEAAAAAAAAAZAAAAGQAAAAAAAAAZAAAAGQAAAAVAAAAYAAAAAAAAAAAAAAADwAAACADAAAAAAAAAAAAAAEAAACgMgAAVgcAAKr4//8BAAAAf39/AAEAAABkAAAAAAAAABQAAABAHwAAAAAAACYAAAAAAAAAwOD//wAAAAAmAAAAZAAAABYAAABMAAAAAAAAAAAAAAAEAAAAAAAAAAEAAACAgIAKAAAAACgAAAAoAAAAZAAAAGQAAAAAAAAAzMzMAAAAAABQAAAAUAAAAGQAAABkAAAAAAAAABcAAAAUAAAAAAAAAAAAAAD/fwAA/38AAAAAAAAJAAAABAAAANw7IAEeAAAAaAAAAAAAAAAAAAAAAAAAAAAAAAAAAAAAECcAABAnAAAAAAAAAAAAAAAAAAAAAAAAAAAAAAAAAAAAAAAAAAAAABQAAAAAAAAAwMD/AAAAAABkAAAAMgAAAAAAAABkAAAAAAAAAH9/fwAKAAAAIgAAABgAAAAAAAAAAAAAAAAAAAAAAAAAAAAAAAAAAAAkAAAAJAAAAAAAAAAHAAAAAAAAAAAAAAAAAAAAAAAAAAAAAAAAAAAAf39/ACUAAABYAAAAAAAAAAAAAAAAAAAAAAAAAAAAAAAAAAAAAAAAAAAAAAAAAAAAAAAAAAAAAAA/AAAAAAAAAKCGAQAAAAAAAAAAAAAAAAAMAAAAAQAAAAAAAAAAAAAAAAAAAB8AAABUAAAAAAAABQAAAAEAAAAAAAAAAAAAAAAAAAAAAAAAAAAAAAAAAAAAAAAAAAAAAAJ/f38AAAAAA8zMzADAwP8Af39/AAAAAAAAAAAAAAAAAAAAAAAAAAAAIQAAABgAAAAUAAAAwAMAABsnAAA/FQAAWSkAABAAAAAmAAAACAAAAAAAAAAAAAAA"/>
               </a:ext>
             </a:extLst>
           </p:cNvSpPr>
@@ -1885,7 +1886,7 @@
           <a:lstStyle/>
           <a:p>
             <a:pPr/>
-            <a:fld id="{3A26A2F7-B9D7-7354-999E-4F01ECD06F1A}" type="datetime1">
+            <a:fld id="{39DFD25A-14D4-8A24-9A67-E2719C296CB7}" type="datetime1">
               <a:t/>
             </a:fld>
           </a:p>
@@ -1898,7 +1899,7 @@
             <a:spLocks noGrp="1" noChangeArrowheads="1"/>
             <a:extLst>
               <a:ext uri="smNativeData">
-                <pr:smNativeData xmlns:pr="smNativeData" xmlns="smNativeData" val="SMDATA_15_ucsbZBMAAAAlAAAAZAAAAA8BAAAAkAAAAEgAAACQAAAASAAAAAAAAAABAAAAAAAAAAEAAABQAAAAAAAAAAAA4D8AAAAAAADgPwAAAAAAAOA/AAAAAAAA4D8AAAAAAADgPwAAAAAAAOA/AAAAAAAA4D8AAAAAAADgPwAAAAAAAOA/AAAAAAAA4D8CAAAAjAAAAAAAAAAAAAAAu+DjDP///wgAAAAAAAAAAAAAAAAAAAAAAAAAAAAAAAAAAAAAZAAAAAEAAABAAAAAAAAAAAAAAAAAAAAAAAAAAAAAAAAAAAAAAAAAAAAAAAAAAAAAAAAAAAAAAAAAAAAAAAAAAAAAAAAAAAAAAAAAAAAAAAAAAAAAAAAAAAAAAAAAAAAAFAAAADwAAAAAAAAAAAAAAAAAAAkUAAAAAQAAABQAAAAUAAAAFAAAAAEAAAAAAAAAZAAAAGQAAAAAAAAAZAAAAGQAAAAVAAAAYAAAAAAAAAAAAAAADwAAACADAAAAAAAAAAAAAAEAAACgMgAAVgcAAKr4//8BAAAAf39/AAEAAABkAAAAAAAAABQAAABAHwAAAAAAACYAAAAAAAAAwOD//wAAAAAmAAAAZAAAABYAAABMAAAAAAAAAAAAAAAEAAAAAAAAAAEAAACAgIAKAAAAACgAAAAoAAAAZAAAAGQAAAAAAAAAzMzMAAAAAABQAAAAUAAAAGQAAABkAAAAAAAAABcAAAAUAAAAAAAAAAAAAAD/fwAA/38AAAAAAAAJAAAABAAAANw7IAEeAAAAaAAAAAAAAAAAAAAAAAAAAAAAAAAAAAAAECcAABAnAAAAAAAAAAAAAAAAAAAAAAAAAAAAAAAAAAAAAAAAAAAAABQAAAAAAAAAwMD/AAAAAABkAAAAMgAAAAAAAABkAAAAAAAAAH9/fwAKAAAAIgAAABgAAAAAAAAAAAAAAAAAAAAAAAAAAAAAAAAAAAAkAAAAJAAAAAAAAAAHAAAAAAAAAAAAAAAAAAAAAAAAAAAAAAAAAAAAf39/ACUAAABYAAAAAAAAAAAAAAAAAAAAAAAAAAAAAAAAAAAAAAAAAAAAAAAAAAAAAAAAAAAAAAA/AAAAAAAAAKCGAQAAAAAAAAAAAAAAAAAMAAAAAQAAAAAAAAAAAAAAAAAAAB8AAABUAAAAAAAABQAAAAEAAAAAAAAAAAAAAAAAAAAAAAAAAAAAAAAAAAAAAAAAAAAAAAJ/f38AAAAAA8zMzADAwP8Af39/AAAAAAAAAAAAAAAAAAAAAAAAAAAAIQAAABgAAAAUAAAAoRkAABsnAABfMQAAWSkAABAAAAAmAAAACAAAAAAAAAAAAAAA"/>
+                <pr:smNativeData xmlns:pr="smNativeData" xmlns="smNativeData" val="SMDATA_15_NygcZBMAAAAlAAAAZAAAAA8BAAAAkAAAAEgAAACQAAAASAAAAAAAAAABAAAAAAAAAAEAAABQAAAAAAAAAAAA4D8AAAAAAADgPwAAAAAAAOA/AAAAAAAA4D8AAAAAAADgPwAAAAAAAOA/AAAAAAAA4D8AAAAAAADgPwAAAAAAAOA/AAAAAAAA4D8CAAAAjAAAAAAAAAAAAAAAu+DjDP///wgAAAAAAAAAAAAAAAAAAAAAAAAAAAAAAAAAAAAAZAAAAAEAAABAAAAAAAAAAAAAAAAAAAAAAAAAAAAAAAAAAAAAAAAAAAAAAAAAAAAAAAAAAAAAAAAAAAAAAAAAAAAAAAAAAAAAAAAAAAAAAAAAAAAAAAAAAAAAAAAAAAAAFAAAADwAAAAAAAAAAAAAAAAAAAkUAAAAAQAAABQAAAAUAAAAFAAAAAEAAAAAAAAAZAAAAGQAAAAAAAAAZAAAAGQAAAAVAAAAYAAAAAAAAAAAAAAADwAAACADAAAAAAAAAAAAAAEAAACgMgAAVgcAAKr4//8BAAAAf39/AAEAAABkAAAAAAAAABQAAABAHwAAAAAAACYAAAAAAAAAwOD//wAAAAAmAAAAZAAAABYAAABMAAAAAAAAAAAAAAAEAAAAAAAAAAEAAACAgIAKAAAAACgAAAAoAAAAZAAAAGQAAAAAAAAAzMzMAAAAAABQAAAAUAAAAGQAAABkAAAAAAAAABcAAAAUAAAAAAAAAAAAAAD/fwAA/38AAAAAAAAJAAAABAAAANw7IAEeAAAAaAAAAAAAAAAAAAAAAAAAAAAAAAAAAAAAECcAABAnAAAAAAAAAAAAAAAAAAAAAAAAAAAAAAAAAAAAAAAAAAAAABQAAAAAAAAAwMD/AAAAAABkAAAAMgAAAAAAAABkAAAAAAAAAH9/fwAKAAAAIgAAABgAAAAAAAAAAAAAAAAAAAAAAAAAAAAAAAAAAAAkAAAAJAAAAAAAAAAHAAAAAAAAAAAAAAAAAAAAAAAAAAAAAAAAAAAAf39/ACUAAABYAAAAAAAAAAAAAAAAAAAAAAAAAAAAAAAAAAAAAAAAAAAAAAAAAAAAAAAAAAAAAAA/AAAAAAAAAKCGAQAAAAAAAAAAAAAAAAAMAAAAAQAAAAAAAAAAAAAAAAAAAB8AAABUAAAAAAAABQAAAAEAAAAAAAAAAAAAAAAAAAAAAAAAAAAAAAAAAAAAAAAAAAAAAAJ/f38AAAAAA8zMzADAwP8Af39/AAAAAAAAAAAAAAAAAAAAAAAAAAAAIQAAABgAAAAUAAAAoRkAABsnAABfMQAAWSkAABAAAAAmAAAACAAAAAAAAAAAAAAA"/>
               </a:ext>
             </a:extLst>
           </p:cNvSpPr>
@@ -1925,7 +1926,7 @@
             <a:spLocks noGrp="1" noChangeArrowheads="1"/>
             <a:extLst>
               <a:ext uri="smNativeData">
-                <pr:smNativeData xmlns:pr="smNativeData" xmlns="smNativeData" val="SMDATA_15_ucsbZBMAAAAlAAAAZAAAAA8BAAAAkAAAAEgAAACQAAAASAAAAAAAAAABAAAAAAAAAAEAAABQAAAAAAAAAAAA4D8AAAAAAADgPwAAAAAAAOA/AAAAAAAA4D8AAAAAAADgPwAAAAAAAOA/AAAAAAAA4D8AAAAAAADgPwAAAAAAAOA/AAAAAAAA4D8CAAAAjAAAAAAAAAAAAAAAu+DjDP///wgAAAAAAAAAAAAAAAAAAAAAAAAAAAAAAAAAAAAAZAAAAAEAAABAAAAAAAAAAAAAAAAAAAAAAAAAAAAAAAAAAAAAAAAAAAAAAAAAAAAAAAAAAAAAAAAAAAAAAAAAAAAAAAAAAAAAAAAAAAAAAAAAAAAAAAAAAAAAAAAAAAAAFAAAADwAAAAAAAAAAAAAAAAAAAkUAAAAAQAAABQAAAAUAAAAFAAAAAEAAAAAAAAAZAAAAGQAAAAAAAAAZAAAAGQAAAAVAAAAYAAAAAAAAAAAAAAADwAAACADAAAAAAAAAAAAAAEAAACgMgAAVgcAAKr4//8BAAAAf39/AAEAAABkAAAAAAAAABQAAABAHwAAAAAAACYAAAAAAAAAwOD//wAAAAAmAAAAZAAAABYAAABMAAAAAAAAAAAAAAAEAAAAAAAAAAEAAACAgIAKAAAAACgAAAAoAAAAZAAAAGQAAAAAAAAAzMzMAAAAAABQAAAAUAAAAGQAAABkAAAAAAAAABcAAAAUAAAAAAAAAAAAAAD/fwAA/38AAAAAAAAJAAAABAAAANw7IAEeAAAAaAAAAAAAAAAAAAAAAAAAAAAAAAAAAAAAECcAABAnAAAAAAAAAAAAAAAAAAAAAAAAAAAAAAAAAAAAAAAAAAAAABQAAAAAAAAAwMD/AAAAAABkAAAAMgAAAAAAAABkAAAAAAAAAH9/fwAKAAAAIgAAABgAAAAAAAAAAAAAAAAAAAAAAAAAAAAAAAAAAAAkAAAAJAAAAAAAAAAHAAAAAAAAAAAAAAAAAAAAAAAAAAAAAAAAAAAAf39/ACUAAABYAAAAAAAAAAAAAAAAAAAAAAAAAAAAAAAAAAAAAAAAAAAAAAAAAAAAAAAAAAAAAAA/AAAAAAAAAKCGAQAAAAAAAAAAAAAAAAAMAAAAAQAAAAAAAAAAAAAAAAAAAB8AAABUAAAAAAAABQAAAAEAAAAAAAAAAAAAAAAAAAAAAAAAAAAAAAAAAAAAAAAAAAAAAAJ/f38AAAAAA8zMzADAwP8Af39/AAAAAAAAAAAAAAAAAAAAAAAAAAAAIQAAABgAAAAUAAAAwTUAABsnAABARwAAWSkAABAAAAAmAAAACAAAAAAAAAAAAAAA"/>
+                <pr:smNativeData xmlns:pr="smNativeData" xmlns="smNativeData" val="SMDATA_15_NygcZBMAAAAlAAAAZAAAAA8BAAAAkAAAAEgAAACQAAAASAAAAAAAAAABAAAAAAAAAAEAAABQAAAAAAAAAAAA4D8AAAAAAADgPwAAAAAAAOA/AAAAAAAA4D8AAAAAAADgPwAAAAAAAOA/AAAAAAAA4D8AAAAAAADgPwAAAAAAAOA/AAAAAAAA4D8CAAAAjAAAAAAAAAAAAAAAu+DjDP///wgAAAAAAAAAAAAAAAAAAAAAAAAAAAAAAAAAAAAAZAAAAAEAAABAAAAAAAAAAAAAAAAAAAAAAAAAAAAAAAAAAAAAAAAAAAAAAAAAAAAAAAAAAAAAAAAAAAAAAAAAAAAAAAAAAAAAAAAAAAAAAAAAAAAAAAAAAAAAAAAAAAAAFAAAADwAAAAAAAAAAAAAAAAAAAkUAAAAAQAAABQAAAAUAAAAFAAAAAEAAAAAAAAAZAAAAGQAAAAAAAAAZAAAAGQAAAAVAAAAYAAAAAAAAAAAAAAADwAAACADAAAAAAAAAAAAAAEAAACgMgAAVgcAAKr4//8BAAAAf39/AAEAAABkAAAAAAAAABQAAABAHwAAAAAAACYAAAAAAAAAwOD//wAAAAAmAAAAZAAAABYAAABMAAAAAAAAAAAAAAAEAAAAAAAAAAEAAACAgIAKAAAAACgAAAAoAAAAZAAAAGQAAAAAAAAAzMzMAAAAAABQAAAAUAAAAGQAAABkAAAAAAAAABcAAAAUAAAAAAAAAAAAAAD/fwAA/38AAAAAAAAJAAAABAAAANw7IAEeAAAAaAAAAAAAAAAAAAAAAAAAAAAAAAAAAAAAECcAABAnAAAAAAAAAAAAAAAAAAAAAAAAAAAAAAAAAAAAAAAAAAAAABQAAAAAAAAAwMD/AAAAAABkAAAAMgAAAAAAAABkAAAAAAAAAH9/fwAKAAAAIgAAABgAAAAAAAAAAAAAAAAAAAAAAAAAAAAAAAAAAAAkAAAAJAAAAAAAAAAHAAAAAAAAAAAAAAAAAAAAAAAAAAAAAAAAAAAAf39/ACUAAABYAAAAAAAAAAAAAAAAAAAAAAAAAAAAAAAAAAAAAAAAAAAAAAAAAAAAAAAAAAAAAAA/AAAAAAAAAKCGAQAAAAAAAAAAAAAAAAAMAAAAAQAAAAAAAAAAAAAAAAAAAB8AAABUAAAAAAAABQAAAAEAAAAAAAAAAAAAAAAAAAAAAAAAAAAAAAAAAAAAAAAAAAAAAAJ/f38AAAAAA8zMzADAwP8Af39/AAAAAAAAAAAAAAAAAAAAAAAAAAAAIQAAABgAAAAUAAAAwTUAABsnAABARwAAWSkAABAAAAAmAAAACAAAAAAAAAAAAAAA"/>
               </a:ext>
             </a:extLst>
           </p:cNvSpPr>
@@ -1939,7 +1940,7 @@
           <a:lstStyle/>
           <a:p>
             <a:pPr/>
-            <a:fld id="{3A26DBB1-FFD7-732D-999E-097895D06F5C}" type="slidenum">
+            <a:fld id="{39DFBE25-6BD4-8A48-9A67-9D1DF0296CC8}" type="slidenum">
               <a:t/>
             </a:fld>
           </a:p>
@@ -1977,7 +1978,7 @@
             <a:spLocks noGrp="1" noChangeArrowheads="1"/>
             <a:extLst>
               <a:ext uri="smNativeData">
-                <pr:smNativeData xmlns:pr="smNativeData" xmlns="smNativeData" val="SMDATA_15_ucsbZBMAAAAlAAAAZAAAAA8BAAAAkAAAAEgAAACQAAAASAAAAAAAAAABAAAAAAAAAAEAAABQAAAAAAAAAAAA4D8AAAAAAADgPwAAAAAAAOA/AAAAAAAA4D8AAAAAAADgPwAAAAAAAOA/AAAAAAAA4D8AAAAAAADgPwAAAAAAAOA/AAAAAAAA4D8CAAAAjAAAAAAAAAAAAAAAu+DjDP///wgAAAAAAAAAAAAAAAAAAAAAAAAAAAAAAAAAAAAAZAAAAAEAAABAAAAAAAAAAAAAAAAAAAAAAAAAAAAAAAAAAAAAAAAAAAAAAAAAAAAAAAAAAAAAAAAAAAAAAAAAAAAAAAAAAAAAAAAAAAAAAAAAAAAAAAAAAAAAAAAAAAAAFAAAADwAAAAAAAAAAAAAAAAAAAkUAAAAAQAAABQAAAAUAAAAFAAAAAEAAAAAAAAAZAAAAGQAAAAAAAAAZAAAAGQAAAAVAAAAYAAAAAAAAAAAAAAADwAAACADAAAAAAAAAAAAAAEAAACgMgAAVgcAAKr4//8BAAAAf39/AAEAAABkAAAAAAAAABQAAABAHwAAAAAAACYAAAAAAAAAwOD//wAAAAAmAAAAZAAAABYAAABMAAAAAAAAAAAAAAAEAAAAAAAAAAEAAACAgIAKAAAAACgAAAAoAAAAZAAAAGQAAAAAAAAAzMzMAAAAAABQAAAAUAAAAGQAAABkAAAAAAAAABcAAAAUAAAAAAAAAAAAAAD/fwAA/38AAAAAAAAJAAAABAAAANw7IAEeAAAAaAAAAAAAAAAAAAAAAAAAAAAAAAAAAAAAECcAABAnAAAAAAAAAAAAAAAAAAAAAAAAAAAAAAAAAAAAAAAAAAAAABQAAAAAAAAAwMD/AAAAAABkAAAAMgAAAAAAAABkAAAAAAAAAH9/fwAKAAAAIgAAABgAAAAAAAAAAAAAAAAAAAAAAAAAAAAAAAAAAAAkAAAAJAAAAAAAAAAHAAAAAAAAAAAAAAAAAAAAAAAAAAAAAAAAAAAAf39/ACUAAABYAAAAAAAAAAAAAAAAAAAAAAAAAAAAAAAAAAAAAAAAAAAAAAAAAAAAAAAAAAAAAAA/AAAAAAAAAKCGAQAAAAAAAAAAAAAAAAAMAAAAAQAAAAAAAAAAAAAAAAAAAB8AAABUAAAAAAAABQAAAAEAAAAAAAAAAAAAAAAAAAAAAAAAAAAAAAAAAAAAAAAAAAAAAAJ/f38AAAAAA8zMzADAwP8Af39/AAAAAAAAAAAAAAAAAAAAAAAAAAAAIQAAABgAAAAUAAAAwAMAALABAABARwAAuAgAABAAAAAmAAAACAAAAAAAAAAAAAAA"/>
+                <pr:smNativeData xmlns:pr="smNativeData" xmlns="smNativeData" val="SMDATA_15_NygcZBMAAAAlAAAAZAAAAA8BAAAAkAAAAEgAAACQAAAASAAAAAAAAAABAAAAAAAAAAEAAABQAAAAAAAAAAAA4D8AAAAAAADgPwAAAAAAAOA/AAAAAAAA4D8AAAAAAADgPwAAAAAAAOA/AAAAAAAA4D8AAAAAAADgPwAAAAAAAOA/AAAAAAAA4D8CAAAAjAAAAAAAAAAAAAAAu+DjDP///wgAAAAAAAAAAAAAAAAAAAAAAAAAAAAAAAAAAAAAZAAAAAEAAABAAAAAAAAAAAAAAAAAAAAAAAAAAAAAAAAAAAAAAAAAAAAAAAAAAAAAAAAAAAAAAAAAAAAAAAAAAAAAAAAAAAAAAAAAAAAAAAAAAAAAAAAAAAAAAAAAAAAAFAAAADwAAAAAAAAAAAAAAAAAAAkUAAAAAQAAABQAAAAUAAAAFAAAAAEAAAAAAAAAZAAAAGQAAAAAAAAAZAAAAGQAAAAVAAAAYAAAAAAAAAAAAAAADwAAACADAAAAAAAAAAAAAAEAAACgMgAAVgcAAKr4//8BAAAAf39/AAEAAABkAAAAAAAAABQAAABAHwAAAAAAACYAAAAAAAAAwOD//wAAAAAmAAAAZAAAABYAAABMAAAAAAAAAAAAAAAEAAAAAAAAAAEAAACAgIAKAAAAACgAAAAoAAAAZAAAAGQAAAAAAAAAzMzMAAAAAABQAAAAUAAAAGQAAABkAAAAAAAAABcAAAAUAAAAAAAAAAAAAAD/fwAA/38AAAAAAAAJAAAABAAAANw7IAEeAAAAaAAAAAAAAAAAAAAAAAAAAAAAAAAAAAAAECcAABAnAAAAAAAAAAAAAAAAAAAAAAAAAAAAAAAAAAAAAAAAAAAAABQAAAAAAAAAwMD/AAAAAABkAAAAMgAAAAAAAABkAAAAAAAAAH9/fwAKAAAAIgAAABgAAAAAAAAAAAAAAAAAAAAAAAAAAAAAAAAAAAAkAAAAJAAAAAAAAAAHAAAAAAAAAAAAAAAAAAAAAAAAAAAAAAAAAAAAf39/ACUAAABYAAAAAAAAAAAAAAAAAAAAAAAAAAAAAAAAAAAAAAAAAAAAAAAAAAAAAAAAAAAAAAA/AAAAAAAAAKCGAQAAAAAAAAAAAAAAAAAMAAAAAQAAAAAAAAAAAAAAAAAAAB8AAABUAAAAAAAABQAAAAEAAAAAAAAAAAAAAAAAAAAAAAAAAAAAAAAAAAAAAAAAAAAAAAJ/f38AAAAAA8zMzADAwP8Af39/AAAAAAAAAAAAAAAAAAAAAAAAAAAAIQAAABgAAAAUAAAAwAMAALABAABARwAAuAgAABAAAAAmAAAACAAAAAAAAAAAAAAA"/>
               </a:ext>
             </a:extLst>
           </p:cNvSpPr>
@@ -2004,7 +2005,7 @@
             <a:spLocks noGrp="1" noChangeArrowheads="1"/>
             <a:extLst>
               <a:ext uri="smNativeData">
-                <pr:smNativeData xmlns:pr="smNativeData" xmlns="smNativeData" val="SMDATA_15_ucsbZBMAAAAlAAAAZAAAAA8BAAAAkAAAAEgAAACQAAAASAAAAAAAAAABAAAAAAAAAAEAAABQAAAAAAAAAAAA4D8AAAAAAADgPwAAAAAAAOA/AAAAAAAA4D8AAAAAAADgPwAAAAAAAOA/AAAAAAAA4D8AAAAAAADgPwAAAAAAAOA/AAAAAAAA4D8CAAAAjAAAAAAAAAAAAAAAu+DjDP///wgAAAAAAAAAAAAAAAAAAAAAAAAAAAAAAAAAAAAAZAAAAAEAAABAAAAAAAAAAAAAAAAAAAAAAAAAAAAAAAAAAAAAAAAAAAAAAAAAAAAAAAAAAAAAAAAAAAAAAAAAAAAAAAAAAAAAAAAAAAAAAAAAAAAAAAAAAAAAAAAAAAAAFAAAADwAAAAAAAAAAAAAAAAAAAkUAAAAAQAAABQAAAAUAAAAFAAAAAEAAAAAAAAAZAAAAGQAAAAAAAAAZAAAAGQAAAAVAAAAYAAAAAAAAAAAAAAADwAAACADAAAAAAAAAAAAAAEAAACgMgAAVgcAAKr4//8BAAAAf39/AAEAAABkAAAAAAAAABQAAABAHwAAAAAAACYAAAAAAAAAwOD//wAAAAAmAAAAZAAAABYAAABMAAAAAAAAAAAAAAAEAAAAAAAAAAEAAACAgIAKAAAAACgAAAAoAAAAZAAAAGQAAAAAAAAAzMzMAAAAAABQAAAAUAAAAGQAAABkAAAAAAAAABcAAAAUAAAAAAAAAAAAAAD/fwAA/38AAAAAAAAJAAAABAAAANw7IAEeAAAAaAAAAAAAAAAAAAAAAAAAAAAAAAAAAAAAECcAABAnAAAAAAAAAAAAAAAAAAAAAAAAAAAAAAAAAAAAAAAAAAAAABQAAAAAAAAAwMD/AAAAAABkAAAAMgAAAAAAAABkAAAAAAAAAH9/fwAKAAAAIgAAABgAAAAAAAAAAAAAAAAAAAAAAAAAAAAAAAAAAAAkAAAAJAAAAAAAAAAHAAAAAAAAAAAAAAAAAAAAAAAAAAAAAAAAAAAAf39/ACUAAABYAAAAAAAAAAAAAAAAAAAAAAAAAAAAAAAAAAAAAAAAAAAAAAAAAAAAAAAAAAAAAAA/AAAAAAAAAKCGAQAAAAAAAAAAAAAAAAAMAAAAAQAAAAAAAAAAAAAAAAAAAB8AAABUAAAAAAAABQAAAAEAAAAAAAAAAAAAAAAAAAAAAAAAAAAAAAAAAAAAAAAAAAAAAAJ/f38AAAAAA8zMzADAwP8Af39/AAAAAAAAAAAAAAAAAAAAAAAAAAAAIQAAABgAAAAUAAAAwAMAABsnAAA/FQAAWSkAABAAAAAmAAAACAAAAAAAAAAAAAAA"/>
+                <pr:smNativeData xmlns:pr="smNativeData" xmlns="smNativeData" val="SMDATA_15_NygcZBMAAAAlAAAAZAAAAA8BAAAAkAAAAEgAAACQAAAASAAAAAAAAAABAAAAAAAAAAEAAABQAAAAAAAAAAAA4D8AAAAAAADgPwAAAAAAAOA/AAAAAAAA4D8AAAAAAADgPwAAAAAAAOA/AAAAAAAA4D8AAAAAAADgPwAAAAAAAOA/AAAAAAAA4D8CAAAAjAAAAAAAAAAAAAAAu+DjDP///wgAAAAAAAAAAAAAAAAAAAAAAAAAAAAAAAAAAAAAZAAAAAEAAABAAAAAAAAAAAAAAAAAAAAAAAAAAAAAAAAAAAAAAAAAAAAAAAAAAAAAAAAAAAAAAAAAAAAAAAAAAAAAAAAAAAAAAAAAAAAAAAAAAAAAAAAAAAAAAAAAAAAAFAAAADwAAAAAAAAAAAAAAAAAAAkUAAAAAQAAABQAAAAUAAAAFAAAAAEAAAAAAAAAZAAAAGQAAAAAAAAAZAAAAGQAAAAVAAAAYAAAAAAAAAAAAAAADwAAACADAAAAAAAAAAAAAAEAAACgMgAAVgcAAKr4//8BAAAAf39/AAEAAABkAAAAAAAAABQAAABAHwAAAAAAACYAAAAAAAAAwOD//wAAAAAmAAAAZAAAABYAAABMAAAAAAAAAAAAAAAEAAAAAAAAAAEAAACAgIAKAAAAACgAAAAoAAAAZAAAAGQAAAAAAAAAzMzMAAAAAABQAAAAUAAAAGQAAABkAAAAAAAAABcAAAAUAAAAAAAAAAAAAAD/fwAA/38AAAAAAAAJAAAABAAAANw7IAEeAAAAaAAAAAAAAAAAAAAAAAAAAAAAAAAAAAAAECcAABAnAAAAAAAAAAAAAAAAAAAAAAAAAAAAAAAAAAAAAAAAAAAAABQAAAAAAAAAwMD/AAAAAABkAAAAMgAAAAAAAABkAAAAAAAAAH9/fwAKAAAAIgAAABgAAAAAAAAAAAAAAAAAAAAAAAAAAAAAAAAAAAAkAAAAJAAAAAAAAAAHAAAAAAAAAAAAAAAAAAAAAAAAAAAAAAAAAAAAf39/ACUAAABYAAAAAAAAAAAAAAAAAAAAAAAAAAAAAAAAAAAAAAAAAAAAAAAAAAAAAAAAAAAAAAA/AAAAAAAAAKCGAQAAAAAAAAAAAAAAAAAMAAAAAQAAAAAAAAAAAAAAAAAAAB8AAABUAAAAAAAABQAAAAEAAAAAAAAAAAAAAAAAAAAAAAAAAAAAAAAAAAAAAAAAAAAAAAJ/f38AAAAAA8zMzADAwP8Af39/AAAAAAAAAAAAAAAAAAAAAAAAAAAAIQAAABgAAAAUAAAAwAMAABsnAAA/FQAAWSkAABAAAAAmAAAACAAAAAAAAAAAAAAA"/>
               </a:ext>
             </a:extLst>
           </p:cNvSpPr>
@@ -2018,7 +2019,7 @@
           <a:lstStyle/>
           <a:p>
             <a:pPr/>
-            <a:fld id="{3A26EAE0-AED7-731C-999E-5849A4D06F0D}" type="datetime1">
+            <a:fld id="{39DFE1E0-AED4-8A17-9A67-5842AF296C0D}" type="datetime1">
               <a:t/>
             </a:fld>
           </a:p>
@@ -2031,7 +2032,7 @@
             <a:spLocks noGrp="1" noChangeArrowheads="1"/>
             <a:extLst>
               <a:ext uri="smNativeData">
-                <pr:smNativeData xmlns:pr="smNativeData" xmlns="smNativeData" val="SMDATA_15_ucsbZBMAAAAlAAAAZAAAAA8BAAAAkAAAAEgAAACQAAAASAAAAAAAAAABAAAAAAAAAAEAAABQAAAAAAAAAAAA4D8AAAAAAADgPwAAAAAAAOA/AAAAAAAA4D8AAAAAAADgPwAAAAAAAOA/AAAAAAAA4D8AAAAAAADgPwAAAAAAAOA/AAAAAAAA4D8CAAAAjAAAAAAAAAAAAAAAu+DjDP///wgAAAAAAAAAAAAAAAAAAAAAAAAAAAAAAAAAAAAAZAAAAAEAAABAAAAAAAAAAAAAAAAAAAAAAAAAAAAAAAAAAAAAAAAAAAAAAAAAAAAAAAAAAAAAAAAAAAAAAAAAAAAAAAAAAAAAAAAAAAAAAAAAAAAAAAAAAAAAAAAAAAAAFAAAADwAAAAAAAAAAAAAAAAAAAkUAAAAAQAAABQAAAAUAAAAFAAAAAEAAAAAAAAAZAAAAGQAAAAAAAAAZAAAAGQAAAAVAAAAYAAAAAAAAAAAAAAADwAAACADAAAAAAAAAAAAAAEAAACgMgAAVgcAAKr4//8BAAAAf39/AAEAAABkAAAAAAAAABQAAABAHwAAAAAAACYAAAAAAAAAwOD//wAAAAAmAAAAZAAAABYAAABMAAAAAAAAAAAAAAAEAAAAAAAAAAEAAACAgIAKAAAAACgAAAAoAAAAZAAAAGQAAAAAAAAAzMzMAAAAAABQAAAAUAAAAGQAAABkAAAAAAAAABcAAAAUAAAAAAAAAAAAAAD/fwAA/38AAAAAAAAJAAAABAAAANw7IAEeAAAAaAAAAAAAAAAAAAAAAAAAAAAAAAAAAAAAECcAABAnAAAAAAAAAAAAAAAAAAAAAAAAAAAAAAAAAAAAAAAAAAAAABQAAAAAAAAAwMD/AAAAAABkAAAAMgAAAAAAAABkAAAAAAAAAH9/fwAKAAAAIgAAABgAAAAAAAAAAAAAAAAAAAAAAAAAAAAAAAAAAAAkAAAAJAAAAAAAAAAHAAAAAAAAAAAAAAAAAAAAAAAAAAAAAAAAAAAAf39/ACUAAABYAAAAAAAAAAAAAAAAAAAAAAAAAAAAAAAAAAAAAAAAAAAAAAAAAAAAAAAAAAAAAAA/AAAAAAAAAKCGAQAAAAAAAAAAAAAAAAAMAAAAAQAAAAAAAAAAAAAAAAAAAB8AAABUAAAAAAAABQAAAAEAAAAAAAAAAAAAAAAAAAAAAAAAAAAAAAAAAAAAAAAAAAAAAAJ/f38AAAAAA8zMzADAwP8Af39/AAAAAAAAAAAAAAAAAAAAAAAAAAAAIQAAABgAAAAUAAAAoRkAABsnAABfMQAAWSkAABAAAAAmAAAACAAAAAAAAAAAAAAA"/>
+                <pr:smNativeData xmlns:pr="smNativeData" xmlns="smNativeData" val="SMDATA_15_NygcZBMAAAAlAAAAZAAAAA8BAAAAkAAAAEgAAACQAAAASAAAAAAAAAABAAAAAAAAAAEAAABQAAAAAAAAAAAA4D8AAAAAAADgPwAAAAAAAOA/AAAAAAAA4D8AAAAAAADgPwAAAAAAAOA/AAAAAAAA4D8AAAAAAADgPwAAAAAAAOA/AAAAAAAA4D8CAAAAjAAAAAAAAAAAAAAAu+DjDP///wgAAAAAAAAAAAAAAAAAAAAAAAAAAAAAAAAAAAAAZAAAAAEAAABAAAAAAAAAAAAAAAAAAAAAAAAAAAAAAAAAAAAAAAAAAAAAAAAAAAAAAAAAAAAAAAAAAAAAAAAAAAAAAAAAAAAAAAAAAAAAAAAAAAAAAAAAAAAAAAAAAAAAFAAAADwAAAAAAAAAAAAAAAAAAAkUAAAAAQAAABQAAAAUAAAAFAAAAAEAAAAAAAAAZAAAAGQAAAAAAAAAZAAAAGQAAAAVAAAAYAAAAAAAAAAAAAAADwAAACADAAAAAAAAAAAAAAEAAACgMgAAVgcAAKr4//8BAAAAf39/AAEAAABkAAAAAAAAABQAAABAHwAAAAAAACYAAAAAAAAAwOD//wAAAAAmAAAAZAAAABYAAABMAAAAAAAAAAAAAAAEAAAAAAAAAAEAAACAgIAKAAAAACgAAAAoAAAAZAAAAGQAAAAAAAAAzMzMAAAAAABQAAAAUAAAAGQAAABkAAAAAAAAABcAAAAUAAAAAAAAAAAAAAD/fwAA/38AAAAAAAAJAAAABAAAANw7IAEeAAAAaAAAAAAAAAAAAAAAAAAAAAAAAAAAAAAAECcAABAnAAAAAAAAAAAAAAAAAAAAAAAAAAAAAAAAAAAAAAAAAAAAABQAAAAAAAAAwMD/AAAAAABkAAAAMgAAAAAAAABkAAAAAAAAAH9/fwAKAAAAIgAAABgAAAAAAAAAAAAAAAAAAAAAAAAAAAAAAAAAAAAkAAAAJAAAAAAAAAAHAAAAAAAAAAAAAAAAAAAAAAAAAAAAAAAAAAAAf39/ACUAAABYAAAAAAAAAAAAAAAAAAAAAAAAAAAAAAAAAAAAAAAAAAAAAAAAAAAAAAAAAAAAAAA/AAAAAAAAAKCGAQAAAAAAAAAAAAAAAAAMAAAAAQAAAAAAAAAAAAAAAAAAAB8AAABUAAAAAAAABQAAAAEAAAAAAAAAAAAAAAAAAAAAAAAAAAAAAAAAAAAAAAAAAAAAAAJ/f38AAAAAA8zMzADAwP8Af39/AAAAAAAAAAAAAAAAAAAAAAAAAAAAIQAAABgAAAAUAAAAoRkAABsnAABfMQAAWSkAABAAAAAmAAAACAAAAAAAAAAAAAAA"/>
               </a:ext>
             </a:extLst>
           </p:cNvSpPr>
@@ -2058,7 +2059,7 @@
             <a:spLocks noGrp="1" noChangeArrowheads="1"/>
             <a:extLst>
               <a:ext uri="smNativeData">
-                <pr:smNativeData xmlns:pr="smNativeData" xmlns="smNativeData" val="SMDATA_15_ucsbZBMAAAAlAAAAZAAAAA8BAAAAkAAAAEgAAACQAAAASAAAAAAAAAABAAAAAAAAAAEAAABQAAAAAAAAAAAA4D8AAAAAAADgPwAAAAAAAOA/AAAAAAAA4D8AAAAAAADgPwAAAAAAAOA/AAAAAAAA4D8AAAAAAADgPwAAAAAAAOA/AAAAAAAA4D8CAAAAjAAAAAAAAAAAAAAAu+DjDP///wgAAAAAAAAAAAAAAAAAAAAAAAAAAAAAAAAAAAAAZAAAAAEAAABAAAAAAAAAAAAAAAAAAAAAAAAAAAAAAAAAAAAAAAAAAAAAAAAAAAAAAAAAAAAAAAAAAAAAAAAAAAAAAAAAAAAAAAAAAAAAAAAAAAAAAAAAAAAAAAAAAAAAFAAAADwAAAAAAAAAAAAAAAAAAAkUAAAAAQAAABQAAAAUAAAAFAAAAAEAAAAAAAAAZAAAAGQAAAAAAAAAZAAAAGQAAAAVAAAAYAAAAAAAAAAAAAAADwAAACADAAAAAAAAAAAAAAEAAACgMgAAVgcAAKr4//8BAAAAf39/AAEAAABkAAAAAAAAABQAAABAHwAAAAAAACYAAAAAAAAAwOD//wAAAAAmAAAAZAAAABYAAABMAAAAAAAAAAAAAAAEAAAAAAAAAAEAAACAgIAKAAAAACgAAAAoAAAAZAAAAGQAAAAAAAAAzMzMAAAAAABQAAAAUAAAAGQAAABkAAAAAAAAABcAAAAUAAAAAAAAAAAAAAD/fwAA/38AAAAAAAAJAAAABAAAANw7IAEeAAAAaAAAAAAAAAAAAAAAAAAAAAAAAAAAAAAAECcAABAnAAAAAAAAAAAAAAAAAAAAAAAAAAAAAAAAAAAAAAAAAAAAABQAAAAAAAAAwMD/AAAAAABkAAAAMgAAAAAAAABkAAAAAAAAAH9/fwAKAAAAIgAAABgAAAAAAAAAAAAAAAAAAAAAAAAAAAAAAAAAAAAkAAAAJAAAAAAAAAAHAAAAAAAAAAAAAAAAAAAAAAAAAAAAAAAAAAAAf39/ACUAAABYAAAAAAAAAAAAAAAAAAAAAAAAAAAAAAAAAAAAAAAAAAAAAAAAAAAAAAAAAAAAAAA/AAAAAAAAAKCGAQAAAAAAAAAAAAAAAAAMAAAAAQAAAAAAAAAAAAAAAAAAAB8AAABUAAAAAAAABQAAAAEAAAAAAAAAAAAAAAAAAAAAAAAAAAAAAAAAAAAAAAAAAAAAAAJ/f38AAAAAA8zMzADAwP8Af39/AAAAAAAAAAAAAAAAAAAAAAAAAAAAIQAAABgAAAAUAAAAwTUAABsnAABARwAAWSkAABAAAAAmAAAACAAAAAAAAAAAAAAA"/>
+                <pr:smNativeData xmlns:pr="smNativeData" xmlns="smNativeData" val="SMDATA_15_NygcZBMAAAAlAAAAZAAAAA8BAAAAkAAAAEgAAACQAAAASAAAAAAAAAABAAAAAAAAAAEAAABQAAAAAAAAAAAA4D8AAAAAAADgPwAAAAAAAOA/AAAAAAAA4D8AAAAAAADgPwAAAAAAAOA/AAAAAAAA4D8AAAAAAADgPwAAAAAAAOA/AAAAAAAA4D8CAAAAjAAAAAAAAAAAAAAAu+DjDP///wgAAAAAAAAAAAAAAAAAAAAAAAAAAAAAAAAAAAAAZAAAAAEAAABAAAAAAAAAAAAAAAAAAAAAAAAAAAAAAAAAAAAAAAAAAAAAAAAAAAAAAAAAAAAAAAAAAAAAAAAAAAAAAAAAAAAAAAAAAAAAAAAAAAAAAAAAAAAAAAAAAAAAFAAAADwAAAAAAAAAAAAAAAAAAAkUAAAAAQAAABQAAAAUAAAAFAAAAAEAAAAAAAAAZAAAAGQAAAAAAAAAZAAAAGQAAAAVAAAAYAAAAAAAAAAAAAAADwAAACADAAAAAAAAAAAAAAEAAACgMgAAVgcAAKr4//8BAAAAf39/AAEAAABkAAAAAAAAABQAAABAHwAAAAAAACYAAAAAAAAAwOD//wAAAAAmAAAAZAAAABYAAABMAAAAAAAAAAAAAAAEAAAAAAAAAAEAAACAgIAKAAAAACgAAAAoAAAAZAAAAGQAAAAAAAAAzMzMAAAAAABQAAAAUAAAAGQAAABkAAAAAAAAABcAAAAUAAAAAAAAAAAAAAD/fwAA/38AAAAAAAAJAAAABAAAANw7IAEeAAAAaAAAAAAAAAAAAAAAAAAAAAAAAAAAAAAAECcAABAnAAAAAAAAAAAAAAAAAAAAAAAAAAAAAAAAAAAAAAAAAAAAABQAAAAAAAAAwMD/AAAAAABkAAAAMgAAAAAAAABkAAAAAAAAAH9/fwAKAAAAIgAAABgAAAAAAAAAAAAAAAAAAAAAAAAAAAAAAAAAAAAkAAAAJAAAAAAAAAAHAAAAAAAAAAAAAAAAAAAAAAAAAAAAAAAAAAAAf39/ACUAAABYAAAAAAAAAAAAAAAAAAAAAAAAAAAAAAAAAAAAAAAAAAAAAAAAAAAAAAAAAAAAAAA/AAAAAAAAAKCGAQAAAAAAAAAAAAAAAAAMAAAAAQAAAAAAAAAAAAAAAAAAAB8AAABUAAAAAAAABQAAAAEAAAAAAAAAAAAAAAAAAAAAAAAAAAAAAAAAAAAAAAAAAAAAAAJ/f38AAAAAA8zMzADAwP8Af39/AAAAAAAAAAAAAAAAAAAAAAAAAAAAIQAAABgAAAAUAAAAwTUAABsnAABARwAAWSkAABAAAAAmAAAACAAAAAAAAAAAAAAA"/>
               </a:ext>
             </a:extLst>
           </p:cNvSpPr>
@@ -2072,7 +2073,7 @@
           <a:lstStyle/>
           <a:p>
             <a:pPr/>
-            <a:fld id="{3A26A6B9-F7D7-7350-999E-0105E8D06F54}" type="slidenum">
+            <a:fld id="{39DFB0E4-AAD4-8A46-9A67-5C13FE296C09}" type="slidenum">
               <a:t/>
             </a:fld>
           </a:p>
@@ -2110,7 +2111,7 @@
             <a:spLocks noGrp="1" noChangeArrowheads="1"/>
             <a:extLst>
               <a:ext uri="smNativeData">
-                <pr:smNativeData xmlns:pr="smNativeData" xmlns="smNativeData" val="SMDATA_15_ucsbZBMAAAAlAAAAZAAAAA8BAAAAkAAAAEgAAACQAAAASAAAAAAAAAABAAAAAAAAAAEAAABQAAAAAAAAAAAA4D8AAAAAAADgPwAAAAAAAOA/AAAAAAAA4D8AAAAAAADgPwAAAAAAAOA/AAAAAAAA4D8AAAAAAADgPwAAAAAAAOA/AAAAAAAA4D8CAAAAjAAAAAAAAAAAAAAAu+DjDP///wgAAAAAAAAAAAAAAAAAAAAAAAAAAAAAAAAAAAAAZAAAAAEAAABAAAAAAAAAAAAAAAAAAAAAAAAAAAAAAAAAAAAAAAAAAAAAAAAAAAAAAAAAAAAAAAAAAAAAAAAAAAAAAAAAAAAAAAAAAAAAAAAAAAAAAAAAAAAAAAAAAAAAFAAAADwAAAAAAAAAAAAAAAAAAAkUAAAAAQAAABQAAAAUAAAAFAAAAAEAAAAAAAAAZAAAAGQAAAAAAAAAZAAAAGQAAAAVAAAAYAAAAAAAAAAAAAAADwAAACADAAAAAAAAAAAAAAEAAACgMgAAVgcAAKr4//8BAAAAf39/AAEAAABkAAAAAAAAABQAAABAHwAAAAAAACYAAAAAAAAAwOD//wAAAAAmAAAAZAAAABYAAABMAAAAAAAAAAAAAAAEAAAAAAAAAAEAAACAgIAKAAAAACgAAAAoAAAAZAAAAGQAAAAAAAAAzMzMAAAAAABQAAAAUAAAAGQAAABkAAAAAAAAABcAAAAUAAAAAAAAAAAAAAD/fwAA/38AAAAAAAAJAAAABAAAANw7IAEeAAAAaAAAAAAAAAAAAAAAAAAAAAAAAAAAAAAAECcAABAnAAAAAAAAAAAAAAAAAAAAAAAAAAAAAAAAAAAAAAAAAAAAABQAAAAAAAAAwMD/AAAAAABkAAAAMgAAAAAAAABkAAAAAAAAAH9/fwAKAAAAIgAAABgAAAAAAAAAAAAAAAAAAAAAAAAAAAAAAAAAAAAkAAAAJAAAAAAAAAAHAAAAAAAAAAAAAAAAAAAAAAAAAAAAAAAAAAAAf39/ACUAAABYAAAAAAAAAAAAAAAAAAAAAAAAAAAAAAAAAAAAAAAAAAAAAAAAAAAAAAAAAAAAAAA/AAAAAAAAAKCGAQAAAAAAAAAAAAAAAAAMAAAAAQAAAAAAAAAAAAAAAAAAAB8AAABUAAAAAAAABQAAAAEAAAAAAAAAAAAAAAAAAAAAAAAAAAAAAAAAAAAAAAAAAAAAAAJ/f38AAAAAA8zMzADAwP8Af39/AAAAAAAAAAAAAAAAAAAAAAAAAAAAIQAAABgAAAAUAAAAwAMAABsnAAA/FQAAWSkAABAAAAAmAAAACAAAAAAAAAAAAAAA"/>
+                <pr:smNativeData xmlns:pr="smNativeData" xmlns="smNativeData" val="SMDATA_15_NygcZBMAAAAlAAAAZAAAAA8BAAAAkAAAAEgAAACQAAAASAAAAAAAAAABAAAAAAAAAAEAAABQAAAAAAAAAAAA4D8AAAAAAADgPwAAAAAAAOA/AAAAAAAA4D8AAAAAAADgPwAAAAAAAOA/AAAAAAAA4D8AAAAAAADgPwAAAAAAAOA/AAAAAAAA4D8CAAAAjAAAAAAAAAAAAAAAu+DjDP///wgAAAAAAAAAAAAAAAAAAAAAAAAAAAAAAAAAAAAAZAAAAAEAAABAAAAAAAAAAAAAAAAAAAAAAAAAAAAAAAAAAAAAAAAAAAAAAAAAAAAAAAAAAAAAAAAAAAAAAAAAAAAAAAAAAAAAAAAAAAAAAAAAAAAAAAAAAAAAAAAAAAAAFAAAADwAAAAAAAAAAAAAAAAAAAkUAAAAAQAAABQAAAAUAAAAFAAAAAEAAAAAAAAAZAAAAGQAAAAAAAAAZAAAAGQAAAAVAAAAYAAAAAAAAAAAAAAADwAAACADAAAAAAAAAAAAAAEAAACgMgAAVgcAAKr4//8BAAAAf39/AAEAAABkAAAAAAAAABQAAABAHwAAAAAAACYAAAAAAAAAwOD//wAAAAAmAAAAZAAAABYAAABMAAAAAAAAAAAAAAAEAAAAAAAAAAEAAACAgIAKAAAAACgAAAAoAAAAZAAAAGQAAAAAAAAAzMzMAAAAAABQAAAAUAAAAGQAAABkAAAAAAAAABcAAAAUAAAAAAAAAAAAAAD/fwAA/38AAAAAAAAJAAAABAAAANw7IAEeAAAAaAAAAAAAAAAAAAAAAAAAAAAAAAAAAAAAECcAABAnAAAAAAAAAAAAAAAAAAAAAAAAAAAAAAAAAAAAAAAAAAAAABQAAAAAAAAAwMD/AAAAAABkAAAAMgAAAAAAAABkAAAAAAAAAH9/fwAKAAAAIgAAABgAAAAAAAAAAAAAAAAAAAAAAAAAAAAAAAAAAAAkAAAAJAAAAAAAAAAHAAAAAAAAAAAAAAAAAAAAAAAAAAAAAAAAAAAAf39/ACUAAABYAAAAAAAAAAAAAAAAAAAAAAAAAAAAAAAAAAAAAAAAAAAAAAAAAAAAAAAAAAAAAAA/AAAAAAAAAKCGAQAAAAAAAAAAAAAAAAAMAAAAAQAAAAAAAAAAAAAAAAAAAB8AAABUAAAAAAAABQAAAAEAAAAAAAAAAAAAAAAAAAAAAAAAAAAAAAAAAAAAAAAAAAAAAAJ/f38AAAAAA8zMzADAwP8Af39/AAAAAAAAAAAAAAAAAAAAAAAAAAAAIQAAABgAAAAUAAAAwAMAABsnAAA/FQAAWSkAABAAAAAmAAAACAAAAAAAAAAAAAAA"/>
               </a:ext>
             </a:extLst>
           </p:cNvSpPr>
@@ -2124,7 +2125,7 @@
           <a:lstStyle/>
           <a:p>
             <a:pPr/>
-            <a:fld id="{3A26FD23-6DD7-730B-999E-9B5EB3D06FCE}" type="datetime1">
+            <a:fld id="{39DFADBC-F2D4-8A5B-9A67-040EE3296C51}" type="datetime1">
               <a:t/>
             </a:fld>
           </a:p>
@@ -2137,7 +2138,7 @@
             <a:spLocks noGrp="1" noChangeArrowheads="1"/>
             <a:extLst>
               <a:ext uri="smNativeData">
-                <pr:smNativeData xmlns:pr="smNativeData" xmlns="smNativeData" val="SMDATA_15_ucsbZBMAAAAlAAAAZAAAAA8BAAAAkAAAAEgAAACQAAAASAAAAAAAAAABAAAAAAAAAAEAAABQAAAAAAAAAAAA4D8AAAAAAADgPwAAAAAAAOA/AAAAAAAA4D8AAAAAAADgPwAAAAAAAOA/AAAAAAAA4D8AAAAAAADgPwAAAAAAAOA/AAAAAAAA4D8CAAAAjAAAAAAAAAAAAAAAu+DjDP///wgAAAAAAAAAAAAAAAAAAAAAAAAAAAAAAAAAAAAAZAAAAAEAAABAAAAAAAAAAAAAAAAAAAAAAAAAAAAAAAAAAAAAAAAAAAAAAAAAAAAAAAAAAAAAAAAAAAAAAAAAAAAAAAAAAAAAAAAAAAAAAAAAAAAAAAAAAAAAAAAAAAAAFAAAADwAAAAAAAAAAAAAAAAAAAkUAAAAAQAAABQAAAAUAAAAFAAAAAEAAAAAAAAAZAAAAGQAAAAAAAAAZAAAAGQAAAAVAAAAYAAAAAAAAAAAAAAADwAAACADAAAAAAAAAAAAAAEAAACgMgAAVgcAAKr4//8BAAAAf39/AAEAAABkAAAAAAAAABQAAABAHwAAAAAAACYAAAAAAAAAwOD//wAAAAAmAAAAZAAAABYAAABMAAAAAAAAAAAAAAAEAAAAAAAAAAEAAACAgIAKAAAAACgAAAAoAAAAZAAAAGQAAAAAAAAAzMzMAAAAAABQAAAAUAAAAGQAAABkAAAAAAAAABcAAAAUAAAAAAAAAAAAAAD/fwAA/38AAAAAAAAJAAAABAAAAAAAAAAeAAAAaAAAAAAAAAAAAAAAAAAAAAAAAAAAAAAAECcAABAnAAAAAAAAAAAAAAAAAAAAAAAAAAAAAAAAAAAAAAAAAAAAABQAAAAAAAAAwMD/AAAAAABkAAAAMgAAAAAAAABkAAAAAAAAAH9/fwAKAAAAIgAAABgAAAAAAAAAAAAAAAAAAAAAAAAAAAAAAAAAAAAkAAAAJAAAAAAAAAAHAAAAAAAAAAAAAAAAAAAAAAAAAAAAAAAAAAAAf39/ACUAAABYAAAAAAAAAAAAAAAAAAAAAAAAAAAAAAAAAAAAAAAAAAAAAAAAAAAAAAAAAAAAAAA/AAAAAAAAAKCGAQAAAAAAAAAAAAAAAAAMAAAAAQAAAAAAAAAAAAAAAAAAAB8AAABUAAAAAAAABQAAAAEAAAAAAAAAAAAAAAAAAAAAAAAAAAAAAAAAAAAAAAAAAAAAAAJ/f38AAAAAA8zMzADAwP8Af39/AAAAAAAAAAAAAAAAAAAAAAAAAAAAIQAAABgAAAAUAAAAoRkAABsnAABfMQAAWSkAABAAAAAmAAAACAAAAAAAAAAAAAAA"/>
+                <pr:smNativeData xmlns:pr="smNativeData" xmlns="smNativeData" val="SMDATA_15_NygcZBMAAAAlAAAAZAAAAA8BAAAAkAAAAEgAAACQAAAASAAAAAAAAAABAAAAAAAAAAEAAABQAAAAAAAAAAAA4D8AAAAAAADgPwAAAAAAAOA/AAAAAAAA4D8AAAAAAADgPwAAAAAAAOA/AAAAAAAA4D8AAAAAAADgPwAAAAAAAOA/AAAAAAAA4D8CAAAAjAAAAAAAAAAAAAAAu+DjDP///wgAAAAAAAAAAAAAAAAAAAAAAAAAAAAAAAAAAAAAZAAAAAEAAABAAAAAAAAAAAAAAAAAAAAAAAAAAAAAAAAAAAAAAAAAAAAAAAAAAAAAAAAAAAAAAAAAAAAAAAAAAAAAAAAAAAAAAAAAAAAAAAAAAAAAAAAAAAAAAAAAAAAAFAAAADwAAAAAAAAAAAAAAAAAAAkUAAAAAQAAABQAAAAUAAAAFAAAAAEAAAAAAAAAZAAAAGQAAAAAAAAAZAAAAGQAAAAVAAAAYAAAAAAAAAAAAAAADwAAACADAAAAAAAAAAAAAAEAAACgMgAAVgcAAKr4//8BAAAAf39/AAEAAABkAAAAAAAAABQAAABAHwAAAAAAACYAAAAAAAAAwOD//wAAAAAmAAAAZAAAABYAAABMAAAAAAAAAAAAAAAEAAAAAAAAAAEAAACAgIAKAAAAACgAAAAoAAAAZAAAAGQAAAAAAAAAzMzMAAAAAABQAAAAUAAAAGQAAABkAAAAAAAAABcAAAAUAAAAAAAAAAAAAAD/fwAA/38AAAAAAAAJAAAABAAAAAAAAAAeAAAAaAAAAAAAAAAAAAAAAAAAAAAAAAAAAAAAECcAABAnAAAAAAAAAAAAAAAAAAAAAAAAAAAAAAAAAAAAAAAAAAAAABQAAAAAAAAAwMD/AAAAAABkAAAAMgAAAAAAAABkAAAAAAAAAH9/fwAKAAAAIgAAABgAAAAAAAAAAAAAAAAAAAAAAAAAAAAAAAAAAAAkAAAAJAAAAAAAAAAHAAAAAAAAAAAAAAAAAAAAAAAAAAAAAAAAAAAAf39/ACUAAABYAAAAAAAAAAAAAAAAAAAAAAAAAAAAAAAAAAAAAAAAAAAAAAAAAAAAAAAAAAAAAAA/AAAAAAAAAKCGAQAAAAAAAAAAAAAAAAAMAAAAAQAAAAAAAAAAAAAAAAAAAB8AAABUAAAAAAAABQAAAAEAAAAAAAAAAAAAAAAAAAAAAAAAAAAAAAAAAAAAAAAAAAAAAAJ/f38AAAAAA8zMzADAwP8Af39/AAAAAAAAAAAAAAAAAAAAAAAAAAAAIQAAABgAAAAUAAAAoRkAABsnAABfMQAAWSkAABAAAAAmAAAACAAAAAAAAAAAAAAA"/>
               </a:ext>
             </a:extLst>
           </p:cNvSpPr>
@@ -2164,7 +2165,7 @@
             <a:spLocks noGrp="1" noChangeArrowheads="1"/>
             <a:extLst>
               <a:ext uri="smNativeData">
-                <pr:smNativeData xmlns:pr="smNativeData" xmlns="smNativeData" val="SMDATA_15_ucsbZBMAAAAlAAAAZAAAAA8BAAAAkAAAAEgAAACQAAAASAAAAAAAAAABAAAAAAAAAAEAAABQAAAAAAAAAAAA4D8AAAAAAADgPwAAAAAAAOA/AAAAAAAA4D8AAAAAAADgPwAAAAAAAOA/AAAAAAAA4D8AAAAAAADgPwAAAAAAAOA/AAAAAAAA4D8CAAAAjAAAAAAAAAAAAAAAu+DjDP///wgAAAAAAAAAAAAAAAAAAAAAAAAAAAAAAAAAAAAAZAAAAAEAAABAAAAAAAAAAAAAAAAAAAAAAAAAAAAAAAAAAAAAAAAAAAAAAAAAAAAAAAAAAAAAAAAAAAAAAAAAAAAAAAAAAAAAAAAAAAAAAAAAAAAAAAAAAAAAAAAAAAAAFAAAADwAAAAAAAAAAAAAAAAAAAkUAAAAAQAAABQAAAAUAAAAFAAAAAEAAAAAAAAAZAAAAGQAAAAAAAAAZAAAAGQAAAAVAAAAYAAAAAAAAAAAAAAADwAAACADAAAAAAAAAAAAAAEAAACgMgAAVgcAAKr4//8BAAAAf39/AAEAAABkAAAAAAAAABQAAABAHwAAAAAAACYAAAAAAAAAwOD//wAAAAAmAAAAZAAAABYAAABMAAAAAAAAAAAAAAAEAAAAAAAAAAEAAACAgIAKAAAAACgAAAAoAAAAZAAAAGQAAAAAAAAAzMzMAAAAAABQAAAAUAAAAGQAAABkAAAAAAAAABcAAAAUAAAAAAAAAAAAAAD/fwAA/38AAAAAAAAJAAAABAAAAAAAAAAeAAAAaAAAAAAAAAAAAAAAAAAAAAAAAAAAAAAAECcAABAnAAAAAAAAAAAAAAAAAAAAAAAAAAAAAAAAAAAAAAAAAAAAABQAAAAAAAAAwMD/AAAAAABkAAAAMgAAAAAAAABkAAAAAAAAAH9/fwAKAAAAIgAAABgAAAAAAAAAAAAAAAAAAAAAAAAAAAAAAAAAAAAkAAAAJAAAAAAAAAAHAAAAAAAAAAAAAAAAAAAAAAAAAAAAAAAAAAAAf39/ACUAAABYAAAAAAAAAAAAAAAAAAAAAAAAAAAAAAAAAAAAAAAAAAAAAAAAAAAAAAAAAAAAAAA/AAAAAAAAAKCGAQAAAAAAAAAAAAAAAAAMAAAAAQAAAAAAAAAAAAAAAAAAAB8AAABUAAAAAAAABQAAAAEAAAAAAAAAAAAAAAAAAAAAAAAAAAAAAAAAAAAAAAAAAAAAAAJ/f38AAAAAA8zMzADAwP8Af39/AAAAAAAAAAAAAAAAAAAAAAAAAAAAIQAAABgAAAAUAAAAwTUAABsnAABARwAAWSkAABAAAAAmAAAACAAAAAAAAAAAAAAA"/>
+                <pr:smNativeData xmlns:pr="smNativeData" xmlns="smNativeData" val="SMDATA_15_NygcZBMAAAAlAAAAZAAAAA8BAAAAkAAAAEgAAACQAAAASAAAAAAAAAABAAAAAAAAAAEAAABQAAAAAAAAAAAA4D8AAAAAAADgPwAAAAAAAOA/AAAAAAAA4D8AAAAAAADgPwAAAAAAAOA/AAAAAAAA4D8AAAAAAADgPwAAAAAAAOA/AAAAAAAA4D8CAAAAjAAAAAAAAAAAAAAAu+DjDP///wgAAAAAAAAAAAAAAAAAAAAAAAAAAAAAAAAAAAAAZAAAAAEAAABAAAAAAAAAAAAAAAAAAAAAAAAAAAAAAAAAAAAAAAAAAAAAAAAAAAAAAAAAAAAAAAAAAAAAAAAAAAAAAAAAAAAAAAAAAAAAAAAAAAAAAAAAAAAAAAAAAAAAFAAAADwAAAAAAAAAAAAAAAAAAAkUAAAAAQAAABQAAAAUAAAAFAAAAAEAAAAAAAAAZAAAAGQAAAAAAAAAZAAAAGQAAAAVAAAAYAAAAAAAAAAAAAAADwAAACADAAAAAAAAAAAAAAEAAACgMgAAVgcAAKr4//8BAAAAf39/AAEAAABkAAAAAAAAABQAAABAHwAAAAAAACYAAAAAAAAAwOD//wAAAAAmAAAAZAAAABYAAABMAAAAAAAAAAAAAAAEAAAAAAAAAAEAAACAgIAKAAAAACgAAAAoAAAAZAAAAGQAAAAAAAAAzMzMAAAAAABQAAAAUAAAAGQAAABkAAAAAAAAABcAAAAUAAAAAAAAAAAAAAD/fwAA/38AAAAAAAAJAAAABAAAAAAAAAAeAAAAaAAAAAAAAAAAAAAAAAAAAAAAAAAAAAAAECcAABAnAAAAAAAAAAAAAAAAAAAAAAAAAAAAAAAAAAAAAAAAAAAAABQAAAAAAAAAwMD/AAAAAABkAAAAMgAAAAAAAABkAAAAAAAAAH9/fwAKAAAAIgAAABgAAAAAAAAAAAAAAAAAAAAAAAAAAAAAAAAAAAAkAAAAJAAAAAAAAAAHAAAAAAAAAAAAAAAAAAAAAAAAAAAAAAAAAAAAf39/ACUAAABYAAAAAAAAAAAAAAAAAAAAAAAAAAAAAAAAAAAAAAAAAAAAAAAAAAAAAAAAAAAAAAA/AAAAAAAAAKCGAQAAAAAAAAAAAAAAAAAMAAAAAQAAAAAAAAAAAAAAAAAAAB8AAABUAAAAAAAABQAAAAEAAAAAAAAAAAAAAAAAAAAAAAAAAAAAAAAAAAAAAAAAAAAAAAJ/f38AAAAAA8zMzADAwP8Af39/AAAAAAAAAAAAAAAAAAAAAAAAAAAAIQAAABgAAAAUAAAAwTUAABsnAABARwAAWSkAABAAAAAmAAAACAAAAAAAAAAAAAAA"/>
               </a:ext>
             </a:extLst>
           </p:cNvSpPr>
@@ -2178,7 +2179,7 @@
           <a:lstStyle/>
           <a:p>
             <a:pPr/>
-            <a:fld id="{3A26C4E1-AFD7-7332-999E-59678AD06F0C}" type="slidenum">
+            <a:fld id="{39DFD695-DBD4-8A20-9A67-2D7598296C78}" type="slidenum">
               <a:t/>
             </a:fld>
           </a:p>
@@ -2216,7 +2217,7 @@
             <a:spLocks noGrp="1" noChangeArrowheads="1"/>
             <a:extLst>
               <a:ext uri="smNativeData">
-                <pr:smNativeData xmlns:pr="smNativeData" xmlns="smNativeData" val="SMDATA_15_ucsbZBMAAAAlAAAAZAAAAA8BAAAAkAAAAEgAAACQAAAASAAAAAAAAAACAAAAAAAAAAEAAABQAAAAAAAAAAAA4D8AAAAAAADgPwAAAAAAAOA/AAAAAAAA4D8AAAAAAADgPwAAAAAAAOA/AAAAAAAA4D8AAAAAAADgPwAAAAAAAOA/AAAAAAAA4D8CAAAAjAAAAAAAAAAAAAAAu+DjDP///wgAAAAAAAAAAAAAAAAAAAAAAAAAAAAAAAAAAAAAZAAAAAEAAABAAAAAAAAAAAAAAAAAAAAAAAAAAAAAAAAAAAAAAAAAAAAAAAAAAAAAAAAAAAAAAAAAAAAAAAAAAAAAAAAAAAAAAAAAAAAAAAAAAAAAAAAAAAAAAAAAAAAAFAAAADwAAAAAAAAAAAAAAAAAAAkUAAAAAQAAABQAAAAUAAAAFAAAAAEAAAAAAAAAZAAAAGQAAAAAAAAAZAAAAGQAAAAVAAAAYAAAAAAAAAAAAAAADwAAACADAAAAAAAAAAAAAAEAAACgMgAAVgcAAKr4//8BAAAAf39/AAEAAABkAAAAAAAAABQAAABAHwAAAAAAACYAAAAAAAAAwOD//wAAAAAmAAAAZAAAABYAAABMAAAAAAAAAAAAAAAEAAAAAAAAAAEAAACAgIAKAAAAACgAAAAoAAAAZAAAAGQAAAAAAAAAzMzMAAAAAABQAAAAUAAAAGQAAABkAAAAAAAAABcAAAAUAAAAAAAAAAAAAAD/fwAA/38AAAAAAAAJAAAABAAAAAAAAAAeAAAAaAAAAAAAAAAAAAAAAAAAAAAAAAAAAAAAECcAABAnAAAAAAAAAAAAAAAAAAAAAAAAAAAAAAAAAAAAAAAAAAAAABQAAAAAAAAAwMD/AAAAAABkAAAAMgAAAAAAAABkAAAAAAAAAH9/fwAKAAAAIgAAABgAAAAAAAAAAAAAAAAAAAAAAAAAAAAAAAAAAAAkAAAAJAAAAAAAAAAHAAAAAAAAAAAAAAAAAAAAAAAAAAAAAAAAAAAAf39/ACUAAABYAAAAAAAAAAAAAAAAAAAAAAAAAAAAAAAAAAAAAAAAAAAAAAAAAAAAAAAAAAAAAAA/AAAAAAAAAKCGAQAAAAAAAAAAAAAAAAAMAAAAAQAAAAAAAAAAAAAAAAAAAB8AAABUAAAAAAAABQAAAAEAAAAAAAAAAAAAAAAAAAAAAAAAAAAAAAAAAAAAAAAAAAAAAAJ/f38AAAAAA8zMzADAwP8Af39/AAAAAAAAAAAAAAAAAAAAAAAAAAAAIQAAABgAAAAUAAAAwAMAAK4BAABtHAAA1AgAABAAAAAmAAAACAAAAIGAAAAAAAAA"/>
+                <pr:smNativeData xmlns:pr="smNativeData" xmlns="smNativeData" val="SMDATA_15_NygcZBMAAAAlAAAAZAAAAA8BAAAAkAAAAEgAAACQAAAASAAAAAAAAAACAAAAAAAAAAEAAABQAAAAAAAAAAAA4D8AAAAAAADgPwAAAAAAAOA/AAAAAAAA4D8AAAAAAADgPwAAAAAAAOA/AAAAAAAA4D8AAAAAAADgPwAAAAAAAOA/AAAAAAAA4D8CAAAAjAAAAAAAAAAAAAAAu+DjDP///wgAAAAAAAAAAAAAAAAAAAAAAAAAAAAAAAAAAAAAZAAAAAEAAABAAAAAAAAAAAAAAAAAAAAAAAAAAAAAAAAAAAAAAAAAAAAAAAAAAAAAAAAAAAAAAAAAAAAAAAAAAAAAAAAAAAAAAAAAAAAAAAAAAAAAAAAAAAAAAAAAAAAAFAAAADwAAAAAAAAAAAAAAAAAAAkUAAAAAQAAABQAAAAUAAAAFAAAAAEAAAAAAAAAZAAAAGQAAAAAAAAAZAAAAGQAAAAVAAAAYAAAAAAAAAAAAAAADwAAACADAAAAAAAAAAAAAAEAAACgMgAAVgcAAKr4//8BAAAAf39/AAEAAABkAAAAAAAAABQAAABAHwAAAAAAACYAAAAAAAAAwOD//wAAAAAmAAAAZAAAABYAAABMAAAAAAAAAAAAAAAEAAAAAAAAAAEAAACAgIAKAAAAACgAAAAoAAAAZAAAAGQAAAAAAAAAzMzMAAAAAABQAAAAUAAAAGQAAABkAAAAAAAAABcAAAAUAAAAAAAAAAAAAAD/fwAA/38AAAAAAAAJAAAABAAAAAAAAAAeAAAAaAAAAAAAAAAAAAAAAAAAAAAAAAAAAAAAECcAABAnAAAAAAAAAAAAAAAAAAAAAAAAAAAAAAAAAAAAAAAAAAAAABQAAAAAAAAAwMD/AAAAAABkAAAAMgAAAAAAAABkAAAAAAAAAH9/fwAKAAAAIgAAABgAAAAAAAAAAAAAAAAAAAAAAAAAAAAAAAAAAAAkAAAAJAAAAAAAAAAHAAAAAAAAAAAAAAAAAAAAAAAAAAAAAAAAAAAAf39/ACUAAABYAAAAAAAAAAAAAAAAAAAAAAAAAAAAAAAAAAAAAAAAAAAAAAAAAAAAAAAAAAAAAAA/AAAAAAAAAKCGAQAAAAAAAAAAAAAAAAAMAAAAAQAAAAAAAAAAAAAAAAAAAB8AAABUAAAAAAAABQAAAAEAAAAAAAAAAAAAAAAAAAAAAAAAAAAAAAAAAAAAAAAAAAAAAAJ/f38AAAAAA8zMzADAwP8Af39/AAAAAAAAAAAAAAAAAAAAAAAAAAAAIQAAABgAAAAUAAAAwAMAAK4BAABtHAAA1AgAABAAAAAmAAAACAAAAIGAAAAAAAAA"/>
               </a:ext>
             </a:extLst>
           </p:cNvSpPr>
@@ -2256,7 +2257,7 @@
             <a:spLocks noGrp="1" noChangeArrowheads="1"/>
             <a:extLst>
               <a:ext uri="smNativeData">
-                <pr:smNativeData xmlns:pr="smNativeData" xmlns="smNativeData" val="SMDATA_15_ucsbZBMAAAAlAAAAZAAAAA8BAAAAkAAAAEgAAACQAAAASAAAAAAAAAAAAAAAAAAAAAEAAABQAAAAAAAAAAAA4D8AAAAAAADgPwAAAAAAAOA/AAAAAAAA4D8AAAAAAADgPwAAAAAAAOA/AAAAAAAA4D8AAAAAAADgPwAAAAAAAOA/AAAAAAAA4D8CAAAAjAAAAAAAAAAAAAAAu+DjDP///wgAAAAAAAAAAAAAAAAAAAAAAAAAAAAAAAAAAAAAZAAAAAEAAABAAAAAAAAAAAAAAAAAAAAAAAAAAAAAAAAAAAAAAAAAAAAAAAAAAAAAAAAAAAAAAAAAAAAAAAAAAAAAAAAAAAAAAAAAAAAAAAAAAAAAAAAAAAAAAAAAAAAAFAAAADwAAAAAAAAAAAAAAAAAAAkUAAAAAQAAABQAAAAUAAAAFAAAAAEAAAAAAAAAZAAAAGQAAAAAAAAAZAAAAGQAAAAVAAAAYAAAAAAAAAAAAAAADwAAACADAAAAAAAAAAAAAAEAAACgMgAAVgcAAKr4//8BAAAAf39/AAEAAABkAAAAAAAAABQAAABAHwAAAAAAACYAAAAAAAAAwOD//wAAAAAmAAAAZAAAABYAAABMAAAAAAAAAAAAAAAEAAAAAAAAAAEAAACAgIAKAAAAACgAAAAoAAAAZAAAAGQAAAAAAAAAzMzMAAAAAABQAAAAUAAAAGQAAABkAAAAAAAAABcAAAAUAAAAAAAAAAAAAAD/fwAA/38AAAAAAAAJAAAABAAAAAAAAAAeAAAAaAAAAAAAAAAAAAAAAAAAAAAAAAAAAAAAECcAABAnAAAAAAAAAAAAAAAAAAAAAAAAAAAAAAAAAAAAAAAAAAAAABQAAAAAAAAAwMD/AAAAAABkAAAAMgAAAAAAAABkAAAAAAAAAH9/fwAKAAAAIgAAABgAAAAAAAAAAAAAAAAAAAAAAAAAAAAAAAAAAAAkAAAAJAAAAAAAAAAHAAAAAAAAAAAAAAAAAAAAAAAAAAAAAAAAAAAAf39/ACUAAABYAAAAAAAAAAAAAAAAAAAAAAAAAAAAAAAAAAAAAAAAAAAAAAAAAAAAAAAAAAAAAAA/AAAAAAAAAKCGAQAAAAAAAAAAAAAAAAAMAAAAAQAAAAAAAAAAAAAAAAAAAB8AAABUAAAAAAAABQAAAAEAAAAAAAAAAAAAAAAAAAAAAAAAAAAAAAAAAAAAAAAAAAAAAAJ/f38AAAAAA8zMzADAwP8Af39/AAAAAAAAAAAAAAAAAAAAAAAAAAAAIQAAABgAAAAUAAAAUx0AAK4BAABARwAAsCUAABAAAAAmAAAACAAAAAGAAAAAAAAA"/>
+                <pr:smNativeData xmlns:pr="smNativeData" xmlns="smNativeData" val="SMDATA_15_NygcZBMAAAAlAAAAZAAAAA8BAAAAkAAAAEgAAACQAAAASAAAAAAAAAAAAAAAAAAAAAEAAABQAAAAAAAAAAAA4D8AAAAAAADgPwAAAAAAAOA/AAAAAAAA4D8AAAAAAADgPwAAAAAAAOA/AAAAAAAA4D8AAAAAAADgPwAAAAAAAOA/AAAAAAAA4D8CAAAAjAAAAAAAAAAAAAAAu+DjDP///wgAAAAAAAAAAAAAAAAAAAAAAAAAAAAAAAAAAAAAZAAAAAEAAABAAAAAAAAAAAAAAAAAAAAAAAAAAAAAAAAAAAAAAAAAAAAAAAAAAAAAAAAAAAAAAAAAAAAAAAAAAAAAAAAAAAAAAAAAAAAAAAAAAAAAAAAAAAAAAAAAAAAAFAAAADwAAAAAAAAAAAAAAAAAAAkUAAAAAQAAABQAAAAUAAAAFAAAAAEAAAAAAAAAZAAAAGQAAAAAAAAAZAAAAGQAAAAVAAAAYAAAAAAAAAAAAAAADwAAACADAAAAAAAAAAAAAAEAAACgMgAAVgcAAKr4//8BAAAAf39/AAEAAABkAAAAAAAAABQAAABAHwAAAAAAACYAAAAAAAAAwOD//wAAAAAmAAAAZAAAABYAAABMAAAAAAAAAAAAAAAEAAAAAAAAAAEAAACAgIAKAAAAACgAAAAoAAAAZAAAAGQAAAAAAAAAzMzMAAAAAABQAAAAUAAAAGQAAABkAAAAAAAAABcAAAAUAAAAAAAAAAAAAAD/fwAA/38AAAAAAAAJAAAABAAAAAAAAAAeAAAAaAAAAAAAAAAAAAAAAAAAAAAAAAAAAAAAECcAABAnAAAAAAAAAAAAAAAAAAAAAAAAAAAAAAAAAAAAAAAAAAAAABQAAAAAAAAAwMD/AAAAAABkAAAAMgAAAAAAAABkAAAAAAAAAH9/fwAKAAAAIgAAABgAAAAAAAAAAAAAAAAAAAAAAAAAAAAAAAAAAAAkAAAAJAAAAAAAAAAHAAAAAAAAAAAAAAAAAAAAAAAAAAAAAAAAAAAAf39/ACUAAABYAAAAAAAAAAAAAAAAAAAAAAAAAAAAAAAAAAAAAAAAAAAAAAAAAAAAAAAAAAAAAAA/AAAAAAAAAKCGAQAAAAAAAAAAAAAAAAAMAAAAAQAAAAAAAAAAAAAAAAAAAB8AAABUAAAAAAAABQAAAAEAAAAAAAAAAAAAAAAAAAAAAAAAAAAAAAAAAAAAAAAAAAAAAAJ/f38AAAAAA8zMzADAwP8Af39/AAAAAAAAAAAAAAAAAAAAAAAAAAAAIQAAABgAAAAUAAAAUx0AAK4BAABARwAAsCUAABAAAAAmAAAACAAAAAGAAAAAAAAA"/>
               </a:ext>
             </a:extLst>
           </p:cNvSpPr>
@@ -2340,7 +2341,7 @@
             <a:spLocks noGrp="1" noChangeArrowheads="1"/>
             <a:extLst>
               <a:ext uri="smNativeData">
-                <pr:smNativeData xmlns:pr="smNativeData" xmlns="smNativeData" val="SMDATA_15_ucsbZBMAAAAlAAAAZAAAAA8BAAAAkAAAAEgAAACQAAAASAAAAAAAAAAAAAAAAAAAAAEAAABQAAAAAAAAAAAA4D8AAAAAAADgPwAAAAAAAOA/AAAAAAAA4D8AAAAAAADgPwAAAAAAAOA/AAAAAAAA4D8AAAAAAADgPwAAAAAAAOA/AAAAAAAA4D8CAAAAjAAAAAAAAAAAAAAAu+DjDP///wgAAAAAAAAAAAAAAAAAAAAAAAAAAAAAAAAAAAAAZAAAAAEAAABAAAAAAAAAAAAAAAAAAAAAAAAAAAAAAAAAAAAAAAAAAAAAAAAAAAAAAAAAAAAAAAAAAAAAAAAAAAAAAAAAAAAAAAAAAAAAAAAAAAAAAAAAAAAAAAAAAAAAFAAAADwAAAAAAAAAAAAAAAAAAAkUAAAAAQAAABQAAAAUAAAAFAAAAAEAAAAAAAAAZAAAAGQAAAAAAAAAZAAAAGQAAAAVAAAAYAAAAAAAAAAAAAAADwAAACADAAAAAAAAAAAAAAEAAACgMgAAVgcAAKr4//8BAAAAf39/AAEAAABkAAAAAAAAABQAAABAHwAAAAAAACYAAAAAAAAAwOD//wAAAAAmAAAAZAAAABYAAABMAAAAAAAAAAAAAAAEAAAAAAAAAAEAAACAgIAKAAAAACgAAAAoAAAAZAAAAGQAAAAAAAAAzMzMAAAAAABQAAAAUAAAAGQAAABkAAAAAAAAABcAAAAUAAAAAAAAAAAAAAD/fwAA/38AAAAAAAAJAAAABAAAAAAAAAAeAAAAaAAAAAAAAAAAAAAAAAAAAAAAAAAAAAAAECcAABAnAAAAAAAAAAAAAAAAAAAAAAAAAAAAAAAAAAAAAAAAAAAAABQAAAAAAAAAwMD/AAAAAABkAAAAMgAAAAAAAABkAAAAAAAAAH9/fwAKAAAAIgAAABgAAAAAAAAAAAAAAAAAAAAAAAAAAAAAAAAAAAAkAAAAJAAAAAAAAAAHAAAAAAAAAAAAAAAAAAAAAAAAAAAAAAAAAAAAf39/ACUAAABYAAAAAAAAAAAAAAAAAAAAAAAAAAAAAAAAAAAAAAAAAAAAAAAAAAAAAAAAAAAAAAA/AAAAAAAAAKCGAQAAAAAAAAAAAAAAAAAMAAAAAQAAAAAAAAAAAAAAAAAAAB8AAABUAAAAAAAABQAAAAEAAAAAAAAAAAAAAAAAAAAAAAAAAAAAAAAAAAAAAAAAAAAAAAJ/f38AAAAAA8zMzADAwP8Af39/AAAAAAAAAAAAAAAAAAAAAAAAAAAAIQAAABgAAAAUAAAAwAMAANQIAABtHAAAsCUAABAAAAAmAAAACAAAAAGAAAAAAAAA"/>
+                <pr:smNativeData xmlns:pr="smNativeData" xmlns="smNativeData" val="SMDATA_15_NygcZBMAAAAlAAAAZAAAAA8BAAAAkAAAAEgAAACQAAAASAAAAAAAAAAAAAAAAAAAAAEAAABQAAAAAAAAAAAA4D8AAAAAAADgPwAAAAAAAOA/AAAAAAAA4D8AAAAAAADgPwAAAAAAAOA/AAAAAAAA4D8AAAAAAADgPwAAAAAAAOA/AAAAAAAA4D8CAAAAjAAAAAAAAAAAAAAAu+DjDP///wgAAAAAAAAAAAAAAAAAAAAAAAAAAAAAAAAAAAAAZAAAAAEAAABAAAAAAAAAAAAAAAAAAAAAAAAAAAAAAAAAAAAAAAAAAAAAAAAAAAAAAAAAAAAAAAAAAAAAAAAAAAAAAAAAAAAAAAAAAAAAAAAAAAAAAAAAAAAAAAAAAAAAFAAAADwAAAAAAAAAAAAAAAAAAAkUAAAAAQAAABQAAAAUAAAAFAAAAAEAAAAAAAAAZAAAAGQAAAAAAAAAZAAAAGQAAAAVAAAAYAAAAAAAAAAAAAAADwAAACADAAAAAAAAAAAAAAEAAACgMgAAVgcAAKr4//8BAAAAf39/AAEAAABkAAAAAAAAABQAAABAHwAAAAAAACYAAAAAAAAAwOD//wAAAAAmAAAAZAAAABYAAABMAAAAAAAAAAAAAAAEAAAAAAAAAAEAAACAgIAKAAAAACgAAAAoAAAAZAAAAGQAAAAAAAAAzMzMAAAAAABQAAAAUAAAAGQAAABkAAAAAAAAABcAAAAUAAAAAAAAAAAAAAD/fwAA/38AAAAAAAAJAAAABAAAAAAAAAAeAAAAaAAAAAAAAAAAAAAAAAAAAAAAAAAAAAAAECcAABAnAAAAAAAAAAAAAAAAAAAAAAAAAAAAAAAAAAAAAAAAAAAAABQAAAAAAAAAwMD/AAAAAABkAAAAMgAAAAAAAABkAAAAAAAAAH9/fwAKAAAAIgAAABgAAAAAAAAAAAAAAAAAAAAAAAAAAAAAAAAAAAAkAAAAJAAAAAAAAAAHAAAAAAAAAAAAAAAAAAAAAAAAAAAAAAAAAAAAf39/ACUAAABYAAAAAAAAAAAAAAAAAAAAAAAAAAAAAAAAAAAAAAAAAAAAAAAAAAAAAAAAAAAAAAA/AAAAAAAAAKCGAQAAAAAAAAAAAAAAAAAMAAAAAQAAAAAAAAAAAAAAAAAAAB8AAABUAAAAAAAABQAAAAEAAAAAAAAAAAAAAAAAAAAAAAAAAAAAAAAAAAAAAAAAAAAAAAJ/f38AAAAAA8zMzADAwP8Af39/AAAAAAAAAAAAAAAAAAAAAAAAAAAAIQAAABgAAAAUAAAAwAMAANQIAABtHAAAsCUAABAAAAAmAAAACAAAAAGAAAAAAAAA"/>
               </a:ext>
             </a:extLst>
           </p:cNvSpPr>
@@ -2409,7 +2410,7 @@
             <a:spLocks noGrp="1" noChangeArrowheads="1"/>
             <a:extLst>
               <a:ext uri="smNativeData">
-                <pr:smNativeData xmlns:pr="smNativeData" xmlns="smNativeData" val="SMDATA_15_ucsbZBMAAAAlAAAAZAAAAA8BAAAAkAAAAEgAAACQAAAASAAAAAAAAAABAAAAAAAAAAEAAABQAAAAAAAAAAAA4D8AAAAAAADgPwAAAAAAAOA/AAAAAAAA4D8AAAAAAADgPwAAAAAAAOA/AAAAAAAA4D8AAAAAAADgPwAAAAAAAOA/AAAAAAAA4D8CAAAAjAAAAAAAAAAAAAAAu+DjDP///wgAAAAAAAAAAAAAAAAAAAAAAAAAAAAAAAAAAAAAZAAAAAEAAABAAAAAAAAAAAAAAAAAAAAAAAAAAAAAAAAAAAAAAAAAAAAAAAAAAAAAAAAAAAAAAAAAAAAAAAAAAAAAAAAAAAAAAAAAAAAAAAAAAAAAAAAAAAAAAAAAAAAAFAAAADwAAAAAAAAAAAAAAAAAAAkUAAAAAQAAABQAAAAUAAAAFAAAAAEAAAAAAAAAZAAAAGQAAAAAAAAAZAAAAGQAAAAVAAAAYAAAAAAAAAAAAAAADwAAACADAAAAAAAAAAAAAAEAAACgMgAAVgcAAKr4//8BAAAAf39/AAEAAABkAAAAAAAAABQAAABAHwAAAAAAACYAAAAAAAAAwOD//wAAAAAmAAAAZAAAABYAAABMAAAAAAAAAAAAAAAEAAAAAAAAAAEAAACAgIAKAAAAACgAAAAoAAAAZAAAAGQAAAAAAAAAzMzMAAAAAABQAAAAUAAAAGQAAABkAAAAAAAAABcAAAAUAAAAAAAAAAAAAAD/fwAA/38AAAAAAAAJAAAABAAAAAAAAAAeAAAAaAAAAAAAAAAAAAAAAAAAAAAAAAAAAAAAECcAABAnAAAAAAAAAAAAAAAAAAAAAAAAAAAAAAAAAAAAAAAAAAAAABQAAAAAAAAAwMD/AAAAAABkAAAAMgAAAAAAAABkAAAAAAAAAH9/fwAKAAAAIgAAABgAAAAAAAAAAAAAAAAAAAAAAAAAAAAAAAAAAAAkAAAAJAAAAAAAAAAHAAAAAAAAAAAAAAAAAAAAAAAAAAAAAAAAAAAAf39/ACUAAABYAAAAAAAAAAAAAAAAAAAAAAAAAAAAAAAAAAAAAAAAAAAAAAAAAAAAAAAAAAAAAAA/AAAAAAAAAKCGAQAAAAAAAAAAAAAAAAAMAAAAAQAAAAAAAAAAAAAAAAAAAB8AAABUAAAAAAAABQAAAAEAAAAAAAAAAAAAAAAAAAAAAAAAAAAAAAAAAAAAAAAAAAAAAAJ/f38AAAAAA8zMzADAwP8Af39/AAAAAAAAAAAAAAAAAAAAAAAAAAAAIQAAABgAAAAUAAAAwAMAABsnAAA/FQAAWSkAABAAAAAmAAAACAAAAAAAAAAAAAAA"/>
+                <pr:smNativeData xmlns:pr="smNativeData" xmlns="smNativeData" val="SMDATA_15_NygcZBMAAAAlAAAAZAAAAA8BAAAAkAAAAEgAAACQAAAASAAAAAAAAAABAAAAAAAAAAEAAABQAAAAAAAAAAAA4D8AAAAAAADgPwAAAAAAAOA/AAAAAAAA4D8AAAAAAADgPwAAAAAAAOA/AAAAAAAA4D8AAAAAAADgPwAAAAAAAOA/AAAAAAAA4D8CAAAAjAAAAAAAAAAAAAAAu+DjDP///wgAAAAAAAAAAAAAAAAAAAAAAAAAAAAAAAAAAAAAZAAAAAEAAABAAAAAAAAAAAAAAAAAAAAAAAAAAAAAAAAAAAAAAAAAAAAAAAAAAAAAAAAAAAAAAAAAAAAAAAAAAAAAAAAAAAAAAAAAAAAAAAAAAAAAAAAAAAAAAAAAAAAAFAAAADwAAAAAAAAAAAAAAAAAAAkUAAAAAQAAABQAAAAUAAAAFAAAAAEAAAAAAAAAZAAAAGQAAAAAAAAAZAAAAGQAAAAVAAAAYAAAAAAAAAAAAAAADwAAACADAAAAAAAAAAAAAAEAAACgMgAAVgcAAKr4//8BAAAAf39/AAEAAABkAAAAAAAAABQAAABAHwAAAAAAACYAAAAAAAAAwOD//wAAAAAmAAAAZAAAABYAAABMAAAAAAAAAAAAAAAEAAAAAAAAAAEAAACAgIAKAAAAACgAAAAoAAAAZAAAAGQAAAAAAAAAzMzMAAAAAABQAAAAUAAAAGQAAABkAAAAAAAAABcAAAAUAAAAAAAAAAAAAAD/fwAA/38AAAAAAAAJAAAABAAAAAAAAAAeAAAAaAAAAAAAAAAAAAAAAAAAAAAAAAAAAAAAECcAABAnAAAAAAAAAAAAAAAAAAAAAAAAAAAAAAAAAAAAAAAAAAAAABQAAAAAAAAAwMD/AAAAAABkAAAAMgAAAAAAAABkAAAAAAAAAH9/fwAKAAAAIgAAABgAAAAAAAAAAAAAAAAAAAAAAAAAAAAAAAAAAAAkAAAAJAAAAAAAAAAHAAAAAAAAAAAAAAAAAAAAAAAAAAAAAAAAAAAAf39/ACUAAABYAAAAAAAAAAAAAAAAAAAAAAAAAAAAAAAAAAAAAAAAAAAAAAAAAAAAAAAAAAAAAAA/AAAAAAAAAKCGAQAAAAAAAAAAAAAAAAAMAAAAAQAAAAAAAAAAAAAAAAAAAB8AAABUAAAAAAAABQAAAAEAAAAAAAAAAAAAAAAAAAAAAAAAAAAAAAAAAAAAAAAAAAAAAAJ/f38AAAAAA8zMzADAwP8Af39/AAAAAAAAAAAAAAAAAAAAAAAAAAAAIQAAABgAAAAUAAAAwAMAABsnAAA/FQAAWSkAABAAAAAmAAAACAAAAAAAAAAAAAAA"/>
               </a:ext>
             </a:extLst>
           </p:cNvSpPr>
@@ -2423,7 +2424,7 @@
           <a:lstStyle/>
           <a:p>
             <a:pPr/>
-            <a:fld id="{3A26F214-5AD7-7304-999E-AC51BCD06FF9}" type="datetime1">
+            <a:fld id="{39DFA2C1-8FD4-8A54-9A67-7901EC296C2C}" type="datetime1">
               <a:t/>
             </a:fld>
           </a:p>
@@ -2436,7 +2437,7 @@
             <a:spLocks noGrp="1" noChangeArrowheads="1"/>
             <a:extLst>
               <a:ext uri="smNativeData">
-                <pr:smNativeData xmlns:pr="smNativeData" xmlns="smNativeData" val="SMDATA_15_ucsbZBMAAAAlAAAAZAAAAA8BAAAAkAAAAEgAAACQAAAASAAAAAAAAAABAAAAAAAAAAEAAABQAAAAAAAAAAAA4D8AAAAAAADgPwAAAAAAAOA/AAAAAAAA4D8AAAAAAADgPwAAAAAAAOA/AAAAAAAA4D8AAAAAAADgPwAAAAAAAOA/AAAAAAAA4D8CAAAAjAAAAAAAAAAAAAAAu+DjDP///wgAAAAAAAAAAAAAAAAAAAAAAAAAAAAAAAAAAAAAZAAAAAEAAABAAAAAAAAAAAAAAAAAAAAAAAAAAAAAAAAAAAAAAAAAAAAAAAAAAAAAAAAAAAAAAAAAAAAAAAAAAAAAAAAAAAAAAAAAAAAAAAAAAAAAAAAAAAAAAAAAAAAAFAAAADwAAAAAAAAAAAAAAAAAAAkUAAAAAQAAABQAAAAUAAAAFAAAAAEAAAAAAAAAZAAAAGQAAAAAAAAAZAAAAGQAAAAVAAAAYAAAAAAAAAAAAAAADwAAACADAAAAAAAAAAAAAAEAAACgMgAAVgcAAKr4//8BAAAAf39/AAEAAABkAAAAAAAAABQAAABAHwAAAAAAACYAAAAAAAAAwOD//wAAAAAmAAAAZAAAABYAAABMAAAAAAAAAAAAAAAEAAAAAAAAAAEAAACAgIAKAAAAACgAAAAoAAAAZAAAAGQAAAAAAAAAzMzMAAAAAABQAAAAUAAAAGQAAABkAAAAAAAAABcAAAAUAAAAAAAAAAAAAAD/fwAA/38AAAAAAAAJAAAABAAAAHNwY0IeAAAAaAAAAAAAAAAAAAAAAAAAAAAAAAAAAAAAECcAABAnAAAAAAAAAAAAAAAAAAAAAAAAAAAAAAAAAAAAAAAAAAAAABQAAAAAAAAAwMD/AAAAAABkAAAAMgAAAAAAAABkAAAAAAAAAH9/fwAKAAAAIgAAABgAAAAAAAAAAAAAAAAAAAAAAAAAAAAAAAAAAAAkAAAAJAAAAAAAAAAHAAAAAAAAAAAAAAAAAAAAAAAAAAAAAAAAAAAAf39/ACUAAABYAAAAAAAAAAAAAAAAAAAAAAAAAAAAAAAAAAAAAAAAAAAAAAAAAAAAAAAAAAAAAAA/AAAAAAAAAKCGAQAAAAAAAAAAAAAAAAAMAAAAAQAAAAAAAAAAAAAAAAAAAB8AAABUAAAAAAAABQAAAAEAAAAAAAAAAAAAAAAAAAAAAAAAAAAAAAAAAAAAAAAAAAAAAAJ/f38AAAAAA8zMzADAwP8Af39/AAAAAAAAAAAAAAAAAAAAAAAAAAAAIQAAABgAAAAUAAAAoRkAABsnAABfMQAAWSkAABAAAAAmAAAACAAAAAAAAAAAAAAA"/>
+                <pr:smNativeData xmlns:pr="smNativeData" xmlns="smNativeData" val="SMDATA_15_NygcZBMAAAAlAAAAZAAAAA8BAAAAkAAAAEgAAACQAAAASAAAAAAAAAABAAAAAAAAAAEAAABQAAAAAAAAAAAA4D8AAAAAAADgPwAAAAAAAOA/AAAAAAAA4D8AAAAAAADgPwAAAAAAAOA/AAAAAAAA4D8AAAAAAADgPwAAAAAAAOA/AAAAAAAA4D8CAAAAjAAAAAAAAAAAAAAAu+DjDP///wgAAAAAAAAAAAAAAAAAAAAAAAAAAAAAAAAAAAAAZAAAAAEAAABAAAAAAAAAAAAAAAAAAAAAAAAAAAAAAAAAAAAAAAAAAAAAAAAAAAAAAAAAAAAAAAAAAAAAAAAAAAAAAAAAAAAAAAAAAAAAAAAAAAAAAAAAAAAAAAAAAAAAFAAAADwAAAAAAAAAAAAAAAAAAAkUAAAAAQAAABQAAAAUAAAAFAAAAAEAAAAAAAAAZAAAAGQAAAAAAAAAZAAAAGQAAAAVAAAAYAAAAAAAAAAAAAAADwAAACADAAAAAAAAAAAAAAEAAACgMgAAVgcAAKr4//8BAAAAf39/AAEAAABkAAAAAAAAABQAAABAHwAAAAAAACYAAAAAAAAAwOD//wAAAAAmAAAAZAAAABYAAABMAAAAAAAAAAAAAAAEAAAAAAAAAAEAAACAgIAKAAAAACgAAAAoAAAAZAAAAGQAAAAAAAAAzMzMAAAAAABQAAAAUAAAAGQAAABkAAAAAAAAABcAAAAUAAAAAAAAAAAAAAD/fwAA/38AAAAAAAAJAAAABAAAAHNwY0IeAAAAaAAAAAAAAAAAAAAAAAAAAAAAAAAAAAAAECcAABAnAAAAAAAAAAAAAAAAAAAAAAAAAAAAAAAAAAAAAAAAAAAAABQAAAAAAAAAwMD/AAAAAABkAAAAMgAAAAAAAABkAAAAAAAAAH9/fwAKAAAAIgAAABgAAAAAAAAAAAAAAAAAAAAAAAAAAAAAAAAAAAAkAAAAJAAAAAAAAAAHAAAAAAAAAAAAAAAAAAAAAAAAAAAAAAAAAAAAf39/ACUAAABYAAAAAAAAAAAAAAAAAAAAAAAAAAAAAAAAAAAAAAAAAAAAAAAAAAAAAAAAAAAAAAA/AAAAAAAAAKCGAQAAAAAAAAAAAAAAAAAMAAAAAQAAAAAAAAAAAAAAAAAAAB8AAABUAAAAAAAABQAAAAEAAAAAAAAAAAAAAAAAAAAAAAAAAAAAAAAAAAAAAAAAAAAAAAJ/f38AAAAAA8zMzADAwP8Af39/AAAAAAAAAAAAAAAAAAAAAAAAAAAAIQAAABgAAAAUAAAAoRkAABsnAABfMQAAWSkAABAAAAAmAAAACAAAAAAAAAAAAAAA"/>
               </a:ext>
             </a:extLst>
           </p:cNvSpPr>
@@ -2463,7 +2464,7 @@
             <a:spLocks noGrp="1" noChangeArrowheads="1"/>
             <a:extLst>
               <a:ext uri="smNativeData">
-                <pr:smNativeData xmlns:pr="smNativeData" xmlns="smNativeData" val="SMDATA_15_ucsbZBMAAAAlAAAAZAAAAA8BAAAAkAAAAEgAAACQAAAASAAAAAAAAAABAAAAAAAAAAEAAABQAAAAAAAAAAAA4D8AAAAAAADgPwAAAAAAAOA/AAAAAAAA4D8AAAAAAADgPwAAAAAAAOA/AAAAAAAA4D8AAAAAAADgPwAAAAAAAOA/AAAAAAAA4D8CAAAAjAAAAAAAAAAAAAAAu+DjDP///wgAAAAAAAAAAAAAAAAAAAAAAAAAAAAAAAAAAAAAZAAAAAEAAABAAAAAAAAAAAAAAAAAAAAAAAAAAAAAAAAAAAAAAAAAAAAAAAAAAAAAAAAAAAAAAAAAAAAAAAAAAAAAAAAAAAAAAAAAAAAAAAAAAAAAAAAAAAAAAAAAAAAAFAAAADwAAAAAAAAAAAAAAAAAAAkUAAAAAQAAABQAAAAUAAAAFAAAAAEAAAAAAAAAZAAAAGQAAAAAAAAAZAAAAGQAAAAVAAAAYAAAAAAAAAAAAAAADwAAACADAAAAAAAAAAAAAAEAAACgMgAAVgcAAKr4//8BAAAAf39/AAEAAABkAAAAAAAAABQAAABAHwAAAAAAACYAAAAAAAAAwOD//wAAAAAmAAAAZAAAABYAAABMAAAAAAAAAAAAAAAEAAAAAAAAAAEAAACAgIAKAAAAACgAAAAoAAAAZAAAAGQAAAAAAAAAzMzMAAAAAABQAAAAUAAAAGQAAABkAAAAAAAAABcAAAAUAAAAAAAAAAAAAAD/fwAA/38AAAAAAAAJAAAABAAAAAAAAAAeAAAAaAAAAAAAAAAAAAAAAAAAAAAAAAAAAAAAECcAABAnAAAAAAAAAAAAAAAAAAAAAAAAAAAAAAAAAAAAAAAAAAAAABQAAAAAAAAAwMD/AAAAAABkAAAAMgAAAAAAAABkAAAAAAAAAH9/fwAKAAAAIgAAABgAAAAAAAAAAAAAAAAAAAAAAAAAAAAAAAAAAAAkAAAAJAAAAAAAAAAHAAAAAAAAAAAAAAAAAAAAAAAAAAAAAAAAAAAAf39/ACUAAABYAAAAAAAAAAAAAAAAAAAAAAAAAAAAAAAAAAAAAAAAAAAAAAAAAAAAAAAAAAAAAAA/AAAAAAAAAKCGAQAAAAAAAAAAAAAAAAAMAAAAAQAAAAAAAAAAAAAAAAAAAB8AAABUAAAAAAAABQAAAAEAAAAAAAAAAAAAAAAAAAAAAAAAAAAAAAAAAAAAAAAAAAAAAAJ/f38AAAAAA8zMzADAwP8Af39/AAAAAAAAAAAAAAAAAAAAAAAAAAAAIQAAABgAAAAUAAAAwTUAABsnAABARwAAWSkAABAAAAAmAAAACAAAAAAAAAAAAAAA"/>
+                <pr:smNativeData xmlns:pr="smNativeData" xmlns="smNativeData" val="SMDATA_15_NygcZBMAAAAlAAAAZAAAAA8BAAAAkAAAAEgAAACQAAAASAAAAAAAAAABAAAAAAAAAAEAAABQAAAAAAAAAAAA4D8AAAAAAADgPwAAAAAAAOA/AAAAAAAA4D8AAAAAAADgPwAAAAAAAOA/AAAAAAAA4D8AAAAAAADgPwAAAAAAAOA/AAAAAAAA4D8CAAAAjAAAAAAAAAAAAAAAu+DjDP///wgAAAAAAAAAAAAAAAAAAAAAAAAAAAAAAAAAAAAAZAAAAAEAAABAAAAAAAAAAAAAAAAAAAAAAAAAAAAAAAAAAAAAAAAAAAAAAAAAAAAAAAAAAAAAAAAAAAAAAAAAAAAAAAAAAAAAAAAAAAAAAAAAAAAAAAAAAAAAAAAAAAAAFAAAADwAAAAAAAAAAAAAAAAAAAkUAAAAAQAAABQAAAAUAAAAFAAAAAEAAAAAAAAAZAAAAGQAAAAAAAAAZAAAAGQAAAAVAAAAYAAAAAAAAAAAAAAADwAAACADAAAAAAAAAAAAAAEAAACgMgAAVgcAAKr4//8BAAAAf39/AAEAAABkAAAAAAAAABQAAABAHwAAAAAAACYAAAAAAAAAwOD//wAAAAAmAAAAZAAAABYAAABMAAAAAAAAAAAAAAAEAAAAAAAAAAEAAACAgIAKAAAAACgAAAAoAAAAZAAAAGQAAAAAAAAAzMzMAAAAAABQAAAAUAAAAGQAAABkAAAAAAAAABcAAAAUAAAAAAAAAAAAAAD/fwAA/38AAAAAAAAJAAAABAAAAAAAAAAeAAAAaAAAAAAAAAAAAAAAAAAAAAAAAAAAAAAAECcAABAnAAAAAAAAAAAAAAAAAAAAAAAAAAAAAAAAAAAAAAAAAAAAABQAAAAAAAAAwMD/AAAAAABkAAAAMgAAAAAAAABkAAAAAAAAAH9/fwAKAAAAIgAAABgAAAAAAAAAAAAAAAAAAAAAAAAAAAAAAAAAAAAkAAAAJAAAAAAAAAAHAAAAAAAAAAAAAAAAAAAAAAAAAAAAAAAAAAAAf39/ACUAAABYAAAAAAAAAAAAAAAAAAAAAAAAAAAAAAAAAAAAAAAAAAAAAAAAAAAAAAAAAAAAAAA/AAAAAAAAAKCGAQAAAAAAAAAAAAAAAAAMAAAAAQAAAAAAAAAAAAAAAAAAAB8AAABUAAAAAAAABQAAAAEAAAAAAAAAAAAAAAAAAAAAAAAAAAAAAAAAAAAAAAAAAAAAAAJ/f38AAAAAA8zMzADAwP8Af39/AAAAAAAAAAAAAAAAAAAAAAAAAAAAIQAAABgAAAAUAAAAwTUAABsnAABARwAAWSkAABAAAAAmAAAACAAAAAAAAAAAAAAA"/>
               </a:ext>
             </a:extLst>
           </p:cNvSpPr>
@@ -2477,7 +2478,7 @@
           <a:lstStyle/>
           <a:p>
             <a:pPr/>
-            <a:fld id="{3A26DE98-D6D7-7328-999E-207D90D06F75}" type="slidenum">
+            <a:fld id="{39DF96CB-85D4-8A60-9A67-7335D8296C26}" type="slidenum">
               <a:t/>
             </a:fld>
           </a:p>
@@ -2515,7 +2516,7 @@
             <a:spLocks noGrp="1" noChangeArrowheads="1"/>
             <a:extLst>
               <a:ext uri="smNativeData">
-                <pr:smNativeData xmlns:pr="smNativeData" xmlns="smNativeData" val="SMDATA_15_ucsbZBMAAAAlAAAAZAAAAA8BAAAAkAAAAEgAAACQAAAASAAAAAAAAAACAAAAAAAAAAEAAABQAAAAAAAAAAAA4D8AAAAAAADgPwAAAAAAAOA/AAAAAAAA4D8AAAAAAADgPwAAAAAAAOA/AAAAAAAA4D8AAAAAAADgPwAAAAAAAOA/AAAAAAAA4D8CAAAAjAAAAAAAAAAAAAAAu+DjDP///wgAAAAAAAAAAAAAAAAAAAAAAAAAAAAAAAAAAAAAZAAAAAEAAABAAAAAAAAAAAAAAAAAAAAAAAAAAAAAAAAAAAAAAAAAAAAAAAAAAAAAAAAAAAAAAAAAAAAAAAAAAAAAAAAAAAAAAAAAAAAAAAAAAAAAAAAAAAAAAAAAAAAAFAAAADwAAAAAAAAAAAAAAAAAAAkUAAAAAQAAABQAAAAUAAAAFAAAAAEAAAAAAAAAZAAAAGQAAAAAAAAAZAAAAGQAAAAVAAAAYAAAAAAAAAAAAAAADwAAACADAAAAAAAAAAAAAAEAAACgMgAAVgcAAKr4//8BAAAAf39/AAEAAABkAAAAAAAAABQAAABAHwAAAAAAACYAAAAAAAAAwOD//wAAAAAmAAAAZAAAABYAAABMAAAAAAAAAAAAAAAEAAAAAAAAAAEAAACAgIAKAAAAACgAAAAoAAAAZAAAAGQAAAAAAAAAzMzMAAAAAABQAAAAUAAAAGQAAABkAAAAAAAAABcAAAAUAAAAAAAAAAAAAAD/fwAA/38AAAAAAAAJAAAABAAAAAAAAAAeAAAAaAAAAAAAAAAAAAAAAAAAAAAAAAAAAAAAECcAABAnAAAAAAAAAAAAAAAAAAAAAAAAAAAAAAAAAAAAAAAAAAAAABQAAAAAAAAAwMD/AAAAAABkAAAAMgAAAAAAAABkAAAAAAAAAH9/fwAKAAAAIgAAABgAAAAAAAAAAAAAAAAAAAAAAAAAAAAAAAAAAAAkAAAAJAAAAAAAAAAHAAAAAAAAAAAAAAAAAAAAAAAAAAAAAAAAAAAAf39/ACUAAABYAAAAAAAAAAAAAAAAAAAAAAAAAAAAAAAAAAAAAAAAAAAAAAAAAAAAAAAAAAAAAAA/AAAAAAAAAKCGAQAAAAAAAAAAAAAAAAAMAAAAAQAAAAAAAAAAAAAAAAAAAB8AAABUAAAAAAAABQAAAAEAAAAAAAAAAAAAAAAAAAAAAAAAAAAAAAAAAAAAAAAAAAAAAAJ/f38AAAAAA8zMzADAwP8Af39/AAAAAAAAAAAAAAAAAAAAAAAAAAAAIQAAABgAAAAUAAAAsw4AAIgdAACzOwAABCEAABAAAAAmAAAACAAAAIGAAAAAAAAA"/>
+                <pr:smNativeData xmlns:pr="smNativeData" xmlns="smNativeData" val="SMDATA_15_NygcZBMAAAAlAAAAZAAAAA8BAAAAkAAAAEgAAACQAAAASAAAAAAAAAACAAAAAAAAAAEAAABQAAAAAAAAAAAA4D8AAAAAAADgPwAAAAAAAOA/AAAAAAAA4D8AAAAAAADgPwAAAAAAAOA/AAAAAAAA4D8AAAAAAADgPwAAAAAAAOA/AAAAAAAA4D8CAAAAjAAAAAAAAAAAAAAAu+DjDP///wgAAAAAAAAAAAAAAAAAAAAAAAAAAAAAAAAAAAAAZAAAAAEAAABAAAAAAAAAAAAAAAAAAAAAAAAAAAAAAAAAAAAAAAAAAAAAAAAAAAAAAAAAAAAAAAAAAAAAAAAAAAAAAAAAAAAAAAAAAAAAAAAAAAAAAAAAAAAAAAAAAAAAFAAAADwAAAAAAAAAAAAAAAAAAAkUAAAAAQAAABQAAAAUAAAAFAAAAAEAAAAAAAAAZAAAAGQAAAAAAAAAZAAAAGQAAAAVAAAAYAAAAAAAAAAAAAAADwAAACADAAAAAAAAAAAAAAEAAACgMgAAVgcAAKr4//8BAAAAf39/AAEAAABkAAAAAAAAABQAAABAHwAAAAAAACYAAAAAAAAAwOD//wAAAAAmAAAAZAAAABYAAABMAAAAAAAAAAAAAAAEAAAAAAAAAAEAAACAgIAKAAAAACgAAAAoAAAAZAAAAGQAAAAAAAAAzMzMAAAAAABQAAAAUAAAAGQAAABkAAAAAAAAABcAAAAUAAAAAAAAAAAAAAD/fwAA/38AAAAAAAAJAAAABAAAAAAAAAAeAAAAaAAAAAAAAAAAAAAAAAAAAAAAAAAAAAAAECcAABAnAAAAAAAAAAAAAAAAAAAAAAAAAAAAAAAAAAAAAAAAAAAAABQAAAAAAAAAwMD/AAAAAABkAAAAMgAAAAAAAABkAAAAAAAAAH9/fwAKAAAAIgAAABgAAAAAAAAAAAAAAAAAAAAAAAAAAAAAAAAAAAAkAAAAJAAAAAAAAAAHAAAAAAAAAAAAAAAAAAAAAAAAAAAAAAAAAAAAf39/ACUAAABYAAAAAAAAAAAAAAAAAAAAAAAAAAAAAAAAAAAAAAAAAAAAAAAAAAAAAAAAAAAAAAA/AAAAAAAAAKCGAQAAAAAAAAAAAAAAAAAMAAAAAQAAAAAAAAAAAAAAAAAAAB8AAABUAAAAAAAABQAAAAEAAAAAAAAAAAAAAAAAAAAAAAAAAAAAAAAAAAAAAAAAAAAAAAJ/f38AAAAAA8zMzADAwP8Af39/AAAAAAAAAAAAAAAAAAAAAAAAAAAAIQAAABgAAAAUAAAAsw4AAIgdAACzOwAABCEAABAAAAAmAAAACAAAAIGAAAAAAAAA"/>
               </a:ext>
             </a:extLst>
           </p:cNvSpPr>
@@ -2555,7 +2556,7 @@
             <a:spLocks noGrp="1" noChangeArrowheads="1"/>
             <a:extLst>
               <a:ext uri="smNativeData">
-                <pr:smNativeData xmlns:pr="smNativeData" xmlns="smNativeData" val="SMDATA_15_ucsbZBMAAAAlAAAAZAAAAA8BAAAAkAAAAEgAAACQAAAASAAAAAAAAAAAAAAAAAAAAAEAAABQAAAAAAAAAAAA4D8AAAAAAADgPwAAAAAAAOA/AAAAAAAA4D8AAAAAAADgPwAAAAAAAOA/AAAAAAAA4D8AAAAAAADgPwAAAAAAAOA/AAAAAAAA4D8CAAAAjAAAAAAAAAAAAAAAu+DjDP///wgAAAAAAAAAAAAAAAAAAAAAAAAAAAAAAAAAAAAAZAAAAAEAAABAAAAAAAAAAAAAAAAAAAAAAAAAAAAAAAAAAAAAAAAAAAAAAAAAAAAAAAAAAAAAAAAAAAAAAAAAAAAAAAAAAAAAAAAAAAAAAAAAAAAAAAAAAAAAAAAAAAAAFAAAADwAAAAAAAAAAAAAAAAAAAkUAAAAAQAAABQAAAAUAAAAFAAAAAEAAAAAAAAAZAAAAGQAAAAAAAAAZAAAAGQAAAAVAAAAYAAAAAAAAAAAAAAADwAAACADAAAAAAAAAAAAAAEAAACgMgAAVgcAAKr4//8BAAAAf39/AAEAAABkAAAAAAAAABQAAABAHwAAAAAAACYAAAAAAAAAwOD//wAAAAAmAAAAZAAAABYAAABMAAAAAAAAAAAAAAAEAAAAAAAAAAEAAACAgIAKAAAAACgAAAAoAAAAZAAAAGQAAAAAAAAAzMzMAAAAAABQAAAAUAAAAGQAAABkAAAAAAAAABcAAAAUAAAAAAAAAAAAAAD/fwAA/38AAAAAAAAJAAAABAAAAAAAAAAeAAAAaAAAAAAAAAAAAAAAAAAAAAAAAAAAAAAAECcAABAnAAAAAAAAAAAAAAAAAAAAAAAAAAAAAAAAAAAAAAAAAAAAABQAAAAAAAAAwMD/AAAAAABkAAAAMgAAAAAAAABkAAAAAAAAAH9/fwAKAAAAIgAAABgAAAAAAAAAAAAAAAAAAAAAAAAAAAAAAAAAAAAkAAAAJAAAAAAAAAAHAAAAAAAAAAAAAAAAAAAAAAAAAAAAAAAAAAAAf39/ACUAAABYAAAAAAAAAAAAAAAAAAAAAAAAAAAAAAAAAAAAAAAAAAAAAAAAAAAAAAAAAAAAAAA/AAAAAAAAAKCGAQAAAAAAAAAAAAAAAAAMAAAAAQAAAAAAAAAAAAAAAAAAAB8AAABUAAAAAAAABQAAAAEAAAAAAAAAAAAAAAAAAAAAAAAAAAAAAAAAAAAAAAAAAAAAAAJ/f38AAAAAA8zMzADAwP8Af39/AAAAAAAAAAAAAAAAAAAAAAAAAAAAIQAAABgAAAAUAAAAsw4AAMYDAACzOwAAFh0AABAAAAAmAAAACAAAAAGAAAAAAAAA"/>
+                <pr:smNativeData xmlns:pr="smNativeData" xmlns="smNativeData" val="SMDATA_15_NygcZBMAAAAlAAAAZAAAAA8BAAAAkAAAAEgAAACQAAAASAAAAAAAAAAAAAAAAAAAAAEAAABQAAAAAAAAAAAA4D8AAAAAAADgPwAAAAAAAOA/AAAAAAAA4D8AAAAAAADgPwAAAAAAAOA/AAAAAAAA4D8AAAAAAADgPwAAAAAAAOA/AAAAAAAA4D8CAAAAjAAAAAAAAAAAAAAAu+DjDP///wgAAAAAAAAAAAAAAAAAAAAAAAAAAAAAAAAAAAAAZAAAAAEAAABAAAAAAAAAAAAAAAAAAAAAAAAAAAAAAAAAAAAAAAAAAAAAAAAAAAAAAAAAAAAAAAAAAAAAAAAAAAAAAAAAAAAAAAAAAAAAAAAAAAAAAAAAAAAAAAAAAAAAFAAAADwAAAAAAAAAAAAAAAAAAAkUAAAAAQAAABQAAAAUAAAAFAAAAAEAAAAAAAAAZAAAAGQAAAAAAAAAZAAAAGQAAAAVAAAAYAAAAAAAAAAAAAAADwAAACADAAAAAAAAAAAAAAEAAACgMgAAVgcAAKr4//8BAAAAf39/AAEAAABkAAAAAAAAABQAAABAHwAAAAAAACYAAAAAAAAAwOD//wAAAAAmAAAAZAAAABYAAABMAAAAAAAAAAAAAAAEAAAAAAAAAAEAAACAgIAKAAAAACgAAAAoAAAAZAAAAGQAAAAAAAAAzMzMAAAAAABQAAAAUAAAAGQAAABkAAAAAAAAABcAAAAUAAAAAAAAAAAAAAD/fwAA/38AAAAAAAAJAAAABAAAAAAAAAAeAAAAaAAAAAAAAAAAAAAAAAAAAAAAAAAAAAAAECcAABAnAAAAAAAAAAAAAAAAAAAAAAAAAAAAAAAAAAAAAAAAAAAAABQAAAAAAAAAwMD/AAAAAABkAAAAMgAAAAAAAABkAAAAAAAAAH9/fwAKAAAAIgAAABgAAAAAAAAAAAAAAAAAAAAAAAAAAAAAAAAAAAAkAAAAJAAAAAAAAAAHAAAAAAAAAAAAAAAAAAAAAAAAAAAAAAAAAAAAf39/ACUAAABYAAAAAAAAAAAAAAAAAAAAAAAAAAAAAAAAAAAAAAAAAAAAAAAAAAAAAAAAAAAAAAA/AAAAAAAAAKCGAQAAAAAAAAAAAAAAAAAMAAAAAQAAAAAAAAAAAAAAAAAAAB8AAABUAAAAAAAABQAAAAEAAAAAAAAAAAAAAAAAAAAAAAAAAAAAAAAAAAAAAAAAAAAAAAJ/f38AAAAAA8zMzADAwP8Af39/AAAAAAAAAAAAAAAAAAAAAAAAAAAAIQAAABgAAAAUAAAAsw4AAMYDAACzOwAAFh0AABAAAAAmAAAACAAAAAGAAAAAAAAA"/>
               </a:ext>
             </a:extLst>
           </p:cNvSpPr>
@@ -2624,7 +2625,7 @@
             <a:spLocks noGrp="1" noChangeArrowheads="1"/>
             <a:extLst>
               <a:ext uri="smNativeData">
-                <pr:smNativeData xmlns:pr="smNativeData" xmlns="smNativeData" val="SMDATA_15_ucsbZBMAAAAlAAAAZAAAAA8BAAAAkAAAAEgAAACQAAAASAAAAAAAAAAAAAAAAAAAAAEAAABQAAAAAAAAAAAA4D8AAAAAAADgPwAAAAAAAOA/AAAAAAAA4D8AAAAAAADgPwAAAAAAAOA/AAAAAAAA4D8AAAAAAADgPwAAAAAAAOA/AAAAAAAA4D8CAAAAjAAAAAAAAAAAAAAAu+DjDP///wgAAAAAAAAAAAAAAAAAAAAAAAAAAAAAAAAAAAAAZAAAAAEAAABAAAAAAAAAAAAAAAAAAAAAAAAAAAAAAAAAAAAAAAAAAAAAAAAAAAAAAAAAAAAAAAAAAAAAAAAAAAAAAAAAAAAAAAAAAAAAAAAAAAAAAAAAAAAAAAAAAAAAFAAAADwAAAAAAAAAAAAAAAAAAAkUAAAAAQAAABQAAAAUAAAAFAAAAAEAAAAAAAAAZAAAAGQAAAAAAAAAZAAAAGQAAAAVAAAAYAAAAAAAAAAAAAAADwAAACADAAAAAAAAAAAAAAEAAACgMgAAVgcAAKr4//8BAAAAf39/AAEAAABkAAAAAAAAABQAAABAHwAAAAAAACYAAAAAAAAAwOD//wAAAAAmAAAAZAAAABYAAABMAAAAAAAAAAAAAAAEAAAAAAAAAAEAAACAgIAKAAAAACgAAAAoAAAAZAAAAGQAAAAAAAAAzMzMAAAAAABQAAAAUAAAAGQAAABkAAAAAAAAABcAAAAUAAAAAAAAAAAAAAD/fwAA/38AAAAAAAAJAAAABAAAAAAAAAAeAAAAaAAAAAAAAAAAAAAAAAAAAAAAAAAAAAAAECcAABAnAAAAAAAAAAAAAAAAAAAAAAAAAAAAAAAAAAAAAAAAAAAAABQAAAAAAAAAwMD/AAAAAABkAAAAMgAAAAAAAABkAAAAAAAAAH9/fwAKAAAAIgAAABgAAAAAAAAAAAAAAAAAAAAAAAAAAAAAAAAAAAAkAAAAJAAAAAAAAAAHAAAAAAAAAAAAAAAAAAAAAAAAAAAAAAAAAAAAf39/ACUAAABYAAAAAAAAAAAAAAAAAAAAAAAAAAAAAAAAAAAAAAAAAAAAAAAAAAAAAAAAAAAAAAA/AAAAAAAAAKCGAQAAAAAAAAAAAAAAAAAMAAAAAQAAAAAAAAAAAAAAAAAAAB8AAABUAAAAAAAABQAAAAEAAAAAAAAAAAAAAAAAAAAAAAAAAAAAAAAAAAAAAAAAAAAAAAJ/f38AAAAAA8zMzADAwP8Af39/AAAAAAAAAAAAAAAAAAAAAAAAAAAAIQAAABgAAAAUAAAAsw4AAAQhAACzOwAA+CUAABAAAAAmAAAACAAAAAGAAAAAAAAA"/>
+                <pr:smNativeData xmlns:pr="smNativeData" xmlns="smNativeData" val="SMDATA_15_NygcZBMAAAAlAAAAZAAAAA8BAAAAkAAAAEgAAACQAAAASAAAAAAAAAAAAAAAAAAAAAEAAABQAAAAAAAAAAAA4D8AAAAAAADgPwAAAAAAAOA/AAAAAAAA4D8AAAAAAADgPwAAAAAAAOA/AAAAAAAA4D8AAAAAAADgPwAAAAAAAOA/AAAAAAAA4D8CAAAAjAAAAAAAAAAAAAAAu+DjDP///wgAAAAAAAAAAAAAAAAAAAAAAAAAAAAAAAAAAAAAZAAAAAEAAABAAAAAAAAAAAAAAAAAAAAAAAAAAAAAAAAAAAAAAAAAAAAAAAAAAAAAAAAAAAAAAAAAAAAAAAAAAAAAAAAAAAAAAAAAAAAAAAAAAAAAAAAAAAAAAAAAAAAAFAAAADwAAAAAAAAAAAAAAAAAAAkUAAAAAQAAABQAAAAUAAAAFAAAAAEAAAAAAAAAZAAAAGQAAAAAAAAAZAAAAGQAAAAVAAAAYAAAAAAAAAAAAAAADwAAACADAAAAAAAAAAAAAAEAAACgMgAAVgcAAKr4//8BAAAAf39/AAEAAABkAAAAAAAAABQAAABAHwAAAAAAACYAAAAAAAAAwOD//wAAAAAmAAAAZAAAABYAAABMAAAAAAAAAAAAAAAEAAAAAAAAAAEAAACAgIAKAAAAACgAAAAoAAAAZAAAAGQAAAAAAAAAzMzMAAAAAABQAAAAUAAAAGQAAABkAAAAAAAAABcAAAAUAAAAAAAAAAAAAAD/fwAA/38AAAAAAAAJAAAABAAAAAAAAAAeAAAAaAAAAAAAAAAAAAAAAAAAAAAAAAAAAAAAECcAABAnAAAAAAAAAAAAAAAAAAAAAAAAAAAAAAAAAAAAAAAAAAAAABQAAAAAAAAAwMD/AAAAAABkAAAAMgAAAAAAAABkAAAAAAAAAH9/fwAKAAAAIgAAABgAAAAAAAAAAAAAAAAAAAAAAAAAAAAAAAAAAAAkAAAAJAAAAAAAAAAHAAAAAAAAAAAAAAAAAAAAAAAAAAAAAAAAAAAAf39/ACUAAABYAAAAAAAAAAAAAAAAAAAAAAAAAAAAAAAAAAAAAAAAAAAAAAAAAAAAAAAAAAAAAAA/AAAAAAAAAKCGAQAAAAAAAAAAAAAAAAAMAAAAAQAAAAAAAAAAAAAAAAAAAB8AAABUAAAAAAAABQAAAAEAAAAAAAAAAAAAAAAAAAAAAAAAAAAAAAAAAAAAAAAAAAAAAAJ/f38AAAAAA8zMzADAwP8Af39/AAAAAAAAAAAAAAAAAAAAAAAAAAAAIQAAABgAAAAUAAAAsw4AAAQhAACzOwAA+CUAABAAAAAmAAAACAAAAAGAAAAAAAAA"/>
               </a:ext>
             </a:extLst>
           </p:cNvSpPr>
@@ -2693,7 +2694,7 @@
             <a:spLocks noGrp="1" noChangeArrowheads="1"/>
             <a:extLst>
               <a:ext uri="smNativeData">
-                <pr:smNativeData xmlns:pr="smNativeData" xmlns="smNativeData" val="SMDATA_15_ucsbZBMAAAAlAAAAZAAAAA8BAAAAkAAAAEgAAACQAAAASAAAAAAAAAABAAAAAAAAAAEAAABQAAAAAAAAAAAA4D8AAAAAAADgPwAAAAAAAOA/AAAAAAAA4D8AAAAAAADgPwAAAAAAAOA/AAAAAAAA4D8AAAAAAADgPwAAAAAAAOA/AAAAAAAA4D8CAAAAjAAAAAAAAAAAAAAAu+DjDP///wgAAAAAAAAAAAAAAAAAAAAAAAAAAAAAAAAAAAAAZAAAAAEAAABAAAAAAAAAAAAAAAAAAAAAAAAAAAAAAAAAAAAAAAAAAAAAAAAAAAAAAAAAAAAAAAAAAAAAAAAAAAAAAAAAAAAAAAAAAAAAAAAAAAAAAAAAAAAAAAAAAAAAFAAAADwAAAAAAAAAAAAAAAAAAAkUAAAAAQAAABQAAAAUAAAAFAAAAAEAAAAAAAAAZAAAAGQAAAAAAAAAZAAAAGQAAAAVAAAAYAAAAAAAAAAAAAAADwAAACADAAAAAAAAAAAAAAEAAACgMgAAVgcAAKr4//8BAAAAf39/AAEAAABkAAAAAAAAABQAAABAHwAAAAAAACYAAAAAAAAAwOD//wAAAAAmAAAAZAAAABYAAABMAAAAAAAAAAAAAAAEAAAAAAAAAAEAAACAgIAKAAAAACgAAAAoAAAAZAAAAGQAAAAAAAAAzMzMAAAAAABQAAAAUAAAAGQAAABkAAAAAAAAABcAAAAUAAAAAAAAAAAAAAD/fwAA/38AAAAAAAAJAAAABAAAAAAAAAAeAAAAaAAAAAAAAAAAAAAAAAAAAAAAAAAAAAAAECcAABAnAAAAAAAAAAAAAAAAAAAAAAAAAAAAAAAAAAAAAAAAAAAAABQAAAAAAAAAwMD/AAAAAABkAAAAMgAAAAAAAABkAAAAAAAAAH9/fwAKAAAAIgAAABgAAAAAAAAAAAAAAAAAAAAAAAAAAAAAAAAAAAAkAAAAJAAAAAAAAAAHAAAAAAAAAAAAAAAAAAAAAAAAAAAAAAAAAAAAf39/ACUAAABYAAAAAAAAAAAAAAAAAAAAAAAAAAAAAAAAAAAAAAAAAAAAAAAAAAAAAAAAAAAAAAA/AAAAAAAAAKCGAQAAAAAAAAAAAAAAAAAMAAAAAQAAAAAAAAAAAAAAAAAAAB8AAABUAAAAAAAABQAAAAEAAAAAAAAAAAAAAAAAAAAAAAAAAAAAAAAAAAAAAAAAAAAAAAJ/f38AAAAAA8zMzADAwP8Af39/AAAAAAAAAAAAAAAAAAAAAAAAAAAAIQAAABgAAAAUAAAAwAMAABsnAAA/FQAAWSkAABAAAAAmAAAACAAAAAAAAAAAAAAA"/>
+                <pr:smNativeData xmlns:pr="smNativeData" xmlns="smNativeData" val="SMDATA_15_NygcZBMAAAAlAAAAZAAAAA8BAAAAkAAAAEgAAACQAAAASAAAAAAAAAABAAAAAAAAAAEAAABQAAAAAAAAAAAA4D8AAAAAAADgPwAAAAAAAOA/AAAAAAAA4D8AAAAAAADgPwAAAAAAAOA/AAAAAAAA4D8AAAAAAADgPwAAAAAAAOA/AAAAAAAA4D8CAAAAjAAAAAAAAAAAAAAAu+DjDP///wgAAAAAAAAAAAAAAAAAAAAAAAAAAAAAAAAAAAAAZAAAAAEAAABAAAAAAAAAAAAAAAAAAAAAAAAAAAAAAAAAAAAAAAAAAAAAAAAAAAAAAAAAAAAAAAAAAAAAAAAAAAAAAAAAAAAAAAAAAAAAAAAAAAAAAAAAAAAAAAAAAAAAFAAAADwAAAAAAAAAAAAAAAAAAAkUAAAAAQAAABQAAAAUAAAAFAAAAAEAAAAAAAAAZAAAAGQAAAAAAAAAZAAAAGQAAAAVAAAAYAAAAAAAAAAAAAAADwAAACADAAAAAAAAAAAAAAEAAACgMgAAVgcAAKr4//8BAAAAf39/AAEAAABkAAAAAAAAABQAAABAHwAAAAAAACYAAAAAAAAAwOD//wAAAAAmAAAAZAAAABYAAABMAAAAAAAAAAAAAAAEAAAAAAAAAAEAAACAgIAKAAAAACgAAAAoAAAAZAAAAGQAAAAAAAAAzMzMAAAAAABQAAAAUAAAAGQAAABkAAAAAAAAABcAAAAUAAAAAAAAAAAAAAD/fwAA/38AAAAAAAAJAAAABAAAAAAAAAAeAAAAaAAAAAAAAAAAAAAAAAAAAAAAAAAAAAAAECcAABAnAAAAAAAAAAAAAAAAAAAAAAAAAAAAAAAAAAAAAAAAAAAAABQAAAAAAAAAwMD/AAAAAABkAAAAMgAAAAAAAABkAAAAAAAAAH9/fwAKAAAAIgAAABgAAAAAAAAAAAAAAAAAAAAAAAAAAAAAAAAAAAAkAAAAJAAAAAAAAAAHAAAAAAAAAAAAAAAAAAAAAAAAAAAAAAAAAAAAf39/ACUAAABYAAAAAAAAAAAAAAAAAAAAAAAAAAAAAAAAAAAAAAAAAAAAAAAAAAAAAAAAAAAAAAA/AAAAAAAAAKCGAQAAAAAAAAAAAAAAAAAMAAAAAQAAAAAAAAAAAAAAAAAAAB8AAABUAAAAAAAABQAAAAEAAAAAAAAAAAAAAAAAAAAAAAAAAAAAAAAAAAAAAAAAAAAAAAJ/f38AAAAAA8zMzADAwP8Af39/AAAAAAAAAAAAAAAAAAAAAAAAAAAAIQAAABgAAAAUAAAAwAMAABsnAAA/FQAAWSkAABAAAAAmAAAACAAAAAAAAAAAAAAA"/>
               </a:ext>
             </a:extLst>
           </p:cNvSpPr>
@@ -2707,7 +2708,7 @@
           <a:lstStyle/>
           <a:p>
             <a:pPr/>
-            <a:fld id="{3A26D538-76D7-7323-999E-80769BD06FD5}" type="datetime1">
+            <a:fld id="{39DFFB2D-63D4-8A0D-9A67-9558B5296CC0}" type="datetime1">
               <a:t/>
             </a:fld>
           </a:p>
@@ -2720,7 +2721,7 @@
             <a:spLocks noGrp="1" noChangeArrowheads="1"/>
             <a:extLst>
               <a:ext uri="smNativeData">
-                <pr:smNativeData xmlns:pr="smNativeData" xmlns="smNativeData" val="SMDATA_15_ucsbZBMAAAAlAAAAZAAAAA8BAAAAkAAAAEgAAACQAAAASAAAAAAAAAABAAAAAAAAAAEAAABQAAAAAAAAAAAA4D8AAAAAAADgPwAAAAAAAOA/AAAAAAAA4D8AAAAAAADgPwAAAAAAAOA/AAAAAAAA4D8AAAAAAADgPwAAAAAAAOA/AAAAAAAA4D8CAAAAjAAAAAAAAAAAAAAAu+DjDP///wgAAAAAAAAAAAAAAAAAAAAAAAAAAAAAAAAAAAAAZAAAAAEAAABAAAAAAAAAAAAAAAAAAAAAAAAAAAAAAAAAAAAAAAAAAAAAAAAAAAAAAAAAAAAAAAAAAAAAAAAAAAAAAAAAAAAAAAAAAAAAAAAAAAAAAAAAAAAAAAAAAAAAFAAAADwAAAAAAAAAAAAAAAAAAAkUAAAAAQAAABQAAAAUAAAAFAAAAAEAAAAAAAAAZAAAAGQAAAAAAAAAZAAAAGQAAAAVAAAAYAAAAAAAAAAAAAAADwAAACADAAAAAAAAAAAAAAEAAACgMgAAVgcAAKr4//8BAAAAf39/AAEAAABkAAAAAAAAABQAAABAHwAAAAAAACYAAAAAAAAAwOD//wAAAAAmAAAAZAAAABYAAABMAAAAAAAAAAAAAAAEAAAAAAAAAAEAAACAgIAKAAAAACgAAAAoAAAAZAAAAGQAAAAAAAAAzMzMAAAAAABQAAAAUAAAAGQAAABkAAAAAAAAABcAAAAUAAAAAAAAAAAAAAD/fwAA/38AAAAAAAAJAAAABAAAAAAAAAAeAAAAaAAAAAAAAAAAAAAAAAAAAAAAAAAAAAAAECcAABAnAAAAAAAAAAAAAAAAAAAAAAAAAAAAAAAAAAAAAAAAAAAAABQAAAAAAAAAwMD/AAAAAABkAAAAMgAAAAAAAABkAAAAAAAAAH9/fwAKAAAAIgAAABgAAAAAAAAAAAAAAAAAAAAAAAAAAAAAAAAAAAAkAAAAJAAAAAAAAAAHAAAAAAAAAAAAAAAAAAAAAAAAAAAAAAAAAAAAf39/ACUAAABYAAAAAAAAAAAAAAAAAAAAAAAAAAAAAAAAAAAAAAAAAAAAAAAAAAAAAAAAAAAAAAA/AAAAAAAAAKCGAQAAAAAAAAAAAAAAAAAMAAAAAQAAAAAAAAAAAAAAAAAAAB8AAABUAAAAAAAABQAAAAEAAAAAAAAAAAAAAAAAAAAAAAAAAAAAAAAAAAAAAAAAAAAAAAJ/f38AAAAAA8zMzADAwP8Af39/AAAAAAAAAAAAAAAAAAAAAAAAAAAAIQAAABgAAAAUAAAAoRkAABsnAABfMQAAWSkAABAAAAAmAAAACAAAAAAAAAAAAAAA"/>
+                <pr:smNativeData xmlns:pr="smNativeData" xmlns="smNativeData" val="SMDATA_15_NygcZBMAAAAlAAAAZAAAAA8BAAAAkAAAAEgAAACQAAAASAAAAAAAAAABAAAAAAAAAAEAAABQAAAAAAAAAAAA4D8AAAAAAADgPwAAAAAAAOA/AAAAAAAA4D8AAAAAAADgPwAAAAAAAOA/AAAAAAAA4D8AAAAAAADgPwAAAAAAAOA/AAAAAAAA4D8CAAAAjAAAAAAAAAAAAAAAu+DjDP///wgAAAAAAAAAAAAAAAAAAAAAAAAAAAAAAAAAAAAAZAAAAAEAAABAAAAAAAAAAAAAAAAAAAAAAAAAAAAAAAAAAAAAAAAAAAAAAAAAAAAAAAAAAAAAAAAAAAAAAAAAAAAAAAAAAAAAAAAAAAAAAAAAAAAAAAAAAAAAAAAAAAAAFAAAADwAAAAAAAAAAAAAAAAAAAkUAAAAAQAAABQAAAAUAAAAFAAAAAEAAAAAAAAAZAAAAGQAAAAAAAAAZAAAAGQAAAAVAAAAYAAAAAAAAAAAAAAADwAAACADAAAAAAAAAAAAAAEAAACgMgAAVgcAAKr4//8BAAAAf39/AAEAAABkAAAAAAAAABQAAABAHwAAAAAAACYAAAAAAAAAwOD//wAAAAAmAAAAZAAAABYAAABMAAAAAAAAAAAAAAAEAAAAAAAAAAEAAACAgIAKAAAAACgAAAAoAAAAZAAAAGQAAAAAAAAAzMzMAAAAAABQAAAAUAAAAGQAAABkAAAAAAAAABcAAAAUAAAAAAAAAAAAAAD/fwAA/38AAAAAAAAJAAAABAAAAAAAAAAeAAAAaAAAAAAAAAAAAAAAAAAAAAAAAAAAAAAAECcAABAnAAAAAAAAAAAAAAAAAAAAAAAAAAAAAAAAAAAAAAAAAAAAABQAAAAAAAAAwMD/AAAAAABkAAAAMgAAAAAAAABkAAAAAAAAAH9/fwAKAAAAIgAAABgAAAAAAAAAAAAAAAAAAAAAAAAAAAAAAAAAAAAkAAAAJAAAAAAAAAAHAAAAAAAAAAAAAAAAAAAAAAAAAAAAAAAAAAAAf39/ACUAAABYAAAAAAAAAAAAAAAAAAAAAAAAAAAAAAAAAAAAAAAAAAAAAAAAAAAAAAAAAAAAAAA/AAAAAAAAAKCGAQAAAAAAAAAAAAAAAAAMAAAAAQAAAAAAAAAAAAAAAAAAAB8AAABUAAAAAAAABQAAAAEAAAAAAAAAAAAAAAAAAAAAAAAAAAAAAAAAAAAAAAAAAAAAAAJ/f38AAAAAA8zMzADAwP8Af39/AAAAAAAAAAAAAAAAAAAAAAAAAAAAIQAAABgAAAAUAAAAoRkAABsnAABfMQAAWSkAABAAAAAmAAAACAAAAAAAAAAAAAAA"/>
               </a:ext>
             </a:extLst>
           </p:cNvSpPr>
@@ -2747,7 +2748,7 @@
             <a:spLocks noGrp="1" noChangeArrowheads="1"/>
             <a:extLst>
               <a:ext uri="smNativeData">
-                <pr:smNativeData xmlns:pr="smNativeData" xmlns="smNativeData" val="SMDATA_15_ucsbZBMAAAAlAAAAZAAAAA8BAAAAkAAAAEgAAACQAAAASAAAAAAAAAABAAAAAAAAAAEAAABQAAAAAAAAAAAA4D8AAAAAAADgPwAAAAAAAOA/AAAAAAAA4D8AAAAAAADgPwAAAAAAAOA/AAAAAAAA4D8AAAAAAADgPwAAAAAAAOA/AAAAAAAA4D8CAAAAjAAAAAAAAAAAAAAAu+DjDP///wgAAAAAAAAAAAAAAAAAAAAAAAAAAAAAAAAAAAAAZAAAAAEAAABAAAAAAAAAAAAAAAAAAAAAAAAAAAAAAAAAAAAAAAAAAAAAAAAAAAAAAAAAAAAAAAAAAAAAAAAAAAAAAAAAAAAAAAAAAAAAAAAAAAAAAAAAAAAAAAAAAAAAFAAAADwAAAAAAAAAAAAAAAAAAAkUAAAAAQAAABQAAAAUAAAAFAAAAAEAAAAAAAAAZAAAAGQAAAAAAAAAZAAAAGQAAAAVAAAAYAAAAAAAAAAAAAAADwAAACADAAAAAAAAAAAAAAEAAACgMgAAVgcAAKr4//8BAAAAf39/AAEAAABkAAAAAAAAABQAAABAHwAAAAAAACYAAAAAAAAAwOD//wAAAAAmAAAAZAAAABYAAABMAAAAAAAAAAAAAAAEAAAAAAAAAAEAAACAgIAKAAAAACgAAAAoAAAAZAAAAGQAAAAAAAAAzMzMAAAAAABQAAAAUAAAAGQAAABkAAAAAAAAABcAAAAUAAAAAAAAAAAAAAD/fwAA/38AAAAAAAAJAAAABAAAAAAAAAAeAAAAaAAAAAAAAAAAAAAAAAAAAAAAAAAAAAAAECcAABAnAAAAAAAAAAAAAAAAAAAAAAAAAAAAAAAAAAAAAAAAAAAAABQAAAAAAAAAwMD/AAAAAABkAAAAMgAAAAAAAABkAAAAAAAAAH9/fwAKAAAAIgAAABgAAAAAAAAAAAAAAAAAAAAAAAAAAAAAAAAAAAAkAAAAJAAAAAAAAAAHAAAAAAAAAAAAAAAAAAAAAAAAAAAAAAAAAAAAf39/ACUAAABYAAAAAAAAAAAAAAAAAAAAAAAAAAAAAAAAAAAAAAAAAAAAAAAAAAAAAAAAAAAAAAA/AAAAAAAAAKCGAQAAAAAAAAAAAAAAAAAMAAAAAQAAAAAAAAAAAAAAAAAAAB8AAABUAAAAAAAABQAAAAEAAAAAAAAAAAAAAAAAAAAAAAAAAAAAAAAAAAAAAAAAAAAAAAJ/f38AAAAAA8zMzADAwP8Af39/AAAAAAAAAAAAAAAAAAAAAAAAAAAAIQAAABgAAAAUAAAAwTUAABsnAABARwAAWSkAABAAAAAmAAAACAAAAAAAAAAAAAAA"/>
+                <pr:smNativeData xmlns:pr="smNativeData" xmlns="smNativeData" val="SMDATA_15_NygcZBMAAAAlAAAAZAAAAA8BAAAAkAAAAEgAAACQAAAASAAAAAAAAAABAAAAAAAAAAEAAABQAAAAAAAAAAAA4D8AAAAAAADgPwAAAAAAAOA/AAAAAAAA4D8AAAAAAADgPwAAAAAAAOA/AAAAAAAA4D8AAAAAAADgPwAAAAAAAOA/AAAAAAAA4D8CAAAAjAAAAAAAAAAAAAAAu+DjDP///wgAAAAAAAAAAAAAAAAAAAAAAAAAAAAAAAAAAAAAZAAAAAEAAABAAAAAAAAAAAAAAAAAAAAAAAAAAAAAAAAAAAAAAAAAAAAAAAAAAAAAAAAAAAAAAAAAAAAAAAAAAAAAAAAAAAAAAAAAAAAAAAAAAAAAAAAAAAAAAAAAAAAAFAAAADwAAAAAAAAAAAAAAAAAAAkUAAAAAQAAABQAAAAUAAAAFAAAAAEAAAAAAAAAZAAAAGQAAAAAAAAAZAAAAGQAAAAVAAAAYAAAAAAAAAAAAAAADwAAACADAAAAAAAAAAAAAAEAAACgMgAAVgcAAKr4//8BAAAAf39/AAEAAABkAAAAAAAAABQAAABAHwAAAAAAACYAAAAAAAAAwOD//wAAAAAmAAAAZAAAABYAAABMAAAAAAAAAAAAAAAEAAAAAAAAAAEAAACAgIAKAAAAACgAAAAoAAAAZAAAAGQAAAAAAAAAzMzMAAAAAABQAAAAUAAAAGQAAABkAAAAAAAAABcAAAAUAAAAAAAAAAAAAAD/fwAA/38AAAAAAAAJAAAABAAAAAAAAAAeAAAAaAAAAAAAAAAAAAAAAAAAAAAAAAAAAAAAECcAABAnAAAAAAAAAAAAAAAAAAAAAAAAAAAAAAAAAAAAAAAAAAAAABQAAAAAAAAAwMD/AAAAAABkAAAAMgAAAAAAAABkAAAAAAAAAH9/fwAKAAAAIgAAABgAAAAAAAAAAAAAAAAAAAAAAAAAAAAAAAAAAAAkAAAAJAAAAAAAAAAHAAAAAAAAAAAAAAAAAAAAAAAAAAAAAAAAAAAAf39/ACUAAABYAAAAAAAAAAAAAAAAAAAAAAAAAAAAAAAAAAAAAAAAAAAAAAAAAAAAAAAAAAAAAAA/AAAAAAAAAKCGAQAAAAAAAAAAAAAAAAAMAAAAAQAAAAAAAAAAAAAAAAAAAB8AAABUAAAAAAAABQAAAAEAAAAAAAAAAAAAAAAAAAAAAAAAAAAAAAAAAAAAAAAAAAAAAAJ/f38AAAAAA8zMzADAwP8Af39/AAAAAAAAAAAAAAAAAAAAAAAAAAAAIQAAABgAAAAUAAAAwTUAABsnAABARwAAWSkAABAAAAAmAAAACAAAAAAAAAAAAAAA"/>
               </a:ext>
             </a:extLst>
           </p:cNvSpPr>
@@ -2761,7 +2762,7 @@
           <a:lstStyle/>
           <a:p>
             <a:pPr/>
-            <a:fld id="{3A26F5A9-E7D7-7303-999E-1156BBD06F44}" type="slidenum">
+            <a:fld id="{39DFA215-5BD4-8A54-9A67-AD01EC296CF8}" type="slidenum">
               <a:t/>
             </a:fld>
           </a:p>
@@ -2807,7 +2808,7 @@
             <a:spLocks noGrp="1" noChangeArrowheads="1"/>
             <a:extLst>
               <a:ext uri="smNativeData">
-                <pr:smNativeData xmlns:pr="smNativeData" xmlns="smNativeData" val="SMDATA_15_ucsbZBMAAAAlAAAAZAAAAA8BAAAAkAAAAEgAAACQAAAASAAAAAAAAAABAAAAAAAAAAEAAABQAAAAAAAAAAAA4D8AAAAAAADgPwAAAAAAAOA/AAAAAAAA4D8AAAAAAADgPwAAAAAAAOA/AAAAAAAA4D8AAAAAAADgPwAAAAAAAOA/AAAAAAAA4D8CAAAAjAAAAAAAAAAAAAAAu+DjDP///wgAAAAAAAAAAAAAAAAAAAAAAAAAAAAAAAAAAAAAZAAAAAEAAABAAAAAAAAAAAAAAAAAAAAAAAAAAAAAAAAAAAAAAAAAAAAAAAAAAAAAAAAAAAAAAAAAAAAAAAAAAAAAAAAAAAAAAAAAAAAAAAAAAAAAAAAAAAAAAAAAAAAAFAAAADwAAAAAAAAAAAAAAAAAAAkUAAAAAQAAABQAAAAUAAAAFAAAAAEAAAAAAAAAZAAAAGQAAAAAAAAAZAAAAGQAAAAVAAAAYAAAAAAAAAAAAAAADwAAACADAAAAAAAAAAAAAAEAAACgMgAAVgcAAKr4//8BAAAAf39/AAEAAABkAAAAAAAAABQAAABAHwAAAAAAACYAAAAAAAAAwOD//wAAAAAmAAAAZAAAABYAAABMAAAAAAAAAAAAAAAEAAAAAAAAAAEAAACAgIAKAAAAACgAAAAoAAAAZAAAAGQAAAAAAAAAzMzMAAAAAABQAAAAUAAAAGQAAABkAAAAAAAAABcAAAAUAAAAAAAAAAAAAAD/fwAA/38AAAAAAAAJAAAABAAAAHsAfAAeAAAAaAAAAAAAAAAAAAAAAAAAAAAAAAAAAAAAECcAABAnAAAAAAAAAAAAAAAAAAAAAAAAAAAAAAAAAAAAAAAAAAAAABQAAAAAAAAAwMD/AAAAAABkAAAAMgAAAAAAAABkAAAAAAAAAH9/fwAKAAAAIgAAABgAAAAAAAAAAAAAAAAAAAAAAAAAAAAAAAAAAAAkAAAAJAAAAAAAAAAHAAAAAAAAAAAAAAAAAAAAAAAAAAAAAAAAAAAAf39/ACUAAABYAAAAAAAAAAAAAAAAAAAAAAAAAAAAAAAAAAAAAAAAAAAAAAAAAAAAAAAAAAAAAAA/AAAAAAAAAKCGAQAAAAAAAAAAAAAAAAAMAAAAAQAAAAAAAAAAAAAAAAAAAB8AAABUAAAAAAAABQAAAAEAAAAAAAAAAAAAAAAAAAAAAAAAAAAAAAAAAAAAAAAAAAAAAAJ/f38AAAAAA8zMzADAwP8Af39/AAAAAAAAAAAAAAAAAAAAAAAAAAAAIQAAABgAAAAUAAAAwAMAALABAABARwAAuAgAABAAAAAmAAAACAAAAP//////////"/>
+                <pr:smNativeData xmlns:pr="smNativeData" xmlns="smNativeData" val="SMDATA_15_NygcZBMAAAAlAAAAZAAAAA8BAAAAkAAAAEgAAACQAAAASAAAAAAAAAABAAAAAAAAAAEAAABQAAAAAAAAAAAA4D8AAAAAAADgPwAAAAAAAOA/AAAAAAAA4D8AAAAAAADgPwAAAAAAAOA/AAAAAAAA4D8AAAAAAADgPwAAAAAAAOA/AAAAAAAA4D8CAAAAjAAAAAAAAAAAAAAAu+DjDP///wgAAAAAAAAAAAAAAAAAAAAAAAAAAAAAAAAAAAAAZAAAAAEAAABAAAAAAAAAAAAAAAAAAAAAAAAAAAAAAAAAAAAAAAAAAAAAAAAAAAAAAAAAAAAAAAAAAAAAAAAAAAAAAAAAAAAAAAAAAAAAAAAAAAAAAAAAAAAAAAAAAAAAFAAAADwAAAAAAAAAAAAAAAAAAAkUAAAAAQAAABQAAAAUAAAAFAAAAAEAAAAAAAAAZAAAAGQAAAAAAAAAZAAAAGQAAAAVAAAAYAAAAAAAAAAAAAAADwAAACADAAAAAAAAAAAAAAEAAACgMgAAVgcAAKr4//8BAAAAf39/AAEAAABkAAAAAAAAABQAAABAHwAAAAAAACYAAAAAAAAAwOD//wAAAAAmAAAAZAAAABYAAABMAAAAAAAAAAAAAAAEAAAAAAAAAAEAAACAgIAKAAAAACgAAAAoAAAAZAAAAGQAAAAAAAAAzMzMAAAAAABQAAAAUAAAAGQAAABkAAAAAAAAABcAAAAUAAAAAAAAAAAAAAD/fwAA/38AAAAAAAAJAAAABAAAAHsAfAAeAAAAaAAAAAAAAAAAAAAAAAAAAAAAAAAAAAAAECcAABAnAAAAAAAAAAAAAAAAAAAAAAAAAAAAAAAAAAAAAAAAAAAAABQAAAAAAAAAwMD/AAAAAABkAAAAMgAAAAAAAABkAAAAAAAAAH9/fwAKAAAAIgAAABgAAAAAAAAAAAAAAAAAAAAAAAAAAAAAAAAAAAAkAAAAJAAAAAAAAAAHAAAAAAAAAAAAAAAAAAAAAAAAAAAAAAAAAAAAf39/ACUAAABYAAAAAAAAAAAAAAAAAAAAAAAAAAAAAAAAAAAAAAAAAAAAAAAAAAAAAAAAAAAAAAA/AAAAAAAAAKCGAQAAAAAAAAAAAAAAAAAMAAAAAQAAAAAAAAAAAAAAAAAAAB8AAABUAAAAAAAABQAAAAEAAAAAAAAAAAAAAAAAAAAAAAAAAAAAAAAAAAAAAAAAAAAAAAJ/f38AAAAAA8zMzADAwP8Af39/AAAAAAAAAAAAAAAAAAAAAAAAAAAAIQAAABgAAAAUAAAAwAMAALABAABARwAAuAgAABAAAAAmAAAACAAAAP//////////"/>
               </a:ext>
             </a:extLst>
           </p:cNvSpPr>
@@ -2851,7 +2852,7 @@
             <a:spLocks noGrp="1" noChangeArrowheads="1"/>
             <a:extLst>
               <a:ext uri="smNativeData">
-                <pr:smNativeData xmlns:pr="smNativeData" xmlns="smNativeData" val="SMDATA_15_ucsbZBMAAAAlAAAAZAAAAA8BAAAAkAAAAEgAAACQAAAASAAAAAAAAAAAAAAAAAAAAAEAAABQAAAAAAAAAAAA4D8AAAAAAADgPwAAAAAAAOA/AAAAAAAA4D8AAAAAAADgPwAAAAAAAOA/AAAAAAAA4D8AAAAAAADgPwAAAAAAAOA/AAAAAAAA4D8CAAAAjAAAAAAAAAAAAAAAu+DjDP///wgAAAAAAAAAAAAAAAAAAAAAAAAAAAAAAAAAAAAAZAAAAAEAAABAAAAAAAAAAAAAAAAAAAAAAAAAAAAAAAAAAAAAAAAAAAAAAAAAAAAAAAAAAAAAAAAAAAAAAAAAAAAAAAAAAAAAAAAAAAAAAAAAAAAAAAAAAAAAAAAAAAAAFAAAADwAAAAAAAAAAAAAAAAAAAkUAAAAAQAAABQAAAAUAAAAFAAAAAEAAAAAAAAAZAAAAGQAAAAAAAAAZAAAAGQAAAAVAAAAYAAAAAAAAAAAAAAADwAAACADAAAAAAAAAAAAAAEAAACgMgAAVgcAAKr4//8BAAAAf39/AAEAAABkAAAAAAAAABQAAABAHwAAAAAAACYAAAAAAAAAwOD//wAAAAAmAAAAZAAAABYAAABMAAAAAAAAAAAAAAAEAAAAAAAAAAEAAACAgIAKAAAAACgAAAAoAAAAZAAAAGQAAAAAAAAAzMzMAAAAAABQAAAAUAAAAGQAAABkAAAAAAAAABcAAAAUAAAAAAAAAAAAAAD/fwAA/38AAAAAAAAJAAAABAAAAHsAfAAeAAAAaAAAAAAAAAAAAAAAAAAAAAAAAAAAAAAAECcAABAnAAAAAAAAAAAAAAAAAAAAAAAAAAAAAAAAAAAAAAAAAAAAABQAAAAAAAAAwMD/AAAAAABkAAAAMgAAAAAAAABkAAAAAAAAAH9/fwAKAAAAIgAAABgAAAAAAAAAAAAAAAAAAAAAAAAAAAAAAAAAAAAkAAAAJAAAAAAAAAAHAAAAAAAAAAAAAAAAAAAAAAAAAAAAAAAAAAAAf39/ACUAAABYAAAAAAAAAAAAAAAAAAAAAAAAAAAAAAAAAAAAAAAAAAAAAAAAAAAAAAAAAAAAAAA/AAAAAAAAAKCGAQAAAAAAAAAAAAAAAAAMAAAAAQAAAAAAAAAAAAAAAAAAAB8AAABUAAAAAAAABQAAAAEAAAAAAAAAAAAAAAAAAAAAAAAAAAAAAAAAAAAAAAAAAAAAAAJ/f38AAAAAA8zMzADAwP8Af39/AAAAAAAAAAAAAAAAAAAAAAAAAAAAIQAAABgAAAAUAAAAwAMAANgJAABARwAAsCUAABAAAAAmAAAACAAAAP//////////"/>
+                <pr:smNativeData xmlns:pr="smNativeData" xmlns="smNativeData" val="SMDATA_15_NygcZBMAAAAlAAAAZAAAAA8BAAAAkAAAAEgAAACQAAAASAAAAAAAAAAAAAAAAAAAAAEAAABQAAAAAAAAAAAA4D8AAAAAAADgPwAAAAAAAOA/AAAAAAAA4D8AAAAAAADgPwAAAAAAAOA/AAAAAAAA4D8AAAAAAADgPwAAAAAAAOA/AAAAAAAA4D8CAAAAjAAAAAAAAAAAAAAAu+DjDP///wgAAAAAAAAAAAAAAAAAAAAAAAAAAAAAAAAAAAAAZAAAAAEAAABAAAAAAAAAAAAAAAAAAAAAAAAAAAAAAAAAAAAAAAAAAAAAAAAAAAAAAAAAAAAAAAAAAAAAAAAAAAAAAAAAAAAAAAAAAAAAAAAAAAAAAAAAAAAAAAAAAAAAFAAAADwAAAAAAAAAAAAAAAAAAAkUAAAAAQAAABQAAAAUAAAAFAAAAAEAAAAAAAAAZAAAAGQAAAAAAAAAZAAAAGQAAAAVAAAAYAAAAAAAAAAAAAAADwAAACADAAAAAAAAAAAAAAEAAACgMgAAVgcAAKr4//8BAAAAf39/AAEAAABkAAAAAAAAABQAAABAHwAAAAAAACYAAAAAAAAAwOD//wAAAAAmAAAAZAAAABYAAABMAAAAAAAAAAAAAAAEAAAAAAAAAAEAAACAgIAKAAAAACgAAAAoAAAAZAAAAGQAAAAAAAAAzMzMAAAAAABQAAAAUAAAAGQAAABkAAAAAAAAABcAAAAUAAAAAAAAAAAAAAD/fwAA/38AAAAAAAAJAAAABAAAAHsAfAAeAAAAaAAAAAAAAAAAAAAAAAAAAAAAAAAAAAAAECcAABAnAAAAAAAAAAAAAAAAAAAAAAAAAAAAAAAAAAAAAAAAAAAAABQAAAAAAAAAwMD/AAAAAABkAAAAMgAAAAAAAABkAAAAAAAAAH9/fwAKAAAAIgAAABgAAAAAAAAAAAAAAAAAAAAAAAAAAAAAAAAAAAAkAAAAJAAAAAAAAAAHAAAAAAAAAAAAAAAAAAAAAAAAAAAAAAAAAAAAf39/ACUAAABYAAAAAAAAAAAAAAAAAAAAAAAAAAAAAAAAAAAAAAAAAAAAAAAAAAAAAAAAAAAAAAA/AAAAAAAAAKCGAQAAAAAAAAAAAAAAAAAMAAAAAQAAAAAAAAAAAAAAAAAAAB8AAABUAAAAAAAABQAAAAEAAAAAAAAAAAAAAAAAAAAAAAAAAAAAAAAAAAAAAAAAAAAAAAJ/f38AAAAAA8zMzADAwP8Af39/AAAAAAAAAAAAAAAAAAAAAAAAAAAAIQAAABgAAAAUAAAAwAMAANgJAABARwAAsCUAABAAAAAmAAAACAAAAP//////////"/>
               </a:ext>
             </a:extLst>
           </p:cNvSpPr>
@@ -2919,7 +2920,7 @@
             <a:spLocks noGrp="1" noChangeArrowheads="1"/>
             <a:extLst>
               <a:ext uri="smNativeData">
-                <pr:smNativeData xmlns:pr="smNativeData" xmlns="smNativeData" val="SMDATA_15_ucsbZBMAAAAlAAAAZAAAAA8BAAAAkAAAAEgAAACQAAAASAAAAAAAAAABAAAAAAAAAAEAAABQAAAAAAAAAAAA4D8AAAAAAADgPwAAAAAAAOA/AAAAAAAA4D8AAAAAAADgPwAAAAAAAOA/AAAAAAAA4D8AAAAAAADgPwAAAAAAAOA/AAAAAAAA4D8CAAAAjAAAAAAAAAAAAAAAu+DjDP///wgAAAAAAAAAAAAAAAAAAAAAAAAAAAAAAAAAAAAAZAAAAAEAAABAAAAAAAAAAAAAAAAAAAAAAAAAAAAAAAAAAAAAAAAAAAAAAAAAAAAAAAAAAAAAAAAAAAAAAAAAAAAAAAAAAAAAAAAAAAAAAAAAAAAAAAAAAAAAAAAAAAAAFAAAADwAAAAAAAAAAAAAAAAAAAkUAAAAAQAAABQAAAAUAAAAFAAAAAEAAAAAAAAAZAAAAGQAAAAAAAAAZAAAAGQAAAAVAAAAYAAAAAAAAAAAAAAADwAAACADAAAAAAAAAAAAAAEAAACgMgAAVgcAAKr4//8BAAAAf39/AAEAAABkAAAAAAAAABQAAABAHwAAAAAAACYAAAAAAAAAwOD//wAAAAAmAAAAZAAAABYAAABMAAAAAAAAAAAAAAAEAAAAAAAAAAEAAACAgIAKAAAAACgAAAAoAAAAZAAAAGQAAAAAAAAAzMzMAAAAAABQAAAAUAAAAGQAAABkAAAAAAAAABcAAAAUAAAAAAAAAAAAAAD/fwAA/38AAAAAAAAJAAAABAAAAHsAfAAeAAAAaAAAAAAAAAAAAAAAAAAAAAAAAAAAAAAAECcAABAnAAAAAAAAAAAAAAAAAAAAAAAAAAAAAAAAAAAAAAAAAAAAABQAAAAAAAAAwMD/AAAAAABkAAAAMgAAAAAAAABkAAAAAAAAAH9/fwAKAAAAIgAAABgAAAAAAAAAAAAAAAAAAAAAAAAAAAAAAAAAAAAkAAAAJAAAAAAAAAAHAAAAAAAAAAAAAAAAAAAAAAAAAAAAAAAAAAAAf39/ACUAAABYAAAAAAAAAAAAAAAAAAAAAAAAAAAAAAAAAAAAAAAAAAAAAAAAAAAAAAAAAAAAAAA/AAAAAAAAAKCGAQAAAAAAAAAAAAAAAAAMAAAAAQAAAAAAAAAAAAAAAAAAAB8AAABUAAAAAAAABQAAAAEAAAAAAAAAAAAAAAAAAAAAAAAAAAAAAAAAAAAAAAAAAAAAAAJ/f38AAAAAA8zMzADAwP8Af39/AAAAAAAAAAAAAAAAAAAAAAAAAAAAIQAAABgAAAAUAAAAwAMAABsnAAA/FQAAWSkAABAAAAAmAAAACAAAAP//////////"/>
+                <pr:smNativeData xmlns:pr="smNativeData" xmlns="smNativeData" val="SMDATA_15_NygcZBMAAAAlAAAAZAAAAA8BAAAAkAAAAEgAAACQAAAASAAAAAAAAAABAAAAAAAAAAEAAABQAAAAAAAAAAAA4D8AAAAAAADgPwAAAAAAAOA/AAAAAAAA4D8AAAAAAADgPwAAAAAAAOA/AAAAAAAA4D8AAAAAAADgPwAAAAAAAOA/AAAAAAAA4D8CAAAAjAAAAAAAAAAAAAAAu+DjDP///wgAAAAAAAAAAAAAAAAAAAAAAAAAAAAAAAAAAAAAZAAAAAEAAABAAAAAAAAAAAAAAAAAAAAAAAAAAAAAAAAAAAAAAAAAAAAAAAAAAAAAAAAAAAAAAAAAAAAAAAAAAAAAAAAAAAAAAAAAAAAAAAAAAAAAAAAAAAAAAAAAAAAAFAAAADwAAAAAAAAAAAAAAAAAAAkUAAAAAQAAABQAAAAUAAAAFAAAAAEAAAAAAAAAZAAAAGQAAAAAAAAAZAAAAGQAAAAVAAAAYAAAAAAAAAAAAAAADwAAACADAAAAAAAAAAAAAAEAAACgMgAAVgcAAKr4//8BAAAAf39/AAEAAABkAAAAAAAAABQAAABAHwAAAAAAACYAAAAAAAAAwOD//wAAAAAmAAAAZAAAABYAAABMAAAAAAAAAAAAAAAEAAAAAAAAAAEAAACAgIAKAAAAACgAAAAoAAAAZAAAAGQAAAAAAAAAzMzMAAAAAABQAAAAUAAAAGQAAABkAAAAAAAAABcAAAAUAAAAAAAAAAAAAAD/fwAA/38AAAAAAAAJAAAABAAAAHsAfAAeAAAAaAAAAAAAAAAAAAAAAAAAAAAAAAAAAAAAECcAABAnAAAAAAAAAAAAAAAAAAAAAAAAAAAAAAAAAAAAAAAAAAAAABQAAAAAAAAAwMD/AAAAAABkAAAAMgAAAAAAAABkAAAAAAAAAH9/fwAKAAAAIgAAABgAAAAAAAAAAAAAAAAAAAAAAAAAAAAAAAAAAAAkAAAAJAAAAAAAAAAHAAAAAAAAAAAAAAAAAAAAAAAAAAAAAAAAAAAAf39/ACUAAABYAAAAAAAAAAAAAAAAAAAAAAAAAAAAAAAAAAAAAAAAAAAAAAAAAAAAAAAAAAAAAAA/AAAAAAAAAKCGAQAAAAAAAAAAAAAAAAAMAAAAAQAAAAAAAAAAAAAAAAAAAB8AAABUAAAAAAAABQAAAAEAAAAAAAAAAAAAAAAAAAAAAAAAAAAAAAAAAAAAAAAAAAAAAAJ/f38AAAAAA8zMzADAwP8Af39/AAAAAAAAAAAAAAAAAAAAAAAAAAAAIQAAABgAAAAUAAAAwAMAABsnAAA/FQAAWSkAABAAAAAmAAAACAAAAP//////////"/>
               </a:ext>
             </a:extLst>
           </p:cNvSpPr>
@@ -2954,7 +2955,7 @@
           </a:lstStyle>
           <a:p>
             <a:pPr/>
-            <a:fld id="{3A26EFA1-EFD7-7319-999E-194CA1D06F4C}" type="datetime1">
+            <a:fld id="{39DFC837-79D4-8A3E-9A67-8F6B86296CDA}" type="datetime1">
               <a:t/>
             </a:fld>
           </a:p>
@@ -2967,7 +2968,7 @@
             <a:spLocks noGrp="1" noChangeArrowheads="1"/>
             <a:extLst>
               <a:ext uri="smNativeData">
-                <pr:smNativeData xmlns:pr="smNativeData" xmlns="smNativeData" val="SMDATA_15_ucsbZBMAAAAlAAAAZAAAAA8BAAAAkAAAAEgAAACQAAAASAAAAAAAAAABAAAAAAAAAAEAAABQAAAAAAAAAAAA4D8AAAAAAADgPwAAAAAAAOA/AAAAAAAA4D8AAAAAAADgPwAAAAAAAOA/AAAAAAAA4D8AAAAAAADgPwAAAAAAAOA/AAAAAAAA4D8CAAAAjAAAAAAAAAAAAAAAu+DjDP///wgAAAAAAAAAAAAAAAAAAAAAAAAAAAAAAAAAAAAAZAAAAAEAAABAAAAAAAAAAAAAAAAAAAAAAAAAAAAAAAAAAAAAAAAAAAAAAAAAAAAAAAAAAAAAAAAAAAAAAAAAAAAAAAAAAAAAAAAAAAAAAAAAAAAAAAAAAAAAAAAAAAAAFAAAADwAAAAAAAAAAAAAAAAAAAkUAAAAAQAAABQAAAAUAAAAFAAAAAEAAAAAAAAAZAAAAGQAAAAAAAAAZAAAAGQAAAAVAAAAYAAAAAAAAAAAAAAADwAAACADAAAAAAAAAAAAAAEAAACgMgAAVgcAAKr4//8BAAAAf39/AAEAAABkAAAAAAAAABQAAABAHwAAAAAAACYAAAAAAAAAwOD//wAAAAAmAAAAZAAAABYAAABMAAAAAAAAAAAAAAAEAAAAAAAAAAEAAACAgIAKAAAAACgAAAAoAAAAZAAAAGQAAAAAAAAAzMzMAAAAAABQAAAAUAAAAGQAAABkAAAAAAAAABcAAAAUAAAAAAAAAAAAAAD/fwAA/38AAAAAAAAJAAAABAAAAAAAAAAeAAAAaAAAAAAAAAAAAAAAAAAAAAAAAAAAAAAAECcAABAnAAAAAAAAAAAAAAAAAAAAAAAAAAAAAAAAAAAAAAAAAAAAABQAAAAAAAAAwMD/AAAAAABkAAAAMgAAAAAAAABkAAAAAAAAAH9/fwAKAAAAIgAAABgAAAAAAAAAAAAAAAAAAAAAAAAAAAAAAAAAAAAkAAAAJAAAAAAAAAAHAAAAAAAAAAAAAAAAAAAAAAAAAAAAAAAAAAAAf39/ACUAAABYAAAAAAAAAAAAAAAAAAAAAAAAAAAAAAAAAAAAAAAAAAAAAAAAAAAAAAAAAAAAAAA/AAAAAAAAAKCGAQAAAAAAAAAAAAAAAAAMAAAAAQAAAAAAAAAAAAAAAAAAAB8AAABUAAAAAAAABQAAAAEAAAAAAAAAAAAAAAAAAAAAAAAAAAAAAAAAAAAAAAAAAAAAAAJ/f38AAAAAA8zMzADAwP8Af39/AAAAAAAAAAAAAAAAAAAAAAAAAAAAIQAAABgAAAAUAAAAoRkAABsnAABfMQAAWSkAABAAAAAmAAAACAAAAP//////////"/>
+                <pr:smNativeData xmlns:pr="smNativeData" xmlns="smNativeData" val="SMDATA_15_NygcZBMAAAAlAAAAZAAAAA8BAAAAkAAAAEgAAACQAAAASAAAAAAAAAABAAAAAAAAAAEAAABQAAAAAAAAAAAA4D8AAAAAAADgPwAAAAAAAOA/AAAAAAAA4D8AAAAAAADgPwAAAAAAAOA/AAAAAAAA4D8AAAAAAADgPwAAAAAAAOA/AAAAAAAA4D8CAAAAjAAAAAAAAAAAAAAAu+DjDP///wgAAAAAAAAAAAAAAAAAAAAAAAAAAAAAAAAAAAAAZAAAAAEAAABAAAAAAAAAAAAAAAAAAAAAAAAAAAAAAAAAAAAAAAAAAAAAAAAAAAAAAAAAAAAAAAAAAAAAAAAAAAAAAAAAAAAAAAAAAAAAAAAAAAAAAAAAAAAAAAAAAAAAFAAAADwAAAAAAAAAAAAAAAAAAAkUAAAAAQAAABQAAAAUAAAAFAAAAAEAAAAAAAAAZAAAAGQAAAAAAAAAZAAAAGQAAAAVAAAAYAAAAAAAAAAAAAAADwAAACADAAAAAAAAAAAAAAEAAACgMgAAVgcAAKr4//8BAAAAf39/AAEAAABkAAAAAAAAABQAAABAHwAAAAAAACYAAAAAAAAAwOD//wAAAAAmAAAAZAAAABYAAABMAAAAAAAAAAAAAAAEAAAAAAAAAAEAAACAgIAKAAAAACgAAAAoAAAAZAAAAGQAAAAAAAAAzMzMAAAAAABQAAAAUAAAAGQAAABkAAAAAAAAABcAAAAUAAAAAAAAAAAAAAD/fwAA/38AAAAAAAAJAAAABAAAAAAAAAAeAAAAaAAAAAAAAAAAAAAAAAAAAAAAAAAAAAAAECcAABAnAAAAAAAAAAAAAAAAAAAAAAAAAAAAAAAAAAAAAAAAAAAAABQAAAAAAAAAwMD/AAAAAABkAAAAMgAAAAAAAABkAAAAAAAAAH9/fwAKAAAAIgAAABgAAAAAAAAAAAAAAAAAAAAAAAAAAAAAAAAAAAAkAAAAJAAAAAAAAAAHAAAAAAAAAAAAAAAAAAAAAAAAAAAAAAAAAAAAf39/ACUAAABYAAAAAAAAAAAAAAAAAAAAAAAAAAAAAAAAAAAAAAAAAAAAAAAAAAAAAAAAAAAAAAA/AAAAAAAAAKCGAQAAAAAAAAAAAAAAAAAMAAAAAQAAAAAAAAAAAAAAAAAAAB8AAABUAAAAAAAABQAAAAEAAAAAAAAAAAAAAAAAAAAAAAAAAAAAAAAAAAAAAAAAAAAAAAJ/f38AAAAAA8zMzADAwP8Af39/AAAAAAAAAAAAAAAAAAAAAAAAAAAAIQAAABgAAAAUAAAAoRkAABsnAABfMQAAWSkAABAAAAAmAAAACAAAAP//////////"/>
               </a:ext>
             </a:extLst>
           </p:cNvSpPr>
@@ -3015,7 +3016,7 @@
             <a:spLocks noGrp="1" noChangeArrowheads="1"/>
             <a:extLst>
               <a:ext uri="smNativeData">
-                <pr:smNativeData xmlns:pr="smNativeData" xmlns="smNativeData" val="SMDATA_15_ucsbZBMAAAAlAAAAZAAAAA8BAAAAkAAAAEgAAACQAAAASAAAAAAAAAABAAAAAAAAAAEAAABQAAAAAAAAAAAA4D8AAAAAAADgPwAAAAAAAOA/AAAAAAAA4D8AAAAAAADgPwAAAAAAAOA/AAAAAAAA4D8AAAAAAADgPwAAAAAAAOA/AAAAAAAA4D8CAAAAjAAAAAAAAAAAAAAAu+DjDP///wgAAAAAAAAAAAAAAAAAAAAAAAAAAAAAAAAAAAAAZAAAAAEAAABAAAAAAAAAAAAAAAAAAAAAAAAAAAAAAAAAAAAAAAAAAAAAAAAAAAAAAAAAAAAAAAAAAAAAAAAAAAAAAAAAAAAAAAAAAAAAAAAAAAAAAAAAAAAAAAAAAAAAFAAAADwAAAAAAAAAAAAAAAAAAAkUAAAAAQAAABQAAAAUAAAAFAAAAAEAAAAAAAAAZAAAAGQAAAAAAAAAZAAAAGQAAAAVAAAAYAAAAAAAAAAAAAAADwAAACADAAAAAAAAAAAAAAEAAACgMgAAVgcAAKr4//8BAAAAf39/AAEAAABkAAAAAAAAABQAAABAHwAAAAAAACYAAAAAAAAAwOD//wAAAAAmAAAAZAAAABYAAABMAAAAAAAAAAAAAAAEAAAAAAAAAAEAAACAgIAKAAAAACgAAAAoAAAAZAAAAGQAAAAAAAAAzMzMAAAAAABQAAAAUAAAAGQAAABkAAAAAAAAABcAAAAUAAAAAAAAAAAAAAD/fwAA/38AAAAAAAAJAAAABAAAAP////8eAAAAaAAAAAAAAAAAAAAAAAAAAAAAAAAAAAAAECcAABAnAAAAAAAAAAAAAAAAAAAAAAAAAAAAAAAAAAAAAAAAAAAAABQAAAAAAAAAwMD/AAAAAABkAAAAMgAAAAAAAABkAAAAAAAAAH9/fwAKAAAAIgAAABgAAAAAAAAAAAAAAAAAAAAAAAAAAAAAAAAAAAAkAAAAJAAAAAAAAAAHAAAAAAAAAAAAAAAAAAAAAAAAAAAAAAAAAAAAf39/ACUAAABYAAAAAAAAAAAAAAAAAAAAAAAAAAAAAAAAAAAAAAAAAAAAAAAAAAAAAAAAAAAAAAA/AAAAAAAAAKCGAQAAAAAAAAAAAAAAAAAMAAAAAQAAAAAAAAAAAAAAAAAAAB8AAABUAAAAAAAABQAAAAEAAAAAAAAAAAAAAAAAAAAAAAAAAAAAAAAAAAAAAAAAAAAAAAJ/f38AAAAAA8zMzADAwP8Af39/AAAAAAAAAAAAAAAAAAAAAAAAAAAAIQAAABgAAAAUAAAAwTUAABsnAABARwAAWSkAABAAAAAmAAAACAAAAP//////////"/>
+                <pr:smNativeData xmlns:pr="smNativeData" xmlns="smNativeData" val="SMDATA_15_NygcZBMAAAAlAAAAZAAAAA8BAAAAkAAAAEgAAACQAAAASAAAAAAAAAABAAAAAAAAAAEAAABQAAAAAAAAAAAA4D8AAAAAAADgPwAAAAAAAOA/AAAAAAAA4D8AAAAAAADgPwAAAAAAAOA/AAAAAAAA4D8AAAAAAADgPwAAAAAAAOA/AAAAAAAA4D8CAAAAjAAAAAAAAAAAAAAAu+DjDP///wgAAAAAAAAAAAAAAAAAAAAAAAAAAAAAAAAAAAAAZAAAAAEAAABAAAAAAAAAAAAAAAAAAAAAAAAAAAAAAAAAAAAAAAAAAAAAAAAAAAAAAAAAAAAAAAAAAAAAAAAAAAAAAAAAAAAAAAAAAAAAAAAAAAAAAAAAAAAAAAAAAAAAFAAAADwAAAAAAAAAAAAAAAAAAAkUAAAAAQAAABQAAAAUAAAAFAAAAAEAAAAAAAAAZAAAAGQAAAAAAAAAZAAAAGQAAAAVAAAAYAAAAAAAAAAAAAAADwAAACADAAAAAAAAAAAAAAEAAACgMgAAVgcAAKr4//8BAAAAf39/AAEAAABkAAAAAAAAABQAAABAHwAAAAAAACYAAAAAAAAAwOD//wAAAAAmAAAAZAAAABYAAABMAAAAAAAAAAAAAAAEAAAAAAAAAAEAAACAgIAKAAAAACgAAAAoAAAAZAAAAGQAAAAAAAAAzMzMAAAAAABQAAAAUAAAAGQAAABkAAAAAAAAABcAAAAUAAAAAAAAAAAAAAD/fwAA/38AAAAAAAAJAAAABAAAAP////8eAAAAaAAAAAAAAAAAAAAAAAAAAAAAAAAAAAAAECcAABAnAAAAAAAAAAAAAAAAAAAAAAAAAAAAAAAAAAAAAAAAAAAAABQAAAAAAAAAwMD/AAAAAABkAAAAMgAAAAAAAABkAAAAAAAAAH9/fwAKAAAAIgAAABgAAAAAAAAAAAAAAAAAAAAAAAAAAAAAAAAAAAAkAAAAJAAAAAAAAAAHAAAAAAAAAAAAAAAAAAAAAAAAAAAAAAAAAAAAf39/ACUAAABYAAAAAAAAAAAAAAAAAAAAAAAAAAAAAAAAAAAAAAAAAAAAAAAAAAAAAAAAAAAAAAA/AAAAAAAAAKCGAQAAAAAAAAAAAAAAAAAMAAAAAQAAAAAAAAAAAAAAAAAAAB8AAABUAAAAAAAABQAAAAEAAAAAAAAAAAAAAAAAAAAAAAAAAAAAAAAAAAAAAAAAAAAAAAJ/f38AAAAAA8zMzADAwP8Af39/AAAAAAAAAAAAAAAAAAAAAAAAAAAAIQAAABgAAAAUAAAAwTUAABsnAABARwAAWSkAABAAAAAmAAAACAAAAP//////////"/>
               </a:ext>
             </a:extLst>
           </p:cNvSpPr>
@@ -3050,7 +3051,7 @@
           </a:lstStyle>
           <a:p>
             <a:pPr/>
-            <a:fld id="{3A26C718-56D7-7331-999E-A06489D06FF5}" type="slidenum">
+            <a:fld id="{39DFEC62-2CD4-8A1A-9A67-DA4FA2296C8F}" type="slidenum">
               <a:t/>
             </a:fld>
           </a:p>
@@ -3707,7 +3708,7 @@
 
 <file path=ppt/slides/slide1.xml><?xml version="1.0" encoding="utf-8"?>
 <p:sld xmlns:p="http://schemas.openxmlformats.org/presentationml/2006/main" xmlns:mc="http://schemas.openxmlformats.org/markup-compatibility/2006" xmlns:p14="http://schemas.microsoft.com/office/powerpoint/2010/main" xmlns:p15="http://schemas.microsoft.com/office/powerpoint/2012/main" xmlns:r="http://schemas.openxmlformats.org/officeDocument/2006/relationships" xmlns:a="http://schemas.openxmlformats.org/drawingml/2006/main" mc:Ignorable="p14">
-  <p:cSld>
+  <p:cSld name="VGG16">
     <p:spTree>
       <p:nvGrpSpPr>
         <p:cNvPr id="1" name=""/>
@@ -3739,7 +3740,7 @@
 
 <file path=ppt/slides/slide2.xml><?xml version="1.0" encoding="utf-8"?>
 <p:sld xmlns:p="http://schemas.openxmlformats.org/presentationml/2006/main" xmlns:mc="http://schemas.openxmlformats.org/markup-compatibility/2006" xmlns:p14="http://schemas.microsoft.com/office/powerpoint/2010/main" xmlns:p15="http://schemas.microsoft.com/office/powerpoint/2012/main" xmlns:r="http://schemas.openxmlformats.org/officeDocument/2006/relationships" xmlns:a="http://schemas.openxmlformats.org/drawingml/2006/main" mc:Ignorable="p14">
-  <p:cSld name="Mobilenet V2">
+  <p:cSld name="Mobilenet V1">
     <p:spTree>
       <p:nvGrpSpPr>
         <p:cNvPr id="1" name=""/>
@@ -3771,6 +3772,38 @@
 
 <file path=ppt/slides/slide3.xml><?xml version="1.0" encoding="utf-8"?>
 <p:sld xmlns:p="http://schemas.openxmlformats.org/presentationml/2006/main" xmlns:mc="http://schemas.openxmlformats.org/markup-compatibility/2006" xmlns:p14="http://schemas.microsoft.com/office/powerpoint/2010/main" xmlns:p15="http://schemas.microsoft.com/office/powerpoint/2012/main" xmlns:r="http://schemas.openxmlformats.org/officeDocument/2006/relationships" xmlns:a="http://schemas.openxmlformats.org/drawingml/2006/main" mc:Ignorable="p14">
+  <p:cSld name="Mobilenet V2">
+    <p:spTree>
+      <p:nvGrpSpPr>
+        <p:cNvPr id="1" name=""/>
+        <p:cNvGrpSpPr/>
+        <p:nvPr/>
+      </p:nvGrpSpPr>
+      <p:grpSpPr>
+        <a:xfrm>
+          <a:off x="0" y="0"/>
+          <a:ext cx="0" cy="0"/>
+          <a:chOff x="0" y="0"/>
+          <a:chExt cx="0" cy="0"/>
+        </a:xfrm>
+      </p:grpSpPr>
+    </p:spTree>
+  </p:cSld>
+  <p:clrMapOvr>
+    <a:masterClrMapping/>
+  </p:clrMapOvr>
+  <p:timing>
+    <p:tnLst>
+      <p:par>
+        <p:cTn id="1" dur="indefinite" restart="never" nodeType="tmRoot"/>
+      </p:par>
+    </p:tnLst>
+  </p:timing>
+</p:sld>
+</file>
+
+<file path=ppt/slides/slide4.xml><?xml version="1.0" encoding="utf-8"?>
+<p:sld xmlns:p="http://schemas.openxmlformats.org/presentationml/2006/main" xmlns:mc="http://schemas.openxmlformats.org/markup-compatibility/2006" xmlns:p14="http://schemas.microsoft.com/office/powerpoint/2010/main" xmlns:p15="http://schemas.microsoft.com/office/powerpoint/2012/main" xmlns:r="http://schemas.openxmlformats.org/officeDocument/2006/relationships" xmlns:a="http://schemas.openxmlformats.org/drawingml/2006/main" mc:Ignorable="p14">
   <p:cSld name="Mobilenet V2 OpenVINO">
     <p:spTree>
       <p:nvGrpSpPr>
@@ -3792,7 +3825,7 @@
           <p:cNvSpPr>
             <a:extLst>
               <a:ext uri="smNativeData">
-                <pr:smNativeData xmlns:pr="smNativeData" xmlns="smNativeData" val="SMDATA_15_ucsbZBMAAAAlAAAAZAAAAA8BAAAAkAAAAEgAAACQAAAASAAAAAAAAAABAAAAAAAAAAEAAABQAAAAAAAAAAAA4D8AAAAAAADgPwAAAAAAAOA/AAAAAAAA4D8AAAAAAADgPwAAAAAAAOA/AAAAAAAA4D8AAAAAAADgPwAAAAAAAOA/AAAAAAAA4D8CAAAAjAAAAAEAAAAAAAAAf38AAP///wgAAAAAAAAAAAAAAAAAAAAAAAAAAAAAAAAAAAAAZAAAAAEAAABAAAAAAAAAAAAAAAAAAAAAAAAAAAAAAAAAAAAAAAAAAAAAAAAAAAAAAAAAAAAAAAAAAAAAAAAAAAAAAAAAAAAAAAAAAAAAAAAAAAAAAAAAAAAAAAAAAAAAFAAAADwAAAABAAAAAAAAAAAAAAkUAAAAAQAAABQAAAAUAAAAFAAAAAEAAAAAAAAAZAAAAGQAAAAAAAAAZAAAAGQAAAAVAAAAYAAAAAAAAAAAAAAADwAAACADAAAAAAAAAAAAAAEAAACgMgAAVgcAAKr4//8BAAAAf39/AAEAAABkAAAAAAAAABQAAABAHwAAAAAAACYAAAAAAAAAwOD//wAAAAAmAAAAZAAAABYAAABMAAAAAAAAAAAAAAAEAAAAAAAAAAEAAACAgIAKAAAAACgAAAAoAAAAZAAAAGQAAAAAAAAAzMzMAAAAAABQAAAAUAAAAGQAAABkAAAAAAAAABcAAAAUAAAAAAAAAAAAAAD/fwAA/38AAAAAAAAJAAAABAAAAAAAAAAeAAAAaAAAAAAAAAAAAAAAAAAAAAAAAAAAAAAAECcAABAnAAAAAAAAAAAAAAAAAAAAAAAAAAAAAAAAAAAAAAAAAAAAABQAAAAAAAAAwMD/AAAAAABkAAAAMgAAAAAAAABkAAAAAAAAAH9/fwAKAAAAIgAAABgAAAAAAAAAAAAAAAAAAAAAAAAAAAAAAAAAAAAkAAAAJAAAAAAAAAAHAAAAAAAAAAAAAAAAAAAAAAAAAAAAAAAAAAAAf39/ACUAAABYAAAAAAAAAAAAAAAAAAAAAAAAAAAAAAAAAAAAAAAAAAAAAAAAAAAAAAAAAAAAAAA/AAAAAAAAAKCGAQAAAAAAAAAAAAAAAAAMAAAAAQAAAAAAAAAAAAAAAAAAAB8AAABUAAAAf38AAP///wEAAAAAAAAAAAAAAAAAAAAAAAAAAAAAAAAAAAAAAAAAAAAAAAJ/f38AgICAA8zMzADAwP8Af39/AAAAAAAAAAAAAAAAAAAAAAAAAAAAIQAAABgAAAAUAAAAmx0AACIdAACcLAAAdR4AAAAAAAAmAAAACAAAAP//////////"/>
+                <pr:smNativeData xmlns:pr="smNativeData" xmlns="smNativeData" val="SMDATA_15_NygcZBMAAAAlAAAAZAAAAA8BAAAAkAAAAEgAAACQAAAASAAAAAAAAAABAAAAAAAAAAEAAABQAAAAAAAAAAAA4D8AAAAAAADgPwAAAAAAAOA/AAAAAAAA4D8AAAAAAADgPwAAAAAAAOA/AAAAAAAA4D8AAAAAAADgPwAAAAAAAOA/AAAAAAAA4D8CAAAAjAAAAAEAAAAAAAAAf38AAP///wgAAAAAAAAAAAAAAAAAAAAAAAAAAAAAAAAAAAAAZAAAAAEAAABAAAAAAAAAAAAAAAAAAAAAAAAAAAAAAAAAAAAAAAAAAAAAAAAAAAAAAAAAAAAAAAAAAAAAAAAAAAAAAAAAAAAAAAAAAAAAAAAAAAAAAAAAAAAAAAAAAAAAFAAAADwAAAABAAAAAAAAAAAAAAkUAAAAAQAAABQAAAAUAAAAFAAAAAEAAAAAAAAAZAAAAGQAAAAAAAAAZAAAAGQAAAAVAAAAYAAAAAAAAAAAAAAADwAAACADAAAAAAAAAAAAAAEAAACgMgAAVgcAAKr4//8BAAAAf39/AAEAAABkAAAAAAAAABQAAABAHwAAAAAAACYAAAAAAAAAwOD//wAAAAAmAAAAZAAAABYAAABMAAAAAAAAAAAAAAAEAAAAAAAAAAEAAACAgIAKAAAAACgAAAAoAAAAZAAAAGQAAAAAAAAAzMzMAAAAAABQAAAAUAAAAGQAAABkAAAAAAAAABcAAAAUAAAAAAAAAAAAAAD/fwAA/38AAAAAAAAJAAAABAAAAAAAAAAeAAAAaAAAAAAAAAAAAAAAAAAAAAAAAAAAAAAAECcAABAnAAAAAAAAAAAAAAAAAAAAAAAAAAAAAAAAAAAAAAAAAAAAABQAAAAAAAAAwMD/AAAAAABkAAAAMgAAAAAAAABkAAAAAAAAAH9/fwAKAAAAIgAAABgAAAAAAAAAAAAAAAAAAAAAAAAAAAAAAAAAAAAkAAAAJAAAAAAAAAAHAAAAAAAAAAAAAAAAAAAAAAAAAAAAAAAAAAAAf39/ACUAAABYAAAAAAAAAAAAAAAAAAAAAAAAAAAAAAAAAAAAAAAAAAAAAAAAAAAAAAAAAAAAAAA/AAAAAAAAAKCGAQAAAAAAAAAAAAAAAAAMAAAAAQAAAAAAAAAAAAAAAAAAAB8AAABUAAAAf38AAP///wEAAAAAAAAAAAAAAAAAAAAAAAAAAAAAAAAAAAAAAAAAAAAAAAJ/f38AgICAA8zMzADAwP8Af39/AAAAAAAAAAAAAAAAAAAAAAAAAAAAIQAAABgAAAAUAAAAmx0AACIdAACcLAAAdR4AAAAAAAAmAAAACAAAAP//////////"/>
               </a:ext>
             </a:extLst>
           </p:cNvSpPr>
@@ -3838,7 +3871,7 @@
           <p:cNvSpPr>
             <a:extLst>
               <a:ext uri="smNativeData">
-                <pr:smNativeData xmlns:pr="smNativeData" xmlns="smNativeData" val="SMDATA_15_ucsbZBMAAAAlAAAAZAAAAA8BAAAAkAAAAEgAAACQAAAASAAAAAAAAAABAAAAAAAAAAEAAABQAAAAAAAAAAAA4D8AAAAAAADgPwAAAAAAAOA/AAAAAAAA4D8AAAAAAADgPwAAAAAAAOA/AAAAAAAA4D8AAAAAAADgPwAAAAAAAOA/AAAAAAAA4D8CAAAAjAAAAAEAAAAAAAAAu+DjDP///wgAAAAAAAAAAAAAAAAAAAAAAAAAAAAAAAAAAAAAZAAAAAEAAABAAAAAAAAAAAAAAAAAAAAAAAAAAAAAAAAAAAAAAAAAAAAAAAAAAAAAAAAAAAAAAAAAAAAAAAAAAAAAAAAAAAAAAAAAAAAAAAAAAAAAAAAAAAAAAAAAAAAAFAAAADwAAAABAAAAAAAAAAAAAAkUAAAAAQAAABQAAAAUAAAAFAAAAAEAAAAAAAAAZAAAAGQAAAAAAAAAZAAAAGQAAAAVAAAAYAAAAAAAAAAAAAAADwAAACADAAAAAAAAAAAAAAEAAACgMgAAVgcAAKr4//8BAAAAf39/AAEAAABkAAAAAAAAABQAAABAHwAAAAAAACYAAAAAAAAAwOD//wAAAAAmAAAAZAAAABYAAABMAAAAAAAAAAAAAAAEAAAAAAAAAAEAAACAgIAKAAAAACgAAAAoAAAAZAAAAGQAAAAAAAAAzMzMAAAAAABQAAAAUAAAAGQAAABkAAAAAAAAABcAAAAUAAAAAAAAAAAAAAD/fwAA/38AAAAAAAAJAAAABAAAAAAAAAAeAAAAaAAAAAAAAAAAAAAAAAAAAAAAAAAAAAAAECcAABAnAAAAAAAAAAAAAAAAAAAAAAAAAAAAAAAAAAAAAAAAAAAAABQAAAAAAAAAwMD/AAAAAABkAAAAMgAAAAAAAABkAAAAAAAAAH9/fwAKAAAAIgAAABgAAAAAAAAAAAAAAAAAAAAAAAAAAAAAAAAAAAAkAAAAJAAAAAAAAAAHAAAAAAAAAAAAAAAAAAAAAAAAAAAAAAAAAAAAf39/ACUAAABYAAAAAAAAAAAAAAAAAAAAAAAAAAAAAAAAAAAAAAAAAAAAAAAAAAAAAAAAAAAAAAA/AAAAAAAAAKCGAQAAAAAAAAAAAAAAAAAMAAAAAQAAAAAAAAAAAAAAAAAAAB8AAABUAAAAu+DjBf///wEAAAAAAAAAAAAAAAAAAAAAAAAAAAAAAAAAAAAAAAAAAAAAAAJ/f38AgICAA8zMzADAwP8Af39/AAAAAAAAAAAAAAAAAAAAAAAAAAAAIQAAABgAAAAUAAAAvgUAABAHAAC/FAAAYwgAAAAAAAAmAAAACAAAAP//////////"/>
+                <pr:smNativeData xmlns:pr="smNativeData" xmlns="smNativeData" val="SMDATA_15_NygcZBMAAAAlAAAAZAAAAA8BAAAAkAAAAEgAAACQAAAASAAAAAAAAAABAAAAAAAAAAEAAABQAAAAAAAAAAAA4D8AAAAAAADgPwAAAAAAAOA/AAAAAAAA4D8AAAAAAADgPwAAAAAAAOA/AAAAAAAA4D8AAAAAAADgPwAAAAAAAOA/AAAAAAAA4D8CAAAAjAAAAAEAAAAAAAAAu+DjDP///wgAAAAAAAAAAAAAAAAAAAAAAAAAAAAAAAAAAAAAZAAAAAEAAABAAAAAAAAAAAAAAAAAAAAAAAAAAAAAAAAAAAAAAAAAAAAAAAAAAAAAAAAAAAAAAAAAAAAAAAAAAAAAAAAAAAAAAAAAAAAAAAAAAAAAAAAAAAAAAAAAAAAAFAAAADwAAAABAAAAAAAAAAAAAAkUAAAAAQAAABQAAAAUAAAAFAAAAAEAAAAAAAAAZAAAAGQAAAAAAAAAZAAAAGQAAAAVAAAAYAAAAAAAAAAAAAAADwAAACADAAAAAAAAAAAAAAEAAACgMgAAVgcAAKr4//8BAAAAf39/AAEAAABkAAAAAAAAABQAAABAHwAAAAAAACYAAAAAAAAAwOD//wAAAAAmAAAAZAAAABYAAABMAAAAAAAAAAAAAAAEAAAAAAAAAAEAAACAgIAKAAAAACgAAAAoAAAAZAAAAGQAAAAAAAAAzMzMAAAAAABQAAAAUAAAAGQAAABkAAAAAAAAABcAAAAUAAAAAAAAAAAAAAD/fwAA/38AAAAAAAAJAAAABAAAAAAAAAAeAAAAaAAAAAAAAAAAAAAAAAAAAAAAAAAAAAAAECcAABAnAAAAAAAAAAAAAAAAAAAAAAAAAAAAAAAAAAAAAAAAAAAAABQAAAAAAAAAwMD/AAAAAABkAAAAMgAAAAAAAABkAAAAAAAAAH9/fwAKAAAAIgAAABgAAAAAAAAAAAAAAAAAAAAAAAAAAAAAAAAAAAAkAAAAJAAAAAAAAAAHAAAAAAAAAAAAAAAAAAAAAAAAAAAAAAAAAAAAf39/ACUAAABYAAAAAAAAAAAAAAAAAAAAAAAAAAAAAAAAAAAAAAAAAAAAAAAAAAAAAAAAAAAAAAA/AAAAAAAAAKCGAQAAAAAAAAAAAAAAAAAMAAAAAQAAAAAAAAAAAAAAAAAAAB8AAABUAAAAu+DjBf///wEAAAAAAAAAAAAAAAAAAAAAAAAAAAAAAAAAAAAAAAAAAAAAAAJ/f38AgICAA8zMzADAwP8Af39/AAAAAAAAAAAAAAAAAAAAAAAAAAAAIQAAABgAAAAUAAAAvgUAABAHAAC/FAAAYwgAAAAAAAAmAAAACAAAAP//////////"/>
               </a:ext>
             </a:extLst>
           </p:cNvSpPr>
@@ -3884,7 +3917,7 @@
           <p:cNvSpPr>
             <a:extLst>
               <a:ext uri="smNativeData">
-                <pr:smNativeData xmlns:pr="smNativeData" xmlns="smNativeData" val="SMDATA_15_ucsbZBMAAAAlAAAAZAAAAA8BAAAAkAAAAEgAAACQAAAASAAAAAAAAAABAAAAAAAAAAEAAABQAAAAAAAAAAAA4D8AAAAAAADgPwAAAAAAAOA/AAAAAAAA4D8AAAAAAADgPwAAAAAAAOA/AAAAAAAA4D8AAAAAAADgPwAAAAAAAOA/AAAAAAAA4D8CAAAAjAAAAAEAAAAAAAAAu+DjDP///wgAAAAAAAAAAAAAAAAAAAAAAAAAAAAAAAAAAAAAZAAAAAEAAABAAAAAAAAAAAAAAAAAAAAAAAAAAAAAAAAAAAAAAAAAAAAAAAAAAAAAAAAAAAAAAAAAAAAAAAAAAAAAAAAAAAAAAAAAAAAAAAAAAAAAAAAAAAAAAAAAAAAAFAAAADwAAAABAAAAAAAAAAAAAAkUAAAAAQAAABQAAAAUAAAAFAAAAAEAAAAAAAAAZAAAAGQAAAAAAAAAZAAAAGQAAAAVAAAAYAAAAAAAAAAAAAAADwAAACADAAAAAAAAAAAAAAEAAACgMgAAVgcAAKr4//8BAAAAf39/AAEAAABkAAAAAAAAABQAAABAHwAAAAAAACYAAAAAAAAAwOD//wAAAAAmAAAAZAAAABYAAABMAAAAAAAAAAAAAAAEAAAAAAAAAAEAAACAgIAKAAAAACgAAAAoAAAAZAAAAGQAAAAAAAAAzMzMAAAAAABQAAAAUAAAAGQAAABkAAAAAAAAABcAAAAUAAAAAAAAAAAAAAD/fwAA/38AAAAAAAAJAAAABAAAAG8AAAAeAAAAaAAAAAAAAAAAAAAAAAAAAAAAAAAAAAAAECcAABAnAAAAAAAAAAAAAAAAAAAAAAAAAAAAAAAAAAAAAAAAAAAAABQAAAAAAAAAwMD/AAAAAABkAAAAMgAAAAAAAABkAAAAAAAAAH9/fwAKAAAAIgAAABgAAAAAAAAAAAAAAAAAAAAAAAAAAAAAAAAAAAAkAAAAJAAAAAAAAAAHAAAAAAAAAAAAAAAAAAAAAAAAAAAAAAAAAAAAf39/ACUAAABYAAAAAAAAAAAAAAAAAAAAAAAAAAAAAAAAAAAAAAAAAAAAAAAAAAAAAAAAAAAAAAA/AAAAAAAAAKCGAQAAAAAAAAAAAAAAAAAMAAAAAQAAAAAAAAAAAAAAAAAAAB8AAABUAAAAu+DjBf///wEAAAAAAAAAAAAAAAAAAAAAAAAAAAAAAAAAAAAAAAAAAAAAAAJ/f38AgICAA8zMzADAwP8Af39/AAAAAAAAAAAAAAAAAAAAAAAAAAAAIQAAABgAAAAUAAAAvgUAAPkDAAC/FAAAvQUAAAAAAAAmAAAACAAAAP//////////"/>
+                <pr:smNativeData xmlns:pr="smNativeData" xmlns="smNativeData" val="SMDATA_15_NygcZBMAAAAlAAAAZAAAAA8BAAAAkAAAAEgAAACQAAAASAAAAAAAAAABAAAAAAAAAAEAAABQAAAAAAAAAAAA4D8AAAAAAADgPwAAAAAAAOA/AAAAAAAA4D8AAAAAAADgPwAAAAAAAOA/AAAAAAAA4D8AAAAAAADgPwAAAAAAAOA/AAAAAAAA4D8CAAAAjAAAAAEAAAAAAAAAu+DjDP///wgAAAAAAAAAAAAAAAAAAAAAAAAAAAAAAAAAAAAAZAAAAAEAAABAAAAAAAAAAAAAAAAAAAAAAAAAAAAAAAAAAAAAAAAAAAAAAAAAAAAAAAAAAAAAAAAAAAAAAAAAAAAAAAAAAAAAAAAAAAAAAAAAAAAAAAAAAAAAAAAAAAAAFAAAADwAAAABAAAAAAAAAAAAAAkUAAAAAQAAABQAAAAUAAAAFAAAAAEAAAAAAAAAZAAAAGQAAAAAAAAAZAAAAGQAAAAVAAAAYAAAAAAAAAAAAAAADwAAACADAAAAAAAAAAAAAAEAAACgMgAAVgcAAKr4//8BAAAAf39/AAEAAABkAAAAAAAAABQAAABAHwAAAAAAACYAAAAAAAAAwOD//wAAAAAmAAAAZAAAABYAAABMAAAAAAAAAAAAAAAEAAAAAAAAAAEAAACAgIAKAAAAACgAAAAoAAAAZAAAAGQAAAAAAAAAzMzMAAAAAABQAAAAUAAAAGQAAABkAAAAAAAAABcAAAAUAAAAAAAAAAAAAAD/fwAA/38AAAAAAAAJAAAABAAAAG8AAAAeAAAAaAAAAAAAAAAAAAAAAAAAAAAAAAAAAAAAECcAABAnAAAAAAAAAAAAAAAAAAAAAAAAAAAAAAAAAAAAAAAAAAAAABQAAAAAAAAAwMD/AAAAAABkAAAAMgAAAAAAAABkAAAAAAAAAH9/fwAKAAAAIgAAABgAAAAAAAAAAAAAAAAAAAAAAAAAAAAAAAAAAAAkAAAAJAAAAAAAAAAHAAAAAAAAAAAAAAAAAAAAAAAAAAAAAAAAAAAAf39/ACUAAABYAAAAAAAAAAAAAAAAAAAAAAAAAAAAAAAAAAAAAAAAAAAAAAAAAAAAAAAAAAAAAAA/AAAAAAAAAKCGAQAAAAAAAAAAAAAAAAAMAAAAAQAAAAAAAAAAAAAAAAAAAB8AAABUAAAAu+DjBf///wEAAAAAAAAAAAAAAAAAAAAAAAAAAAAAAAAAAAAAAAAAAAAAAAJ/f38AgICAA8zMzADAwP8Af39/AAAAAAAAAAAAAAAAAAAAAAAAAAAAIQAAABgAAAAUAAAAvgUAAPkDAAC/FAAAvQUAAAAAAAAmAAAACAAAAP//////////"/>
               </a:ext>
             </a:extLst>
           </p:cNvSpPr>
@@ -3930,7 +3963,7 @@
           <p:cNvSpPr>
             <a:extLst>
               <a:ext uri="smNativeData">
-                <pr:smNativeData xmlns:pr="smNativeData" xmlns="smNativeData" val="SMDATA_15_ucsbZBMAAAAlAAAAZAAAAA8BAAAAkAAAAEgAAACQAAAASAAAAAAAAAABAAAAAAAAAAEAAABQAAAAAAAAAAAA4D8AAAAAAADgPwAAAAAAAOA/AAAAAAAA4D8AAAAAAADgPwAAAAAAAOA/AAAAAAAA4D8AAAAAAADgPwAAAAAAAOA/AAAAAAAA4D8CAAAAjAAAAAEAAAAAAAAAu+DjDP///wgAAAAAAAAAAAAAAAAAAAAAAAAAAAAAAAAAAAAAZAAAAAEAAABAAAAAAAAAAAAAAAAAAAAAAAAAAAAAAAAAAAAAAAAAAAAAAAAAAAAAAAAAAAAAAAAAAAAAAAAAAAAAAAAAAAAAAAAAAAAAAAAAAAAAAAAAAAAAAAAAAAAAFAAAADwAAAABAAAAAAAAAAAAAAkUAAAAAQAAABQAAAAUAAAAFAAAAAEAAAAAAAAAZAAAAGQAAAAAAAAAZAAAAGQAAAAVAAAAYAAAAAAAAAAAAAAADwAAACADAAAAAAAAAAAAAAEAAACgMgAAVgcAAKr4//8BAAAAf39/AAEAAABkAAAAAAAAABQAAABAHwAAAAAAACYAAAAAAAAAwOD//wAAAAAmAAAAZAAAABYAAABMAAAAAAAAAAAAAAAEAAAAAAAAAAEAAACAgIAKAAAAACgAAAAoAAAAZAAAAGQAAAAAAAAAzMzMAAAAAABQAAAAUAAAAGQAAABkAAAAAAAAABcAAAAUAAAAAAAAAAAAAAD/fwAA/38AAAAAAAAJAAAABAAAAAAAAAAeAAAAaAAAAAAAAAAAAAAAAAAAAAAAAAAAAAAAECcAABAnAAAAAAAAAAAAAAAAAAAAAAAAAAAAAAAAAAAAAAAAAAAAABQAAAAAAAAAwMD/AAAAAABkAAAAMgAAAAAAAABkAAAAAAAAAH9/fwAKAAAAIgAAABgAAAAAAAAAAAAAAAAAAAAAAAAAAAAAAAAAAAAkAAAAJAAAAAAAAAAHAAAAAAAAAAAAAAAAAAAAAAAAAAAAAAAAAAAAf39/ACUAAABYAAAAAAAAAAAAAAAAAAAAAAAAAAAAAAAAAAAAAAAAAAAAAAAAAAAAAAAAAAAAAAA/AAAAAAAAAKCGAQAAAAAAAAAAAAAAAAAMAAAAAQAAAAAAAAAAAAAAAAAAAB8AAABUAAAAu+DjBf///wEAAAAAAAAAAAAAAAAAAAAAAAAAAAAAAAAAAAAAAAAAAAAAAAJ/f38AgICAA8zMzADAwP8Af39/AAAAAAAAAAAAAAAAAAAAAAAAAAAAIQAAABgAAAAUAAAAvgUAAGMIAAC/FAAAtgkAAAAAAAAmAAAACAAAAP//////////"/>
+                <pr:smNativeData xmlns:pr="smNativeData" xmlns="smNativeData" val="SMDATA_15_NygcZBMAAAAlAAAAZAAAAA8BAAAAkAAAAEgAAACQAAAASAAAAAAAAAABAAAAAAAAAAEAAABQAAAAAAAAAAAA4D8AAAAAAADgPwAAAAAAAOA/AAAAAAAA4D8AAAAAAADgPwAAAAAAAOA/AAAAAAAA4D8AAAAAAADgPwAAAAAAAOA/AAAAAAAA4D8CAAAAjAAAAAEAAAAAAAAAu+DjDP///wgAAAAAAAAAAAAAAAAAAAAAAAAAAAAAAAAAAAAAZAAAAAEAAABAAAAAAAAAAAAAAAAAAAAAAAAAAAAAAAAAAAAAAAAAAAAAAAAAAAAAAAAAAAAAAAAAAAAAAAAAAAAAAAAAAAAAAAAAAAAAAAAAAAAAAAAAAAAAAAAAAAAAFAAAADwAAAABAAAAAAAAAAAAAAkUAAAAAQAAABQAAAAUAAAAFAAAAAEAAAAAAAAAZAAAAGQAAAAAAAAAZAAAAGQAAAAVAAAAYAAAAAAAAAAAAAAADwAAACADAAAAAAAAAAAAAAEAAACgMgAAVgcAAKr4//8BAAAAf39/AAEAAABkAAAAAAAAABQAAABAHwAAAAAAACYAAAAAAAAAwOD//wAAAAAmAAAAZAAAABYAAABMAAAAAAAAAAAAAAAEAAAAAAAAAAEAAACAgIAKAAAAACgAAAAoAAAAZAAAAGQAAAAAAAAAzMzMAAAAAABQAAAAUAAAAGQAAABkAAAAAAAAABcAAAAUAAAAAAAAAAAAAAD/fwAA/38AAAAAAAAJAAAABAAAAAAAAAAeAAAAaAAAAAAAAAAAAAAAAAAAAAAAAAAAAAAAECcAABAnAAAAAAAAAAAAAAAAAAAAAAAAAAAAAAAAAAAAAAAAAAAAABQAAAAAAAAAwMD/AAAAAABkAAAAMgAAAAAAAABkAAAAAAAAAH9/fwAKAAAAIgAAABgAAAAAAAAAAAAAAAAAAAAAAAAAAAAAAAAAAAAkAAAAJAAAAAAAAAAHAAAAAAAAAAAAAAAAAAAAAAAAAAAAAAAAAAAAf39/ACUAAABYAAAAAAAAAAAAAAAAAAAAAAAAAAAAAAAAAAAAAAAAAAAAAAAAAAAAAAAAAAAAAAA/AAAAAAAAAKCGAQAAAAAAAAAAAAAAAAAMAAAAAQAAAAAAAAAAAAAAAAAAAB8AAABUAAAAu+DjBf///wEAAAAAAAAAAAAAAAAAAAAAAAAAAAAAAAAAAAAAAAAAAAAAAAJ/f38AgICAA8zMzADAwP8Af39/AAAAAAAAAAAAAAAAAAAAAAAAAAAAIQAAABgAAAAUAAAAvgUAAGMIAAC/FAAAtgkAAAAAAAAmAAAACAAAAP//////////"/>
               </a:ext>
             </a:extLst>
           </p:cNvSpPr>
@@ -3976,7 +4009,7 @@
           <p:cNvSpPr>
             <a:extLst>
               <a:ext uri="smNativeData">
-                <pr:smNativeData xmlns:pr="smNativeData" xmlns="smNativeData" val="SMDATA_15_ucsbZBMAAAAlAAAAZAAAAA8BAAAAkAAAAEgAAACQAAAASAAAAAAAAAABAAAAAAAAAAEAAABQAAAAAAAAAAAA4D8AAAAAAADgPwAAAAAAAOA/AAAAAAAA4D8AAAAAAADgPwAAAAAAAOA/AAAAAAAA4D8AAAAAAADgPwAAAAAAAOA/AAAAAAAA4D8CAAAAjAAAAAEAAAAAAAAAu+DjDP///wgAAAAAAAAAAAAAAAAAAAAAAAAAAAAAAAAAAAAAZAAAAAEAAABAAAAAAAAAAAAAAAAAAAAAAAAAAAAAAAAAAAAAAAAAAAAAAAAAAAAAAAAAAAAAAAAAAAAAAAAAAAAAAAAAAAAAAAAAAAAAAAAAAAAAAAAAAAAAAAAAAAAAFAAAADwAAAABAAAAAAAAAAAAAAkUAAAAAQAAABQAAAAUAAAAFAAAAAEAAAAAAAAAZAAAAGQAAAAAAAAAZAAAAGQAAAAVAAAAYAAAAAAAAAAAAAAADwAAACADAAAAAAAAAAAAAAEAAACgMgAAVgcAAKr4//8BAAAAf39/AAEAAABkAAAAAAAAABQAAABAHwAAAAAAACYAAAAAAAAAwOD//wAAAAAmAAAAZAAAABYAAABMAAAAAAAAAAAAAAAEAAAAAAAAAAEAAACAgIAKAAAAACgAAAAoAAAAZAAAAGQAAAAAAAAAzMzMAAAAAABQAAAAUAAAAGQAAABkAAAAAAAAABcAAAAUAAAAAAAAAAAAAAD/fwAA/38AAAAAAAAJAAAABAAAAAAAAAAeAAAAaAAAAAAAAAAAAAAAAAAAAAAAAAAAAAAAECcAABAnAAAAAAAAAAAAAAAAAAAAAAAAAAAAAAAAAAAAAAAAAAAAABQAAAAAAAAAwMD/AAAAAABkAAAAMgAAAAAAAABkAAAAAAAAAH9/fwAKAAAAIgAAABgAAAAAAAAAAAAAAAAAAAAAAAAAAAAAAAAAAAAkAAAAJAAAAAAAAAAHAAAAAAAAAAAAAAAAAAAAAAAAAAAAAAAAAAAAf39/ACUAAABYAAAAAAAAAAAAAAAAAAAAAAAAAAAAAAAAAAAAAAAAAAAAAAAAAAAAAAAAAAAAAAA/AAAAAAAAAKCGAQAAAAAAAAAAAAAAAAAMAAAAAQAAAAAAAAAAAAAAAAAAAB8AAABUAAAAu+DjBf///wEAAAAAAAAAAAAAAAAAAAAAAAAAAAAAAAAAAAAAAAAAAAAAAAJ/f38AgICAA8zMzADAwP8Af39/AAAAAAAAAAAAAAAAAAAAAAAAAAAAIQAAABgAAAAUAAAAvgUAALYJAAC/FAAACQsAAAAAAAAmAAAACAAAAP//////////"/>
+                <pr:smNativeData xmlns:pr="smNativeData" xmlns="smNativeData" val="SMDATA_15_NygcZBMAAAAlAAAAZAAAAA8BAAAAkAAAAEgAAACQAAAASAAAAAAAAAABAAAAAAAAAAEAAABQAAAAAAAAAAAA4D8AAAAAAADgPwAAAAAAAOA/AAAAAAAA4D8AAAAAAADgPwAAAAAAAOA/AAAAAAAA4D8AAAAAAADgPwAAAAAAAOA/AAAAAAAA4D8CAAAAjAAAAAEAAAAAAAAAu+DjDP///wgAAAAAAAAAAAAAAAAAAAAAAAAAAAAAAAAAAAAAZAAAAAEAAABAAAAAAAAAAAAAAAAAAAAAAAAAAAAAAAAAAAAAAAAAAAAAAAAAAAAAAAAAAAAAAAAAAAAAAAAAAAAAAAAAAAAAAAAAAAAAAAAAAAAAAAAAAAAAAAAAAAAAFAAAADwAAAABAAAAAAAAAAAAAAkUAAAAAQAAABQAAAAUAAAAFAAAAAEAAAAAAAAAZAAAAGQAAAAAAAAAZAAAAGQAAAAVAAAAYAAAAAAAAAAAAAAADwAAACADAAAAAAAAAAAAAAEAAACgMgAAVgcAAKr4//8BAAAAf39/AAEAAABkAAAAAAAAABQAAABAHwAAAAAAACYAAAAAAAAAwOD//wAAAAAmAAAAZAAAABYAAABMAAAAAAAAAAAAAAAEAAAAAAAAAAEAAACAgIAKAAAAACgAAAAoAAAAZAAAAGQAAAAAAAAAzMzMAAAAAABQAAAAUAAAAGQAAABkAAAAAAAAABcAAAAUAAAAAAAAAAAAAAD/fwAA/38AAAAAAAAJAAAABAAAAAAAAAAeAAAAaAAAAAAAAAAAAAAAAAAAAAAAAAAAAAAAECcAABAnAAAAAAAAAAAAAAAAAAAAAAAAAAAAAAAAAAAAAAAAAAAAABQAAAAAAAAAwMD/AAAAAABkAAAAMgAAAAAAAABkAAAAAAAAAH9/fwAKAAAAIgAAABgAAAAAAAAAAAAAAAAAAAAAAAAAAAAAAAAAAAAkAAAAJAAAAAAAAAAHAAAAAAAAAAAAAAAAAAAAAAAAAAAAAAAAAAAAf39/ACUAAABYAAAAAAAAAAAAAAAAAAAAAAAAAAAAAAAAAAAAAAAAAAAAAAAAAAAAAAAAAAAAAAA/AAAAAAAAAKCGAQAAAAAAAAAAAAAAAAAMAAAAAQAAAAAAAAAAAAAAAAAAAB8AAABUAAAAu+DjBf///wEAAAAAAAAAAAAAAAAAAAAAAAAAAAAAAAAAAAAAAAAAAAAAAAJ/f38AgICAA8zMzADAwP8Af39/AAAAAAAAAAAAAAAAAAAAAAAAAAAAIQAAABgAAAAUAAAAvgUAALYJAAC/FAAACQsAAAAAAAAmAAAACAAAAP//////////"/>
               </a:ext>
             </a:extLst>
           </p:cNvSpPr>
@@ -4022,7 +4055,7 @@
           <p:cNvSpPr txBox="1">
             <a:extLst>
               <a:ext uri="smNativeData">
-                <pr:smNativeData xmlns:pr="smNativeData" xmlns="smNativeData" val="SMDATA_15_ucsbZBMAAAAlAAAAEgAAAA8BAAAAkAAAAEgAAACQAAAASAAAAAAAAAAAAAAAAAAAAAEAAABQAAAAAAAAAAAA4D8AAAAAAADgPwAAAAAAAOA/AAAAAAAA4D8AAAAAAADgPwAAAAAAAOA/AAAAAAAA4D8AAAAAAADgPwAAAAAAAOA/AAAAAAAA4D8CAAAAjAAAAAAAAAAAAAAAu+DjDP///wgAAAAAAAAAAAAAAAAAAAAAAAAAAAAAAAAAAAAAZAAAAAEAAABAAAAAAAAAAAAAAAAAAAAAAAAAAAAAAAAAAAAAAAAAAAAAAAAAAAAAAAAAAAAAAAAAAAAAAAAAAAAAAAAAAAAAAAAAAAAAAAAAAAAAAAAAAAAAAAAAAAAAFAAAADwAAAAAAAAAAAAAAAAAAAkUAAAAAQAAABQAAAAUAAAAFAAAAAEAAAAAAAAAZAAAAGQAAAAAAAAAZAAAAGQAAAAVAAAAYAAAAAAAAAAAAAAADwAAACADAAAAAAAAAAAAAAEAAACgMgAAVgcAAKr4//8BAAAAf39/AAEAAABkAAAAAAAAABQAAABAHwAAAAAAACYAAAAAAAAAwOD//wAAAAAmAAAAZAAAABYAAABMAAAAAAAAAAAAAAAEAAAAAAAAAAEAAACAgIAKAAAAACgAAAAoAAAAZAAAAGQAAAAAAAAAzMzMAAAAAABQAAAAUAAAAGQAAABkAAAAAAAAABcAAAAUAAAAAAAAANwIAAD/fwAA/38AAAAAAAAJAAAABAAAAAAAAAAeAAAAaAAAAAAAAAAAAAAAAAAAAAAAAAAAAAAAECcAABAnAAAAAAAAAAAAAAAAAAAAAAAAAAAAAAAAAAAAAAAAAAAAABQAAAAAAAAAwMD/AAAAAABkAAAAMgAAAAAAAABkAAAAAAAAAH9/fwAKAAAAIgAAABgAAAAAAAAAAAAAAAAAAAAAAAAAAAAAAAAAAAAkAAAAJAAAAAAAAAAHAAAAAAAAAAAAAAAAAAAAAAAAAAAAAAAAAAAAf39/ACUAAABYAAAAAAAAAAAAAAAAAAAAAAAAAAAAAAAAAAAAAAAAAAAAAAAAAAAAAAAAAAAAAAA/AAAAAAAAAKCGAQAAAAAAAAAAAAAAAAAMAAAAAQAAAAAAAAAAAAAAAAAAAB8AAABUAAAAu+DjBf///wEAAAAAAAAAAAAAAAAAAAAAAAAAAAAAAAAAAAAAAAAAAAAAAAJ/f38AgICAA8zMzADAwP8Af39/AAAAAAAAAAAAAAAAAAAAAAAAAAAAIQAAABgAAAAUAAAAIBUAAGMIAADHGwAAtgkAAAAAAAAmAAAACAAAAP//////////"/>
+                <pr:smNativeData xmlns:pr="smNativeData" xmlns="smNativeData" val="SMDATA_15_NygcZBMAAAAlAAAAEgAAAA8BAAAAkAAAAEgAAACQAAAASAAAAAAAAAAAAAAAAAAAAAEAAABQAAAAAAAAAAAA4D8AAAAAAADgPwAAAAAAAOA/AAAAAAAA4D8AAAAAAADgPwAAAAAAAOA/AAAAAAAA4D8AAAAAAADgPwAAAAAAAOA/AAAAAAAA4D8CAAAAjAAAAAAAAAAAAAAAu+DjDP///wgAAAAAAAAAAAAAAAAAAAAAAAAAAAAAAAAAAAAAZAAAAAEAAABAAAAAAAAAAAAAAAAAAAAAAAAAAAAAAAAAAAAAAAAAAAAAAAAAAAAAAAAAAAAAAAAAAAAAAAAAAAAAAAAAAAAAAAAAAAAAAAAAAAAAAAAAAAAAAAAAAAAAFAAAADwAAAAAAAAAAAAAAAAAAAkUAAAAAQAAABQAAAAUAAAAFAAAAAEAAAAAAAAAZAAAAGQAAAAAAAAAZAAAAGQAAAAVAAAAYAAAAAAAAAAAAAAADwAAACADAAAAAAAAAAAAAAEAAACgMgAAVgcAAKr4//8BAAAAf39/AAEAAABkAAAAAAAAABQAAABAHwAAAAAAACYAAAAAAAAAwOD//wAAAAAmAAAAZAAAABYAAABMAAAAAAAAAAAAAAAEAAAAAAAAAAEAAACAgIAKAAAAACgAAAAoAAAAZAAAAGQAAAAAAAAAzMzMAAAAAABQAAAAUAAAAGQAAABkAAAAAAAAABcAAAAUAAAAAAAAANwIAAD/fwAA/38AAAAAAAAJAAAABAAAAAAAAAAeAAAAaAAAAAAAAAAAAAAAAAAAAAAAAAAAAAAAECcAABAnAAAAAAAAAAAAAAAAAAAAAAAAAAAAAAAAAAAAAAAAAAAAABQAAAAAAAAAwMD/AAAAAABkAAAAMgAAAAAAAABkAAAAAAAAAH9/fwAKAAAAIgAAABgAAAAAAAAAAAAAAAAAAAAAAAAAAAAAAAAAAAAkAAAAJAAAAAAAAAAHAAAAAAAAAAAAAAAAAAAAAAAAAAAAAAAAAAAAf39/ACUAAABYAAAAAAAAAAAAAAAAAAAAAAAAAAAAAAAAAAAAAAAAAAAAAAAAAAAAAAAAAAAAAAA/AAAAAAAAAKCGAQAAAAAAAAAAAAAAAAAMAAAAAQAAAAAAAAAAAAAAAAAAAB8AAABUAAAAu+DjBf///wEAAAAAAAAAAAAAAAAAAAAAAAAAAAAAAAAAAAAAAAAAAAAAAAJ/f38AgICAA8zMzADAwP8Af39/AAAAAAAAAAAAAAAAAAAAAAAAAAAAIQAAABgAAAAUAAAAIBUAAGMIAADHGwAAtgkAAAAAAAAmAAAACAAAAP//////////"/>
               </a:ext>
             </a:extLst>
           </p:cNvSpPr>
@@ -4061,7 +4094,7 @@
           <p:cNvSpPr>
             <a:extLst>
               <a:ext uri="smNativeData">
-                <pr:smNativeData xmlns:pr="smNativeData" xmlns="smNativeData" val="SMDATA_15_ucsbZBMAAAAlAAAAZAAAAA8BAAAAkAAAAEgAAACQAAAASAAAAAAAAAABAAAAAAAAAAEAAABQAAAAAAAAAAAA4D8AAAAAAADgPwAAAAAAAOA/AAAAAAAA4D8AAAAAAADgPwAAAAAAAOA/AAAAAAAA4D8AAAAAAADgPwAAAAAAAOA/AAAAAAAA4D8CAAAAjAAAAAEAAAAAAAAAu+DjDP///wgAAAAAAAAAAAAAAAAAAAAAAAAAAAAAAAAAAAAAZAAAAAEAAABAAAAAAAAAAAAAAAAAAAAAAAAAAAAAAAAAAAAAAAAAAAAAAAAAAAAAAAAAAAAAAAAAAAAAAAAAAAAAAAAAAAAAAAAAAAAAAAAAAAAAAAAAAAAAAAAAAAAAFAAAADwAAAABAAAAAAAAAAAAAAkUAAAAAQAAABQAAAAUAAAAFAAAAAEAAAAAAAAAZAAAAGQAAAAAAAAAZAAAAGQAAAAVAAAAYAAAAAAAAAAAAAAADwAAACADAAAAAAAAAAAAAAEAAACgMgAAVgcAAKr4//8BAAAAf39/AAEAAABkAAAAAAAAABQAAABAHwAAAAAAACYAAAAAAAAAwOD//wAAAAAmAAAAZAAAABYAAABMAAAAAAAAAAAAAAAEAAAAAAAAAAEAAACAgIAKAAAAACgAAAAoAAAAZAAAAGQAAAAAAAAAzMzMAAAAAABQAAAAUAAAAGQAAABkAAAAAAAAABcAAAAUAAAAAAAAAAAAAAD/fwAA/38AAAAAAAAJAAAABAAAAAAAAAAeAAAAaAAAAAAAAAAAAAAAAAAAAAAAAAAAAAAAECcAABAnAAAAAAAAAAAAAAAAAAAAAAAAAAAAAAAAAAAAAAAAAAAAABQAAAAAAAAAwMD/AAAAAABkAAAAMgAAAAAAAABkAAAAAAAAAH9/fwAKAAAAIgAAABgAAAAAAAAAAAAAAAAAAAAAAAAAAAAAAAAAAAAkAAAAJAAAAAAAAAAHAAAAAAAAAAAAAAAAAAAAAAAAAAAAAAAAAAAAf39/ACUAAABYAAAAAAAAAAAAAAAAAAAAAAAAAAAAAAAAAAAAAAAAAAAAAAAAAAAAAAAAAAAAAAA/AAAAAAAAAKCGAQAAAAAAAAAAAAAAAAAMAAAAAQAAAAAAAAAAAAAAAAAAAB8AAABUAAAAu+DjBf///wEAAAAAAAAAAAAAAAAAAAAAAAAAAAAAAAAAAAAAAAAAAAAAAAJ/f38AgICAA8zMzADAwP8Af39/AAAAAAAAAAAAAAAAAAAAAAAAAAAAIQAAABgAAAAUAAAAvgUAAAkLAAC/FAAAXAwAAAAAAAAmAAAACAAAAP//////////"/>
+                <pr:smNativeData xmlns:pr="smNativeData" xmlns="smNativeData" val="SMDATA_15_NygcZBMAAAAlAAAAZAAAAA8BAAAAkAAAAEgAAACQAAAASAAAAAAAAAABAAAAAAAAAAEAAABQAAAAAAAAAAAA4D8AAAAAAADgPwAAAAAAAOA/AAAAAAAA4D8AAAAAAADgPwAAAAAAAOA/AAAAAAAA4D8AAAAAAADgPwAAAAAAAOA/AAAAAAAA4D8CAAAAjAAAAAEAAAAAAAAAu+DjDP///wgAAAAAAAAAAAAAAAAAAAAAAAAAAAAAAAAAAAAAZAAAAAEAAABAAAAAAAAAAAAAAAAAAAAAAAAAAAAAAAAAAAAAAAAAAAAAAAAAAAAAAAAAAAAAAAAAAAAAAAAAAAAAAAAAAAAAAAAAAAAAAAAAAAAAAAAAAAAAAAAAAAAAFAAAADwAAAABAAAAAAAAAAAAAAkUAAAAAQAAABQAAAAUAAAAFAAAAAEAAAAAAAAAZAAAAGQAAAAAAAAAZAAAAGQAAAAVAAAAYAAAAAAAAAAAAAAADwAAACADAAAAAAAAAAAAAAEAAACgMgAAVgcAAKr4//8BAAAAf39/AAEAAABkAAAAAAAAABQAAABAHwAAAAAAACYAAAAAAAAAwOD//wAAAAAmAAAAZAAAABYAAABMAAAAAAAAAAAAAAAEAAAAAAAAAAEAAACAgIAKAAAAACgAAAAoAAAAZAAAAGQAAAAAAAAAzMzMAAAAAABQAAAAUAAAAGQAAABkAAAAAAAAABcAAAAUAAAAAAAAAAAAAAD/fwAA/38AAAAAAAAJAAAABAAAAAAAAAAeAAAAaAAAAAAAAAAAAAAAAAAAAAAAAAAAAAAAECcAABAnAAAAAAAAAAAAAAAAAAAAAAAAAAAAAAAAAAAAAAAAAAAAABQAAAAAAAAAwMD/AAAAAABkAAAAMgAAAAAAAABkAAAAAAAAAH9/fwAKAAAAIgAAABgAAAAAAAAAAAAAAAAAAAAAAAAAAAAAAAAAAAAkAAAAJAAAAAAAAAAHAAAAAAAAAAAAAAAAAAAAAAAAAAAAAAAAAAAAf39/ACUAAABYAAAAAAAAAAAAAAAAAAAAAAAAAAAAAAAAAAAAAAAAAAAAAAAAAAAAAAAAAAAAAAA/AAAAAAAAAKCGAQAAAAAAAAAAAAAAAAAMAAAAAQAAAAAAAAAAAAAAAAAAAB8AAABUAAAAu+DjBf///wEAAAAAAAAAAAAAAAAAAAAAAAAAAAAAAAAAAAAAAAAAAAAAAAJ/f38AgICAA8zMzADAwP8Af39/AAAAAAAAAAAAAAAAAAAAAAAAAAAAIQAAABgAAAAUAAAAvgUAAAkLAAC/FAAAXAwAAAAAAAAmAAAACAAAAP//////////"/>
               </a:ext>
             </a:extLst>
           </p:cNvSpPr>
@@ -4115,7 +4148,7 @@
           <p:cNvSpPr txBox="1">
             <a:extLst>
               <a:ext uri="smNativeData">
-                <pr:smNativeData xmlns:pr="smNativeData" xmlns="smNativeData" val="SMDATA_15_ucsbZBMAAAAlAAAAEgAAAA8BAAAAkAAAAEgAAACQAAAASAAAAAAAAAAAAAAAAAAAAAEAAABQAAAAAAAAAAAA4D8AAAAAAADgPwAAAAAAAOA/AAAAAAAA4D8AAAAAAADgPwAAAAAAAOA/AAAAAAAA4D8AAAAAAADgPwAAAAAAAOA/AAAAAAAA4D8CAAAAjAAAAAAAAAAAAAAAu+DjDP///wgAAAAAAAAAAAAAAAAAAAAAAAAAAAAAAAAAAAAAZAAAAAEAAABAAAAAAAAAAAAAAAAAAAAAAAAAAAAAAAAAAAAAAAAAAAAAAAAAAAAAAAAAAAAAAAAAAAAAAAAAAAAAAAAAAAAAAAAAAAAAAAAAAAAAAAAAAAAAAAAAAAAAFAAAADwAAAAAAAAAAAAAAAAAAAkUAAAAAQAAABQAAAAUAAAAFAAAAAEAAAAAAAAAZAAAAGQAAAAAAAAAZAAAAGQAAAAVAAAAYAAAAAAAAAAAAAAADwAAACADAAAAAAAAAAAAAAEAAACgMgAAVgcAAKr4//8BAAAAf39/AAEAAABkAAAAAAAAABQAAABAHwAAAAAAACYAAAAAAAAAwOD//wAAAAAmAAAAZAAAABYAAABMAAAAAAAAAAAAAAAEAAAAAAAAAAEAAACAgIAKAAAAACgAAAAoAAAAZAAAAGQAAAAAAAAAzMzMAAAAAABQAAAAUAAAAGQAAABkAAAAAAAAABcAAAAUAAAAAAAAANwIAAD/fwAA/38AAAAAAAAJAAAABAAAAAAAAAAeAAAAaAAAAAAAAAAAAAAAAAAAAAAAAAAAAAAAECcAABAnAAAAAAAAAAAAAAAAAAAAAAAAAAAAAAAAAAAAAAAAAAAAABQAAAAAAAAAwMD/AAAAAABkAAAAMgAAAAAAAABkAAAAAAAAAH9/fwAKAAAAIgAAABgAAAAAAAAAAAAAAAAAAAAAAAAAAAAAAAAAAAAkAAAAJAAAAAAAAAAHAAAAAAAAAAAAAAAAAAAAAAAAAAAAAAAAAAAAf39/ACUAAABYAAAAAAAAAAAAAAAAAAAAAAAAAAAAAAAAAAAAAAAAAAAAAAAAAAAAAAAAAAAAAAA/AAAAAAAAAKCGAQAAAAAAAAAAAAAAAAAMAAAAAQAAAAAAAAAAAAAAAAAAAB8AAABUAAAAu+DjBf///wEAAAAAAAAAAAAAAAAAAAAAAAAAAAAAAAAAAAAAAAAAAAAAAAJ/f38AgICAA8zMzADAwP8Af39/AAAAAAAAAAAAAAAAAAAAAAAAAAAAIQAAABgAAAAUAAAAKBUAALYJAADPGwAACQsAAAAAAAAmAAAACAAAAP//////////"/>
+                <pr:smNativeData xmlns:pr="smNativeData" xmlns="smNativeData" val="SMDATA_15_NygcZBMAAAAlAAAAEgAAAA8BAAAAkAAAAEgAAACQAAAASAAAAAAAAAAAAAAAAAAAAAEAAABQAAAAAAAAAAAA4D8AAAAAAADgPwAAAAAAAOA/AAAAAAAA4D8AAAAAAADgPwAAAAAAAOA/AAAAAAAA4D8AAAAAAADgPwAAAAAAAOA/AAAAAAAA4D8CAAAAjAAAAAAAAAAAAAAAu+DjDP///wgAAAAAAAAAAAAAAAAAAAAAAAAAAAAAAAAAAAAAZAAAAAEAAABAAAAAAAAAAAAAAAAAAAAAAAAAAAAAAAAAAAAAAAAAAAAAAAAAAAAAAAAAAAAAAAAAAAAAAAAAAAAAAAAAAAAAAAAAAAAAAAAAAAAAAAAAAAAAAAAAAAAAFAAAADwAAAAAAAAAAAAAAAAAAAkUAAAAAQAAABQAAAAUAAAAFAAAAAEAAAAAAAAAZAAAAGQAAAAAAAAAZAAAAGQAAAAVAAAAYAAAAAAAAAAAAAAADwAAACADAAAAAAAAAAAAAAEAAACgMgAAVgcAAKr4//8BAAAAf39/AAEAAABkAAAAAAAAABQAAABAHwAAAAAAACYAAAAAAAAAwOD//wAAAAAmAAAAZAAAABYAAABMAAAAAAAAAAAAAAAEAAAAAAAAAAEAAACAgIAKAAAAACgAAAAoAAAAZAAAAGQAAAAAAAAAzMzMAAAAAABQAAAAUAAAAGQAAABkAAAAAAAAABcAAAAUAAAAAAAAANwIAAD/fwAA/38AAAAAAAAJAAAABAAAAAAAAAAeAAAAaAAAAAAAAAAAAAAAAAAAAAAAAAAAAAAAECcAABAnAAAAAAAAAAAAAAAAAAAAAAAAAAAAAAAAAAAAAAAAAAAAABQAAAAAAAAAwMD/AAAAAABkAAAAMgAAAAAAAABkAAAAAAAAAH9/fwAKAAAAIgAAABgAAAAAAAAAAAAAAAAAAAAAAAAAAAAAAAAAAAAkAAAAJAAAAAAAAAAHAAAAAAAAAAAAAAAAAAAAAAAAAAAAAAAAAAAAf39/ACUAAABYAAAAAAAAAAAAAAAAAAAAAAAAAAAAAAAAAAAAAAAAAAAAAAAAAAAAAAAAAAAAAAA/AAAAAAAAAKCGAQAAAAAAAAAAAAAAAAAMAAAAAQAAAAAAAAAAAAAAAAAAAB8AAABUAAAAu+DjBf///wEAAAAAAAAAAAAAAAAAAAAAAAAAAAAAAAAAAAAAAAAAAAAAAAJ/f38AgICAA8zMzADAwP8Af39/AAAAAAAAAAAAAAAAAAAAAAAAAAAAIQAAABgAAAAUAAAAKBUAALYJAADPGwAACQsAAAAAAAAmAAAACAAAAP//////////"/>
               </a:ext>
             </a:extLst>
           </p:cNvSpPr>
@@ -4154,7 +4187,7 @@
           <p:cNvSpPr txBox="1">
             <a:extLst>
               <a:ext uri="smNativeData">
-                <pr:smNativeData xmlns:pr="smNativeData" xmlns="smNativeData" val="SMDATA_15_ucsbZBMAAAAlAAAAEgAAAA8BAAAAkAAAAEgAAACQAAAASAAAAAAAAAAAAAAAAAAAAAEAAABQAAAAAAAAAAAA4D8AAAAAAADgPwAAAAAAAOA/AAAAAAAA4D8AAAAAAADgPwAAAAAAAOA/AAAAAAAA4D8AAAAAAADgPwAAAAAAAOA/AAAAAAAA4D8CAAAAjAAAAAAAAAAAAAAAu+DjDP///wgAAAAAAAAAAAAAAAAAAAAAAAAAAAAAAAAAAAAAZAAAAAEAAABAAAAAAAAAAAAAAAAAAAAAAAAAAAAAAAAAAAAAAAAAAAAAAAAAAAAAAAAAAAAAAAAAAAAAAAAAAAAAAAAAAAAAAAAAAAAAAAAAAAAAAAAAAAAAAAAAAAAAFAAAADwAAAAAAAAAAAAAAAAAAAkUAAAAAQAAABQAAAAUAAAAFAAAAAEAAAAAAAAAZAAAAGQAAAAAAAAAZAAAAGQAAAAVAAAAYAAAAAAAAAAAAAAADwAAACADAAAAAAAAAAAAAAEAAACgMgAAVgcAAKr4//8BAAAAf39/AAEAAABkAAAAAAAAABQAAABAHwAAAAAAACYAAAAAAAAAwOD//wAAAAAmAAAAZAAAABYAAABMAAAAAAAAAAAAAAAEAAAAAAAAAAEAAACAgIAKAAAAACgAAAAoAAAAZAAAAGQAAAAAAAAAzMzMAAAAAABQAAAAUAAAAGQAAABkAAAAAAAAABcAAAAUAAAAAAAAANwIAAD/fwAA/38AAAAAAAAJAAAABAAAAAAAAAAeAAAAaAAAAAAAAAAAAAAAAAAAAAAAAAAAAAAAECcAABAnAAAAAAAAAAAAAAAAAAAAAAAAAAAAAAAAAAAAAAAAAAAAABQAAAAAAAAAwMD/AAAAAABkAAAAMgAAAAAAAABkAAAAAAAAAH9/fwAKAAAAIgAAABgAAAAAAAAAAAAAAAAAAAAAAAAAAAAAAAAAAAAkAAAAJAAAAAAAAAAHAAAAAAAAAAAAAAAAAAAAAAAAAAAAAAAAAAAAf39/ACUAAABYAAAAAAAAAAAAAAAAAAAAAAAAAAAAAAAAAAAAAAAAAAAAAAAAAAAAAAAAAAAAAAA/AAAAAAAAAKCGAQAAAAAAAAAAAAAAAAAMAAAAAQAAAAAAAAAAAAAAAAAAAB8AAABUAAAAu+DjBf///wEAAAAAAAAAAAAAAAAAAAAAAAAAAAAAAAAAAAAAAAAAAAAAAAJ/f38AgICAA8zMzADAwP8Af39/AAAAAAAAAAAAAAAAAAAAAAAAAAAAIQAAABgAAAAUAAAAKBUAAAkLAADPGwAAXAwAAAAAAAAmAAAACAAAAP//////////"/>
+                <pr:smNativeData xmlns:pr="smNativeData" xmlns="smNativeData" val="SMDATA_15_NygcZBMAAAAlAAAAEgAAAA8BAAAAkAAAAEgAAACQAAAASAAAAAAAAAAAAAAAAAAAAAEAAABQAAAAAAAAAAAA4D8AAAAAAADgPwAAAAAAAOA/AAAAAAAA4D8AAAAAAADgPwAAAAAAAOA/AAAAAAAA4D8AAAAAAADgPwAAAAAAAOA/AAAAAAAA4D8CAAAAjAAAAAAAAAAAAAAAu+DjDP///wgAAAAAAAAAAAAAAAAAAAAAAAAAAAAAAAAAAAAAZAAAAAEAAABAAAAAAAAAAAAAAAAAAAAAAAAAAAAAAAAAAAAAAAAAAAAAAAAAAAAAAAAAAAAAAAAAAAAAAAAAAAAAAAAAAAAAAAAAAAAAAAAAAAAAAAAAAAAAAAAAAAAAFAAAADwAAAAAAAAAAAAAAAAAAAkUAAAAAQAAABQAAAAUAAAAFAAAAAEAAAAAAAAAZAAAAGQAAAAAAAAAZAAAAGQAAAAVAAAAYAAAAAAAAAAAAAAADwAAACADAAAAAAAAAAAAAAEAAACgMgAAVgcAAKr4//8BAAAAf39/AAEAAABkAAAAAAAAABQAAABAHwAAAAAAACYAAAAAAAAAwOD//wAAAAAmAAAAZAAAABYAAABMAAAAAAAAAAAAAAAEAAAAAAAAAAEAAACAgIAKAAAAACgAAAAoAAAAZAAAAGQAAAAAAAAAzMzMAAAAAABQAAAAUAAAAGQAAABkAAAAAAAAABcAAAAUAAAAAAAAANwIAAD/fwAA/38AAAAAAAAJAAAABAAAAAAAAAAeAAAAaAAAAAAAAAAAAAAAAAAAAAAAAAAAAAAAECcAABAnAAAAAAAAAAAAAAAAAAAAAAAAAAAAAAAAAAAAAAAAAAAAABQAAAAAAAAAwMD/AAAAAABkAAAAMgAAAAAAAABkAAAAAAAAAH9/fwAKAAAAIgAAABgAAAAAAAAAAAAAAAAAAAAAAAAAAAAAAAAAAAAkAAAAJAAAAAAAAAAHAAAAAAAAAAAAAAAAAAAAAAAAAAAAAAAAAAAAf39/ACUAAABYAAAAAAAAAAAAAAAAAAAAAAAAAAAAAAAAAAAAAAAAAAAAAAAAAAAAAAAAAAAAAAA/AAAAAAAAAKCGAQAAAAAAAAAAAAAAAAAMAAAAAQAAAAAAAAAAAAAAAAAAAB8AAABUAAAAu+DjBf///wEAAAAAAAAAAAAAAAAAAAAAAAAAAAAAAAAAAAAAAAAAAAAAAAJ/f38AgICAA8zMzADAwP8Af39/AAAAAAAAAAAAAAAAAAAAAAAAAAAAIQAAABgAAAAUAAAAKBUAAAkLAADPGwAAXAwAAAAAAAAmAAAACAAAAP//////////"/>
               </a:ext>
             </a:extLst>
           </p:cNvSpPr>
@@ -4193,7 +4226,7 @@
           <p:cNvSpPr>
             <a:extLst>
               <a:ext uri="smNativeData">
-                <pr:smNativeData xmlns:pr="smNativeData" xmlns="smNativeData" val="SMDATA_15_ucsbZBMAAAAlAAAAZAAAAA8BAAAAkAAAAEgAAACQAAAASAAAAAAAAAABAAAAAAAAAAEAAABQAAAAAAAAAAAA4D8AAAAAAADgPwAAAAAAAOA/AAAAAAAA4D8AAAAAAADgPwAAAAAAAOA/AAAAAAAA4D8AAAAAAADgPwAAAAAAAOA/AAAAAAAA4D8CAAAAjAAAAAEAAAAAAAAAu+DjDP///wgAAAAAAAAAAAAAAAAAAAAAAAAAAAAAAAAAAAAAZAAAAAEAAABAAAAAAAAAAAAAAAAAAAAAAAAAAAAAAAAAAAAAAAAAAAAAAAAAAAAAAAAAAAAAAAAAAAAAAAAAAAAAAAAAAAAAAAAAAAAAAAAAAAAAAAAAAAAAAAAAAAAAFAAAADwAAAABAAAAAAAAAAAAAAkUAAAAAQAAABQAAAAUAAAAFAAAAAEAAAAAAAAAZAAAAGQAAAAAAAAAZAAAAGQAAAAVAAAAYAAAAAAAAAAAAAAADwAAACADAAAAAAAAAAAAAAEAAACgMgAAVgcAAKr4//8BAAAAf39/AAEAAABkAAAAAAAAABQAAABAHwAAAAAAACYAAAAAAAAAwOD//wAAAAAmAAAAZAAAABYAAABMAAAAAAAAAAAAAAAEAAAAAAAAAAEAAACAgIAKAAAAACgAAAAoAAAAZAAAAGQAAAAAAAAAzMzMAAAAAABQAAAAUAAAAGQAAABkAAAAAAAAABcAAAAUAAAAAAAAAAAAAAD/fwAA/38AAAAAAAAJAAAABAAAAAAAAAAeAAAAaAAAAAAAAAAAAAAAAAAAAAAAAAAAAAAAECcAABAnAAAAAAAAAAAAAAAAAAAAAAAAAAAAAAAAAAAAAAAAAAAAABQAAAAAAAAAwMD/AAAAAABkAAAAMgAAAAAAAABkAAAAAAAAAH9/fwAKAAAAIgAAABgAAAAAAAAAAAAAAAAAAAAAAAAAAAAAAAAAAAAkAAAAJAAAAAAAAAAHAAAAAAAAAAAAAAAAAAAAAAAAAAAAAAAAAAAAf39/ACUAAABYAAAAAAAAAAAAAAAAAAAAAAAAAAAAAAAAAAAAAAAAAAAAAAAAAAAAAAAAAAAAAAA/AAAAAAAAAKCGAQAAAAAAAAAAAAAAAAAMAAAAAQAAAAAAAAAAAAAAAAAAAB8AAABUAAAAu+DjBf///wEAAAAAAAAAAAAAAAAAAAAAAAAAAAAAAAAAAAAAAAAAAAAAAAJ/f38AgICAA8zMzADAwP8Af39/AAAAAAAAAAAAAAAAAAAAAAAAAAAAIQAAABgAAAAUAAAAvQUAAD4NAAC+FAAAkQ4AAAAAAAAmAAAACAAAAP//////////"/>
+                <pr:smNativeData xmlns:pr="smNativeData" xmlns="smNativeData" val="SMDATA_15_NygcZBMAAAAlAAAAZAAAAA8BAAAAkAAAAEgAAACQAAAASAAAAAAAAAABAAAAAAAAAAEAAABQAAAAAAAAAAAA4D8AAAAAAADgPwAAAAAAAOA/AAAAAAAA4D8AAAAAAADgPwAAAAAAAOA/AAAAAAAA4D8AAAAAAADgPwAAAAAAAOA/AAAAAAAA4D8CAAAAjAAAAAEAAAAAAAAAu+DjDP///wgAAAAAAAAAAAAAAAAAAAAAAAAAAAAAAAAAAAAAZAAAAAEAAABAAAAAAAAAAAAAAAAAAAAAAAAAAAAAAAAAAAAAAAAAAAAAAAAAAAAAAAAAAAAAAAAAAAAAAAAAAAAAAAAAAAAAAAAAAAAAAAAAAAAAAAAAAAAAAAAAAAAAFAAAADwAAAABAAAAAAAAAAAAAAkUAAAAAQAAABQAAAAUAAAAFAAAAAEAAAAAAAAAZAAAAGQAAAAAAAAAZAAAAGQAAAAVAAAAYAAAAAAAAAAAAAAADwAAACADAAAAAAAAAAAAAAEAAACgMgAAVgcAAKr4//8BAAAAf39/AAEAAABkAAAAAAAAABQAAABAHwAAAAAAACYAAAAAAAAAwOD//wAAAAAmAAAAZAAAABYAAABMAAAAAAAAAAAAAAAEAAAAAAAAAAEAAACAgIAKAAAAACgAAAAoAAAAZAAAAGQAAAAAAAAAzMzMAAAAAABQAAAAUAAAAGQAAABkAAAAAAAAABcAAAAUAAAAAAAAAAAAAAD/fwAA/38AAAAAAAAJAAAABAAAAAAAAAAeAAAAaAAAAAAAAAAAAAAAAAAAAAAAAAAAAAAAECcAABAnAAAAAAAAAAAAAAAAAAAAAAAAAAAAAAAAAAAAAAAAAAAAABQAAAAAAAAAwMD/AAAAAABkAAAAMgAAAAAAAABkAAAAAAAAAH9/fwAKAAAAIgAAABgAAAAAAAAAAAAAAAAAAAAAAAAAAAAAAAAAAAAkAAAAJAAAAAAAAAAHAAAAAAAAAAAAAAAAAAAAAAAAAAAAAAAAAAAAf39/ACUAAABYAAAAAAAAAAAAAAAAAAAAAAAAAAAAAAAAAAAAAAAAAAAAAAAAAAAAAAAAAAAAAAA/AAAAAAAAAKCGAQAAAAAAAAAAAAAAAAAMAAAAAQAAAAAAAAAAAAAAAAAAAB8AAABUAAAAu+DjBf///wEAAAAAAAAAAAAAAAAAAAAAAAAAAAAAAAAAAAAAAAAAAAAAAAJ/f38AgICAA8zMzADAwP8Af39/AAAAAAAAAAAAAAAAAAAAAAAAAAAAIQAAABgAAAAUAAAAvQUAAD4NAAC+FAAAkQ4AAAAAAAAmAAAACAAAAP//////////"/>
               </a:ext>
             </a:extLst>
           </p:cNvSpPr>
@@ -4239,7 +4272,7 @@
           <p:cNvSpPr>
             <a:extLst>
               <a:ext uri="smNativeData">
-                <pr:smNativeData xmlns:pr="smNativeData" xmlns="smNativeData" val="SMDATA_15_ucsbZBMAAAAlAAAAZAAAAA8BAAAAkAAAAEgAAACQAAAASAAAAAAAAAABAAAAAAAAAAEAAABQAAAAAAAAAAAA4D8AAAAAAADgPwAAAAAAAOA/AAAAAAAA4D8AAAAAAADgPwAAAAAAAOA/AAAAAAAA4D8AAAAAAADgPwAAAAAAAOA/AAAAAAAA4D8CAAAAjAAAAAEAAAAAAAAAu+DjDP///wgAAAAAAAAAAAAAAAAAAAAAAAAAAAAAAAAAAAAAZAAAAAEAAABAAAAAAAAAAAAAAAAAAAAAAAAAAAAAAAAAAAAAAAAAAAAAAAAAAAAAAAAAAAAAAAAAAAAAAAAAAAAAAAAAAAAAAAAAAAAAAAAAAAAAAAAAAAAAAAAAAAAAFAAAADwAAAABAAAAAAAAAAAAAAkUAAAAAQAAABQAAAAUAAAAFAAAAAEAAAAAAAAAZAAAAGQAAAAAAAAAZAAAAGQAAAAVAAAAYAAAAAAAAAAAAAAADwAAACADAAAAAAAAAAAAAAEAAACgMgAAVgcAAKr4//8BAAAAf39/AAEAAABkAAAAAAAAABQAAABAHwAAAAAAACYAAAAAAAAAwOD//wAAAAAmAAAAZAAAABYAAABMAAAAAAAAAAAAAAAEAAAAAAAAAAEAAACAgIAKAAAAACgAAAAoAAAAZAAAAGQAAAAAAAAAzMzMAAAAAABQAAAAUAAAAGQAAABkAAAAAAAAABcAAAAUAAAAAAAAAAAAAAD/fwAA/38AAAAAAAAJAAAABAAAAAAAAAAeAAAAaAAAAAAAAAAAAAAAAAAAAAAAAAAAAAAAECcAABAnAAAAAAAAAAAAAAAAAAAAAAAAAAAAAAAAAAAAAAAAAAAAABQAAAAAAAAAwMD/AAAAAABkAAAAMgAAAAAAAABkAAAAAAAAAH9/fwAKAAAAIgAAABgAAAAAAAAAAAAAAAAAAAAAAAAAAAAAAAAAAAAkAAAAJAAAAAAAAAAHAAAAAAAAAAAAAAAAAAAAAAAAAAAAAAAAAAAAf39/ACUAAABYAAAAAAAAAAAAAAAAAAAAAAAAAAAAAAAAAAAAAAAAAAAAAAAAAAAAAAAAAAAAAAA/AAAAAAAAAKCGAQAAAAAAAAAAAAAAAAAMAAAAAQAAAAAAAAAAAAAAAAAAAB8AAABUAAAAu+DjBf///wEAAAAAAAAAAAAAAAAAAAAAAAAAAAAAAAAAAAAAAAAAAAAAAAJ/f38AgICAA8zMzADAwP8Af39/AAAAAAAAAAAAAAAAAAAAAAAAAAAAIQAAABgAAAAUAAAAvQUAAJEOAAC+FAAA5A8AAAAAAAAmAAAACAAAAP//////////"/>
+                <pr:smNativeData xmlns:pr="smNativeData" xmlns="smNativeData" val="SMDATA_15_NygcZBMAAAAlAAAAZAAAAA8BAAAAkAAAAEgAAACQAAAASAAAAAAAAAABAAAAAAAAAAEAAABQAAAAAAAAAAAA4D8AAAAAAADgPwAAAAAAAOA/AAAAAAAA4D8AAAAAAADgPwAAAAAAAOA/AAAAAAAA4D8AAAAAAADgPwAAAAAAAOA/AAAAAAAA4D8CAAAAjAAAAAEAAAAAAAAAu+DjDP///wgAAAAAAAAAAAAAAAAAAAAAAAAAAAAAAAAAAAAAZAAAAAEAAABAAAAAAAAAAAAAAAAAAAAAAAAAAAAAAAAAAAAAAAAAAAAAAAAAAAAAAAAAAAAAAAAAAAAAAAAAAAAAAAAAAAAAAAAAAAAAAAAAAAAAAAAAAAAAAAAAAAAAFAAAADwAAAABAAAAAAAAAAAAAAkUAAAAAQAAABQAAAAUAAAAFAAAAAEAAAAAAAAAZAAAAGQAAAAAAAAAZAAAAGQAAAAVAAAAYAAAAAAAAAAAAAAADwAAACADAAAAAAAAAAAAAAEAAACgMgAAVgcAAKr4//8BAAAAf39/AAEAAABkAAAAAAAAABQAAABAHwAAAAAAACYAAAAAAAAAwOD//wAAAAAmAAAAZAAAABYAAABMAAAAAAAAAAAAAAAEAAAAAAAAAAEAAACAgIAKAAAAACgAAAAoAAAAZAAAAGQAAAAAAAAAzMzMAAAAAABQAAAAUAAAAGQAAABkAAAAAAAAABcAAAAUAAAAAAAAAAAAAAD/fwAA/38AAAAAAAAJAAAABAAAAAAAAAAeAAAAaAAAAAAAAAAAAAAAAAAAAAAAAAAAAAAAECcAABAnAAAAAAAAAAAAAAAAAAAAAAAAAAAAAAAAAAAAAAAAAAAAABQAAAAAAAAAwMD/AAAAAABkAAAAMgAAAAAAAABkAAAAAAAAAH9/fwAKAAAAIgAAABgAAAAAAAAAAAAAAAAAAAAAAAAAAAAAAAAAAAAkAAAAJAAAAAAAAAAHAAAAAAAAAAAAAAAAAAAAAAAAAAAAAAAAAAAAf39/ACUAAABYAAAAAAAAAAAAAAAAAAAAAAAAAAAAAAAAAAAAAAAAAAAAAAAAAAAAAAAAAAAAAAA/AAAAAAAAAKCGAQAAAAAAAAAAAAAAAAAMAAAAAQAAAAAAAAAAAAAAAAAAAB8AAABUAAAAu+DjBf///wEAAAAAAAAAAAAAAAAAAAAAAAAAAAAAAAAAAAAAAAAAAAAAAAJ/f38AgICAA8zMzADAwP8Af39/AAAAAAAAAAAAAAAAAAAAAAAAAAAAIQAAABgAAAAUAAAAvQUAAJEOAAC+FAAA5A8AAAAAAAAmAAAACAAAAP//////////"/>
               </a:ext>
             </a:extLst>
           </p:cNvSpPr>
@@ -4285,7 +4318,7 @@
           <p:cNvSpPr txBox="1">
             <a:extLst>
               <a:ext uri="smNativeData">
-                <pr:smNativeData xmlns:pr="smNativeData" xmlns="smNativeData" val="SMDATA_15_ucsbZBMAAAAlAAAAEgAAAA8BAAAAkAAAAEgAAACQAAAASAAAAAAAAAAAAAAAAAAAAAEAAABQAAAAAAAAAAAA4D8AAAAAAADgPwAAAAAAAOA/AAAAAAAA4D8AAAAAAADgPwAAAAAAAOA/AAAAAAAA4D8AAAAAAADgPwAAAAAAAOA/AAAAAAAA4D8CAAAAjAAAAAAAAAAAAAAAu+DjDP///wgAAAAAAAAAAAAAAAAAAAAAAAAAAAAAAAAAAAAAZAAAAAEAAABAAAAAAAAAAAAAAAAAAAAAAAAAAAAAAAAAAAAAAAAAAAAAAAAAAAAAAAAAAAAAAAAAAAAAAAAAAAAAAAAAAAAAAAAAAAAAAAAAAAAAAAAAAAAAAAAAAAAAFAAAADwAAAAAAAAAAAAAAAAAAAkUAAAAAQAAABQAAAAUAAAAFAAAAAEAAAAAAAAAZAAAAGQAAAAAAAAAZAAAAGQAAAAVAAAAYAAAAAAAAAAAAAAADwAAACADAAAAAAAAAAAAAAEAAACgMgAAVgcAAKr4//8BAAAAf39/AAEAAABkAAAAAAAAABQAAABAHwAAAAAAACYAAAAAAAAAwOD//wAAAAAmAAAAZAAAABYAAABMAAAAAAAAAAAAAAAEAAAAAAAAAAEAAACAgIAKAAAAACgAAAAoAAAAZAAAAGQAAAAAAAAAzMzMAAAAAABQAAAAUAAAAGQAAABkAAAAAAAAABcAAAAUAAAAAAAAANwIAAD/fwAA/38AAAAAAAAJAAAABAAAAAAAAAAeAAAAaAAAAAAAAAAAAAAAAAAAAAAAAAAAAAAAECcAABAnAAAAAAAAAAAAAAAAAAAAAAAAAAAAAAAAAAAAAAAAAAAAABQAAAAAAAAAwMD/AAAAAABkAAAAMgAAAAAAAABkAAAAAAAAAH9/fwAKAAAAIgAAABgAAAAAAAAAAAAAAAAAAAAAAAAAAAAAAAAAAAAkAAAAJAAAAAAAAAAHAAAAAAAAAAAAAAAAAAAAAAAAAAAAAAAAAAAAf39/ACUAAABYAAAAAAAAAAAAAAAAAAAAAAAAAAAAAAAAAAAAAAAAAAAAAAAAAAAAAAAAAAAAAAA/AAAAAAAAAKCGAQAAAAAAAAAAAAAAAAAMAAAAAQAAAAAAAAAAAAAAAAAAAB8AAABUAAAAu+DjBf///wEAAAAAAAAAAAAAAAAAAAAAAAAAAAAAAAAAAAAAAAAAAAAAAAJ/f38AgICAA8zMzADAwP8Af39/AAAAAAAAAAAAAAAAAAAAAAAAAAAAIQAAABgAAAAUAAAAERUAADANAAC4GwAAgw4AAAAAAAAmAAAACAAAAP//////////"/>
+                <pr:smNativeData xmlns:pr="smNativeData" xmlns="smNativeData" val="SMDATA_15_NygcZBMAAAAlAAAAEgAAAA8BAAAAkAAAAEgAAACQAAAASAAAAAAAAAAAAAAAAAAAAAEAAABQAAAAAAAAAAAA4D8AAAAAAADgPwAAAAAAAOA/AAAAAAAA4D8AAAAAAADgPwAAAAAAAOA/AAAAAAAA4D8AAAAAAADgPwAAAAAAAOA/AAAAAAAA4D8CAAAAjAAAAAAAAAAAAAAAu+DjDP///wgAAAAAAAAAAAAAAAAAAAAAAAAAAAAAAAAAAAAAZAAAAAEAAABAAAAAAAAAAAAAAAAAAAAAAAAAAAAAAAAAAAAAAAAAAAAAAAAAAAAAAAAAAAAAAAAAAAAAAAAAAAAAAAAAAAAAAAAAAAAAAAAAAAAAAAAAAAAAAAAAAAAAFAAAADwAAAAAAAAAAAAAAAAAAAkUAAAAAQAAABQAAAAUAAAAFAAAAAEAAAAAAAAAZAAAAGQAAAAAAAAAZAAAAGQAAAAVAAAAYAAAAAAAAAAAAAAADwAAACADAAAAAAAAAAAAAAEAAACgMgAAVgcAAKr4//8BAAAAf39/AAEAAABkAAAAAAAAABQAAABAHwAAAAAAACYAAAAAAAAAwOD//wAAAAAmAAAAZAAAABYAAABMAAAAAAAAAAAAAAAEAAAAAAAAAAEAAACAgIAKAAAAACgAAAAoAAAAZAAAAGQAAAAAAAAAzMzMAAAAAABQAAAAUAAAAGQAAABkAAAAAAAAABcAAAAUAAAAAAAAANwIAAD/fwAA/38AAAAAAAAJAAAABAAAAAAAAAAeAAAAaAAAAAAAAAAAAAAAAAAAAAAAAAAAAAAAECcAABAnAAAAAAAAAAAAAAAAAAAAAAAAAAAAAAAAAAAAAAAAAAAAABQAAAAAAAAAwMD/AAAAAABkAAAAMgAAAAAAAABkAAAAAAAAAH9/fwAKAAAAIgAAABgAAAAAAAAAAAAAAAAAAAAAAAAAAAAAAAAAAAAkAAAAJAAAAAAAAAAHAAAAAAAAAAAAAAAAAAAAAAAAAAAAAAAAAAAAf39/ACUAAABYAAAAAAAAAAAAAAAAAAAAAAAAAAAAAAAAAAAAAAAAAAAAAAAAAAAAAAAAAAAAAAA/AAAAAAAAAKCGAQAAAAAAAAAAAAAAAAAMAAAAAQAAAAAAAAAAAAAAAAAAAB8AAABUAAAAu+DjBf///wEAAAAAAAAAAAAAAAAAAAAAAAAAAAAAAAAAAAAAAAAAAAAAAAJ/f38AgICAA8zMzADAwP8Af39/AAAAAAAAAAAAAAAAAAAAAAAAAAAAIQAAABgAAAAUAAAAERUAADANAAC4GwAAgw4AAAAAAAAmAAAACAAAAP//////////"/>
               </a:ext>
             </a:extLst>
           </p:cNvSpPr>
@@ -4324,7 +4357,7 @@
           <p:cNvSpPr>
             <a:extLst>
               <a:ext uri="smNativeData">
-                <pr:smNativeData xmlns:pr="smNativeData" xmlns="smNativeData" val="SMDATA_15_ucsbZBMAAAAlAAAAZAAAAA8BAAAAkAAAAEgAAACQAAAASAAAAAAAAAABAAAAAAAAAAEAAABQAAAAAAAAAAAA4D8AAAAAAADgPwAAAAAAAOA/AAAAAAAA4D8AAAAAAADgPwAAAAAAAOA/AAAAAAAA4D8AAAAAAADgPwAAAAAAAOA/AAAAAAAA4D8CAAAAjAAAAAEAAAAAAAAAu+DjDP///wgAAAAAAAAAAAAAAAAAAAAAAAAAAAAAAAAAAAAAZAAAAAEAAABAAAAAAAAAAAAAAAAAAAAAAAAAAAAAAAAAAAAAAAAAAAAAAAAAAAAAAAAAAAAAAAAAAAAAAAAAAAAAAAAAAAAAAAAAAAAAAAAAAAAAAAAAAAAAAAAAAAAAFAAAADwAAAABAAAAAAAAAAAAAAkUAAAAAQAAABQAAAAUAAAAFAAAAAEAAAAAAAAAZAAAAGQAAAAAAAAAZAAAAGQAAAAVAAAAYAAAAAAAAAAAAAAADwAAACADAAAAAAAAAAAAAAEAAACgMgAAVgcAAKr4//8BAAAAf39/AAEAAABkAAAAAAAAABQAAABAHwAAAAAAACYAAAAAAAAAwOD//wAAAAAmAAAAZAAAABYAAABMAAAAAAAAAAAAAAAEAAAAAAAAAAEAAACAgIAKAAAAACgAAAAoAAAAZAAAAGQAAAAAAAAAzMzMAAAAAABQAAAAUAAAAGQAAABkAAAAAAAAABcAAAAUAAAAAAAAAAAAAAD/fwAA/38AAAAAAAAJAAAABAAAAAAAAAAeAAAAaAAAAAAAAAAAAAAAAAAAAAAAAAAAAAAAECcAABAnAAAAAAAAAAAAAAAAAAAAAAAAAAAAAAAAAAAAAAAAAAAAABQAAAAAAAAAwMD/AAAAAABkAAAAMgAAAAAAAABkAAAAAAAAAH9/fwAKAAAAIgAAABgAAAAAAAAAAAAAAAAAAAAAAAAAAAAAAAAAAAAkAAAAJAAAAAAAAAAHAAAAAAAAAAAAAAAAAAAAAAAAAAAAAAAAAAAAf39/ACUAAABYAAAAAAAAAAAAAAAAAAAAAAAAAAAAAAAAAAAAAAAAAAAAAAAAAAAAAAAAAAAAAAA/AAAAAAAAAKCGAQAAAAAAAAAAAAAAAAAMAAAAAQAAAAAAAAAAAAAAAAAAAB8AAABUAAAAu+DjBf///wEAAAAAAAAAAAAAAAAAAAAAAAAAAAAAAAAAAAAAAAAAAAAAAAJ/f38AgICAA8zMzADAwP8Af39/AAAAAAAAAAAAAAAAAAAAAAAAAAAAIQAAABgAAAAUAAAAvQUAAOQPAAC+FAAANxEAAAAAAAAmAAAACAAAAP//////////"/>
+                <pr:smNativeData xmlns:pr="smNativeData" xmlns="smNativeData" val="SMDATA_15_NygcZBMAAAAlAAAAZAAAAA8BAAAAkAAAAEgAAACQAAAASAAAAAAAAAABAAAAAAAAAAEAAABQAAAAAAAAAAAA4D8AAAAAAADgPwAAAAAAAOA/AAAAAAAA4D8AAAAAAADgPwAAAAAAAOA/AAAAAAAA4D8AAAAAAADgPwAAAAAAAOA/AAAAAAAA4D8CAAAAjAAAAAEAAAAAAAAAu+DjDP///wgAAAAAAAAAAAAAAAAAAAAAAAAAAAAAAAAAAAAAZAAAAAEAAABAAAAAAAAAAAAAAAAAAAAAAAAAAAAAAAAAAAAAAAAAAAAAAAAAAAAAAAAAAAAAAAAAAAAAAAAAAAAAAAAAAAAAAAAAAAAAAAAAAAAAAAAAAAAAAAAAAAAAFAAAADwAAAABAAAAAAAAAAAAAAkUAAAAAQAAABQAAAAUAAAAFAAAAAEAAAAAAAAAZAAAAGQAAAAAAAAAZAAAAGQAAAAVAAAAYAAAAAAAAAAAAAAADwAAACADAAAAAAAAAAAAAAEAAACgMgAAVgcAAKr4//8BAAAAf39/AAEAAABkAAAAAAAAABQAAABAHwAAAAAAACYAAAAAAAAAwOD//wAAAAAmAAAAZAAAABYAAABMAAAAAAAAAAAAAAAEAAAAAAAAAAEAAACAgIAKAAAAACgAAAAoAAAAZAAAAGQAAAAAAAAAzMzMAAAAAABQAAAAUAAAAGQAAABkAAAAAAAAABcAAAAUAAAAAAAAAAAAAAD/fwAA/38AAAAAAAAJAAAABAAAAAAAAAAeAAAAaAAAAAAAAAAAAAAAAAAAAAAAAAAAAAAAECcAABAnAAAAAAAAAAAAAAAAAAAAAAAAAAAAAAAAAAAAAAAAAAAAABQAAAAAAAAAwMD/AAAAAABkAAAAMgAAAAAAAABkAAAAAAAAAH9/fwAKAAAAIgAAABgAAAAAAAAAAAAAAAAAAAAAAAAAAAAAAAAAAAAkAAAAJAAAAAAAAAAHAAAAAAAAAAAAAAAAAAAAAAAAAAAAAAAAAAAAf39/ACUAAABYAAAAAAAAAAAAAAAAAAAAAAAAAAAAAAAAAAAAAAAAAAAAAAAAAAAAAAAAAAAAAAA/AAAAAAAAAKCGAQAAAAAAAAAAAAAAAAAMAAAAAQAAAAAAAAAAAAAAAAAAAB8AAABUAAAAu+DjBf///wEAAAAAAAAAAAAAAAAAAAAAAAAAAAAAAAAAAAAAAAAAAAAAAAJ/f38AgICAA8zMzADAwP8Af39/AAAAAAAAAAAAAAAAAAAAAAAAAAAAIQAAABgAAAAUAAAAvQUAAOQPAAC+FAAANxEAAAAAAAAmAAAACAAAAP//////////"/>
               </a:ext>
             </a:extLst>
           </p:cNvSpPr>
@@ -4370,7 +4403,7 @@
           <p:cNvSpPr txBox="1">
             <a:extLst>
               <a:ext uri="smNativeData">
-                <pr:smNativeData xmlns:pr="smNativeData" xmlns="smNativeData" val="SMDATA_15_ucsbZBMAAAAlAAAAEgAAAA8BAAAAkAAAAEgAAACQAAAASAAAAAAAAAAAAAAAAAAAAAEAAABQAAAAAAAAAAAA4D8AAAAAAADgPwAAAAAAAOA/AAAAAAAA4D8AAAAAAADgPwAAAAAAAOA/AAAAAAAA4D8AAAAAAADgPwAAAAAAAOA/AAAAAAAA4D8CAAAAjAAAAAAAAAAAAAAAu+DjDP///wgAAAAAAAAAAAAAAAAAAAAAAAAAAAAAAAAAAAAAZAAAAAEAAABAAAAAAAAAAAAAAAAAAAAAAAAAAAAAAAAAAAAAAAAAAAAAAAAAAAAAAAAAAAAAAAAAAAAAAAAAAAAAAAAAAAAAAAAAAAAAAAAAAAAAAAAAAAAAAAAAAAAAFAAAADwAAAAAAAAAAAAAAAAAAAkUAAAAAQAAABQAAAAUAAAAFAAAAAEAAAAAAAAAZAAAAGQAAAAAAAAAZAAAAGQAAAAVAAAAYAAAAAAAAAAAAAAADwAAACADAAAAAAAAAAAAAAEAAACgMgAAVgcAAKr4//8BAAAAf39/AAEAAABkAAAAAAAAABQAAABAHwAAAAAAACYAAAAAAAAAwOD//wAAAAAmAAAAZAAAABYAAABMAAAAAAAAAAAAAAAEAAAAAAAAAAEAAACAgIAKAAAAACgAAAAoAAAAZAAAAGQAAAAAAAAAzMzMAAAAAABQAAAAUAAAAGQAAABkAAAAAAAAABcAAAAUAAAAAAAAANwIAAD/fwAA/38AAAAAAAAJAAAABAAAAAAAAAAeAAAAaAAAAAAAAAAAAAAAAAAAAAAAAAAAAAAAECcAABAnAAAAAAAAAAAAAAAAAAAAAAAAAAAAAAAAAAAAAAAAAAAAABQAAAAAAAAAwMD/AAAAAABkAAAAMgAAAAAAAABkAAAAAAAAAH9/fwAKAAAAIgAAABgAAAAAAAAAAAAAAAAAAAAAAAAAAAAAAAAAAAAkAAAAJAAAAAAAAAAHAAAAAAAAAAAAAAAAAAAAAAAAAAAAAAAAAAAAf39/ACUAAABYAAAAAAAAAAAAAAAAAAAAAAAAAAAAAAAAAAAAAAAAAAAAAAAAAAAAAAAAAAAAAAA/AAAAAAAAAKCGAQAAAAAAAAAAAAAAAAAMAAAAAQAAAAAAAAAAAAAAAAAAAB8AAABUAAAAu+DjBf///wEAAAAAAAAAAAAAAAAAAAAAAAAAAAAAAAAAAAAAAAAAAAAAAAJ/f38AgICAA8zMzADAwP8Af39/AAAAAAAAAAAAAAAAAAAAAAAAAAAAIQAAABgAAAAUAAAAGRUAAIMOAADAGwAA1g8AAAAAAAAmAAAACAAAAP//////////"/>
+                <pr:smNativeData xmlns:pr="smNativeData" xmlns="smNativeData" val="SMDATA_15_NygcZBMAAAAlAAAAEgAAAA8BAAAAkAAAAEgAAACQAAAASAAAAAAAAAAAAAAAAAAAAAEAAABQAAAAAAAAAAAA4D8AAAAAAADgPwAAAAAAAOA/AAAAAAAA4D8AAAAAAADgPwAAAAAAAOA/AAAAAAAA4D8AAAAAAADgPwAAAAAAAOA/AAAAAAAA4D8CAAAAjAAAAAAAAAAAAAAAu+DjDP///wgAAAAAAAAAAAAAAAAAAAAAAAAAAAAAAAAAAAAAZAAAAAEAAABAAAAAAAAAAAAAAAAAAAAAAAAAAAAAAAAAAAAAAAAAAAAAAAAAAAAAAAAAAAAAAAAAAAAAAAAAAAAAAAAAAAAAAAAAAAAAAAAAAAAAAAAAAAAAAAAAAAAAFAAAADwAAAAAAAAAAAAAAAAAAAkUAAAAAQAAABQAAAAUAAAAFAAAAAEAAAAAAAAAZAAAAGQAAAAAAAAAZAAAAGQAAAAVAAAAYAAAAAAAAAAAAAAADwAAACADAAAAAAAAAAAAAAEAAACgMgAAVgcAAKr4//8BAAAAf39/AAEAAABkAAAAAAAAABQAAABAHwAAAAAAACYAAAAAAAAAwOD//wAAAAAmAAAAZAAAABYAAABMAAAAAAAAAAAAAAAEAAAAAAAAAAEAAACAgIAKAAAAACgAAAAoAAAAZAAAAGQAAAAAAAAAzMzMAAAAAABQAAAAUAAAAGQAAABkAAAAAAAAABcAAAAUAAAAAAAAANwIAAD/fwAA/38AAAAAAAAJAAAABAAAAAAAAAAeAAAAaAAAAAAAAAAAAAAAAAAAAAAAAAAAAAAAECcAABAnAAAAAAAAAAAAAAAAAAAAAAAAAAAAAAAAAAAAAAAAAAAAABQAAAAAAAAAwMD/AAAAAABkAAAAMgAAAAAAAABkAAAAAAAAAH9/fwAKAAAAIgAAABgAAAAAAAAAAAAAAAAAAAAAAAAAAAAAAAAAAAAkAAAAJAAAAAAAAAAHAAAAAAAAAAAAAAAAAAAAAAAAAAAAAAAAAAAAf39/ACUAAABYAAAAAAAAAAAAAAAAAAAAAAAAAAAAAAAAAAAAAAAAAAAAAAAAAAAAAAAAAAAAAAA/AAAAAAAAAKCGAQAAAAAAAAAAAAAAAAAMAAAAAQAAAAAAAAAAAAAAAAAAAB8AAABUAAAAu+DjBf///wEAAAAAAAAAAAAAAAAAAAAAAAAAAAAAAAAAAAAAAAAAAAAAAAJ/f38AgICAA8zMzADAwP8Af39/AAAAAAAAAAAAAAAAAAAAAAAAAAAAIQAAABgAAAAUAAAAGRUAAIMOAADAGwAA1g8AAAAAAAAmAAAACAAAAP//////////"/>
               </a:ext>
             </a:extLst>
           </p:cNvSpPr>
@@ -4409,7 +4442,7 @@
           <p:cNvSpPr txBox="1">
             <a:extLst>
               <a:ext uri="smNativeData">
-                <pr:smNativeData xmlns:pr="smNativeData" xmlns="smNativeData" val="SMDATA_15_ucsbZBMAAAAlAAAAEgAAAA8BAAAAkAAAAEgAAACQAAAASAAAAAAAAAAAAAAAAAAAAAEAAABQAAAAAAAAAAAA4D8AAAAAAADgPwAAAAAAAOA/AAAAAAAA4D8AAAAAAADgPwAAAAAAAOA/AAAAAAAA4D8AAAAAAADgPwAAAAAAAOA/AAAAAAAA4D8CAAAAjAAAAAAAAAAAAAAAu+DjDP///wgAAAAAAAAAAAAAAAAAAAAAAAAAAAAAAAAAAAAAZAAAAAEAAABAAAAAAAAAAAAAAAAAAAAAAAAAAAAAAAAAAAAAAAAAAAAAAAAAAAAAAAAAAAAAAAAAAAAAAAAAAAAAAAAAAAAAAAAAAAAAAAAAAAAAAAAAAAAAAAAAAAAAFAAAADwAAAAAAAAAAAAAAAAAAAkUAAAAAQAAABQAAAAUAAAAFAAAAAEAAAAAAAAAZAAAAGQAAAAAAAAAZAAAAGQAAAAVAAAAYAAAAAAAAAAAAAAADwAAACADAAAAAAAAAAAAAAEAAACgMgAAVgcAAKr4//8BAAAAf39/AAEAAABkAAAAAAAAABQAAABAHwAAAAAAACYAAAAAAAAAwOD//wAAAAAmAAAAZAAAABYAAABMAAAAAAAAAAAAAAAEAAAAAAAAAAEAAACAgIAKAAAAACgAAAAoAAAAZAAAAGQAAAAAAAAAzMzMAAAAAABQAAAAUAAAAGQAAABkAAAAAAAAABcAAAAUAAAAAAAAANwIAAD/fwAA/38AAAAAAAAJAAAABAAAAAAAAAAeAAAAaAAAAAAAAAAAAAAAAAAAAAAAAAAAAAAAECcAABAnAAAAAAAAAAAAAAAAAAAAAAAAAAAAAAAAAAAAAAAAAAAAABQAAAAAAAAAwMD/AAAAAABkAAAAMgAAAAAAAABkAAAAAAAAAH9/fwAKAAAAIgAAABgAAAAAAAAAAAAAAAAAAAAAAAAAAAAAAAAAAAAkAAAAJAAAAAAAAAAHAAAAAAAAAAAAAAAAAAAAAAAAAAAAAAAAAAAAf39/ACUAAABYAAAAAAAAAAAAAAAAAAAAAAAAAAAAAAAAAAAAAAAAAAAAAAAAAAAAAAAAAAAAAAA/AAAAAAAAAKCGAQAAAAAAAAAAAAAAAAAMAAAAAQAAAAAAAAAAAAAAAAAAAB8AAABUAAAAu+DjBf///wEAAAAAAAAAAAAAAAAAAAAAAAAAAAAAAAAAAAAAAAAAAAAAAAJ/f38AgICAA8zMzADAwP8Af39/AAAAAAAAAAAAAAAAAAAAAAAAAAAAIQAAABgAAAAUAAAAGRUAANYPAADAGwAAKREAAAAAAAAmAAAACAAAAP//////////"/>
+                <pr:smNativeData xmlns:pr="smNativeData" xmlns="smNativeData" val="SMDATA_15_NygcZBMAAAAlAAAAEgAAAA8BAAAAkAAAAEgAAACQAAAASAAAAAAAAAAAAAAAAAAAAAEAAABQAAAAAAAAAAAA4D8AAAAAAADgPwAAAAAAAOA/AAAAAAAA4D8AAAAAAADgPwAAAAAAAOA/AAAAAAAA4D8AAAAAAADgPwAAAAAAAOA/AAAAAAAA4D8CAAAAjAAAAAAAAAAAAAAAu+DjDP///wgAAAAAAAAAAAAAAAAAAAAAAAAAAAAAAAAAAAAAZAAAAAEAAABAAAAAAAAAAAAAAAAAAAAAAAAAAAAAAAAAAAAAAAAAAAAAAAAAAAAAAAAAAAAAAAAAAAAAAAAAAAAAAAAAAAAAAAAAAAAAAAAAAAAAAAAAAAAAAAAAAAAAFAAAADwAAAAAAAAAAAAAAAAAAAkUAAAAAQAAABQAAAAUAAAAFAAAAAEAAAAAAAAAZAAAAGQAAAAAAAAAZAAAAGQAAAAVAAAAYAAAAAAAAAAAAAAADwAAACADAAAAAAAAAAAAAAEAAACgMgAAVgcAAKr4//8BAAAAf39/AAEAAABkAAAAAAAAABQAAABAHwAAAAAAACYAAAAAAAAAwOD//wAAAAAmAAAAZAAAABYAAABMAAAAAAAAAAAAAAAEAAAAAAAAAAEAAACAgIAKAAAAACgAAAAoAAAAZAAAAGQAAAAAAAAAzMzMAAAAAABQAAAAUAAAAGQAAABkAAAAAAAAABcAAAAUAAAAAAAAANwIAAD/fwAA/38AAAAAAAAJAAAABAAAAAAAAAAeAAAAaAAAAAAAAAAAAAAAAAAAAAAAAAAAAAAAECcAABAnAAAAAAAAAAAAAAAAAAAAAAAAAAAAAAAAAAAAAAAAAAAAABQAAAAAAAAAwMD/AAAAAABkAAAAMgAAAAAAAABkAAAAAAAAAH9/fwAKAAAAIgAAABgAAAAAAAAAAAAAAAAAAAAAAAAAAAAAAAAAAAAkAAAAJAAAAAAAAAAHAAAAAAAAAAAAAAAAAAAAAAAAAAAAAAAAAAAAf39/ACUAAABYAAAAAAAAAAAAAAAAAAAAAAAAAAAAAAAAAAAAAAAAAAAAAAAAAAAAAAAAAAAAAAA/AAAAAAAAAKCGAQAAAAAAAAAAAAAAAAAMAAAAAQAAAAAAAAAAAAAAAAAAAB8AAABUAAAAu+DjBf///wEAAAAAAAAAAAAAAAAAAAAAAAAAAAAAAAAAAAAAAAAAAAAAAAJ/f38AgICAA8zMzADAwP8Af39/AAAAAAAAAAAAAAAAAAAAAAAAAAAAIQAAABgAAAAUAAAAGRUAANYPAADAGwAAKREAAAAAAAAmAAAACAAAAP//////////"/>
               </a:ext>
             </a:extLst>
           </p:cNvSpPr>
@@ -4448,7 +4481,7 @@
           <p:cNvSpPr>
             <a:extLst>
               <a:ext uri="smNativeData">
-                <pr:smNativeData xmlns:pr="smNativeData" xmlns="smNativeData" val="SMDATA_15_ucsbZBMAAAAlAAAAZAAAAA8BAAAAkAAAAEgAAACQAAAASAAAAAAAAAABAAAAAAAAAAEAAABQAAAAAAAAAAAA4D8AAAAAAADgPwAAAAAAAOA/AAAAAAAA4D8AAAAAAADgPwAAAAAAAOA/AAAAAAAA4D8AAAAAAADgPwAAAAAAAOA/AAAAAAAA4D8CAAAAjAAAAAEAAAAAAAAAu+DjDP///wgAAAAAAAAAAAAAAAAAAAAAAAAAAAAAAAAAAAAAZAAAAAEAAABAAAAAAAAAAAAAAAAAAAAAAAAAAAAAAAAAAAAAAAAAAAAAAAAAAAAAAAAAAAAAAAAAAAAAAAAAAAAAAAAAAAAAAAAAAAAAAAAAAAAAAAAAAAAAAAAAAAAAFAAAADwAAAABAAAAAAAAAAAAAAkUAAAAAQAAABQAAAAUAAAAFAAAAAEAAAAAAAAAZAAAAGQAAAAAAAAAZAAAAGQAAAAVAAAAYAAAAAAAAAAAAAAADwAAACADAAAAAAAAAAAAAAEAAACgMgAAVgcAAKr4//8BAAAAf39/AAEAAABkAAAAAAAAABQAAABAHwAAAAAAACYAAAAAAAAAwOD//wAAAAAmAAAAZAAAABYAAABMAAAAAAAAAAAAAAAEAAAAAAAAAAEAAACAgIAKAAAAACgAAAAoAAAAZAAAAGQAAAAAAAAAzMzMAAAAAABQAAAAUAAAAGQAAABkAAAAAAAAABcAAAAUAAAAAAAAAAAAAAD/fwAA/38AAAAAAAAJAAAABAAAAAAAAAAeAAAAaAAAAAAAAAAAAAAAAAAAAAAAAAAAAAAAECcAABAnAAAAAAAAAAAAAAAAAAAAAAAAAAAAAAAAAAAAAAAAAAAAABQAAAAAAAAAwMD/AAAAAABkAAAAMgAAAAAAAABkAAAAAAAAAH9/fwAKAAAAIgAAABgAAAAAAAAAAAAAAAAAAAAAAAAAAAAAAAAAAAAkAAAAJAAAAAAAAAAHAAAAAAAAAAAAAAAAAAAAAAAAAAAAAAAAAAAAf39/ACUAAABYAAAAAAAAAAAAAAAAAAAAAAAAAAAAAAAAAAAAAAAAAAAAAAAAAAAAAAAAAAAAAAA/AAAAAAAAAKCGAQAAAAAAAAAAAAAAAAAMAAAAAQAAAAAAAAAAAAAAAAAAAB8AAABUAAAAu+DjBf///wEAAAAAAAAAAAAAAAAAAAAAAAAAAAAAAAAAAAAAAAAAAAAAAAJ/f38AgICAA8zMzADAwP8Af39/AAAAAAAAAAAAAAAAAAAAAAAAAAAAIQAAABgAAAAUAAAAvQUAADcRAAC+FAAAihIAAAAAAAAmAAAACAAAAP//////////"/>
+                <pr:smNativeData xmlns:pr="smNativeData" xmlns="smNativeData" val="SMDATA_15_NygcZBMAAAAlAAAAZAAAAA8BAAAAkAAAAEgAAACQAAAASAAAAAAAAAABAAAAAAAAAAEAAABQAAAAAAAAAAAA4D8AAAAAAADgPwAAAAAAAOA/AAAAAAAA4D8AAAAAAADgPwAAAAAAAOA/AAAAAAAA4D8AAAAAAADgPwAAAAAAAOA/AAAAAAAA4D8CAAAAjAAAAAEAAAAAAAAAu+DjDP///wgAAAAAAAAAAAAAAAAAAAAAAAAAAAAAAAAAAAAAZAAAAAEAAABAAAAAAAAAAAAAAAAAAAAAAAAAAAAAAAAAAAAAAAAAAAAAAAAAAAAAAAAAAAAAAAAAAAAAAAAAAAAAAAAAAAAAAAAAAAAAAAAAAAAAAAAAAAAAAAAAAAAAFAAAADwAAAABAAAAAAAAAAAAAAkUAAAAAQAAABQAAAAUAAAAFAAAAAEAAAAAAAAAZAAAAGQAAAAAAAAAZAAAAGQAAAAVAAAAYAAAAAAAAAAAAAAADwAAACADAAAAAAAAAAAAAAEAAACgMgAAVgcAAKr4//8BAAAAf39/AAEAAABkAAAAAAAAABQAAABAHwAAAAAAACYAAAAAAAAAwOD//wAAAAAmAAAAZAAAABYAAABMAAAAAAAAAAAAAAAEAAAAAAAAAAEAAACAgIAKAAAAACgAAAAoAAAAZAAAAGQAAAAAAAAAzMzMAAAAAABQAAAAUAAAAGQAAABkAAAAAAAAABcAAAAUAAAAAAAAAAAAAAD/fwAA/38AAAAAAAAJAAAABAAAAAAAAAAeAAAAaAAAAAAAAAAAAAAAAAAAAAAAAAAAAAAAECcAABAnAAAAAAAAAAAAAAAAAAAAAAAAAAAAAAAAAAAAAAAAAAAAABQAAAAAAAAAwMD/AAAAAABkAAAAMgAAAAAAAABkAAAAAAAAAH9/fwAKAAAAIgAAABgAAAAAAAAAAAAAAAAAAAAAAAAAAAAAAAAAAAAkAAAAJAAAAAAAAAAHAAAAAAAAAAAAAAAAAAAAAAAAAAAAAAAAAAAAf39/ACUAAABYAAAAAAAAAAAAAAAAAAAAAAAAAAAAAAAAAAAAAAAAAAAAAAAAAAAAAAAAAAAAAAA/AAAAAAAAAKCGAQAAAAAAAAAAAAAAAAAMAAAAAQAAAAAAAAAAAAAAAAAAAB8AAABUAAAAu+DjBf///wEAAAAAAAAAAAAAAAAAAAAAAAAAAAAAAAAAAAAAAAAAAAAAAAJ/f38AgICAA8zMzADAwP8Af39/AAAAAAAAAAAAAAAAAAAAAAAAAAAAIQAAABgAAAAUAAAAvQUAADcRAAC+FAAAihIAAAAAAAAmAAAACAAAAP//////////"/>
               </a:ext>
             </a:extLst>
           </p:cNvSpPr>
@@ -4494,7 +4527,7 @@
           <p:cNvSpPr>
             <a:extLst>
               <a:ext uri="smNativeData">
-                <pr:smNativeData xmlns:pr="smNativeData" xmlns="smNativeData" val="SMDATA_15_ucsbZBMAAAAlAAAAZAAAAA8BAAAAkAAAAEgAAACQAAAASAAAAAAAAAABAAAAAAAAAAEAAABQAAAAAAAAAAAA4D8AAAAAAADgPwAAAAAAAOA/AAAAAAAA4D8AAAAAAADgPwAAAAAAAOA/AAAAAAAA4D8AAAAAAADgPwAAAAAAAOA/AAAAAAAA4D8CAAAAjAAAAAEAAAAAAAAAu+DjDP///wgAAAAAAAAAAAAAAAAAAAAAAAAAAAAAAAAAAAAAZAAAAAEAAABAAAAAAAAAAAAAAAAAAAAAAAAAAAAAAAAAAAAAAAAAAAAAAAAAAAAAAAAAAAAAAAAAAAAAAAAAAAAAAAAAAAAAAAAAAAAAAAAAAAAAAAAAAAAAAAAAAAAAFAAAADwAAAABAAAAAAAAAAAAAAkUAAAAAQAAABQAAAAUAAAAFAAAAAEAAAAAAAAAZAAAAGQAAAAAAAAAZAAAAGQAAAAVAAAAYAAAAAAAAAAAAAAADwAAACADAAAAAAAAAAAAAAEAAACgMgAAVgcAAKr4//8BAAAAf39/AAEAAABkAAAAAAAAABQAAABAHwAAAAAAACYAAAAAAAAAwOD//wAAAAAmAAAAZAAAABYAAABMAAAAAAAAAAAAAAAEAAAAAAAAAAEAAACAgIAKAAAAACgAAAAoAAAAZAAAAGQAAAAAAAAAzMzMAAAAAABQAAAAUAAAAGQAAABkAAAAAAAAABcAAAAUAAAAAAAAAAAAAAD/fwAA/38AAAAAAAAJAAAABAAAAAAAAAAeAAAAaAAAAAAAAAAAAAAAAAAAAAAAAAAAAAAAECcAABAnAAAAAAAAAAAAAAAAAAAAAAAAAAAAAAAAAAAAAAAAAAAAABQAAAAAAAAAwMD/AAAAAABkAAAAMgAAAAAAAABkAAAAAAAAAH9/fwAKAAAAIgAAABgAAAAAAAAAAAAAAAAAAAAAAAAAAAAAAAAAAAAkAAAAJAAAAAAAAAAHAAAAAAAAAAAAAAAAAAAAAAAAAAAAAAAAAAAAf39/ACUAAABYAAAAAAAAAAAAAAAAAAAAAAAAAAAAAAAAAAAAAAAAAAAAAAAAAAAAAAAAAAAAAAA/AAAAAAAAAKCGAQAAAAAAAAAAAAAAAAAMAAAAAQAAAAAAAAAAAAAAAAAAAB8AAABUAAAAu+DjBf///wEAAAAAAAAAAAAAAAAAAAAAAAAAAAAAAAAAAAAAAAAAAAAAAAJ/f38AgICAA8zMzADAwP8Af39/AAAAAAAAAAAAAAAAAAAAAAAAAAAAIQAAABgAAAAUAAAAvQUAAIoSAAC+FAAA3RMAAAAAAAAmAAAACAAAAP//////////"/>
+                <pr:smNativeData xmlns:pr="smNativeData" xmlns="smNativeData" val="SMDATA_15_NygcZBMAAAAlAAAAZAAAAA8BAAAAkAAAAEgAAACQAAAASAAAAAAAAAABAAAAAAAAAAEAAABQAAAAAAAAAAAA4D8AAAAAAADgPwAAAAAAAOA/AAAAAAAA4D8AAAAAAADgPwAAAAAAAOA/AAAAAAAA4D8AAAAAAADgPwAAAAAAAOA/AAAAAAAA4D8CAAAAjAAAAAEAAAAAAAAAu+DjDP///wgAAAAAAAAAAAAAAAAAAAAAAAAAAAAAAAAAAAAAZAAAAAEAAABAAAAAAAAAAAAAAAAAAAAAAAAAAAAAAAAAAAAAAAAAAAAAAAAAAAAAAAAAAAAAAAAAAAAAAAAAAAAAAAAAAAAAAAAAAAAAAAAAAAAAAAAAAAAAAAAAAAAAFAAAADwAAAABAAAAAAAAAAAAAAkUAAAAAQAAABQAAAAUAAAAFAAAAAEAAAAAAAAAZAAAAGQAAAAAAAAAZAAAAGQAAAAVAAAAYAAAAAAAAAAAAAAADwAAACADAAAAAAAAAAAAAAEAAACgMgAAVgcAAKr4//8BAAAAf39/AAEAAABkAAAAAAAAABQAAABAHwAAAAAAACYAAAAAAAAAwOD//wAAAAAmAAAAZAAAABYAAABMAAAAAAAAAAAAAAAEAAAAAAAAAAEAAACAgIAKAAAAACgAAAAoAAAAZAAAAGQAAAAAAAAAzMzMAAAAAABQAAAAUAAAAGQAAABkAAAAAAAAABcAAAAUAAAAAAAAAAAAAAD/fwAA/38AAAAAAAAJAAAABAAAAAAAAAAeAAAAaAAAAAAAAAAAAAAAAAAAAAAAAAAAAAAAECcAABAnAAAAAAAAAAAAAAAAAAAAAAAAAAAAAAAAAAAAAAAAAAAAABQAAAAAAAAAwMD/AAAAAABkAAAAMgAAAAAAAABkAAAAAAAAAH9/fwAKAAAAIgAAABgAAAAAAAAAAAAAAAAAAAAAAAAAAAAAAAAAAAAkAAAAJAAAAAAAAAAHAAAAAAAAAAAAAAAAAAAAAAAAAAAAAAAAAAAAf39/ACUAAABYAAAAAAAAAAAAAAAAAAAAAAAAAAAAAAAAAAAAAAAAAAAAAAAAAAAAAAAAAAAAAAA/AAAAAAAAAKCGAQAAAAAAAAAAAAAAAAAMAAAAAQAAAAAAAAAAAAAAAAAAAB8AAABUAAAAu+DjBf///wEAAAAAAAAAAAAAAAAAAAAAAAAAAAAAAAAAAAAAAAAAAAAAAAJ/f38AgICAA8zMzADAwP8Af39/AAAAAAAAAAAAAAAAAAAAAAAAAAAAIQAAABgAAAAUAAAAvQUAAIoSAAC+FAAA3RMAAAAAAAAmAAAACAAAAP//////////"/>
               </a:ext>
             </a:extLst>
           </p:cNvSpPr>
@@ -4540,7 +4573,7 @@
           <p:cNvSpPr>
             <a:extLst>
               <a:ext uri="smNativeData">
-                <pr:smNativeData xmlns:pr="smNativeData" xmlns="smNativeData" val="SMDATA_15_ucsbZBMAAAAlAAAAZAAAAA8BAAAAkAAAAEgAAACQAAAASAAAAAAAAAABAAAAAAAAAAEAAABQAAAAAAAAAAAA4D8AAAAAAADgPwAAAAAAAOA/AAAAAAAA4D8AAAAAAADgPwAAAAAAAOA/AAAAAAAA4D8AAAAAAADgPwAAAAAAAOA/AAAAAAAA4D8CAAAAjAAAAAEAAAAAAAAAu+DjDP///wgAAAAAAAAAAAAAAAAAAAAAAAAAAAAAAAAAAAAAZAAAAAEAAABAAAAAAAAAAAAAAAAAAAAAAAAAAAAAAAAAAAAAAAAAAAAAAAAAAAAAAAAAAAAAAAAAAAAAAAAAAAAAAAAAAAAAAAAAAAAAAAAAAAAAAAAAAAAAAAAAAAAAFAAAADwAAAABAAAAAAAAAAAAAAkUAAAAAQAAABQAAAAUAAAAFAAAAAEAAAAAAAAAZAAAAGQAAAAAAAAAZAAAAGQAAAAVAAAAYAAAAAAAAAAAAAAADwAAACADAAAAAAAAAAAAAAEAAACgMgAAVgcAAKr4//8BAAAAf39/AAEAAABkAAAAAAAAABQAAABAHwAAAAAAACYAAAAAAAAAwOD//wAAAAAmAAAAZAAAABYAAABMAAAAAAAAAAAAAAAEAAAAAAAAAAEAAACAgIAKAAAAACgAAAAoAAAAZAAAAGQAAAAAAAAAzMzMAAAAAABQAAAAUAAAAGQAAABkAAAAAAAAABcAAAAUAAAAAAAAAAAAAAD/fwAA/38AAAAAAAAJAAAABAAAAAAAAAAeAAAAaAAAAAAAAAAAAAAAAAAAAAAAAAAAAAAAECcAABAnAAAAAAAAAAAAAAAAAAAAAAAAAAAAAAAAAAAAAAAAAAAAABQAAAAAAAAAwMD/AAAAAABkAAAAMgAAAAAAAABkAAAAAAAAAH9/fwAKAAAAIgAAABgAAAAAAAAAAAAAAAAAAAAAAAAAAAAAAAAAAAAkAAAAJAAAAAAAAAAHAAAAAAAAAAAAAAAAAAAAAAAAAAAAAAAAAAAAf39/ACUAAABYAAAAAAAAAAAAAAAAAAAAAAAAAAAAAAAAAAAAAAAAAAAAAAAAAAAAAAAAAAAAAAA/AAAAAAAAAKCGAQAAAAAAAAAAAAAAAAAMAAAAAQAAAAAAAAAAAAAAAAAAAB8AAABUAAAAu+DjBf///wEAAAAAAAAAAAAAAAAAAAAAAAAAAAAAAAAAAAAAAAAAAAAAAAJ/f38AgICAA8zMzADAwP8Af39/AAAAAAAAAAAAAAAAAAAAAAAAAAAAIQAAABgAAAAUAAAAvQUAAN0TAAC+FAAAMBUAAAAAAAAmAAAACAAAAP//////////"/>
+                <pr:smNativeData xmlns:pr="smNativeData" xmlns="smNativeData" val="SMDATA_15_NygcZBMAAAAlAAAAZAAAAA8BAAAAkAAAAEgAAACQAAAASAAAAAAAAAABAAAAAAAAAAEAAABQAAAAAAAAAAAA4D8AAAAAAADgPwAAAAAAAOA/AAAAAAAA4D8AAAAAAADgPwAAAAAAAOA/AAAAAAAA4D8AAAAAAADgPwAAAAAAAOA/AAAAAAAA4D8CAAAAjAAAAAEAAAAAAAAAu+DjDP///wgAAAAAAAAAAAAAAAAAAAAAAAAAAAAAAAAAAAAAZAAAAAEAAABAAAAAAAAAAAAAAAAAAAAAAAAAAAAAAAAAAAAAAAAAAAAAAAAAAAAAAAAAAAAAAAAAAAAAAAAAAAAAAAAAAAAAAAAAAAAAAAAAAAAAAAAAAAAAAAAAAAAAFAAAADwAAAABAAAAAAAAAAAAAAkUAAAAAQAAABQAAAAUAAAAFAAAAAEAAAAAAAAAZAAAAGQAAAAAAAAAZAAAAGQAAAAVAAAAYAAAAAAAAAAAAAAADwAAACADAAAAAAAAAAAAAAEAAACgMgAAVgcAAKr4//8BAAAAf39/AAEAAABkAAAAAAAAABQAAABAHwAAAAAAACYAAAAAAAAAwOD//wAAAAAmAAAAZAAAABYAAABMAAAAAAAAAAAAAAAEAAAAAAAAAAEAAACAgIAKAAAAACgAAAAoAAAAZAAAAGQAAAAAAAAAzMzMAAAAAABQAAAAUAAAAGQAAABkAAAAAAAAABcAAAAUAAAAAAAAAAAAAAD/fwAA/38AAAAAAAAJAAAABAAAAAAAAAAeAAAAaAAAAAAAAAAAAAAAAAAAAAAAAAAAAAAAECcAABAnAAAAAAAAAAAAAAAAAAAAAAAAAAAAAAAAAAAAAAAAAAAAABQAAAAAAAAAwMD/AAAAAABkAAAAMgAAAAAAAABkAAAAAAAAAH9/fwAKAAAAIgAAABgAAAAAAAAAAAAAAAAAAAAAAAAAAAAAAAAAAAAkAAAAJAAAAAAAAAAHAAAAAAAAAAAAAAAAAAAAAAAAAAAAAAAAAAAAf39/ACUAAABYAAAAAAAAAAAAAAAAAAAAAAAAAAAAAAAAAAAAAAAAAAAAAAAAAAAAAAAAAAAAAAA/AAAAAAAAAKCGAQAAAAAAAAAAAAAAAAAMAAAAAQAAAAAAAAAAAAAAAAAAAB8AAABUAAAAu+DjBf///wEAAAAAAAAAAAAAAAAAAAAAAAAAAAAAAAAAAAAAAAAAAAAAAAJ/f38AgICAA8zMzADAwP8Af39/AAAAAAAAAAAAAAAAAAAAAAAAAAAAIQAAABgAAAAUAAAAvQUAAN0TAAC+FAAAMBUAAAAAAAAmAAAACAAAAP//////////"/>
               </a:ext>
             </a:extLst>
           </p:cNvSpPr>
@@ -4586,7 +4619,7 @@
           <p:cNvSpPr txBox="1">
             <a:extLst>
               <a:ext uri="smNativeData">
-                <pr:smNativeData xmlns:pr="smNativeData" xmlns="smNativeData" val="SMDATA_15_ucsbZBMAAAAlAAAAEgAAAA8BAAAAkAAAAEgAAACQAAAASAAAAAAAAAAAAAAAAAAAAAEAAABQAAAAAAAAAAAA4D8AAAAAAADgPwAAAAAAAOA/AAAAAAAA4D8AAAAAAADgPwAAAAAAAOA/AAAAAAAA4D8AAAAAAADgPwAAAAAAAOA/AAAAAAAA4D8CAAAAjAAAAAAAAAAAAAAAu+DjDP///wgAAAAAAAAAAAAAAAAAAAAAAAAAAAAAAAAAAAAAZAAAAAEAAABAAAAAAAAAAAAAAAAAAAAAAAAAAAAAAAAAAAAAAAAAAAAAAAAAAAAAAAAAAAAAAAAAAAAAAAAAAAAAAAAAAAAAAAAAAAAAAAAAAAAAAAAAAAAAAAAAAAAAFAAAADwAAAAAAAAAAAAAAAAAAAkUAAAAAQAAABQAAAAUAAAAFAAAAAEAAAAAAAAAZAAAAGQAAAAAAAAAZAAAAGQAAAAVAAAAYAAAAAAAAAAAAAAADwAAACADAAAAAAAAAAAAAAEAAACgMgAAVgcAAKr4//8BAAAAf39/AAEAAABkAAAAAAAAABQAAABAHwAAAAAAACYAAAAAAAAAwOD//wAAAAAmAAAAZAAAABYAAABMAAAAAAAAAAAAAAAEAAAAAAAAAAEAAACAgIAKAAAAACgAAAAoAAAAZAAAAGQAAAAAAAAAzMzMAAAAAABQAAAAUAAAAGQAAABkAAAAAAAAABcAAAAUAAAAAAAAANwIAAD/fwAA/38AAAAAAAAJAAAABAAAAAAAAAAeAAAAaAAAAAAAAAAAAAAAAAAAAAAAAAAAAAAAECcAABAnAAAAAAAAAAAAAAAAAAAAAAAAAAAAAAAAAAAAAAAAAAAAABQAAAAAAAAAwMD/AAAAAABkAAAAMgAAAAAAAABkAAAAAAAAAH9/fwAKAAAAIgAAABgAAAAAAAAAAAAAAAAAAAAAAAAAAAAAAAAAAAAkAAAAJAAAAAAAAAAHAAAAAAAAAAAAAAAAAAAAAAAAAAAAAAAAAAAAf39/ACUAAABYAAAAAAAAAAAAAAAAAAAAAAAAAAAAAAAAAAAAAAAAAAAAAAAAAAAAAAAAAAAAAAA/AAAAAAAAAKCGAQAAAAAAAAAAAAAAAAAMAAAAAQAAAAAAAAAAAAAAAAAAAB8AAABUAAAAu+DjBf///wEAAAAAAAAAAAAAAAAAAAAAAAAAAAAAAAAAAAAAAAAAAAAAAAJ/f38AgICAA8zMzADAwP8Af39/AAAAAAAAAAAAAAAAAAAAAAAAAAAAIQAAABgAAAAUAAAAKBUAADcRAADPGwAAihIAAAAAAAAmAAAACAAAAP//////////"/>
+                <pr:smNativeData xmlns:pr="smNativeData" xmlns="smNativeData" val="SMDATA_15_NygcZBMAAAAlAAAAEgAAAA8BAAAAkAAAAEgAAACQAAAASAAAAAAAAAAAAAAAAAAAAAEAAABQAAAAAAAAAAAA4D8AAAAAAADgPwAAAAAAAOA/AAAAAAAA4D8AAAAAAADgPwAAAAAAAOA/AAAAAAAA4D8AAAAAAADgPwAAAAAAAOA/AAAAAAAA4D8CAAAAjAAAAAAAAAAAAAAAu+DjDP///wgAAAAAAAAAAAAAAAAAAAAAAAAAAAAAAAAAAAAAZAAAAAEAAABAAAAAAAAAAAAAAAAAAAAAAAAAAAAAAAAAAAAAAAAAAAAAAAAAAAAAAAAAAAAAAAAAAAAAAAAAAAAAAAAAAAAAAAAAAAAAAAAAAAAAAAAAAAAAAAAAAAAAFAAAADwAAAAAAAAAAAAAAAAAAAkUAAAAAQAAABQAAAAUAAAAFAAAAAEAAAAAAAAAZAAAAGQAAAAAAAAAZAAAAGQAAAAVAAAAYAAAAAAAAAAAAAAADwAAACADAAAAAAAAAAAAAAEAAACgMgAAVgcAAKr4//8BAAAAf39/AAEAAABkAAAAAAAAABQAAABAHwAAAAAAACYAAAAAAAAAwOD//wAAAAAmAAAAZAAAABYAAABMAAAAAAAAAAAAAAAEAAAAAAAAAAEAAACAgIAKAAAAACgAAAAoAAAAZAAAAGQAAAAAAAAAzMzMAAAAAABQAAAAUAAAAGQAAABkAAAAAAAAABcAAAAUAAAAAAAAANwIAAD/fwAA/38AAAAAAAAJAAAABAAAAAAAAAAeAAAAaAAAAAAAAAAAAAAAAAAAAAAAAAAAAAAAECcAABAnAAAAAAAAAAAAAAAAAAAAAAAAAAAAAAAAAAAAAAAAAAAAABQAAAAAAAAAwMD/AAAAAABkAAAAMgAAAAAAAABkAAAAAAAAAH9/fwAKAAAAIgAAABgAAAAAAAAAAAAAAAAAAAAAAAAAAAAAAAAAAAAkAAAAJAAAAAAAAAAHAAAAAAAAAAAAAAAAAAAAAAAAAAAAAAAAAAAAf39/ACUAAABYAAAAAAAAAAAAAAAAAAAAAAAAAAAAAAAAAAAAAAAAAAAAAAAAAAAAAAAAAAAAAAA/AAAAAAAAAKCGAQAAAAAAAAAAAAAAAAAMAAAAAQAAAAAAAAAAAAAAAAAAAB8AAABUAAAAu+DjBf///wEAAAAAAAAAAAAAAAAAAAAAAAAAAAAAAAAAAAAAAAAAAAAAAAJ/f38AgICAA8zMzADAwP8Af39/AAAAAAAAAAAAAAAAAAAAAAAAAAAAIQAAABgAAAAUAAAAKBUAADcRAADPGwAAihIAAAAAAAAmAAAACAAAAP//////////"/>
               </a:ext>
             </a:extLst>
           </p:cNvSpPr>
@@ -4625,7 +4658,7 @@
           <p:cNvSpPr txBox="1">
             <a:extLst>
               <a:ext uri="smNativeData">
-                <pr:smNativeData xmlns:pr="smNativeData" xmlns="smNativeData" val="SMDATA_15_ucsbZBMAAAAlAAAAEgAAAA8BAAAAkAAAAEgAAACQAAAASAAAAAAAAAAAAAAAAAAAAAEAAABQAAAAAAAAAAAA4D8AAAAAAADgPwAAAAAAAOA/AAAAAAAA4D8AAAAAAADgPwAAAAAAAOA/AAAAAAAA4D8AAAAAAADgPwAAAAAAAOA/AAAAAAAA4D8CAAAAjAAAAAAAAAAAAAAAu+DjDP///wgAAAAAAAAAAAAAAAAAAAAAAAAAAAAAAAAAAAAAZAAAAAEAAABAAAAAAAAAAAAAAAAAAAAAAAAAAAAAAAAAAAAAAAAAAAAAAAAAAAAAAAAAAAAAAAAAAAAAAAAAAAAAAAAAAAAAAAAAAAAAAAAAAAAAAAAAAAAAAAAAAAAAFAAAADwAAAAAAAAAAAAAAAAAAAkUAAAAAQAAABQAAAAUAAAAFAAAAAEAAAAAAAAAZAAAAGQAAAAAAAAAZAAAAGQAAAAVAAAAYAAAAAAAAAAAAAAADwAAACADAAAAAAAAAAAAAAEAAACgMgAAVgcAAKr4//8BAAAAf39/AAEAAABkAAAAAAAAABQAAABAHwAAAAAAACYAAAAAAAAAwOD//wAAAAAmAAAAZAAAABYAAABMAAAAAAAAAAAAAAAEAAAAAAAAAAEAAACAgIAKAAAAACgAAAAoAAAAZAAAAGQAAAAAAAAAzMzMAAAAAABQAAAAUAAAAGQAAABkAAAAAAAAABcAAAAUAAAAAAAAANwIAAD/fwAA/38AAAAAAAAJAAAABAAAAAAAAAAeAAAAaAAAAAAAAAAAAAAAAAAAAAAAAAAAAAAAECcAABAnAAAAAAAAAAAAAAAAAAAAAAAAAAAAAAAAAAAAAAAAAAAAABQAAAAAAAAAwMD/AAAAAABkAAAAMgAAAAAAAABkAAAAAAAAAH9/fwAKAAAAIgAAABgAAAAAAAAAAAAAAAAAAAAAAAAAAAAAAAAAAAAkAAAAJAAAAAAAAAAHAAAAAAAAAAAAAAAAAAAAAAAAAAAAAAAAAAAAf39/ACUAAABYAAAAAAAAAAAAAAAAAAAAAAAAAAAAAAAAAAAAAAAAAAAAAAAAAAAAAAAAAAAAAAA/AAAAAAAAAKCGAQAAAAAAAAAAAAAAAAAMAAAAAQAAAAAAAAAAAAAAAAAAAB8AAABUAAAAu+DjBf///wEAAAAAAAAAAAAAAAAAAAAAAAAAAAAAAAAAAAAAAAAAAAAAAAJ/f38AgICAA8zMzADAwP8Af39/AAAAAAAAAAAAAAAAAAAAAAAAAAAAIQAAABgAAAAUAAAAKBUAAIoSAADPGwAA3RMAAAAAAAAmAAAACAAAAP//////////"/>
+                <pr:smNativeData xmlns:pr="smNativeData" xmlns="smNativeData" val="SMDATA_15_NygcZBMAAAAlAAAAEgAAAA8BAAAAkAAAAEgAAACQAAAASAAAAAAAAAAAAAAAAAAAAAEAAABQAAAAAAAAAAAA4D8AAAAAAADgPwAAAAAAAOA/AAAAAAAA4D8AAAAAAADgPwAAAAAAAOA/AAAAAAAA4D8AAAAAAADgPwAAAAAAAOA/AAAAAAAA4D8CAAAAjAAAAAAAAAAAAAAAu+DjDP///wgAAAAAAAAAAAAAAAAAAAAAAAAAAAAAAAAAAAAAZAAAAAEAAABAAAAAAAAAAAAAAAAAAAAAAAAAAAAAAAAAAAAAAAAAAAAAAAAAAAAAAAAAAAAAAAAAAAAAAAAAAAAAAAAAAAAAAAAAAAAAAAAAAAAAAAAAAAAAAAAAAAAAFAAAADwAAAAAAAAAAAAAAAAAAAkUAAAAAQAAABQAAAAUAAAAFAAAAAEAAAAAAAAAZAAAAGQAAAAAAAAAZAAAAGQAAAAVAAAAYAAAAAAAAAAAAAAADwAAACADAAAAAAAAAAAAAAEAAACgMgAAVgcAAKr4//8BAAAAf39/AAEAAABkAAAAAAAAABQAAABAHwAAAAAAACYAAAAAAAAAwOD//wAAAAAmAAAAZAAAABYAAABMAAAAAAAAAAAAAAAEAAAAAAAAAAEAAACAgIAKAAAAACgAAAAoAAAAZAAAAGQAAAAAAAAAzMzMAAAAAABQAAAAUAAAAGQAAABkAAAAAAAAABcAAAAUAAAAAAAAANwIAAD/fwAA/38AAAAAAAAJAAAABAAAAAAAAAAeAAAAaAAAAAAAAAAAAAAAAAAAAAAAAAAAAAAAECcAABAnAAAAAAAAAAAAAAAAAAAAAAAAAAAAAAAAAAAAAAAAAAAAABQAAAAAAAAAwMD/AAAAAABkAAAAMgAAAAAAAABkAAAAAAAAAH9/fwAKAAAAIgAAABgAAAAAAAAAAAAAAAAAAAAAAAAAAAAAAAAAAAAkAAAAJAAAAAAAAAAHAAAAAAAAAAAAAAAAAAAAAAAAAAAAAAAAAAAAf39/ACUAAABYAAAAAAAAAAAAAAAAAAAAAAAAAAAAAAAAAAAAAAAAAAAAAAAAAAAAAAAAAAAAAAA/AAAAAAAAAKCGAQAAAAAAAAAAAAAAAAAMAAAAAQAAAAAAAAAAAAAAAAAAAB8AAABUAAAAu+DjBf///wEAAAAAAAAAAAAAAAAAAAAAAAAAAAAAAAAAAAAAAAAAAAAAAAJ/f38AgICAA8zMzADAwP8Af39/AAAAAAAAAAAAAAAAAAAAAAAAAAAAIQAAABgAAAAUAAAAKBUAAIoSAADPGwAA3RMAAAAAAAAmAAAACAAAAP//////////"/>
               </a:ext>
             </a:extLst>
           </p:cNvSpPr>
@@ -4664,7 +4697,7 @@
           <p:cNvSpPr txBox="1">
             <a:extLst>
               <a:ext uri="smNativeData">
-                <pr:smNativeData xmlns:pr="smNativeData" xmlns="smNativeData" val="SMDATA_15_ucsbZBMAAAAlAAAAEgAAAA8BAAAAkAAAAEgAAACQAAAASAAAAAAAAAAAAAAAAAAAAAEAAABQAAAAAAAAAAAA4D8AAAAAAADgPwAAAAAAAOA/AAAAAAAA4D8AAAAAAADgPwAAAAAAAOA/AAAAAAAA4D8AAAAAAADgPwAAAAAAAOA/AAAAAAAA4D8CAAAAjAAAAAAAAAAAAAAAu+DjDP///wgAAAAAAAAAAAAAAAAAAAAAAAAAAAAAAAAAAAAAZAAAAAEAAABAAAAAAAAAAAAAAAAAAAAAAAAAAAAAAAAAAAAAAAAAAAAAAAAAAAAAAAAAAAAAAAAAAAAAAAAAAAAAAAAAAAAAAAAAAAAAAAAAAAAAAAAAAAAAAAAAAAAAFAAAADwAAAAAAAAAAAAAAAAAAAkUAAAAAQAAABQAAAAUAAAAFAAAAAEAAAAAAAAAZAAAAGQAAAAAAAAAZAAAAGQAAAAVAAAAYAAAAAAAAAAAAAAADwAAACADAAAAAAAAAAAAAAEAAACgMgAAVgcAAKr4//8BAAAAf39/AAEAAABkAAAAAAAAABQAAABAHwAAAAAAACYAAAAAAAAAwOD//wAAAAAmAAAAZAAAABYAAABMAAAAAAAAAAAAAAAEAAAAAAAAAAEAAACAgIAKAAAAACgAAAAoAAAAZAAAAGQAAAAAAAAAzMzMAAAAAABQAAAAUAAAAGQAAABkAAAAAAAAABcAAAAUAAAAAAAAANwIAAD/fwAA/38AAAAAAAAJAAAABAAAAAAAAAAeAAAAaAAAAAAAAAAAAAAAAAAAAAAAAAAAAAAAECcAABAnAAAAAAAAAAAAAAAAAAAAAAAAAAAAAAAAAAAAAAAAAAAAABQAAAAAAAAAwMD/AAAAAABkAAAAMgAAAAAAAABkAAAAAAAAAH9/fwAKAAAAIgAAABgAAAAAAAAAAAAAAAAAAAAAAAAAAAAAAAAAAAAkAAAAJAAAAAAAAAAHAAAAAAAAAAAAAAAAAAAAAAAAAAAAAAAAAAAAf39/ACUAAABYAAAAAAAAAAAAAAAAAAAAAAAAAAAAAAAAAAAAAAAAAAAAAAAAAAAAAAAAAAAAAAA/AAAAAAAAAKCGAQAAAAAAAAAAAAAAAAAMAAAAAQAAAAAAAAAAAAAAAAAAAB8AAABUAAAAu+DjBf///wEAAAAAAAAAAAAAAAAAAAAAAAAAAAAAAAAAAAAAAAAAAAAAAAJ/f38AgICAA8zMzADAwP8Af39/AAAAAAAAAAAAAAAAAAAAAAAAAAAAIQAAABgAAAAUAAAAKBUAAN0TAADPGwAAMBUAAAAAAAAmAAAACAAAAP//////////"/>
+                <pr:smNativeData xmlns:pr="smNativeData" xmlns="smNativeData" val="SMDATA_15_NygcZBMAAAAlAAAAEgAAAA8BAAAAkAAAAEgAAACQAAAASAAAAAAAAAAAAAAAAAAAAAEAAABQAAAAAAAAAAAA4D8AAAAAAADgPwAAAAAAAOA/AAAAAAAA4D8AAAAAAADgPwAAAAAAAOA/AAAAAAAA4D8AAAAAAADgPwAAAAAAAOA/AAAAAAAA4D8CAAAAjAAAAAAAAAAAAAAAu+DjDP///wgAAAAAAAAAAAAAAAAAAAAAAAAAAAAAAAAAAAAAZAAAAAEAAABAAAAAAAAAAAAAAAAAAAAAAAAAAAAAAAAAAAAAAAAAAAAAAAAAAAAAAAAAAAAAAAAAAAAAAAAAAAAAAAAAAAAAAAAAAAAAAAAAAAAAAAAAAAAAAAAAAAAAFAAAADwAAAAAAAAAAAAAAAAAAAkUAAAAAQAAABQAAAAUAAAAFAAAAAEAAAAAAAAAZAAAAGQAAAAAAAAAZAAAAGQAAAAVAAAAYAAAAAAAAAAAAAAADwAAACADAAAAAAAAAAAAAAEAAACgMgAAVgcAAKr4//8BAAAAf39/AAEAAABkAAAAAAAAABQAAABAHwAAAAAAACYAAAAAAAAAwOD//wAAAAAmAAAAZAAAABYAAABMAAAAAAAAAAAAAAAEAAAAAAAAAAEAAACAgIAKAAAAACgAAAAoAAAAZAAAAGQAAAAAAAAAzMzMAAAAAABQAAAAUAAAAGQAAABkAAAAAAAAABcAAAAUAAAAAAAAANwIAAD/fwAA/38AAAAAAAAJAAAABAAAAAAAAAAeAAAAaAAAAAAAAAAAAAAAAAAAAAAAAAAAAAAAECcAABAnAAAAAAAAAAAAAAAAAAAAAAAAAAAAAAAAAAAAAAAAAAAAABQAAAAAAAAAwMD/AAAAAABkAAAAMgAAAAAAAABkAAAAAAAAAH9/fwAKAAAAIgAAABgAAAAAAAAAAAAAAAAAAAAAAAAAAAAAAAAAAAAkAAAAJAAAAAAAAAAHAAAAAAAAAAAAAAAAAAAAAAAAAAAAAAAAAAAAf39/ACUAAABYAAAAAAAAAAAAAAAAAAAAAAAAAAAAAAAAAAAAAAAAAAAAAAAAAAAAAAAAAAAAAAA/AAAAAAAAAKCGAQAAAAAAAAAAAAAAAAAMAAAAAQAAAAAAAAAAAAAAAAAAAB8AAABUAAAAu+DjBf///wEAAAAAAAAAAAAAAAAAAAAAAAAAAAAAAAAAAAAAAAAAAAAAAAJ/f38AgICAA8zMzADAwP8Af39/AAAAAAAAAAAAAAAAAAAAAAAAAAAAIQAAABgAAAAUAAAAKBUAAN0TAADPGwAAMBUAAAAAAAAmAAAACAAAAP//////////"/>
               </a:ext>
             </a:extLst>
           </p:cNvSpPr>
@@ -4703,7 +4736,7 @@
           <p:cNvSpPr>
             <a:extLst>
               <a:ext uri="smNativeData">
-                <pr:smNativeData xmlns:pr="smNativeData" xmlns="smNativeData" val="SMDATA_15_ucsbZBMAAAAlAAAAZAAAAA8BAAAAkAAAAEgAAACQAAAASAAAAAAAAAABAAAAAAAAAAEAAABQAAAAAAAAAAAA4D8AAAAAAADgPwAAAAAAAOA/AAAAAAAA4D8AAAAAAADgPwAAAAAAAOA/AAAAAAAA4D8AAAAAAADgPwAAAAAAAOA/AAAAAAAA4D8CAAAAjAAAAAEAAAAAAAAAu+DjDP///wgAAAAAAAAAAAAAAAAAAAAAAAAAAAAAAAAAAAAAZAAAAAEAAABAAAAAAAAAAAAAAAAAAAAAAAAAAAAAAAAAAAAAAAAAAAAAAAAAAAAAAAAAAAAAAAAAAAAAAAAAAAAAAAAAAAAAAAAAAAAAAAAAAAAAAAAAAAAAAAAAAAAAFAAAADwAAAABAAAAAAAAAAAAAAkUAAAAAQAAABQAAAAUAAAAFAAAAAEAAAAAAAAAZAAAAGQAAAAAAAAAZAAAAGQAAAAVAAAAYAAAAAAAAAAAAAAADwAAACADAAAAAAAAAAAAAAEAAACgMgAAVgcAAKr4//8BAAAAf39/AAEAAABkAAAAAAAAABQAAABAHwAAAAAAACYAAAAAAAAAwOD//wAAAAAmAAAAZAAAABYAAABMAAAAAAAAAAAAAAAEAAAAAAAAAAEAAACAgIAKAAAAACgAAAAoAAAAZAAAAGQAAAAAAAAAzMzMAAAAAABQAAAAUAAAAGQAAABkAAAAAAAAABcAAAAUAAAAAAAAAAAAAAD/fwAA/38AAAAAAAAJAAAABAAAAAAAAAAeAAAAaAAAAAAAAAAAAAAAAAAAAAAAAAAAAAAAECcAABAnAAAAAAAAAAAAAAAAAAAAAAAAAAAAAAAAAAAAAAAAAAAAABQAAAAAAAAAwMD/AAAAAABkAAAAMgAAAAAAAABkAAAAAAAAAH9/fwAKAAAAIgAAABgAAAAAAAAAAAAAAAAAAAAAAAAAAAAAAAAAAAAkAAAAJAAAAAAAAAAHAAAAAAAAAAAAAAAAAAAAAAAAAAAAAAAAAAAAf39/ACUAAABYAAAAAAAAAAAAAAAAAAAAAAAAAAAAAAAAAAAAAAAAAAAAAAAAAAAAAAAAAAAAAAA/AAAAAAAAAKCGAQAAAAAAAAAAAAAAAAAMAAAAAQAAAAAAAAAAAAAAAAAAAB8AAABUAAAAu+DjBf///wEAAAAAAAAAAAAAAAAAAAAAAAAAAAAAAAAAAAAAAAAAAAAAAAJ/f38AgICAA8zMzADAwP8Af39/AAAAAAAAAAAAAAAAAAAAAAAAAAAAIQAAABgAAAAUAAAAvgUAADAVAAC/FAAAgxYAAAAAAAAmAAAACAAAAP//////////"/>
+                <pr:smNativeData xmlns:pr="smNativeData" xmlns="smNativeData" val="SMDATA_15_NygcZBMAAAAlAAAAZAAAAA8BAAAAkAAAAEgAAACQAAAASAAAAAAAAAABAAAAAAAAAAEAAABQAAAAAAAAAAAA4D8AAAAAAADgPwAAAAAAAOA/AAAAAAAA4D8AAAAAAADgPwAAAAAAAOA/AAAAAAAA4D8AAAAAAADgPwAAAAAAAOA/AAAAAAAA4D8CAAAAjAAAAAEAAAAAAAAAu+DjDP///wgAAAAAAAAAAAAAAAAAAAAAAAAAAAAAAAAAAAAAZAAAAAEAAABAAAAAAAAAAAAAAAAAAAAAAAAAAAAAAAAAAAAAAAAAAAAAAAAAAAAAAAAAAAAAAAAAAAAAAAAAAAAAAAAAAAAAAAAAAAAAAAAAAAAAAAAAAAAAAAAAAAAAFAAAADwAAAABAAAAAAAAAAAAAAkUAAAAAQAAABQAAAAUAAAAFAAAAAEAAAAAAAAAZAAAAGQAAAAAAAAAZAAAAGQAAAAVAAAAYAAAAAAAAAAAAAAADwAAACADAAAAAAAAAAAAAAEAAACgMgAAVgcAAKr4//8BAAAAf39/AAEAAABkAAAAAAAAABQAAABAHwAAAAAAACYAAAAAAAAAwOD//wAAAAAmAAAAZAAAABYAAABMAAAAAAAAAAAAAAAEAAAAAAAAAAEAAACAgIAKAAAAACgAAAAoAAAAZAAAAGQAAAAAAAAAzMzMAAAAAABQAAAAUAAAAGQAAABkAAAAAAAAABcAAAAUAAAAAAAAAAAAAAD/fwAA/38AAAAAAAAJAAAABAAAAAAAAAAeAAAAaAAAAAAAAAAAAAAAAAAAAAAAAAAAAAAAECcAABAnAAAAAAAAAAAAAAAAAAAAAAAAAAAAAAAAAAAAAAAAAAAAABQAAAAAAAAAwMD/AAAAAABkAAAAMgAAAAAAAABkAAAAAAAAAH9/fwAKAAAAIgAAABgAAAAAAAAAAAAAAAAAAAAAAAAAAAAAAAAAAAAkAAAAJAAAAAAAAAAHAAAAAAAAAAAAAAAAAAAAAAAAAAAAAAAAAAAAf39/ACUAAABYAAAAAAAAAAAAAAAAAAAAAAAAAAAAAAAAAAAAAAAAAAAAAAAAAAAAAAAAAAAAAAA/AAAAAAAAAKCGAQAAAAAAAAAAAAAAAAAMAAAAAQAAAAAAAAAAAAAAAAAAAB8AAABUAAAAu+DjBf///wEAAAAAAAAAAAAAAAAAAAAAAAAAAAAAAAAAAAAAAAAAAAAAAAJ/f38AgICAA8zMzADAwP8Af39/AAAAAAAAAAAAAAAAAAAAAAAAAAAAIQAAABgAAAAUAAAAvgUAADAVAAC/FAAAgxYAAAAAAAAmAAAACAAAAP//////////"/>
               </a:ext>
             </a:extLst>
           </p:cNvSpPr>
@@ -4749,7 +4782,7 @@
           <p:cNvSpPr>
             <a:extLst>
               <a:ext uri="smNativeData">
-                <pr:smNativeData xmlns:pr="smNativeData" xmlns="smNativeData" val="SMDATA_15_ucsbZBMAAAAlAAAAZAAAAA8BAAAAkAAAAEgAAACQAAAASAAAAAAAAAABAAAAAAAAAAEAAABQAAAAAAAAAAAA4D8AAAAAAADgPwAAAAAAAOA/AAAAAAAA4D8AAAAAAADgPwAAAAAAAOA/AAAAAAAA4D8AAAAAAADgPwAAAAAAAOA/AAAAAAAA4D8CAAAAjAAAAAEAAAAAAAAAu+DjDP///wgAAAAAAAAAAAAAAAAAAAAAAAAAAAAAAAAAAAAAZAAAAAEAAABAAAAAAAAAAAAAAAAAAAAAAAAAAAAAAAAAAAAAAAAAAAAAAAAAAAAAAAAAAAAAAAAAAAAAAAAAAAAAAAAAAAAAAAAAAAAAAAAAAAAAAAAAAAAAAAAAAAAAFAAAADwAAAABAAAAAAAAAAAAAAkUAAAAAQAAABQAAAAUAAAAFAAAAAEAAAAAAAAAZAAAAGQAAAAAAAAAZAAAAGQAAAAVAAAAYAAAAAAAAAAAAAAADwAAACADAAAAAAAAAAAAAAEAAACgMgAAVgcAAKr4//8BAAAAf39/AAEAAABkAAAAAAAAABQAAABAHwAAAAAAACYAAAAAAAAAwOD//wAAAAAmAAAAZAAAABYAAABMAAAAAAAAAAAAAAAEAAAAAAAAAAEAAACAgIAKAAAAACgAAAAoAAAAZAAAAGQAAAAAAAAAzMzMAAAAAABQAAAAUAAAAGQAAABkAAAAAAAAABcAAAAUAAAAAAAAAAAAAAD/fwAA/38AAAAAAAAJAAAABAAAAAAAAAAeAAAAaAAAAAAAAAAAAAAAAAAAAAAAAAAAAAAAECcAABAnAAAAAAAAAAAAAAAAAAAAAAAAAAAAAAAAAAAAAAAAAAAAABQAAAAAAAAAwMD/AAAAAABkAAAAMgAAAAAAAABkAAAAAAAAAH9/fwAKAAAAIgAAABgAAAAAAAAAAAAAAAAAAAAAAAAAAAAAAAAAAAAkAAAAJAAAAAAAAAAHAAAAAAAAAAAAAAAAAAAAAAAAAAAAAAAAAAAAf39/ACUAAABYAAAAAAAAAAAAAAAAAAAAAAAAAAAAAAAAAAAAAAAAAAAAAAAAAAAAAAAAAAAAAAA/AAAAAAAAAKCGAQAAAAAAAAAAAAAAAAAMAAAAAQAAAAAAAAAAAAAAAAAAAB8AAABUAAAAu+DjBf///wEAAAAAAAAAAAAAAAAAAAAAAAAAAAAAAAAAAAAAAAAAAAAAAAJ/f38AgICAA8zMzADAwP8Af39/AAAAAAAAAAAAAAAAAAAAAAAAAAAAIQAAABgAAAAUAAAAvgUAAIMWAAC/FAAA1hcAAAAAAAAmAAAACAAAAP//////////"/>
+                <pr:smNativeData xmlns:pr="smNativeData" xmlns="smNativeData" val="SMDATA_15_NygcZBMAAAAlAAAAZAAAAA8BAAAAkAAAAEgAAACQAAAASAAAAAAAAAABAAAAAAAAAAEAAABQAAAAAAAAAAAA4D8AAAAAAADgPwAAAAAAAOA/AAAAAAAA4D8AAAAAAADgPwAAAAAAAOA/AAAAAAAA4D8AAAAAAADgPwAAAAAAAOA/AAAAAAAA4D8CAAAAjAAAAAEAAAAAAAAAu+DjDP///wgAAAAAAAAAAAAAAAAAAAAAAAAAAAAAAAAAAAAAZAAAAAEAAABAAAAAAAAAAAAAAAAAAAAAAAAAAAAAAAAAAAAAAAAAAAAAAAAAAAAAAAAAAAAAAAAAAAAAAAAAAAAAAAAAAAAAAAAAAAAAAAAAAAAAAAAAAAAAAAAAAAAAFAAAADwAAAABAAAAAAAAAAAAAAkUAAAAAQAAABQAAAAUAAAAFAAAAAEAAAAAAAAAZAAAAGQAAAAAAAAAZAAAAGQAAAAVAAAAYAAAAAAAAAAAAAAADwAAACADAAAAAAAAAAAAAAEAAACgMgAAVgcAAKr4//8BAAAAf39/AAEAAABkAAAAAAAAABQAAABAHwAAAAAAACYAAAAAAAAAwOD//wAAAAAmAAAAZAAAABYAAABMAAAAAAAAAAAAAAAEAAAAAAAAAAEAAACAgIAKAAAAACgAAAAoAAAAZAAAAGQAAAAAAAAAzMzMAAAAAABQAAAAUAAAAGQAAABkAAAAAAAAABcAAAAUAAAAAAAAAAAAAAD/fwAA/38AAAAAAAAJAAAABAAAAAAAAAAeAAAAaAAAAAAAAAAAAAAAAAAAAAAAAAAAAAAAECcAABAnAAAAAAAAAAAAAAAAAAAAAAAAAAAAAAAAAAAAAAAAAAAAABQAAAAAAAAAwMD/AAAAAABkAAAAMgAAAAAAAABkAAAAAAAAAH9/fwAKAAAAIgAAABgAAAAAAAAAAAAAAAAAAAAAAAAAAAAAAAAAAAAkAAAAJAAAAAAAAAAHAAAAAAAAAAAAAAAAAAAAAAAAAAAAAAAAAAAAf39/ACUAAABYAAAAAAAAAAAAAAAAAAAAAAAAAAAAAAAAAAAAAAAAAAAAAAAAAAAAAAAAAAAAAAA/AAAAAAAAAKCGAQAAAAAAAAAAAAAAAAAMAAAAAQAAAAAAAAAAAAAAAAAAAB8AAABUAAAAu+DjBf///wEAAAAAAAAAAAAAAAAAAAAAAAAAAAAAAAAAAAAAAAAAAAAAAAJ/f38AgICAA8zMzADAwP8Af39/AAAAAAAAAAAAAAAAAAAAAAAAAAAAIQAAABgAAAAUAAAAvgUAAIMWAAC/FAAA1hcAAAAAAAAmAAAACAAAAP//////////"/>
               </a:ext>
             </a:extLst>
           </p:cNvSpPr>
@@ -4795,7 +4828,7 @@
           <p:cNvSpPr>
             <a:extLst>
               <a:ext uri="smNativeData">
-                <pr:smNativeData xmlns:pr="smNativeData" xmlns="smNativeData" val="SMDATA_15_ucsbZBMAAAAlAAAAZAAAAA8BAAAAkAAAAEgAAACQAAAASAAAAAAAAAABAAAAAAAAAAEAAABQAAAAAAAAAAAA4D8AAAAAAADgPwAAAAAAAOA/AAAAAAAA4D8AAAAAAADgPwAAAAAAAOA/AAAAAAAA4D8AAAAAAADgPwAAAAAAAOA/AAAAAAAA4D8CAAAAjAAAAAEAAAAAAAAAu+DjDP///wgAAAAAAAAAAAAAAAAAAAAAAAAAAAAAAAAAAAAAZAAAAAEAAABAAAAAAAAAAAAAAAAAAAAAAAAAAAAAAAAAAAAAAAAAAAAAAAAAAAAAAAAAAAAAAAAAAAAAAAAAAAAAAAAAAAAAAAAAAAAAAAAAAAAAAAAAAAAAAAAAAAAAFAAAADwAAAABAAAAAAAAAAAAAAkUAAAAAQAAABQAAAAUAAAAFAAAAAEAAAAAAAAAZAAAAGQAAAAAAAAAZAAAAGQAAAAVAAAAYAAAAAAAAAAAAAAADwAAACADAAAAAAAAAAAAAAEAAACgMgAAVgcAAKr4//8BAAAAf39/AAEAAABkAAAAAAAAABQAAABAHwAAAAAAACYAAAAAAAAAwOD//wAAAAAmAAAAZAAAABYAAABMAAAAAAAAAAAAAAAEAAAAAAAAAAEAAACAgIAKAAAAACgAAAAoAAAAZAAAAGQAAAAAAAAAzMzMAAAAAABQAAAAUAAAAGQAAABkAAAAAAAAABcAAAAUAAAAAAAAAAAAAAD/fwAA/38AAAAAAAAJAAAABAAAAAAAAAAeAAAAaAAAAAAAAAAAAAAAAAAAAAAAAAAAAAAAECcAABAnAAAAAAAAAAAAAAAAAAAAAAAAAAAAAAAAAAAAAAAAAAAAABQAAAAAAAAAwMD/AAAAAABkAAAAMgAAAAAAAABkAAAAAAAAAH9/fwAKAAAAIgAAABgAAAAAAAAAAAAAAAAAAAAAAAAAAAAAAAAAAAAkAAAAJAAAAAAAAAAHAAAAAAAAAAAAAAAAAAAAAAAAAAAAAAAAAAAAf39/ACUAAABYAAAAAAAAAAAAAAAAAAAAAAAAAAAAAAAAAAAAAAAAAAAAAAAAAAAAAAAAAAAAAAA/AAAAAAAAAKCGAQAAAAAAAAAAAAAAAAAMAAAAAQAAAAAAAAAAAAAAAAAAAB8AAABUAAAAu+DjBf///wEAAAAAAAAAAAAAAAAAAAAAAAAAAAAAAAAAAAAAAAAAAAAAAAJ/f38AgICAA8zMzADAwP8Af39/AAAAAAAAAAAAAAAAAAAAAAAAAAAAIQAAABgAAAAUAAAAvgUAANYXAAC/FAAAKRkAAAAAAAAmAAAACAAAAP//////////"/>
+                <pr:smNativeData xmlns:pr="smNativeData" xmlns="smNativeData" val="SMDATA_15_NygcZBMAAAAlAAAAZAAAAA8BAAAAkAAAAEgAAACQAAAASAAAAAAAAAABAAAAAAAAAAEAAABQAAAAAAAAAAAA4D8AAAAAAADgPwAAAAAAAOA/AAAAAAAA4D8AAAAAAADgPwAAAAAAAOA/AAAAAAAA4D8AAAAAAADgPwAAAAAAAOA/AAAAAAAA4D8CAAAAjAAAAAEAAAAAAAAAu+DjDP///wgAAAAAAAAAAAAAAAAAAAAAAAAAAAAAAAAAAAAAZAAAAAEAAABAAAAAAAAAAAAAAAAAAAAAAAAAAAAAAAAAAAAAAAAAAAAAAAAAAAAAAAAAAAAAAAAAAAAAAAAAAAAAAAAAAAAAAAAAAAAAAAAAAAAAAAAAAAAAAAAAAAAAFAAAADwAAAABAAAAAAAAAAAAAAkUAAAAAQAAABQAAAAUAAAAFAAAAAEAAAAAAAAAZAAAAGQAAAAAAAAAZAAAAGQAAAAVAAAAYAAAAAAAAAAAAAAADwAAACADAAAAAAAAAAAAAAEAAACgMgAAVgcAAKr4//8BAAAAf39/AAEAAABkAAAAAAAAABQAAABAHwAAAAAAACYAAAAAAAAAwOD//wAAAAAmAAAAZAAAABYAAABMAAAAAAAAAAAAAAAEAAAAAAAAAAEAAACAgIAKAAAAACgAAAAoAAAAZAAAAGQAAAAAAAAAzMzMAAAAAABQAAAAUAAAAGQAAABkAAAAAAAAABcAAAAUAAAAAAAAAAAAAAD/fwAA/38AAAAAAAAJAAAABAAAAAAAAAAeAAAAaAAAAAAAAAAAAAAAAAAAAAAAAAAAAAAAECcAABAnAAAAAAAAAAAAAAAAAAAAAAAAAAAAAAAAAAAAAAAAAAAAABQAAAAAAAAAwMD/AAAAAABkAAAAMgAAAAAAAABkAAAAAAAAAH9/fwAKAAAAIgAAABgAAAAAAAAAAAAAAAAAAAAAAAAAAAAAAAAAAAAkAAAAJAAAAAAAAAAHAAAAAAAAAAAAAAAAAAAAAAAAAAAAAAAAAAAAf39/ACUAAABYAAAAAAAAAAAAAAAAAAAAAAAAAAAAAAAAAAAAAAAAAAAAAAAAAAAAAAAAAAAAAAA/AAAAAAAAAKCGAQAAAAAAAAAAAAAAAAAMAAAAAQAAAAAAAAAAAAAAAAAAAB8AAABUAAAAu+DjBf///wEAAAAAAAAAAAAAAAAAAAAAAAAAAAAAAAAAAAAAAAAAAAAAAAJ/f38AgICAA8zMzADAwP8Af39/AAAAAAAAAAAAAAAAAAAAAAAAAAAAIQAAABgAAAAUAAAAvgUAANYXAAC/FAAAKRkAAAAAAAAmAAAACAAAAP//////////"/>
               </a:ext>
             </a:extLst>
           </p:cNvSpPr>
@@ -4841,7 +4874,7 @@
           <p:cNvSpPr txBox="1">
             <a:extLst>
               <a:ext uri="smNativeData">
-                <pr:smNativeData xmlns:pr="smNativeData" xmlns="smNativeData" val="SMDATA_15_ucsbZBMAAAAlAAAAEgAAAA8BAAAAkAAAAEgAAACQAAAASAAAAAAAAAAAAAAAAAAAAAEAAABQAAAAAAAAAAAA4D8AAAAAAADgPwAAAAAAAOA/AAAAAAAA4D8AAAAAAADgPwAAAAAAAOA/AAAAAAAA4D8AAAAAAADgPwAAAAAAAOA/AAAAAAAA4D8CAAAAjAAAAAAAAAAAAAAAu+DjDP///wgAAAAAAAAAAAAAAAAAAAAAAAAAAAAAAAAAAAAAZAAAAAEAAABAAAAAAAAAAAAAAAAAAAAAAAAAAAAAAAAAAAAAAAAAAAAAAAAAAAAAAAAAAAAAAAAAAAAAAAAAAAAAAAAAAAAAAAAAAAAAAAAAAAAAAAAAAAAAAAAAAAAAFAAAADwAAAAAAAAAAAAAAAAAAAkUAAAAAQAAABQAAAAUAAAAFAAAAAEAAAAAAAAAZAAAAGQAAAAAAAAAZAAAAGQAAAAVAAAAYAAAAAAAAAAAAAAADwAAACADAAAAAAAAAAAAAAEAAACgMgAAVgcAAKr4//8BAAAAf39/AAEAAABkAAAAAAAAABQAAABAHwAAAAAAACYAAAAAAAAAwOD//wAAAAAmAAAAZAAAABYAAABMAAAAAAAAAAAAAAAEAAAAAAAAAAEAAACAgIAKAAAAACgAAAAoAAAAZAAAAGQAAAAAAAAAzMzMAAAAAABQAAAAUAAAAGQAAABkAAAAAAAAABcAAAAUAAAAAAAAANwIAAD/fwAA/38AAAAAAAAJAAAABAAAAAAAAAAeAAAAaAAAAAAAAAAAAAAAAAAAAAAAAAAAAAAAECcAABAnAAAAAAAAAAAAAAAAAAAAAAAAAAAAAAAAAAAAAAAAAAAAABQAAAAAAAAAwMD/AAAAAABkAAAAMgAAAAAAAABkAAAAAAAAAH9/fwAKAAAAIgAAABgAAAAAAAAAAAAAAAAAAAAAAAAAAAAAAAAAAAAkAAAAJAAAAAAAAAAHAAAAAAAAAAAAAAAAAAAAAAAAAAAAAAAAAAAAf39/ACUAAABYAAAAAAAAAAAAAAAAAAAAAAAAAAAAAAAAAAAAAAAAAAAAAAAAAAAAAAAAAAAAAAA/AAAAAAAAAKCGAQAAAAAAAAAAAAAAAAAMAAAAAQAAAAAAAAAAAAAAAAAAAB8AAABUAAAAu+DjBf///wEAAAAAAAAAAAAAAAAAAAAAAAAAAAAAAAAAAAAAAAAAAAAAAAJ/f38AgICAA8zMzADAwP8Af39/AAAAAAAAAAAAAAAAAAAAAAAAAAAAIQAAABgAAAAUAAAAKBUAADAVAADPGwAAgxYAAAAAAAAmAAAACAAAAP//////////"/>
+                <pr:smNativeData xmlns:pr="smNativeData" xmlns="smNativeData" val="SMDATA_15_NygcZBMAAAAlAAAAEgAAAA8BAAAAkAAAAEgAAACQAAAASAAAAAAAAAAAAAAAAAAAAAEAAABQAAAAAAAAAAAA4D8AAAAAAADgPwAAAAAAAOA/AAAAAAAA4D8AAAAAAADgPwAAAAAAAOA/AAAAAAAA4D8AAAAAAADgPwAAAAAAAOA/AAAAAAAA4D8CAAAAjAAAAAAAAAAAAAAAu+DjDP///wgAAAAAAAAAAAAAAAAAAAAAAAAAAAAAAAAAAAAAZAAAAAEAAABAAAAAAAAAAAAAAAAAAAAAAAAAAAAAAAAAAAAAAAAAAAAAAAAAAAAAAAAAAAAAAAAAAAAAAAAAAAAAAAAAAAAAAAAAAAAAAAAAAAAAAAAAAAAAAAAAAAAAFAAAADwAAAAAAAAAAAAAAAAAAAkUAAAAAQAAABQAAAAUAAAAFAAAAAEAAAAAAAAAZAAAAGQAAAAAAAAAZAAAAGQAAAAVAAAAYAAAAAAAAAAAAAAADwAAACADAAAAAAAAAAAAAAEAAACgMgAAVgcAAKr4//8BAAAAf39/AAEAAABkAAAAAAAAABQAAABAHwAAAAAAACYAAAAAAAAAwOD//wAAAAAmAAAAZAAAABYAAABMAAAAAAAAAAAAAAAEAAAAAAAAAAEAAACAgIAKAAAAACgAAAAoAAAAZAAAAGQAAAAAAAAAzMzMAAAAAABQAAAAUAAAAGQAAABkAAAAAAAAABcAAAAUAAAAAAAAANwIAAD/fwAA/38AAAAAAAAJAAAABAAAAAAAAAAeAAAAaAAAAAAAAAAAAAAAAAAAAAAAAAAAAAAAECcAABAnAAAAAAAAAAAAAAAAAAAAAAAAAAAAAAAAAAAAAAAAAAAAABQAAAAAAAAAwMD/AAAAAABkAAAAMgAAAAAAAABkAAAAAAAAAH9/fwAKAAAAIgAAABgAAAAAAAAAAAAAAAAAAAAAAAAAAAAAAAAAAAAkAAAAJAAAAAAAAAAHAAAAAAAAAAAAAAAAAAAAAAAAAAAAAAAAAAAAf39/ACUAAABYAAAAAAAAAAAAAAAAAAAAAAAAAAAAAAAAAAAAAAAAAAAAAAAAAAAAAAAAAAAAAAA/AAAAAAAAAKCGAQAAAAAAAAAAAAAAAAAMAAAAAQAAAAAAAAAAAAAAAAAAAB8AAABUAAAAu+DjBf///wEAAAAAAAAAAAAAAAAAAAAAAAAAAAAAAAAAAAAAAAAAAAAAAAJ/f38AgICAA8zMzADAwP8Af39/AAAAAAAAAAAAAAAAAAAAAAAAAAAAIQAAABgAAAAUAAAAKBUAADAVAADPGwAAgxYAAAAAAAAmAAAACAAAAP//////////"/>
               </a:ext>
             </a:extLst>
           </p:cNvSpPr>
@@ -4880,7 +4913,7 @@
           <p:cNvSpPr txBox="1">
             <a:extLst>
               <a:ext uri="smNativeData">
-                <pr:smNativeData xmlns:pr="smNativeData" xmlns="smNativeData" val="SMDATA_15_ucsbZBMAAAAlAAAAEgAAAA8BAAAAkAAAAEgAAACQAAAASAAAAAAAAAAAAAAAAAAAAAEAAABQAAAAAAAAAAAA4D8AAAAAAADgPwAAAAAAAOA/AAAAAAAA4D8AAAAAAADgPwAAAAAAAOA/AAAAAAAA4D8AAAAAAADgPwAAAAAAAOA/AAAAAAAA4D8CAAAAjAAAAAAAAAAAAAAAu+DjDP///wgAAAAAAAAAAAAAAAAAAAAAAAAAAAAAAAAAAAAAZAAAAAEAAABAAAAAAAAAAAAAAAAAAAAAAAAAAAAAAAAAAAAAAAAAAAAAAAAAAAAAAAAAAAAAAAAAAAAAAAAAAAAAAAAAAAAAAAAAAAAAAAAAAAAAAAAAAAAAAAAAAAAAFAAAADwAAAAAAAAAAAAAAAAAAAkUAAAAAQAAABQAAAAUAAAAFAAAAAEAAAAAAAAAZAAAAGQAAAAAAAAAZAAAAGQAAAAVAAAAYAAAAAAAAAAAAAAADwAAACADAAAAAAAAAAAAAAEAAACgMgAAVgcAAKr4//8BAAAAf39/AAEAAABkAAAAAAAAABQAAABAHwAAAAAAACYAAAAAAAAAwOD//wAAAAAmAAAAZAAAABYAAABMAAAAAAAAAAAAAAAEAAAAAAAAAAEAAACAgIAKAAAAACgAAAAoAAAAZAAAAGQAAAAAAAAAzMzMAAAAAABQAAAAUAAAAGQAAABkAAAAAAAAABcAAAAUAAAAAAAAANwIAAD/fwAA/38AAAAAAAAJAAAABAAAAAAAAAAeAAAAaAAAAAAAAAAAAAAAAAAAAAAAAAAAAAAAECcAABAnAAAAAAAAAAAAAAAAAAAAAAAAAAAAAAAAAAAAAAAAAAAAABQAAAAAAAAAwMD/AAAAAABkAAAAMgAAAAAAAABkAAAAAAAAAH9/fwAKAAAAIgAAABgAAAAAAAAAAAAAAAAAAAAAAAAAAAAAAAAAAAAkAAAAJAAAAAAAAAAHAAAAAAAAAAAAAAAAAAAAAAAAAAAAAAAAAAAAf39/ACUAAABYAAAAAAAAAAAAAAAAAAAAAAAAAAAAAAAAAAAAAAAAAAAAAAAAAAAAAAAAAAAAAAA/AAAAAAAAAKCGAQAAAAAAAAAAAAAAAAAMAAAAAQAAAAAAAAAAAAAAAAAAAB8AAABUAAAAu+DjBf///wEAAAAAAAAAAAAAAAAAAAAAAAAAAAAAAAAAAAAAAAAAAAAAAAJ/f38AgICAA8zMzADAwP8Af39/AAAAAAAAAAAAAAAAAAAAAAAAAAAAIQAAABgAAAAUAAAAKBUAAIMWAADPGwAA1hcAAAAAAAAmAAAACAAAAP//////////"/>
+                <pr:smNativeData xmlns:pr="smNativeData" xmlns="smNativeData" val="SMDATA_15_NygcZBMAAAAlAAAAEgAAAA8BAAAAkAAAAEgAAACQAAAASAAAAAAAAAAAAAAAAAAAAAEAAABQAAAAAAAAAAAA4D8AAAAAAADgPwAAAAAAAOA/AAAAAAAA4D8AAAAAAADgPwAAAAAAAOA/AAAAAAAA4D8AAAAAAADgPwAAAAAAAOA/AAAAAAAA4D8CAAAAjAAAAAAAAAAAAAAAu+DjDP///wgAAAAAAAAAAAAAAAAAAAAAAAAAAAAAAAAAAAAAZAAAAAEAAABAAAAAAAAAAAAAAAAAAAAAAAAAAAAAAAAAAAAAAAAAAAAAAAAAAAAAAAAAAAAAAAAAAAAAAAAAAAAAAAAAAAAAAAAAAAAAAAAAAAAAAAAAAAAAAAAAAAAAFAAAADwAAAAAAAAAAAAAAAAAAAkUAAAAAQAAABQAAAAUAAAAFAAAAAEAAAAAAAAAZAAAAGQAAAAAAAAAZAAAAGQAAAAVAAAAYAAAAAAAAAAAAAAADwAAACADAAAAAAAAAAAAAAEAAACgMgAAVgcAAKr4//8BAAAAf39/AAEAAABkAAAAAAAAABQAAABAHwAAAAAAACYAAAAAAAAAwOD//wAAAAAmAAAAZAAAABYAAABMAAAAAAAAAAAAAAAEAAAAAAAAAAEAAACAgIAKAAAAACgAAAAoAAAAZAAAAGQAAAAAAAAAzMzMAAAAAABQAAAAUAAAAGQAAABkAAAAAAAAABcAAAAUAAAAAAAAANwIAAD/fwAA/38AAAAAAAAJAAAABAAAAAAAAAAeAAAAaAAAAAAAAAAAAAAAAAAAAAAAAAAAAAAAECcAABAnAAAAAAAAAAAAAAAAAAAAAAAAAAAAAAAAAAAAAAAAAAAAABQAAAAAAAAAwMD/AAAAAABkAAAAMgAAAAAAAABkAAAAAAAAAH9/fwAKAAAAIgAAABgAAAAAAAAAAAAAAAAAAAAAAAAAAAAAAAAAAAAkAAAAJAAAAAAAAAAHAAAAAAAAAAAAAAAAAAAAAAAAAAAAAAAAAAAAf39/ACUAAABYAAAAAAAAAAAAAAAAAAAAAAAAAAAAAAAAAAAAAAAAAAAAAAAAAAAAAAAAAAAAAAA/AAAAAAAAAKCGAQAAAAAAAAAAAAAAAAAMAAAAAQAAAAAAAAAAAAAAAAAAAB8AAABUAAAAu+DjBf///wEAAAAAAAAAAAAAAAAAAAAAAAAAAAAAAAAAAAAAAAAAAAAAAAJ/f38AgICAA8zMzADAwP8Af39/AAAAAAAAAAAAAAAAAAAAAAAAAAAAIQAAABgAAAAUAAAAKBUAAIMWAADPGwAA1hcAAAAAAAAmAAAACAAAAP//////////"/>
               </a:ext>
             </a:extLst>
           </p:cNvSpPr>
@@ -4919,7 +4952,7 @@
           <p:cNvSpPr txBox="1">
             <a:extLst>
               <a:ext uri="smNativeData">
-                <pr:smNativeData xmlns:pr="smNativeData" xmlns="smNativeData" val="SMDATA_15_ucsbZBMAAAAlAAAAEgAAAA8BAAAAkAAAAEgAAACQAAAASAAAAAAAAAAAAAAAAAAAAAEAAABQAAAAAAAAAAAA4D8AAAAAAADgPwAAAAAAAOA/AAAAAAAA4D8AAAAAAADgPwAAAAAAAOA/AAAAAAAA4D8AAAAAAADgPwAAAAAAAOA/AAAAAAAA4D8CAAAAjAAAAAAAAAAAAAAAu+DjDP///wgAAAAAAAAAAAAAAAAAAAAAAAAAAAAAAAAAAAAAZAAAAAEAAABAAAAAAAAAAAAAAAAAAAAAAAAAAAAAAAAAAAAAAAAAAAAAAAAAAAAAAAAAAAAAAAAAAAAAAAAAAAAAAAAAAAAAAAAAAAAAAAAAAAAAAAAAAAAAAAAAAAAAFAAAADwAAAAAAAAAAAAAAAAAAAkUAAAAAQAAABQAAAAUAAAAFAAAAAEAAAAAAAAAZAAAAGQAAAAAAAAAZAAAAGQAAAAVAAAAYAAAAAAAAAAAAAAADwAAACADAAAAAAAAAAAAAAEAAACgMgAAVgcAAKr4//8BAAAAf39/AAEAAABkAAAAAAAAABQAAABAHwAAAAAAACYAAAAAAAAAwOD//wAAAAAmAAAAZAAAABYAAABMAAAAAAAAAAAAAAAEAAAAAAAAAAEAAACAgIAKAAAAACgAAAAoAAAAZAAAAGQAAAAAAAAAzMzMAAAAAABQAAAAUAAAAGQAAABkAAAAAAAAABcAAAAUAAAAAAAAANwIAAD/fwAA/38AAAAAAAAJAAAABAAAAAAAAAAeAAAAaAAAAAAAAAAAAAAAAAAAAAAAAAAAAAAAECcAABAnAAAAAAAAAAAAAAAAAAAAAAAAAAAAAAAAAAAAAAAAAAAAABQAAAAAAAAAwMD/AAAAAABkAAAAMgAAAAAAAABkAAAAAAAAAH9/fwAKAAAAIgAAABgAAAAAAAAAAAAAAAAAAAAAAAAAAAAAAAAAAAAkAAAAJAAAAAAAAAAHAAAAAAAAAAAAAAAAAAAAAAAAAAAAAAAAAAAAf39/ACUAAABYAAAAAAAAAAAAAAAAAAAAAAAAAAAAAAAAAAAAAAAAAAAAAAAAAAAAAAAAAAAAAAA/AAAAAAAAAKCGAQAAAAAAAAAAAAAAAAAMAAAAAQAAAAAAAAAAAAAAAAAAAB8AAABUAAAAu+DjBf///wEAAAAAAAAAAAAAAAAAAAAAAAAAAAAAAAAAAAAAAAAAAAAAAAJ/f38AgICAA8zMzADAwP8Af39/AAAAAAAAAAAAAAAAAAAAAAAAAAAAIQAAABgAAAAUAAAAMBUAANYXAADXGwAAKRkAAAAAAAAmAAAACAAAAP//////////"/>
+                <pr:smNativeData xmlns:pr="smNativeData" xmlns="smNativeData" val="SMDATA_15_NygcZBMAAAAlAAAAEgAAAA8BAAAAkAAAAEgAAACQAAAASAAAAAAAAAAAAAAAAAAAAAEAAABQAAAAAAAAAAAA4D8AAAAAAADgPwAAAAAAAOA/AAAAAAAA4D8AAAAAAADgPwAAAAAAAOA/AAAAAAAA4D8AAAAAAADgPwAAAAAAAOA/AAAAAAAA4D8CAAAAjAAAAAAAAAAAAAAAu+DjDP///wgAAAAAAAAAAAAAAAAAAAAAAAAAAAAAAAAAAAAAZAAAAAEAAABAAAAAAAAAAAAAAAAAAAAAAAAAAAAAAAAAAAAAAAAAAAAAAAAAAAAAAAAAAAAAAAAAAAAAAAAAAAAAAAAAAAAAAAAAAAAAAAAAAAAAAAAAAAAAAAAAAAAAFAAAADwAAAAAAAAAAAAAAAAAAAkUAAAAAQAAABQAAAAUAAAAFAAAAAEAAAAAAAAAZAAAAGQAAAAAAAAAZAAAAGQAAAAVAAAAYAAAAAAAAAAAAAAADwAAACADAAAAAAAAAAAAAAEAAACgMgAAVgcAAKr4//8BAAAAf39/AAEAAABkAAAAAAAAABQAAABAHwAAAAAAACYAAAAAAAAAwOD//wAAAAAmAAAAZAAAABYAAABMAAAAAAAAAAAAAAAEAAAAAAAAAAEAAACAgIAKAAAAACgAAAAoAAAAZAAAAGQAAAAAAAAAzMzMAAAAAABQAAAAUAAAAGQAAABkAAAAAAAAABcAAAAUAAAAAAAAANwIAAD/fwAA/38AAAAAAAAJAAAABAAAAAAAAAAeAAAAaAAAAAAAAAAAAAAAAAAAAAAAAAAAAAAAECcAABAnAAAAAAAAAAAAAAAAAAAAAAAAAAAAAAAAAAAAAAAAAAAAABQAAAAAAAAAwMD/AAAAAABkAAAAMgAAAAAAAABkAAAAAAAAAH9/fwAKAAAAIgAAABgAAAAAAAAAAAAAAAAAAAAAAAAAAAAAAAAAAAAkAAAAJAAAAAAAAAAHAAAAAAAAAAAAAAAAAAAAAAAAAAAAAAAAAAAAf39/ACUAAABYAAAAAAAAAAAAAAAAAAAAAAAAAAAAAAAAAAAAAAAAAAAAAAAAAAAAAAAAAAAAAAA/AAAAAAAAAKCGAQAAAAAAAAAAAAAAAAAMAAAAAQAAAAAAAAAAAAAAAAAAAB8AAABUAAAAu+DjBf///wEAAAAAAAAAAAAAAAAAAAAAAAAAAAAAAAAAAAAAAAAAAAAAAAJ/f38AgICAA8zMzADAwP8Af39/AAAAAAAAAAAAAAAAAAAAAAAAAAAAIQAAABgAAAAUAAAAMBUAANYXAADXGwAAKRkAAAAAAAAmAAAACAAAAP//////////"/>
               </a:ext>
             </a:extLst>
           </p:cNvSpPr>
@@ -4958,7 +4991,7 @@
           <p:cNvSpPr>
             <a:extLst>
               <a:ext uri="smNativeData">
-                <pr:smNativeData xmlns:pr="smNativeData" xmlns="smNativeData" val="SMDATA_15_ucsbZBMAAAAlAAAAZAAAAA8BAAAAkAAAAEgAAACQAAAASAAAAAAAAAABAAAAAAAAAAEAAABQAAAAAAAAAAAA4D8AAAAAAADgPwAAAAAAAOA/AAAAAAAA4D8AAAAAAADgPwAAAAAAAOA/AAAAAAAA4D8AAAAAAADgPwAAAAAAAOA/AAAAAAAA4D8CAAAAjAAAAAEAAAAAAAAAu+DjDP///wgAAAAAAAAAAAAAAAAAAAAAAAAAAAAAAAAAAAAAZAAAAAEAAABAAAAAAAAAAAAAAAAAAAAAAAAAAAAAAAAAAAAAAAAAAAAAAAAAAAAAAAAAAAAAAAAAAAAAAAAAAAAAAAAAAAAAAAAAAAAAAAAAAAAAAAAAAAAAAAAAAAAAFAAAADwAAAABAAAAAAAAAAAAAAkUAAAAAQAAABQAAAAUAAAAFAAAAAEAAAAAAAAAZAAAAGQAAAAAAAAAZAAAAGQAAAAVAAAAYAAAAAAAAAAAAAAADwAAACADAAAAAAAAAAAAAAEAAACgMgAAVgcAAKr4//8BAAAAf39/AAEAAABkAAAAAAAAABQAAABAHwAAAAAAACYAAAAAAAAAwOD//wAAAAAmAAAAZAAAABYAAABMAAAAAAAAAAAAAAAEAAAAAAAAAAEAAACAgIAKAAAAACgAAAAoAAAAZAAAAGQAAAAAAAAAzMzMAAAAAABQAAAAUAAAAGQAAABkAAAAAAAAABcAAAAUAAAAAAAAAAAAAAD/fwAA/38AAAAAAAAJAAAABAAAAAAAAAAeAAAAaAAAAAAAAAAAAAAAAAAAAAAAAAAAAAAAECcAABAnAAAAAAAAAAAAAAAAAAAAAAAAAAAAAAAAAAAAAAAAAAAAABQAAAAAAAAAwMD/AAAAAABkAAAAMgAAAAAAAABkAAAAAAAAAH9/fwAKAAAAIgAAABgAAAAAAAAAAAAAAAAAAAAAAAAAAAAAAAAAAAAkAAAAJAAAAAAAAAAHAAAAAAAAAAAAAAAAAAAAAAAAAAAAAAAAAAAAf39/ACUAAABYAAAAAAAAAAAAAAAAAAAAAAAAAAAAAAAAAAAAAAAAAAAAAAAAAAAAAAAAAAAAAAA/AAAAAAAAAKCGAQAAAAAAAAAAAAAAAAAMAAAAAQAAAAAAAAAAAAAAAAAAAB8AAABUAAAAu+DjBf///wEAAAAAAAAAAAAAAAAAAAAAAAAAAAAAAAAAAAAAAAAAAAAAAAJ/f38AgICAA8zMzADAwP8Af39/AAAAAAAAAAAAAAAAAAAAAAAAAAAAIQAAABgAAAAUAAAAvgUAACkZAAC/FAAAfBoAAAAAAAAmAAAACAAAAP//////////"/>
+                <pr:smNativeData xmlns:pr="smNativeData" xmlns="smNativeData" val="SMDATA_15_NygcZBMAAAAlAAAAZAAAAA8BAAAAkAAAAEgAAACQAAAASAAAAAAAAAABAAAAAAAAAAEAAABQAAAAAAAAAAAA4D8AAAAAAADgPwAAAAAAAOA/AAAAAAAA4D8AAAAAAADgPwAAAAAAAOA/AAAAAAAA4D8AAAAAAADgPwAAAAAAAOA/AAAAAAAA4D8CAAAAjAAAAAEAAAAAAAAAu+DjDP///wgAAAAAAAAAAAAAAAAAAAAAAAAAAAAAAAAAAAAAZAAAAAEAAABAAAAAAAAAAAAAAAAAAAAAAAAAAAAAAAAAAAAAAAAAAAAAAAAAAAAAAAAAAAAAAAAAAAAAAAAAAAAAAAAAAAAAAAAAAAAAAAAAAAAAAAAAAAAAAAAAAAAAFAAAADwAAAABAAAAAAAAAAAAAAkUAAAAAQAAABQAAAAUAAAAFAAAAAEAAAAAAAAAZAAAAGQAAAAAAAAAZAAAAGQAAAAVAAAAYAAAAAAAAAAAAAAADwAAACADAAAAAAAAAAAAAAEAAACgMgAAVgcAAKr4//8BAAAAf39/AAEAAABkAAAAAAAAABQAAABAHwAAAAAAACYAAAAAAAAAwOD//wAAAAAmAAAAZAAAABYAAABMAAAAAAAAAAAAAAAEAAAAAAAAAAEAAACAgIAKAAAAACgAAAAoAAAAZAAAAGQAAAAAAAAAzMzMAAAAAABQAAAAUAAAAGQAAABkAAAAAAAAABcAAAAUAAAAAAAAAAAAAAD/fwAA/38AAAAAAAAJAAAABAAAAAAAAAAeAAAAaAAAAAAAAAAAAAAAAAAAAAAAAAAAAAAAECcAABAnAAAAAAAAAAAAAAAAAAAAAAAAAAAAAAAAAAAAAAAAAAAAABQAAAAAAAAAwMD/AAAAAABkAAAAMgAAAAAAAABkAAAAAAAAAH9/fwAKAAAAIgAAABgAAAAAAAAAAAAAAAAAAAAAAAAAAAAAAAAAAAAkAAAAJAAAAAAAAAAHAAAAAAAAAAAAAAAAAAAAAAAAAAAAAAAAAAAAf39/ACUAAABYAAAAAAAAAAAAAAAAAAAAAAAAAAAAAAAAAAAAAAAAAAAAAAAAAAAAAAAAAAAAAAA/AAAAAAAAAKCGAQAAAAAAAAAAAAAAAAAMAAAAAQAAAAAAAAAAAAAAAAAAAB8AAABUAAAAu+DjBf///wEAAAAAAAAAAAAAAAAAAAAAAAAAAAAAAAAAAAAAAAAAAAAAAAJ/f38AgICAA8zMzADAwP8Af39/AAAAAAAAAAAAAAAAAAAAAAAAAAAAIQAAABgAAAAUAAAAvgUAACkZAAC/FAAAfBoAAAAAAAAmAAAACAAAAP//////////"/>
               </a:ext>
             </a:extLst>
           </p:cNvSpPr>
@@ -5004,7 +5037,7 @@
           <p:cNvSpPr txBox="1">
             <a:extLst>
               <a:ext uri="smNativeData">
-                <pr:smNativeData xmlns:pr="smNativeData" xmlns="smNativeData" val="SMDATA_15_ucsbZBMAAAAlAAAAEgAAAA8BAAAAkAAAAEgAAACQAAAASAAAAAAAAAAAAAAAAAAAAAEAAABQAAAAAAAAAAAA4D8AAAAAAADgPwAAAAAAAOA/AAAAAAAA4D8AAAAAAADgPwAAAAAAAOA/AAAAAAAA4D8AAAAAAADgPwAAAAAAAOA/AAAAAAAA4D8CAAAAjAAAAAAAAAAAAAAAu+DjDP///wgAAAAAAAAAAAAAAAAAAAAAAAAAAAAAAAAAAAAAZAAAAAEAAABAAAAAAAAAAAAAAAAAAAAAAAAAAAAAAAAAAAAAAAAAAAAAAAAAAAAAAAAAAAAAAAAAAAAAAAAAAAAAAAAAAAAAAAAAAAAAAAAAAAAAAAAAAAAAAAAAAAAAFAAAADwAAAAAAAAAAAAAAAAAAAkUAAAAAQAAABQAAAAUAAAAFAAAAAEAAAAAAAAAZAAAAGQAAAAAAAAAZAAAAGQAAAAVAAAAYAAAAAAAAAAAAAAADwAAACADAAAAAAAAAAAAAAEAAACgMgAAVgcAAKr4//8BAAAAf39/AAEAAABkAAAAAAAAABQAAABAHwAAAAAAACYAAAAAAAAAwOD//wAAAAAmAAAAZAAAABYAAABMAAAAAAAAAAAAAAAEAAAAAAAAAAEAAACAgIAKAAAAACgAAAAoAAAAZAAAAGQAAAAAAAAAzMzMAAAAAABQAAAAUAAAAGQAAABkAAAAAAAAABcAAAAUAAAAAAAAANwIAAD/fwAA/38AAAAAAAAJAAAABAAAAAAAAAAeAAAAaAAAAAAAAAAAAAAAAAAAAAAAAAAAAAAAECcAABAnAAAAAAAAAAAAAAAAAAAAAAAAAAAAAAAAAAAAAAAAAAAAABQAAAAAAAAAwMD/AAAAAABkAAAAMgAAAAAAAABkAAAAAAAAAH9/fwAKAAAAIgAAABgAAAAAAAAAAAAAAAAAAAAAAAAAAAAAAAAAAAAkAAAAJAAAAAAAAAAHAAAAAAAAAAAAAAAAAAAAAAAAAAAAAAAAAAAAf39/ACUAAABYAAAAAAAAAAAAAAAAAAAAAAAAAAAAAAAAAAAAAAAAAAAAAAAAAAAAAAAAAAAAAAA/AAAAAAAAAKCGAQAAAAAAAAAAAAAAAAAMAAAAAQAAAAAAAAAAAAAAAAAAAB8AAABUAAAAu+DjBf///wEAAAAAAAAAAAAAAAAAAAAAAAAAAAAAAAAAAAAAAAAAAAAAAAJ/f38AgICAA8zMzADAwP8Af39/AAAAAAAAAAAAAAAAAAAAAAAAAAAAIQAAABgAAAAUAAAAMBUAACkZAADXGwAAfBoAAAAAAAAmAAAACAAAAP//////////"/>
+                <pr:smNativeData xmlns:pr="smNativeData" xmlns="smNativeData" val="SMDATA_15_NygcZBMAAAAlAAAAEgAAAA8BAAAAkAAAAEgAAACQAAAASAAAAAAAAAAAAAAAAAAAAAEAAABQAAAAAAAAAAAA4D8AAAAAAADgPwAAAAAAAOA/AAAAAAAA4D8AAAAAAADgPwAAAAAAAOA/AAAAAAAA4D8AAAAAAADgPwAAAAAAAOA/AAAAAAAA4D8CAAAAjAAAAAAAAAAAAAAAu+DjDP///wgAAAAAAAAAAAAAAAAAAAAAAAAAAAAAAAAAAAAAZAAAAAEAAABAAAAAAAAAAAAAAAAAAAAAAAAAAAAAAAAAAAAAAAAAAAAAAAAAAAAAAAAAAAAAAAAAAAAAAAAAAAAAAAAAAAAAAAAAAAAAAAAAAAAAAAAAAAAAAAAAAAAAFAAAADwAAAAAAAAAAAAAAAAAAAkUAAAAAQAAABQAAAAUAAAAFAAAAAEAAAAAAAAAZAAAAGQAAAAAAAAAZAAAAGQAAAAVAAAAYAAAAAAAAAAAAAAADwAAACADAAAAAAAAAAAAAAEAAACgMgAAVgcAAKr4//8BAAAAf39/AAEAAABkAAAAAAAAABQAAABAHwAAAAAAACYAAAAAAAAAwOD//wAAAAAmAAAAZAAAABYAAABMAAAAAAAAAAAAAAAEAAAAAAAAAAEAAACAgIAKAAAAACgAAAAoAAAAZAAAAGQAAAAAAAAAzMzMAAAAAABQAAAAUAAAAGQAAABkAAAAAAAAABcAAAAUAAAAAAAAANwIAAD/fwAA/38AAAAAAAAJAAAABAAAAAAAAAAeAAAAaAAAAAAAAAAAAAAAAAAAAAAAAAAAAAAAECcAABAnAAAAAAAAAAAAAAAAAAAAAAAAAAAAAAAAAAAAAAAAAAAAABQAAAAAAAAAwMD/AAAAAABkAAAAMgAAAAAAAABkAAAAAAAAAH9/fwAKAAAAIgAAABgAAAAAAAAAAAAAAAAAAAAAAAAAAAAAAAAAAAAkAAAAJAAAAAAAAAAHAAAAAAAAAAAAAAAAAAAAAAAAAAAAAAAAAAAAf39/ACUAAABYAAAAAAAAAAAAAAAAAAAAAAAAAAAAAAAAAAAAAAAAAAAAAAAAAAAAAAAAAAAAAAA/AAAAAAAAAKCGAQAAAAAAAAAAAAAAAAAMAAAAAQAAAAAAAAAAAAAAAAAAAB8AAABUAAAAu+DjBf///wEAAAAAAAAAAAAAAAAAAAAAAAAAAAAAAAAAAAAAAAAAAAAAAAJ/f38AgICAA8zMzADAwP8Af39/AAAAAAAAAAAAAAAAAAAAAAAAAAAAIQAAABgAAAAUAAAAMBUAACkZAADXGwAAfBoAAAAAAAAmAAAACAAAAP//////////"/>
               </a:ext>
             </a:extLst>
           </p:cNvSpPr>
@@ -5043,7 +5076,7 @@
           <p:cNvSpPr>
             <a:extLst>
               <a:ext uri="smNativeData">
-                <pr:smNativeData xmlns:pr="smNativeData" xmlns="smNativeData" val="SMDATA_15_ucsbZBMAAAAlAAAAZAAAAA8BAAAAkAAAAEgAAACQAAAASAAAAAAAAAABAAAAAAAAAAEAAABQAAAAAAAAAAAA4D8AAAAAAADgPwAAAAAAAOA/AAAAAAAA4D8AAAAAAADgPwAAAAAAAOA/AAAAAAAA4D8AAAAAAADgPwAAAAAAAOA/AAAAAAAA4D8CAAAAjAAAAAEAAAAAAAAAu+DjDP///wgAAAAAAAAAAAAAAAAAAAAAAAAAAAAAAAAAAAAAZAAAAAEAAABAAAAAAAAAAAAAAAAAAAAAAAAAAAAAAAAAAAAAAAAAAAAAAAAAAAAAAAAAAAAAAAAAAAAAAAAAAAAAAAAAAAAAAAAAAAAAAAAAAAAAAAAAAAAAAAAAAAAAFAAAADwAAAABAAAAAAAAAAAAAAkUAAAAAQAAABQAAAAUAAAAFAAAAAEAAAAAAAAAZAAAAGQAAAAAAAAAZAAAAGQAAAAVAAAAYAAAAAAAAAAAAAAADwAAACADAAAAAAAAAAAAAAEAAACgMgAAVgcAAKr4//8BAAAAf39/AAEAAABkAAAAAAAAABQAAABAHwAAAAAAACYAAAAAAAAAwOD//wAAAAAmAAAAZAAAABYAAABMAAAAAAAAAAAAAAAEAAAAAAAAAAEAAACAgIAKAAAAACgAAAAoAAAAZAAAAGQAAAAAAAAAzMzMAAAAAABQAAAAUAAAAGQAAABkAAAAAAAAABcAAAAUAAAAAAAAAAAAAAD/fwAA/38AAAAAAAAJAAAABAAAAAAAAAAeAAAAaAAAAAAAAAAAAAAAAAAAAAAAAAAAAAAAECcAABAnAAAAAAAAAAAAAAAAAAAAAAAAAAAAAAAAAAAAAAAAAAAAABQAAAAAAAAAwMD/AAAAAABkAAAAMgAAAAAAAABkAAAAAAAAAH9/fwAKAAAAIgAAABgAAAAAAAAAAAAAAAAAAAAAAAAAAAAAAAAAAAAkAAAAJAAAAAAAAAAHAAAAAAAAAAAAAAAAAAAAAAAAAAAAAAAAAAAAf39/ACUAAABYAAAAAAAAAAAAAAAAAAAAAAAAAAAAAAAAAAAAAAAAAAAAAAAAAAAAAAAAAAAAAAA/AAAAAAAAAKCGAQAAAAAAAAAAAAAAAAAMAAAAAQAAAAAAAAAAAAAAAAAAAB8AAABUAAAAu+DjBf///wEAAAAAAAAAAAAAAAAAAAAAAAAAAAAAAAAAAAAAAAAAAAAAAAJ/f38AgICAA8zMzADAwP8Af39/AAAAAAAAAAAAAAAAAAAAAAAAAAAAIQAAABgAAAAUAAAAvgUAAHwaAAC/FAAAzxsAAAAAAAAmAAAACAAAAP//////////"/>
+                <pr:smNativeData xmlns:pr="smNativeData" xmlns="smNativeData" val="SMDATA_15_NygcZBMAAAAlAAAAZAAAAA8BAAAAkAAAAEgAAACQAAAASAAAAAAAAAABAAAAAAAAAAEAAABQAAAAAAAAAAAA4D8AAAAAAADgPwAAAAAAAOA/AAAAAAAA4D8AAAAAAADgPwAAAAAAAOA/AAAAAAAA4D8AAAAAAADgPwAAAAAAAOA/AAAAAAAA4D8CAAAAjAAAAAEAAAAAAAAAu+DjDP///wgAAAAAAAAAAAAAAAAAAAAAAAAAAAAAAAAAAAAAZAAAAAEAAABAAAAAAAAAAAAAAAAAAAAAAAAAAAAAAAAAAAAAAAAAAAAAAAAAAAAAAAAAAAAAAAAAAAAAAAAAAAAAAAAAAAAAAAAAAAAAAAAAAAAAAAAAAAAAAAAAAAAAFAAAADwAAAABAAAAAAAAAAAAAAkUAAAAAQAAABQAAAAUAAAAFAAAAAEAAAAAAAAAZAAAAGQAAAAAAAAAZAAAAGQAAAAVAAAAYAAAAAAAAAAAAAAADwAAACADAAAAAAAAAAAAAAEAAACgMgAAVgcAAKr4//8BAAAAf39/AAEAAABkAAAAAAAAABQAAABAHwAAAAAAACYAAAAAAAAAwOD//wAAAAAmAAAAZAAAABYAAABMAAAAAAAAAAAAAAAEAAAAAAAAAAEAAACAgIAKAAAAACgAAAAoAAAAZAAAAGQAAAAAAAAAzMzMAAAAAABQAAAAUAAAAGQAAABkAAAAAAAAABcAAAAUAAAAAAAAAAAAAAD/fwAA/38AAAAAAAAJAAAABAAAAAAAAAAeAAAAaAAAAAAAAAAAAAAAAAAAAAAAAAAAAAAAECcAABAnAAAAAAAAAAAAAAAAAAAAAAAAAAAAAAAAAAAAAAAAAAAAABQAAAAAAAAAwMD/AAAAAABkAAAAMgAAAAAAAABkAAAAAAAAAH9/fwAKAAAAIgAAABgAAAAAAAAAAAAAAAAAAAAAAAAAAAAAAAAAAAAkAAAAJAAAAAAAAAAHAAAAAAAAAAAAAAAAAAAAAAAAAAAAAAAAAAAAf39/ACUAAABYAAAAAAAAAAAAAAAAAAAAAAAAAAAAAAAAAAAAAAAAAAAAAAAAAAAAAAAAAAAAAAA/AAAAAAAAAKCGAQAAAAAAAAAAAAAAAAAMAAAAAQAAAAAAAAAAAAAAAAAAAB8AAABUAAAAu+DjBf///wEAAAAAAAAAAAAAAAAAAAAAAAAAAAAAAAAAAAAAAAAAAAAAAAJ/f38AgICAA8zMzADAwP8Af39/AAAAAAAAAAAAAAAAAAAAAAAAAAAAIQAAABgAAAAUAAAAvgUAAHwaAAC/FAAAzxsAAAAAAAAmAAAACAAAAP//////////"/>
               </a:ext>
             </a:extLst>
           </p:cNvSpPr>
@@ -5089,7 +5122,7 @@
           <p:cNvSpPr>
             <a:extLst>
               <a:ext uri="smNativeData">
-                <pr:smNativeData xmlns:pr="smNativeData" xmlns="smNativeData" val="SMDATA_15_ucsbZBMAAAAlAAAAZAAAAA8BAAAAkAAAAEgAAACQAAAASAAAAAAAAAABAAAAAAAAAAEAAABQAAAAAAAAAAAA4D8AAAAAAADgPwAAAAAAAOA/AAAAAAAA4D8AAAAAAADgPwAAAAAAAOA/AAAAAAAA4D8AAAAAAADgPwAAAAAAAOA/AAAAAAAA4D8CAAAAjAAAAAEAAAAAAAAAu+DjDP///wgAAAAAAAAAAAAAAAAAAAAAAAAAAAAAAAAAAAAAZAAAAAEAAABAAAAAAAAAAAAAAAAAAAAAAAAAAAAAAAAAAAAAAAAAAAAAAAAAAAAAAAAAAAAAAAAAAAAAAAAAAAAAAAAAAAAAAAAAAAAAAAAAAAAAAAAAAAAAAAAAAAAAFAAAADwAAAABAAAAAAAAAAAAAAkUAAAAAQAAABQAAAAUAAAAFAAAAAEAAAAAAAAAZAAAAGQAAAAAAAAAZAAAAGQAAAAVAAAAYAAAAAAAAAAAAAAADwAAACADAAAAAAAAAAAAAAEAAACgMgAAVgcAAKr4//8BAAAAf39/AAEAAABkAAAAAAAAABQAAABAHwAAAAAAACYAAAAAAAAAwOD//wAAAAAmAAAAZAAAABYAAABMAAAAAAAAAAAAAAAEAAAAAAAAAAEAAACAgIAKAAAAACgAAAAoAAAAZAAAAGQAAAAAAAAAzMzMAAAAAABQAAAAUAAAAGQAAABkAAAAAAAAABcAAAAUAAAAAAAAAAAAAAD/fwAA/38AAAAAAAAJAAAABAAAAAAAAAAeAAAAaAAAAAAAAAAAAAAAAAAAAAAAAAAAAAAAECcAABAnAAAAAAAAAAAAAAAAAAAAAAAAAAAAAAAAAAAAAAAAAAAAABQAAAAAAAAAwMD/AAAAAABkAAAAMgAAAAAAAABkAAAAAAAAAH9/fwAKAAAAIgAAABgAAAAAAAAAAAAAAAAAAAAAAAAAAAAAAAAAAAAkAAAAJAAAAAAAAAAHAAAAAAAAAAAAAAAAAAAAAAAAAAAAAAAAAAAAf39/ACUAAABYAAAAAAAAAAAAAAAAAAAAAAAAAAAAAAAAAAAAAAAAAAAAAAAAAAAAAAAAAAAAAAA/AAAAAAAAAKCGAQAAAAAAAAAAAAAAAAAMAAAAAQAAAAAAAAAAAAAAAAAAAB8AAABUAAAAu+DjBf///wEAAAAAAAAAAAAAAAAAAAAAAAAAAAAAAAAAAAAAAAAAAAAAAAJ/f38AgICAA8zMzADAwP8Af39/AAAAAAAAAAAAAAAAAAAAAAAAAAAAIQAAABgAAAAUAAAAvgUAAM8bAAC/FAAAIh0AAAAAAAAmAAAACAAAAP//////////"/>
+                <pr:smNativeData xmlns:pr="smNativeData" xmlns="smNativeData" val="SMDATA_15_NygcZBMAAAAlAAAAZAAAAA8BAAAAkAAAAEgAAACQAAAASAAAAAAAAAABAAAAAAAAAAEAAABQAAAAAAAAAAAA4D8AAAAAAADgPwAAAAAAAOA/AAAAAAAA4D8AAAAAAADgPwAAAAAAAOA/AAAAAAAA4D8AAAAAAADgPwAAAAAAAOA/AAAAAAAA4D8CAAAAjAAAAAEAAAAAAAAAu+DjDP///wgAAAAAAAAAAAAAAAAAAAAAAAAAAAAAAAAAAAAAZAAAAAEAAABAAAAAAAAAAAAAAAAAAAAAAAAAAAAAAAAAAAAAAAAAAAAAAAAAAAAAAAAAAAAAAAAAAAAAAAAAAAAAAAAAAAAAAAAAAAAAAAAAAAAAAAAAAAAAAAAAAAAAFAAAADwAAAABAAAAAAAAAAAAAAkUAAAAAQAAABQAAAAUAAAAFAAAAAEAAAAAAAAAZAAAAGQAAAAAAAAAZAAAAGQAAAAVAAAAYAAAAAAAAAAAAAAADwAAACADAAAAAAAAAAAAAAEAAACgMgAAVgcAAKr4//8BAAAAf39/AAEAAABkAAAAAAAAABQAAABAHwAAAAAAACYAAAAAAAAAwOD//wAAAAAmAAAAZAAAABYAAABMAAAAAAAAAAAAAAAEAAAAAAAAAAEAAACAgIAKAAAAACgAAAAoAAAAZAAAAGQAAAAAAAAAzMzMAAAAAABQAAAAUAAAAGQAAABkAAAAAAAAABcAAAAUAAAAAAAAAAAAAAD/fwAA/38AAAAAAAAJAAAABAAAAAAAAAAeAAAAaAAAAAAAAAAAAAAAAAAAAAAAAAAAAAAAECcAABAnAAAAAAAAAAAAAAAAAAAAAAAAAAAAAAAAAAAAAAAAAAAAABQAAAAAAAAAwMD/AAAAAABkAAAAMgAAAAAAAABkAAAAAAAAAH9/fwAKAAAAIgAAABgAAAAAAAAAAAAAAAAAAAAAAAAAAAAAAAAAAAAkAAAAJAAAAAAAAAAHAAAAAAAAAAAAAAAAAAAAAAAAAAAAAAAAAAAAf39/ACUAAABYAAAAAAAAAAAAAAAAAAAAAAAAAAAAAAAAAAAAAAAAAAAAAAAAAAAAAAAAAAAAAAA/AAAAAAAAAKCGAQAAAAAAAAAAAAAAAAAMAAAAAQAAAAAAAAAAAAAAAAAAAB8AAABUAAAAu+DjBf///wEAAAAAAAAAAAAAAAAAAAAAAAAAAAAAAAAAAAAAAAAAAAAAAAJ/f38AgICAA8zMzADAwP8Af39/AAAAAAAAAAAAAAAAAAAAAAAAAAAAIQAAABgAAAAUAAAAvgUAAM8bAAC/FAAAIh0AAAAAAAAmAAAACAAAAP//////////"/>
               </a:ext>
             </a:extLst>
           </p:cNvSpPr>
@@ -5135,7 +5168,7 @@
           <p:cNvSpPr txBox="1">
             <a:extLst>
               <a:ext uri="smNativeData">
-                <pr:smNativeData xmlns:pr="smNativeData" xmlns="smNativeData" val="SMDATA_15_ucsbZBMAAAAlAAAAEgAAAA8BAAAAkAAAAEgAAACQAAAASAAAAAAAAAAAAAAAAAAAAAEAAABQAAAAAAAAAAAA4D8AAAAAAADgPwAAAAAAAOA/AAAAAAAA4D8AAAAAAADgPwAAAAAAAOA/AAAAAAAA4D8AAAAAAADgPwAAAAAAAOA/AAAAAAAA4D8CAAAAjAAAAAAAAAAAAAAAu+DjDP///wgAAAAAAAAAAAAAAAAAAAAAAAAAAAAAAAAAAAAAZAAAAAEAAABAAAAAAAAAAAAAAAAAAAAAAAAAAAAAAAAAAAAAAAAAAAAAAAAAAAAAAAAAAAAAAAAAAAAAAAAAAAAAAAAAAAAAAAAAAAAAAAAAAAAAAAAAAAAAAAAAAAAAFAAAADwAAAAAAAAAAAAAAAAAAAkUAAAAAQAAABQAAAAUAAAAFAAAAAEAAAAAAAAAZAAAAGQAAAAAAAAAZAAAAGQAAAAVAAAAYAAAAAAAAAAAAAAADwAAACADAAAAAAAAAAAAAAEAAACgMgAAVgcAAKr4//8BAAAAf39/AAEAAABkAAAAAAAAABQAAABAHwAAAAAAACYAAAAAAAAAwOD//wAAAAAmAAAAZAAAABYAAABMAAAAAAAAAAAAAAAEAAAAAAAAAAEAAACAgIAKAAAAACgAAAAoAAAAZAAAAGQAAAAAAAAAzMzMAAAAAABQAAAAUAAAAGQAAABkAAAAAAAAABcAAAAUAAAAAAAAANwIAAD/fwAA/38AAAAAAAAJAAAABAAAAAAAAAAeAAAAaAAAAAAAAAAAAAAAAAAAAAAAAAAAAAAAECcAABAnAAAAAAAAAAAAAAAAAAAAAAAAAAAAAAAAAAAAAAAAAAAAABQAAAAAAAAAwMD/AAAAAABkAAAAMgAAAAAAAABkAAAAAAAAAH9/fwAKAAAAIgAAABgAAAAAAAAAAAAAAAAAAAAAAAAAAAAAAAAAAAAkAAAAJAAAAAAAAAAHAAAAAAAAAAAAAAAAAAAAAAAAAAAAAAAAAAAAf39/ACUAAABYAAAAAAAAAAAAAAAAAAAAAAAAAAAAAAAAAAAAAAAAAAAAAAAAAAAAAAAAAAAAAAA/AAAAAAAAAKCGAQAAAAAAAAAAAAAAAAAMAAAAAQAAAAAAAAAAAAAAAAAAAB8AAABUAAAAu+DjBf///wEAAAAAAAAAAAAAAAAAAAAAAAAAAAAAAAAAAAAAAAAAAAAAAAJ/f38AgICAA8zMzADAwP8Af39/AAAAAAAAAAAAAAAAAAAAAAAAAAAAIQAAABgAAAAUAAAAMBUAAHwaAADXGwAAzxsAAAAAAAAmAAAACAAAAP//////////"/>
+                <pr:smNativeData xmlns:pr="smNativeData" xmlns="smNativeData" val="SMDATA_15_NygcZBMAAAAlAAAAEgAAAA8BAAAAkAAAAEgAAACQAAAASAAAAAAAAAAAAAAAAAAAAAEAAABQAAAAAAAAAAAA4D8AAAAAAADgPwAAAAAAAOA/AAAAAAAA4D8AAAAAAADgPwAAAAAAAOA/AAAAAAAA4D8AAAAAAADgPwAAAAAAAOA/AAAAAAAA4D8CAAAAjAAAAAAAAAAAAAAAu+DjDP///wgAAAAAAAAAAAAAAAAAAAAAAAAAAAAAAAAAAAAAZAAAAAEAAABAAAAAAAAAAAAAAAAAAAAAAAAAAAAAAAAAAAAAAAAAAAAAAAAAAAAAAAAAAAAAAAAAAAAAAAAAAAAAAAAAAAAAAAAAAAAAAAAAAAAAAAAAAAAAAAAAAAAAFAAAADwAAAAAAAAAAAAAAAAAAAkUAAAAAQAAABQAAAAUAAAAFAAAAAEAAAAAAAAAZAAAAGQAAAAAAAAAZAAAAGQAAAAVAAAAYAAAAAAAAAAAAAAADwAAACADAAAAAAAAAAAAAAEAAACgMgAAVgcAAKr4//8BAAAAf39/AAEAAABkAAAAAAAAABQAAABAHwAAAAAAACYAAAAAAAAAwOD//wAAAAAmAAAAZAAAABYAAABMAAAAAAAAAAAAAAAEAAAAAAAAAAEAAACAgIAKAAAAACgAAAAoAAAAZAAAAGQAAAAAAAAAzMzMAAAAAABQAAAAUAAAAGQAAABkAAAAAAAAABcAAAAUAAAAAAAAANwIAAD/fwAA/38AAAAAAAAJAAAABAAAAAAAAAAeAAAAaAAAAAAAAAAAAAAAAAAAAAAAAAAAAAAAECcAABAnAAAAAAAAAAAAAAAAAAAAAAAAAAAAAAAAAAAAAAAAAAAAABQAAAAAAAAAwMD/AAAAAABkAAAAMgAAAAAAAABkAAAAAAAAAH9/fwAKAAAAIgAAABgAAAAAAAAAAAAAAAAAAAAAAAAAAAAAAAAAAAAkAAAAJAAAAAAAAAAHAAAAAAAAAAAAAAAAAAAAAAAAAAAAAAAAAAAAf39/ACUAAABYAAAAAAAAAAAAAAAAAAAAAAAAAAAAAAAAAAAAAAAAAAAAAAAAAAAAAAAAAAAAAAA/AAAAAAAAAKCGAQAAAAAAAAAAAAAAAAAMAAAAAQAAAAAAAAAAAAAAAAAAAB8AAABUAAAAu+DjBf///wEAAAAAAAAAAAAAAAAAAAAAAAAAAAAAAAAAAAAAAAAAAAAAAAJ/f38AgICAA8zMzADAwP8Af39/AAAAAAAAAAAAAAAAAAAAAAAAAAAAIQAAABgAAAAUAAAAMBUAAHwaAADXGwAAzxsAAAAAAAAmAAAACAAAAP//////////"/>
               </a:ext>
             </a:extLst>
           </p:cNvSpPr>
@@ -5174,7 +5207,7 @@
           <p:cNvSpPr txBox="1">
             <a:extLst>
               <a:ext uri="smNativeData">
-                <pr:smNativeData xmlns:pr="smNativeData" xmlns="smNativeData" val="SMDATA_15_ucsbZBMAAAAlAAAAEgAAAA8BAAAAkAAAAEgAAACQAAAASAAAAAAAAAAAAAAAAAAAAAEAAABQAAAAAAAAAAAA4D8AAAAAAADgPwAAAAAAAOA/AAAAAAAA4D8AAAAAAADgPwAAAAAAAOA/AAAAAAAA4D8AAAAAAADgPwAAAAAAAOA/AAAAAAAA4D8CAAAAjAAAAAAAAAAAAAAAu+DjDP///wgAAAAAAAAAAAAAAAAAAAAAAAAAAAAAAAAAAAAAZAAAAAEAAABAAAAAAAAAAAAAAAAAAAAAAAAAAAAAAAAAAAAAAAAAAAAAAAAAAAAAAAAAAAAAAAAAAAAAAAAAAAAAAAAAAAAAAAAAAAAAAAAAAAAAAAAAAAAAAAAAAAAAFAAAADwAAAAAAAAAAAAAAAAAAAkUAAAAAQAAABQAAAAUAAAAFAAAAAEAAAAAAAAAZAAAAGQAAAAAAAAAZAAAAGQAAAAVAAAAYAAAAAAAAAAAAAAADwAAACADAAAAAAAAAAAAAAEAAACgMgAAVgcAAKr4//8BAAAAf39/AAEAAABkAAAAAAAAABQAAABAHwAAAAAAACYAAAAAAAAAwOD//wAAAAAmAAAAZAAAABYAAABMAAAAAAAAAAAAAAAEAAAAAAAAAAEAAACAgIAKAAAAACgAAAAoAAAAZAAAAGQAAAAAAAAAzMzMAAAAAABQAAAAUAAAAGQAAABkAAAAAAAAABcAAAAUAAAAAAAAANwIAAD/fwAA/38AAAAAAAAJAAAABAAAAAAAAAAeAAAAaAAAAAAAAAAAAAAAAAAAAAAAAAAAAAAAECcAABAnAAAAAAAAAAAAAAAAAAAAAAAAAAAAAAAAAAAAAAAAAAAAABQAAAAAAAAAwMD/AAAAAABkAAAAMgAAAAAAAABkAAAAAAAAAH9/fwAKAAAAIgAAABgAAAAAAAAAAAAAAAAAAAAAAAAAAAAAAAAAAAAkAAAAJAAAAAAAAAAHAAAAAAAAAAAAAAAAAAAAAAAAAAAAAAAAAAAAf39/ACUAAABYAAAAAAAAAAAAAAAAAAAAAAAAAAAAAAAAAAAAAAAAAAAAAAAAAAAAAAAAAAAAAAA/AAAAAAAAAKCGAQAAAAAAAAAAAAAAAAAMAAAAAQAAAAAAAAAAAAAAAAAAAB8AAABUAAAAu+DjBf///wEAAAAAAAAAAAAAAAAAAAAAAAAAAAAAAAAAAAAAAAAAAAAAAAJ/f38AgICAA8zMzADAwP8Af39/AAAAAAAAAAAAAAAAAAAAAAAAAAAAIQAAABgAAAAUAAAAMBUAAM8bAADXGwAAIh0AAAAAAAAmAAAACAAAAP//////////"/>
+                <pr:smNativeData xmlns:pr="smNativeData" xmlns="smNativeData" val="SMDATA_15_NygcZBMAAAAlAAAAEgAAAA8BAAAAkAAAAEgAAACQAAAASAAAAAAAAAAAAAAAAAAAAAEAAABQAAAAAAAAAAAA4D8AAAAAAADgPwAAAAAAAOA/AAAAAAAA4D8AAAAAAADgPwAAAAAAAOA/AAAAAAAA4D8AAAAAAADgPwAAAAAAAOA/AAAAAAAA4D8CAAAAjAAAAAAAAAAAAAAAu+DjDP///wgAAAAAAAAAAAAAAAAAAAAAAAAAAAAAAAAAAAAAZAAAAAEAAABAAAAAAAAAAAAAAAAAAAAAAAAAAAAAAAAAAAAAAAAAAAAAAAAAAAAAAAAAAAAAAAAAAAAAAAAAAAAAAAAAAAAAAAAAAAAAAAAAAAAAAAAAAAAAAAAAAAAAFAAAADwAAAAAAAAAAAAAAAAAAAkUAAAAAQAAABQAAAAUAAAAFAAAAAEAAAAAAAAAZAAAAGQAAAAAAAAAZAAAAGQAAAAVAAAAYAAAAAAAAAAAAAAADwAAACADAAAAAAAAAAAAAAEAAACgMgAAVgcAAKr4//8BAAAAf39/AAEAAABkAAAAAAAAABQAAABAHwAAAAAAACYAAAAAAAAAwOD//wAAAAAmAAAAZAAAABYAAABMAAAAAAAAAAAAAAAEAAAAAAAAAAEAAACAgIAKAAAAACgAAAAoAAAAZAAAAGQAAAAAAAAAzMzMAAAAAABQAAAAUAAAAGQAAABkAAAAAAAAABcAAAAUAAAAAAAAANwIAAD/fwAA/38AAAAAAAAJAAAABAAAAAAAAAAeAAAAaAAAAAAAAAAAAAAAAAAAAAAAAAAAAAAAECcAABAnAAAAAAAAAAAAAAAAAAAAAAAAAAAAAAAAAAAAAAAAAAAAABQAAAAAAAAAwMD/AAAAAABkAAAAMgAAAAAAAABkAAAAAAAAAH9/fwAKAAAAIgAAABgAAAAAAAAAAAAAAAAAAAAAAAAAAAAAAAAAAAAkAAAAJAAAAAAAAAAHAAAAAAAAAAAAAAAAAAAAAAAAAAAAAAAAAAAAf39/ACUAAABYAAAAAAAAAAAAAAAAAAAAAAAAAAAAAAAAAAAAAAAAAAAAAAAAAAAAAAAAAAAAAAA/AAAAAAAAAKCGAQAAAAAAAAAAAAAAAAAMAAAAAQAAAAAAAAAAAAAAAAAAAB8AAABUAAAAu+DjBf///wEAAAAAAAAAAAAAAAAAAAAAAAAAAAAAAAAAAAAAAAAAAAAAAAJ/f38AgICAA8zMzADAwP8Af39/AAAAAAAAAAAAAAAAAAAAAAAAAAAAIQAAABgAAAAUAAAAMBUAAM8bAADXGwAAIh0AAAAAAAAmAAAACAAAAP//////////"/>
               </a:ext>
             </a:extLst>
           </p:cNvSpPr>
@@ -5213,7 +5246,7 @@
           <p:cNvSpPr>
             <a:extLst>
               <a:ext uri="smNativeData">
-                <pr:smNativeData xmlns:pr="smNativeData" xmlns="smNativeData" val="SMDATA_15_ucsbZBMAAAAlAAAAZAAAAA8BAAAAkAAAAEgAAACQAAAASAAAAAAAAAABAAAAAAAAAAEAAABQAAAAAAAAAAAA4D8AAAAAAADgPwAAAAAAAOA/AAAAAAAA4D8AAAAAAADgPwAAAAAAAOA/AAAAAAAA4D8AAAAAAADgPwAAAAAAAOA/AAAAAAAA4D8CAAAAjAAAAAEAAAAAAAAAf38AAP///wgAAAAAAAAAAAAAAAAAAAAAAAAAAAAAAAAAAAAAZAAAAAEAAABAAAAAAAAAAAAAAAAAAAAAAAAAAAAAAAAAAAAAAAAAAAAAAAAAAAAAAAAAAAAAAAAAAAAAAAAAAAAAAAAAAAAAAAAAAAAAAAAAAAAAAAAAAAAAAAAAAAAAFAAAADwAAAABAAAAAAAAAAAAAAkUAAAAAQAAABQAAAAUAAAAFAAAAAEAAAAAAAAAZAAAAGQAAAAAAAAAZAAAAGQAAAAVAAAAYAAAAAAAAAAAAAAADwAAACADAAAAAAAAAAAAAAEAAACgMgAAVgcAAKr4//8BAAAAf39/AAEAAABkAAAAAAAAABQAAABAHwAAAAAAACYAAAAAAAAAwOD//wAAAAAmAAAAZAAAABYAAABMAAAAAAAAAAAAAAAEAAAAAAAAAAEAAACAgIAKAAAAACgAAAAoAAAAZAAAAGQAAAAAAAAAzMzMAAAAAABQAAAAUAAAAGQAAABkAAAAAAAAABcAAAAUAAAAAAAAAAAAAAD/fwAA/38AAAAAAAAJAAAABAAAAAAAAAAeAAAAaAAAAAAAAAAAAAAAAAAAAAAAAAAAAAAAECcAABAnAAAAAAAAAAAAAAAAAAAAAAAAAAAAAAAAAAAAAAAAAAAAABQAAAAAAAAAwMD/AAAAAABkAAAAMgAAAAAAAABkAAAAAAAAAH9/fwAKAAAAIgAAABgAAAAAAAAAAAAAAAAAAAAAAAAAAAAAAAAAAAAkAAAAJAAAAAAAAAAHAAAAAAAAAAAAAAAAAAAAAAAAAAAAAAAAAAAAf39/ACUAAABYAAAAAAAAAAAAAAAAAAAAAAAAAAAAAAAAAAAAAAAAAAAAAAAAAAAAAAAAAAAAAAA/AAAAAAAAAKCGAQAAAAAAAAAAAAAAAAAMAAAAAQAAAAAAAAAAAAAAAAAAAB8AAABUAAAAf38AAP///wEAAAAAAAAAAAAAAAAAAAAAAAAAAAAAAAAAAAAAAAAAAAAAAAJ/f38AgICAA8zMzADAwP8Af39/AAAAAAAAAAAAAAAAAAAAAAAAAAAAIQAAABgAAAAUAAAAnR0AAEwFAACeLAAAnwYAAAAAAAAmAAAACAAAAP//////////"/>
+                <pr:smNativeData xmlns:pr="smNativeData" xmlns="smNativeData" val="SMDATA_15_NygcZBMAAAAlAAAAZAAAAA8BAAAAkAAAAEgAAACQAAAASAAAAAAAAAABAAAAAAAAAAEAAABQAAAAAAAAAAAA4D8AAAAAAADgPwAAAAAAAOA/AAAAAAAA4D8AAAAAAADgPwAAAAAAAOA/AAAAAAAA4D8AAAAAAADgPwAAAAAAAOA/AAAAAAAA4D8CAAAAjAAAAAEAAAAAAAAAf38AAP///wgAAAAAAAAAAAAAAAAAAAAAAAAAAAAAAAAAAAAAZAAAAAEAAABAAAAAAAAAAAAAAAAAAAAAAAAAAAAAAAAAAAAAAAAAAAAAAAAAAAAAAAAAAAAAAAAAAAAAAAAAAAAAAAAAAAAAAAAAAAAAAAAAAAAAAAAAAAAAAAAAAAAAFAAAADwAAAABAAAAAAAAAAAAAAkUAAAAAQAAABQAAAAUAAAAFAAAAAEAAAAAAAAAZAAAAGQAAAAAAAAAZAAAAGQAAAAVAAAAYAAAAAAAAAAAAAAADwAAACADAAAAAAAAAAAAAAEAAACgMgAAVgcAAKr4//8BAAAAf39/AAEAAABkAAAAAAAAABQAAABAHwAAAAAAACYAAAAAAAAAwOD//wAAAAAmAAAAZAAAABYAAABMAAAAAAAAAAAAAAAEAAAAAAAAAAEAAACAgIAKAAAAACgAAAAoAAAAZAAAAGQAAAAAAAAAzMzMAAAAAABQAAAAUAAAAGQAAABkAAAAAAAAABcAAAAUAAAAAAAAAAAAAAD/fwAA/38AAAAAAAAJAAAABAAAAAAAAAAeAAAAaAAAAAAAAAAAAAAAAAAAAAAAAAAAAAAAECcAABAnAAAAAAAAAAAAAAAAAAAAAAAAAAAAAAAAAAAAAAAAAAAAABQAAAAAAAAAwMD/AAAAAABkAAAAMgAAAAAAAABkAAAAAAAAAH9/fwAKAAAAIgAAABgAAAAAAAAAAAAAAAAAAAAAAAAAAAAAAAAAAAAkAAAAJAAAAAAAAAAHAAAAAAAAAAAAAAAAAAAAAAAAAAAAAAAAAAAAf39/ACUAAABYAAAAAAAAAAAAAAAAAAAAAAAAAAAAAAAAAAAAAAAAAAAAAAAAAAAAAAAAAAAAAAA/AAAAAAAAAKCGAQAAAAAAAAAAAAAAAAAMAAAAAQAAAAAAAAAAAAAAAAAAAB8AAABUAAAAf38AAP///wEAAAAAAAAAAAAAAAAAAAAAAAAAAAAAAAAAAAAAAAAAAAAAAAJ/f38AgICAA8zMzADAwP8Af39/AAAAAAAAAAAAAAAAAAAAAAAAAAAAIQAAABgAAAAUAAAAnR0AAEwFAACeLAAAnwYAAAAAAAAmAAAACAAAAP//////////"/>
               </a:ext>
             </a:extLst>
           </p:cNvSpPr>
@@ -5259,7 +5292,7 @@
           <p:cNvSpPr txBox="1">
             <a:extLst>
               <a:ext uri="smNativeData">
-                <pr:smNativeData xmlns:pr="smNativeData" xmlns="smNativeData" val="SMDATA_15_ucsbZBMAAAAlAAAAEgAAAA8BAAAAkAAAAEgAAACQAAAASAAAAAAAAAAAAAAAAAAAAAEAAABQAAAAAAAAAAAA4D8AAAAAAADgPwAAAAAAAOA/AAAAAAAA4D8AAAAAAADgPwAAAAAAAOA/AAAAAAAA4D8AAAAAAADgPwAAAAAAAOA/AAAAAAAA4D8CAAAAjAAAAAAAAAAAAAAAu+DjDP///wgAAAAAAAAAAAAAAAAAAAAAAAAAAAAAAAAAAAAAZAAAAAEAAABAAAAAAAAAAAAAAAAAAAAAAAAAAAAAAAAAAAAAAAAAAAAAAAAAAAAAAAAAAAAAAAAAAAAAAAAAAAAAAAAAAAAAAAAAAAAAAAAAAAAAAAAAAAAAAAAAAAAAFAAAADwAAAAAAAAAAAAAAAAAAAkUAAAAAQAAABQAAAAUAAAAFAAAAAEAAAAAAAAAZAAAAGQAAAAAAAAAZAAAAGQAAAAVAAAAYAAAAAAAAAAAAAAADwAAACADAAAAAAAAAAAAAAEAAACgMgAAVgcAAKr4//8BAAAAf39/AAEAAABkAAAAAAAAABQAAABAHwAAAAAAACYAAAAAAAAAwOD//wAAAAAmAAAAZAAAABYAAABMAAAAAAAAAAAAAAAEAAAAAAAAAAEAAACAgIAKAAAAACgAAAAoAAAAZAAAAGQAAAAAAAAAzMzMAAAAAABQAAAAUAAAAGQAAABkAAAAAAAAABcAAAAUAAAAAAAAANwIAAD/fwAA/38AAAAAAAAJAAAABAAAAAAAAAAeAAAAaAAAAAAAAAAAAAAAAAAAAAAAAAAAAAAAECcAABAnAAAAAAAAAAAAAAAAAAAAAAAAAAAAAAAAAAAAAAAAAAAAABQAAAAAAAAAwMD/AAAAAABkAAAAMgAAAAAAAABkAAAAAAAAAH9/fwAKAAAAIgAAABgAAAAAAAAAAAAAAAAAAAAAAAAAAAAAAAAAAAAkAAAAJAAAAAAAAAAHAAAAAAAAAAAAAAAAAAAAAAAAAAAAAAAAAAAAf39/ACUAAABYAAAAAAAAAAAAAAAAAAAAAAAAAAAAAAAAAAAAAAAAAAAAAAAAAAAAAAAAAAAAAAA/AAAAAAAAAKCGAQAAAAAAAAAAAAAAAAAMAAAAAQAAAAAAAAAAAAAAAAAAAB8AAABUAAAAu+DjBf///wEAAAAAAAAAAAAAAAAAAAAAAAAAAAAAAAAAAAAAAAAAAAAAAAJ/f38AgICAA8zMzADAwP8Af39/AAAAAAAAAAAAAAAAAAAAAAAAAAAAIQAAABgAAAAUAAAABy0AAEwFAACuMwAAnwYAAAAAAAAmAAAACAAAAP//////////"/>
+                <pr:smNativeData xmlns:pr="smNativeData" xmlns="smNativeData" val="SMDATA_15_NygcZBMAAAAlAAAAEgAAAA8BAAAAkAAAAEgAAACQAAAASAAAAAAAAAAAAAAAAAAAAAEAAABQAAAAAAAAAAAA4D8AAAAAAADgPwAAAAAAAOA/AAAAAAAA4D8AAAAAAADgPwAAAAAAAOA/AAAAAAAA4D8AAAAAAADgPwAAAAAAAOA/AAAAAAAA4D8CAAAAjAAAAAAAAAAAAAAAu+DjDP///wgAAAAAAAAAAAAAAAAAAAAAAAAAAAAAAAAAAAAAZAAAAAEAAABAAAAAAAAAAAAAAAAAAAAAAAAAAAAAAAAAAAAAAAAAAAAAAAAAAAAAAAAAAAAAAAAAAAAAAAAAAAAAAAAAAAAAAAAAAAAAAAAAAAAAAAAAAAAAAAAAAAAAFAAAADwAAAAAAAAAAAAAAAAAAAkUAAAAAQAAABQAAAAUAAAAFAAAAAEAAAAAAAAAZAAAAGQAAAAAAAAAZAAAAGQAAAAVAAAAYAAAAAAAAAAAAAAADwAAACADAAAAAAAAAAAAAAEAAACgMgAAVgcAAKr4//8BAAAAf39/AAEAAABkAAAAAAAAABQAAABAHwAAAAAAACYAAAAAAAAAwOD//wAAAAAmAAAAZAAAABYAAABMAAAAAAAAAAAAAAAEAAAAAAAAAAEAAACAgIAKAAAAACgAAAAoAAAAZAAAAGQAAAAAAAAAzMzMAAAAAABQAAAAUAAAAGQAAABkAAAAAAAAABcAAAAUAAAAAAAAANwIAAD/fwAA/38AAAAAAAAJAAAABAAAAAAAAAAeAAAAaAAAAAAAAAAAAAAAAAAAAAAAAAAAAAAAECcAABAnAAAAAAAAAAAAAAAAAAAAAAAAAAAAAAAAAAAAAAAAAAAAABQAAAAAAAAAwMD/AAAAAABkAAAAMgAAAAAAAABkAAAAAAAAAH9/fwAKAAAAIgAAABgAAAAAAAAAAAAAAAAAAAAAAAAAAAAAAAAAAAAkAAAAJAAAAAAAAAAHAAAAAAAAAAAAAAAAAAAAAAAAAAAAAAAAAAAAf39/ACUAAABYAAAAAAAAAAAAAAAAAAAAAAAAAAAAAAAAAAAAAAAAAAAAAAAAAAAAAAAAAAAAAAA/AAAAAAAAAKCGAQAAAAAAAAAAAAAAAAAMAAAAAQAAAAAAAAAAAAAAAAAAAB8AAABUAAAAu+DjBf///wEAAAAAAAAAAAAAAAAAAAAAAAAAAAAAAAAAAAAAAAAAAAAAAAJ/f38AgICAA8zMzADAwP8Af39/AAAAAAAAAAAAAAAAAAAAAAAAAAAAIQAAABgAAAAUAAAABy0AAEwFAACuMwAAnwYAAAAAAAAmAAAACAAAAP//////////"/>
               </a:ext>
             </a:extLst>
           </p:cNvSpPr>
@@ -5298,7 +5331,7 @@
           <p:cNvSpPr>
             <a:extLst>
               <a:ext uri="smNativeData">
-                <pr:smNativeData xmlns:pr="smNativeData" xmlns="smNativeData" val="SMDATA_15_ucsbZBMAAAAlAAAAZAAAAA8BAAAAkAAAAEgAAACQAAAASAAAAAAAAAABAAAAAAAAAAEAAABQAAAAAAAAAAAA4D8AAAAAAADgPwAAAAAAAOA/AAAAAAAA4D8AAAAAAADgPwAAAAAAAOA/AAAAAAAA4D8AAAAAAADgPwAAAAAAAOA/AAAAAAAA4D8CAAAAjAAAAAEAAAAAAAAAAJmZDv///wgAAAAAAAAAAAAAAAAAAAAAAAAAAAAAAAAAAAAAZAAAAAEAAABAAAAAAAAAAAAAAAAAAAAAAAAAAAAAAAAAAAAAAAAAAAAAAAAAAAAAAAAAAAAAAAAAAAAAAAAAAAAAAAAAAAAAAAAAAAAAAAAAAAAAAAAAAAAAAAAAAAAAFAAAADwAAAABAAAAAAAAAAAAAAkUAAAAAQAAABQAAAAUAAAAFAAAAAEAAAAAAAAAZAAAAGQAAAAAAAAAZAAAAGQAAAAVAAAAYAAAAAAAAAAAAAAADwAAACADAAAAAAAAAAAAAAEAAACgMgAAVgcAAKr4//8BAAAAf39/AAEAAABkAAAAAAAAABQAAABAHwAAAAAAACYAAAAAAAAAwOD//wAAAAAmAAAAZAAAABYAAABMAAAAAAAAAAAAAAAEAAAAAAAAAAEAAACAgIAKAAAAACgAAAAoAAAAZAAAAGQAAAAAAAAAzMzMAAAAAABQAAAAUAAAAGQAAABkAAAAAAAAABcAAAAUAAAAAAAAAAAAAAD/fwAA/38AAAAAAAAJAAAABAAAAAAAAAAeAAAAaAAAAAAAAAAAAAAAAAAAAAAAAAAAAAAAECcAABAnAAAAAAAAAAAAAAAAAAAAAAAAAAAAAAAAAAAAAAAAAAAAABQAAAAAAAAAwMD/AAAAAABkAAAAMgAAAAAAAABkAAAAAAAAAH9/fwAKAAAAIgAAABgAAAAAAAAAAAAAAAAAAAAAAAAAAAAAAAAAAAAkAAAAJAAAAAAAAAAHAAAAAAAAAAAAAAAAAAAAAAAAAAAAAAAAAAAAf39/ACUAAABYAAAAAAAAAAAAAAAAAAAAAAAAAAAAAAAAAAAAAAAAAAAAAAAAAAAAAAAAAAAAAAA/AAAAAAAAAKCGAQAAAAAAAAAAAAAAAAAMAAAAAQAAAAAAAAAAAAAAAAAAAB8AAABUAAAAAJmZB////wEAAAAAAAAAAAAAAAAAAAAAAAAAAAAAAAAAAAAAAAAAAAAAAAJ/f38AgICAA8zMzADAwP8Af39/AAAAAAAAAAAAAAAAAAAAAAAAAAAAIQAAABgAAAAUAAAAcjUAAEwFAABzRAAAnwYAAAAAAAAmAAAACAAAAP//////////"/>
+                <pr:smNativeData xmlns:pr="smNativeData" xmlns="smNativeData" val="SMDATA_15_NygcZBMAAAAlAAAAZAAAAA8BAAAAkAAAAEgAAACQAAAASAAAAAAAAAABAAAAAAAAAAEAAABQAAAAAAAAAAAA4D8AAAAAAADgPwAAAAAAAOA/AAAAAAAA4D8AAAAAAADgPwAAAAAAAOA/AAAAAAAA4D8AAAAAAADgPwAAAAAAAOA/AAAAAAAA4D8CAAAAjAAAAAEAAAAAAAAAAJmZDv///wgAAAAAAAAAAAAAAAAAAAAAAAAAAAAAAAAAAAAAZAAAAAEAAABAAAAAAAAAAAAAAAAAAAAAAAAAAAAAAAAAAAAAAAAAAAAAAAAAAAAAAAAAAAAAAAAAAAAAAAAAAAAAAAAAAAAAAAAAAAAAAAAAAAAAAAAAAAAAAAAAAAAAFAAAADwAAAABAAAAAAAAAAAAAAkUAAAAAQAAABQAAAAUAAAAFAAAAAEAAAAAAAAAZAAAAGQAAAAAAAAAZAAAAGQAAAAVAAAAYAAAAAAAAAAAAAAADwAAACADAAAAAAAAAAAAAAEAAACgMgAAVgcAAKr4//8BAAAAf39/AAEAAABkAAAAAAAAABQAAABAHwAAAAAAACYAAAAAAAAAwOD//wAAAAAmAAAAZAAAABYAAABMAAAAAAAAAAAAAAAEAAAAAAAAAAEAAACAgIAKAAAAACgAAAAoAAAAZAAAAGQAAAAAAAAAzMzMAAAAAABQAAAAUAAAAGQAAABkAAAAAAAAABcAAAAUAAAAAAAAAAAAAAD/fwAA/38AAAAAAAAJAAAABAAAAAAAAAAeAAAAaAAAAAAAAAAAAAAAAAAAAAAAAAAAAAAAECcAABAnAAAAAAAAAAAAAAAAAAAAAAAAAAAAAAAAAAAAAAAAAAAAABQAAAAAAAAAwMD/AAAAAABkAAAAMgAAAAAAAABkAAAAAAAAAH9/fwAKAAAAIgAAABgAAAAAAAAAAAAAAAAAAAAAAAAAAAAAAAAAAAAkAAAAJAAAAAAAAAAHAAAAAAAAAAAAAAAAAAAAAAAAAAAAAAAAAAAAf39/ACUAAABYAAAAAAAAAAAAAAAAAAAAAAAAAAAAAAAAAAAAAAAAAAAAAAAAAAAAAAAAAAAAAAA/AAAAAAAAAKCGAQAAAAAAAAAAAAAAAAAMAAAAAQAAAAAAAAAAAAAAAAAAAB8AAABUAAAAAJmZB////wEAAAAAAAAAAAAAAAAAAAAAAAAAAAAAAAAAAAAAAAAAAAAAAAJ/f38AgICAA8zMzADAwP8Af39/AAAAAAAAAAAAAAAAAAAAAAAAAAAAIQAAABgAAAAUAAAAcjUAAEwFAABzRAAAnwYAAAAAAAAmAAAACAAAAP//////////"/>
               </a:ext>
             </a:extLst>
           </p:cNvSpPr>
@@ -5352,7 +5385,7 @@
           <p:cNvSpPr>
             <a:extLst>
               <a:ext uri="smNativeData">
-                <pr:smNativeData xmlns:pr="smNativeData" xmlns="smNativeData" val="SMDATA_15_ucsbZBMAAAAlAAAAZAAAAA8BAAAAkAAAAEgAAACQAAAASAAAAAAAAAABAAAAAAAAAAEAAABQAAAAAAAAAAAA4D8AAAAAAADgPwAAAAAAAOA/AAAAAAAA4D8AAAAAAADgPwAAAAAAAOA/AAAAAAAA4D8AAAAAAADgPwAAAAAAAOA/AAAAAAAA4D8CAAAAjAAAAAEAAAAAAAAAwMDAAP///wgAAAAAAAAAAAAAAAAAAAAAAAAAAAAAAAAAAAAAZAAAAAEAAABAAAAAAAAAAAAAAAAAAAAAAAAAAAAAAAAAAAAAAAAAAAAAAAAAAAAAAAAAAAAAAAAAAAAAAAAAAAAAAAAAAAAAAAAAAAAAAAAAAAAAAAAAAAAAAAAAAAAAFAAAADwAAAABAAAAAAAAAAAAAAkUAAAAAQAAABQAAAAUAAAAFAAAAAEAAAAAAAAAZAAAAGQAAAAAAAAAZAAAAGQAAAAVAAAAYAAAAAAAAAAAAAAADwAAACADAAAAAAAAAAAAAAEAAACgMgAAVgcAAKr4//8BAAAAf39/AAEAAABkAAAAAAAAABQAAABAHwAAAAAAACYAAAAAAAAAwOD//wAAAAAmAAAAZAAAABYAAABMAAAAAAAAAAAAAAAEAAAAAAAAAAEAAACAgIAKAAAAACgAAAAoAAAAZAAAAGQAAAAAAAAAzMzMAAAAAABQAAAAUAAAAGQAAABkAAAAAAAAABcAAAAUAAAAAAAAAAAAAAD/fwAA/38AAAAAAAAJAAAABAAAAAAAAAAeAAAAaAAAAAAAAAAAAAAAAAAAAAAAAAAAAAAAECcAABAnAAAAAAAAAAAAAAAAAAAAAAAAAAAAAAAAAAAAAAAAAAAAABQAAAAAAAAAwMD/AAAAAABkAAAAMgAAAAAAAABkAAAAAAAAAH9/fwAKAAAAIgAAABgAAAAAAAAAAAAAAAAAAAAAAAAAAAAAAAAAAAAkAAAAJAAAAAAAAAAHAAAAAAAAAAAAAAAAAAAAAAAAAAAAAAAAAAAAf39/ACUAAABYAAAAAAAAAAAAAAAAAAAAAAAAAAAAAAAAAAAAAAAAAAAAAAAAAAAAAAAAAAAAAAA/AAAAAAAAAKCGAQAAAAAAAAAAAAAAAAAMAAAAAQAAAAAAAAAAAAAAAAAAAB8AAABUAAAAwMDAAP///wEAAAAAAAAAAAAAAAAAAAAAAAAAAAAAAAAAAAAAAAAAAAAAAAJ/f38AgICAA8zMzADAwP8Af39/AAAAAAAAAAAAAAAAAAAAAAAAAAAAIQAAABgAAAAUAAAAnR0AAJ8GAACeLAAA8gcAAAAAAAAmAAAACAAAAP//////////"/>
+                <pr:smNativeData xmlns:pr="smNativeData" xmlns="smNativeData" val="SMDATA_15_NygcZBMAAAAlAAAAZAAAAA8BAAAAkAAAAEgAAACQAAAASAAAAAAAAAABAAAAAAAAAAEAAABQAAAAAAAAAAAA4D8AAAAAAADgPwAAAAAAAOA/AAAAAAAA4D8AAAAAAADgPwAAAAAAAOA/AAAAAAAA4D8AAAAAAADgPwAAAAAAAOA/AAAAAAAA4D8CAAAAjAAAAAEAAAAAAAAAwMDAAP///wgAAAAAAAAAAAAAAAAAAAAAAAAAAAAAAAAAAAAAZAAAAAEAAABAAAAAAAAAAAAAAAAAAAAAAAAAAAAAAAAAAAAAAAAAAAAAAAAAAAAAAAAAAAAAAAAAAAAAAAAAAAAAAAAAAAAAAAAAAAAAAAAAAAAAAAAAAAAAAAAAAAAAFAAAADwAAAABAAAAAAAAAAAAAAkUAAAAAQAAABQAAAAUAAAAFAAAAAEAAAAAAAAAZAAAAGQAAAAAAAAAZAAAAGQAAAAVAAAAYAAAAAAAAAAAAAAADwAAACADAAAAAAAAAAAAAAEAAACgMgAAVgcAAKr4//8BAAAAf39/AAEAAABkAAAAAAAAABQAAABAHwAAAAAAACYAAAAAAAAAwOD//wAAAAAmAAAAZAAAABYAAABMAAAAAAAAAAAAAAAEAAAAAAAAAAEAAACAgIAKAAAAACgAAAAoAAAAZAAAAGQAAAAAAAAAzMzMAAAAAABQAAAAUAAAAGQAAABkAAAAAAAAABcAAAAUAAAAAAAAAAAAAAD/fwAA/38AAAAAAAAJAAAABAAAAAAAAAAeAAAAaAAAAAAAAAAAAAAAAAAAAAAAAAAAAAAAECcAABAnAAAAAAAAAAAAAAAAAAAAAAAAAAAAAAAAAAAAAAAAAAAAABQAAAAAAAAAwMD/AAAAAABkAAAAMgAAAAAAAABkAAAAAAAAAH9/fwAKAAAAIgAAABgAAAAAAAAAAAAAAAAAAAAAAAAAAAAAAAAAAAAkAAAAJAAAAAAAAAAHAAAAAAAAAAAAAAAAAAAAAAAAAAAAAAAAAAAAf39/ACUAAABYAAAAAAAAAAAAAAAAAAAAAAAAAAAAAAAAAAAAAAAAAAAAAAAAAAAAAAAAAAAAAAA/AAAAAAAAAKCGAQAAAAAAAAAAAAAAAAAMAAAAAQAAAAAAAAAAAAAAAAAAAB8AAABUAAAAwMDAAP///wEAAAAAAAAAAAAAAAAAAAAAAAAAAAAAAAAAAAAAAAAAAAAAAAJ/f38AgICAA8zMzADAwP8Af39/AAAAAAAAAAAAAAAAAAAAAAAAAAAAIQAAABgAAAAUAAAAnR0AAJ8GAACeLAAA8gcAAAAAAAAmAAAACAAAAP//////////"/>
               </a:ext>
             </a:extLst>
           </p:cNvSpPr>
@@ -5398,7 +5431,7 @@
           <p:cNvSpPr>
             <a:extLst>
               <a:ext uri="smNativeData">
-                <pr:smNativeData xmlns:pr="smNativeData" xmlns="smNativeData" val="SMDATA_15_ucsbZBMAAAAlAAAAZAAAAA8BAAAAkAAAAEgAAACQAAAASAAAAAAAAAABAAAAAAAAAAEAAABQAAAAAAAAAAAA4D8AAAAAAADgPwAAAAAAAOA/AAAAAAAA4D8AAAAAAADgPwAAAAAAAOA/AAAAAAAA4D8AAAAAAADgPwAAAAAAAOA/AAAAAAAA4D8CAAAAjAAAAAEAAAAAAAAAwMDAAP///wgAAAAAAAAAAAAAAAAAAAAAAAAAAAAAAAAAAAAAZAAAAAEAAABAAAAAAAAAAAAAAAAAAAAAAAAAAAAAAAAAAAAAAAAAAAAAAAAAAAAAAAAAAAAAAAAAAAAAAAAAAAAAAAAAAAAAAAAAAAAAAAAAAAAAAAAAAAAAAAAAAAAAFAAAADwAAAABAAAAAAAAAAAAAAkUAAAAAQAAABQAAAAUAAAAFAAAAAEAAAAAAAAAZAAAAGQAAAAAAAAAZAAAAGQAAAAVAAAAYAAAAAAAAAAAAAAADwAAACADAAAAAAAAAAAAAAEAAACgMgAAVgcAAKr4//8BAAAAf39/AAEAAABkAAAAAAAAABQAAABAHwAAAAAAACYAAAAAAAAAwOD//wAAAAAmAAAAZAAAABYAAABMAAAAAAAAAAAAAAAEAAAAAAAAAAEAAACAgIAKAAAAACgAAAAoAAAAZAAAAGQAAAAAAAAAzMzMAAAAAABQAAAAUAAAAGQAAABkAAAAAAAAABcAAAAUAAAAAAAAAAAAAAD/fwAA/38AAAAAAAAJAAAABAAAAAAAAAAeAAAAaAAAAAAAAAAAAAAAAAAAAAAAAAAAAAAAECcAABAnAAAAAAAAAAAAAAAAAAAAAAAAAAAAAAAAAAAAAAAAAAAAABQAAAAAAAAAwMD/AAAAAABkAAAAMgAAAAAAAABkAAAAAAAAAH9/fwAKAAAAIgAAABgAAAAAAAAAAAAAAAAAAAAAAAAAAAAAAAAAAAAkAAAAJAAAAAAAAAAHAAAAAAAAAAAAAAAAAAAAAAAAAAAAAAAAAAAAf39/ACUAAABYAAAAAAAAAAAAAAAAAAAAAAAAAAAAAAAAAAAAAAAAAAAAAAAAAAAAAAAAAAAAAAA/AAAAAAAAAKCGAQAAAAAAAAAAAAAAAAAMAAAAAQAAAAAAAAAAAAAAAAAAAB8AAABUAAAAwMDAAP///wEAAAAAAAAAAAAAAAAAAAAAAAAAAAAAAAAAAAAAAAAAAAAAAAJ/f38AgICAA8zMzADAwP8Af39/AAAAAAAAAAAAAAAAAAAAAAAAAAAAIQAAABgAAAAUAAAAnR0AAPIHAACeLAAARQkAAAAAAAAmAAAACAAAAP//////////"/>
+                <pr:smNativeData xmlns:pr="smNativeData" xmlns="smNativeData" val="SMDATA_15_NygcZBMAAAAlAAAAZAAAAA8BAAAAkAAAAEgAAACQAAAASAAAAAAAAAABAAAAAAAAAAEAAABQAAAAAAAAAAAA4D8AAAAAAADgPwAAAAAAAOA/AAAAAAAA4D8AAAAAAADgPwAAAAAAAOA/AAAAAAAA4D8AAAAAAADgPwAAAAAAAOA/AAAAAAAA4D8CAAAAjAAAAAEAAAAAAAAAwMDAAP///wgAAAAAAAAAAAAAAAAAAAAAAAAAAAAAAAAAAAAAZAAAAAEAAABAAAAAAAAAAAAAAAAAAAAAAAAAAAAAAAAAAAAAAAAAAAAAAAAAAAAAAAAAAAAAAAAAAAAAAAAAAAAAAAAAAAAAAAAAAAAAAAAAAAAAAAAAAAAAAAAAAAAAFAAAADwAAAABAAAAAAAAAAAAAAkUAAAAAQAAABQAAAAUAAAAFAAAAAEAAAAAAAAAZAAAAGQAAAAAAAAAZAAAAGQAAAAVAAAAYAAAAAAAAAAAAAAADwAAACADAAAAAAAAAAAAAAEAAACgMgAAVgcAAKr4//8BAAAAf39/AAEAAABkAAAAAAAAABQAAABAHwAAAAAAACYAAAAAAAAAwOD//wAAAAAmAAAAZAAAABYAAABMAAAAAAAAAAAAAAAEAAAAAAAAAAEAAACAgIAKAAAAACgAAAAoAAAAZAAAAGQAAAAAAAAAzMzMAAAAAABQAAAAUAAAAGQAAABkAAAAAAAAABcAAAAUAAAAAAAAAAAAAAD/fwAA/38AAAAAAAAJAAAABAAAAAAAAAAeAAAAaAAAAAAAAAAAAAAAAAAAAAAAAAAAAAAAECcAABAnAAAAAAAAAAAAAAAAAAAAAAAAAAAAAAAAAAAAAAAAAAAAABQAAAAAAAAAwMD/AAAAAABkAAAAMgAAAAAAAABkAAAAAAAAAH9/fwAKAAAAIgAAABgAAAAAAAAAAAAAAAAAAAAAAAAAAAAAAAAAAAAkAAAAJAAAAAAAAAAHAAAAAAAAAAAAAAAAAAAAAAAAAAAAAAAAAAAAf39/ACUAAABYAAAAAAAAAAAAAAAAAAAAAAAAAAAAAAAAAAAAAAAAAAAAAAAAAAAAAAAAAAAAAAA/AAAAAAAAAKCGAQAAAAAAAAAAAAAAAAAMAAAAAQAAAAAAAAAAAAAAAAAAAB8AAABUAAAAwMDAAP///wEAAAAAAAAAAAAAAAAAAAAAAAAAAAAAAAAAAAAAAAAAAAAAAAJ/f38AgICAA8zMzADAwP8Af39/AAAAAAAAAAAAAAAAAAAAAAAAAAAAIQAAABgAAAAUAAAAnR0AAPIHAACeLAAARQkAAAAAAAAmAAAACAAAAP//////////"/>
               </a:ext>
             </a:extLst>
           </p:cNvSpPr>
@@ -5454,7 +5487,7 @@
             <a:endCxn id="35" idx="1"/>
             <a:extLst>
               <a:ext uri="smNativeData">
-                <pr:smNativeData xmlns:pr="smNativeData" xmlns="smNativeData" val="SMDATA_15_ucsbZBMAAAAlAAAADgAAAA8BAAAAkAAAAEgAAACQAAAASAAAAAAAAAAAAAAAAAAAAAEAAABQAAAABUnrZzIU8b9H0/HLdYTsPwAAAAAAAOA/AAAAAAAA4D8AAAAAAADgPwAAAAAAAOA/AAAAAAAA4D8AAAAAAADgPwAAAAAAAOA/AAAAAAAA4D8CAAAAjAAAAAAAAAAAAAAAu+DjDP///wgAAAAAAAAAAAAAAAAAAAAAAAAAAAAAAAAAAAAAZAAAAAEAAABAAAAAAAAAAAAAAAAAAAAAAAAAAAAAAAAAAAAAAAAAAAAAAAAAAAAAAAAAAAAAAAAAAAAAAAAAAAAAAAAAAAAAAAAAAAAAAAAAAAAAAAAAAAAAAAAAAAAAFAAAADwAAAABAAAAAAAAAAAAAAkUAAAAAQAAABQAAAAUAAAAFAAAAAEAAAAAAAAAZAAAAGQAAAABAAAAlgAAAJYAAAAVAAAAYAAAAAAAAAAAAAAADwAAACADAAAAAAAAAAAAAAEAAACgMgAAVgcAAKr4//8BAAAAf39/AAEAAABkAAAAAAAAABQAAABAHwAAAAAAACYAAAAAAAAAwOD//wAAAAAmAAAAZAAAABYAAABMAAAAAAAAAAAAAAAEAAAAAAAAAAEAAACAgIAKAAAAACgAAAAoAAAAZAAAAGQAAAAAAAAAzMzMAAAAAABQAAAAUAAAAGQAAABkAAAAAAAAABcAAAAUAAAAAAAAAAAAAAD/fwAA/38AAAAAAAAJAAAABAAAAAAAAAAeAAAAaAAAAAAAAAAAAAAAAAAAAAAAAAAAAAAAECcAABAnAAAAAAAAAAAAAAAAAAAAAAAAAAAAAAAAAAAAAAAAAAAAABQAAAAAAAAAwMD/AAAAAABkAAAAMgAAAAAAAABkAAAAAAAAAH9/fwAKAAAAIgAAABgAAAAAAAAAAAAAAAAAAAAAAAAAAAAAAAAAAAAkAAAAJAAAAAAAAAAHAAAAAAAAAAAAAAAAAAAAAAAAAAAAAAAAAAAAf39/ACUAAABYAAAAAAAAAAAAAAAAAAAAAAAAAAAAAAAAAAAAAAAAAAAAAAAAAAAAAAAAAAAAAAA/AAAAAAAAAKCGAQAAAAAAAAAAAAAAAAAMAAAAAQAAAAAAAAAAAAAAAAAAAB8AAABUAAAAu+DjBf///wEAAAAAAAAAAAAAAAAAAAAAAAAAAAAAAAAAAAAAAAAAAAAAAAJ/f38AgICAA8zMzADAwP8Af39/AAAAAAAAAAAAAAAAAAAAAAAAAAAAIQAAABgAAAAUAAAAPw0AAPYFAACdHQAAIh0AAAAAAAAmAAAACAAAAP//////////"/>
+                <pr:smNativeData xmlns:pr="smNativeData" xmlns="smNativeData" val="SMDATA_15_NygcZBMAAAAlAAAADgAAAA8BAAAAkAAAAEgAAACQAAAASAAAAAAAAAAAAAAAAAAAAAEAAABQAAAABUnrZzIU8b9H0/HLdYTsPwAAAAAAAOA/AAAAAAAA4D8AAAAAAADgPwAAAAAAAOA/AAAAAAAA4D8AAAAAAADgPwAAAAAAAOA/AAAAAAAA4D8CAAAAjAAAAAAAAAAAAAAAu+DjDP///wgAAAAAAAAAAAAAAAAAAAAAAAAAAAAAAAAAAAAAZAAAAAEAAABAAAAAAAAAAAAAAAAAAAAAAAAAAAAAAAAAAAAAAAAAAAAAAAAAAAAAAAAAAAAAAAAAAAAAAAAAAAAAAAAAAAAAAAAAAAAAAAAAAAAAAAAAAAAAAAAAAAAAFAAAADwAAAABAAAAAAAAAAAAAAkUAAAAAQAAABQAAAAUAAAAFAAAAAEAAAAAAAAAZAAAAGQAAAABAAAAlgAAAJYAAAAVAAAAYAAAAAAAAAAAAAAADwAAACADAAAAAAAAAAAAAAEAAACgMgAAVgcAAKr4//8BAAAAf39/AAEAAABkAAAAAAAAABQAAABAHwAAAAAAACYAAAAAAAAAwOD//wAAAAAmAAAAZAAAABYAAABMAAAAAAAAAAAAAAAEAAAAAAAAAAEAAACAgIAKAAAAACgAAAAoAAAAZAAAAGQAAAAAAAAAzMzMAAAAAABQAAAAUAAAAGQAAABkAAAAAAAAABcAAAAUAAAAAAAAAAAAAAD/fwAA/38AAAAAAAAJAAAABAAAAAAAAAAeAAAAaAAAAAAAAAAAAAAAAAAAAAAAAAAAAAAAECcAABAnAAAAAAAAAAAAAAAAAAAAAAAAAAAAAAAAAAAAAAAAAAAAABQAAAAAAAAAwMD/AAAAAABkAAAAMgAAAAAAAABkAAAAAAAAAH9/fwAKAAAAIgAAABgAAAAAAAAAAAAAAAAAAAAAAAAAAAAAAAAAAAAkAAAAJAAAAAAAAAAHAAAAAAAAAAAAAAAAAAAAAAAAAAAAAAAAAAAAf39/ACUAAABYAAAAAAAAAAAAAAAAAAAAAAAAAAAAAAAAAAAAAAAAAAAAAAAAAAAAAAAAAAAAAAA/AAAAAAAAAKCGAQAAAAAAAAAAAAAAAAAMAAAAAQAAAAAAAAAAAAAAAAAAAB8AAABUAAAAu+DjBf///wEAAAAAAAAAAAAAAAAAAAAAAAAAAAAAAAAAAAAAAAAAAAAAAAJ/f38AgICAA8zMzADAwP8Af39/AAAAAAAAAAAAAAAAAAAAAAAAAAAAIQAAABgAAAAUAAAAPw0AAPYFAACdHQAAIh0AAAAAAAAmAAAACAAAAP//////////"/>
               </a:ext>
             </a:extLst>
           </p:cNvCxnSpPr>
@@ -5491,7 +5524,7 @@
             <a:endCxn id="3" idx="0"/>
             <a:extLst>
               <a:ext uri="smNativeData">
-                <pr:smNativeData xmlns:pr="smNativeData" xmlns="smNativeData" val="SMDATA_15_ucsbZBMAAAAlAAAADQAAAA8BAAAAkAAAAEgAAACQAAAASAAAAAAAAAAAAAAAAAAAAAEAAABQAAAAAAAAAAAA4D8AAAAAAADgPwAAAAAAAOA/AAAAAAAA4D8AAAAAAADgPwAAAAAAAOA/AAAAAAAA4D8AAAAAAADgPwAAAAAAAOA/AAAAAAAA4D8CAAAAjAAAAAAAAAAAAAAAu+DjDP///wgAAAAAAAAAAAAAAAAAAAAAAAAAAAAAAAAAAAAAZAAAAAEAAABAAAAAAAAAAAAAAAAAAAAAAAAAAAAAAAAAAAAAAAAAAAAAAAAAAAAAAAAAAAAAAAAAAAAAAAAAAAAAAAAAAAAAAAAAAAAAAAAAAAAAAAAAAAAAAAAAAAAAFAAAADwAAAABAAAAAAAAAAAAAAkUAAAAAQAAABQAAAAUAAAAFAAAAAEAAAAAAAAAZAAAAGQAAAABAAAAlgAAAJYAAAAVAAAAYAAAAAAAAAAAAAAADwAAACADAAAAAAAAAAAAAAEAAACgMgAAVgcAAKr4//8BAAAAf39/AAEAAABkAAAAAAAAABQAAABAHwAAAAAAACYAAAAAAAAAwOD//wAAAAAmAAAAZAAAABYAAABMAAAAAAAAAAAAAAAEAAAAAAAAAAEAAACAgIAKAAAAACgAAAAoAAAAZAAAAGQAAAAAAAAAzMzMAAAAAABQAAAAUAAAAGQAAABkAAAAAAAAABcAAAAUAAAAAAAAAAAAAAD/fwAA/38AAAAAAAAJAAAABAAAAAAAAAAeAAAAaAAAAAAAAAAAAAAAAAAAAAAAAAAAAAAAECcAABAnAAAAAAAAAAAAAAAAAAAAAAAAAAAAAAAAAAAAAAAAAAAAABQAAAAAAAAAwMD/AAAAAABkAAAAMgAAAAAAAABkAAAAAAAAAH9/fwAKAAAAIgAAABgAAAAAAAAAAAAAAAAAAAAAAAAAAAAAAAAAAAAkAAAAJAAAAAAAAAAHAAAAAAAAAAAAAAAAAAAAAAAAAAAAAAAAAAAAf39/ACUAAABYAAAAAAAAAAAAAAAAAAAAAAAAAAAAAAAAAAAAAAAAAAAAAAAAAAAAAAAAAAAAAAA/AAAAAAAAAKCGAQAAAAAAAAAAAAAAAAAMAAAAAQAAAAAAAAAAAAAAAAAAAB8AAABUAAAAu+DjBf///wEAAAAAAAAAAAAAAAAAAAAAAAAAAAAAAAAAAAAAAAAAAAAAAAJ/f38AgICAA8zMzADAwP8Af39/AAAAAAAAAAAAAAAAAAAAAAAAAAAAIQAAABgAAAAUAAAAPw0AAL0FAAA/DQAAEAcAAAAAAAAmAAAACAAAAP//////////"/>
+                <pr:smNativeData xmlns:pr="smNativeData" xmlns="smNativeData" val="SMDATA_15_NygcZBMAAAAlAAAADQAAAA8BAAAAkAAAAEgAAACQAAAASAAAAAAAAAAAAAAAAAAAAAEAAABQAAAAAAAAAAAA4D8AAAAAAADgPwAAAAAAAOA/AAAAAAAA4D8AAAAAAADgPwAAAAAAAOA/AAAAAAAA4D8AAAAAAADgPwAAAAAAAOA/AAAAAAAA4D8CAAAAjAAAAAAAAAAAAAAAu+DjDP///wgAAAAAAAAAAAAAAAAAAAAAAAAAAAAAAAAAAAAAZAAAAAEAAABAAAAAAAAAAAAAAAAAAAAAAAAAAAAAAAAAAAAAAAAAAAAAAAAAAAAAAAAAAAAAAAAAAAAAAAAAAAAAAAAAAAAAAAAAAAAAAAAAAAAAAAAAAAAAAAAAAAAAFAAAADwAAAABAAAAAAAAAAAAAAkUAAAAAQAAABQAAAAUAAAAFAAAAAEAAAAAAAAAZAAAAGQAAAABAAAAlgAAAJYAAAAVAAAAYAAAAAAAAAAAAAAADwAAACADAAAAAAAAAAAAAAEAAACgMgAAVgcAAKr4//8BAAAAf39/AAEAAABkAAAAAAAAABQAAABAHwAAAAAAACYAAAAAAAAAwOD//wAAAAAmAAAAZAAAABYAAABMAAAAAAAAAAAAAAAEAAAAAAAAAAEAAACAgIAKAAAAACgAAAAoAAAAZAAAAGQAAAAAAAAAzMzMAAAAAABQAAAAUAAAAGQAAABkAAAAAAAAABcAAAAUAAAAAAAAAAAAAAD/fwAA/38AAAAAAAAJAAAABAAAAAAAAAAeAAAAaAAAAAAAAAAAAAAAAAAAAAAAAAAAAAAAECcAABAnAAAAAAAAAAAAAAAAAAAAAAAAAAAAAAAAAAAAAAAAAAAAABQAAAAAAAAAwMD/AAAAAABkAAAAMgAAAAAAAABkAAAAAAAAAH9/fwAKAAAAIgAAABgAAAAAAAAAAAAAAAAAAAAAAAAAAAAAAAAAAAAkAAAAJAAAAAAAAAAHAAAAAAAAAAAAAAAAAAAAAAAAAAAAAAAAAAAAf39/ACUAAABYAAAAAAAAAAAAAAAAAAAAAAAAAAAAAAAAAAAAAAAAAAAAAAAAAAAAAAAAAAAAAAA/AAAAAAAAAKCGAQAAAAAAAAAAAAAAAAAMAAAAAQAAAAAAAAAAAAAAAAAAAB8AAABUAAAAu+DjBf///wEAAAAAAAAAAAAAAAAAAAAAAAAAAAAAAAAAAAAAAAAAAAAAAAJ/f38AgICAA8zMzADAwP8Af39/AAAAAAAAAAAAAAAAAAAAAAAAAAAAIQAAABgAAAAUAAAAPw0AAL0FAAA/DQAAEAcAAAAAAAAmAAAACAAAAP//////////"/>
               </a:ext>
             </a:extLst>
           </p:cNvCxnSpPr>
@@ -5525,7 +5558,7 @@
             <a:endCxn id="11" idx="0"/>
             <a:extLst>
               <a:ext uri="smNativeData">
-                <pr:smNativeData xmlns:pr="smNativeData" xmlns="smNativeData" val="SMDATA_15_ucsbZBMAAAAlAAAADQAAAA8BAAAAkAAAAEgAAACQAAAASAAAAAAAAAAAAAAAAAAAAAEAAABQAAAAAAAAAAAA4D8AAAAAAADgPwAAAAAAAOA/AAAAAAAA4D8AAAAAAADgPwAAAAAAAOA/AAAAAAAA4D8AAAAAAADgPwAAAAAAAOA/AAAAAAAA4D8CAAAAjAAAAAAAAAAAAAAAu+DjDP///wgAAAAAAAAAAAAAAAAAAAAAAAAAAAAAAAAAAAAAZAAAAAEAAABAAAAAAAAAAAAAAAAAAAAAAAAAAAAAAAAAAAAAAAAAAAAAAAAAAAAAAAAAAAAAAAAAAAAAAAAAAAAAAAAAAAAAAAAAAAAAAAAAAAAAAAAAAAAAAAAAAAAAFAAAADwAAAABAAAAAAAAAAAAAAkUAAAAAQAAABQAAAAUAAAAFAAAAAEAAAAAAAAAZAAAAGQAAAABAAAAlgAAAJYAAAAVAAAAYAAAAAAAAAAAAAAADwAAACADAAAAAAAAAAAAAAEAAACgMgAAVgcAAKr4//8BAAAAf39/AAEAAABkAAAAAAAAABQAAABAHwAAAAAAACYAAAAAAAAAwOD//wAAAAAmAAAAZAAAABYAAABMAAAAAAAAAAAAAAAEAAAAAAAAAAEAAACAgIAKAAAAACgAAAAoAAAAZAAAAGQAAAAAAAAAzMzMAAAAAABQAAAAUAAAAGQAAABkAAAAAAAAABcAAAAUAAAAAAAAAAAAAAD/fwAA/38AAAAAAAAJAAAABAAAAAAAAAAeAAAAaAAAAAAAAAAAAAAAAAAAAAAAAAAAAAAAECcAABAnAAAAAAAAAAAAAAAAAAAAAAAAAAAAAAAAAAAAAAAAAAAAABQAAAAAAAAAwMD/AAAAAABkAAAAMgAAAAAAAABkAAAAAAAAAH9/fwAKAAAAIgAAABgAAAAAAAAAAAAAAAAAAAAAAAAAAAAAAAAAAAAkAAAAJAAAAAAAAAAHAAAAAAAAAAAAAAAAAAAAAAAAAAAAAAAAAAAAf39/ACUAAABYAAAAAAAAAAAAAAAAAAAAAAAAAAAAAAAAAAAAAAAAAAAAAAAAAAAAAAAAAAAAAAA/AAAAAAAAAKCGAQAAAAAAAAAAAAAAAAAMAAAAAQAAAAAAAAAAAAAAAAAAAB8AAABUAAAAu+DjBf///wEAAAAAAAAAAAAAAAAAAAAAAAAAAAAAAAAAAAAAAAAAAAAAAAJ/f38AgICAA8zMzADAwP8Af39/AAAAAAAAAAAAAAAAAAAAAAAAAAAAIQAAABgAAAAUAAAAPg0AAFwMAAA/DQAAPg0AAAAAAAAmAAAACAAAAP//////////"/>
+                <pr:smNativeData xmlns:pr="smNativeData" xmlns="smNativeData" val="SMDATA_15_NygcZBMAAAAlAAAADQAAAA8BAAAAkAAAAEgAAACQAAAASAAAAAAAAAAAAAAAAAAAAAEAAABQAAAAAAAAAAAA4D8AAAAAAADgPwAAAAAAAOA/AAAAAAAA4D8AAAAAAADgPwAAAAAAAOA/AAAAAAAA4D8AAAAAAADgPwAAAAAAAOA/AAAAAAAA4D8CAAAAjAAAAAAAAAAAAAAAu+DjDP///wgAAAAAAAAAAAAAAAAAAAAAAAAAAAAAAAAAAAAAZAAAAAEAAABAAAAAAAAAAAAAAAAAAAAAAAAAAAAAAAAAAAAAAAAAAAAAAAAAAAAAAAAAAAAAAAAAAAAAAAAAAAAAAAAAAAAAAAAAAAAAAAAAAAAAAAAAAAAAAAAAAAAAFAAAADwAAAABAAAAAAAAAAAAAAkUAAAAAQAAABQAAAAUAAAAFAAAAAEAAAAAAAAAZAAAAGQAAAABAAAAlgAAAJYAAAAVAAAAYAAAAAAAAAAAAAAADwAAACADAAAAAAAAAAAAAAEAAACgMgAAVgcAAKr4//8BAAAAf39/AAEAAABkAAAAAAAAABQAAABAHwAAAAAAACYAAAAAAAAAwOD//wAAAAAmAAAAZAAAABYAAABMAAAAAAAAAAAAAAAEAAAAAAAAAAEAAACAgIAKAAAAACgAAAAoAAAAZAAAAGQAAAAAAAAAzMzMAAAAAABQAAAAUAAAAGQAAABkAAAAAAAAABcAAAAUAAAAAAAAAAAAAAD/fwAA/38AAAAAAAAJAAAABAAAAAAAAAAeAAAAaAAAAAAAAAAAAAAAAAAAAAAAAAAAAAAAECcAABAnAAAAAAAAAAAAAAAAAAAAAAAAAAAAAAAAAAAAAAAAAAAAABQAAAAAAAAAwMD/AAAAAABkAAAAMgAAAAAAAABkAAAAAAAAAH9/fwAKAAAAIgAAABgAAAAAAAAAAAAAAAAAAAAAAAAAAAAAAAAAAAAkAAAAJAAAAAAAAAAHAAAAAAAAAAAAAAAAAAAAAAAAAAAAAAAAAAAAf39/ACUAAABYAAAAAAAAAAAAAAAAAAAAAAAAAAAAAAAAAAAAAAAAAAAAAAAAAAAAAAAAAAAAAAA/AAAAAAAAAKCGAQAAAAAAAAAAAAAAAAAMAAAAAQAAAAAAAAAAAAAAAAAAAB8AAABUAAAAu+DjBf///wEAAAAAAAAAAAAAAAAAAAAAAAAAAAAAAAAAAAAAAAAAAAAAAAJ/f38AgICAA8zMzADAwP8Af39/AAAAAAAAAAAAAAAAAAAAAAAAAAAAIQAAABgAAAAUAAAAPg0AAFwMAAA/DQAAPg0AAAAAAAAmAAAACAAAAP//////////"/>
               </a:ext>
             </a:extLst>
           </p:cNvCxnSpPr>
@@ -5559,7 +5592,7 @@
             <a:endCxn id="37" idx="1"/>
             <a:extLst>
               <a:ext uri="smNativeData">
-                <pr:smNativeData xmlns:pr="smNativeData" xmlns="smNativeData" val="SMDATA_15_ucsbZBMAAAAlAAAADQAAAA8BAAAAkAAAAEgAAACQAAAASAAAAAAAAAAAAAAAAAAAAAEAAABQAAAAAAAAAAAA4D8AAAAAAADgPwAAAAAAAOA/AAAAAAAA4D8AAAAAAADgPwAAAAAAAOA/AAAAAAAA4D8AAAAAAADgPwAAAAAAAOA/AAAAAAAA4D8CAAAAjAAAAAAAAAAAAAAAu+DjDP///wgAAAAAAAAAAAAAAAAAAAAAAAAAAAAAAAAAAAAAZAAAAAEAAABAAAAAAAAAAAAAAAAAAAAAAAAAAAAAAAAAAAAAAAAAAAAAAAAAAAAAAAAAAAAAAAAAAAAAAAAAAAAAAAAAAAAAAAAAAAAAAAAAAAAAAAAAAAAAAAAAAAAAFAAAADwAAAABAAAAAAAAAAAAAAkUAAAAAQAAABQAAAAUAAAAFAAAAAEAAAAAAAAAZAAAAGQAAAABAAAAlgAAAJYAAAAVAAAAYAAAAAAAAAAAAAAADwAAACADAAAAAAAAAAAAAAEAAACgMgAAVgcAAKr4//8BAAAAf39/AAEAAABkAAAAAAAAABQAAABAHwAAAAAAACYAAAAAAAAAwOD//wAAAAAmAAAAZAAAABYAAABMAAAAAAAAAAAAAAAEAAAAAAAAAAEAAACAgIAKAAAAACgAAAAoAAAAZAAAAGQAAAAAAAAAzMzMAAAAAABQAAAAUAAAAGQAAABkAAAAAAAAABcAAAAUAAAAAAAAAAAAAAD/fwAA/38AAAAAAAAJAAAABAAAAAAAAAAeAAAAaAAAAAAAAAAAAAAAAAAAAAAAAAAAAAAAECcAABAnAAAAAAAAAAAAAAAAAAAAAAAAAAAAAAAAAAAAAAAAAAAAABQAAAAAAAAAwMD/AAAAAABkAAAAMgAAAAAAAABkAAAAAAAAAH9/fwAKAAAAIgAAABgAAAAAAAAAAAAAAAAAAAAAAAAAAAAAAAAAAAAkAAAAJAAAAAAAAAAHAAAAAAAAAAAAAAAAAAAAAAAAAAAAAAAAAAAAf39/ACUAAABYAAAAAAAAAAAAAAAAAAAAAAAAAAAAAAAAAAAAAAAAAAAAAAAAAAAAAAAAAAAAAAA/AAAAAAAAAKCGAQAAAAAAAAAAAAAAAAAMAAAAAQAAAAAAAAAAAAAAAAAAAB8AAABUAAAAu+DjBf///wEAAAAAAAAAAAAAAAAAAAAAAAAAAAAAAAAAAAAAAAAAAAAAAAJ/f38AgICAA8zMzADAwP8Af39/AAAAAAAAAAAAAAAAAAAAAAAAAAAAIQAAABgAAAAUAAAArjMAAPYFAAByNQAA9gUAAAAAAAAmAAAACAAAAP//////////"/>
+                <pr:smNativeData xmlns:pr="smNativeData" xmlns="smNativeData" val="SMDATA_15_NygcZBMAAAAlAAAADQAAAA8BAAAAkAAAAEgAAACQAAAASAAAAAAAAAAAAAAAAAAAAAEAAABQAAAAAAAAAAAA4D8AAAAAAADgPwAAAAAAAOA/AAAAAAAA4D8AAAAAAADgPwAAAAAAAOA/AAAAAAAA4D8AAAAAAADgPwAAAAAAAOA/AAAAAAAA4D8CAAAAjAAAAAAAAAAAAAAAu+DjDP///wgAAAAAAAAAAAAAAAAAAAAAAAAAAAAAAAAAAAAAZAAAAAEAAABAAAAAAAAAAAAAAAAAAAAAAAAAAAAAAAAAAAAAAAAAAAAAAAAAAAAAAAAAAAAAAAAAAAAAAAAAAAAAAAAAAAAAAAAAAAAAAAAAAAAAAAAAAAAAAAAAAAAAFAAAADwAAAABAAAAAAAAAAAAAAkUAAAAAQAAABQAAAAUAAAAFAAAAAEAAAAAAAAAZAAAAGQAAAABAAAAlgAAAJYAAAAVAAAAYAAAAAAAAAAAAAAADwAAACADAAAAAAAAAAAAAAEAAACgMgAAVgcAAKr4//8BAAAAf39/AAEAAABkAAAAAAAAABQAAABAHwAAAAAAACYAAAAAAAAAwOD//wAAAAAmAAAAZAAAABYAAABMAAAAAAAAAAAAAAAEAAAAAAAAAAEAAACAgIAKAAAAACgAAAAoAAAAZAAAAGQAAAAAAAAAzMzMAAAAAABQAAAAUAAAAGQAAABkAAAAAAAAABcAAAAUAAAAAAAAAAAAAAD/fwAA/38AAAAAAAAJAAAABAAAAAAAAAAeAAAAaAAAAAAAAAAAAAAAAAAAAAAAAAAAAAAAECcAABAnAAAAAAAAAAAAAAAAAAAAAAAAAAAAAAAAAAAAAAAAAAAAABQAAAAAAAAAwMD/AAAAAABkAAAAMgAAAAAAAABkAAAAAAAAAH9/fwAKAAAAIgAAABgAAAAAAAAAAAAAAAAAAAAAAAAAAAAAAAAAAAAkAAAAJAAAAAAAAAAHAAAAAAAAAAAAAAAAAAAAAAAAAAAAAAAAAAAAf39/ACUAAABYAAAAAAAAAAAAAAAAAAAAAAAAAAAAAAAAAAAAAAAAAAAAAAAAAAAAAAAAAAAAAAA/AAAAAAAAAKCGAQAAAAAAAAAAAAAAAAAMAAAAAQAAAAAAAAAAAAAAAAAAAB8AAABUAAAAu+DjBf///wEAAAAAAAAAAAAAAAAAAAAAAAAAAAAAAAAAAAAAAAAAAAAAAAJ/f38AgICAA8zMzADAwP8Af39/AAAAAAAAAAAAAAAAAAAAAAAAAAAAIQAAABgAAAAUAAAArjMAAPYFAAByNQAA9gUAAAAAAAAmAAAACAAAAP//////////"/>
               </a:ext>
             </a:extLst>
           </p:cNvCxnSpPr>
@@ -5591,7 +5624,7 @@
           <p:cNvSpPr txBox="1">
             <a:extLst>
               <a:ext uri="smNativeData">
-                <pr:smNativeData xmlns:pr="smNativeData" xmlns="smNativeData" val="SMDATA_15_ucsbZBMAAAAlAAAAEgAAAA8BAAAAkAAAAEgAAACQAAAASAAAAAAAAAAAAAAAAAAAAAEAAABQAAAAAAAAAAAA4D8AAAAAAADgPwAAAAAAAOA/AAAAAAAA4D8AAAAAAADgPwAAAAAAAOA/AAAAAAAA4D8AAAAAAADgPwAAAAAAAOA/AAAAAAAA4D8CAAAAjAAAAAAAAAAAAAAAu+DjDP///wgAAAAAAAAAAAAAAAAAAAAAAAAAAAAAAAAAAAAAZAAAAAEAAABAAAAAAAAAAAAAAAAAAAAAAAAAAAAAAAAAAAAAAAAAAAAAAAAAAAAAAAAAAAAAAAAAAAAAAAAAAAAAAAAAAAAAAAAAAAAAAAAAAAAAAAAAAAAAAAAAAAAAFAAAADwAAAAAAAAAAAAAAAAAAAkUAAAAAQAAABQAAAAUAAAAFAAAAAEAAAAAAAAAZAAAAGQAAAAAAAAAZAAAAGQAAAAVAAAAYAAAAAAAAAAAAAAADwAAACADAAAAAAAAAAAAAAEAAACgMgAAVgcAAKr4//8BAAAAf39/AAEAAABkAAAAAAAAABQAAABAHwAAAAAAACYAAAAAAAAAwOD//wAAAAAmAAAAZAAAABYAAABMAAAAAAAAAAAAAAAEAAAAAAAAAAEAAACAgIAKAAAAACgAAAAoAAAAZAAAAGQAAAAAAAAAzMzMAAAAAABQAAAAUAAAAGQAAABkAAAAAAAAABcAAAAUAAAAAAAAANwIAAD/fwAA/38AAAAAAAAJAAAABAAAAAAAAAAeAAAAaAAAAAAAAAAAAAAAAAAAAAAAAAAAAAAAECcAABAnAAAAAAAAAAAAAAAAAAAAAAAAAAAAAAAAAAAAAAAAAAAAABQAAAAAAAAAwMD/AAAAAABkAAAAMgAAAAAAAABkAAAAAAAAAH9/fwAKAAAAIgAAABgAAAAAAAAAAAAAAAAAAAAAAAAAAAAAAAAAAAAkAAAAJAAAAAAAAAAHAAAAAAAAAAAAAAAAAAAAAAAAAAAAAAAAAAAAf39/ACUAAABYAAAAAAAAAAAAAAAAAAAAAAAAAAAAAAAAAAAAAAAAAAAAAAAAAAAAAAAAAAAAAAA/AAAAAAAAAKCGAQAAAAAAAAAAAAAAAAAMAAAAAQAAAAAAAAAAAAAAAAAAAB8AAABUAAAAu+DjBf///wEAAAAAAAAAAAAAAAAAAAAAAAAAAAAAAAAAAAAAAAAAAAAAAAJ/f38AgICAA8zMzADAwP8Af39/AAAAAAAAAAAAAAAAAAAAAAAAAAAAIQAAABgAAAAUAAAADi0AAJ8GAAC1MwAA8gcAAAAAAAAmAAAACAAAAP//////////"/>
+                <pr:smNativeData xmlns:pr="smNativeData" xmlns="smNativeData" val="SMDATA_15_NygcZBMAAAAlAAAAEgAAAA8BAAAAkAAAAEgAAACQAAAASAAAAAAAAAAAAAAAAAAAAAEAAABQAAAAAAAAAAAA4D8AAAAAAADgPwAAAAAAAOA/AAAAAAAA4D8AAAAAAADgPwAAAAAAAOA/AAAAAAAA4D8AAAAAAADgPwAAAAAAAOA/AAAAAAAA4D8CAAAAjAAAAAAAAAAAAAAAu+DjDP///wgAAAAAAAAAAAAAAAAAAAAAAAAAAAAAAAAAAAAAZAAAAAEAAABAAAAAAAAAAAAAAAAAAAAAAAAAAAAAAAAAAAAAAAAAAAAAAAAAAAAAAAAAAAAAAAAAAAAAAAAAAAAAAAAAAAAAAAAAAAAAAAAAAAAAAAAAAAAAAAAAAAAAFAAAADwAAAAAAAAAAAAAAAAAAAkUAAAAAQAAABQAAAAUAAAAFAAAAAEAAAAAAAAAZAAAAGQAAAAAAAAAZAAAAGQAAAAVAAAAYAAAAAAAAAAAAAAADwAAACADAAAAAAAAAAAAAAEAAACgMgAAVgcAAKr4//8BAAAAf39/AAEAAABkAAAAAAAAABQAAABAHwAAAAAAACYAAAAAAAAAwOD//wAAAAAmAAAAZAAAABYAAABMAAAAAAAAAAAAAAAEAAAAAAAAAAEAAACAgIAKAAAAACgAAAAoAAAAZAAAAGQAAAAAAAAAzMzMAAAAAABQAAAAUAAAAGQAAABkAAAAAAAAABcAAAAUAAAAAAAAANwIAAD/fwAA/38AAAAAAAAJAAAABAAAAAAAAAAeAAAAaAAAAAAAAAAAAAAAAAAAAAAAAAAAAAAAECcAABAnAAAAAAAAAAAAAAAAAAAAAAAAAAAAAAAAAAAAAAAAAAAAABQAAAAAAAAAwMD/AAAAAABkAAAAMgAAAAAAAABkAAAAAAAAAH9/fwAKAAAAIgAAABgAAAAAAAAAAAAAAAAAAAAAAAAAAAAAAAAAAAAkAAAAJAAAAAAAAAAHAAAAAAAAAAAAAAAAAAAAAAAAAAAAAAAAAAAAf39/ACUAAABYAAAAAAAAAAAAAAAAAAAAAAAAAAAAAAAAAAAAAAAAAAAAAAAAAAAAAAAAAAAAAAA/AAAAAAAAAKCGAQAAAAAAAAAAAAAAAAAMAAAAAQAAAAAAAAAAAAAAAAAAAB8AAABUAAAAu+DjBf///wEAAAAAAAAAAAAAAAAAAAAAAAAAAAAAAAAAAAAAAAAAAAAAAAJ/f38AgICAA8zMzADAwP8Af39/AAAAAAAAAAAAAAAAAAAAAAAAAAAAIQAAABgAAAAUAAAADi0AAJ8GAAC1MwAA8gcAAAAAAAAmAAAACAAAAP//////////"/>
               </a:ext>
             </a:extLst>
           </p:cNvSpPr>
@@ -5630,7 +5663,7 @@
           <p:cNvSpPr txBox="1">
             <a:extLst>
               <a:ext uri="smNativeData">
-                <pr:smNativeData xmlns:pr="smNativeData" xmlns="smNativeData" val="SMDATA_15_ucsbZBMAAAAlAAAAEgAAAA8BAAAAkAAAAEgAAACQAAAASAAAAAAAAAAAAAAAAAAAAAEAAABQAAAAAAAAAAAA4D8AAAAAAADgPwAAAAAAAOA/AAAAAAAA4D8AAAAAAADgPwAAAAAAAOA/AAAAAAAA4D8AAAAAAADgPwAAAAAAAOA/AAAAAAAA4D8CAAAAjAAAAAAAAAAAAAAAu+DjDP///wgAAAAAAAAAAAAAAAAAAAAAAAAAAAAAAAAAAAAAZAAAAAEAAABAAAAAAAAAAAAAAAAAAAAAAAAAAAAAAAAAAAAAAAAAAAAAAAAAAAAAAAAAAAAAAAAAAAAAAAAAAAAAAAAAAAAAAAAAAAAAAAAAAAAAAAAAAAAAAAAAAAAAFAAAADwAAAAAAAAAAAAAAAAAAAkUAAAAAQAAABQAAAAUAAAAFAAAAAEAAAAAAAAAZAAAAGQAAAAAAAAAZAAAAGQAAAAVAAAAYAAAAAAAAAAAAAAADwAAACADAAAAAAAAAAAAAAEAAACgMgAAVgcAAKr4//8BAAAAf39/AAEAAABkAAAAAAAAABQAAABAHwAAAAAAACYAAAAAAAAAwOD//wAAAAAmAAAAZAAAABYAAABMAAAAAAAAAAAAAAAEAAAAAAAAAAEAAACAgIAKAAAAACgAAAAoAAAAZAAAAGQAAAAAAAAAzMzMAAAAAABQAAAAUAAAAGQAAABkAAAAAAAAABcAAAAUAAAAAAAAANwIAAD/fwAA/38AAAAAAAAJAAAABAAAAEoAAAAeAAAAaAAAAAAAAAAAAAAAAAAAAAAAAAAAAAAAECcAABAnAAAAAAAAAAAAAAAAAAAAAAAAAAAAAAAAAAAAAAAAAAAAABQAAAAAAAAAwMD/AAAAAABkAAAAMgAAAAAAAABkAAAAAAAAAH9/fwAKAAAAIgAAABgAAAAAAAAAAAAAAAAAAAAAAAAAAAAAAAAAAAAkAAAAJAAAAAAAAAAHAAAAAAAAAAAAAAAAAAAAAAAAAAAAAAAAAAAAf39/ACUAAABYAAAAAAAAAAAAAAAAAAAAAAAAAAAAAAAAAAAAAAAAAAAAAAAAAAAAAAAAAAAAAAA/AAAAAAAAAKCGAQAAAAAAAAAAAAAAAAAMAAAAAQAAAAAAAAAAAAAAAAAAAB8AAABUAAAAu+DjBf///wEAAAAAAAAAAAAAAAAAAAAAAAAAAAAAAAAAAAAAAAAAAAAAAAJ/f38AgICAA8zMzADAwP8Af39/AAAAAAAAAAAAAAAAAAAAAAAAAAAAIQAAABgAAAAUAAAADi0AAPIHAAC1MwAARQkAAAAAAAAmAAAACAAAAP//////////"/>
+                <pr:smNativeData xmlns:pr="smNativeData" xmlns="smNativeData" val="SMDATA_15_NygcZBMAAAAlAAAAEgAAAA8BAAAAkAAAAEgAAACQAAAASAAAAAAAAAAAAAAAAAAAAAEAAABQAAAAAAAAAAAA4D8AAAAAAADgPwAAAAAAAOA/AAAAAAAA4D8AAAAAAADgPwAAAAAAAOA/AAAAAAAA4D8AAAAAAADgPwAAAAAAAOA/AAAAAAAA4D8CAAAAjAAAAAAAAAAAAAAAu+DjDP///wgAAAAAAAAAAAAAAAAAAAAAAAAAAAAAAAAAAAAAZAAAAAEAAABAAAAAAAAAAAAAAAAAAAAAAAAAAAAAAAAAAAAAAAAAAAAAAAAAAAAAAAAAAAAAAAAAAAAAAAAAAAAAAAAAAAAAAAAAAAAAAAAAAAAAAAAAAAAAAAAAAAAAFAAAADwAAAAAAAAAAAAAAAAAAAkUAAAAAQAAABQAAAAUAAAAFAAAAAEAAAAAAAAAZAAAAGQAAAAAAAAAZAAAAGQAAAAVAAAAYAAAAAAAAAAAAAAADwAAACADAAAAAAAAAAAAAAEAAACgMgAAVgcAAKr4//8BAAAAf39/AAEAAABkAAAAAAAAABQAAABAHwAAAAAAACYAAAAAAAAAwOD//wAAAAAmAAAAZAAAABYAAABMAAAAAAAAAAAAAAAEAAAAAAAAAAEAAACAgIAKAAAAACgAAAAoAAAAZAAAAGQAAAAAAAAAzMzMAAAAAABQAAAAUAAAAGQAAABkAAAAAAAAABcAAAAUAAAAAAAAANwIAAD/fwAA/38AAAAAAAAJAAAABAAAAEoAAAAeAAAAaAAAAAAAAAAAAAAAAAAAAAAAAAAAAAAAECcAABAnAAAAAAAAAAAAAAAAAAAAAAAAAAAAAAAAAAAAAAAAAAAAABQAAAAAAAAAwMD/AAAAAABkAAAAMgAAAAAAAABkAAAAAAAAAH9/fwAKAAAAIgAAABgAAAAAAAAAAAAAAAAAAAAAAAAAAAAAAAAAAAAkAAAAJAAAAAAAAAAHAAAAAAAAAAAAAAAAAAAAAAAAAAAAAAAAAAAAf39/ACUAAABYAAAAAAAAAAAAAAAAAAAAAAAAAAAAAAAAAAAAAAAAAAAAAAAAAAAAAAAAAAAAAAA/AAAAAAAAAKCGAQAAAAAAAAAAAAAAAAAMAAAAAQAAAAAAAAAAAAAAAAAAAB8AAABUAAAAu+DjBf///wEAAAAAAAAAAAAAAAAAAAAAAAAAAAAAAAAAAAAAAAAAAAAAAAJ/f38AgICAA8zMzADAwP8Af39/AAAAAAAAAAAAAAAAAAAAAAAAAAAAIQAAABgAAAAUAAAADi0AAPIHAAC1MwAARQkAAAAAAAAmAAAACAAAAP//////////"/>
               </a:ext>
             </a:extLst>
           </p:cNvSpPr>
@@ -5669,7 +5702,7 @@
           <p:cNvSpPr>
             <a:extLst>
               <a:ext uri="smNativeData">
-                <pr:smNativeData xmlns:pr="smNativeData" xmlns="smNativeData" val="SMDATA_15_ucsbZBMAAAAlAAAAZAAAAA8BAAAAkAAAAEgAAACQAAAASAAAAAAAAAABAAAAAAAAAAEAAABQAAAAAAAAAAAA4D8AAAAAAADgPwAAAAAAAOA/AAAAAAAA4D8AAAAAAADgPwAAAAAAAOA/AAAAAAAA4D8AAAAAAADgPwAAAAAAAOA/AAAAAAAA4D8CAAAAjAAAAAEAAAAAAAAAwMDAAP///wgAAAAAAAAAAAAAAAAAAAAAAAAAAAAAAAAAAAAAZAAAAAEAAABAAAAAAAAAAAAAAAAAAAAAAAAAAAAAAAAAAAAAAAAAAAAAAAAAAAAAAAAAAAAAAAAAAAAAAAAAAAAAAAAAAAAAAAAAAAAAAAAAAAAAAAAAAAAAAAAAAAAAFAAAADwAAAABAAAAAAAAAAAAAAkUAAAAAQAAABQAAAAUAAAAFAAAAAEAAAAAAAAAZAAAAGQAAAAAAAAAZAAAAGQAAAAVAAAAYAAAAAAAAAAAAAAADwAAACADAAAAAAAAAAAAAAEAAACgMgAAVgcAAKr4//8BAAAAf39/AAEAAABkAAAAAAAAABQAAABAHwAAAAAAACYAAAAAAAAAwOD//wAAAAAmAAAAZAAAABYAAABMAAAAAAAAAAAAAAAEAAAAAAAAAAEAAACAgIAKAAAAACgAAAAoAAAAZAAAAGQAAAAAAAAAzMzMAAAAAABQAAAAUAAAAGQAAABkAAAAAAAAABcAAAAUAAAAAAAAAAAAAAD/fwAA/38AAAAAAAAJAAAABAAAAAAAAAAeAAAAaAAAAAAAAAAAAAAAAAAAAAAAAAAAAAAAECcAABAnAAAAAAAAAAAAAAAAAAAAAAAAAAAAAAAAAAAAAAAAAAAAABQAAAAAAAAAwMD/AAAAAABkAAAAMgAAAAAAAABkAAAAAAAAAH9/fwAKAAAAIgAAABgAAAAAAAAAAAAAAAAAAAAAAAAAAAAAAAAAAAAkAAAAJAAAAAAAAAAHAAAAAAAAAAAAAAAAAAAAAAAAAAAAAAAAAAAAf39/ACUAAABYAAAAAAAAAAAAAAAAAAAAAAAAAAAAAAAAAAAAAAAAAAAAAAAAAAAAAAAAAAAAAAA/AAAAAAAAAKCGAQAAAAAAAAAAAAAAAAAMAAAAAQAAAAAAAAAAAAAAAAAAAB8AAABUAAAAwMDAAP///wEAAAAAAAAAAAAAAAAAAAAAAAAAAAAAAAAAAAAAAAAAAAAAAAJ/f38AgICAA8zMzADAwP8Af39/AAAAAAAAAAAAAAAAAAAAAAAAAAAAIQAAABgAAAAUAAAAmx0AAEUJAACcLAAAmAoAAAAAAAAmAAAACAAAAP//////////"/>
+                <pr:smNativeData xmlns:pr="smNativeData" xmlns="smNativeData" val="SMDATA_15_NygcZBMAAAAlAAAAZAAAAA8BAAAAkAAAAEgAAACQAAAASAAAAAAAAAABAAAAAAAAAAEAAABQAAAAAAAAAAAA4D8AAAAAAADgPwAAAAAAAOA/AAAAAAAA4D8AAAAAAADgPwAAAAAAAOA/AAAAAAAA4D8AAAAAAADgPwAAAAAAAOA/AAAAAAAA4D8CAAAAjAAAAAEAAAAAAAAAwMDAAP///wgAAAAAAAAAAAAAAAAAAAAAAAAAAAAAAAAAAAAAZAAAAAEAAABAAAAAAAAAAAAAAAAAAAAAAAAAAAAAAAAAAAAAAAAAAAAAAAAAAAAAAAAAAAAAAAAAAAAAAAAAAAAAAAAAAAAAAAAAAAAAAAAAAAAAAAAAAAAAAAAAAAAAFAAAADwAAAABAAAAAAAAAAAAAAkUAAAAAQAAABQAAAAUAAAAFAAAAAEAAAAAAAAAZAAAAGQAAAAAAAAAZAAAAGQAAAAVAAAAYAAAAAAAAAAAAAAADwAAACADAAAAAAAAAAAAAAEAAACgMgAAVgcAAKr4//8BAAAAf39/AAEAAABkAAAAAAAAABQAAABAHwAAAAAAACYAAAAAAAAAwOD//wAAAAAmAAAAZAAAABYAAABMAAAAAAAAAAAAAAAEAAAAAAAAAAEAAACAgIAKAAAAACgAAAAoAAAAZAAAAGQAAAAAAAAAzMzMAAAAAABQAAAAUAAAAGQAAABkAAAAAAAAABcAAAAUAAAAAAAAAAAAAAD/fwAA/38AAAAAAAAJAAAABAAAAAAAAAAeAAAAaAAAAAAAAAAAAAAAAAAAAAAAAAAAAAAAECcAABAnAAAAAAAAAAAAAAAAAAAAAAAAAAAAAAAAAAAAAAAAAAAAABQAAAAAAAAAwMD/AAAAAABkAAAAMgAAAAAAAABkAAAAAAAAAH9/fwAKAAAAIgAAABgAAAAAAAAAAAAAAAAAAAAAAAAAAAAAAAAAAAAkAAAAJAAAAAAAAAAHAAAAAAAAAAAAAAAAAAAAAAAAAAAAAAAAAAAAf39/ACUAAABYAAAAAAAAAAAAAAAAAAAAAAAAAAAAAAAAAAAAAAAAAAAAAAAAAAAAAAAAAAAAAAA/AAAAAAAAAKCGAQAAAAAAAAAAAAAAAAAMAAAAAQAAAAAAAAAAAAAAAAAAAB8AAABUAAAAwMDAAP///wEAAAAAAAAAAAAAAAAAAAAAAAAAAAAAAAAAAAAAAAAAAAAAAAJ/f38AgICAA8zMzADAwP8Af39/AAAAAAAAAAAAAAAAAAAAAAAAAAAAIQAAABgAAAAUAAAAmx0AAEUJAACcLAAAmAoAAAAAAAAmAAAACAAAAP//////////"/>
               </a:ext>
             </a:extLst>
           </p:cNvSpPr>
@@ -5715,7 +5748,7 @@
           <p:cNvSpPr>
             <a:extLst>
               <a:ext uri="smNativeData">
-                <pr:smNativeData xmlns:pr="smNativeData" xmlns="smNativeData" val="SMDATA_15_ucsbZBMAAAAlAAAAZAAAAA8BAAAAkAAAAEgAAACQAAAASAAAAAAAAAABAAAAAAAAAAEAAABQAAAAAAAAAAAA4D8AAAAAAADgPwAAAAAAAOA/AAAAAAAA4D8AAAAAAADgPwAAAAAAAOA/AAAAAAAA4D8AAAAAAADgPwAAAAAAAOA/AAAAAAAA4D8CAAAAjAAAAAEAAAAAAAAAwMDAAP///wgAAAAAAAAAAAAAAAAAAAAAAAAAAAAAAAAAAAAAZAAAAAEAAABAAAAAAAAAAAAAAAAAAAAAAAAAAAAAAAAAAAAAAAAAAAAAAAAAAAAAAAAAAAAAAAAAAAAAAAAAAAAAAAAAAAAAAAAAAAAAAAAAAAAAAAAAAAAAAAAAAAAAFAAAADwAAAABAAAAAAAAAAAAAAkUAAAAAQAAABQAAAAUAAAAFAAAAAEAAAAAAAAAZAAAAGQAAAAAAAAAZAAAAGQAAAAVAAAAYAAAAAAAAAAAAAAADwAAACADAAAAAAAAAAAAAAEAAACgMgAAVgcAAKr4//8BAAAAf39/AAEAAABkAAAAAAAAABQAAABAHwAAAAAAACYAAAAAAAAAwOD//wAAAAAmAAAAZAAAABYAAABMAAAAAAAAAAAAAAAEAAAAAAAAAAEAAACAgIAKAAAAACgAAAAoAAAAZAAAAGQAAAAAAAAAzMzMAAAAAABQAAAAUAAAAGQAAABkAAAAAAAAABcAAAAUAAAAAAAAAAAAAAD/fwAA/38AAAAAAAAJAAAABAAAAAAAAAAeAAAAaAAAAAAAAAAAAAAAAAAAAAAAAAAAAAAAECcAABAnAAAAAAAAAAAAAAAAAAAAAAAAAAAAAAAAAAAAAAAAAAAAABQAAAAAAAAAwMD/AAAAAABkAAAAMgAAAAAAAABkAAAAAAAAAH9/fwAKAAAAIgAAABgAAAAAAAAAAAAAAAAAAAAAAAAAAAAAAAAAAAAkAAAAJAAAAAAAAAAHAAAAAAAAAAAAAAAAAAAAAAAAAAAAAAAAAAAAf39/ACUAAABYAAAAAAAAAAAAAAAAAAAAAAAAAAAAAAAAAAAAAAAAAAAAAAAAAAAAAAAAAAAAAAA/AAAAAAAAAKCGAQAAAAAAAAAAAAAAAAAMAAAAAQAAAAAAAAAAAAAAAAAAAB8AAABUAAAAwMDAAP///wEAAAAAAAAAAAAAAAAAAAAAAAAAAAAAAAAAAAAAAAAAAAAAAAJ/f38AgICAA8zMzADAwP8Af39/AAAAAAAAAAAAAAAAAAAAAAAAAAAAIQAAABgAAAAUAAAAmx0AAJgKAACcLAAA6wsAAAAAAAAmAAAACAAAAP//////////"/>
+                <pr:smNativeData xmlns:pr="smNativeData" xmlns="smNativeData" val="SMDATA_15_NygcZBMAAAAlAAAAZAAAAA8BAAAAkAAAAEgAAACQAAAASAAAAAAAAAABAAAAAAAAAAEAAABQAAAAAAAAAAAA4D8AAAAAAADgPwAAAAAAAOA/AAAAAAAA4D8AAAAAAADgPwAAAAAAAOA/AAAAAAAA4D8AAAAAAADgPwAAAAAAAOA/AAAAAAAA4D8CAAAAjAAAAAEAAAAAAAAAwMDAAP///wgAAAAAAAAAAAAAAAAAAAAAAAAAAAAAAAAAAAAAZAAAAAEAAABAAAAAAAAAAAAAAAAAAAAAAAAAAAAAAAAAAAAAAAAAAAAAAAAAAAAAAAAAAAAAAAAAAAAAAAAAAAAAAAAAAAAAAAAAAAAAAAAAAAAAAAAAAAAAAAAAAAAAFAAAADwAAAABAAAAAAAAAAAAAAkUAAAAAQAAABQAAAAUAAAAFAAAAAEAAAAAAAAAZAAAAGQAAAAAAAAAZAAAAGQAAAAVAAAAYAAAAAAAAAAAAAAADwAAACADAAAAAAAAAAAAAAEAAACgMgAAVgcAAKr4//8BAAAAf39/AAEAAABkAAAAAAAAABQAAABAHwAAAAAAACYAAAAAAAAAwOD//wAAAAAmAAAAZAAAABYAAABMAAAAAAAAAAAAAAAEAAAAAAAAAAEAAACAgIAKAAAAACgAAAAoAAAAZAAAAGQAAAAAAAAAzMzMAAAAAABQAAAAUAAAAGQAAABkAAAAAAAAABcAAAAUAAAAAAAAAAAAAAD/fwAA/38AAAAAAAAJAAAABAAAAAAAAAAeAAAAaAAAAAAAAAAAAAAAAAAAAAAAAAAAAAAAECcAABAnAAAAAAAAAAAAAAAAAAAAAAAAAAAAAAAAAAAAAAAAAAAAABQAAAAAAAAAwMD/AAAAAABkAAAAMgAAAAAAAABkAAAAAAAAAH9/fwAKAAAAIgAAABgAAAAAAAAAAAAAAAAAAAAAAAAAAAAAAAAAAAAkAAAAJAAAAAAAAAAHAAAAAAAAAAAAAAAAAAAAAAAAAAAAAAAAAAAAf39/ACUAAABYAAAAAAAAAAAAAAAAAAAAAAAAAAAAAAAAAAAAAAAAAAAAAAAAAAAAAAAAAAAAAAA/AAAAAAAAAKCGAQAAAAAAAAAAAAAAAAAMAAAAAQAAAAAAAAAAAAAAAAAAAB8AAABUAAAAwMDAAP///wEAAAAAAAAAAAAAAAAAAAAAAAAAAAAAAAAAAAAAAAAAAAAAAAJ/f38AgICAA8zMzADAwP8Af39/AAAAAAAAAAAAAAAAAAAAAAAAAAAAIQAAABgAAAAUAAAAmx0AAJgKAACcLAAA6wsAAAAAAAAmAAAACAAAAP//////////"/>
               </a:ext>
             </a:extLst>
           </p:cNvSpPr>
@@ -5761,7 +5794,7 @@
           <p:cNvSpPr>
             <a:extLst>
               <a:ext uri="smNativeData">
-                <pr:smNativeData xmlns:pr="smNativeData" xmlns="smNativeData" val="SMDATA_15_ucsbZBMAAAAlAAAAZAAAAA8BAAAAkAAAAEgAAACQAAAASAAAAAAAAAABAAAAAAAAAAEAAABQAAAAAAAAAAAA4D8AAAAAAADgPwAAAAAAAOA/AAAAAAAA4D8AAAAAAADgPwAAAAAAAOA/AAAAAAAA4D8AAAAAAADgPwAAAAAAAOA/AAAAAAAA4D8CAAAAjAAAAAEAAAAAAAAAwMDAAP///wgAAAAAAAAAAAAAAAAAAAAAAAAAAAAAAAAAAAAAZAAAAAEAAABAAAAAAAAAAAAAAAAAAAAAAAAAAAAAAAAAAAAAAAAAAAAAAAAAAAAAAAAAAAAAAAAAAAAAAAAAAAAAAAAAAAAAAAAAAAAAAAAAAAAAAAAAAAAAAAAAAAAAFAAAADwAAAABAAAAAAAAAAAAAAkUAAAAAQAAABQAAAAUAAAAFAAAAAEAAAAAAAAAZAAAAGQAAAAAAAAAZAAAAGQAAAAVAAAAYAAAAAAAAAAAAAAADwAAACADAAAAAAAAAAAAAAEAAACgMgAAVgcAAKr4//8BAAAAf39/AAEAAABkAAAAAAAAABQAAABAHwAAAAAAACYAAAAAAAAAwOD//wAAAAAmAAAAZAAAABYAAABMAAAAAAAAAAAAAAAEAAAAAAAAAAEAAACAgIAKAAAAACgAAAAoAAAAZAAAAGQAAAAAAAAAzMzMAAAAAABQAAAAUAAAAGQAAABkAAAAAAAAABcAAAAUAAAAAAAAAAAAAAD/fwAA/38AAAAAAAAJAAAABAAAAAAAAAAeAAAAaAAAAAAAAAAAAAAAAAAAAAAAAAAAAAAAECcAABAnAAAAAAAAAAAAAAAAAAAAAAAAAAAAAAAAAAAAAAAAAAAAABQAAAAAAAAAwMD/AAAAAABkAAAAMgAAAAAAAABkAAAAAAAAAH9/fwAKAAAAIgAAABgAAAAAAAAAAAAAAAAAAAAAAAAAAAAAAAAAAAAkAAAAJAAAAAAAAAAHAAAAAAAAAAAAAAAAAAAAAAAAAAAAAAAAAAAAf39/ACUAAABYAAAAAAAAAAAAAAAAAAAAAAAAAAAAAAAAAAAAAAAAAAAAAAAAAAAAAAAAAAAAAAA/AAAAAAAAAKCGAQAAAAAAAAAAAAAAAAAMAAAAAQAAAAAAAAAAAAAAAAAAAB8AAABUAAAAwMDAAP///wEAAAAAAAAAAAAAAAAAAAAAAAAAAAAAAAAAAAAAAAAAAAAAAAJ/f38AgICAA8zMzADAwP8Af39/AAAAAAAAAAAAAAAAAAAAAAAAAAAAIQAAABgAAAAUAAAAmx0AAOsLAACcLAAAPg0AAAAAAAAmAAAACAAAAP//////////"/>
+                <pr:smNativeData xmlns:pr="smNativeData" xmlns="smNativeData" val="SMDATA_15_NygcZBMAAAAlAAAAZAAAAA8BAAAAkAAAAEgAAACQAAAASAAAAAAAAAABAAAAAAAAAAEAAABQAAAAAAAAAAAA4D8AAAAAAADgPwAAAAAAAOA/AAAAAAAA4D8AAAAAAADgPwAAAAAAAOA/AAAAAAAA4D8AAAAAAADgPwAAAAAAAOA/AAAAAAAA4D8CAAAAjAAAAAEAAAAAAAAAwMDAAP///wgAAAAAAAAAAAAAAAAAAAAAAAAAAAAAAAAAAAAAZAAAAAEAAABAAAAAAAAAAAAAAAAAAAAAAAAAAAAAAAAAAAAAAAAAAAAAAAAAAAAAAAAAAAAAAAAAAAAAAAAAAAAAAAAAAAAAAAAAAAAAAAAAAAAAAAAAAAAAAAAAAAAAFAAAADwAAAABAAAAAAAAAAAAAAkUAAAAAQAAABQAAAAUAAAAFAAAAAEAAAAAAAAAZAAAAGQAAAAAAAAAZAAAAGQAAAAVAAAAYAAAAAAAAAAAAAAADwAAACADAAAAAAAAAAAAAAEAAACgMgAAVgcAAKr4//8BAAAAf39/AAEAAABkAAAAAAAAABQAAABAHwAAAAAAACYAAAAAAAAAwOD//wAAAAAmAAAAZAAAABYAAABMAAAAAAAAAAAAAAAEAAAAAAAAAAEAAACAgIAKAAAAACgAAAAoAAAAZAAAAGQAAAAAAAAAzMzMAAAAAABQAAAAUAAAAGQAAABkAAAAAAAAABcAAAAUAAAAAAAAAAAAAAD/fwAA/38AAAAAAAAJAAAABAAAAAAAAAAeAAAAaAAAAAAAAAAAAAAAAAAAAAAAAAAAAAAAECcAABAnAAAAAAAAAAAAAAAAAAAAAAAAAAAAAAAAAAAAAAAAAAAAABQAAAAAAAAAwMD/AAAAAABkAAAAMgAAAAAAAABkAAAAAAAAAH9/fwAKAAAAIgAAABgAAAAAAAAAAAAAAAAAAAAAAAAAAAAAAAAAAAAkAAAAJAAAAAAAAAAHAAAAAAAAAAAAAAAAAAAAAAAAAAAAAAAAAAAAf39/ACUAAABYAAAAAAAAAAAAAAAAAAAAAAAAAAAAAAAAAAAAAAAAAAAAAAAAAAAAAAAAAAAAAAA/AAAAAAAAAKCGAQAAAAAAAAAAAAAAAAAMAAAAAQAAAAAAAAAAAAAAAAAAAB8AAABUAAAAwMDAAP///wEAAAAAAAAAAAAAAAAAAAAAAAAAAAAAAAAAAAAAAAAAAAAAAAJ/f38AgICAA8zMzADAwP8Af39/AAAAAAAAAAAAAAAAAAAAAAAAAAAAIQAAABgAAAAUAAAAmx0AAOsLAACcLAAAPg0AAAAAAAAmAAAACAAAAP//////////"/>
               </a:ext>
             </a:extLst>
           </p:cNvSpPr>
@@ -5807,7 +5840,7 @@
           <p:cNvSpPr txBox="1">
             <a:extLst>
               <a:ext uri="smNativeData">
-                <pr:smNativeData xmlns:pr="smNativeData" xmlns="smNativeData" val="SMDATA_15_ucsbZBMAAAAlAAAAEgAAAA8BAAAAkAAAAEgAAACQAAAASAAAAAAAAAAAAAAAAAAAAAEAAABQAAAAAAAAAAAA4D8AAAAAAADgPwAAAAAAAOA/AAAAAAAA4D8AAAAAAADgPwAAAAAAAOA/AAAAAAAA4D8AAAAAAADgPwAAAAAAAOA/AAAAAAAA4D8CAAAAjAAAAAAAAAAAAAAAu+DjDP///wgAAAAAAAAAAAAAAAAAAAAAAAAAAAAAAAAAAAAAZAAAAAEAAABAAAAAAAAAAAAAAAAAAAAAAAAAAAAAAAAAAAAAAAAAAAAAAAAAAAAAAAAAAAAAAAAAAAAAAAAAAAAAAAAAAAAAAAAAAAAAAAAAAAAAAAAAAAAAAAAAAAAAFAAAADwAAAAAAAAAAAAAAAAAAAkUAAAAAQAAABQAAAAUAAAAFAAAAAEAAAAAAAAAZAAAAGQAAAAAAAAAZAAAAGQAAAAVAAAAYAAAAAAAAAAAAAAADwAAACADAAAAAAAAAAAAAAEAAACgMgAAVgcAAKr4//8BAAAAf39/AAEAAABkAAAAAAAAABQAAABAHwAAAAAAACYAAAAAAAAAwOD//wAAAAAmAAAAZAAAABYAAABMAAAAAAAAAAAAAAAEAAAAAAAAAAEAAACAgIAKAAAAACgAAAAoAAAAZAAAAGQAAAAAAAAAzMzMAAAAAABQAAAAUAAAAGQAAABkAAAAAAAAABcAAAAUAAAAAAAAANwIAAD/fwAA/38AAAAAAAAJAAAABAAAAAAAAAAeAAAAaAAAAAAAAAAAAAAAAAAAAAAAAAAAAAAAECcAABAnAAAAAAAAAAAAAAAAAAAAAAAAAAAAAAAAAAAAAAAAAAAAABQAAAAAAAAAwMD/AAAAAABkAAAAMgAAAAAAAABkAAAAAAAAAH9/fwAKAAAAIgAAABgAAAAAAAAAAAAAAAAAAAAAAAAAAAAAAAAAAAAkAAAAJAAAAAAAAAAHAAAAAAAAAAAAAAAAAAAAAAAAAAAAAAAAAAAAf39/ACUAAABYAAAAAAAAAAAAAAAAAAAAAAAAAAAAAAAAAAAAAAAAAAAAAAAAAAAAAAAAAAAAAAA/AAAAAAAAAKCGAQAAAAAAAAAAAAAAAAAMAAAAAQAAAAAAAAAAAAAAAAAAAB8AAABUAAAAu+DjBf///wEAAAAAAAAAAAAAAAAAAAAAAAAAAAAAAAAAAAAAAAAAAAAAAAJ/f38AgICAA8zMzADAwP8Af39/AAAAAAAAAAAAAAAAAAAAAAAAAAAAIQAAABgAAAAUAAAADS0AAEUJAAC0MwAAmAoAAAAAAAAmAAAACAAAAP//////////"/>
+                <pr:smNativeData xmlns:pr="smNativeData" xmlns="smNativeData" val="SMDATA_15_NygcZBMAAAAlAAAAEgAAAA8BAAAAkAAAAEgAAACQAAAASAAAAAAAAAAAAAAAAAAAAAEAAABQAAAAAAAAAAAA4D8AAAAAAADgPwAAAAAAAOA/AAAAAAAA4D8AAAAAAADgPwAAAAAAAOA/AAAAAAAA4D8AAAAAAADgPwAAAAAAAOA/AAAAAAAA4D8CAAAAjAAAAAAAAAAAAAAAu+DjDP///wgAAAAAAAAAAAAAAAAAAAAAAAAAAAAAAAAAAAAAZAAAAAEAAABAAAAAAAAAAAAAAAAAAAAAAAAAAAAAAAAAAAAAAAAAAAAAAAAAAAAAAAAAAAAAAAAAAAAAAAAAAAAAAAAAAAAAAAAAAAAAAAAAAAAAAAAAAAAAAAAAAAAAFAAAADwAAAAAAAAAAAAAAAAAAAkUAAAAAQAAABQAAAAUAAAAFAAAAAEAAAAAAAAAZAAAAGQAAAAAAAAAZAAAAGQAAAAVAAAAYAAAAAAAAAAAAAAADwAAACADAAAAAAAAAAAAAAEAAACgMgAAVgcAAKr4//8BAAAAf39/AAEAAABkAAAAAAAAABQAAABAHwAAAAAAACYAAAAAAAAAwOD//wAAAAAmAAAAZAAAABYAAABMAAAAAAAAAAAAAAAEAAAAAAAAAAEAAACAgIAKAAAAACgAAAAoAAAAZAAAAGQAAAAAAAAAzMzMAAAAAABQAAAAUAAAAGQAAABkAAAAAAAAABcAAAAUAAAAAAAAANwIAAD/fwAA/38AAAAAAAAJAAAABAAAAAAAAAAeAAAAaAAAAAAAAAAAAAAAAAAAAAAAAAAAAAAAECcAABAnAAAAAAAAAAAAAAAAAAAAAAAAAAAAAAAAAAAAAAAAAAAAABQAAAAAAAAAwMD/AAAAAABkAAAAMgAAAAAAAABkAAAAAAAAAH9/fwAKAAAAIgAAABgAAAAAAAAAAAAAAAAAAAAAAAAAAAAAAAAAAAAkAAAAJAAAAAAAAAAHAAAAAAAAAAAAAAAAAAAAAAAAAAAAAAAAAAAAf39/ACUAAABYAAAAAAAAAAAAAAAAAAAAAAAAAAAAAAAAAAAAAAAAAAAAAAAAAAAAAAAAAAAAAAA/AAAAAAAAAKCGAQAAAAAAAAAAAAAAAAAMAAAAAQAAAAAAAAAAAAAAAAAAAB8AAABUAAAAu+DjBf///wEAAAAAAAAAAAAAAAAAAAAAAAAAAAAAAAAAAAAAAAAAAAAAAAJ/f38AgICAA8zMzADAwP8Af39/AAAAAAAAAAAAAAAAAAAAAAAAAAAAIQAAABgAAAAUAAAADS0AAEUJAAC0MwAAmAoAAAAAAAAmAAAACAAAAP//////////"/>
               </a:ext>
             </a:extLst>
           </p:cNvSpPr>
@@ -5846,7 +5879,7 @@
           <p:cNvSpPr txBox="1">
             <a:extLst>
               <a:ext uri="smNativeData">
-                <pr:smNativeData xmlns:pr="smNativeData" xmlns="smNativeData" val="SMDATA_15_ucsbZBMAAAAlAAAAEgAAAA8BAAAAkAAAAEgAAACQAAAASAAAAAAAAAAAAAAAAAAAAAEAAABQAAAAAAAAAAAA4D8AAAAAAADgPwAAAAAAAOA/AAAAAAAA4D8AAAAAAADgPwAAAAAAAOA/AAAAAAAA4D8AAAAAAADgPwAAAAAAAOA/AAAAAAAA4D8CAAAAjAAAAAAAAAAAAAAAu+DjDP///wgAAAAAAAAAAAAAAAAAAAAAAAAAAAAAAAAAAAAAZAAAAAEAAABAAAAAAAAAAAAAAAAAAAAAAAAAAAAAAAAAAAAAAAAAAAAAAAAAAAAAAAAAAAAAAAAAAAAAAAAAAAAAAAAAAAAAAAAAAAAAAAAAAAAAAAAAAAAAAAAAAAAAFAAAADwAAAAAAAAAAAAAAAAAAAkUAAAAAQAAABQAAAAUAAAAFAAAAAEAAAAAAAAAZAAAAGQAAAAAAAAAZAAAAGQAAAAVAAAAYAAAAAAAAAAAAAAADwAAACADAAAAAAAAAAAAAAEAAACgMgAAVgcAAKr4//8BAAAAf39/AAEAAABkAAAAAAAAABQAAABAHwAAAAAAACYAAAAAAAAAwOD//wAAAAAmAAAAZAAAABYAAABMAAAAAAAAAAAAAAAEAAAAAAAAAAEAAACAgIAKAAAAACgAAAAoAAAAZAAAAGQAAAAAAAAAzMzMAAAAAABQAAAAUAAAAGQAAABkAAAAAAAAABcAAAAUAAAAAAAAANwIAAD/fwAA/38AAAAAAAAJAAAABAAAAAAAAAAeAAAAaAAAAAAAAAAAAAAAAAAAAAAAAAAAAAAAECcAABAnAAAAAAAAAAAAAAAAAAAAAAAAAAAAAAAAAAAAAAAAAAAAABQAAAAAAAAAwMD/AAAAAABkAAAAMgAAAAAAAABkAAAAAAAAAH9/fwAKAAAAIgAAABgAAAAAAAAAAAAAAAAAAAAAAAAAAAAAAAAAAAAkAAAAJAAAAAAAAAAHAAAAAAAAAAAAAAAAAAAAAAAAAAAAAAAAAAAAf39/ACUAAABYAAAAAAAAAAAAAAAAAAAAAAAAAAAAAAAAAAAAAAAAAAAAAAAAAAAAAAAAAAAAAAA/AAAAAAAAAKCGAQAAAAAAAAAAAAAAAAAMAAAAAQAAAAAAAAAAAAAAAAAAAB8AAABUAAAAu+DjBf///wEAAAAAAAAAAAAAAAAAAAAAAAAAAAAAAAAAAAAAAAAAAAAAAAJ/f38AgICAA8zMzADAwP8Af39/AAAAAAAAAAAAAAAAAAAAAAAAAAAAIQAAABgAAAAUAAAADS0AAJgKAAC0MwAA6wsAAAAAAAAmAAAACAAAAP//////////"/>
+                <pr:smNativeData xmlns:pr="smNativeData" xmlns="smNativeData" val="SMDATA_15_NygcZBMAAAAlAAAAEgAAAA8BAAAAkAAAAEgAAACQAAAASAAAAAAAAAAAAAAAAAAAAAEAAABQAAAAAAAAAAAA4D8AAAAAAADgPwAAAAAAAOA/AAAAAAAA4D8AAAAAAADgPwAAAAAAAOA/AAAAAAAA4D8AAAAAAADgPwAAAAAAAOA/AAAAAAAA4D8CAAAAjAAAAAAAAAAAAAAAu+DjDP///wgAAAAAAAAAAAAAAAAAAAAAAAAAAAAAAAAAAAAAZAAAAAEAAABAAAAAAAAAAAAAAAAAAAAAAAAAAAAAAAAAAAAAAAAAAAAAAAAAAAAAAAAAAAAAAAAAAAAAAAAAAAAAAAAAAAAAAAAAAAAAAAAAAAAAAAAAAAAAAAAAAAAAFAAAADwAAAAAAAAAAAAAAAAAAAkUAAAAAQAAABQAAAAUAAAAFAAAAAEAAAAAAAAAZAAAAGQAAAAAAAAAZAAAAGQAAAAVAAAAYAAAAAAAAAAAAAAADwAAACADAAAAAAAAAAAAAAEAAACgMgAAVgcAAKr4//8BAAAAf39/AAEAAABkAAAAAAAAABQAAABAHwAAAAAAACYAAAAAAAAAwOD//wAAAAAmAAAAZAAAABYAAABMAAAAAAAAAAAAAAAEAAAAAAAAAAEAAACAgIAKAAAAACgAAAAoAAAAZAAAAGQAAAAAAAAAzMzMAAAAAABQAAAAUAAAAGQAAABkAAAAAAAAABcAAAAUAAAAAAAAANwIAAD/fwAA/38AAAAAAAAJAAAABAAAAAAAAAAeAAAAaAAAAAAAAAAAAAAAAAAAAAAAAAAAAAAAECcAABAnAAAAAAAAAAAAAAAAAAAAAAAAAAAAAAAAAAAAAAAAAAAAABQAAAAAAAAAwMD/AAAAAABkAAAAMgAAAAAAAABkAAAAAAAAAH9/fwAKAAAAIgAAABgAAAAAAAAAAAAAAAAAAAAAAAAAAAAAAAAAAAAkAAAAJAAAAAAAAAAHAAAAAAAAAAAAAAAAAAAAAAAAAAAAAAAAAAAAf39/ACUAAABYAAAAAAAAAAAAAAAAAAAAAAAAAAAAAAAAAAAAAAAAAAAAAAAAAAAAAAAAAAAAAAA/AAAAAAAAAKCGAQAAAAAAAAAAAAAAAAAMAAAAAQAAAAAAAAAAAAAAAAAAAB8AAABUAAAAu+DjBf///wEAAAAAAAAAAAAAAAAAAAAAAAAAAAAAAAAAAAAAAAAAAAAAAAJ/f38AgICAA8zMzADAwP8Af39/AAAAAAAAAAAAAAAAAAAAAAAAAAAAIQAAABgAAAAUAAAADS0AAJgKAAC0MwAA6wsAAAAAAAAmAAAACAAAAP//////////"/>
               </a:ext>
             </a:extLst>
           </p:cNvSpPr>
@@ -5885,7 +5918,7 @@
           <p:cNvSpPr txBox="1">
             <a:extLst>
               <a:ext uri="smNativeData">
-                <pr:smNativeData xmlns:pr="smNativeData" xmlns="smNativeData" val="SMDATA_15_ucsbZBMAAAAlAAAAEgAAAA8BAAAAkAAAAEgAAACQAAAASAAAAAAAAAAAAAAAAAAAAAEAAABQAAAAAAAAAAAA4D8AAAAAAADgPwAAAAAAAOA/AAAAAAAA4D8AAAAAAADgPwAAAAAAAOA/AAAAAAAA4D8AAAAAAADgPwAAAAAAAOA/AAAAAAAA4D8CAAAAjAAAAAAAAAAAAAAAu+DjDP///wgAAAAAAAAAAAAAAAAAAAAAAAAAAAAAAAAAAAAAZAAAAAEAAABAAAAAAAAAAAAAAAAAAAAAAAAAAAAAAAAAAAAAAAAAAAAAAAAAAAAAAAAAAAAAAAAAAAAAAAAAAAAAAAAAAAAAAAAAAAAAAAAAAAAAAAAAAAAAAAAAAAAAFAAAADwAAAAAAAAAAAAAAAAAAAkUAAAAAQAAABQAAAAUAAAAFAAAAAEAAAAAAAAAZAAAAGQAAAAAAAAAZAAAAGQAAAAVAAAAYAAAAAAAAAAAAAAADwAAACADAAAAAAAAAAAAAAEAAACgMgAAVgcAAKr4//8BAAAAf39/AAEAAABkAAAAAAAAABQAAABAHwAAAAAAACYAAAAAAAAAwOD//wAAAAAmAAAAZAAAABYAAABMAAAAAAAAAAAAAAAEAAAAAAAAAAEAAACAgIAKAAAAACgAAAAoAAAAZAAAAGQAAAAAAAAAzMzMAAAAAABQAAAAUAAAAGQAAABkAAAAAAAAABcAAAAUAAAAAAAAANwIAAD/fwAA/38AAAAAAAAJAAAABAAAAAAAAAAeAAAAaAAAAAAAAAAAAAAAAAAAAAAAAAAAAAAAECcAABAnAAAAAAAAAAAAAAAAAAAAAAAAAAAAAAAAAAAAAAAAAAAAABQAAAAAAAAAwMD/AAAAAABkAAAAMgAAAAAAAABkAAAAAAAAAH9/fwAKAAAAIgAAABgAAAAAAAAAAAAAAAAAAAAAAAAAAAAAAAAAAAAkAAAAJAAAAAAAAAAHAAAAAAAAAAAAAAAAAAAAAAAAAAAAAAAAAAAAf39/ACUAAABYAAAAAAAAAAAAAAAAAAAAAAAAAAAAAAAAAAAAAAAAAAAAAAAAAAAAAAAAAAAAAAA/AAAAAAAAAKCGAQAAAAAAAAAAAAAAAAAMAAAAAQAAAAAAAAAAAAAAAAAAAB8AAABUAAAAu+DjBf///wEAAAAAAAAAAAAAAAAAAAAAAAAAAAAAAAAAAAAAAAAAAAAAAAJ/f38AgICAA8zMzADAwP8Af39/AAAAAAAAAAAAAAAAAAAAAAAAAAAAIQAAABgAAAAUAAAADS0AAOsLAAC0MwAAPg0AAAAAAAAmAAAACAAAAP//////////"/>
+                <pr:smNativeData xmlns:pr="smNativeData" xmlns="smNativeData" val="SMDATA_15_NygcZBMAAAAlAAAAEgAAAA8BAAAAkAAAAEgAAACQAAAASAAAAAAAAAAAAAAAAAAAAAEAAABQAAAAAAAAAAAA4D8AAAAAAADgPwAAAAAAAOA/AAAAAAAA4D8AAAAAAADgPwAAAAAAAOA/AAAAAAAA4D8AAAAAAADgPwAAAAAAAOA/AAAAAAAA4D8CAAAAjAAAAAAAAAAAAAAAu+DjDP///wgAAAAAAAAAAAAAAAAAAAAAAAAAAAAAAAAAAAAAZAAAAAEAAABAAAAAAAAAAAAAAAAAAAAAAAAAAAAAAAAAAAAAAAAAAAAAAAAAAAAAAAAAAAAAAAAAAAAAAAAAAAAAAAAAAAAAAAAAAAAAAAAAAAAAAAAAAAAAAAAAAAAAFAAAADwAAAAAAAAAAAAAAAAAAAkUAAAAAQAAABQAAAAUAAAAFAAAAAEAAAAAAAAAZAAAAGQAAAAAAAAAZAAAAGQAAAAVAAAAYAAAAAAAAAAAAAAADwAAACADAAAAAAAAAAAAAAEAAACgMgAAVgcAAKr4//8BAAAAf39/AAEAAABkAAAAAAAAABQAAABAHwAAAAAAACYAAAAAAAAAwOD//wAAAAAmAAAAZAAAABYAAABMAAAAAAAAAAAAAAAEAAAAAAAAAAEAAACAgIAKAAAAACgAAAAoAAAAZAAAAGQAAAAAAAAAzMzMAAAAAABQAAAAUAAAAGQAAABkAAAAAAAAABcAAAAUAAAAAAAAANwIAAD/fwAA/38AAAAAAAAJAAAABAAAAAAAAAAeAAAAaAAAAAAAAAAAAAAAAAAAAAAAAAAAAAAAECcAABAnAAAAAAAAAAAAAAAAAAAAAAAAAAAAAAAAAAAAAAAAAAAAABQAAAAAAAAAwMD/AAAAAABkAAAAMgAAAAAAAABkAAAAAAAAAH9/fwAKAAAAIgAAABgAAAAAAAAAAAAAAAAAAAAAAAAAAAAAAAAAAAAkAAAAJAAAAAAAAAAHAAAAAAAAAAAAAAAAAAAAAAAAAAAAAAAAAAAAf39/ACUAAABYAAAAAAAAAAAAAAAAAAAAAAAAAAAAAAAAAAAAAAAAAAAAAAAAAAAAAAAAAAAAAAA/AAAAAAAAAKCGAQAAAAAAAAAAAAAAAAAMAAAAAQAAAAAAAAAAAAAAAAAAAB8AAABUAAAAu+DjBf///wEAAAAAAAAAAAAAAAAAAAAAAAAAAAAAAAAAAAAAAAAAAAAAAAJ/f38AgICAA8zMzADAwP8Af39/AAAAAAAAAAAAAAAAAAAAAAAAAAAAIQAAABgAAAAUAAAADS0AAOsLAAC0MwAAPg0AAAAAAAAmAAAACAAAAP//////////"/>
               </a:ext>
             </a:extLst>
           </p:cNvSpPr>
@@ -5924,7 +5957,7 @@
           <p:cNvSpPr>
             <a:extLst>
               <a:ext uri="smNativeData">
-                <pr:smNativeData xmlns:pr="smNativeData" xmlns="smNativeData" val="SMDATA_15_ucsbZBMAAAAlAAAAZAAAAA8BAAAAkAAAAEgAAACQAAAASAAAAAAAAAABAAAAAAAAAAEAAABQAAAAAAAAAAAA4D8AAAAAAADgPwAAAAAAAOA/AAAAAAAA4D8AAAAAAADgPwAAAAAAAOA/AAAAAAAA4D8AAAAAAADgPwAAAAAAAOA/AAAAAAAA4D8CAAAAjAAAAAEAAAAAAAAAwMDAAP///wgAAAAAAAAAAAAAAAAAAAAAAAAAAAAAAAAAAAAAZAAAAAEAAABAAAAAAAAAAAAAAAAAAAAAAAAAAAAAAAAAAAAAAAAAAAAAAAAAAAAAAAAAAAAAAAAAAAAAAAAAAAAAAAAAAAAAAAAAAAAAAAAAAAAAAAAAAAAAAAAAAAAAFAAAADwAAAABAAAAAAAAAAAAAAkUAAAAAQAAABQAAAAUAAAAFAAAAAEAAAAAAAAAZAAAAGQAAAAAAAAAZAAAAGQAAAAVAAAAYAAAAAAAAAAAAAAADwAAACADAAAAAAAAAAAAAAEAAACgMgAAVgcAAKr4//8BAAAAf39/AAEAAABkAAAAAAAAABQAAABAHwAAAAAAACYAAAAAAAAAwOD//wAAAAAmAAAAZAAAABYAAABMAAAAAAAAAAAAAAAEAAAAAAAAAAEAAACAgIAKAAAAACgAAAAoAAAAZAAAAGQAAAAAAAAAzMzMAAAAAABQAAAAUAAAAGQAAABkAAAAAAAAABcAAAAUAAAAAAAAAAAAAAD/fwAA/38AAAAAAAAJAAAABAAAAAAAAAAeAAAAaAAAAAAAAAAAAAAAAAAAAAAAAAAAAAAAECcAABAnAAAAAAAAAAAAAAAAAAAAAAAAAAAAAAAAAAAAAAAAAAAAABQAAAAAAAAAwMD/AAAAAABkAAAAMgAAAAAAAABkAAAAAAAAAH9/fwAKAAAAIgAAABgAAAAAAAAAAAAAAAAAAAAAAAAAAAAAAAAAAAAkAAAAJAAAAAAAAAAHAAAAAAAAAAAAAAAAAAAAAAAAAAAAAAAAAAAAf39/ACUAAABYAAAAAAAAAAAAAAAAAAAAAAAAAAAAAAAAAAAAAAAAAAAAAAAAAAAAAAAAAAAAAAA/AAAAAAAAAKCGAQAAAAAAAAAAAAAAAAAMAAAAAQAAAAAAAAAAAAAAAAAAAB8AAABUAAAAwMDAAP///wEAAAAAAAAAAAAAAAAAAAAAAAAAAAAAAAAAAAAAAAAAAAAAAAJ/f38AgICAA8zMzADAwP8Af39/AAAAAAAAAAAAAAAAAAAAAAAAAAAAIQAAABgAAAAUAAAAnB0AAD4NAACdLAAAkQ4AAAAAAAAmAAAACAAAAP//////////"/>
+                <pr:smNativeData xmlns:pr="smNativeData" xmlns="smNativeData" val="SMDATA_15_NygcZBMAAAAlAAAAZAAAAA8BAAAAkAAAAEgAAACQAAAASAAAAAAAAAABAAAAAAAAAAEAAABQAAAAAAAAAAAA4D8AAAAAAADgPwAAAAAAAOA/AAAAAAAA4D8AAAAAAADgPwAAAAAAAOA/AAAAAAAA4D8AAAAAAADgPwAAAAAAAOA/AAAAAAAA4D8CAAAAjAAAAAEAAAAAAAAAwMDAAP///wgAAAAAAAAAAAAAAAAAAAAAAAAAAAAAAAAAAAAAZAAAAAEAAABAAAAAAAAAAAAAAAAAAAAAAAAAAAAAAAAAAAAAAAAAAAAAAAAAAAAAAAAAAAAAAAAAAAAAAAAAAAAAAAAAAAAAAAAAAAAAAAAAAAAAAAAAAAAAAAAAAAAAFAAAADwAAAABAAAAAAAAAAAAAAkUAAAAAQAAABQAAAAUAAAAFAAAAAEAAAAAAAAAZAAAAGQAAAAAAAAAZAAAAGQAAAAVAAAAYAAAAAAAAAAAAAAADwAAACADAAAAAAAAAAAAAAEAAACgMgAAVgcAAKr4//8BAAAAf39/AAEAAABkAAAAAAAAABQAAABAHwAAAAAAACYAAAAAAAAAwOD//wAAAAAmAAAAZAAAABYAAABMAAAAAAAAAAAAAAAEAAAAAAAAAAEAAACAgIAKAAAAACgAAAAoAAAAZAAAAGQAAAAAAAAAzMzMAAAAAABQAAAAUAAAAGQAAABkAAAAAAAAABcAAAAUAAAAAAAAAAAAAAD/fwAA/38AAAAAAAAJAAAABAAAAAAAAAAeAAAAaAAAAAAAAAAAAAAAAAAAAAAAAAAAAAAAECcAABAnAAAAAAAAAAAAAAAAAAAAAAAAAAAAAAAAAAAAAAAAAAAAABQAAAAAAAAAwMD/AAAAAABkAAAAMgAAAAAAAABkAAAAAAAAAH9/fwAKAAAAIgAAABgAAAAAAAAAAAAAAAAAAAAAAAAAAAAAAAAAAAAkAAAAJAAAAAAAAAAHAAAAAAAAAAAAAAAAAAAAAAAAAAAAAAAAAAAAf39/ACUAAABYAAAAAAAAAAAAAAAAAAAAAAAAAAAAAAAAAAAAAAAAAAAAAAAAAAAAAAAAAAAAAAA/AAAAAAAAAKCGAQAAAAAAAAAAAAAAAAAMAAAAAQAAAAAAAAAAAAAAAAAAAB8AAABUAAAAwMDAAP///wEAAAAAAAAAAAAAAAAAAAAAAAAAAAAAAAAAAAAAAAAAAAAAAAJ/f38AgICAA8zMzADAwP8Af39/AAAAAAAAAAAAAAAAAAAAAAAAAAAAIQAAABgAAAAUAAAAnB0AAD4NAACdLAAAkQ4AAAAAAAAmAAAACAAAAP//////////"/>
               </a:ext>
             </a:extLst>
           </p:cNvSpPr>
@@ -5970,7 +6003,7 @@
           <p:cNvSpPr txBox="1">
             <a:extLst>
               <a:ext uri="smNativeData">
-                <pr:smNativeData xmlns:pr="smNativeData" xmlns="smNativeData" val="SMDATA_15_ucsbZBMAAAAlAAAAEgAAAA8BAAAAkAAAAEgAAACQAAAASAAAAAAAAAAAAAAAAAAAAAEAAABQAAAAAAAAAAAA4D8AAAAAAADgPwAAAAAAAOA/AAAAAAAA4D8AAAAAAADgPwAAAAAAAOA/AAAAAAAA4D8AAAAAAADgPwAAAAAAAOA/AAAAAAAA4D8CAAAAjAAAAAAAAAAAAAAAu+DjDP///wgAAAAAAAAAAAAAAAAAAAAAAAAAAAAAAAAAAAAAZAAAAAEAAABAAAAAAAAAAAAAAAAAAAAAAAAAAAAAAAAAAAAAAAAAAAAAAAAAAAAAAAAAAAAAAAAAAAAAAAAAAAAAAAAAAAAAAAAAAAAAAAAAAAAAAAAAAAAAAAAAAAAAFAAAADwAAAAAAAAAAAAAAAAAAAkUAAAAAQAAABQAAAAUAAAAFAAAAAEAAAAAAAAAZAAAAGQAAAAAAAAAZAAAAGQAAAAVAAAAYAAAAAAAAAAAAAAADwAAACADAAAAAAAAAAAAAAEAAACgMgAAVgcAAKr4//8BAAAAf39/AAEAAABkAAAAAAAAABQAAABAHwAAAAAAACYAAAAAAAAAwOD//wAAAAAmAAAAZAAAABYAAABMAAAAAAAAAAAAAAAEAAAAAAAAAAEAAACAgIAKAAAAACgAAAAoAAAAZAAAAGQAAAAAAAAAzMzMAAAAAABQAAAAUAAAAGQAAABkAAAAAAAAABcAAAAUAAAAAAAAANwIAAD/fwAA/38AAAAAAAAJAAAABAAAAAAAAAAeAAAAaAAAAAAAAAAAAAAAAAAAAAAAAAAAAAAAECcAABAnAAAAAAAAAAAAAAAAAAAAAAAAAAAAAAAAAAAAAAAAAAAAABQAAAAAAAAAwMD/AAAAAABkAAAAMgAAAAAAAABkAAAAAAAAAH9/fwAKAAAAIgAAABgAAAAAAAAAAAAAAAAAAAAAAAAAAAAAAAAAAAAkAAAAJAAAAAAAAAAHAAAAAAAAAAAAAAAAAAAAAAAAAAAAAAAAAAAAf39/ACUAAABYAAAAAAAAAAAAAAAAAAAAAAAAAAAAAAAAAAAAAAAAAAAAAAAAAAAAAAAAAAAAAAA/AAAAAAAAAKCGAQAAAAAAAAAAAAAAAAAMAAAAAQAAAAAAAAAAAAAAAAAAAB8AAABUAAAAu+DjBf///wEAAAAAAAAAAAAAAAAAAAAAAAAAAAAAAAAAAAAAAAAAAAAAAAJ/f38AgICAA8zMzADAwP8Af39/AAAAAAAAAAAAAAAAAAAAAAAAAAAAIQAAABgAAAAUAAAABi0AAD4NAACtMwAAkQ4AAAAAAAAmAAAACAAAAP//////////"/>
+                <pr:smNativeData xmlns:pr="smNativeData" xmlns="smNativeData" val="SMDATA_15_NygcZBMAAAAlAAAAEgAAAA8BAAAAkAAAAEgAAACQAAAASAAAAAAAAAAAAAAAAAAAAAEAAABQAAAAAAAAAAAA4D8AAAAAAADgPwAAAAAAAOA/AAAAAAAA4D8AAAAAAADgPwAAAAAAAOA/AAAAAAAA4D8AAAAAAADgPwAAAAAAAOA/AAAAAAAA4D8CAAAAjAAAAAAAAAAAAAAAu+DjDP///wgAAAAAAAAAAAAAAAAAAAAAAAAAAAAAAAAAAAAAZAAAAAEAAABAAAAAAAAAAAAAAAAAAAAAAAAAAAAAAAAAAAAAAAAAAAAAAAAAAAAAAAAAAAAAAAAAAAAAAAAAAAAAAAAAAAAAAAAAAAAAAAAAAAAAAAAAAAAAAAAAAAAAFAAAADwAAAAAAAAAAAAAAAAAAAkUAAAAAQAAABQAAAAUAAAAFAAAAAEAAAAAAAAAZAAAAGQAAAAAAAAAZAAAAGQAAAAVAAAAYAAAAAAAAAAAAAAADwAAACADAAAAAAAAAAAAAAEAAACgMgAAVgcAAKr4//8BAAAAf39/AAEAAABkAAAAAAAAABQAAABAHwAAAAAAACYAAAAAAAAAwOD//wAAAAAmAAAAZAAAABYAAABMAAAAAAAAAAAAAAAEAAAAAAAAAAEAAACAgIAKAAAAACgAAAAoAAAAZAAAAGQAAAAAAAAAzMzMAAAAAABQAAAAUAAAAGQAAABkAAAAAAAAABcAAAAUAAAAAAAAANwIAAD/fwAA/38AAAAAAAAJAAAABAAAAAAAAAAeAAAAaAAAAAAAAAAAAAAAAAAAAAAAAAAAAAAAECcAABAnAAAAAAAAAAAAAAAAAAAAAAAAAAAAAAAAAAAAAAAAAAAAABQAAAAAAAAAwMD/AAAAAABkAAAAMgAAAAAAAABkAAAAAAAAAH9/fwAKAAAAIgAAABgAAAAAAAAAAAAAAAAAAAAAAAAAAAAAAAAAAAAkAAAAJAAAAAAAAAAHAAAAAAAAAAAAAAAAAAAAAAAAAAAAAAAAAAAAf39/ACUAAABYAAAAAAAAAAAAAAAAAAAAAAAAAAAAAAAAAAAAAAAAAAAAAAAAAAAAAAAAAAAAAAA/AAAAAAAAAKCGAQAAAAAAAAAAAAAAAAAMAAAAAQAAAAAAAAAAAAAAAAAAAB8AAABUAAAAu+DjBf///wEAAAAAAAAAAAAAAAAAAAAAAAAAAAAAAAAAAAAAAAAAAAAAAAJ/f38AgICAA8zMzADAwP8Af39/AAAAAAAAAAAAAAAAAAAAAAAAAAAAIQAAABgAAAAUAAAABi0AAD4NAACtMwAAkQ4AAAAAAAAmAAAACAAAAP//////////"/>
               </a:ext>
             </a:extLst>
           </p:cNvSpPr>
@@ -6009,7 +6042,7 @@
           <p:cNvCxnSpPr>
             <a:extLst>
               <a:ext uri="smNativeData">
-                <pr:smNativeData xmlns:pr="smNativeData" xmlns="smNativeData" val="SMDATA_15_ucsbZBMAAAAlAAAADQAAAA8BAAAAkAAAAEgAAACQAAAASAAAAAAAAAAAAAAAAAAAAAEAAABQAAAAAAAAAAAA4D8AAAAAAADgPwAAAAAAAOA/AAAAAAAA4D8AAAAAAADgPwAAAAAAAOA/AAAAAAAA4D8AAAAAAADgPwAAAAAAAOA/AAAAAAAA4D8CAAAAjAAAAAAAAAAAAAAAu+DjDP///wgAAAAAAAAAAAAAAAAAAAAAAAAAAAAAAAAAAAAAZAAAAAEAAABAAAAAAAAAAAAAAAAAAAAAAAAAAAAAAAAAAAAAAAAAAAAAAAAAAAAAAAAAAAAAAAAAAAAAAAAAAAAAAAAAAAAAAAAAAAAAAAAAAAAAAAAAAAAAAAAAAAAAFAAAADwAAAABAAAAAAAAAAAAAAkUAAAAAQAAABQAAAAUAAAAFAAAAAEAAAAAAAAAZAAAAGQAAAABAAAAlgAAAJYAAAAVAAAAYAAAAAAAAAAAAAAADwAAACADAAAAAAAAAAAAAAEAAACgMgAAVgcAAKr4//8BAAAAf39/AAEAAABkAAAAAAAAABQAAABAHwAAAAAAACYAAAAAAAAAwOD//wAAAAAmAAAAZAAAABYAAABMAAAAAAAAAAAAAAAEAAAAAAAAAAEAAACAgIAKAAAAACgAAAAoAAAAZAAAAGQAAAAAAAAAzMzMAAAAAABQAAAAUAAAAGQAAABkAAAAAAAAABcAAAAUAAAAAAAAAAAAAAD/fwAA/38AAAAAAAAJAAAABAAAAAAAAAAeAAAAaAAAAAAAAAAAAAAAAAAAAAAAAAAAAAAAECcAABAnAAAAAAAAAAAAAAAAAAAAAAAAAAAAAAAAAAAAAAAAAAAAABQAAAAAAAAAwMD/AAAAAABkAAAAMgAAAAAAAABkAAAAAAAAAH9/fwAKAAAAIgAAABgAAAAAAAAAAAAAAAAAAAAAAAAAAAAAAAAAAAAkAAAAJAAAAAAAAAAHAAAAAAAAAAAAAAAAAAAAAAAAAAAAAAAAAAAAf39/ACUAAABYAAAAAAAAAAAAAAAAAAAAAAAAAAAAAAAAAAAAAAAAAAAAAAAAAAAAAAAAAAAAAAA/AAAAAAAAAKCGAQAAAAAAAAAAAAAAAAAMAAAAAQAAAAAAAAAAAAAAAAAAAB8AAABUAAAAu+DjBf///wEAAAAAAAAAAAAAAAAAAAAAAAAAAAAAAAAAAAAAAAAAAAAAAAJ/f38AgICAA8zMzADAwP8Af39/AAAAAAAAAAAAAAAAAAAAAAAAAAAAIQAAABgAAAAUAAAArjMAAOgNAAByNQAA6A0AAAAAAAAmAAAACAAAAP//////////"/>
+                <pr:smNativeData xmlns:pr="smNativeData" xmlns="smNativeData" val="SMDATA_15_NygcZBMAAAAlAAAADQAAAA8BAAAAkAAAAEgAAACQAAAASAAAAAAAAAAAAAAAAAAAAAEAAABQAAAAAAAAAAAA4D8AAAAAAADgPwAAAAAAAOA/AAAAAAAA4D8AAAAAAADgPwAAAAAAAOA/AAAAAAAA4D8AAAAAAADgPwAAAAAAAOA/AAAAAAAA4D8CAAAAjAAAAAAAAAAAAAAAu+DjDP///wgAAAAAAAAAAAAAAAAAAAAAAAAAAAAAAAAAAAAAZAAAAAEAAABAAAAAAAAAAAAAAAAAAAAAAAAAAAAAAAAAAAAAAAAAAAAAAAAAAAAAAAAAAAAAAAAAAAAAAAAAAAAAAAAAAAAAAAAAAAAAAAAAAAAAAAAAAAAAAAAAAAAAFAAAADwAAAABAAAAAAAAAAAAAAkUAAAAAQAAABQAAAAUAAAAFAAAAAEAAAAAAAAAZAAAAGQAAAABAAAAlgAAAJYAAAAVAAAAYAAAAAAAAAAAAAAADwAAACADAAAAAAAAAAAAAAEAAACgMgAAVgcAAKr4//8BAAAAf39/AAEAAABkAAAAAAAAABQAAABAHwAAAAAAACYAAAAAAAAAwOD//wAAAAAmAAAAZAAAABYAAABMAAAAAAAAAAAAAAAEAAAAAAAAAAEAAACAgIAKAAAAACgAAAAoAAAAZAAAAGQAAAAAAAAAzMzMAAAAAABQAAAAUAAAAGQAAABkAAAAAAAAABcAAAAUAAAAAAAAAAAAAAD/fwAA/38AAAAAAAAJAAAABAAAAAAAAAAeAAAAaAAAAAAAAAAAAAAAAAAAAAAAAAAAAAAAECcAABAnAAAAAAAAAAAAAAAAAAAAAAAAAAAAAAAAAAAAAAAAAAAAABQAAAAAAAAAwMD/AAAAAABkAAAAMgAAAAAAAABkAAAAAAAAAH9/fwAKAAAAIgAAABgAAAAAAAAAAAAAAAAAAAAAAAAAAAAAAAAAAAAkAAAAJAAAAAAAAAAHAAAAAAAAAAAAAAAAAAAAAAAAAAAAAAAAAAAAf39/ACUAAABYAAAAAAAAAAAAAAAAAAAAAAAAAAAAAAAAAAAAAAAAAAAAAAAAAAAAAAAAAAAAAAA/AAAAAAAAAKCGAQAAAAAAAAAAAAAAAAAMAAAAAQAAAAAAAAAAAAAAAAAAAB8AAABUAAAAu+DjBf///wEAAAAAAAAAAAAAAAAAAAAAAAAAAAAAAAAAAAAAAAAAAAAAAAJ/f38AgICAA8zMzADAwP8Af39/AAAAAAAAAAAAAAAAAAAAAAAAAAAAIQAAABgAAAAUAAAArjMAAOgNAAByNQAA6A0AAAAAAAAmAAAACAAAAP//////////"/>
               </a:ext>
             </a:extLst>
           </p:cNvCxnSpPr>
@@ -6041,7 +6074,7 @@
           <p:cNvSpPr>
             <a:extLst>
               <a:ext uri="smNativeData">
-                <pr:smNativeData xmlns:pr="smNativeData" xmlns="smNativeData" val="SMDATA_15_ucsbZBMAAAAlAAAAZAAAAA8BAAAAkAAAAEgAAACQAAAASAAAAAAAAAABAAAAAAAAAAEAAABQAAAAAAAAAAAA4D8AAAAAAADgPwAAAAAAAOA/AAAAAAAA4D8AAAAAAADgPwAAAAAAAOA/AAAAAAAA4D8AAAAAAADgPwAAAAAAAOA/AAAAAAAA4D8CAAAAjAAAAAEAAAAAAAAAAJmZDv///wgAAAAAAAAAAAAAAAAAAAAAAAAAAAAAAAAAAAAAZAAAAAEAAABAAAAAAAAAAAAAAAAAAAAAAAAAAAAAAAAAAAAAAAAAAAAAAAAAAAAAAAAAAAAAAAAAAAAAAAAAAAAAAAAAAAAAAAAAAAAAAAAAAAAAAAAAAAAAAAAAAAAAFAAAADwAAAABAAAAAAAAAAAAAAkUAAAAAQAAABQAAAAUAAAAFAAAAAEAAAAAAAAAZAAAAGQAAAAAAAAAZAAAAGQAAAAVAAAAYAAAAAAAAAAAAAAADwAAACADAAAAAAAAAAAAAAEAAACgMgAAVgcAAKr4//8BAAAAf39/AAEAAABkAAAAAAAAABQAAABAHwAAAAAAACYAAAAAAAAAwOD//wAAAAAmAAAAZAAAABYAAABMAAAAAAAAAAAAAAAEAAAAAAAAAAEAAACAgIAKAAAAACgAAAAoAAAAZAAAAGQAAAAAAAAAzMzMAAAAAABQAAAAUAAAAGQAAABkAAAAAAAAABcAAAAUAAAAAAAAAAAAAAD/fwAA/38AAAAAAAAJAAAABAAAAAAAAAAeAAAAaAAAAAAAAAAAAAAAAAAAAAAAAAAAAAAAECcAABAnAAAAAAAAAAAAAAAAAAAAAAAAAAAAAAAAAAAAAAAAAAAAABQAAAAAAAAAwMD/AAAAAABkAAAAMgAAAAAAAABkAAAAAAAAAH9/fwAKAAAAIgAAABgAAAAAAAAAAAAAAAAAAAAAAAAAAAAAAAAAAAAkAAAAJAAAAAAAAAAHAAAAAAAAAAAAAAAAAAAAAAAAAAAAAAAAAAAAf39/ACUAAABYAAAAAAAAAAAAAAAAAAAAAAAAAAAAAAAAAAAAAAAAAAAAAAAAAAAAAAAAAAAAAAA/AAAAAAAAAKCGAQAAAAAAAAAAAAAAAAAMAAAAAQAAAAAAAAAAAAAAAAAAAB8AAABUAAAAAJmZB////wEAAAAAAAAAAAAAAAAAAAAAAAAAAAAAAAAAAAAAAAAAAAAAAAJ/f38AgICAA8zMzADAwP8Af39/AAAAAAAAAAAAAAAAAAAAAAAAAAAAIQAAABgAAAAUAAAAcjUAAD4NAABzRAAAkQ4AAAAAAAAmAAAACAAAAP//////////"/>
+                <pr:smNativeData xmlns:pr="smNativeData" xmlns="smNativeData" val="SMDATA_15_NygcZBMAAAAlAAAAZAAAAA8BAAAAkAAAAEgAAACQAAAASAAAAAAAAAABAAAAAAAAAAEAAABQAAAAAAAAAAAA4D8AAAAAAADgPwAAAAAAAOA/AAAAAAAA4D8AAAAAAADgPwAAAAAAAOA/AAAAAAAA4D8AAAAAAADgPwAAAAAAAOA/AAAAAAAA4D8CAAAAjAAAAAEAAAAAAAAAAJmZDv///wgAAAAAAAAAAAAAAAAAAAAAAAAAAAAAAAAAAAAAZAAAAAEAAABAAAAAAAAAAAAAAAAAAAAAAAAAAAAAAAAAAAAAAAAAAAAAAAAAAAAAAAAAAAAAAAAAAAAAAAAAAAAAAAAAAAAAAAAAAAAAAAAAAAAAAAAAAAAAAAAAAAAAFAAAADwAAAABAAAAAAAAAAAAAAkUAAAAAQAAABQAAAAUAAAAFAAAAAEAAAAAAAAAZAAAAGQAAAAAAAAAZAAAAGQAAAAVAAAAYAAAAAAAAAAAAAAADwAAACADAAAAAAAAAAAAAAEAAACgMgAAVgcAAKr4//8BAAAAf39/AAEAAABkAAAAAAAAABQAAABAHwAAAAAAACYAAAAAAAAAwOD//wAAAAAmAAAAZAAAABYAAABMAAAAAAAAAAAAAAAEAAAAAAAAAAEAAACAgIAKAAAAACgAAAAoAAAAZAAAAGQAAAAAAAAAzMzMAAAAAABQAAAAUAAAAGQAAABkAAAAAAAAABcAAAAUAAAAAAAAAAAAAAD/fwAA/38AAAAAAAAJAAAABAAAAAAAAAAeAAAAaAAAAAAAAAAAAAAAAAAAAAAAAAAAAAAAECcAABAnAAAAAAAAAAAAAAAAAAAAAAAAAAAAAAAAAAAAAAAAAAAAABQAAAAAAAAAwMD/AAAAAABkAAAAMgAAAAAAAABkAAAAAAAAAH9/fwAKAAAAIgAAABgAAAAAAAAAAAAAAAAAAAAAAAAAAAAAAAAAAAAkAAAAJAAAAAAAAAAHAAAAAAAAAAAAAAAAAAAAAAAAAAAAAAAAAAAAf39/ACUAAABYAAAAAAAAAAAAAAAAAAAAAAAAAAAAAAAAAAAAAAAAAAAAAAAAAAAAAAAAAAAAAAA/AAAAAAAAAKCGAQAAAAAAAAAAAAAAAAAMAAAAAQAAAAAAAAAAAAAAAAAAAB8AAABUAAAAAJmZB////wEAAAAAAAAAAAAAAAAAAAAAAAAAAAAAAAAAAAAAAAAAAAAAAAJ/f38AgICAA8zMzADAwP8Af39/AAAAAAAAAAAAAAAAAAAAAAAAAAAAIQAAABgAAAAUAAAAcjUAAD4NAABzRAAAkQ4AAAAAAAAmAAAACAAAAP//////////"/>
               </a:ext>
             </a:extLst>
           </p:cNvSpPr>
@@ -6095,7 +6128,7 @@
           <p:cNvSpPr>
             <a:extLst>
               <a:ext uri="smNativeData">
-                <pr:smNativeData xmlns:pr="smNativeData" xmlns="smNativeData" val="SMDATA_15_ucsbZBMAAAAlAAAAZAAAAA8BAAAAkAAAAEgAAACQAAAASAAAAAAAAAABAAAAAAAAAAEAAABQAAAAAAAAAAAA4D8AAAAAAADgPwAAAAAAAOA/AAAAAAAA4D8AAAAAAADgPwAAAAAAAOA/AAAAAAAA4D8AAAAAAADgPwAAAAAAAOA/AAAAAAAA4D8CAAAAjAAAAAEAAAAAAAAAf38AAP///wgAAAAAAAAAAAAAAAAAAAAAAAAAAAAAAAAAAAAAZAAAAAEAAABAAAAAAAAAAAAAAAAAAAAAAAAAAAAAAAAAAAAAAAAAAAAAAAAAAAAAAAAAAAAAAAAAAAAAAAAAAAAAAAAAAAAAAAAAAAAAAAAAAAAAAAAAAAAAAAAAAAAAFAAAADwAAAABAAAAAAAAAAAAAAkUAAAAAQAAABQAAAAUAAAAFAAAAAEAAAAAAAAAZAAAAGQAAAAAAAAAZAAAAGQAAAAVAAAAYAAAAAAAAAAAAAAADwAAACADAAAAAAAAAAAAAAEAAACgMgAAVgcAAKr4//8BAAAAf39/AAEAAABkAAAAAAAAABQAAABAHwAAAAAAACYAAAAAAAAAwOD//wAAAAAmAAAAZAAAABYAAABMAAAAAAAAAAAAAAAEAAAAAAAAAAEAAACAgIAKAAAAACgAAAAoAAAAZAAAAGQAAAAAAAAAzMzMAAAAAABQAAAAUAAAAGQAAABkAAAAAAAAABcAAAAUAAAAAAAAAAAAAAD/fwAA/38AAAAAAAAJAAAABAAAAAAAAAAeAAAAaAAAAAAAAAAAAAAAAAAAAAAAAAAAAAAAECcAABAnAAAAAAAAAAAAAAAAAAAAAAAAAAAAAAAAAAAAAAAAAAAAABQAAAAAAAAAwMD/AAAAAABkAAAAMgAAAAAAAABkAAAAAAAAAH9/fwAKAAAAIgAAABgAAAAAAAAAAAAAAAAAAAAAAAAAAAAAAAAAAAAkAAAAJAAAAAAAAAAHAAAAAAAAAAAAAAAAAAAAAAAAAAAAAAAAAAAAf39/ACUAAABYAAAAAAAAAAAAAAAAAAAAAAAAAAAAAAAAAAAAAAAAAAAAAAAAAAAAAAAAAAAAAAA/AAAAAAAAAKCGAQAAAAAAAAAAAAAAAAAMAAAAAQAAAAAAAAAAAAAAAAAAAB8AAABUAAAAf38AAP///wEAAAAAAAAAAAAAAAAAAAAAAAAAAAAAAAAAAAAAAAAAAAAAAAJ/f38AgICAA8zMzADAwP8Af39/AAAAAAAAAAAAAAAAAAAAAAAAAAAAIQAAABgAAAAUAAAAnB0AAOQPAACdLAAANxEAAAAAAAAmAAAACAAAAP//////////"/>
+                <pr:smNativeData xmlns:pr="smNativeData" xmlns="smNativeData" val="SMDATA_15_NygcZBMAAAAlAAAAZAAAAA8BAAAAkAAAAEgAAACQAAAASAAAAAAAAAABAAAAAAAAAAEAAABQAAAAAAAAAAAA4D8AAAAAAADgPwAAAAAAAOA/AAAAAAAA4D8AAAAAAADgPwAAAAAAAOA/AAAAAAAA4D8AAAAAAADgPwAAAAAAAOA/AAAAAAAA4D8CAAAAjAAAAAEAAAAAAAAAf38AAP///wgAAAAAAAAAAAAAAAAAAAAAAAAAAAAAAAAAAAAAZAAAAAEAAABAAAAAAAAAAAAAAAAAAAAAAAAAAAAAAAAAAAAAAAAAAAAAAAAAAAAAAAAAAAAAAAAAAAAAAAAAAAAAAAAAAAAAAAAAAAAAAAAAAAAAAAAAAAAAAAAAAAAAFAAAADwAAAABAAAAAAAAAAAAAAkUAAAAAQAAABQAAAAUAAAAFAAAAAEAAAAAAAAAZAAAAGQAAAAAAAAAZAAAAGQAAAAVAAAAYAAAAAAAAAAAAAAADwAAACADAAAAAAAAAAAAAAEAAACgMgAAVgcAAKr4//8BAAAAf39/AAEAAABkAAAAAAAAABQAAABAHwAAAAAAACYAAAAAAAAAwOD//wAAAAAmAAAAZAAAABYAAABMAAAAAAAAAAAAAAAEAAAAAAAAAAEAAACAgIAKAAAAACgAAAAoAAAAZAAAAGQAAAAAAAAAzMzMAAAAAABQAAAAUAAAAGQAAABkAAAAAAAAABcAAAAUAAAAAAAAAAAAAAD/fwAA/38AAAAAAAAJAAAABAAAAAAAAAAeAAAAaAAAAAAAAAAAAAAAAAAAAAAAAAAAAAAAECcAABAnAAAAAAAAAAAAAAAAAAAAAAAAAAAAAAAAAAAAAAAAAAAAABQAAAAAAAAAwMD/AAAAAABkAAAAMgAAAAAAAABkAAAAAAAAAH9/fwAKAAAAIgAAABgAAAAAAAAAAAAAAAAAAAAAAAAAAAAAAAAAAAAkAAAAJAAAAAAAAAAHAAAAAAAAAAAAAAAAAAAAAAAAAAAAAAAAAAAAf39/ACUAAABYAAAAAAAAAAAAAAAAAAAAAAAAAAAAAAAAAAAAAAAAAAAAAAAAAAAAAAAAAAAAAAA/AAAAAAAAAKCGAQAAAAAAAAAAAAAAAAAMAAAAAQAAAAAAAAAAAAAAAAAAAB8AAABUAAAAf38AAP///wEAAAAAAAAAAAAAAAAAAAAAAAAAAAAAAAAAAAAAAAAAAAAAAAJ/f38AgICAA8zMzADAwP8Af39/AAAAAAAAAAAAAAAAAAAAAAAAAAAAIQAAABgAAAAUAAAAnB0AAOQPAACdLAAANxEAAAAAAAAmAAAACAAAAP//////////"/>
               </a:ext>
             </a:extLst>
           </p:cNvSpPr>
@@ -6141,7 +6174,7 @@
           <p:cNvSpPr txBox="1">
             <a:extLst>
               <a:ext uri="smNativeData">
-                <pr:smNativeData xmlns:pr="smNativeData" xmlns="smNativeData" val="SMDATA_15_ucsbZBMAAAAlAAAAEgAAAA8BAAAAkAAAAEgAAACQAAAASAAAAAAAAAAAAAAAAAAAAAEAAABQAAAAAAAAAAAA4D8AAAAAAADgPwAAAAAAAOA/AAAAAAAA4D8AAAAAAADgPwAAAAAAAOA/AAAAAAAA4D8AAAAAAADgPwAAAAAAAOA/AAAAAAAA4D8CAAAAjAAAAAAAAAAAAAAAu+DjDP///wgAAAAAAAAAAAAAAAAAAAAAAAAAAAAAAAAAAAAAZAAAAAEAAABAAAAAAAAAAAAAAAAAAAAAAAAAAAAAAAAAAAAAAAAAAAAAAAAAAAAAAAAAAAAAAAAAAAAAAAAAAAAAAAAAAAAAAAAAAAAAAAAAAAAAAAAAAAAAAAAAAAAAFAAAADwAAAAAAAAAAAAAAAAAAAkUAAAAAQAAABQAAAAUAAAAFAAAAAEAAAAAAAAAZAAAAGQAAAAAAAAAZAAAAGQAAAAVAAAAYAAAAAAAAAAAAAAADwAAACADAAAAAAAAAAAAAAEAAACgMgAAVgcAAKr4//8BAAAAf39/AAEAAABkAAAAAAAAABQAAABAHwAAAAAAACYAAAAAAAAAwOD//wAAAAAmAAAAZAAAABYAAABMAAAAAAAAAAAAAAAEAAAAAAAAAAEAAACAgIAKAAAAACgAAAAoAAAAZAAAAGQAAAAAAAAAzMzMAAAAAABQAAAAUAAAAGQAAABkAAAAAAAAABcAAAAUAAAAAAAAANwIAAD/fwAA/38AAAAAAAAJAAAABAAAAAAAAAAeAAAAaAAAAAAAAAAAAAAAAAAAAAAAAAAAAAAAECcAABAnAAAAAAAAAAAAAAAAAAAAAAAAAAAAAAAAAAAAAAAAAAAAABQAAAAAAAAAwMD/AAAAAABkAAAAMgAAAAAAAABkAAAAAAAAAH9/fwAKAAAAIgAAABgAAAAAAAAAAAAAAAAAAAAAAAAAAAAAAAAAAAAkAAAAJAAAAAAAAAAHAAAAAAAAAAAAAAAAAAAAAAAAAAAAAAAAAAAAf39/ACUAAABYAAAAAAAAAAAAAAAAAAAAAAAAAAAAAAAAAAAAAAAAAAAAAAAAAAAAAAAAAAAAAAA/AAAAAAAAAKCGAQAAAAAAAAAAAAAAAAAMAAAAAQAAAAAAAAAAAAAAAAAAAB8AAABUAAAAu+DjBf///wEAAAAAAAAAAAAAAAAAAAAAAAAAAAAAAAAAAAAAAAAAAAAAAAJ/f38AgICAA8zMzADAwP8Af39/AAAAAAAAAAAAAAAAAAAAAAAAAAAAIQAAABgAAAAUAAAABi0AAOQPAACtMwAANxEAAAAAAAAmAAAACAAAAP//////////"/>
+                <pr:smNativeData xmlns:pr="smNativeData" xmlns="smNativeData" val="SMDATA_15_NygcZBMAAAAlAAAAEgAAAA8BAAAAkAAAAEgAAACQAAAASAAAAAAAAAAAAAAAAAAAAAEAAABQAAAAAAAAAAAA4D8AAAAAAADgPwAAAAAAAOA/AAAAAAAA4D8AAAAAAADgPwAAAAAAAOA/AAAAAAAA4D8AAAAAAADgPwAAAAAAAOA/AAAAAAAA4D8CAAAAjAAAAAAAAAAAAAAAu+DjDP///wgAAAAAAAAAAAAAAAAAAAAAAAAAAAAAAAAAAAAAZAAAAAEAAABAAAAAAAAAAAAAAAAAAAAAAAAAAAAAAAAAAAAAAAAAAAAAAAAAAAAAAAAAAAAAAAAAAAAAAAAAAAAAAAAAAAAAAAAAAAAAAAAAAAAAAAAAAAAAAAAAAAAAFAAAADwAAAAAAAAAAAAAAAAAAAkUAAAAAQAAABQAAAAUAAAAFAAAAAEAAAAAAAAAZAAAAGQAAAAAAAAAZAAAAGQAAAAVAAAAYAAAAAAAAAAAAAAADwAAACADAAAAAAAAAAAAAAEAAACgMgAAVgcAAKr4//8BAAAAf39/AAEAAABkAAAAAAAAABQAAABAHwAAAAAAACYAAAAAAAAAwOD//wAAAAAmAAAAZAAAABYAAABMAAAAAAAAAAAAAAAEAAAAAAAAAAEAAACAgIAKAAAAACgAAAAoAAAAZAAAAGQAAAAAAAAAzMzMAAAAAABQAAAAUAAAAGQAAABkAAAAAAAAABcAAAAUAAAAAAAAANwIAAD/fwAA/38AAAAAAAAJAAAABAAAAAAAAAAeAAAAaAAAAAAAAAAAAAAAAAAAAAAAAAAAAAAAECcAABAnAAAAAAAAAAAAAAAAAAAAAAAAAAAAAAAAAAAAAAAAAAAAABQAAAAAAAAAwMD/AAAAAABkAAAAMgAAAAAAAABkAAAAAAAAAH9/fwAKAAAAIgAAABgAAAAAAAAAAAAAAAAAAAAAAAAAAAAAAAAAAAAkAAAAJAAAAAAAAAAHAAAAAAAAAAAAAAAAAAAAAAAAAAAAAAAAAAAAf39/ACUAAABYAAAAAAAAAAAAAAAAAAAAAAAAAAAAAAAAAAAAAAAAAAAAAAAAAAAAAAAAAAAAAAA/AAAAAAAAAKCGAQAAAAAAAAAAAAAAAAAMAAAAAQAAAAAAAAAAAAAAAAAAAB8AAABUAAAAu+DjBf///wEAAAAAAAAAAAAAAAAAAAAAAAAAAAAAAAAAAAAAAAAAAAAAAAJ/f38AgICAA8zMzADAwP8Af39/AAAAAAAAAAAAAAAAAAAAAAAAAAAAIQAAABgAAAAUAAAABi0AAOQPAACtMwAANxEAAAAAAAAmAAAACAAAAP//////////"/>
               </a:ext>
             </a:extLst>
           </p:cNvSpPr>
@@ -6180,7 +6213,7 @@
           <p:cNvSpPr>
             <a:extLst>
               <a:ext uri="smNativeData">
-                <pr:smNativeData xmlns:pr="smNativeData" xmlns="smNativeData" val="SMDATA_15_ucsbZBMAAAAlAAAAZAAAAA8BAAAAkAAAAEgAAACQAAAASAAAAAAAAAABAAAAAAAAAAEAAABQAAAAAAAAAAAA4D8AAAAAAADgPwAAAAAAAOA/AAAAAAAA4D8AAAAAAADgPwAAAAAAAOA/AAAAAAAA4D8AAAAAAADgPwAAAAAAAOA/AAAAAAAA4D8CAAAAjAAAAAEAAAAAAAAAf38AAP///wgAAAAAAAAAAAAAAAAAAAAAAAAAAAAAAAAAAAAAZAAAAAEAAABAAAAAAAAAAAAAAAAAAAAAAAAAAAAAAAAAAAAAAAAAAAAAAAAAAAAAAAAAAAAAAAAAAAAAAAAAAAAAAAAAAAAAAAAAAAAAAAAAAAAAAAAAAAAAAAAAAAAAFAAAADwAAAABAAAAAAAAAAAAAAkUAAAAAQAAABQAAAAUAAAAFAAAAAEAAAAAAAAAZAAAAGQAAAAAAAAAZAAAAGQAAAAVAAAAYAAAAAAAAAAAAAAADwAAACADAAAAAAAAAAAAAAEAAACgMgAAVgcAAKr4//8BAAAAf39/AAEAAABkAAAAAAAAABQAAABAHwAAAAAAACYAAAAAAAAAwOD//wAAAAAmAAAAZAAAABYAAABMAAAAAAAAAAAAAAAEAAAAAAAAAAEAAACAgIAKAAAAACgAAAAoAAAAZAAAAGQAAAAAAAAAzMzMAAAAAABQAAAAUAAAAGQAAABkAAAAAAAAABcAAAAUAAAAAAAAAAAAAAD/fwAA/38AAAAAAAAJAAAABAAAAAAAAAAeAAAAaAAAAAAAAAAAAAAAAAAAAAAAAAAAAAAAECcAABAnAAAAAAAAAAAAAAAAAAAAAAAAAAAAAAAAAAAAAAAAAAAAABQAAAAAAAAAwMD/AAAAAABkAAAAMgAAAAAAAABkAAAAAAAAAH9/fwAKAAAAIgAAABgAAAAAAAAAAAAAAAAAAAAAAAAAAAAAAAAAAAAkAAAAJAAAAAAAAAAHAAAAAAAAAAAAAAAAAAAAAAAAAAAAAAAAAAAAf39/ACUAAABYAAAAAAAAAAAAAAAAAAAAAAAAAAAAAAAAAAAAAAAAAAAAAAAAAAAAAAAAAAAAAAA/AAAAAAAAAKCGAQAAAAAAAAAAAAAAAAAMAAAAAQAAAAAAAAAAAAAAAAAAAB8AAABUAAAAf38AAP///wEAAAAAAAAAAAAAAAAAAAAAAAAAAAAAAAAAAAAAAAAAAAAAAAJ/f38AgICAA8zMzADAwP8Af39/AAAAAAAAAAAAAAAAAAAAAAAAAAAAIQAAABgAAAAUAAAAnB0AADcRAACdLAAAihIAAAAAAAAmAAAACAAAAP//////////"/>
+                <pr:smNativeData xmlns:pr="smNativeData" xmlns="smNativeData" val="SMDATA_15_NygcZBMAAAAlAAAAZAAAAA8BAAAAkAAAAEgAAACQAAAASAAAAAAAAAABAAAAAAAAAAEAAABQAAAAAAAAAAAA4D8AAAAAAADgPwAAAAAAAOA/AAAAAAAA4D8AAAAAAADgPwAAAAAAAOA/AAAAAAAA4D8AAAAAAADgPwAAAAAAAOA/AAAAAAAA4D8CAAAAjAAAAAEAAAAAAAAAf38AAP///wgAAAAAAAAAAAAAAAAAAAAAAAAAAAAAAAAAAAAAZAAAAAEAAABAAAAAAAAAAAAAAAAAAAAAAAAAAAAAAAAAAAAAAAAAAAAAAAAAAAAAAAAAAAAAAAAAAAAAAAAAAAAAAAAAAAAAAAAAAAAAAAAAAAAAAAAAAAAAAAAAAAAAFAAAADwAAAABAAAAAAAAAAAAAAkUAAAAAQAAABQAAAAUAAAAFAAAAAEAAAAAAAAAZAAAAGQAAAAAAAAAZAAAAGQAAAAVAAAAYAAAAAAAAAAAAAAADwAAACADAAAAAAAAAAAAAAEAAACgMgAAVgcAAKr4//8BAAAAf39/AAEAAABkAAAAAAAAABQAAABAHwAAAAAAACYAAAAAAAAAwOD//wAAAAAmAAAAZAAAABYAAABMAAAAAAAAAAAAAAAEAAAAAAAAAAEAAACAgIAKAAAAACgAAAAoAAAAZAAAAGQAAAAAAAAAzMzMAAAAAABQAAAAUAAAAGQAAABkAAAAAAAAABcAAAAUAAAAAAAAAAAAAAD/fwAA/38AAAAAAAAJAAAABAAAAAAAAAAeAAAAaAAAAAAAAAAAAAAAAAAAAAAAAAAAAAAAECcAABAnAAAAAAAAAAAAAAAAAAAAAAAAAAAAAAAAAAAAAAAAAAAAABQAAAAAAAAAwMD/AAAAAABkAAAAMgAAAAAAAABkAAAAAAAAAH9/fwAKAAAAIgAAABgAAAAAAAAAAAAAAAAAAAAAAAAAAAAAAAAAAAAkAAAAJAAAAAAAAAAHAAAAAAAAAAAAAAAAAAAAAAAAAAAAAAAAAAAAf39/ACUAAABYAAAAAAAAAAAAAAAAAAAAAAAAAAAAAAAAAAAAAAAAAAAAAAAAAAAAAAAAAAAAAAA/AAAAAAAAAKCGAQAAAAAAAAAAAAAAAAAMAAAAAQAAAAAAAAAAAAAAAAAAAB8AAABUAAAAf38AAP///wEAAAAAAAAAAAAAAAAAAAAAAAAAAAAAAAAAAAAAAAAAAAAAAAJ/f38AgICAA8zMzADAwP8Af39/AAAAAAAAAAAAAAAAAAAAAAAAAAAAIQAAABgAAAAUAAAAnB0AADcRAACdLAAAihIAAAAAAAAmAAAACAAAAP//////////"/>
               </a:ext>
             </a:extLst>
           </p:cNvSpPr>
@@ -6226,7 +6259,7 @@
           <p:cNvSpPr txBox="1">
             <a:extLst>
               <a:ext uri="smNativeData">
-                <pr:smNativeData xmlns:pr="smNativeData" xmlns="smNativeData" val="SMDATA_15_ucsbZBMAAAAlAAAAEgAAAA8BAAAAkAAAAEgAAACQAAAASAAAAAAAAAAAAAAAAAAAAAEAAABQAAAAAAAAAAAA4D8AAAAAAADgPwAAAAAAAOA/AAAAAAAA4D8AAAAAAADgPwAAAAAAAOA/AAAAAAAA4D8AAAAAAADgPwAAAAAAAOA/AAAAAAAA4D8CAAAAjAAAAAAAAAAAAAAAu+DjDP///wgAAAAAAAAAAAAAAAAAAAAAAAAAAAAAAAAAAAAAZAAAAAEAAABAAAAAAAAAAAAAAAAAAAAAAAAAAAAAAAAAAAAAAAAAAAAAAAAAAAAAAAAAAAAAAAAAAAAAAAAAAAAAAAAAAAAAAAAAAAAAAAAAAAAAAAAAAAAAAAAAAAAAFAAAADwAAAAAAAAAAAAAAAAAAAkUAAAAAQAAABQAAAAUAAAAFAAAAAEAAAAAAAAAZAAAAGQAAAAAAAAAZAAAAGQAAAAVAAAAYAAAAAAAAAAAAAAADwAAACADAAAAAAAAAAAAAAEAAACgMgAAVgcAAKr4//8BAAAAf39/AAEAAABkAAAAAAAAABQAAABAHwAAAAAAACYAAAAAAAAAwOD//wAAAAAmAAAAZAAAABYAAABMAAAAAAAAAAAAAAAEAAAAAAAAAAEAAACAgIAKAAAAACgAAAAoAAAAZAAAAGQAAAAAAAAAzMzMAAAAAABQAAAAUAAAAGQAAABkAAAAAAAAABcAAAAUAAAAAAAAANwIAAD/fwAA/38AAAAAAAAJAAAABAAAAAAAAAAeAAAAaAAAAAAAAAAAAAAAAAAAAAAAAAAAAAAAECcAABAnAAAAAAAAAAAAAAAAAAAAAAAAAAAAAAAAAAAAAAAAAAAAABQAAAAAAAAAwMD/AAAAAABkAAAAMgAAAAAAAABkAAAAAAAAAH9/fwAKAAAAIgAAABgAAAAAAAAAAAAAAAAAAAAAAAAAAAAAAAAAAAAkAAAAJAAAAAAAAAAHAAAAAAAAAAAAAAAAAAAAAAAAAAAAAAAAAAAAf39/ACUAAABYAAAAAAAAAAAAAAAAAAAAAAAAAAAAAAAAAAAAAAAAAAAAAAAAAAAAAAAAAAAAAAA/AAAAAAAAAKCGAQAAAAAAAAAAAAAAAAAMAAAAAQAAAAAAAAAAAAAAAAAAAB8AAABUAAAAu+DjBf///wEAAAAAAAAAAAAAAAAAAAAAAAAAAAAAAAAAAAAAAAAAAAAAAAJ/f38AgICAA8zMzADAwP8Af39/AAAAAAAAAAAAAAAAAAAAAAAAAAAAIQAAABgAAAAUAAAADi0AADcRAAC1MwAAihIAAAAAAAAmAAAACAAAAP//////////"/>
+                <pr:smNativeData xmlns:pr="smNativeData" xmlns="smNativeData" val="SMDATA_15_NygcZBMAAAAlAAAAEgAAAA8BAAAAkAAAAEgAAACQAAAASAAAAAAAAAAAAAAAAAAAAAEAAABQAAAAAAAAAAAA4D8AAAAAAADgPwAAAAAAAOA/AAAAAAAA4D8AAAAAAADgPwAAAAAAAOA/AAAAAAAA4D8AAAAAAADgPwAAAAAAAOA/AAAAAAAA4D8CAAAAjAAAAAAAAAAAAAAAu+DjDP///wgAAAAAAAAAAAAAAAAAAAAAAAAAAAAAAAAAAAAAZAAAAAEAAABAAAAAAAAAAAAAAAAAAAAAAAAAAAAAAAAAAAAAAAAAAAAAAAAAAAAAAAAAAAAAAAAAAAAAAAAAAAAAAAAAAAAAAAAAAAAAAAAAAAAAAAAAAAAAAAAAAAAAFAAAADwAAAAAAAAAAAAAAAAAAAkUAAAAAQAAABQAAAAUAAAAFAAAAAEAAAAAAAAAZAAAAGQAAAAAAAAAZAAAAGQAAAAVAAAAYAAAAAAAAAAAAAAADwAAACADAAAAAAAAAAAAAAEAAACgMgAAVgcAAKr4//8BAAAAf39/AAEAAABkAAAAAAAAABQAAABAHwAAAAAAACYAAAAAAAAAwOD//wAAAAAmAAAAZAAAABYAAABMAAAAAAAAAAAAAAAEAAAAAAAAAAEAAACAgIAKAAAAACgAAAAoAAAAZAAAAGQAAAAAAAAAzMzMAAAAAABQAAAAUAAAAGQAAABkAAAAAAAAABcAAAAUAAAAAAAAANwIAAD/fwAA/38AAAAAAAAJAAAABAAAAAAAAAAeAAAAaAAAAAAAAAAAAAAAAAAAAAAAAAAAAAAAECcAABAnAAAAAAAAAAAAAAAAAAAAAAAAAAAAAAAAAAAAAAAAAAAAABQAAAAAAAAAwMD/AAAAAABkAAAAMgAAAAAAAABkAAAAAAAAAH9/fwAKAAAAIgAAABgAAAAAAAAAAAAAAAAAAAAAAAAAAAAAAAAAAAAkAAAAJAAAAAAAAAAHAAAAAAAAAAAAAAAAAAAAAAAAAAAAAAAAAAAAf39/ACUAAABYAAAAAAAAAAAAAAAAAAAAAAAAAAAAAAAAAAAAAAAAAAAAAAAAAAAAAAAAAAAAAAA/AAAAAAAAAKCGAQAAAAAAAAAAAAAAAAAMAAAAAQAAAAAAAAAAAAAAAAAAAB8AAABUAAAAu+DjBf///wEAAAAAAAAAAAAAAAAAAAAAAAAAAAAAAAAAAAAAAAAAAAAAAAJ/f38AgICAA8zMzADAwP8Af39/AAAAAAAAAAAAAAAAAAAAAAAAAAAAIQAAABgAAAAUAAAADi0AADcRAAC1MwAAihIAAAAAAAAmAAAACAAAAP//////////"/>
               </a:ext>
             </a:extLst>
           </p:cNvSpPr>
@@ -6265,7 +6298,7 @@
           <p:cNvSpPr>
             <a:extLst>
               <a:ext uri="smNativeData">
-                <pr:smNativeData xmlns:pr="smNativeData" xmlns="smNativeData" val="SMDATA_15_ucsbZBMAAAAlAAAAZAAAAA8BAAAAkAAAAEgAAACQAAAASAAAAAAAAAABAAAAAAAAAAEAAABQAAAAAAAAAAAA4D8AAAAAAADgPwAAAAAAAOA/AAAAAAAA4D8AAAAAAADgPwAAAAAAAOA/AAAAAAAA4D8AAAAAAADgPwAAAAAAAOA/AAAAAAAA4D8CAAAAjAAAAAEAAAAAAAAAf38AAP///wgAAAAAAAAAAAAAAAAAAAAAAAAAAAAAAAAAAAAAZAAAAAEAAABAAAAAAAAAAAAAAAAAAAAAAAAAAAAAAAAAAAAAAAAAAAAAAAAAAAAAAAAAAAAAAAAAAAAAAAAAAAAAAAAAAAAAAAAAAAAAAAAAAAAAAAAAAAAAAAAAAAAAFAAAADwAAAABAAAAAAAAAAAAAAkUAAAAAQAAABQAAAAUAAAAFAAAAAEAAAAAAAAAZAAAAGQAAAAAAAAAZAAAAGQAAAAVAAAAYAAAAAAAAAAAAAAADwAAACADAAAAAAAAAAAAAAEAAACgMgAAVgcAAKr4//8BAAAAf39/AAEAAABkAAAAAAAAABQAAABAHwAAAAAAACYAAAAAAAAAwOD//wAAAAAmAAAAZAAAABYAAABMAAAAAAAAAAAAAAAEAAAAAAAAAAEAAACAgIAKAAAAACgAAAAoAAAAZAAAAGQAAAAAAAAAzMzMAAAAAABQAAAAUAAAAGQAAABkAAAAAAAAABcAAAAUAAAAAAAAAAAAAAD/fwAA/38AAAAAAAAJAAAABAAAAAAAAAAeAAAAaAAAAAAAAAAAAAAAAAAAAAAAAAAAAAAAECcAABAnAAAAAAAAAAAAAAAAAAAAAAAAAAAAAAAAAAAAAAAAAAAAABQAAAAAAAAAwMD/AAAAAABkAAAAMgAAAAAAAABkAAAAAAAAAH9/fwAKAAAAIgAAABgAAAAAAAAAAAAAAAAAAAAAAAAAAAAAAAAAAAAkAAAAJAAAAAAAAAAHAAAAAAAAAAAAAAAAAAAAAAAAAAAAAAAAAAAAf39/ACUAAABYAAAAAAAAAAAAAAAAAAAAAAAAAAAAAAAAAAAAAAAAAAAAAAAAAAAAAAAAAAAAAAA/AAAAAAAAAKCGAQAAAAAAAAAAAAAAAAAMAAAAAQAAAAAAAAAAAAAAAAAAAB8AAABUAAAAf38AAP///wEAAAAAAAAAAAAAAAAAAAAAAAAAAAAAAAAAAAAAAAAAAAAAAAJ/f38AgICAA8zMzADAwP8Af39/AAAAAAAAAAAAAAAAAAAAAAAAAAAAIQAAABgAAAAUAAAAnB0AAIoSAACdLAAA3RMAAAAAAAAmAAAACAAAAP//////////"/>
+                <pr:smNativeData xmlns:pr="smNativeData" xmlns="smNativeData" val="SMDATA_15_NygcZBMAAAAlAAAAZAAAAA8BAAAAkAAAAEgAAACQAAAASAAAAAAAAAABAAAAAAAAAAEAAABQAAAAAAAAAAAA4D8AAAAAAADgPwAAAAAAAOA/AAAAAAAA4D8AAAAAAADgPwAAAAAAAOA/AAAAAAAA4D8AAAAAAADgPwAAAAAAAOA/AAAAAAAA4D8CAAAAjAAAAAEAAAAAAAAAf38AAP///wgAAAAAAAAAAAAAAAAAAAAAAAAAAAAAAAAAAAAAZAAAAAEAAABAAAAAAAAAAAAAAAAAAAAAAAAAAAAAAAAAAAAAAAAAAAAAAAAAAAAAAAAAAAAAAAAAAAAAAAAAAAAAAAAAAAAAAAAAAAAAAAAAAAAAAAAAAAAAAAAAAAAAFAAAADwAAAABAAAAAAAAAAAAAAkUAAAAAQAAABQAAAAUAAAAFAAAAAEAAAAAAAAAZAAAAGQAAAAAAAAAZAAAAGQAAAAVAAAAYAAAAAAAAAAAAAAADwAAACADAAAAAAAAAAAAAAEAAACgMgAAVgcAAKr4//8BAAAAf39/AAEAAABkAAAAAAAAABQAAABAHwAAAAAAACYAAAAAAAAAwOD//wAAAAAmAAAAZAAAABYAAABMAAAAAAAAAAAAAAAEAAAAAAAAAAEAAACAgIAKAAAAACgAAAAoAAAAZAAAAGQAAAAAAAAAzMzMAAAAAABQAAAAUAAAAGQAAABkAAAAAAAAABcAAAAUAAAAAAAAAAAAAAD/fwAA/38AAAAAAAAJAAAABAAAAAAAAAAeAAAAaAAAAAAAAAAAAAAAAAAAAAAAAAAAAAAAECcAABAnAAAAAAAAAAAAAAAAAAAAAAAAAAAAAAAAAAAAAAAAAAAAABQAAAAAAAAAwMD/AAAAAABkAAAAMgAAAAAAAABkAAAAAAAAAH9/fwAKAAAAIgAAABgAAAAAAAAAAAAAAAAAAAAAAAAAAAAAAAAAAAAkAAAAJAAAAAAAAAAHAAAAAAAAAAAAAAAAAAAAAAAAAAAAAAAAAAAAf39/ACUAAABYAAAAAAAAAAAAAAAAAAAAAAAAAAAAAAAAAAAAAAAAAAAAAAAAAAAAAAAAAAAAAAA/AAAAAAAAAKCGAQAAAAAAAAAAAAAAAAAMAAAAAQAAAAAAAAAAAAAAAAAAAB8AAABUAAAAf38AAP///wEAAAAAAAAAAAAAAAAAAAAAAAAAAAAAAAAAAAAAAAAAAAAAAAJ/f38AgICAA8zMzADAwP8Af39/AAAAAAAAAAAAAAAAAAAAAAAAAAAAIQAAABgAAAAUAAAAnB0AAIoSAACdLAAA3RMAAAAAAAAmAAAACAAAAP//////////"/>
               </a:ext>
             </a:extLst>
           </p:cNvSpPr>
@@ -6311,7 +6344,7 @@
           <p:cNvSpPr txBox="1">
             <a:extLst>
               <a:ext uri="smNativeData">
-                <pr:smNativeData xmlns:pr="smNativeData" xmlns="smNativeData" val="SMDATA_15_ucsbZBMAAAAlAAAAEgAAAA8BAAAAkAAAAEgAAACQAAAASAAAAAAAAAAAAAAAAAAAAAEAAABQAAAAAAAAAAAA4D8AAAAAAADgPwAAAAAAAOA/AAAAAAAA4D8AAAAAAADgPwAAAAAAAOA/AAAAAAAA4D8AAAAAAADgPwAAAAAAAOA/AAAAAAAA4D8CAAAAjAAAAAAAAAAAAAAAu+DjDP///wgAAAAAAAAAAAAAAAAAAAAAAAAAAAAAAAAAAAAAZAAAAAEAAABAAAAAAAAAAAAAAAAAAAAAAAAAAAAAAAAAAAAAAAAAAAAAAAAAAAAAAAAAAAAAAAAAAAAAAAAAAAAAAAAAAAAAAAAAAAAAAAAAAAAAAAAAAAAAAAAAAAAAFAAAADwAAAAAAAAAAAAAAAAAAAkUAAAAAQAAABQAAAAUAAAAFAAAAAEAAAAAAAAAZAAAAGQAAAAAAAAAZAAAAGQAAAAVAAAAYAAAAAAAAAAAAAAADwAAACADAAAAAAAAAAAAAAEAAACgMgAAVgcAAKr4//8BAAAAf39/AAEAAABkAAAAAAAAABQAAABAHwAAAAAAACYAAAAAAAAAwOD//wAAAAAmAAAAZAAAABYAAABMAAAAAAAAAAAAAAAEAAAAAAAAAAEAAACAgIAKAAAAACgAAAAoAAAAZAAAAGQAAAAAAAAAzMzMAAAAAABQAAAAUAAAAGQAAABkAAAAAAAAABcAAAAUAAAAAAAAANwIAAD/fwAA/38AAAAAAAAJAAAABAAAAEoAAAAeAAAAaAAAAAAAAAAAAAAAAAAAAAAAAAAAAAAAECcAABAnAAAAAAAAAAAAAAAAAAAAAAAAAAAAAAAAAAAAAAAAAAAAABQAAAAAAAAAwMD/AAAAAABkAAAAMgAAAAAAAABkAAAAAAAAAH9/fwAKAAAAIgAAABgAAAAAAAAAAAAAAAAAAAAAAAAAAAAAAAAAAAAkAAAAJAAAAAAAAAAHAAAAAAAAAAAAAAAAAAAAAAAAAAAAAAAAAAAAf39/ACUAAABYAAAAAAAAAAAAAAAAAAAAAAAAAAAAAAAAAAAAAAAAAAAAAAAAAAAAAAAAAAAAAAA/AAAAAAAAAKCGAQAAAAAAAAAAAAAAAAAMAAAAAQAAAAAAAAAAAAAAAAAAAB8AAABUAAAAu+DjBf///wEAAAAAAAAAAAAAAAAAAAAAAAAAAAAAAAAAAAAAAAAAAAAAAAJ/f38AgICAA8zMzADAwP8Af39/AAAAAAAAAAAAAAAAAAAAAAAAAAAAIQAAABgAAAAUAAAADi0AAIoSAAC1MwAA3RMAAAAAAAAmAAAACAAAAP//////////"/>
+                <pr:smNativeData xmlns:pr="smNativeData" xmlns="smNativeData" val="SMDATA_15_NygcZBMAAAAlAAAAEgAAAA8BAAAAkAAAAEgAAACQAAAASAAAAAAAAAAAAAAAAAAAAAEAAABQAAAAAAAAAAAA4D8AAAAAAADgPwAAAAAAAOA/AAAAAAAA4D8AAAAAAADgPwAAAAAAAOA/AAAAAAAA4D8AAAAAAADgPwAAAAAAAOA/AAAAAAAA4D8CAAAAjAAAAAAAAAAAAAAAu+DjDP///wgAAAAAAAAAAAAAAAAAAAAAAAAAAAAAAAAAAAAAZAAAAAEAAABAAAAAAAAAAAAAAAAAAAAAAAAAAAAAAAAAAAAAAAAAAAAAAAAAAAAAAAAAAAAAAAAAAAAAAAAAAAAAAAAAAAAAAAAAAAAAAAAAAAAAAAAAAAAAAAAAAAAAFAAAADwAAAAAAAAAAAAAAAAAAAkUAAAAAQAAABQAAAAUAAAAFAAAAAEAAAAAAAAAZAAAAGQAAAAAAAAAZAAAAGQAAAAVAAAAYAAAAAAAAAAAAAAADwAAACADAAAAAAAAAAAAAAEAAACgMgAAVgcAAKr4//8BAAAAf39/AAEAAABkAAAAAAAAABQAAABAHwAAAAAAACYAAAAAAAAAwOD//wAAAAAmAAAAZAAAABYAAABMAAAAAAAAAAAAAAAEAAAAAAAAAAEAAACAgIAKAAAAACgAAAAoAAAAZAAAAGQAAAAAAAAAzMzMAAAAAABQAAAAUAAAAGQAAABkAAAAAAAAABcAAAAUAAAAAAAAANwIAAD/fwAA/38AAAAAAAAJAAAABAAAAEoAAAAeAAAAaAAAAAAAAAAAAAAAAAAAAAAAAAAAAAAAECcAABAnAAAAAAAAAAAAAAAAAAAAAAAAAAAAAAAAAAAAAAAAAAAAABQAAAAAAAAAwMD/AAAAAABkAAAAMgAAAAAAAABkAAAAAAAAAH9/fwAKAAAAIgAAABgAAAAAAAAAAAAAAAAAAAAAAAAAAAAAAAAAAAAkAAAAJAAAAAAAAAAHAAAAAAAAAAAAAAAAAAAAAAAAAAAAAAAAAAAAf39/ACUAAABYAAAAAAAAAAAAAAAAAAAAAAAAAAAAAAAAAAAAAAAAAAAAAAAAAAAAAAAAAAAAAAA/AAAAAAAAAKCGAQAAAAAAAAAAAAAAAAAMAAAAAQAAAAAAAAAAAAAAAAAAAB8AAABUAAAAu+DjBf///wEAAAAAAAAAAAAAAAAAAAAAAAAAAAAAAAAAAAAAAAAAAAAAAAJ/f38AgICAA8zMzADAwP8Af39/AAAAAAAAAAAAAAAAAAAAAAAAAAAAIQAAABgAAAAUAAAADi0AAIoSAAC1MwAA3RMAAAAAAAAmAAAACAAAAP//////////"/>
               </a:ext>
             </a:extLst>
           </p:cNvSpPr>
@@ -6350,7 +6383,7 @@
           <p:cNvSpPr>
             <a:extLst>
               <a:ext uri="smNativeData">
-                <pr:smNativeData xmlns:pr="smNativeData" xmlns="smNativeData" val="SMDATA_15_ucsbZBMAAAAlAAAAZAAAAA8BAAAAkAAAAEgAAACQAAAASAAAAAAAAAABAAAAAAAAAAEAAABQAAAAAAAAAAAA4D8AAAAAAADgPwAAAAAAAOA/AAAAAAAA4D8AAAAAAADgPwAAAAAAAOA/AAAAAAAA4D8AAAAAAADgPwAAAAAAAOA/AAAAAAAA4D8CAAAAjAAAAAEAAAAAAAAAwMDAAP///wgAAAAAAAAAAAAAAAAAAAAAAAAAAAAAAAAAAAAAZAAAAAEAAABAAAAAAAAAAAAAAAAAAAAAAAAAAAAAAAAAAAAAAAAAAAAAAAAAAAAAAAAAAAAAAAAAAAAAAAAAAAAAAAAAAAAAAAAAAAAAAAAAAAAAAAAAAAAAAAAAAAAAFAAAADwAAAABAAAAAAAAAAAAAAkUAAAAAQAAABQAAAAUAAAAFAAAAAEAAAAAAAAAZAAAAGQAAAAAAAAAZAAAAGQAAAAVAAAAYAAAAAAAAAAAAAAADwAAACADAAAAAAAAAAAAAAEAAACgMgAAVgcAAKr4//8BAAAAf39/AAEAAABkAAAAAAAAABQAAABAHwAAAAAAACYAAAAAAAAAwOD//wAAAAAmAAAAZAAAABYAAABMAAAAAAAAAAAAAAAEAAAAAAAAAAEAAACAgIAKAAAAACgAAAAoAAAAZAAAAGQAAAAAAAAAzMzMAAAAAABQAAAAUAAAAGQAAABkAAAAAAAAABcAAAAUAAAAAAAAAAAAAAD/fwAA/38AAAAAAAAJAAAABAAAAAAAAAAeAAAAaAAAAAAAAAAAAAAAAAAAAAAAAAAAAAAAECcAABAnAAAAAAAAAAAAAAAAAAAAAAAAAAAAAAAAAAAAAAAAAAAAABQAAAAAAAAAwMD/AAAAAABkAAAAMgAAAAAAAABkAAAAAAAAAH9/fwAKAAAAIgAAABgAAAAAAAAAAAAAAAAAAAAAAAAAAAAAAAAAAAAkAAAAJAAAAAAAAAAHAAAAAAAAAAAAAAAAAAAAAAAAAAAAAAAAAAAAf39/ACUAAABYAAAAAAAAAAAAAAAAAAAAAAAAAAAAAAAAAAAAAAAAAAAAAAAAAAAAAAAAAAAAAAA/AAAAAAAAAKCGAQAAAAAAAAAAAAAAAAAMAAAAAQAAAAAAAAAAAAAAAAAAAB8AAABUAAAAwMDAAP///wEAAAAAAAAAAAAAAAAAAAAAAAAAAAAAAAAAAAAAAAAAAAAAAAJ/f38AgICAA8zMzADAwP8Af39/AAAAAAAAAAAAAAAAAAAAAAAAAAAAIQAAABgAAAAUAAAAlB0AADAVAACVLAAAgxYAAAAAAAAmAAAACAAAAP//////////"/>
+                <pr:smNativeData xmlns:pr="smNativeData" xmlns="smNativeData" val="SMDATA_15_NygcZBMAAAAlAAAAZAAAAA8BAAAAkAAAAEgAAACQAAAASAAAAAAAAAABAAAAAAAAAAEAAABQAAAAAAAAAAAA4D8AAAAAAADgPwAAAAAAAOA/AAAAAAAA4D8AAAAAAADgPwAAAAAAAOA/AAAAAAAA4D8AAAAAAADgPwAAAAAAAOA/AAAAAAAA4D8CAAAAjAAAAAEAAAAAAAAAwMDAAP///wgAAAAAAAAAAAAAAAAAAAAAAAAAAAAAAAAAAAAAZAAAAAEAAABAAAAAAAAAAAAAAAAAAAAAAAAAAAAAAAAAAAAAAAAAAAAAAAAAAAAAAAAAAAAAAAAAAAAAAAAAAAAAAAAAAAAAAAAAAAAAAAAAAAAAAAAAAAAAAAAAAAAAFAAAADwAAAABAAAAAAAAAAAAAAkUAAAAAQAAABQAAAAUAAAAFAAAAAEAAAAAAAAAZAAAAGQAAAAAAAAAZAAAAGQAAAAVAAAAYAAAAAAAAAAAAAAADwAAACADAAAAAAAAAAAAAAEAAACgMgAAVgcAAKr4//8BAAAAf39/AAEAAABkAAAAAAAAABQAAABAHwAAAAAAACYAAAAAAAAAwOD//wAAAAAmAAAAZAAAABYAAABMAAAAAAAAAAAAAAAEAAAAAAAAAAEAAACAgIAKAAAAACgAAAAoAAAAZAAAAGQAAAAAAAAAzMzMAAAAAABQAAAAUAAAAGQAAABkAAAAAAAAABcAAAAUAAAAAAAAAAAAAAD/fwAA/38AAAAAAAAJAAAABAAAAAAAAAAeAAAAaAAAAAAAAAAAAAAAAAAAAAAAAAAAAAAAECcAABAnAAAAAAAAAAAAAAAAAAAAAAAAAAAAAAAAAAAAAAAAAAAAABQAAAAAAAAAwMD/AAAAAABkAAAAMgAAAAAAAABkAAAAAAAAAH9/fwAKAAAAIgAAABgAAAAAAAAAAAAAAAAAAAAAAAAAAAAAAAAAAAAkAAAAJAAAAAAAAAAHAAAAAAAAAAAAAAAAAAAAAAAAAAAAAAAAAAAAf39/ACUAAABYAAAAAAAAAAAAAAAAAAAAAAAAAAAAAAAAAAAAAAAAAAAAAAAAAAAAAAAAAAAAAAA/AAAAAAAAAKCGAQAAAAAAAAAAAAAAAAAMAAAAAQAAAAAAAAAAAAAAAAAAAB8AAABUAAAAwMDAAP///wEAAAAAAAAAAAAAAAAAAAAAAAAAAAAAAAAAAAAAAAAAAAAAAAJ/f38AgICAA8zMzADAwP8Af39/AAAAAAAAAAAAAAAAAAAAAAAAAAAAIQAAABgAAAAUAAAAlB0AADAVAACVLAAAgxYAAAAAAAAmAAAACAAAAP//////////"/>
               </a:ext>
             </a:extLst>
           </p:cNvSpPr>
@@ -6396,7 +6429,7 @@
           <p:cNvSpPr txBox="1">
             <a:extLst>
               <a:ext uri="smNativeData">
-                <pr:smNativeData xmlns:pr="smNativeData" xmlns="smNativeData" val="SMDATA_15_ucsbZBMAAAAlAAAAEgAAAA8BAAAAkAAAAEgAAACQAAAASAAAAAAAAAAAAAAAAAAAAAEAAABQAAAAAAAAAAAA4D8AAAAAAADgPwAAAAAAAOA/AAAAAAAA4D8AAAAAAADgPwAAAAAAAOA/AAAAAAAA4D8AAAAAAADgPwAAAAAAAOA/AAAAAAAA4D8CAAAAjAAAAAAAAAAAAAAAu+DjDP///wgAAAAAAAAAAAAAAAAAAAAAAAAAAAAAAAAAAAAAZAAAAAEAAABAAAAAAAAAAAAAAAAAAAAAAAAAAAAAAAAAAAAAAAAAAAAAAAAAAAAAAAAAAAAAAAAAAAAAAAAAAAAAAAAAAAAAAAAAAAAAAAAAAAAAAAAAAAAAAAAAAAAAFAAAADwAAAAAAAAAAAAAAAAAAAkUAAAAAQAAABQAAAAUAAAAFAAAAAEAAAAAAAAAZAAAAGQAAAAAAAAAZAAAAGQAAAAVAAAAYAAAAAAAAAAAAAAADwAAACADAAAAAAAAAAAAAAEAAACgMgAAVgcAAKr4//8BAAAAf39/AAEAAABkAAAAAAAAABQAAABAHwAAAAAAACYAAAAAAAAAwOD//wAAAAAmAAAAZAAAABYAAABMAAAAAAAAAAAAAAAEAAAAAAAAAAEAAACAgIAKAAAAACgAAAAoAAAAZAAAAGQAAAAAAAAAzMzMAAAAAABQAAAAUAAAAGQAAABkAAAAAAAAABcAAAAUAAAAAAAAANwIAAD/fwAA/38AAAAAAAAJAAAABAAAAAAAAAAeAAAAaAAAAAAAAAAAAAAAAAAAAAAAAAAAAAAAECcAABAnAAAAAAAAAAAAAAAAAAAAAAAAAAAAAAAAAAAAAAAAAAAAABQAAAAAAAAAwMD/AAAAAABkAAAAMgAAAAAAAABkAAAAAAAAAH9/fwAKAAAAIgAAABgAAAAAAAAAAAAAAAAAAAAAAAAAAAAAAAAAAAAkAAAAJAAAAAAAAAAHAAAAAAAAAAAAAAAAAAAAAAAAAAAAAAAAAAAAf39/ACUAAABYAAAAAAAAAAAAAAAAAAAAAAAAAAAAAAAAAAAAAAAAAAAAAAAAAAAAAAAAAAAAAAA/AAAAAAAAAKCGAQAAAAAAAAAAAAAAAAAMAAAAAQAAAAAAAAAAAAAAAAAAAB8AAABUAAAAu+DjBf///wEAAAAAAAAAAAAAAAAAAAAAAAAAAAAAAAAAAAAAAAAAAAAAAAJ/f38AgICAA8zMzADAwP8Af39/AAAAAAAAAAAAAAAAAAAAAAAAAAAAIQAAABgAAAAUAAAA/iwAADAVAAClMwAAgxYAAAAAAAAmAAAACAAAAP//////////"/>
+                <pr:smNativeData xmlns:pr="smNativeData" xmlns="smNativeData" val="SMDATA_15_NygcZBMAAAAlAAAAEgAAAA8BAAAAkAAAAEgAAACQAAAASAAAAAAAAAAAAAAAAAAAAAEAAABQAAAAAAAAAAAA4D8AAAAAAADgPwAAAAAAAOA/AAAAAAAA4D8AAAAAAADgPwAAAAAAAOA/AAAAAAAA4D8AAAAAAADgPwAAAAAAAOA/AAAAAAAA4D8CAAAAjAAAAAAAAAAAAAAAu+DjDP///wgAAAAAAAAAAAAAAAAAAAAAAAAAAAAAAAAAAAAAZAAAAAEAAABAAAAAAAAAAAAAAAAAAAAAAAAAAAAAAAAAAAAAAAAAAAAAAAAAAAAAAAAAAAAAAAAAAAAAAAAAAAAAAAAAAAAAAAAAAAAAAAAAAAAAAAAAAAAAAAAAAAAAFAAAADwAAAAAAAAAAAAAAAAAAAkUAAAAAQAAABQAAAAUAAAAFAAAAAEAAAAAAAAAZAAAAGQAAAAAAAAAZAAAAGQAAAAVAAAAYAAAAAAAAAAAAAAADwAAACADAAAAAAAAAAAAAAEAAACgMgAAVgcAAKr4//8BAAAAf39/AAEAAABkAAAAAAAAABQAAABAHwAAAAAAACYAAAAAAAAAwOD//wAAAAAmAAAAZAAAABYAAABMAAAAAAAAAAAAAAAEAAAAAAAAAAEAAACAgIAKAAAAACgAAAAoAAAAZAAAAGQAAAAAAAAAzMzMAAAAAABQAAAAUAAAAGQAAABkAAAAAAAAABcAAAAUAAAAAAAAANwIAAD/fwAA/38AAAAAAAAJAAAABAAAAAAAAAAeAAAAaAAAAAAAAAAAAAAAAAAAAAAAAAAAAAAAECcAABAnAAAAAAAAAAAAAAAAAAAAAAAAAAAAAAAAAAAAAAAAAAAAABQAAAAAAAAAwMD/AAAAAABkAAAAMgAAAAAAAABkAAAAAAAAAH9/fwAKAAAAIgAAABgAAAAAAAAAAAAAAAAAAAAAAAAAAAAAAAAAAAAkAAAAJAAAAAAAAAAHAAAAAAAAAAAAAAAAAAAAAAAAAAAAAAAAAAAAf39/ACUAAABYAAAAAAAAAAAAAAAAAAAAAAAAAAAAAAAAAAAAAAAAAAAAAAAAAAAAAAAAAAAAAAA/AAAAAAAAAKCGAQAAAAAAAAAAAAAAAAAMAAAAAQAAAAAAAAAAAAAAAAAAAB8AAABUAAAAu+DjBf///wEAAAAAAAAAAAAAAAAAAAAAAAAAAAAAAAAAAAAAAAAAAAAAAAJ/f38AgICAA8zMzADAwP8Af39/AAAAAAAAAAAAAAAAAAAAAAAAAAAAIQAAABgAAAAUAAAA/iwAADAVAAClMwAAgxYAAAAAAAAmAAAACAAAAP//////////"/>
               </a:ext>
             </a:extLst>
           </p:cNvSpPr>
@@ -6435,7 +6468,7 @@
           <p:cNvSpPr>
             <a:extLst>
               <a:ext uri="smNativeData">
-                <pr:smNativeData xmlns:pr="smNativeData" xmlns="smNativeData" val="SMDATA_15_ucsbZBMAAAAlAAAAZAAAAA8BAAAAkAAAAEgAAACQAAAASAAAAAAAAAABAAAAAAAAAAEAAABQAAAAAAAAAAAA4D8AAAAAAADgPwAAAAAAAOA/AAAAAAAA4D8AAAAAAADgPwAAAAAAAOA/AAAAAAAA4D8AAAAAAADgPwAAAAAAAOA/AAAAAAAA4D8CAAAAjAAAAAEAAAAAAAAAwMDAAP///wgAAAAAAAAAAAAAAAAAAAAAAAAAAAAAAAAAAAAAZAAAAAEAAABAAAAAAAAAAAAAAAAAAAAAAAAAAAAAAAAAAAAAAAAAAAAAAAAAAAAAAAAAAAAAAAAAAAAAAAAAAAAAAAAAAAAAAAAAAAAAAAAAAAAAAAAAAAAAAAAAAAAAFAAAADwAAAABAAAAAAAAAAAAAAkUAAAAAQAAABQAAAAUAAAAFAAAAAEAAAAAAAAAZAAAAGQAAAAAAAAAZAAAAGQAAAAVAAAAYAAAAAAAAAAAAAAADwAAACADAAAAAAAAAAAAAAEAAACgMgAAVgcAAKr4//8BAAAAf39/AAEAAABkAAAAAAAAABQAAABAHwAAAAAAACYAAAAAAAAAwOD//wAAAAAmAAAAZAAAABYAAABMAAAAAAAAAAAAAAAEAAAAAAAAAAEAAACAgIAKAAAAACgAAAAoAAAAZAAAAGQAAAAAAAAAzMzMAAAAAABQAAAAUAAAAGQAAABkAAAAAAAAABcAAAAUAAAAAAAAAAAAAAD/fwAA/38AAAAAAAAJAAAABAAAAAAAAAAeAAAAaAAAAAAAAAAAAAAAAAAAAAAAAAAAAAAAECcAABAnAAAAAAAAAAAAAAAAAAAAAAAAAAAAAAAAAAAAAAAAAAAAABQAAAAAAAAAwMD/AAAAAABkAAAAMgAAAAAAAABkAAAAAAAAAH9/fwAKAAAAIgAAABgAAAAAAAAAAAAAAAAAAAAAAAAAAAAAAAAAAAAkAAAAJAAAAAAAAAAHAAAAAAAAAAAAAAAAAAAAAAAAAAAAAAAAAAAAf39/ACUAAABYAAAAAAAAAAAAAAAAAAAAAAAAAAAAAAAAAAAAAAAAAAAAAAAAAAAAAAAAAAAAAAA/AAAAAAAAAKCGAQAAAAAAAAAAAAAAAAAMAAAAAQAAAAAAAAAAAAAAAAAAAB8AAABUAAAAwMDAAP///wEAAAAAAAAAAAAAAAAAAAAAAAAAAAAAAAAAAAAAAAAAAAAAAAJ/f38AgICAA8zMzADAwP8Af39/AAAAAAAAAAAAAAAAAAAAAAAAAAAAIQAAABgAAAAUAAAAlB0AAIMWAACVLAAA1hcAAAAAAAAmAAAACAAAAP//////////"/>
+                <pr:smNativeData xmlns:pr="smNativeData" xmlns="smNativeData" val="SMDATA_15_NygcZBMAAAAlAAAAZAAAAA8BAAAAkAAAAEgAAACQAAAASAAAAAAAAAABAAAAAAAAAAEAAABQAAAAAAAAAAAA4D8AAAAAAADgPwAAAAAAAOA/AAAAAAAA4D8AAAAAAADgPwAAAAAAAOA/AAAAAAAA4D8AAAAAAADgPwAAAAAAAOA/AAAAAAAA4D8CAAAAjAAAAAEAAAAAAAAAwMDAAP///wgAAAAAAAAAAAAAAAAAAAAAAAAAAAAAAAAAAAAAZAAAAAEAAABAAAAAAAAAAAAAAAAAAAAAAAAAAAAAAAAAAAAAAAAAAAAAAAAAAAAAAAAAAAAAAAAAAAAAAAAAAAAAAAAAAAAAAAAAAAAAAAAAAAAAAAAAAAAAAAAAAAAAFAAAADwAAAABAAAAAAAAAAAAAAkUAAAAAQAAABQAAAAUAAAAFAAAAAEAAAAAAAAAZAAAAGQAAAAAAAAAZAAAAGQAAAAVAAAAYAAAAAAAAAAAAAAADwAAACADAAAAAAAAAAAAAAEAAACgMgAAVgcAAKr4//8BAAAAf39/AAEAAABkAAAAAAAAABQAAABAHwAAAAAAACYAAAAAAAAAwOD//wAAAAAmAAAAZAAAABYAAABMAAAAAAAAAAAAAAAEAAAAAAAAAAEAAACAgIAKAAAAACgAAAAoAAAAZAAAAGQAAAAAAAAAzMzMAAAAAABQAAAAUAAAAGQAAABkAAAAAAAAABcAAAAUAAAAAAAAAAAAAAD/fwAA/38AAAAAAAAJAAAABAAAAAAAAAAeAAAAaAAAAAAAAAAAAAAAAAAAAAAAAAAAAAAAECcAABAnAAAAAAAAAAAAAAAAAAAAAAAAAAAAAAAAAAAAAAAAAAAAABQAAAAAAAAAwMD/AAAAAABkAAAAMgAAAAAAAABkAAAAAAAAAH9/fwAKAAAAIgAAABgAAAAAAAAAAAAAAAAAAAAAAAAAAAAAAAAAAAAkAAAAJAAAAAAAAAAHAAAAAAAAAAAAAAAAAAAAAAAAAAAAAAAAAAAAf39/ACUAAABYAAAAAAAAAAAAAAAAAAAAAAAAAAAAAAAAAAAAAAAAAAAAAAAAAAAAAAAAAAAAAAA/AAAAAAAAAKCGAQAAAAAAAAAAAAAAAAAMAAAAAQAAAAAAAAAAAAAAAAAAAB8AAABUAAAAwMDAAP///wEAAAAAAAAAAAAAAAAAAAAAAAAAAAAAAAAAAAAAAAAAAAAAAAJ/f38AgICAA8zMzADAwP8Af39/AAAAAAAAAAAAAAAAAAAAAAAAAAAAIQAAABgAAAAUAAAAlB0AAIMWAACVLAAA1hcAAAAAAAAmAAAACAAAAP//////////"/>
               </a:ext>
             </a:extLst>
           </p:cNvSpPr>
@@ -6481,7 +6514,7 @@
           <p:cNvSpPr txBox="1">
             <a:extLst>
               <a:ext uri="smNativeData">
-                <pr:smNativeData xmlns:pr="smNativeData" xmlns="smNativeData" val="SMDATA_15_ucsbZBMAAAAlAAAAEgAAAA8BAAAAkAAAAEgAAACQAAAASAAAAAAAAAAAAAAAAAAAAAEAAABQAAAAAAAAAAAA4D8AAAAAAADgPwAAAAAAAOA/AAAAAAAA4D8AAAAAAADgPwAAAAAAAOA/AAAAAAAA4D8AAAAAAADgPwAAAAAAAOA/AAAAAAAA4D8CAAAAjAAAAAAAAAAAAAAAu+DjDP///wgAAAAAAAAAAAAAAAAAAAAAAAAAAAAAAAAAAAAAZAAAAAEAAABAAAAAAAAAAAAAAAAAAAAAAAAAAAAAAAAAAAAAAAAAAAAAAAAAAAAAAAAAAAAAAAAAAAAAAAAAAAAAAAAAAAAAAAAAAAAAAAAAAAAAAAAAAAAAAAAAAAAAFAAAADwAAAAAAAAAAAAAAAAAAAkUAAAAAQAAABQAAAAUAAAAFAAAAAEAAAAAAAAAZAAAAGQAAAAAAAAAZAAAAGQAAAAVAAAAYAAAAAAAAAAAAAAADwAAACADAAAAAAAAAAAAAAEAAACgMgAAVgcAAKr4//8BAAAAf39/AAEAAABkAAAAAAAAABQAAABAHwAAAAAAACYAAAAAAAAAwOD//wAAAAAmAAAAZAAAABYAAABMAAAAAAAAAAAAAAAEAAAAAAAAAAEAAACAgIAKAAAAACgAAAAoAAAAZAAAAGQAAAAAAAAAzMzMAAAAAABQAAAAUAAAAGQAAABkAAAAAAAAABcAAAAUAAAAAAAAANwIAAD/fwAA/38AAAAAAAAJAAAABAAAAEoAAAAeAAAAaAAAAAAAAAAAAAAAAAAAAAAAAAAAAAAAECcAABAnAAAAAAAAAAAAAAAAAAAAAAAAAAAAAAAAAAAAAAAAAAAAABQAAAAAAAAAwMD/AAAAAABkAAAAMgAAAAAAAABkAAAAAAAAAH9/fwAKAAAAIgAAABgAAAAAAAAAAAAAAAAAAAAAAAAAAAAAAAAAAAAkAAAAJAAAAAAAAAAHAAAAAAAAAAAAAAAAAAAAAAAAAAAAAAAAAAAAf39/ACUAAABYAAAAAAAAAAAAAAAAAAAAAAAAAAAAAAAAAAAAAAAAAAAAAAAAAAAAAAAAAAAAAAA/AAAAAAAAAKCGAQAAAAAAAAAAAAAAAAAMAAAAAQAAAAAAAAAAAAAAAAAAAB8AAABUAAAAu+DjBf///wEAAAAAAAAAAAAAAAAAAAAAAAAAAAAAAAAAAAAAAAAAAAAAAAJ/f38AgICAA8zMzADAwP8Af39/AAAAAAAAAAAAAAAAAAAAAAAAAAAAIQAAABgAAAAUAAAABi0AAIMWAACtMwAA1hcAAAAAAAAmAAAACAAAAP//////////"/>
+                <pr:smNativeData xmlns:pr="smNativeData" xmlns="smNativeData" val="SMDATA_15_NygcZBMAAAAlAAAAEgAAAA8BAAAAkAAAAEgAAACQAAAASAAAAAAAAAAAAAAAAAAAAAEAAABQAAAAAAAAAAAA4D8AAAAAAADgPwAAAAAAAOA/AAAAAAAA4D8AAAAAAADgPwAAAAAAAOA/AAAAAAAA4D8AAAAAAADgPwAAAAAAAOA/AAAAAAAA4D8CAAAAjAAAAAAAAAAAAAAAu+DjDP///wgAAAAAAAAAAAAAAAAAAAAAAAAAAAAAAAAAAAAAZAAAAAEAAABAAAAAAAAAAAAAAAAAAAAAAAAAAAAAAAAAAAAAAAAAAAAAAAAAAAAAAAAAAAAAAAAAAAAAAAAAAAAAAAAAAAAAAAAAAAAAAAAAAAAAAAAAAAAAAAAAAAAAFAAAADwAAAAAAAAAAAAAAAAAAAkUAAAAAQAAABQAAAAUAAAAFAAAAAEAAAAAAAAAZAAAAGQAAAAAAAAAZAAAAGQAAAAVAAAAYAAAAAAAAAAAAAAADwAAACADAAAAAAAAAAAAAAEAAACgMgAAVgcAAKr4//8BAAAAf39/AAEAAABkAAAAAAAAABQAAABAHwAAAAAAACYAAAAAAAAAwOD//wAAAAAmAAAAZAAAABYAAABMAAAAAAAAAAAAAAAEAAAAAAAAAAEAAACAgIAKAAAAACgAAAAoAAAAZAAAAGQAAAAAAAAAzMzMAAAAAABQAAAAUAAAAGQAAABkAAAAAAAAABcAAAAUAAAAAAAAANwIAAD/fwAA/38AAAAAAAAJAAAABAAAAEoAAAAeAAAAaAAAAAAAAAAAAAAAAAAAAAAAAAAAAAAAECcAABAnAAAAAAAAAAAAAAAAAAAAAAAAAAAAAAAAAAAAAAAAAAAAABQAAAAAAAAAwMD/AAAAAABkAAAAMgAAAAAAAABkAAAAAAAAAH9/fwAKAAAAIgAAABgAAAAAAAAAAAAAAAAAAAAAAAAAAAAAAAAAAAAkAAAAJAAAAAAAAAAHAAAAAAAAAAAAAAAAAAAAAAAAAAAAAAAAAAAAf39/ACUAAABYAAAAAAAAAAAAAAAAAAAAAAAAAAAAAAAAAAAAAAAAAAAAAAAAAAAAAAAAAAAAAAA/AAAAAAAAAKCGAQAAAAAAAAAAAAAAAAAMAAAAAQAAAAAAAAAAAAAAAAAAAB8AAABUAAAAu+DjBf///wEAAAAAAAAAAAAAAAAAAAAAAAAAAAAAAAAAAAAAAAAAAAAAAAJ/f38AgICAA8zMzADAwP8Af39/AAAAAAAAAAAAAAAAAAAAAAAAAAAAIQAAABgAAAAUAAAABi0AAIMWAACtMwAA1hcAAAAAAAAmAAAACAAAAP//////////"/>
               </a:ext>
             </a:extLst>
           </p:cNvSpPr>
@@ -6520,7 +6553,7 @@
           <p:cNvSpPr>
             <a:extLst>
               <a:ext uri="smNativeData">
-                <pr:smNativeData xmlns:pr="smNativeData" xmlns="smNativeData" val="SMDATA_15_ucsbZBMAAAAlAAAAZAAAAA8BAAAAkAAAAEgAAACQAAAASAAAAAAAAAABAAAAAAAAAAEAAABQAAAAAAAAAAAA4D8AAAAAAADgPwAAAAAAAOA/AAAAAAAA4D8AAAAAAADgPwAAAAAAAOA/AAAAAAAA4D8AAAAAAADgPwAAAAAAAOA/AAAAAAAA4D8CAAAAjAAAAAEAAAAAAAAAwMDAAP///wgAAAAAAAAAAAAAAAAAAAAAAAAAAAAAAAAAAAAAZAAAAAEAAABAAAAAAAAAAAAAAAAAAAAAAAAAAAAAAAAAAAAAAAAAAAAAAAAAAAAAAAAAAAAAAAAAAAAAAAAAAAAAAAAAAAAAAAAAAAAAAAAAAAAAAAAAAAAAAAAAAAAAFAAAADwAAAABAAAAAAAAAAAAAAkUAAAAAQAAABQAAAAUAAAAFAAAAAEAAAAAAAAAZAAAAGQAAAAAAAAAZAAAAGQAAAAVAAAAYAAAAAAAAAAAAAAADwAAACADAAAAAAAAAAAAAAEAAACgMgAAVgcAAKr4//8BAAAAf39/AAEAAABkAAAAAAAAABQAAABAHwAAAAAAACYAAAAAAAAAwOD//wAAAAAmAAAAZAAAABYAAABMAAAAAAAAAAAAAAAEAAAAAAAAAAEAAACAgIAKAAAAACgAAAAoAAAAZAAAAGQAAAAAAAAAzMzMAAAAAABQAAAAUAAAAGQAAABkAAAAAAAAABcAAAAUAAAAAAAAAAAAAAD/fwAA/38AAAAAAAAJAAAABAAAAEoAAAAeAAAAaAAAAAAAAAAAAAAAAAAAAAAAAAAAAAAAECcAABAnAAAAAAAAAAAAAAAAAAAAAAAAAAAAAAAAAAAAAAAAAAAAABQAAAAAAAAAwMD/AAAAAABkAAAAMgAAAAAAAABkAAAAAAAAAH9/fwAKAAAAIgAAABgAAAAAAAAAAAAAAAAAAAAAAAAAAAAAAAAAAAAkAAAAJAAAAAAAAAAHAAAAAAAAAAAAAAAAAAAAAAAAAAAAAAAAAAAAf39/ACUAAABYAAAAAAAAAAAAAAAAAAAAAAAAAAAAAAAAAAAAAAAAAAAAAAAAAAAAAAAAAAAAAAA/AAAAAAAAAKCGAQAAAAAAAAAAAAAAAAAMAAAAAQAAAAAAAAAAAAAAAAAAAB8AAABUAAAAwMDAAP///wEAAAAAAAAAAAAAAAAAAAAAAAAAAAAAAAAAAAAAAAAAAAAAAAJ/f38AgICAA8zMzADAwP8Af39/AAAAAAAAAAAAAAAAAAAAAAAAAAAAIQAAABgAAAAUAAAAlB0AANYXAACVLAAAKRkAAAAAAAAmAAAACAAAAP//////////"/>
+                <pr:smNativeData xmlns:pr="smNativeData" xmlns="smNativeData" val="SMDATA_15_NygcZBMAAAAlAAAAZAAAAA8BAAAAkAAAAEgAAACQAAAASAAAAAAAAAABAAAAAAAAAAEAAABQAAAAAAAAAAAA4D8AAAAAAADgPwAAAAAAAOA/AAAAAAAA4D8AAAAAAADgPwAAAAAAAOA/AAAAAAAA4D8AAAAAAADgPwAAAAAAAOA/AAAAAAAA4D8CAAAAjAAAAAEAAAAAAAAAwMDAAP///wgAAAAAAAAAAAAAAAAAAAAAAAAAAAAAAAAAAAAAZAAAAAEAAABAAAAAAAAAAAAAAAAAAAAAAAAAAAAAAAAAAAAAAAAAAAAAAAAAAAAAAAAAAAAAAAAAAAAAAAAAAAAAAAAAAAAAAAAAAAAAAAAAAAAAAAAAAAAAAAAAAAAAFAAAADwAAAABAAAAAAAAAAAAAAkUAAAAAQAAABQAAAAUAAAAFAAAAAEAAAAAAAAAZAAAAGQAAAAAAAAAZAAAAGQAAAAVAAAAYAAAAAAAAAAAAAAADwAAACADAAAAAAAAAAAAAAEAAACgMgAAVgcAAKr4//8BAAAAf39/AAEAAABkAAAAAAAAABQAAABAHwAAAAAAACYAAAAAAAAAwOD//wAAAAAmAAAAZAAAABYAAABMAAAAAAAAAAAAAAAEAAAAAAAAAAEAAACAgIAKAAAAACgAAAAoAAAAZAAAAGQAAAAAAAAAzMzMAAAAAABQAAAAUAAAAGQAAABkAAAAAAAAABcAAAAUAAAAAAAAAAAAAAD/fwAA/38AAAAAAAAJAAAABAAAAEoAAAAeAAAAaAAAAAAAAAAAAAAAAAAAAAAAAAAAAAAAECcAABAnAAAAAAAAAAAAAAAAAAAAAAAAAAAAAAAAAAAAAAAAAAAAABQAAAAAAAAAwMD/AAAAAABkAAAAMgAAAAAAAABkAAAAAAAAAH9/fwAKAAAAIgAAABgAAAAAAAAAAAAAAAAAAAAAAAAAAAAAAAAAAAAkAAAAJAAAAAAAAAAHAAAAAAAAAAAAAAAAAAAAAAAAAAAAAAAAAAAAf39/ACUAAABYAAAAAAAAAAAAAAAAAAAAAAAAAAAAAAAAAAAAAAAAAAAAAAAAAAAAAAAAAAAAAAA/AAAAAAAAAKCGAQAAAAAAAAAAAAAAAAAMAAAAAQAAAAAAAAAAAAAAAAAAAB8AAABUAAAAwMDAAP///wEAAAAAAAAAAAAAAAAAAAAAAAAAAAAAAAAAAAAAAAAAAAAAAAJ/f38AgICAA8zMzADAwP8Af39/AAAAAAAAAAAAAAAAAAAAAAAAAAAAIQAAABgAAAAUAAAAlB0AANYXAACVLAAAKRkAAAAAAAAmAAAACAAAAP//////////"/>
               </a:ext>
             </a:extLst>
           </p:cNvSpPr>
@@ -6566,7 +6599,7 @@
           <p:cNvSpPr txBox="1">
             <a:extLst>
               <a:ext uri="smNativeData">
-                <pr:smNativeData xmlns:pr="smNativeData" xmlns="smNativeData" val="SMDATA_15_ucsbZBMAAAAlAAAAEgAAAA8BAAAAkAAAAEgAAACQAAAASAAAAAAAAAAAAAAAAAAAAAEAAABQAAAAAAAAAAAA4D8AAAAAAADgPwAAAAAAAOA/AAAAAAAA4D8AAAAAAADgPwAAAAAAAOA/AAAAAAAA4D8AAAAAAADgPwAAAAAAAOA/AAAAAAAA4D8CAAAAjAAAAAAAAAAAAAAAu+DjDP///wgAAAAAAAAAAAAAAAAAAAAAAAAAAAAAAAAAAAAAZAAAAAEAAABAAAAAAAAAAAAAAAAAAAAAAAAAAAAAAAAAAAAAAAAAAAAAAAAAAAAAAAAAAAAAAAAAAAAAAAAAAAAAAAAAAAAAAAAAAAAAAAAAAAAAAAAAAAAAAAAAAAAAFAAAADwAAAAAAAAAAAAAAAAAAAkUAAAAAQAAABQAAAAUAAAAFAAAAAEAAAAAAAAAZAAAAGQAAAAAAAAAZAAAAGQAAAAVAAAAYAAAAAAAAAAAAAAADwAAACADAAAAAAAAAAAAAAEAAACgMgAAVgcAAKr4//8BAAAAf39/AAEAAABkAAAAAAAAABQAAABAHwAAAAAAACYAAAAAAAAAwOD//wAAAAAmAAAAZAAAABYAAABMAAAAAAAAAAAAAAAEAAAAAAAAAAEAAACAgIAKAAAAACgAAAAoAAAAZAAAAGQAAAAAAAAAzMzMAAAAAABQAAAAUAAAAGQAAABkAAAAAAAAABcAAAAUAAAAAAAAANwIAAD/fwAA/38AAAAAAAAJAAAABAAAAAAAAAAeAAAAaAAAAAAAAAAAAAAAAAAAAAAAAAAAAAAAECcAABAnAAAAAAAAAAAAAAAAAAAAAAAAAAAAAAAAAAAAAAAAAAAAABQAAAAAAAAAwMD/AAAAAABkAAAAMgAAAAAAAABkAAAAAAAAAH9/fwAKAAAAIgAAABgAAAAAAAAAAAAAAAAAAAAAAAAAAAAAAAAAAAAkAAAAJAAAAAAAAAAHAAAAAAAAAAAAAAAAAAAAAAAAAAAAAAAAAAAAf39/ACUAAABYAAAAAAAAAAAAAAAAAAAAAAAAAAAAAAAAAAAAAAAAAAAAAAAAAAAAAAAAAAAAAAA/AAAAAAAAAKCGAQAAAAAAAAAAAAAAAAAMAAAAAQAAAAAAAAAAAAAAAAAAAB8AAABUAAAAu+DjBf///wEAAAAAAAAAAAAAAAAAAAAAAAAAAAAAAAAAAAAAAAAAAAAAAAJ/f38AgICAA8zMzADAwP8Af39/AAAAAAAAAAAAAAAAAAAAAAAAAAAAIQAAABgAAAAUAAAABi0AANYXAACtMwAAKRkAAAAAAAAmAAAACAAAAP//////////"/>
+                <pr:smNativeData xmlns:pr="smNativeData" xmlns="smNativeData" val="SMDATA_15_NygcZBMAAAAlAAAAEgAAAA8BAAAAkAAAAEgAAACQAAAASAAAAAAAAAAAAAAAAAAAAAEAAABQAAAAAAAAAAAA4D8AAAAAAADgPwAAAAAAAOA/AAAAAAAA4D8AAAAAAADgPwAAAAAAAOA/AAAAAAAA4D8AAAAAAADgPwAAAAAAAOA/AAAAAAAA4D8CAAAAjAAAAAAAAAAAAAAAu+DjDP///wgAAAAAAAAAAAAAAAAAAAAAAAAAAAAAAAAAAAAAZAAAAAEAAABAAAAAAAAAAAAAAAAAAAAAAAAAAAAAAAAAAAAAAAAAAAAAAAAAAAAAAAAAAAAAAAAAAAAAAAAAAAAAAAAAAAAAAAAAAAAAAAAAAAAAAAAAAAAAAAAAAAAAFAAAADwAAAAAAAAAAAAAAAAAAAkUAAAAAQAAABQAAAAUAAAAFAAAAAEAAAAAAAAAZAAAAGQAAAAAAAAAZAAAAGQAAAAVAAAAYAAAAAAAAAAAAAAADwAAACADAAAAAAAAAAAAAAEAAACgMgAAVgcAAKr4//8BAAAAf39/AAEAAABkAAAAAAAAABQAAABAHwAAAAAAACYAAAAAAAAAwOD//wAAAAAmAAAAZAAAABYAAABMAAAAAAAAAAAAAAAEAAAAAAAAAAEAAACAgIAKAAAAACgAAAAoAAAAZAAAAGQAAAAAAAAAzMzMAAAAAABQAAAAUAAAAGQAAABkAAAAAAAAABcAAAAUAAAAAAAAANwIAAD/fwAA/38AAAAAAAAJAAAABAAAAAAAAAAeAAAAaAAAAAAAAAAAAAAAAAAAAAAAAAAAAAAAECcAABAnAAAAAAAAAAAAAAAAAAAAAAAAAAAAAAAAAAAAAAAAAAAAABQAAAAAAAAAwMD/AAAAAABkAAAAMgAAAAAAAABkAAAAAAAAAH9/fwAKAAAAIgAAABgAAAAAAAAAAAAAAAAAAAAAAAAAAAAAAAAAAAAkAAAAJAAAAAAAAAAHAAAAAAAAAAAAAAAAAAAAAAAAAAAAAAAAAAAAf39/ACUAAABYAAAAAAAAAAAAAAAAAAAAAAAAAAAAAAAAAAAAAAAAAAAAAAAAAAAAAAAAAAAAAAA/AAAAAAAAAKCGAQAAAAAAAAAAAAAAAAAMAAAAAQAAAAAAAAAAAAAAAAAAAB8AAABUAAAAu+DjBf///wEAAAAAAAAAAAAAAAAAAAAAAAAAAAAAAAAAAAAAAAAAAAAAAAJ/f38AgICAA8zMzADAwP8Af39/AAAAAAAAAAAAAAAAAAAAAAAAAAAAIQAAABgAAAAUAAAABi0AANYXAACtMwAAKRkAAAAAAAAmAAAACAAAAP//////////"/>
               </a:ext>
             </a:extLst>
           </p:cNvSpPr>
@@ -6605,7 +6638,7 @@
           <p:cNvSpPr>
             <a:extLst>
               <a:ext uri="smNativeData">
-                <pr:smNativeData xmlns:pr="smNativeData" xmlns="smNativeData" val="SMDATA_15_ucsbZBMAAAAlAAAAZAAAAA8BAAAAkAAAAEgAAACQAAAASAAAAAAAAAABAAAAAAAAAAEAAABQAAAAAAAAAAAA4D8AAAAAAADgPwAAAAAAAOA/AAAAAAAA4D8AAAAAAADgPwAAAAAAAOA/AAAAAAAA4D8AAAAAAADgPwAAAAAAAOA/AAAAAAAA4D8CAAAAjAAAAAEAAAAAAAAAf38AAP///wgAAAAAAAAAAAAAAAAAAAAAAAAAAAAAAAAAAAAAZAAAAAEAAABAAAAAAAAAAAAAAAAAAAAAAAAAAAAAAAAAAAAAAAAAAAAAAAAAAAAAAAAAAAAAAAAAAAAAAAAAAAAAAAAAAAAAAAAAAAAAAAAAAAAAAAAAAAAAAAAAAAAAFAAAADwAAAABAAAAAAAAAAAAAAkUAAAAAQAAABQAAAAUAAAAFAAAAAEAAAAAAAAAZAAAAGQAAAAAAAAAZAAAAGQAAAAVAAAAYAAAAAAAAAAAAAAADwAAACADAAAAAAAAAAAAAAEAAACgMgAAVgcAAKr4//8BAAAAf39/AAEAAABkAAAAAAAAABQAAABAHwAAAAAAACYAAAAAAAAAwOD//wAAAAAmAAAAZAAAABYAAABMAAAAAAAAAAAAAAAEAAAAAAAAAAEAAACAgIAKAAAAACgAAAAoAAAAZAAAAGQAAAAAAAAAzMzMAAAAAABQAAAAUAAAAGQAAABkAAAAAAAAABcAAAAUAAAAAAAAAAAAAAD/fwAA/38AAAAAAAAJAAAABAAAAAAAAAAeAAAAaAAAAAAAAAAAAAAAAAAAAAAAAAAAAAAAECcAABAnAAAAAAAAAAAAAAAAAAAAAAAAAAAAAAAAAAAAAAAAAAAAABQAAAAAAAAAwMD/AAAAAABkAAAAMgAAAAAAAABkAAAAAAAAAH9/fwAKAAAAIgAAABgAAAAAAAAAAAAAAAAAAAAAAAAAAAAAAAAAAAAkAAAAJAAAAAAAAAAHAAAAAAAAAAAAAAAAAAAAAAAAAAAAAAAAAAAAf39/ACUAAABYAAAAAAAAAAAAAAAAAAAAAAAAAAAAAAAAAAAAAAAAAAAAAAAAAAAAAAAAAAAAAAA/AAAAAAAAAKCGAQAAAAAAAAAAAAAAAAAMAAAAAQAAAAAAAAAAAAAAAAAAAB8AAABUAAAAf38AAP///wEAAAAAAAAAAAAAAAAAAAAAAAAAAAAAAAAAAAAAAAAAAAAAAAJ/f38AgICAA8zMzADAwP8Af39/AAAAAAAAAAAAAAAAAAAAAAAAAAAAIQAAABgAAAAUAAAAmx0AAHwaAACcLAAAzxsAAAAAAAAmAAAACAAAAP//////////"/>
+                <pr:smNativeData xmlns:pr="smNativeData" xmlns="smNativeData" val="SMDATA_15_NygcZBMAAAAlAAAAZAAAAA8BAAAAkAAAAEgAAACQAAAASAAAAAAAAAABAAAAAAAAAAEAAABQAAAAAAAAAAAA4D8AAAAAAADgPwAAAAAAAOA/AAAAAAAA4D8AAAAAAADgPwAAAAAAAOA/AAAAAAAA4D8AAAAAAADgPwAAAAAAAOA/AAAAAAAA4D8CAAAAjAAAAAEAAAAAAAAAf38AAP///wgAAAAAAAAAAAAAAAAAAAAAAAAAAAAAAAAAAAAAZAAAAAEAAABAAAAAAAAAAAAAAAAAAAAAAAAAAAAAAAAAAAAAAAAAAAAAAAAAAAAAAAAAAAAAAAAAAAAAAAAAAAAAAAAAAAAAAAAAAAAAAAAAAAAAAAAAAAAAAAAAAAAAFAAAADwAAAABAAAAAAAAAAAAAAkUAAAAAQAAABQAAAAUAAAAFAAAAAEAAAAAAAAAZAAAAGQAAAAAAAAAZAAAAGQAAAAVAAAAYAAAAAAAAAAAAAAADwAAACADAAAAAAAAAAAAAAEAAACgMgAAVgcAAKr4//8BAAAAf39/AAEAAABkAAAAAAAAABQAAABAHwAAAAAAACYAAAAAAAAAwOD//wAAAAAmAAAAZAAAABYAAABMAAAAAAAAAAAAAAAEAAAAAAAAAAEAAACAgIAKAAAAACgAAAAoAAAAZAAAAGQAAAAAAAAAzMzMAAAAAABQAAAAUAAAAGQAAABkAAAAAAAAABcAAAAUAAAAAAAAAAAAAAD/fwAA/38AAAAAAAAJAAAABAAAAAAAAAAeAAAAaAAAAAAAAAAAAAAAAAAAAAAAAAAAAAAAECcAABAnAAAAAAAAAAAAAAAAAAAAAAAAAAAAAAAAAAAAAAAAAAAAABQAAAAAAAAAwMD/AAAAAABkAAAAMgAAAAAAAABkAAAAAAAAAH9/fwAKAAAAIgAAABgAAAAAAAAAAAAAAAAAAAAAAAAAAAAAAAAAAAAkAAAAJAAAAAAAAAAHAAAAAAAAAAAAAAAAAAAAAAAAAAAAAAAAAAAAf39/ACUAAABYAAAAAAAAAAAAAAAAAAAAAAAAAAAAAAAAAAAAAAAAAAAAAAAAAAAAAAAAAAAAAAA/AAAAAAAAAKCGAQAAAAAAAAAAAAAAAAAMAAAAAQAAAAAAAAAAAAAAAAAAAB8AAABUAAAAf38AAP///wEAAAAAAAAAAAAAAAAAAAAAAAAAAAAAAAAAAAAAAAAAAAAAAAJ/f38AgICAA8zMzADAwP8Af39/AAAAAAAAAAAAAAAAAAAAAAAAAAAAIQAAABgAAAAUAAAAmx0AAHwaAACcLAAAzxsAAAAAAAAmAAAACAAAAP//////////"/>
               </a:ext>
             </a:extLst>
           </p:cNvSpPr>
@@ -6651,7 +6684,7 @@
           <p:cNvSpPr txBox="1">
             <a:extLst>
               <a:ext uri="smNativeData">
-                <pr:smNativeData xmlns:pr="smNativeData" xmlns="smNativeData" val="SMDATA_15_ucsbZBMAAAAlAAAAEgAAAA8BAAAAkAAAAEgAAACQAAAASAAAAAAAAAAAAAAAAAAAAAEAAABQAAAAAAAAAAAA4D8AAAAAAADgPwAAAAAAAOA/AAAAAAAA4D8AAAAAAADgPwAAAAAAAOA/AAAAAAAA4D8AAAAAAADgPwAAAAAAAOA/AAAAAAAA4D8CAAAAjAAAAAAAAAAAAAAAu+DjDP///wgAAAAAAAAAAAAAAAAAAAAAAAAAAAAAAAAAAAAAZAAAAAEAAABAAAAAAAAAAAAAAAAAAAAAAAAAAAAAAAAAAAAAAAAAAAAAAAAAAAAAAAAAAAAAAAAAAAAAAAAAAAAAAAAAAAAAAAAAAAAAAAAAAAAAAAAAAAAAAAAAAAAAFAAAADwAAAAAAAAAAAAAAAAAAAkUAAAAAQAAABQAAAAUAAAAFAAAAAEAAAAAAAAAZAAAAGQAAAAAAAAAZAAAAGQAAAAVAAAAYAAAAAAAAAAAAAAADwAAACADAAAAAAAAAAAAAAEAAACgMgAAVgcAAKr4//8BAAAAf39/AAEAAABkAAAAAAAAABQAAABAHwAAAAAAACYAAAAAAAAAwOD//wAAAAAmAAAAZAAAABYAAABMAAAAAAAAAAAAAAAEAAAAAAAAAAEAAACAgIAKAAAAACgAAAAoAAAAZAAAAGQAAAAAAAAAzMzMAAAAAABQAAAAUAAAAGQAAABkAAAAAAAAABcAAAAUAAAAAAAAANwIAAD/fwAA/38AAAAAAAAJAAAABAAAAAAAAAAeAAAAaAAAAAAAAAAAAAAAAAAAAAAAAAAAAAAAECcAABAnAAAAAAAAAAAAAAAAAAAAAAAAAAAAAAAAAAAAAAAAAAAAABQAAAAAAAAAwMD/AAAAAABkAAAAMgAAAAAAAABkAAAAAAAAAH9/fwAKAAAAIgAAABgAAAAAAAAAAAAAAAAAAAAAAAAAAAAAAAAAAAAkAAAAJAAAAAAAAAAHAAAAAAAAAAAAAAAAAAAAAAAAAAAAAAAAAAAAf39/ACUAAABYAAAAAAAAAAAAAAAAAAAAAAAAAAAAAAAAAAAAAAAAAAAAAAAAAAAAAAAAAAAAAAA/AAAAAAAAAKCGAQAAAAAAAAAAAAAAAAAMAAAAAQAAAAAAAAAAAAAAAAAAAB8AAABUAAAAu+DjBf///wEAAAAAAAAAAAAAAAAAAAAAAAAAAAAAAAAAAAAAAAAAAAAAAAJ/f38AgICAA8zMzADAwP8Af39/AAAAAAAAAAAAAAAAAAAAAAAAAAAAIQAAABgAAAAUAAAABS0AAHwaAACsMwAAzxsAAAAAAAAmAAAACAAAAP//////////"/>
+                <pr:smNativeData xmlns:pr="smNativeData" xmlns="smNativeData" val="SMDATA_15_NygcZBMAAAAlAAAAEgAAAA8BAAAAkAAAAEgAAACQAAAASAAAAAAAAAAAAAAAAAAAAAEAAABQAAAAAAAAAAAA4D8AAAAAAADgPwAAAAAAAOA/AAAAAAAA4D8AAAAAAADgPwAAAAAAAOA/AAAAAAAA4D8AAAAAAADgPwAAAAAAAOA/AAAAAAAA4D8CAAAAjAAAAAAAAAAAAAAAu+DjDP///wgAAAAAAAAAAAAAAAAAAAAAAAAAAAAAAAAAAAAAZAAAAAEAAABAAAAAAAAAAAAAAAAAAAAAAAAAAAAAAAAAAAAAAAAAAAAAAAAAAAAAAAAAAAAAAAAAAAAAAAAAAAAAAAAAAAAAAAAAAAAAAAAAAAAAAAAAAAAAAAAAAAAAFAAAADwAAAAAAAAAAAAAAAAAAAkUAAAAAQAAABQAAAAUAAAAFAAAAAEAAAAAAAAAZAAAAGQAAAAAAAAAZAAAAGQAAAAVAAAAYAAAAAAAAAAAAAAADwAAACADAAAAAAAAAAAAAAEAAACgMgAAVgcAAKr4//8BAAAAf39/AAEAAABkAAAAAAAAABQAAABAHwAAAAAAACYAAAAAAAAAwOD//wAAAAAmAAAAZAAAABYAAABMAAAAAAAAAAAAAAAEAAAAAAAAAAEAAACAgIAKAAAAACgAAAAoAAAAZAAAAGQAAAAAAAAAzMzMAAAAAABQAAAAUAAAAGQAAABkAAAAAAAAABcAAAAUAAAAAAAAANwIAAD/fwAA/38AAAAAAAAJAAAABAAAAAAAAAAeAAAAaAAAAAAAAAAAAAAAAAAAAAAAAAAAAAAAECcAABAnAAAAAAAAAAAAAAAAAAAAAAAAAAAAAAAAAAAAAAAAAAAAABQAAAAAAAAAwMD/AAAAAABkAAAAMgAAAAAAAABkAAAAAAAAAH9/fwAKAAAAIgAAABgAAAAAAAAAAAAAAAAAAAAAAAAAAAAAAAAAAAAkAAAAJAAAAAAAAAAHAAAAAAAAAAAAAAAAAAAAAAAAAAAAAAAAAAAAf39/ACUAAABYAAAAAAAAAAAAAAAAAAAAAAAAAAAAAAAAAAAAAAAAAAAAAAAAAAAAAAAAAAAAAAA/AAAAAAAAAKCGAQAAAAAAAAAAAAAAAAAMAAAAAQAAAAAAAAAAAAAAAAAAAB8AAABUAAAAu+DjBf///wEAAAAAAAAAAAAAAAAAAAAAAAAAAAAAAAAAAAAAAAAAAAAAAAJ/f38AgICAA8zMzADAwP8Af39/AAAAAAAAAAAAAAAAAAAAAAAAAAAAIQAAABgAAAAUAAAABS0AAHwaAACsMwAAzxsAAAAAAAAmAAAACAAAAP//////////"/>
               </a:ext>
             </a:extLst>
           </p:cNvSpPr>
@@ -6690,7 +6723,7 @@
           <p:cNvSpPr>
             <a:extLst>
               <a:ext uri="smNativeData">
-                <pr:smNativeData xmlns:pr="smNativeData" xmlns="smNativeData" val="SMDATA_15_ucsbZBMAAAAlAAAAZAAAAA8BAAAAkAAAAEgAAACQAAAASAAAAAAAAAABAAAAAAAAAAEAAABQAAAAAAAAAAAA4D8AAAAAAADgPwAAAAAAAOA/AAAAAAAA4D8AAAAAAADgPwAAAAAAAOA/AAAAAAAA4D8AAAAAAADgPwAAAAAAAOA/AAAAAAAA4D8CAAAAjAAAAAEAAAAAAAAAf38AAP///wgAAAAAAAAAAAAAAAAAAAAAAAAAAAAAAAAAAAAAZAAAAAEAAABAAAAAAAAAAAAAAAAAAAAAAAAAAAAAAAAAAAAAAAAAAAAAAAAAAAAAAAAAAAAAAAAAAAAAAAAAAAAAAAAAAAAAAAAAAAAAAAAAAAAAAAAAAAAAAAAAAAAAFAAAADwAAAABAAAAAAAAAAAAAAkUAAAAAQAAABQAAAAUAAAAFAAAAAEAAAAAAAAAZAAAAGQAAAAAAAAAZAAAAGQAAAAVAAAAYAAAAAAAAAAAAAAADwAAACADAAAAAAAAAAAAAAEAAACgMgAAVgcAAKr4//8BAAAAf39/AAEAAABkAAAAAAAAABQAAABAHwAAAAAAACYAAAAAAAAAwOD//wAAAAAmAAAAZAAAABYAAABMAAAAAAAAAAAAAAAEAAAAAAAAAAEAAACAgIAKAAAAACgAAAAoAAAAZAAAAGQAAAAAAAAAzMzMAAAAAABQAAAAUAAAAGQAAABkAAAAAAAAABcAAAAUAAAAAAAAAAAAAAD/fwAA/38AAAAAAAAJAAAABAAAAAAAAAAeAAAAaAAAAAAAAAAAAAAAAAAAAAAAAAAAAAAAECcAABAnAAAAAAAAAAAAAAAAAAAAAAAAAAAAAAAAAAAAAAAAAAAAABQAAAAAAAAAwMD/AAAAAABkAAAAMgAAAAAAAABkAAAAAAAAAH9/fwAKAAAAIgAAABgAAAAAAAAAAAAAAAAAAAAAAAAAAAAAAAAAAAAkAAAAJAAAAAAAAAAHAAAAAAAAAAAAAAAAAAAAAAAAAAAAAAAAAAAAf39/ACUAAABYAAAAAAAAAAAAAAAAAAAAAAAAAAAAAAAAAAAAAAAAAAAAAAAAAAAAAAAAAAAAAAA/AAAAAAAAAKCGAQAAAAAAAAAAAAAAAAAMAAAAAQAAAAAAAAAAAAAAAAAAAB8AAABUAAAAf38AAP///wEAAAAAAAAAAAAAAAAAAAAAAAAAAAAAAAAAAAAAAAAAAAAAAAJ/f38AgICAA8zMzADAwP8Af39/AAAAAAAAAAAAAAAAAAAAAAAAAAAAIQAAABgAAAAUAAAAmx0AAM8bAACcLAAAIh0AAAAAAAAmAAAACAAAAP//////////"/>
+                <pr:smNativeData xmlns:pr="smNativeData" xmlns="smNativeData" val="SMDATA_15_NygcZBMAAAAlAAAAZAAAAA8BAAAAkAAAAEgAAACQAAAASAAAAAAAAAABAAAAAAAAAAEAAABQAAAAAAAAAAAA4D8AAAAAAADgPwAAAAAAAOA/AAAAAAAA4D8AAAAAAADgPwAAAAAAAOA/AAAAAAAA4D8AAAAAAADgPwAAAAAAAOA/AAAAAAAA4D8CAAAAjAAAAAEAAAAAAAAAf38AAP///wgAAAAAAAAAAAAAAAAAAAAAAAAAAAAAAAAAAAAAZAAAAAEAAABAAAAAAAAAAAAAAAAAAAAAAAAAAAAAAAAAAAAAAAAAAAAAAAAAAAAAAAAAAAAAAAAAAAAAAAAAAAAAAAAAAAAAAAAAAAAAAAAAAAAAAAAAAAAAAAAAAAAAFAAAADwAAAABAAAAAAAAAAAAAAkUAAAAAQAAABQAAAAUAAAAFAAAAAEAAAAAAAAAZAAAAGQAAAAAAAAAZAAAAGQAAAAVAAAAYAAAAAAAAAAAAAAADwAAACADAAAAAAAAAAAAAAEAAACgMgAAVgcAAKr4//8BAAAAf39/AAEAAABkAAAAAAAAABQAAABAHwAAAAAAACYAAAAAAAAAwOD//wAAAAAmAAAAZAAAABYAAABMAAAAAAAAAAAAAAAEAAAAAAAAAAEAAACAgIAKAAAAACgAAAAoAAAAZAAAAGQAAAAAAAAAzMzMAAAAAABQAAAAUAAAAGQAAABkAAAAAAAAABcAAAAUAAAAAAAAAAAAAAD/fwAA/38AAAAAAAAJAAAABAAAAAAAAAAeAAAAaAAAAAAAAAAAAAAAAAAAAAAAAAAAAAAAECcAABAnAAAAAAAAAAAAAAAAAAAAAAAAAAAAAAAAAAAAAAAAAAAAABQAAAAAAAAAwMD/AAAAAABkAAAAMgAAAAAAAABkAAAAAAAAAH9/fwAKAAAAIgAAABgAAAAAAAAAAAAAAAAAAAAAAAAAAAAAAAAAAAAkAAAAJAAAAAAAAAAHAAAAAAAAAAAAAAAAAAAAAAAAAAAAAAAAAAAAf39/ACUAAABYAAAAAAAAAAAAAAAAAAAAAAAAAAAAAAAAAAAAAAAAAAAAAAAAAAAAAAAAAAAAAAA/AAAAAAAAAKCGAQAAAAAAAAAAAAAAAAAMAAAAAQAAAAAAAAAAAAAAAAAAAB8AAABUAAAAf38AAP///wEAAAAAAAAAAAAAAAAAAAAAAAAAAAAAAAAAAAAAAAAAAAAAAAJ/f38AgICAA8zMzADAwP8Af39/AAAAAAAAAAAAAAAAAAAAAAAAAAAAIQAAABgAAAAUAAAAmx0AAM8bAACcLAAAIh0AAAAAAAAmAAAACAAAAP//////////"/>
               </a:ext>
             </a:extLst>
           </p:cNvSpPr>
@@ -6736,7 +6769,7 @@
           <p:cNvSpPr txBox="1">
             <a:extLst>
               <a:ext uri="smNativeData">
-                <pr:smNativeData xmlns:pr="smNativeData" xmlns="smNativeData" val="SMDATA_15_ucsbZBMAAAAlAAAAEgAAAA8BAAAAkAAAAEgAAACQAAAASAAAAAAAAAAAAAAAAAAAAAEAAABQAAAAAAAAAAAA4D8AAAAAAADgPwAAAAAAAOA/AAAAAAAA4D8AAAAAAADgPwAAAAAAAOA/AAAAAAAA4D8AAAAAAADgPwAAAAAAAOA/AAAAAAAA4D8CAAAAjAAAAAAAAAAAAAAAu+DjDP///wgAAAAAAAAAAAAAAAAAAAAAAAAAAAAAAAAAAAAAZAAAAAEAAABAAAAAAAAAAAAAAAAAAAAAAAAAAAAAAAAAAAAAAAAAAAAAAAAAAAAAAAAAAAAAAAAAAAAAAAAAAAAAAAAAAAAAAAAAAAAAAAAAAAAAAAAAAAAAAAAAAAAAFAAAADwAAAAAAAAAAAAAAAAAAAkUAAAAAQAAABQAAAAUAAAAFAAAAAEAAAAAAAAAZAAAAGQAAAAAAAAAZAAAAGQAAAAVAAAAYAAAAAAAAAAAAAAADwAAACADAAAAAAAAAAAAAAEAAACgMgAAVgcAAKr4//8BAAAAf39/AAEAAABkAAAAAAAAABQAAABAHwAAAAAAACYAAAAAAAAAwOD//wAAAAAmAAAAZAAAABYAAABMAAAAAAAAAAAAAAAEAAAAAAAAAAEAAACAgIAKAAAAACgAAAAoAAAAZAAAAGQAAAAAAAAAzMzMAAAAAABQAAAAUAAAAGQAAABkAAAAAAAAABcAAAAUAAAAAAAAANwIAAD/fwAA/38AAAAAAAAJAAAABAAAAAAAAAAeAAAAaAAAAAAAAAAAAAAAAAAAAAAAAAAAAAAAECcAABAnAAAAAAAAAAAAAAAAAAAAAAAAAAAAAAAAAAAAAAAAAAAAABQAAAAAAAAAwMD/AAAAAABkAAAAMgAAAAAAAABkAAAAAAAAAH9/fwAKAAAAIgAAABgAAAAAAAAAAAAAAAAAAAAAAAAAAAAAAAAAAAAkAAAAJAAAAAAAAAAHAAAAAAAAAAAAAAAAAAAAAAAAAAAAAAAAAAAAf39/ACUAAABYAAAAAAAAAAAAAAAAAAAAAAAAAAAAAAAAAAAAAAAAAAAAAAAAAAAAAAAAAAAAAAA/AAAAAAAAAKCGAQAAAAAAAAAAAAAAAAAMAAAAAQAAAAAAAAAAAAAAAAAAAB8AAABUAAAAu+DjBf///wEAAAAAAAAAAAAAAAAAAAAAAAAAAAAAAAAAAAAAAAAAAAAAAAJ/f38AgICAA8zMzADAwP8Af39/AAAAAAAAAAAAAAAAAAAAAAAAAAAAIQAAABgAAAAUAAAADS0AAM8bAAC0MwAAIh0AAAAAAAAmAAAACAAAAP//////////"/>
+                <pr:smNativeData xmlns:pr="smNativeData" xmlns="smNativeData" val="SMDATA_15_NygcZBMAAAAlAAAAEgAAAA8BAAAAkAAAAEgAAACQAAAASAAAAAAAAAAAAAAAAAAAAAEAAABQAAAAAAAAAAAA4D8AAAAAAADgPwAAAAAAAOA/AAAAAAAA4D8AAAAAAADgPwAAAAAAAOA/AAAAAAAA4D8AAAAAAADgPwAAAAAAAOA/AAAAAAAA4D8CAAAAjAAAAAAAAAAAAAAAu+DjDP///wgAAAAAAAAAAAAAAAAAAAAAAAAAAAAAAAAAAAAAZAAAAAEAAABAAAAAAAAAAAAAAAAAAAAAAAAAAAAAAAAAAAAAAAAAAAAAAAAAAAAAAAAAAAAAAAAAAAAAAAAAAAAAAAAAAAAAAAAAAAAAAAAAAAAAAAAAAAAAAAAAAAAAFAAAADwAAAAAAAAAAAAAAAAAAAkUAAAAAQAAABQAAAAUAAAAFAAAAAEAAAAAAAAAZAAAAGQAAAAAAAAAZAAAAGQAAAAVAAAAYAAAAAAAAAAAAAAADwAAACADAAAAAAAAAAAAAAEAAACgMgAAVgcAAKr4//8BAAAAf39/AAEAAABkAAAAAAAAABQAAABAHwAAAAAAACYAAAAAAAAAwOD//wAAAAAmAAAAZAAAABYAAABMAAAAAAAAAAAAAAAEAAAAAAAAAAEAAACAgIAKAAAAACgAAAAoAAAAZAAAAGQAAAAAAAAAzMzMAAAAAABQAAAAUAAAAGQAAABkAAAAAAAAABcAAAAUAAAAAAAAANwIAAD/fwAA/38AAAAAAAAJAAAABAAAAAAAAAAeAAAAaAAAAAAAAAAAAAAAAAAAAAAAAAAAAAAAECcAABAnAAAAAAAAAAAAAAAAAAAAAAAAAAAAAAAAAAAAAAAAAAAAABQAAAAAAAAAwMD/AAAAAABkAAAAMgAAAAAAAABkAAAAAAAAAH9/fwAKAAAAIgAAABgAAAAAAAAAAAAAAAAAAAAAAAAAAAAAAAAAAAAkAAAAJAAAAAAAAAAHAAAAAAAAAAAAAAAAAAAAAAAAAAAAAAAAAAAAf39/ACUAAABYAAAAAAAAAAAAAAAAAAAAAAAAAAAAAAAAAAAAAAAAAAAAAAAAAAAAAAAAAAAAAAA/AAAAAAAAAKCGAQAAAAAAAAAAAAAAAAAMAAAAAQAAAAAAAAAAAAAAAAAAAB8AAABUAAAAu+DjBf///wEAAAAAAAAAAAAAAAAAAAAAAAAAAAAAAAAAAAAAAAAAAAAAAAJ/f38AgICAA8zMzADAwP8Af39/AAAAAAAAAAAAAAAAAAAAAAAAAAAAIQAAABgAAAAUAAAADS0AAM8bAAC0MwAAIh0AAAAAAAAmAAAACAAAAP//////////"/>
               </a:ext>
             </a:extLst>
           </p:cNvSpPr>
@@ -6775,7 +6808,7 @@
           <p:cNvSpPr txBox="1">
             <a:extLst>
               <a:ext uri="smNativeData">
-                <pr:smNativeData xmlns:pr="smNativeData" xmlns="smNativeData" val="SMDATA_15_ucsbZBMAAAAlAAAAEgAAAA8BAAAAkAAAAEgAAACQAAAASAAAAAAAAAAAAAAAAAAAAAEAAABQAAAAAAAAAAAA4D8AAAAAAADgPwAAAAAAAOA/AAAAAAAA4D8AAAAAAADgPwAAAAAAAOA/AAAAAAAA4D8AAAAAAADgPwAAAAAAAOA/AAAAAAAA4D8CAAAAjAAAAAAAAAAAAAAAu+DjDP///wgAAAAAAAAAAAAAAAAAAAAAAAAAAAAAAAAAAAAAZAAAAAEAAABAAAAAAAAAAAAAAAAAAAAAAAAAAAAAAAAAAAAAAAAAAAAAAAAAAAAAAAAAAAAAAAAAAAAAAAAAAAAAAAAAAAAAAAAAAAAAAAAAAAAAAAAAAAAAAAAAAAAAFAAAADwAAAAAAAAAAAAAAAAAAAkUAAAAAQAAABQAAAAUAAAAFAAAAAEAAAAAAAAAZAAAAGQAAAAAAAAAZAAAAGQAAAAVAAAAYAAAAAAAAAAAAAAADwAAACADAAAAAAAAAAAAAAEAAACgMgAAVgcAAKr4//8BAAAAf39/AAEAAABkAAAAAAAAABQAAABAHwAAAAAAACYAAAAAAAAAwOD//wAAAAAmAAAAZAAAABYAAABMAAAAAAAAAAAAAAAEAAAAAAAAAAEAAACAgIAKAAAAACgAAAAoAAAAZAAAAGQAAAAAAAAAzMzMAAAAAABQAAAAUAAAAGQAAABkAAAAAAAAABcAAAAUAAAAAAAAANwIAAD/fwAA/38AAAAAAAAJAAAABAAAAAAAAAAeAAAAaAAAAAAAAAAAAAAAAAAAAAAAAAAAAAAAECcAABAnAAAAAAAAAAAAAAAAAAAAAAAAAAAAAAAAAAAAAAAAAAAAABQAAAAAAAAAwMD/AAAAAABkAAAAMgAAAAAAAABkAAAAAAAAAH9/fwAKAAAAIgAAABgAAAAAAAAAAAAAAAAAAAAAAAAAAAAAAAAAAAAkAAAAJAAAAAAAAAAHAAAAAAAAAAAAAAAAAAAAAAAAAAAAAAAAAAAAf39/ACUAAABYAAAAAAAAAAAAAAAAAAAAAAAAAAAAAAAAAAAAAAAAAAAAAAAAAAAAAAAAAAAAAAA/AAAAAAAAAKCGAQAAAAAAAAAAAAAAAAAMAAAAAQAAAAAAAAAAAAAAAAAAAB8AAABUAAAAu+DjBf///wEAAAAAAAAAAAAAAAAAAAAAAAAAAAAAAAAAAAAAAAAAAAAAAAJ/f38AgICAA8zMzADAwP8Af39/AAAAAAAAAAAAAAAAAAAAAAAAAAAAIQAAABgAAAAUAAAADS0AACIdAAC0MwAAdR4AAAAAAAAmAAAACAAAAP//////////"/>
+                <pr:smNativeData xmlns:pr="smNativeData" xmlns="smNativeData" val="SMDATA_15_NygcZBMAAAAlAAAAEgAAAA8BAAAAkAAAAEgAAACQAAAASAAAAAAAAAAAAAAAAAAAAAEAAABQAAAAAAAAAAAA4D8AAAAAAADgPwAAAAAAAOA/AAAAAAAA4D8AAAAAAADgPwAAAAAAAOA/AAAAAAAA4D8AAAAAAADgPwAAAAAAAOA/AAAAAAAA4D8CAAAAjAAAAAAAAAAAAAAAu+DjDP///wgAAAAAAAAAAAAAAAAAAAAAAAAAAAAAAAAAAAAAZAAAAAEAAABAAAAAAAAAAAAAAAAAAAAAAAAAAAAAAAAAAAAAAAAAAAAAAAAAAAAAAAAAAAAAAAAAAAAAAAAAAAAAAAAAAAAAAAAAAAAAAAAAAAAAAAAAAAAAAAAAAAAAFAAAADwAAAAAAAAAAAAAAAAAAAkUAAAAAQAAABQAAAAUAAAAFAAAAAEAAAAAAAAAZAAAAGQAAAAAAAAAZAAAAGQAAAAVAAAAYAAAAAAAAAAAAAAADwAAACADAAAAAAAAAAAAAAEAAACgMgAAVgcAAKr4//8BAAAAf39/AAEAAABkAAAAAAAAABQAAABAHwAAAAAAACYAAAAAAAAAwOD//wAAAAAmAAAAZAAAABYAAABMAAAAAAAAAAAAAAAEAAAAAAAAAAEAAACAgIAKAAAAACgAAAAoAAAAZAAAAGQAAAAAAAAAzMzMAAAAAABQAAAAUAAAAGQAAABkAAAAAAAAABcAAAAUAAAAAAAAANwIAAD/fwAA/38AAAAAAAAJAAAABAAAAAAAAAAeAAAAaAAAAAAAAAAAAAAAAAAAAAAAAAAAAAAAECcAABAnAAAAAAAAAAAAAAAAAAAAAAAAAAAAAAAAAAAAAAAAAAAAABQAAAAAAAAAwMD/AAAAAABkAAAAMgAAAAAAAABkAAAAAAAAAH9/fwAKAAAAIgAAABgAAAAAAAAAAAAAAAAAAAAAAAAAAAAAAAAAAAAkAAAAJAAAAAAAAAAHAAAAAAAAAAAAAAAAAAAAAAAAAAAAAAAAAAAAf39/ACUAAABYAAAAAAAAAAAAAAAAAAAAAAAAAAAAAAAAAAAAAAAAAAAAAAAAAAAAAAAAAAAAAAA/AAAAAAAAAKCGAQAAAAAAAAAAAAAAAAAMAAAAAQAAAAAAAAAAAAAAAAAAAB8AAABUAAAAu+DjBf///wEAAAAAAAAAAAAAAAAAAAAAAAAAAAAAAAAAAAAAAAAAAAAAAAJ/f38AgICAA8zMzADAwP8Af39/AAAAAAAAAAAAAAAAAAAAAAAAAAAAIQAAABgAAAAUAAAADS0AACIdAAC0MwAAdR4AAAAAAAAmAAAACAAAAP//////////"/>
               </a:ext>
             </a:extLst>
           </p:cNvSpPr>
@@ -6814,7 +6847,7 @@
           <p:cNvSpPr>
             <a:extLst>
               <a:ext uri="smNativeData">
-                <pr:smNativeData xmlns:pr="smNativeData" xmlns="smNativeData" val="SMDATA_15_ucsbZBMAAAAlAAAAZAAAAA8BAAAAkAAAAEgAAACQAAAASAAAAAAAAAABAAAAAAAAAAEAAABQAAAAAAAAAAAA4D8AAAAAAADgPwAAAAAAAOA/AAAAAAAA4D8AAAAAAADgPwAAAAAAAOA/AAAAAAAA4D8AAAAAAADgPwAAAAAAAOA/AAAAAAAA4D8CAAAAjAAAAAEAAAAAAAAAwMDAAP///wgAAAAAAAAAAAAAAAAAAAAAAAAAAAAAAAAAAAAAZAAAAAEAAABAAAAAAAAAAAAAAAAAAAAAAAAAAAAAAAAAAAAAAAAAAAAAAAAAAAAAAAAAAAAAAAAAAAAAAAAAAAAAAAAAAAAAAAAAAAAAAAAAAAAAAAAAAAAAAAAAAAAAFAAAADwAAAABAAAAAAAAAAAAAAkUAAAAAQAAABQAAAAUAAAAFAAAAAEAAAAAAAAAZAAAAGQAAAAAAAAAZAAAAGQAAAAVAAAAYAAAAAAAAAAAAAAADwAAACADAAAAAAAAAAAAAAEAAACgMgAAVgcAAKr4//8BAAAAf39/AAEAAABkAAAAAAAAABQAAABAHwAAAAAAACYAAAAAAAAAwOD//wAAAAAmAAAAZAAAABYAAABMAAAAAAAAAAAAAAAEAAAAAAAAAAEAAACAgIAKAAAAACgAAAAoAAAAZAAAAGQAAAAAAAAAzMzMAAAAAABQAAAAUAAAAGQAAABkAAAAAAAAABcAAAAUAAAAAAAAAAAAAAD/fwAA/38AAAAAAAAJAAAABAAAAEoAAAAeAAAAaAAAAAAAAAAAAAAAAAAAAAAAAAAAAAAAECcAABAnAAAAAAAAAAAAAAAAAAAAAAAAAAAAAAAAAAAAAAAAAAAAABQAAAAAAAAAwMD/AAAAAABkAAAAMgAAAAAAAABkAAAAAAAAAH9/fwAKAAAAIgAAABgAAAAAAAAAAAAAAAAAAAAAAAAAAAAAAAAAAAAkAAAAJAAAAAAAAAAHAAAAAAAAAAAAAAAAAAAAAAAAAAAAAAAAAAAAf39/ACUAAABYAAAAAAAAAAAAAAAAAAAAAAAAAAAAAAAAAAAAAAAAAAAAAAAAAAAAAAAAAAAAAAA/AAAAAAAAAKCGAQAAAAAAAAAAAAAAAAAMAAAAAQAAAAAAAAAAAAAAAAAAAB8AAABUAAAAwMDAAP///wEAAAAAAAAAAAAAAAAAAAAAAAAAAAAAAAAAAAAAAAAAAAAAAAJ/f38AgICAA8zMzADAwP8Af39/AAAAAAAAAAAAAAAAAAAAAAAAAAAAIQAAABgAAAAUAAAAmx0AALoiAACcLAAADSQAAAAAAAAmAAAACAAAAP//////////"/>
+                <pr:smNativeData xmlns:pr="smNativeData" xmlns="smNativeData" val="SMDATA_15_NygcZBMAAAAlAAAAZAAAAA8BAAAAkAAAAEgAAACQAAAASAAAAAAAAAABAAAAAAAAAAEAAABQAAAAAAAAAAAA4D8AAAAAAADgPwAAAAAAAOA/AAAAAAAA4D8AAAAAAADgPwAAAAAAAOA/AAAAAAAA4D8AAAAAAADgPwAAAAAAAOA/AAAAAAAA4D8CAAAAjAAAAAEAAAAAAAAAwMDAAP///wgAAAAAAAAAAAAAAAAAAAAAAAAAAAAAAAAAAAAAZAAAAAEAAABAAAAAAAAAAAAAAAAAAAAAAAAAAAAAAAAAAAAAAAAAAAAAAAAAAAAAAAAAAAAAAAAAAAAAAAAAAAAAAAAAAAAAAAAAAAAAAAAAAAAAAAAAAAAAAAAAAAAAFAAAADwAAAABAAAAAAAAAAAAAAkUAAAAAQAAABQAAAAUAAAAFAAAAAEAAAAAAAAAZAAAAGQAAAAAAAAAZAAAAGQAAAAVAAAAYAAAAAAAAAAAAAAADwAAACADAAAAAAAAAAAAAAEAAACgMgAAVgcAAKr4//8BAAAAf39/AAEAAABkAAAAAAAAABQAAABAHwAAAAAAACYAAAAAAAAAwOD//wAAAAAmAAAAZAAAABYAAABMAAAAAAAAAAAAAAAEAAAAAAAAAAEAAACAgIAKAAAAACgAAAAoAAAAZAAAAGQAAAAAAAAAzMzMAAAAAABQAAAAUAAAAGQAAABkAAAAAAAAABcAAAAUAAAAAAAAAAAAAAD/fwAA/38AAAAAAAAJAAAABAAAAEoAAAAeAAAAaAAAAAAAAAAAAAAAAAAAAAAAAAAAAAAAECcAABAnAAAAAAAAAAAAAAAAAAAAAAAAAAAAAAAAAAAAAAAAAAAAABQAAAAAAAAAwMD/AAAAAABkAAAAMgAAAAAAAABkAAAAAAAAAH9/fwAKAAAAIgAAABgAAAAAAAAAAAAAAAAAAAAAAAAAAAAAAAAAAAAkAAAAJAAAAAAAAAAHAAAAAAAAAAAAAAAAAAAAAAAAAAAAAAAAAAAAf39/ACUAAABYAAAAAAAAAAAAAAAAAAAAAAAAAAAAAAAAAAAAAAAAAAAAAAAAAAAAAAAAAAAAAAA/AAAAAAAAAKCGAQAAAAAAAAAAAAAAAAAMAAAAAQAAAAAAAAAAAAAAAAAAAB8AAABUAAAAwMDAAP///wEAAAAAAAAAAAAAAAAAAAAAAAAAAAAAAAAAAAAAAAAAAAAAAAJ/f38AgICAA8zMzADAwP8Af39/AAAAAAAAAAAAAAAAAAAAAAAAAAAAIQAAABgAAAAUAAAAmx0AALoiAACcLAAADSQAAAAAAAAmAAAACAAAAP//////////"/>
               </a:ext>
             </a:extLst>
           </p:cNvSpPr>
@@ -6860,7 +6893,7 @@
           <p:cNvSpPr>
             <a:extLst>
               <a:ext uri="smNativeData">
-                <pr:smNativeData xmlns:pr="smNativeData" xmlns="smNativeData" val="SMDATA_15_ucsbZBMAAAAlAAAAZAAAAA8BAAAAkAAAAEgAAACQAAAASAAAAAAAAAABAAAAAAAAAAEAAABQAAAAAAAAAAAA4D8AAAAAAADgPwAAAAAAAOA/AAAAAAAA4D8AAAAAAADgPwAAAAAAAOA/AAAAAAAA4D8AAAAAAADgPwAAAAAAAOA/AAAAAAAA4D8CAAAAjAAAAAEAAAAAAAAAwMDAAP///wgAAAAAAAAAAAAAAAAAAAAAAAAAAAAAAAAAAAAAZAAAAAEAAABAAAAAAAAAAAAAAAAAAAAAAAAAAAAAAAAAAAAAAAAAAAAAAAAAAAAAAAAAAAAAAAAAAAAAAAAAAAAAAAAAAAAAAAAAAAAAAAAAAAAAAAAAAAAAAAAAAAAAFAAAADwAAAABAAAAAAAAAAAAAAkUAAAAAQAAABQAAAAUAAAAFAAAAAEAAAAAAAAAZAAAAGQAAAAAAAAAZAAAAGQAAAAVAAAAYAAAAAAAAAAAAAAADwAAACADAAAAAAAAAAAAAAEAAACgMgAAVgcAAKr4//8BAAAAf39/AAEAAABkAAAAAAAAABQAAABAHwAAAAAAACYAAAAAAAAAwOD//wAAAAAmAAAAZAAAABYAAABMAAAAAAAAAAAAAAAEAAAAAAAAAAEAAACAgIAKAAAAACgAAAAoAAAAZAAAAGQAAAAAAAAAzMzMAAAAAABQAAAAUAAAAGQAAABkAAAAAAAAABcAAAAUAAAAAAAAAAAAAAD/fwAA/38AAAAAAAAJAAAABAAAAEoAAAAeAAAAaAAAAAAAAAAAAAAAAAAAAAAAAAAAAAAAECcAABAnAAAAAAAAAAAAAAAAAAAAAAAAAAAAAAAAAAAAAAAAAAAAABQAAAAAAAAAwMD/AAAAAABkAAAAMgAAAAAAAABkAAAAAAAAAH9/fwAKAAAAIgAAABgAAAAAAAAAAAAAAAAAAAAAAAAAAAAAAAAAAAAkAAAAJAAAAAAAAAAHAAAAAAAAAAAAAAAAAAAAAAAAAAAAAAAAAAAAf39/ACUAAABYAAAAAAAAAAAAAAAAAAAAAAAAAAAAAAAAAAAAAAAAAAAAAAAAAAAAAAAAAAAAAAA/AAAAAAAAAKCGAQAAAAAAAAAAAAAAAAAMAAAAAQAAAAAAAAAAAAAAAAAAAB8AAABUAAAAwMDAAP///wEAAAAAAAAAAAAAAAAAAAAAAAAAAAAAAAAAAAAAAAAAAAAAAAJ/f38AgICAA8zMzADAwP8Af39/AAAAAAAAAAAAAAAAAAAAAAAAAAAAIQAAABgAAAAUAAAAmx0AABQgAACcLAAAZyEAAAAAAAAmAAAACAAAAP//////////"/>
+                <pr:smNativeData xmlns:pr="smNativeData" xmlns="smNativeData" val="SMDATA_15_NygcZBMAAAAlAAAAZAAAAA8BAAAAkAAAAEgAAACQAAAASAAAAAAAAAABAAAAAAAAAAEAAABQAAAAAAAAAAAA4D8AAAAAAADgPwAAAAAAAOA/AAAAAAAA4D8AAAAAAADgPwAAAAAAAOA/AAAAAAAA4D8AAAAAAADgPwAAAAAAAOA/AAAAAAAA4D8CAAAAjAAAAAEAAAAAAAAAwMDAAP///wgAAAAAAAAAAAAAAAAAAAAAAAAAAAAAAAAAAAAAZAAAAAEAAABAAAAAAAAAAAAAAAAAAAAAAAAAAAAAAAAAAAAAAAAAAAAAAAAAAAAAAAAAAAAAAAAAAAAAAAAAAAAAAAAAAAAAAAAAAAAAAAAAAAAAAAAAAAAAAAAAAAAAFAAAADwAAAABAAAAAAAAAAAAAAkUAAAAAQAAABQAAAAUAAAAFAAAAAEAAAAAAAAAZAAAAGQAAAAAAAAAZAAAAGQAAAAVAAAAYAAAAAAAAAAAAAAADwAAACADAAAAAAAAAAAAAAEAAACgMgAAVgcAAKr4//8BAAAAf39/AAEAAABkAAAAAAAAABQAAABAHwAAAAAAACYAAAAAAAAAwOD//wAAAAAmAAAAZAAAABYAAABMAAAAAAAAAAAAAAAEAAAAAAAAAAEAAACAgIAKAAAAACgAAAAoAAAAZAAAAGQAAAAAAAAAzMzMAAAAAABQAAAAUAAAAGQAAABkAAAAAAAAABcAAAAUAAAAAAAAAAAAAAD/fwAA/38AAAAAAAAJAAAABAAAAEoAAAAeAAAAaAAAAAAAAAAAAAAAAAAAAAAAAAAAAAAAECcAABAnAAAAAAAAAAAAAAAAAAAAAAAAAAAAAAAAAAAAAAAAAAAAABQAAAAAAAAAwMD/AAAAAABkAAAAMgAAAAAAAABkAAAAAAAAAH9/fwAKAAAAIgAAABgAAAAAAAAAAAAAAAAAAAAAAAAAAAAAAAAAAAAkAAAAJAAAAAAAAAAHAAAAAAAAAAAAAAAAAAAAAAAAAAAAAAAAAAAAf39/ACUAAABYAAAAAAAAAAAAAAAAAAAAAAAAAAAAAAAAAAAAAAAAAAAAAAAAAAAAAAAAAAAAAAA/AAAAAAAAAKCGAQAAAAAAAAAAAAAAAAAMAAAAAQAAAAAAAAAAAAAAAAAAAB8AAABUAAAAwMDAAP///wEAAAAAAAAAAAAAAAAAAAAAAAAAAAAAAAAAAAAAAAAAAAAAAAJ/f38AgICAA8zMzADAwP8Af39/AAAAAAAAAAAAAAAAAAAAAAAAAAAAIQAAABgAAAAUAAAAmx0AABQgAACcLAAAZyEAAAAAAAAmAAAACAAAAP//////////"/>
               </a:ext>
             </a:extLst>
           </p:cNvSpPr>
@@ -6906,7 +6939,7 @@
           <p:cNvSpPr txBox="1">
             <a:extLst>
               <a:ext uri="smNativeData">
-                <pr:smNativeData xmlns:pr="smNativeData" xmlns="smNativeData" val="SMDATA_15_ucsbZBMAAAAlAAAAEgAAAA8BAAAAkAAAAEgAAACQAAAASAAAAAAAAAAAAAAAAAAAAAEAAABQAAAAAAAAAAAA4D8AAAAAAADgPwAAAAAAAOA/AAAAAAAA4D8AAAAAAADgPwAAAAAAAOA/AAAAAAAA4D8AAAAAAADgPwAAAAAAAOA/AAAAAAAA4D8CAAAAjAAAAAAAAAAAAAAAu+DjDP///wgAAAAAAAAAAAAAAAAAAAAAAAAAAAAAAAAAAAAAZAAAAAEAAABAAAAAAAAAAAAAAAAAAAAAAAAAAAAAAAAAAAAAAAAAAAAAAAAAAAAAAAAAAAAAAAAAAAAAAAAAAAAAAAAAAAAAAAAAAAAAAAAAAAAAAAAAAAAAAAAAAAAAFAAAADwAAAAAAAAAAAAAAAAAAAkUAAAAAQAAABQAAAAUAAAAFAAAAAEAAAAAAAAAZAAAAGQAAAAAAAAAZAAAAGQAAAAVAAAAYAAAAAAAAAAAAAAADwAAACADAAAAAAAAAAAAAAEAAACgMgAAVgcAAKr4//8BAAAAf39/AAEAAABkAAAAAAAAABQAAABAHwAAAAAAACYAAAAAAAAAwOD//wAAAAAmAAAAZAAAABYAAABMAAAAAAAAAAAAAAAEAAAAAAAAAAEAAACAgIAKAAAAACgAAAAoAAAAZAAAAGQAAAAAAAAAzMzMAAAAAABQAAAAUAAAAGQAAABkAAAAAAAAABcAAAAUAAAAAAAAANwIAAD/fwAA/38AAAAAAAAJAAAABAAAAAAAAAAeAAAAaAAAAAAAAAAAAAAAAAAAAAAAAAAAAAAAECcAABAnAAAAAAAAAAAAAAAAAAAAAAAAAAAAAAAAAAAAAAAAAAAAABQAAAAAAAAAwMD/AAAAAABkAAAAMgAAAAAAAABkAAAAAAAAAH9/fwAKAAAAIgAAABgAAAAAAAAAAAAAAAAAAAAAAAAAAAAAAAAAAAAkAAAAJAAAAAAAAAAHAAAAAAAAAAAAAAAAAAAAAAAAAAAAAAAAAAAAf39/ACUAAABYAAAAAAAAAAAAAAAAAAAAAAAAAAAAAAAAAAAAAAAAAAAAAAAAAAAAAAAAAAAAAAA/AAAAAAAAAKCGAQAAAAAAAAAAAAAAAAAMAAAAAQAAAAAAAAAAAAAAAAAAAB8AAABUAAAAu+DjBf///wEAAAAAAAAAAAAAAAAAAAAAAAAAAAAAAAAAAAAAAAAAAAAAAAJ/f38AgICAA8zMzADAwP8Af39/AAAAAAAAAAAAAAAAAAAAAAAAAAAAIQAAABgAAAAUAAAABS0AABQgAACsMwAAZyEAAAAAAAAmAAAACAAAAP//////////"/>
+                <pr:smNativeData xmlns:pr="smNativeData" xmlns="smNativeData" val="SMDATA_15_NygcZBMAAAAlAAAAEgAAAA8BAAAAkAAAAEgAAACQAAAASAAAAAAAAAAAAAAAAAAAAAEAAABQAAAAAAAAAAAA4D8AAAAAAADgPwAAAAAAAOA/AAAAAAAA4D8AAAAAAADgPwAAAAAAAOA/AAAAAAAA4D8AAAAAAADgPwAAAAAAAOA/AAAAAAAA4D8CAAAAjAAAAAAAAAAAAAAAu+DjDP///wgAAAAAAAAAAAAAAAAAAAAAAAAAAAAAAAAAAAAAZAAAAAEAAABAAAAAAAAAAAAAAAAAAAAAAAAAAAAAAAAAAAAAAAAAAAAAAAAAAAAAAAAAAAAAAAAAAAAAAAAAAAAAAAAAAAAAAAAAAAAAAAAAAAAAAAAAAAAAAAAAAAAAFAAAADwAAAAAAAAAAAAAAAAAAAkUAAAAAQAAABQAAAAUAAAAFAAAAAEAAAAAAAAAZAAAAGQAAAAAAAAAZAAAAGQAAAAVAAAAYAAAAAAAAAAAAAAADwAAACADAAAAAAAAAAAAAAEAAACgMgAAVgcAAKr4//8BAAAAf39/AAEAAABkAAAAAAAAABQAAABAHwAAAAAAACYAAAAAAAAAwOD//wAAAAAmAAAAZAAAABYAAABMAAAAAAAAAAAAAAAEAAAAAAAAAAEAAACAgIAKAAAAACgAAAAoAAAAZAAAAGQAAAAAAAAAzMzMAAAAAABQAAAAUAAAAGQAAABkAAAAAAAAABcAAAAUAAAAAAAAANwIAAD/fwAA/38AAAAAAAAJAAAABAAAAAAAAAAeAAAAaAAAAAAAAAAAAAAAAAAAAAAAAAAAAAAAECcAABAnAAAAAAAAAAAAAAAAAAAAAAAAAAAAAAAAAAAAAAAAAAAAABQAAAAAAAAAwMD/AAAAAABkAAAAMgAAAAAAAABkAAAAAAAAAH9/fwAKAAAAIgAAABgAAAAAAAAAAAAAAAAAAAAAAAAAAAAAAAAAAAAkAAAAJAAAAAAAAAAHAAAAAAAAAAAAAAAAAAAAAAAAAAAAAAAAAAAAf39/ACUAAABYAAAAAAAAAAAAAAAAAAAAAAAAAAAAAAAAAAAAAAAAAAAAAAAAAAAAAAAAAAAAAAA/AAAAAAAAAKCGAQAAAAAAAAAAAAAAAAAMAAAAAQAAAAAAAAAAAAAAAAAAAB8AAABUAAAAu+DjBf///wEAAAAAAAAAAAAAAAAAAAAAAAAAAAAAAAAAAAAAAAAAAAAAAAJ/f38AgICAA8zMzADAwP8Af39/AAAAAAAAAAAAAAAAAAAAAAAAAAAAIQAAABgAAAAUAAAABS0AABQgAACsMwAAZyEAAAAAAAAmAAAACAAAAP//////////"/>
               </a:ext>
             </a:extLst>
           </p:cNvSpPr>
@@ -6945,7 +6978,7 @@
           <p:cNvSpPr>
             <a:extLst>
               <a:ext uri="smNativeData">
-                <pr:smNativeData xmlns:pr="smNativeData" xmlns="smNativeData" val="SMDATA_15_ucsbZBMAAAAlAAAAZAAAAA8BAAAAkAAAAEgAAACQAAAASAAAAAAAAAABAAAAAAAAAAEAAABQAAAAAAAAAAAA4D8AAAAAAADgPwAAAAAAAOA/AAAAAAAA4D8AAAAAAADgPwAAAAAAAOA/AAAAAAAA4D8AAAAAAADgPwAAAAAAAOA/AAAAAAAA4D8CAAAAjAAAAAEAAAAAAAAAwMDAAP///wgAAAAAAAAAAAAAAAAAAAAAAAAAAAAAAAAAAAAAZAAAAAEAAABAAAAAAAAAAAAAAAAAAAAAAAAAAAAAAAAAAAAAAAAAAAAAAAAAAAAAAAAAAAAAAAAAAAAAAAAAAAAAAAAAAAAAAAAAAAAAAAAAAAAAAAAAAAAAAAAAAAAAFAAAADwAAAABAAAAAAAAAAAAAAkUAAAAAQAAABQAAAAUAAAAFAAAAAEAAAAAAAAAZAAAAGQAAAAAAAAAZAAAAGQAAAAVAAAAYAAAAAAAAAAAAAAADwAAACADAAAAAAAAAAAAAAEAAACgMgAAVgcAAKr4//8BAAAAf39/AAEAAABkAAAAAAAAABQAAABAHwAAAAAAACYAAAAAAAAAwOD//wAAAAAmAAAAZAAAABYAAABMAAAAAAAAAAAAAAAEAAAAAAAAAAEAAACAgIAKAAAAACgAAAAoAAAAZAAAAGQAAAAAAAAAzMzMAAAAAABQAAAAUAAAAGQAAABkAAAAAAAAABcAAAAUAAAAAAAAAAAAAAD/fwAA/38AAAAAAAAJAAAABAAAAAAAAAAeAAAAaAAAAAAAAAAAAAAAAAAAAAAAAAAAAAAAECcAABAnAAAAAAAAAAAAAAAAAAAAAAAAAAAAAAAAAAAAAAAAAAAAABQAAAAAAAAAwMD/AAAAAABkAAAAMgAAAAAAAABkAAAAAAAAAH9/fwAKAAAAIgAAABgAAAAAAAAAAAAAAAAAAAAAAAAAAAAAAAAAAAAkAAAAJAAAAAAAAAAHAAAAAAAAAAAAAAAAAAAAAAAAAAAAAAAAAAAAf39/ACUAAABYAAAAAAAAAAAAAAAAAAAAAAAAAAAAAAAAAAAAAAAAAAAAAAAAAAAAAAAAAAAAAAA/AAAAAAAAAKCGAQAAAAAAAAAAAAAAAAAMAAAAAQAAAAAAAAAAAAAAAAAAAB8AAABUAAAAwMDAAP///wEAAAAAAAAAAAAAAAAAAAAAAAAAAAAAAAAAAAAAAAAAAAAAAAJ/f38AgICAA8zMzADAwP8Af39/AAAAAAAAAAAAAAAAAAAAAAAAAAAAIQAAABgAAAAUAAAAmx0AAGchAACcLAAAuiIAAAAAAAAmAAAACAAAAP//////////"/>
+                <pr:smNativeData xmlns:pr="smNativeData" xmlns="smNativeData" val="SMDATA_15_NygcZBMAAAAlAAAAZAAAAA8BAAAAkAAAAEgAAACQAAAASAAAAAAAAAABAAAAAAAAAAEAAABQAAAAAAAAAAAA4D8AAAAAAADgPwAAAAAAAOA/AAAAAAAA4D8AAAAAAADgPwAAAAAAAOA/AAAAAAAA4D8AAAAAAADgPwAAAAAAAOA/AAAAAAAA4D8CAAAAjAAAAAEAAAAAAAAAwMDAAP///wgAAAAAAAAAAAAAAAAAAAAAAAAAAAAAAAAAAAAAZAAAAAEAAABAAAAAAAAAAAAAAAAAAAAAAAAAAAAAAAAAAAAAAAAAAAAAAAAAAAAAAAAAAAAAAAAAAAAAAAAAAAAAAAAAAAAAAAAAAAAAAAAAAAAAAAAAAAAAAAAAAAAAFAAAADwAAAABAAAAAAAAAAAAAAkUAAAAAQAAABQAAAAUAAAAFAAAAAEAAAAAAAAAZAAAAGQAAAAAAAAAZAAAAGQAAAAVAAAAYAAAAAAAAAAAAAAADwAAACADAAAAAAAAAAAAAAEAAACgMgAAVgcAAKr4//8BAAAAf39/AAEAAABkAAAAAAAAABQAAABAHwAAAAAAACYAAAAAAAAAwOD//wAAAAAmAAAAZAAAABYAAABMAAAAAAAAAAAAAAAEAAAAAAAAAAEAAACAgIAKAAAAACgAAAAoAAAAZAAAAGQAAAAAAAAAzMzMAAAAAABQAAAAUAAAAGQAAABkAAAAAAAAABcAAAAUAAAAAAAAAAAAAAD/fwAA/38AAAAAAAAJAAAABAAAAAAAAAAeAAAAaAAAAAAAAAAAAAAAAAAAAAAAAAAAAAAAECcAABAnAAAAAAAAAAAAAAAAAAAAAAAAAAAAAAAAAAAAAAAAAAAAABQAAAAAAAAAwMD/AAAAAABkAAAAMgAAAAAAAABkAAAAAAAAAH9/fwAKAAAAIgAAABgAAAAAAAAAAAAAAAAAAAAAAAAAAAAAAAAAAAAkAAAAJAAAAAAAAAAHAAAAAAAAAAAAAAAAAAAAAAAAAAAAAAAAAAAAf39/ACUAAABYAAAAAAAAAAAAAAAAAAAAAAAAAAAAAAAAAAAAAAAAAAAAAAAAAAAAAAAAAAAAAAA/AAAAAAAAAKCGAQAAAAAAAAAAAAAAAAAMAAAAAQAAAAAAAAAAAAAAAAAAAB8AAABUAAAAwMDAAP///wEAAAAAAAAAAAAAAAAAAAAAAAAAAAAAAAAAAAAAAAAAAAAAAAJ/f38AgICAA8zMzADAwP8Af39/AAAAAAAAAAAAAAAAAAAAAAAAAAAAIQAAABgAAAAUAAAAmx0AAGchAACcLAAAuiIAAAAAAAAmAAAACAAAAP//////////"/>
               </a:ext>
             </a:extLst>
           </p:cNvSpPr>
@@ -6991,7 +7024,7 @@
           <p:cNvSpPr txBox="1">
             <a:extLst>
               <a:ext uri="smNativeData">
-                <pr:smNativeData xmlns:pr="smNativeData" xmlns="smNativeData" val="SMDATA_15_ucsbZBMAAAAlAAAAEgAAAA8BAAAAkAAAAEgAAACQAAAASAAAAAAAAAAAAAAAAAAAAAEAAABQAAAAAAAAAAAA4D8AAAAAAADgPwAAAAAAAOA/AAAAAAAA4D8AAAAAAADgPwAAAAAAAOA/AAAAAAAA4D8AAAAAAADgPwAAAAAAAOA/AAAAAAAA4D8CAAAAjAAAAAAAAAAAAAAAu+DjDP///wgAAAAAAAAAAAAAAAAAAAAAAAAAAAAAAAAAAAAAZAAAAAEAAABAAAAAAAAAAAAAAAAAAAAAAAAAAAAAAAAAAAAAAAAAAAAAAAAAAAAAAAAAAAAAAAAAAAAAAAAAAAAAAAAAAAAAAAAAAAAAAAAAAAAAAAAAAAAAAAAAAAAAFAAAADwAAAAAAAAAAAAAAAAAAAkUAAAAAQAAABQAAAAUAAAAFAAAAAEAAAAAAAAAZAAAAGQAAAAAAAAAZAAAAGQAAAAVAAAAYAAAAAAAAAAAAAAADwAAACADAAAAAAAAAAAAAAEAAACgMgAAVgcAAKr4//8BAAAAf39/AAEAAABkAAAAAAAAABQAAABAHwAAAAAAACYAAAAAAAAAwOD//wAAAAAmAAAAZAAAABYAAABMAAAAAAAAAAAAAAAEAAAAAAAAAAEAAACAgIAKAAAAACgAAAAoAAAAZAAAAGQAAAAAAAAAzMzMAAAAAABQAAAAUAAAAGQAAABkAAAAAAAAABcAAAAUAAAAAAAAANwIAAD/fwAA/38AAAAAAAAJAAAABAAAAAAAAAAeAAAAaAAAAAAAAAAAAAAAAAAAAAAAAAAAAAAAECcAABAnAAAAAAAAAAAAAAAAAAAAAAAAAAAAAAAAAAAAAAAAAAAAABQAAAAAAAAAwMD/AAAAAABkAAAAMgAAAAAAAABkAAAAAAAAAH9/fwAKAAAAIgAAABgAAAAAAAAAAAAAAAAAAAAAAAAAAAAAAAAAAAAkAAAAJAAAAAAAAAAHAAAAAAAAAAAAAAAAAAAAAAAAAAAAAAAAAAAAf39/ACUAAABYAAAAAAAAAAAAAAAAAAAAAAAAAAAAAAAAAAAAAAAAAAAAAAAAAAAAAAAAAAAAAAA/AAAAAAAAAKCGAQAAAAAAAAAAAAAAAAAMAAAAAQAAAAAAAAAAAAAAAAAAAB8AAABUAAAAu+DjBf///wEAAAAAAAAAAAAAAAAAAAAAAAAAAAAAAAAAAAAAAAAAAAAAAAJ/f38AgICAA8zMzADAwP8Af39/AAAAAAAAAAAAAAAAAAAAAAAAAAAAIQAAABgAAAAUAAAADS0AAGchAAC0MwAAuiIAAAAAAAAmAAAACAAAAP//////////"/>
+                <pr:smNativeData xmlns:pr="smNativeData" xmlns="smNativeData" val="SMDATA_15_NygcZBMAAAAlAAAAEgAAAA8BAAAAkAAAAEgAAACQAAAASAAAAAAAAAAAAAAAAAAAAAEAAABQAAAAAAAAAAAA4D8AAAAAAADgPwAAAAAAAOA/AAAAAAAA4D8AAAAAAADgPwAAAAAAAOA/AAAAAAAA4D8AAAAAAADgPwAAAAAAAOA/AAAAAAAA4D8CAAAAjAAAAAAAAAAAAAAAu+DjDP///wgAAAAAAAAAAAAAAAAAAAAAAAAAAAAAAAAAAAAAZAAAAAEAAABAAAAAAAAAAAAAAAAAAAAAAAAAAAAAAAAAAAAAAAAAAAAAAAAAAAAAAAAAAAAAAAAAAAAAAAAAAAAAAAAAAAAAAAAAAAAAAAAAAAAAAAAAAAAAAAAAAAAAFAAAADwAAAAAAAAAAAAAAAAAAAkUAAAAAQAAABQAAAAUAAAAFAAAAAEAAAAAAAAAZAAAAGQAAAAAAAAAZAAAAGQAAAAVAAAAYAAAAAAAAAAAAAAADwAAACADAAAAAAAAAAAAAAEAAACgMgAAVgcAAKr4//8BAAAAf39/AAEAAABkAAAAAAAAABQAAABAHwAAAAAAACYAAAAAAAAAwOD//wAAAAAmAAAAZAAAABYAAABMAAAAAAAAAAAAAAAEAAAAAAAAAAEAAACAgIAKAAAAACgAAAAoAAAAZAAAAGQAAAAAAAAAzMzMAAAAAABQAAAAUAAAAGQAAABkAAAAAAAAABcAAAAUAAAAAAAAANwIAAD/fwAA/38AAAAAAAAJAAAABAAAAAAAAAAeAAAAaAAAAAAAAAAAAAAAAAAAAAAAAAAAAAAAECcAABAnAAAAAAAAAAAAAAAAAAAAAAAAAAAAAAAAAAAAAAAAAAAAABQAAAAAAAAAwMD/AAAAAABkAAAAMgAAAAAAAABkAAAAAAAAAH9/fwAKAAAAIgAAABgAAAAAAAAAAAAAAAAAAAAAAAAAAAAAAAAAAAAkAAAAJAAAAAAAAAAHAAAAAAAAAAAAAAAAAAAAAAAAAAAAAAAAAAAAf39/ACUAAABYAAAAAAAAAAAAAAAAAAAAAAAAAAAAAAAAAAAAAAAAAAAAAAAAAAAAAAAAAAAAAAA/AAAAAAAAAKCGAQAAAAAAAAAAAAAAAAAMAAAAAQAAAAAAAAAAAAAAAAAAAB8AAABUAAAAu+DjBf///wEAAAAAAAAAAAAAAAAAAAAAAAAAAAAAAAAAAAAAAAAAAAAAAAJ/f38AgICAA8zMzADAwP8Af39/AAAAAAAAAAAAAAAAAAAAAAAAAAAAIQAAABgAAAAUAAAADS0AAGchAAC0MwAAuiIAAAAAAAAmAAAACAAAAP//////////"/>
               </a:ext>
             </a:extLst>
           </p:cNvSpPr>
@@ -7030,7 +7063,7 @@
           <p:cNvSpPr txBox="1">
             <a:extLst>
               <a:ext uri="smNativeData">
-                <pr:smNativeData xmlns:pr="smNativeData" xmlns="smNativeData" val="SMDATA_15_ucsbZBMAAAAlAAAAEgAAAA8BAAAAkAAAAEgAAACQAAAASAAAAAAAAAAAAAAAAAAAAAEAAABQAAAAAAAAAAAA4D8AAAAAAADgPwAAAAAAAOA/AAAAAAAA4D8AAAAAAADgPwAAAAAAAOA/AAAAAAAA4D8AAAAAAADgPwAAAAAAAOA/AAAAAAAA4D8CAAAAjAAAAAAAAAAAAAAAu+DjDP///wgAAAAAAAAAAAAAAAAAAAAAAAAAAAAAAAAAAAAAZAAAAAEAAABAAAAAAAAAAAAAAAAAAAAAAAAAAAAAAAAAAAAAAAAAAAAAAAAAAAAAAAAAAAAAAAAAAAAAAAAAAAAAAAAAAAAAAAAAAAAAAAAAAAAAAAAAAAAAAAAAAAAAFAAAADwAAAAAAAAAAAAAAAAAAAkUAAAAAQAAABQAAAAUAAAAFAAAAAEAAAAAAAAAZAAAAGQAAAAAAAAAZAAAAGQAAAAVAAAAYAAAAAAAAAAAAAAADwAAACADAAAAAAAAAAAAAAEAAACgMgAAVgcAAKr4//8BAAAAf39/AAEAAABkAAAAAAAAABQAAABAHwAAAAAAACYAAAAAAAAAwOD//wAAAAAmAAAAZAAAABYAAABMAAAAAAAAAAAAAAAEAAAAAAAAAAEAAACAgIAKAAAAACgAAAAoAAAAZAAAAGQAAAAAAAAAzMzMAAAAAABQAAAAUAAAAGQAAABkAAAAAAAAABcAAAAUAAAAAAAAANwIAAD/fwAA/38AAAAAAAAJAAAABAAAAAAAAAAeAAAAaAAAAAAAAAAAAAAAAAAAAAAAAAAAAAAAECcAABAnAAAAAAAAAAAAAAAAAAAAAAAAAAAAAAAAAAAAAAAAAAAAABQAAAAAAAAAwMD/AAAAAABkAAAAMgAAAAAAAABkAAAAAAAAAH9/fwAKAAAAIgAAABgAAAAAAAAAAAAAAAAAAAAAAAAAAAAAAAAAAAAkAAAAJAAAAAAAAAAHAAAAAAAAAAAAAAAAAAAAAAAAAAAAAAAAAAAAf39/ACUAAABYAAAAAAAAAAAAAAAAAAAAAAAAAAAAAAAAAAAAAAAAAAAAAAAAAAAAAAAAAAAAAAA/AAAAAAAAAKCGAQAAAAAAAAAAAAAAAAAMAAAAAQAAAAAAAAAAAAAAAAAAAB8AAABUAAAAu+DjBf///wEAAAAAAAAAAAAAAAAAAAAAAAAAAAAAAAAAAAAAAAAAAAAAAAJ/f38AgICAA8zMzADAwP8Af39/AAAAAAAAAAAAAAAAAAAAAAAAAAAAIQAAABgAAAAUAAAADS0AALoiAAC0MwAADSQAAAAAAAAmAAAACAAAAP//////////"/>
+                <pr:smNativeData xmlns:pr="smNativeData" xmlns="smNativeData" val="SMDATA_15_NygcZBMAAAAlAAAAEgAAAA8BAAAAkAAAAEgAAACQAAAASAAAAAAAAAAAAAAAAAAAAAEAAABQAAAAAAAAAAAA4D8AAAAAAADgPwAAAAAAAOA/AAAAAAAA4D8AAAAAAADgPwAAAAAAAOA/AAAAAAAA4D8AAAAAAADgPwAAAAAAAOA/AAAAAAAA4D8CAAAAjAAAAAAAAAAAAAAAu+DjDP///wgAAAAAAAAAAAAAAAAAAAAAAAAAAAAAAAAAAAAAZAAAAAEAAABAAAAAAAAAAAAAAAAAAAAAAAAAAAAAAAAAAAAAAAAAAAAAAAAAAAAAAAAAAAAAAAAAAAAAAAAAAAAAAAAAAAAAAAAAAAAAAAAAAAAAAAAAAAAAAAAAAAAAFAAAADwAAAAAAAAAAAAAAAAAAAkUAAAAAQAAABQAAAAUAAAAFAAAAAEAAAAAAAAAZAAAAGQAAAAAAAAAZAAAAGQAAAAVAAAAYAAAAAAAAAAAAAAADwAAACADAAAAAAAAAAAAAAEAAACgMgAAVgcAAKr4//8BAAAAf39/AAEAAABkAAAAAAAAABQAAABAHwAAAAAAACYAAAAAAAAAwOD//wAAAAAmAAAAZAAAABYAAABMAAAAAAAAAAAAAAAEAAAAAAAAAAEAAACAgIAKAAAAACgAAAAoAAAAZAAAAGQAAAAAAAAAzMzMAAAAAABQAAAAUAAAAGQAAABkAAAAAAAAABcAAAAUAAAAAAAAANwIAAD/fwAA/38AAAAAAAAJAAAABAAAAAAAAAAeAAAAaAAAAAAAAAAAAAAAAAAAAAAAAAAAAAAAECcAABAnAAAAAAAAAAAAAAAAAAAAAAAAAAAAAAAAAAAAAAAAAAAAABQAAAAAAAAAwMD/AAAAAABkAAAAMgAAAAAAAABkAAAAAAAAAH9/fwAKAAAAIgAAABgAAAAAAAAAAAAAAAAAAAAAAAAAAAAAAAAAAAAkAAAAJAAAAAAAAAAHAAAAAAAAAAAAAAAAAAAAAAAAAAAAAAAAAAAAf39/ACUAAABYAAAAAAAAAAAAAAAAAAAAAAAAAAAAAAAAAAAAAAAAAAAAAAAAAAAAAAAAAAAAAAA/AAAAAAAAAKCGAQAAAAAAAAAAAAAAAAAMAAAAAQAAAAAAAAAAAAAAAAAAAB8AAABUAAAAu+DjBf///wEAAAAAAAAAAAAAAAAAAAAAAAAAAAAAAAAAAAAAAAAAAAAAAAJ/f38AgICAA8zMzADAwP8Af39/AAAAAAAAAAAAAAAAAAAAAAAAAAAAIQAAABgAAAAUAAAADS0AALoiAAC0MwAADSQAAAAAAAAmAAAACAAAAP//////////"/>
               </a:ext>
             </a:extLst>
           </p:cNvSpPr>
@@ -7069,7 +7102,7 @@
           <p:cNvCxnSpPr>
             <a:extLst>
               <a:ext uri="smNativeData">
-                <pr:smNativeData xmlns:pr="smNativeData" xmlns="smNativeData" val="SMDATA_15_ucsbZBMAAAAlAAAADQAAAA8BAAAAkAAAAEgAAACQAAAASAAAAAAAAAAAAAAAAAAAAAEAAABQAAAAAAAAAAAA4D8AAAAAAADgPwAAAAAAAOA/AAAAAAAA4D8AAAAAAADgPwAAAAAAAOA/AAAAAAAA4D8AAAAAAADgPwAAAAAAAOA/AAAAAAAA4D8CAAAAjAAAAAAAAAAAAAAAu+DjDP///wgAAAAAAAAAAAAAAAAAAAAAAAAAAAAAAAAAAAAAZAAAAAEAAABAAAAAAAAAAAAAAAAAAAAAAAAAAAAAAAAAAAAAAAAAAAAAAAAAAAAAAAAAAAAAAAAAAAAAAAAAAAAAAAAAAAAAAAAAAAAAAAAAAAAAAAAAAAAAAAAAAAAAFAAAADwAAAABAAAAAAAAAAAAAAkUAAAAAQAAABQAAAAUAAAAFAAAAAEAAAAAAAAAZAAAAGQAAAABAAAAlgAAAJYAAAAVAAAAYAAAAAAAAAAAAAAADwAAACADAAAAAAAAAAAAAAEAAACgMgAAVgcAAKr4//8BAAAAf39/AAEAAABkAAAAAAAAABQAAABAHwAAAAAAACYAAAAAAAAAwOD//wAAAAAmAAAAZAAAABYAAABMAAAAAAAAAAAAAAAEAAAAAAAAAAEAAACAgIAKAAAAACgAAAAoAAAAZAAAAGQAAAAAAAAAzMzMAAAAAABQAAAAUAAAAGQAAABkAAAAAAAAABcAAAAUAAAAAAAAAAAAAAD/fwAA/38AAAAAAAAJAAAABAAAAAAAAAAeAAAAaAAAAAAAAAAAAAAAAAAAAAAAAAAAAAAAECcAABAnAAAAAAAAAAAAAAAAAAAAAAAAAAAAAAAAAAAAAAAAAAAAABQAAAAAAAAAwMD/AAAAAABkAAAAMgAAAAAAAABkAAAAAAAAAH9/fwAKAAAAIgAAABgAAAAAAAAAAAAAAAAAAAAAAAAAAAAAAAAAAAAkAAAAJAAAAAAAAAAHAAAAAAAAAAAAAAAAAAAAAAAAAAAAAAAAAAAAf39/ACUAAABYAAAAAAAAAAAAAAAAAAAAAAAAAAAAAAAAAAAAAAAAAAAAAAAAAAAAAAAAAAAAAAA/AAAAAAAAAKCGAQAAAAAAAAAAAAAAAAAMAAAAAQAAAAAAAAAAAAAAAAAAAB8AAABUAAAAu+DjBf///wEAAAAAAAAAAAAAAAAAAAAAAAAAAAAAAAAAAAAAAAAAAAAAAAJ/f38AgICAA8zMzADAwP8Af39/AAAAAAAAAAAAAAAAAAAAAAAAAAAAIQAAABgAAAAUAAAArjMAADQTAAByNQAANBMAAAAAAAAmAAAACAAAAP//////////"/>
+                <pr:smNativeData xmlns:pr="smNativeData" xmlns="smNativeData" val="SMDATA_15_NygcZBMAAAAlAAAADQAAAA8BAAAAkAAAAEgAAACQAAAASAAAAAAAAAAAAAAAAAAAAAEAAABQAAAAAAAAAAAA4D8AAAAAAADgPwAAAAAAAOA/AAAAAAAA4D8AAAAAAADgPwAAAAAAAOA/AAAAAAAA4D8AAAAAAADgPwAAAAAAAOA/AAAAAAAA4D8CAAAAjAAAAAAAAAAAAAAAu+DjDP///wgAAAAAAAAAAAAAAAAAAAAAAAAAAAAAAAAAAAAAZAAAAAEAAABAAAAAAAAAAAAAAAAAAAAAAAAAAAAAAAAAAAAAAAAAAAAAAAAAAAAAAAAAAAAAAAAAAAAAAAAAAAAAAAAAAAAAAAAAAAAAAAAAAAAAAAAAAAAAAAAAAAAAFAAAADwAAAABAAAAAAAAAAAAAAkUAAAAAQAAABQAAAAUAAAAFAAAAAEAAAAAAAAAZAAAAGQAAAABAAAAlgAAAJYAAAAVAAAAYAAAAAAAAAAAAAAADwAAACADAAAAAAAAAAAAAAEAAACgMgAAVgcAAKr4//8BAAAAf39/AAEAAABkAAAAAAAAABQAAABAHwAAAAAAACYAAAAAAAAAwOD//wAAAAAmAAAAZAAAABYAAABMAAAAAAAAAAAAAAAEAAAAAAAAAAEAAACAgIAKAAAAACgAAAAoAAAAZAAAAGQAAAAAAAAAzMzMAAAAAABQAAAAUAAAAGQAAABkAAAAAAAAABcAAAAUAAAAAAAAAAAAAAD/fwAA/38AAAAAAAAJAAAABAAAAAAAAAAeAAAAaAAAAAAAAAAAAAAAAAAAAAAAAAAAAAAAECcAABAnAAAAAAAAAAAAAAAAAAAAAAAAAAAAAAAAAAAAAAAAAAAAABQAAAAAAAAAwMD/AAAAAABkAAAAMgAAAAAAAABkAAAAAAAAAH9/fwAKAAAAIgAAABgAAAAAAAAAAAAAAAAAAAAAAAAAAAAAAAAAAAAkAAAAJAAAAAAAAAAHAAAAAAAAAAAAAAAAAAAAAAAAAAAAAAAAAAAAf39/ACUAAABYAAAAAAAAAAAAAAAAAAAAAAAAAAAAAAAAAAAAAAAAAAAAAAAAAAAAAAAAAAAAAAA/AAAAAAAAAKCGAQAAAAAAAAAAAAAAAAAMAAAAAQAAAAAAAAAAAAAAAAAAAB8AAABUAAAAu+DjBf///wEAAAAAAAAAAAAAAAAAAAAAAAAAAAAAAAAAAAAAAAAAAAAAAAJ/f38AgICAA8zMzADAwP8Af39/AAAAAAAAAAAAAAAAAAAAAAAAAAAAIQAAABgAAAAUAAAArjMAADQTAAByNQAANBMAAAAAAAAmAAAACAAAAP//////////"/>
               </a:ext>
             </a:extLst>
           </p:cNvCxnSpPr>
@@ -7101,7 +7134,7 @@
           <p:cNvSpPr>
             <a:extLst>
               <a:ext uri="smNativeData">
-                <pr:smNativeData xmlns:pr="smNativeData" xmlns="smNativeData" val="SMDATA_15_ucsbZBMAAAAlAAAAZAAAAA8BAAAAkAAAAEgAAACQAAAASAAAAAAAAAABAAAAAAAAAAEAAABQAAAAAAAAAAAA4D8AAAAAAADgPwAAAAAAAOA/AAAAAAAA4D8AAAAAAADgPwAAAAAAAOA/AAAAAAAA4D8AAAAAAADgPwAAAAAAAOA/AAAAAAAA4D8CAAAAjAAAAAEAAAAAAAAAAJmZDv///wgAAAAAAAAAAAAAAAAAAAAAAAAAAAAAAAAAAAAAZAAAAAEAAABAAAAAAAAAAAAAAAAAAAAAAAAAAAAAAAAAAAAAAAAAAAAAAAAAAAAAAAAAAAAAAAAAAAAAAAAAAAAAAAAAAAAAAAAAAAAAAAAAAAAAAAAAAAAAAAAAAAAAFAAAADwAAAABAAAAAAAAAAAAAAkUAAAAAQAAABQAAAAUAAAAFAAAAAEAAAAAAAAAZAAAAGQAAAAAAAAAZAAAAGQAAAAVAAAAYAAAAAAAAAAAAAAADwAAACADAAAAAAAAAAAAAAEAAACgMgAAVgcAAKr4//8BAAAAf39/AAEAAABkAAAAAAAAABQAAABAHwAAAAAAACYAAAAAAAAAwOD//wAAAAAmAAAAZAAAABYAAABMAAAAAAAAAAAAAAAEAAAAAAAAAAEAAACAgIAKAAAAACgAAAAoAAAAZAAAAGQAAAAAAAAAzMzMAAAAAABQAAAAUAAAAGQAAABkAAAAAAAAABcAAAAUAAAAAAAAAAAAAAD/fwAA/38AAAAAAAAJAAAABAAAAAAAAAAeAAAAaAAAAAAAAAAAAAAAAAAAAAAAAAAAAAAAECcAABAnAAAAAAAAAAAAAAAAAAAAAAAAAAAAAAAAAAAAAAAAAAAAABQAAAAAAAAAwMD/AAAAAABkAAAAMgAAAAAAAABkAAAAAAAAAH9/fwAKAAAAIgAAABgAAAAAAAAAAAAAAAAAAAAAAAAAAAAAAAAAAAAkAAAAJAAAAAAAAAAHAAAAAAAAAAAAAAAAAAAAAAAAAAAAAAAAAAAAf39/ACUAAABYAAAAAAAAAAAAAAAAAAAAAAAAAAAAAAAAAAAAAAAAAAAAAAAAAAAAAAAAAAAAAAA/AAAAAAAAAKCGAQAAAAAAAAAAAAAAAAAMAAAAAQAAAAAAAAAAAAAAAAAAAB8AAABUAAAAAJmZB////wEAAAAAAAAAAAAAAAAAAAAAAAAAAAAAAAAAAAAAAAAAAAAAAAJ/f38AgICAA8zMzADAwP8Af39/AAAAAAAAAAAAAAAAAAAAAAAAAAAAIQAAABgAAAAUAAAAcjUAAIoSAABzRAAA3RMAAAAAAAAmAAAACAAAAP//////////"/>
+                <pr:smNativeData xmlns:pr="smNativeData" xmlns="smNativeData" val="SMDATA_15_NygcZBMAAAAlAAAAZAAAAA8BAAAAkAAAAEgAAACQAAAASAAAAAAAAAABAAAAAAAAAAEAAABQAAAAAAAAAAAA4D8AAAAAAADgPwAAAAAAAOA/AAAAAAAA4D8AAAAAAADgPwAAAAAAAOA/AAAAAAAA4D8AAAAAAADgPwAAAAAAAOA/AAAAAAAA4D8CAAAAjAAAAAEAAAAAAAAAAJmZDv///wgAAAAAAAAAAAAAAAAAAAAAAAAAAAAAAAAAAAAAZAAAAAEAAABAAAAAAAAAAAAAAAAAAAAAAAAAAAAAAAAAAAAAAAAAAAAAAAAAAAAAAAAAAAAAAAAAAAAAAAAAAAAAAAAAAAAAAAAAAAAAAAAAAAAAAAAAAAAAAAAAAAAAFAAAADwAAAABAAAAAAAAAAAAAAkUAAAAAQAAABQAAAAUAAAAFAAAAAEAAAAAAAAAZAAAAGQAAAAAAAAAZAAAAGQAAAAVAAAAYAAAAAAAAAAAAAAADwAAACADAAAAAAAAAAAAAAEAAACgMgAAVgcAAKr4//8BAAAAf39/AAEAAABkAAAAAAAAABQAAABAHwAAAAAAACYAAAAAAAAAwOD//wAAAAAmAAAAZAAAABYAAABMAAAAAAAAAAAAAAAEAAAAAAAAAAEAAACAgIAKAAAAACgAAAAoAAAAZAAAAGQAAAAAAAAAzMzMAAAAAABQAAAAUAAAAGQAAABkAAAAAAAAABcAAAAUAAAAAAAAAAAAAAD/fwAA/38AAAAAAAAJAAAABAAAAAAAAAAeAAAAaAAAAAAAAAAAAAAAAAAAAAAAAAAAAAAAECcAABAnAAAAAAAAAAAAAAAAAAAAAAAAAAAAAAAAAAAAAAAAAAAAABQAAAAAAAAAwMD/AAAAAABkAAAAMgAAAAAAAABkAAAAAAAAAH9/fwAKAAAAIgAAABgAAAAAAAAAAAAAAAAAAAAAAAAAAAAAAAAAAAAkAAAAJAAAAAAAAAAHAAAAAAAAAAAAAAAAAAAAAAAAAAAAAAAAAAAAf39/ACUAAABYAAAAAAAAAAAAAAAAAAAAAAAAAAAAAAAAAAAAAAAAAAAAAAAAAAAAAAAAAAAAAAA/AAAAAAAAAKCGAQAAAAAAAAAAAAAAAAAMAAAAAQAAAAAAAAAAAAAAAAAAAB8AAABUAAAAAJmZB////wEAAAAAAAAAAAAAAAAAAAAAAAAAAAAAAAAAAAAAAAAAAAAAAAJ/f38AgICAA8zMzADAwP8Af39/AAAAAAAAAAAAAAAAAAAAAAAAAAAAIQAAABgAAAAUAAAAcjUAAIoSAABzRAAA3RMAAAAAAAAmAAAACAAAAP//////////"/>
               </a:ext>
             </a:extLst>
           </p:cNvSpPr>
@@ -7155,7 +7188,7 @@
           <p:cNvCxnSpPr>
             <a:extLst>
               <a:ext uri="smNativeData">
-                <pr:smNativeData xmlns:pr="smNativeData" xmlns="smNativeData" val="SMDATA_15_ucsbZBMAAAAlAAAADQAAAA8BAAAAkAAAAEgAAACQAAAASAAAAAAAAAAAAAAAAAAAAAEAAABQAAAAAAAAAAAA4D8AAAAAAADgPwAAAAAAAOA/AAAAAAAA4D8AAAAAAADgPwAAAAAAAOA/AAAAAAAA4D8AAAAAAADgPwAAAAAAAOA/AAAAAAAA4D8CAAAAjAAAAAAAAAAAAAAAu+DjDP///wgAAAAAAAAAAAAAAAAAAAAAAAAAAAAAAAAAAAAAZAAAAAEAAABAAAAAAAAAAAAAAAAAAAAAAAAAAAAAAAAAAAAAAAAAAAAAAAAAAAAAAAAAAAAAAAAAAAAAAAAAAAAAAAAAAAAAAAAAAAAAAAAAAAAAAAAAAAAAAAAAAAAAFAAAADwAAAABAAAAAAAAAAAAAAkUAAAAAQAAABQAAAAUAAAAFAAAAAEAAAAAAAAAZAAAAGQAAAABAAAAlgAAAJYAAAAVAAAAYAAAAAAAAAAAAAAADwAAACADAAAAAAAAAAAAAAEAAACgMgAAVgcAAKr4//8BAAAAf39/AAEAAABkAAAAAAAAABQAAABAHwAAAAAAACYAAAAAAAAAwOD//wAAAAAmAAAAZAAAABYAAABMAAAAAAAAAAAAAAAEAAAAAAAAAAEAAACAgIAKAAAAACgAAAAoAAAAZAAAAGQAAAAAAAAAzMzMAAAAAABQAAAAUAAAAGQAAABkAAAAAAAAABcAAAAUAAAAAAAAAAAAAAD/fwAA/38AAAAAAAAJAAAABAAAAAAAAAAeAAAAaAAAAAAAAAAAAAAAAAAAAAAAAAAAAAAAECcAABAnAAAAAAAAAAAAAAAAAAAAAAAAAAAAAAAAAAAAAAAAAAAAABQAAAAAAAAAwMD/AAAAAABkAAAAMgAAAAAAAABkAAAAAAAAAH9/fwAKAAAAIgAAABgAAAAAAAAAAAAAAAAAAAAAAAAAAAAAAAAAAAAkAAAAJAAAAAAAAAAHAAAAAAAAAAAAAAAAAAAAAAAAAAAAAAAAAAAAf39/ACUAAABYAAAAAAAAAAAAAAAAAAAAAAAAAAAAAAAAAAAAAAAAAAAAAAAAAAAAAAAAAAAAAAA/AAAAAAAAAKCGAQAAAAAAAAAAAAAAAAAMAAAAAQAAAAAAAAAAAAAAAAAAAB8AAABUAAAAu+DjBf///wEAAAAAAAAAAAAAAAAAAAAAAAAAAAAAAAAAAAAAAAAAAAAAAAJ/f38AgICAA8zMzADAwP8Af39/AAAAAAAAAAAAAAAAAAAAAAAAAAAAIQAAABgAAAAUAAAArjMAAIAYAAByNQAAgBgAAAAAAAAmAAAACAAAAP//////////"/>
+                <pr:smNativeData xmlns:pr="smNativeData" xmlns="smNativeData" val="SMDATA_15_NygcZBMAAAAlAAAADQAAAA8BAAAAkAAAAEgAAACQAAAASAAAAAAAAAAAAAAAAAAAAAEAAABQAAAAAAAAAAAA4D8AAAAAAADgPwAAAAAAAOA/AAAAAAAA4D8AAAAAAADgPwAAAAAAAOA/AAAAAAAA4D8AAAAAAADgPwAAAAAAAOA/AAAAAAAA4D8CAAAAjAAAAAAAAAAAAAAAu+DjDP///wgAAAAAAAAAAAAAAAAAAAAAAAAAAAAAAAAAAAAAZAAAAAEAAABAAAAAAAAAAAAAAAAAAAAAAAAAAAAAAAAAAAAAAAAAAAAAAAAAAAAAAAAAAAAAAAAAAAAAAAAAAAAAAAAAAAAAAAAAAAAAAAAAAAAAAAAAAAAAAAAAAAAAFAAAADwAAAABAAAAAAAAAAAAAAkUAAAAAQAAABQAAAAUAAAAFAAAAAEAAAAAAAAAZAAAAGQAAAABAAAAlgAAAJYAAAAVAAAAYAAAAAAAAAAAAAAADwAAACADAAAAAAAAAAAAAAEAAACgMgAAVgcAAKr4//8BAAAAf39/AAEAAABkAAAAAAAAABQAAABAHwAAAAAAACYAAAAAAAAAwOD//wAAAAAmAAAAZAAAABYAAABMAAAAAAAAAAAAAAAEAAAAAAAAAAEAAACAgIAKAAAAACgAAAAoAAAAZAAAAGQAAAAAAAAAzMzMAAAAAABQAAAAUAAAAGQAAABkAAAAAAAAABcAAAAUAAAAAAAAAAAAAAD/fwAA/38AAAAAAAAJAAAABAAAAAAAAAAeAAAAaAAAAAAAAAAAAAAAAAAAAAAAAAAAAAAAECcAABAnAAAAAAAAAAAAAAAAAAAAAAAAAAAAAAAAAAAAAAAAAAAAABQAAAAAAAAAwMD/AAAAAABkAAAAMgAAAAAAAABkAAAAAAAAAH9/fwAKAAAAIgAAABgAAAAAAAAAAAAAAAAAAAAAAAAAAAAAAAAAAAAkAAAAJAAAAAAAAAAHAAAAAAAAAAAAAAAAAAAAAAAAAAAAAAAAAAAAf39/ACUAAABYAAAAAAAAAAAAAAAAAAAAAAAAAAAAAAAAAAAAAAAAAAAAAAAAAAAAAAAAAAAAAAA/AAAAAAAAAKCGAQAAAAAAAAAAAAAAAAAMAAAAAQAAAAAAAAAAAAAAAAAAAB8AAABUAAAAu+DjBf///wEAAAAAAAAAAAAAAAAAAAAAAAAAAAAAAAAAAAAAAAAAAAAAAAJ/f38AgICAA8zMzADAwP8Af39/AAAAAAAAAAAAAAAAAAAAAAAAAAAAIQAAABgAAAAUAAAArjMAAIAYAAByNQAAgBgAAAAAAAAmAAAACAAAAP//////////"/>
               </a:ext>
             </a:extLst>
           </p:cNvCxnSpPr>
@@ -7187,7 +7220,7 @@
           <p:cNvSpPr>
             <a:extLst>
               <a:ext uri="smNativeData">
-                <pr:smNativeData xmlns:pr="smNativeData" xmlns="smNativeData" val="SMDATA_15_ucsbZBMAAAAlAAAAZAAAAA8BAAAAkAAAAEgAAACQAAAASAAAAAAAAAABAAAAAAAAAAEAAABQAAAAAAAAAAAA4D8AAAAAAADgPwAAAAAAAOA/AAAAAAAA4D8AAAAAAADgPwAAAAAAAOA/AAAAAAAA4D8AAAAAAADgPwAAAAAAAOA/AAAAAAAA4D8CAAAAjAAAAAEAAAAAAAAAAJmZDv///wgAAAAAAAAAAAAAAAAAAAAAAAAAAAAAAAAAAAAAZAAAAAEAAABAAAAAAAAAAAAAAAAAAAAAAAAAAAAAAAAAAAAAAAAAAAAAAAAAAAAAAAAAAAAAAAAAAAAAAAAAAAAAAAAAAAAAAAAAAAAAAAAAAAAAAAAAAAAAAAAAAAAAFAAAADwAAAABAAAAAAAAAAAAAAkUAAAAAQAAABQAAAAUAAAAFAAAAAEAAAAAAAAAZAAAAGQAAAAAAAAAZAAAAGQAAAAVAAAAYAAAAAAAAAAAAAAADwAAACADAAAAAAAAAAAAAAEAAACgMgAAVgcAAKr4//8BAAAAf39/AAEAAABkAAAAAAAAABQAAABAHwAAAAAAACYAAAAAAAAAwOD//wAAAAAmAAAAZAAAABYAAABMAAAAAAAAAAAAAAAEAAAAAAAAAAEAAACAgIAKAAAAACgAAAAoAAAAZAAAAGQAAAAAAAAAzMzMAAAAAABQAAAAUAAAAGQAAABkAAAAAAAAABcAAAAUAAAAAAAAAAAAAAD/fwAA/38AAAAAAAAJAAAABAAAAAAAAAAeAAAAaAAAAAAAAAAAAAAAAAAAAAAAAAAAAAAAECcAABAnAAAAAAAAAAAAAAAAAAAAAAAAAAAAAAAAAAAAAAAAAAAAABQAAAAAAAAAwMD/AAAAAABkAAAAMgAAAAAAAABkAAAAAAAAAH9/fwAKAAAAIgAAABgAAAAAAAAAAAAAAAAAAAAAAAAAAAAAAAAAAAAkAAAAJAAAAAAAAAAHAAAAAAAAAAAAAAAAAAAAAAAAAAAAAAAAAAAAf39/ACUAAABYAAAAAAAAAAAAAAAAAAAAAAAAAAAAAAAAAAAAAAAAAAAAAAAAAAAAAAAAAAAAAAA/AAAAAAAAAKCGAQAAAAAAAAAAAAAAAAAMAAAAAQAAAAAAAAAAAAAAAAAAAB8AAABUAAAAAJmZB////wEAAAAAAAAAAAAAAAAAAAAAAAAAAAAAAAAAAAAAAAAAAAAAAAJ/f38AgICAA8zMzADAwP8Af39/AAAAAAAAAAAAAAAAAAAAAAAAAAAAIQAAABgAAAAUAAAAcjUAANYXAABzRAAAKRkAAAAAAAAmAAAACAAAAP//////////"/>
+                <pr:smNativeData xmlns:pr="smNativeData" xmlns="smNativeData" val="SMDATA_15_NygcZBMAAAAlAAAAZAAAAA8BAAAAkAAAAEgAAACQAAAASAAAAAAAAAABAAAAAAAAAAEAAABQAAAAAAAAAAAA4D8AAAAAAADgPwAAAAAAAOA/AAAAAAAA4D8AAAAAAADgPwAAAAAAAOA/AAAAAAAA4D8AAAAAAADgPwAAAAAAAOA/AAAAAAAA4D8CAAAAjAAAAAEAAAAAAAAAAJmZDv///wgAAAAAAAAAAAAAAAAAAAAAAAAAAAAAAAAAAAAAZAAAAAEAAABAAAAAAAAAAAAAAAAAAAAAAAAAAAAAAAAAAAAAAAAAAAAAAAAAAAAAAAAAAAAAAAAAAAAAAAAAAAAAAAAAAAAAAAAAAAAAAAAAAAAAAAAAAAAAAAAAAAAAFAAAADwAAAABAAAAAAAAAAAAAAkUAAAAAQAAABQAAAAUAAAAFAAAAAEAAAAAAAAAZAAAAGQAAAAAAAAAZAAAAGQAAAAVAAAAYAAAAAAAAAAAAAAADwAAACADAAAAAAAAAAAAAAEAAACgMgAAVgcAAKr4//8BAAAAf39/AAEAAABkAAAAAAAAABQAAABAHwAAAAAAACYAAAAAAAAAwOD//wAAAAAmAAAAZAAAABYAAABMAAAAAAAAAAAAAAAEAAAAAAAAAAEAAACAgIAKAAAAACgAAAAoAAAAZAAAAGQAAAAAAAAAzMzMAAAAAABQAAAAUAAAAGQAAABkAAAAAAAAABcAAAAUAAAAAAAAAAAAAAD/fwAA/38AAAAAAAAJAAAABAAAAAAAAAAeAAAAaAAAAAAAAAAAAAAAAAAAAAAAAAAAAAAAECcAABAnAAAAAAAAAAAAAAAAAAAAAAAAAAAAAAAAAAAAAAAAAAAAABQAAAAAAAAAwMD/AAAAAABkAAAAMgAAAAAAAABkAAAAAAAAAH9/fwAKAAAAIgAAABgAAAAAAAAAAAAAAAAAAAAAAAAAAAAAAAAAAAAkAAAAJAAAAAAAAAAHAAAAAAAAAAAAAAAAAAAAAAAAAAAAAAAAAAAAf39/ACUAAABYAAAAAAAAAAAAAAAAAAAAAAAAAAAAAAAAAAAAAAAAAAAAAAAAAAAAAAAAAAAAAAA/AAAAAAAAAKCGAQAAAAAAAAAAAAAAAAAMAAAAAQAAAAAAAAAAAAAAAAAAAB8AAABUAAAAAJmZB////wEAAAAAAAAAAAAAAAAAAAAAAAAAAAAAAAAAAAAAAAAAAAAAAAJ/f38AgICAA8zMzADAwP8Af39/AAAAAAAAAAAAAAAAAAAAAAAAAAAAIQAAABgAAAAUAAAAcjUAANYXAABzRAAAKRkAAAAAAAAmAAAACAAAAP//////////"/>
               </a:ext>
             </a:extLst>
           </p:cNvSpPr>
@@ -7241,7 +7274,7 @@
           <p:cNvCxnSpPr>
             <a:extLst>
               <a:ext uri="smNativeData">
-                <pr:smNativeData xmlns:pr="smNativeData" xmlns="smNativeData" val="SMDATA_15_ucsbZBMAAAAlAAAADQAAAA8BAAAAkAAAAEgAAACQAAAASAAAAAAAAAAAAAAAAAAAAAEAAABQAAAAAAAAAAAA4D8AAAAAAADgPwAAAAAAAOA/AAAAAAAA4D8AAAAAAADgPwAAAAAAAOA/AAAAAAAA4D8AAAAAAADgPwAAAAAAAOA/AAAAAAAA4D8CAAAAjAAAAAAAAAAAAAAAu+DjDP///wgAAAAAAAAAAAAAAAAAAAAAAAAAAAAAAAAAAAAAZAAAAAEAAABAAAAAAAAAAAAAAAAAAAAAAAAAAAAAAAAAAAAAAAAAAAAAAAAAAAAAAAAAAAAAAAAAAAAAAAAAAAAAAAAAAAAAAAAAAAAAAAAAAAAAAAAAAAAAAAAAAAAAFAAAADwAAAABAAAAAAAAAAAAAAkUAAAAAQAAABQAAAAUAAAAFAAAAAEAAAAAAAAAZAAAAGQAAAABAAAAlgAAAJYAAAAVAAAAYAAAAAAAAAAAAAAADwAAACADAAAAAAAAAAAAAAEAAACgMgAAVgcAAKr4//8BAAAAf39/AAEAAABkAAAAAAAAABQAAABAHwAAAAAAACYAAAAAAAAAwOD//wAAAAAmAAAAZAAAABYAAABMAAAAAAAAAAAAAAAEAAAAAAAAAAEAAACAgIAKAAAAACgAAAAoAAAAZAAAAGQAAAAAAAAAzMzMAAAAAABQAAAAUAAAAGQAAABkAAAAAAAAABcAAAAUAAAAAAAAAAAAAAD/fwAA/38AAAAAAAAJAAAABAAAAEoAAAAeAAAAaAAAAAAAAAAAAAAAAAAAAAAAAAAAAAAAECcAABAnAAAAAAAAAAAAAAAAAAAAAAAAAAAAAAAAAAAAAAAAAAAAABQAAAAAAAAAwMD/AAAAAABkAAAAMgAAAAAAAABkAAAAAAAAAH9/fwAKAAAAIgAAABgAAAAAAAAAAAAAAAAAAAAAAAAAAAAAAAAAAAAkAAAAJAAAAAAAAAAHAAAAAAAAAAAAAAAAAAAAAAAAAAAAAAAAAAAAf39/ACUAAABYAAAAAAAAAAAAAAAAAAAAAAAAAAAAAAAAAAAAAAAAAAAAAAAAAAAAAAAAAAAAAAA/AAAAAAAAAKCGAQAAAAAAAAAAAAAAAAAMAAAAAQAAAAAAAAAAAAAAAAAAAB8AAABUAAAAu+DjBf///wEAAAAAAAAAAAAAAAAAAAAAAAAAAAAAAAAAAAAAAAAAAAAAAAJ/f38AgICAA8zMzADAwP8Af39/AAAAAAAAAAAAAAAAAAAAAAAAAAAAIQAAABgAAAAUAAAArjMAAMwdAAByNQAAzB0AAAAAAAAmAAAACAAAAP//////////"/>
+                <pr:smNativeData xmlns:pr="smNativeData" xmlns="smNativeData" val="SMDATA_15_NygcZBMAAAAlAAAADQAAAA8BAAAAkAAAAEgAAACQAAAASAAAAAAAAAAAAAAAAAAAAAEAAABQAAAAAAAAAAAA4D8AAAAAAADgPwAAAAAAAOA/AAAAAAAA4D8AAAAAAADgPwAAAAAAAOA/AAAAAAAA4D8AAAAAAADgPwAAAAAAAOA/AAAAAAAA4D8CAAAAjAAAAAAAAAAAAAAAu+DjDP///wgAAAAAAAAAAAAAAAAAAAAAAAAAAAAAAAAAAAAAZAAAAAEAAABAAAAAAAAAAAAAAAAAAAAAAAAAAAAAAAAAAAAAAAAAAAAAAAAAAAAAAAAAAAAAAAAAAAAAAAAAAAAAAAAAAAAAAAAAAAAAAAAAAAAAAAAAAAAAAAAAAAAAFAAAADwAAAABAAAAAAAAAAAAAAkUAAAAAQAAABQAAAAUAAAAFAAAAAEAAAAAAAAAZAAAAGQAAAABAAAAlgAAAJYAAAAVAAAAYAAAAAAAAAAAAAAADwAAACADAAAAAAAAAAAAAAEAAACgMgAAVgcAAKr4//8BAAAAf39/AAEAAABkAAAAAAAAABQAAABAHwAAAAAAACYAAAAAAAAAwOD//wAAAAAmAAAAZAAAABYAAABMAAAAAAAAAAAAAAAEAAAAAAAAAAEAAACAgIAKAAAAACgAAAAoAAAAZAAAAGQAAAAAAAAAzMzMAAAAAABQAAAAUAAAAGQAAABkAAAAAAAAABcAAAAUAAAAAAAAAAAAAAD/fwAA/38AAAAAAAAJAAAABAAAAEoAAAAeAAAAaAAAAAAAAAAAAAAAAAAAAAAAAAAAAAAAECcAABAnAAAAAAAAAAAAAAAAAAAAAAAAAAAAAAAAAAAAAAAAAAAAABQAAAAAAAAAwMD/AAAAAABkAAAAMgAAAAAAAABkAAAAAAAAAH9/fwAKAAAAIgAAABgAAAAAAAAAAAAAAAAAAAAAAAAAAAAAAAAAAAAkAAAAJAAAAAAAAAAHAAAAAAAAAAAAAAAAAAAAAAAAAAAAAAAAAAAAf39/ACUAAABYAAAAAAAAAAAAAAAAAAAAAAAAAAAAAAAAAAAAAAAAAAAAAAAAAAAAAAAAAAAAAAA/AAAAAAAAAKCGAQAAAAAAAAAAAAAAAAAMAAAAAQAAAAAAAAAAAAAAAAAAAB8AAABUAAAAu+DjBf///wEAAAAAAAAAAAAAAAAAAAAAAAAAAAAAAAAAAAAAAAAAAAAAAAJ/f38AgICAA8zMzADAwP8Af39/AAAAAAAAAAAAAAAAAAAAAAAAAAAAIQAAABgAAAAUAAAArjMAAMwdAAByNQAAzB0AAAAAAAAmAAAACAAAAP//////////"/>
               </a:ext>
             </a:extLst>
           </p:cNvCxnSpPr>
@@ -7273,7 +7306,7 @@
           <p:cNvSpPr>
             <a:extLst>
               <a:ext uri="smNativeData">
-                <pr:smNativeData xmlns:pr="smNativeData" xmlns="smNativeData" val="SMDATA_15_ucsbZBMAAAAlAAAAZAAAAA8BAAAAkAAAAEgAAACQAAAASAAAAAAAAAABAAAAAAAAAAEAAABQAAAAAAAAAAAA4D8AAAAAAADgPwAAAAAAAOA/AAAAAAAA4D8AAAAAAADgPwAAAAAAAOA/AAAAAAAA4D8AAAAAAADgPwAAAAAAAOA/AAAAAAAA4D8CAAAAjAAAAAEAAAAAAAAAAJmZDv///wgAAAAAAAAAAAAAAAAAAAAAAAAAAAAAAAAAAAAAZAAAAAEAAABAAAAAAAAAAAAAAAAAAAAAAAAAAAAAAAAAAAAAAAAAAAAAAAAAAAAAAAAAAAAAAAAAAAAAAAAAAAAAAAAAAAAAAAAAAAAAAAAAAAAAAAAAAAAAAAAAAAAAFAAAADwAAAABAAAAAAAAAAAAAAkUAAAAAQAAABQAAAAUAAAAFAAAAAEAAAAAAAAAZAAAAGQAAAAAAAAAZAAAAGQAAAAVAAAAYAAAAAAAAAAAAAAADwAAACADAAAAAAAAAAAAAAEAAACgMgAAVgcAAKr4//8BAAAAf39/AAEAAABkAAAAAAAAABQAAABAHwAAAAAAACYAAAAAAAAAwOD//wAAAAAmAAAAZAAAABYAAABMAAAAAAAAAAAAAAAEAAAAAAAAAAEAAACAgIAKAAAAACgAAAAoAAAAZAAAAGQAAAAAAAAAzMzMAAAAAABQAAAAUAAAAGQAAABkAAAAAAAAABcAAAAUAAAAAAAAAAAAAAD/fwAA/38AAAAAAAAJAAAABAAAAAAAAAAeAAAAaAAAAAAAAAAAAAAAAAAAAAAAAAAAAAAAECcAABAnAAAAAAAAAAAAAAAAAAAAAAAAAAAAAAAAAAAAAAAAAAAAABQAAAAAAAAAwMD/AAAAAABkAAAAMgAAAAAAAABkAAAAAAAAAH9/fwAKAAAAIgAAABgAAAAAAAAAAAAAAAAAAAAAAAAAAAAAAAAAAAAkAAAAJAAAAAAAAAAHAAAAAAAAAAAAAAAAAAAAAAAAAAAAAAAAAAAAf39/ACUAAABYAAAAAAAAAAAAAAAAAAAAAAAAAAAAAAAAAAAAAAAAAAAAAAAAAAAAAAAAAAAAAAA/AAAAAAAAAKCGAQAAAAAAAAAAAAAAAAAMAAAAAQAAAAAAAAAAAAAAAAAAAB8AAABUAAAAAJmZB////wEAAAAAAAAAAAAAAAAAAAAAAAAAAAAAAAAAAAAAAAAAAAAAAAJ/f38AgICAA8zMzADAwP8Af39/AAAAAAAAAAAAAAAAAAAAAAAAAAAAIQAAABgAAAAUAAAAcjUAACIdAABzRAAAdR4AAAAAAAAmAAAACAAAAP//////////"/>
+                <pr:smNativeData xmlns:pr="smNativeData" xmlns="smNativeData" val="SMDATA_15_NygcZBMAAAAlAAAAZAAAAA8BAAAAkAAAAEgAAACQAAAASAAAAAAAAAABAAAAAAAAAAEAAABQAAAAAAAAAAAA4D8AAAAAAADgPwAAAAAAAOA/AAAAAAAA4D8AAAAAAADgPwAAAAAAAOA/AAAAAAAA4D8AAAAAAADgPwAAAAAAAOA/AAAAAAAA4D8CAAAAjAAAAAEAAAAAAAAAAJmZDv///wgAAAAAAAAAAAAAAAAAAAAAAAAAAAAAAAAAAAAAZAAAAAEAAABAAAAAAAAAAAAAAAAAAAAAAAAAAAAAAAAAAAAAAAAAAAAAAAAAAAAAAAAAAAAAAAAAAAAAAAAAAAAAAAAAAAAAAAAAAAAAAAAAAAAAAAAAAAAAAAAAAAAAFAAAADwAAAABAAAAAAAAAAAAAAkUAAAAAQAAABQAAAAUAAAAFAAAAAEAAAAAAAAAZAAAAGQAAAAAAAAAZAAAAGQAAAAVAAAAYAAAAAAAAAAAAAAADwAAACADAAAAAAAAAAAAAAEAAACgMgAAVgcAAKr4//8BAAAAf39/AAEAAABkAAAAAAAAABQAAABAHwAAAAAAACYAAAAAAAAAwOD//wAAAAAmAAAAZAAAABYAAABMAAAAAAAAAAAAAAAEAAAAAAAAAAEAAACAgIAKAAAAACgAAAAoAAAAZAAAAGQAAAAAAAAAzMzMAAAAAABQAAAAUAAAAGQAAABkAAAAAAAAABcAAAAUAAAAAAAAAAAAAAD/fwAA/38AAAAAAAAJAAAABAAAAAAAAAAeAAAAaAAAAAAAAAAAAAAAAAAAAAAAAAAAAAAAECcAABAnAAAAAAAAAAAAAAAAAAAAAAAAAAAAAAAAAAAAAAAAAAAAABQAAAAAAAAAwMD/AAAAAABkAAAAMgAAAAAAAABkAAAAAAAAAH9/fwAKAAAAIgAAABgAAAAAAAAAAAAAAAAAAAAAAAAAAAAAAAAAAAAkAAAAJAAAAAAAAAAHAAAAAAAAAAAAAAAAAAAAAAAAAAAAAAAAAAAAf39/ACUAAABYAAAAAAAAAAAAAAAAAAAAAAAAAAAAAAAAAAAAAAAAAAAAAAAAAAAAAAAAAAAAAAA/AAAAAAAAAKCGAQAAAAAAAAAAAAAAAAAMAAAAAQAAAAAAAAAAAAAAAAAAAB8AAABUAAAAAJmZB////wEAAAAAAAAAAAAAAAAAAAAAAAAAAAAAAAAAAAAAAAAAAAAAAAJ/f38AgICAA8zMzADAwP8Af39/AAAAAAAAAAAAAAAAAAAAAAAAAAAAIQAAABgAAAAUAAAAcjUAACIdAABzRAAAdR4AAAAAAAAmAAAACAAAAP//////////"/>
               </a:ext>
             </a:extLst>
           </p:cNvSpPr>
@@ -7327,7 +7360,7 @@
           <p:cNvCxnSpPr>
             <a:extLst>
               <a:ext uri="smNativeData">
-                <pr:smNativeData xmlns:pr="smNativeData" xmlns="smNativeData" val="SMDATA_15_ucsbZBMAAAAlAAAADQAAAA8BAAAAkAAAAEgAAACQAAAASAAAAAAAAAAAAAAAAAAAAAEAAABQAAAAAAAAAAAA4D8AAAAAAADgPwAAAAAAAOA/AAAAAAAA4D8AAAAAAADgPwAAAAAAAOA/AAAAAAAA4D8AAAAAAADgPwAAAAAAAOA/AAAAAAAA4D8CAAAAjAAAAAAAAAAAAAAAu+DjDP///wgAAAAAAAAAAAAAAAAAAAAAAAAAAAAAAAAAAAAAZAAAAAEAAABAAAAAAAAAAAAAAAAAAAAAAAAAAAAAAAAAAAAAAAAAAAAAAAAAAAAAAAAAAAAAAAAAAAAAAAAAAAAAAAAAAAAAAAAAAAAAAAAAAAAAAAAAAAAAAAAAAAAAFAAAADwAAAABAAAAAAAAAAAAAAkUAAAAAQAAABQAAAAUAAAAFAAAAAEAAAAAAAAAZAAAAGQAAAABAAAAlgAAAJYAAAAVAAAAYAAAAAAAAAAAAAAADwAAACADAAAAAAAAAAAAAAEAAACgMgAAVgcAAKr4//8BAAAAf39/AAEAAABkAAAAAAAAABQAAABAHwAAAAAAACYAAAAAAAAAwOD//wAAAAAmAAAAZAAAABYAAABMAAAAAAAAAAAAAAAEAAAAAAAAAAEAAACAgIAKAAAAACgAAAAoAAAAZAAAAGQAAAAAAAAAzMzMAAAAAABQAAAAUAAAAGQAAABkAAAAAAAAABcAAAAUAAAAAAAAAAAAAAD/fwAA/38AAAAAAAAJAAAABAAAAAAAAAAeAAAAaAAAAAAAAAAAAAAAAAAAAAAAAAAAAAAAECcAABAnAAAAAAAAAAAAAAAAAAAAAAAAAAAAAAAAAAAAAAAAAAAAABQAAAAAAAAAwMD/AAAAAABkAAAAMgAAAAAAAABkAAAAAAAAAH9/fwAKAAAAIgAAABgAAAAAAAAAAAAAAAAAAAAAAAAAAAAAAAAAAAAkAAAAJAAAAAAAAAAHAAAAAAAAAAAAAAAAAAAAAAAAAAAAAAAAAAAAf39/ACUAAABYAAAAAAAAAAAAAAAAAAAAAAAAAAAAAAAAAAAAAAAAAAAAAAAAAAAAAAAAAAAAAAA/AAAAAAAAAKCGAQAAAAAAAAAAAAAAAAAMAAAAAQAAAAAAAAAAAAAAAAAAAB8AAABUAAAAu+DjBf///wEAAAAAAAAAAAAAAAAAAAAAAAAAAAAAAAAAAAAAAAAAAAAAAAJ/f38AgICAA8zMzADAwP8Af39/AAAAAAAAAAAAAAAAAAAAAAAAAAAAIQAAABgAAAAUAAAArTMAAGQjAABxNQAAZCMAAAAAAAAmAAAACAAAAP//////////"/>
+                <pr:smNativeData xmlns:pr="smNativeData" xmlns="smNativeData" val="SMDATA_15_NygcZBMAAAAlAAAADQAAAA8BAAAAkAAAAEgAAACQAAAASAAAAAAAAAAAAAAAAAAAAAEAAABQAAAAAAAAAAAA4D8AAAAAAADgPwAAAAAAAOA/AAAAAAAA4D8AAAAAAADgPwAAAAAAAOA/AAAAAAAA4D8AAAAAAADgPwAAAAAAAOA/AAAAAAAA4D8CAAAAjAAAAAAAAAAAAAAAu+DjDP///wgAAAAAAAAAAAAAAAAAAAAAAAAAAAAAAAAAAAAAZAAAAAEAAABAAAAAAAAAAAAAAAAAAAAAAAAAAAAAAAAAAAAAAAAAAAAAAAAAAAAAAAAAAAAAAAAAAAAAAAAAAAAAAAAAAAAAAAAAAAAAAAAAAAAAAAAAAAAAAAAAAAAAFAAAADwAAAABAAAAAAAAAAAAAAkUAAAAAQAAABQAAAAUAAAAFAAAAAEAAAAAAAAAZAAAAGQAAAABAAAAlgAAAJYAAAAVAAAAYAAAAAAAAAAAAAAADwAAACADAAAAAAAAAAAAAAEAAACgMgAAVgcAAKr4//8BAAAAf39/AAEAAABkAAAAAAAAABQAAABAHwAAAAAAACYAAAAAAAAAwOD//wAAAAAmAAAAZAAAABYAAABMAAAAAAAAAAAAAAAEAAAAAAAAAAEAAACAgIAKAAAAACgAAAAoAAAAZAAAAGQAAAAAAAAAzMzMAAAAAABQAAAAUAAAAGQAAABkAAAAAAAAABcAAAAUAAAAAAAAAAAAAAD/fwAA/38AAAAAAAAJAAAABAAAAAAAAAAeAAAAaAAAAAAAAAAAAAAAAAAAAAAAAAAAAAAAECcAABAnAAAAAAAAAAAAAAAAAAAAAAAAAAAAAAAAAAAAAAAAAAAAABQAAAAAAAAAwMD/AAAAAABkAAAAMgAAAAAAAABkAAAAAAAAAH9/fwAKAAAAIgAAABgAAAAAAAAAAAAAAAAAAAAAAAAAAAAAAAAAAAAkAAAAJAAAAAAAAAAHAAAAAAAAAAAAAAAAAAAAAAAAAAAAAAAAAAAAf39/ACUAAABYAAAAAAAAAAAAAAAAAAAAAAAAAAAAAAAAAAAAAAAAAAAAAAAAAAAAAAAAAAAAAAA/AAAAAAAAAKCGAQAAAAAAAAAAAAAAAAAMAAAAAQAAAAAAAAAAAAAAAAAAAB8AAABUAAAAu+DjBf///wEAAAAAAAAAAAAAAAAAAAAAAAAAAAAAAAAAAAAAAAAAAAAAAAJ/f38AgICAA8zMzADAwP8Af39/AAAAAAAAAAAAAAAAAAAAAAAAAAAAIQAAABgAAAAUAAAArTMAAGQjAABxNQAAZCMAAAAAAAAmAAAACAAAAP//////////"/>
               </a:ext>
             </a:extLst>
           </p:cNvCxnSpPr>
@@ -7359,7 +7392,7 @@
           <p:cNvSpPr>
             <a:extLst>
               <a:ext uri="smNativeData">
-                <pr:smNativeData xmlns:pr="smNativeData" xmlns="smNativeData" val="SMDATA_15_ucsbZBMAAAAlAAAAZAAAAA8BAAAAkAAAAEgAAACQAAAASAAAAAAAAAABAAAAAAAAAAEAAABQAAAAAAAAAAAA4D8AAAAAAADgPwAAAAAAAOA/AAAAAAAA4D8AAAAAAADgPwAAAAAAAOA/AAAAAAAA4D8AAAAAAADgPwAAAAAAAOA/AAAAAAAA4D8CAAAAjAAAAAEAAAAAAAAAAJmZDv///wgAAAAAAAAAAAAAAAAAAAAAAAAAAAAAAAAAAAAAZAAAAAEAAABAAAAAAAAAAAAAAAAAAAAAAAAAAAAAAAAAAAAAAAAAAAAAAAAAAAAAAAAAAAAAAAAAAAAAAAAAAAAAAAAAAAAAAAAAAAAAAAAAAAAAAAAAAAAAAAAAAAAAFAAAADwAAAABAAAAAAAAAAAAAAkUAAAAAQAAABQAAAAUAAAAFAAAAAEAAAAAAAAAZAAAAGQAAAAAAAAAZAAAAGQAAAAVAAAAYAAAAAAAAAAAAAAADwAAACADAAAAAAAAAAAAAAEAAACgMgAAVgcAAKr4//8BAAAAf39/AAEAAABkAAAAAAAAABQAAABAHwAAAAAAACYAAAAAAAAAwOD//wAAAAAmAAAAZAAAABYAAABMAAAAAAAAAAAAAAAEAAAAAAAAAAEAAACAgIAKAAAAACgAAAAoAAAAZAAAAGQAAAAAAAAAzMzMAAAAAABQAAAAUAAAAGQAAABkAAAAAAAAABcAAAAUAAAAAAAAAAAAAAD/fwAA/38AAAAAAAAJAAAABAAAAAAAAAAeAAAAaAAAAAAAAAAAAAAAAAAAAAAAAAAAAAAAECcAABAnAAAAAAAAAAAAAAAAAAAAAAAAAAAAAAAAAAAAAAAAAAAAABQAAAAAAAAAwMD/AAAAAABkAAAAMgAAAAAAAABkAAAAAAAAAH9/fwAKAAAAIgAAABgAAAAAAAAAAAAAAAAAAAAAAAAAAAAAAAAAAAAkAAAAJAAAAAAAAAAHAAAAAAAAAAAAAAAAAAAAAAAAAAAAAAAAAAAAf39/ACUAAABYAAAAAAAAAAAAAAAAAAAAAAAAAAAAAAAAAAAAAAAAAAAAAAAAAAAAAAAAAAAAAAA/AAAAAAAAAKCGAQAAAAAAAAAAAAAAAAAMAAAAAQAAAAAAAAAAAAAAAAAAAB8AAABUAAAAAJmZB////wEAAAAAAAAAAAAAAAAAAAAAAAAAAAAAAAAAAAAAAAAAAAAAAAJ/f38AgICAA8zMzADAwP8Af39/AAAAAAAAAAAAAAAAAAAAAAAAAAAAIQAAABgAAAAUAAAAcTUAALoiAAByRAAADSQAAAAAAAAmAAAACAAAAP//////////"/>
+                <pr:smNativeData xmlns:pr="smNativeData" xmlns="smNativeData" val="SMDATA_15_NygcZBMAAAAlAAAAZAAAAA8BAAAAkAAAAEgAAACQAAAASAAAAAAAAAABAAAAAAAAAAEAAABQAAAAAAAAAAAA4D8AAAAAAADgPwAAAAAAAOA/AAAAAAAA4D8AAAAAAADgPwAAAAAAAOA/AAAAAAAA4D8AAAAAAADgPwAAAAAAAOA/AAAAAAAA4D8CAAAAjAAAAAEAAAAAAAAAAJmZDv///wgAAAAAAAAAAAAAAAAAAAAAAAAAAAAAAAAAAAAAZAAAAAEAAABAAAAAAAAAAAAAAAAAAAAAAAAAAAAAAAAAAAAAAAAAAAAAAAAAAAAAAAAAAAAAAAAAAAAAAAAAAAAAAAAAAAAAAAAAAAAAAAAAAAAAAAAAAAAAAAAAAAAAFAAAADwAAAABAAAAAAAAAAAAAAkUAAAAAQAAABQAAAAUAAAAFAAAAAEAAAAAAAAAZAAAAGQAAAAAAAAAZAAAAGQAAAAVAAAAYAAAAAAAAAAAAAAADwAAACADAAAAAAAAAAAAAAEAAACgMgAAVgcAAKr4//8BAAAAf39/AAEAAABkAAAAAAAAABQAAABAHwAAAAAAACYAAAAAAAAAwOD//wAAAAAmAAAAZAAAABYAAABMAAAAAAAAAAAAAAAEAAAAAAAAAAEAAACAgIAKAAAAACgAAAAoAAAAZAAAAGQAAAAAAAAAzMzMAAAAAABQAAAAUAAAAGQAAABkAAAAAAAAABcAAAAUAAAAAAAAAAAAAAD/fwAA/38AAAAAAAAJAAAABAAAAAAAAAAeAAAAaAAAAAAAAAAAAAAAAAAAAAAAAAAAAAAAECcAABAnAAAAAAAAAAAAAAAAAAAAAAAAAAAAAAAAAAAAAAAAAAAAABQAAAAAAAAAwMD/AAAAAABkAAAAMgAAAAAAAABkAAAAAAAAAH9/fwAKAAAAIgAAABgAAAAAAAAAAAAAAAAAAAAAAAAAAAAAAAAAAAAkAAAAJAAAAAAAAAAHAAAAAAAAAAAAAAAAAAAAAAAAAAAAAAAAAAAAf39/ACUAAABYAAAAAAAAAAAAAAAAAAAAAAAAAAAAAAAAAAAAAAAAAAAAAAAAAAAAAAAAAAAAAAA/AAAAAAAAAKCGAQAAAAAAAAAAAAAAAAAMAAAAAQAAAAAAAAAAAAAAAAAAAB8AAABUAAAAAJmZB////wEAAAAAAAAAAAAAAAAAAAAAAAAAAAAAAAAAAAAAAAAAAAAAAAJ/f38AgICAA8zMzADAwP8Af39/AAAAAAAAAAAAAAAAAAAAAAAAAAAAIQAAABgAAAAUAAAAcTUAALoiAAByRAAADSQAAAAAAAAmAAAACAAAAP//////////"/>
               </a:ext>
             </a:extLst>
           </p:cNvSpPr>
@@ -7415,7 +7448,7 @@
             <a:endCxn id="56" idx="0"/>
             <a:extLst>
               <a:ext uri="smNativeData">
-                <pr:smNativeData xmlns:pr="smNativeData" xmlns="smNativeData" val="SMDATA_15_ucsbZBMAAAAlAAAADQAAAA8BAAAAkAAAAEgAAACQAAAASAAAAAAAAAAAAAAAAAAAAAEAAABQAAAAAAAAAAAA4D8AAAAAAADgPwAAAAAAAOA/AAAAAAAA4D8AAAAAAADgPwAAAAAAAOA/AAAAAAAA4D8AAAAAAADgPwAAAAAAAOA/AAAAAAAA4D8CAAAAjAAAAAAAAAAAAAAAu+DjDP///wgAAAAAAAAAAAAAAAAAAAAAAAAAAAAAAAAAAAAAZAAAAAEAAABAAAAAAAAAAAAAAAAAAAAAAAAAAAAAAAAAAAAAAAAAAAAAAAAAAAAAAAAAAAAAAAAAAAAAAAAAAAAAAAAAAAAAAAAAAAAAAAAAAAAAAAAAAAAAAAAAAAAAFAAAADwAAAABAAAAAAAAAAAAAAkUAAAAAQAAABQAAAAUAAAAFAAAAAEAAAAAAAAAZAAAAGQAAAABAAAAlgAAAJYAAAAVAAAAYAAAAAAAAAAAAAAADwAAACADAAAAAAAAAAAAAAEAAACgMgAAVgcAAKr4//8BAAAAf39/AAEAAABkAAAAAAAAABQAAABAHwAAAAAAACYAAAAAAAAAwOD//wAAAAAmAAAAZAAAABYAAABMAAAAAAAAAAAAAAAEAAAAAAAAAAEAAACAgIAKAAAAACgAAAAoAAAAZAAAAGQAAAAAAAAAzMzMAAAAAABQAAAAUAAAAGQAAABkAAAAAAAAABcAAAAUAAAAAAAAAAAAAAD/fwAA/38AAAAAAAAJAAAABAAAAAAAAAAeAAAAaAAAAAAAAAAAAAAAAAAAAAAAAAAAAAAAECcAABAnAAAAAAAAAAAAAAAAAAAAAAAAAAAAAAAAAAAAAAAAAAAAABQAAAAAAAAAwMD/AAAAAABkAAAAMgAAAAAAAABkAAAAAAAAAH9/fwAKAAAAIgAAABgAAAAAAAAAAAAAAAAAAAAAAAAAAAAAAAAAAAAkAAAAJAAAAAAAAAAHAAAAAAAAAAAAAAAAAAAAAAAAAAAAAAAAAAAAf39/ACUAAABYAAAAAAAAAAAAAAAAAAAAAAAAAAAAAAAAAAAAAAAAAAAAAAAAAAAAAAAAAAAAAAA/AAAAAAAAAKCGAQAAAAAAAAAAAAAAAAAMAAAAAQAAAAAAAAAAAAAAAAAAAB8AAABUAAAAu+DjBf///wEAAAAAAAAAAAAAAAAAAAAAAAAAAAAAAAAAAAAAAAAAAAAAAAJ/f38AgICAA8zMzADAwP8Af39/AAAAAAAAAAAAAAAAAAAAAAAAAAAAIQAAABgAAAAUAAAAHSUAAJEOAAAdJQAA5A8AAAAAAAAmAAAACAAAAP//////////"/>
+                <pr:smNativeData xmlns:pr="smNativeData" xmlns="smNativeData" val="SMDATA_15_NygcZBMAAAAlAAAADQAAAA8BAAAAkAAAAEgAAACQAAAASAAAAAAAAAAAAAAAAAAAAAEAAABQAAAAAAAAAAAA4D8AAAAAAADgPwAAAAAAAOA/AAAAAAAA4D8AAAAAAADgPwAAAAAAAOA/AAAAAAAA4D8AAAAAAADgPwAAAAAAAOA/AAAAAAAA4D8CAAAAjAAAAAAAAAAAAAAAu+DjDP///wgAAAAAAAAAAAAAAAAAAAAAAAAAAAAAAAAAAAAAZAAAAAEAAABAAAAAAAAAAAAAAAAAAAAAAAAAAAAAAAAAAAAAAAAAAAAAAAAAAAAAAAAAAAAAAAAAAAAAAAAAAAAAAAAAAAAAAAAAAAAAAAAAAAAAAAAAAAAAAAAAAAAAFAAAADwAAAABAAAAAAAAAAAAAAkUAAAAAQAAABQAAAAUAAAAFAAAAAEAAAAAAAAAZAAAAGQAAAABAAAAlgAAAJYAAAAVAAAAYAAAAAAAAAAAAAAADwAAACADAAAAAAAAAAAAAAEAAACgMgAAVgcAAKr4//8BAAAAf39/AAEAAABkAAAAAAAAABQAAABAHwAAAAAAACYAAAAAAAAAwOD//wAAAAAmAAAAZAAAABYAAABMAAAAAAAAAAAAAAAEAAAAAAAAAAEAAACAgIAKAAAAACgAAAAoAAAAZAAAAGQAAAAAAAAAzMzMAAAAAABQAAAAUAAAAGQAAABkAAAAAAAAABcAAAAUAAAAAAAAAAAAAAD/fwAA/38AAAAAAAAJAAAABAAAAAAAAAAeAAAAaAAAAAAAAAAAAAAAAAAAAAAAAAAAAAAAECcAABAnAAAAAAAAAAAAAAAAAAAAAAAAAAAAAAAAAAAAAAAAAAAAABQAAAAAAAAAwMD/AAAAAABkAAAAMgAAAAAAAABkAAAAAAAAAH9/fwAKAAAAIgAAABgAAAAAAAAAAAAAAAAAAAAAAAAAAAAAAAAAAAAkAAAAJAAAAAAAAAAHAAAAAAAAAAAAAAAAAAAAAAAAAAAAAAAAAAAAf39/ACUAAABYAAAAAAAAAAAAAAAAAAAAAAAAAAAAAAAAAAAAAAAAAAAAAAAAAAAAAAAAAAAAAAA/AAAAAAAAAKCGAQAAAAAAAAAAAAAAAAAMAAAAAQAAAAAAAAAAAAAAAAAAAB8AAABUAAAAu+DjBf///wEAAAAAAAAAAAAAAAAAAAAAAAAAAAAAAAAAAAAAAAAAAAAAAAJ/f38AgICAA8zMzADAwP8Af39/AAAAAAAAAAAAAAAAAAAAAAAAAAAAIQAAABgAAAAUAAAAHSUAAJEOAAAdJQAA5A8AAAAAAAAmAAAACAAAAP//////////"/>
               </a:ext>
             </a:extLst>
           </p:cNvCxnSpPr>
@@ -7449,7 +7482,7 @@
             <a:endCxn id="62" idx="0"/>
             <a:extLst>
               <a:ext uri="smNativeData">
-                <pr:smNativeData xmlns:pr="smNativeData" xmlns="smNativeData" val="SMDATA_15_ucsbZBMAAAAlAAAADQAAAA8BAAAAkAAAAEgAAACQAAAASAAAAAAAAAAAAAAAAAAAAAEAAABQAAAAAAAAAAAA4D8AAAAAAADgPwAAAAAAAOA/AAAAAAAA4D8AAAAAAADgPwAAAAAAAOA/AAAAAAAA4D8AAAAAAADgPwAAAAAAAOA/AAAAAAAA4D8CAAAAjAAAAAAAAAAAAAAAu+DjDP///wgAAAAAAAAAAAAAAAAAAAAAAAAAAAAAAAAAAAAAZAAAAAEAAABAAAAAAAAAAAAAAAAAAAAAAAAAAAAAAAAAAAAAAAAAAAAAAAAAAAAAAAAAAAAAAAAAAAAAAAAAAAAAAAAAAAAAAAAAAAAAAAAAAAAAAAAAAAAAAAAAAAAAFAAAADwAAAABAAAAAAAAAAAAAAkUAAAAAQAAABQAAAAUAAAAFAAAAAEAAAAAAAAAZAAAAGQAAAABAAAAlgAAAJYAAAAVAAAAYAAAAAAAAAAAAAAADwAAACADAAAAAAAAAAAAAAEAAACgMgAAVgcAAKr4//8BAAAAf39/AAEAAABkAAAAAAAAABQAAABAHwAAAAAAACYAAAAAAAAAwOD//wAAAAAmAAAAZAAAABYAAABMAAAAAAAAAAAAAAAEAAAAAAAAAAEAAACAgIAKAAAAACgAAAAoAAAAZAAAAGQAAAAAAAAAzMzMAAAAAABQAAAAUAAAAGQAAABkAAAAAAAAABcAAAAUAAAAAAAAAAAAAAD/fwAA/38AAAAAAAAJAAAABAAAAAAAAAAeAAAAaAAAAAAAAAAAAAAAAAAAAAAAAAAAAAAAECcAABAnAAAAAAAAAAAAAAAAAAAAAAAAAAAAAAAAAAAAAAAAAAAAABQAAAAAAAAAwMD/AAAAAABkAAAAMgAAAAAAAABkAAAAAAAAAH9/fwAKAAAAIgAAABgAAAAAAAAAAAAAAAAAAAAAAAAAAAAAAAAAAAAkAAAAJAAAAAAAAAAHAAAAAAAAAAAAAAAAAAAAAAAAAAAAAAAAAAAAf39/ACUAAABYAAAAAAAAAAAAAAAAAAAAAAAAAAAAAAAAAAAAAAAAAAAAAAAAAAAAAAAAAAAAAAA/AAAAAAAAAKCGAQAAAAAAAAAAAAAAAAAMAAAAAQAAAAAAAAAAAAAAAAAAAB8AAABUAAAAu+DjBf///wEAAAAAAAAAAAAAAAAAAAAAAAAAAAAAAAAAAAAAAAAAAAAAAAJ/f38AgICAA8zMzADAwP8Af39/AAAAAAAAAAAAAAAAAAAAAAAAAAAAIQAAABgAAAAUAAAAFSUAAN0TAAAdJQAAMBUAAAAAAAAmAAAACAAAAP//////////"/>
+                <pr:smNativeData xmlns:pr="smNativeData" xmlns="smNativeData" val="SMDATA_15_NygcZBMAAAAlAAAADQAAAA8BAAAAkAAAAEgAAACQAAAASAAAAAAAAAAAAAAAAAAAAAEAAABQAAAAAAAAAAAA4D8AAAAAAADgPwAAAAAAAOA/AAAAAAAA4D8AAAAAAADgPwAAAAAAAOA/AAAAAAAA4D8AAAAAAADgPwAAAAAAAOA/AAAAAAAA4D8CAAAAjAAAAAAAAAAAAAAAu+DjDP///wgAAAAAAAAAAAAAAAAAAAAAAAAAAAAAAAAAAAAAZAAAAAEAAABAAAAAAAAAAAAAAAAAAAAAAAAAAAAAAAAAAAAAAAAAAAAAAAAAAAAAAAAAAAAAAAAAAAAAAAAAAAAAAAAAAAAAAAAAAAAAAAAAAAAAAAAAAAAAAAAAAAAAFAAAADwAAAABAAAAAAAAAAAAAAkUAAAAAQAAABQAAAAUAAAAFAAAAAEAAAAAAAAAZAAAAGQAAAABAAAAlgAAAJYAAAAVAAAAYAAAAAAAAAAAAAAADwAAACADAAAAAAAAAAAAAAEAAACgMgAAVgcAAKr4//8BAAAAf39/AAEAAABkAAAAAAAAABQAAABAHwAAAAAAACYAAAAAAAAAwOD//wAAAAAmAAAAZAAAABYAAABMAAAAAAAAAAAAAAAEAAAAAAAAAAEAAACAgIAKAAAAACgAAAAoAAAAZAAAAGQAAAAAAAAAzMzMAAAAAABQAAAAUAAAAGQAAABkAAAAAAAAABcAAAAUAAAAAAAAAAAAAAD/fwAA/38AAAAAAAAJAAAABAAAAAAAAAAeAAAAaAAAAAAAAAAAAAAAAAAAAAAAAAAAAAAAECcAABAnAAAAAAAAAAAAAAAAAAAAAAAAAAAAAAAAAAAAAAAAAAAAABQAAAAAAAAAwMD/AAAAAABkAAAAMgAAAAAAAABkAAAAAAAAAH9/fwAKAAAAIgAAABgAAAAAAAAAAAAAAAAAAAAAAAAAAAAAAAAAAAAkAAAAJAAAAAAAAAAHAAAAAAAAAAAAAAAAAAAAAAAAAAAAAAAAAAAAf39/ACUAAABYAAAAAAAAAAAAAAAAAAAAAAAAAAAAAAAAAAAAAAAAAAAAAAAAAAAAAAAAAAAAAAA/AAAAAAAAAKCGAQAAAAAAAAAAAAAAAAAMAAAAAQAAAAAAAAAAAAAAAAAAAB8AAABUAAAAu+DjBf///wEAAAAAAAAAAAAAAAAAAAAAAAAAAAAAAAAAAAAAAAAAAAAAAAJ/f38AgICAA8zMzADAwP8Af39/AAAAAAAAAAAAAAAAAAAAAAAAAAAAIQAAABgAAAAUAAAAFSUAAN0TAAAdJQAAMBUAAAAAAAAmAAAACAAAAP//////////"/>
               </a:ext>
             </a:extLst>
           </p:cNvCxnSpPr>
@@ -7483,7 +7516,7 @@
             <a:endCxn id="68" idx="0"/>
             <a:extLst>
               <a:ext uri="smNativeData">
-                <pr:smNativeData xmlns:pr="smNativeData" xmlns="smNativeData" val="SMDATA_15_ucsbZBMAAAAlAAAADQAAAA8BAAAAkAAAAEgAAACQAAAASAAAAAAAAAAAAAAAAAAAAAEAAABQAAAAAAAAAAAA4D8AAAAAAADgPwAAAAAAAOA/AAAAAAAA4D8AAAAAAADgPwAAAAAAAOA/AAAAAAAA4D8AAAAAAADgPwAAAAAAAOA/AAAAAAAA4D8CAAAAjAAAAAAAAAAAAAAAu+DjDP///wgAAAAAAAAAAAAAAAAAAAAAAAAAAAAAAAAAAAAAZAAAAAEAAABAAAAAAAAAAAAAAAAAAAAAAAAAAAAAAAAAAAAAAAAAAAAAAAAAAAAAAAAAAAAAAAAAAAAAAAAAAAAAAAAAAAAAAAAAAAAAAAAAAAAAAAAAAAAAAAAAAAAAFAAAADwAAAABAAAAAAAAAAAAAAkUAAAAAQAAABQAAAAUAAAAFAAAAAEAAAAAAAAAZAAAAGQAAAABAAAAlgAAAJYAAAAVAAAAYAAAAAAAAAAAAAAADwAAACADAAAAAAAAAAAAAAEAAACgMgAAVgcAAKr4//8BAAAAf39/AAEAAABkAAAAAAAAABQAAABAHwAAAAAAACYAAAAAAAAAwOD//wAAAAAmAAAAZAAAABYAAABMAAAAAAAAAAAAAAAEAAAAAAAAAAEAAACAgIAKAAAAACgAAAAoAAAAZAAAAGQAAAAAAAAAzMzMAAAAAABQAAAAUAAAAGQAAABkAAAAAAAAABcAAAAUAAAAAAAAAAAAAAD/fwAA/38AAAAAAAAJAAAABAAAAAAAAAAeAAAAaAAAAAAAAAAAAAAAAAAAAAAAAAAAAAAAECcAABAnAAAAAAAAAAAAAAAAAAAAAAAAAAAAAAAAAAAAAAAAAAAAABQAAAAAAAAAwMD/AAAAAABkAAAAMgAAAAAAAABkAAAAAAAAAH9/fwAKAAAAIgAAABgAAAAAAAAAAAAAAAAAAAAAAAAAAAAAAAAAAAAkAAAAJAAAAAAAAAAHAAAAAAAAAAAAAAAAAAAAAAAAAAAAAAAAAAAAf39/ACUAAABYAAAAAAAAAAAAAAAAAAAAAAAAAAAAAAAAAAAAAAAAAAAAAAAAAAAAAAAAAAAAAAA/AAAAAAAAAKCGAQAAAAAAAAAAAAAAAAAMAAAAAQAAAAAAAAAAAAAAAAAAAB8AAABUAAAAu+DjBf///wEAAAAAAAAAAAAAAAAAAAAAAAAAAAAAAAAAAAAAAAAAAAAAAAJ/f38AgICAA8zMzADAwP8Af39/AAAAAAAAAAAAAAAAAAAAAAAAAAAAIQAAABgAAAAUAAAAFSUAACkZAAAcJQAAfBoAAAAAAAAmAAAACAAAAP//////////"/>
+                <pr:smNativeData xmlns:pr="smNativeData" xmlns="smNativeData" val="SMDATA_15_NygcZBMAAAAlAAAADQAAAA8BAAAAkAAAAEgAAACQAAAASAAAAAAAAAAAAAAAAAAAAAEAAABQAAAAAAAAAAAA4D8AAAAAAADgPwAAAAAAAOA/AAAAAAAA4D8AAAAAAADgPwAAAAAAAOA/AAAAAAAA4D8AAAAAAADgPwAAAAAAAOA/AAAAAAAA4D8CAAAAjAAAAAAAAAAAAAAAu+DjDP///wgAAAAAAAAAAAAAAAAAAAAAAAAAAAAAAAAAAAAAZAAAAAEAAABAAAAAAAAAAAAAAAAAAAAAAAAAAAAAAAAAAAAAAAAAAAAAAAAAAAAAAAAAAAAAAAAAAAAAAAAAAAAAAAAAAAAAAAAAAAAAAAAAAAAAAAAAAAAAAAAAAAAAFAAAADwAAAABAAAAAAAAAAAAAAkUAAAAAQAAABQAAAAUAAAAFAAAAAEAAAAAAAAAZAAAAGQAAAABAAAAlgAAAJYAAAAVAAAAYAAAAAAAAAAAAAAADwAAACADAAAAAAAAAAAAAAEAAACgMgAAVgcAAKr4//8BAAAAf39/AAEAAABkAAAAAAAAABQAAABAHwAAAAAAACYAAAAAAAAAwOD//wAAAAAmAAAAZAAAABYAAABMAAAAAAAAAAAAAAAEAAAAAAAAAAEAAACAgIAKAAAAACgAAAAoAAAAZAAAAGQAAAAAAAAAzMzMAAAAAABQAAAAUAAAAGQAAABkAAAAAAAAABcAAAAUAAAAAAAAAAAAAAD/fwAA/38AAAAAAAAJAAAABAAAAAAAAAAeAAAAaAAAAAAAAAAAAAAAAAAAAAAAAAAAAAAAECcAABAnAAAAAAAAAAAAAAAAAAAAAAAAAAAAAAAAAAAAAAAAAAAAABQAAAAAAAAAwMD/AAAAAABkAAAAMgAAAAAAAABkAAAAAAAAAH9/fwAKAAAAIgAAABgAAAAAAAAAAAAAAAAAAAAAAAAAAAAAAAAAAAAkAAAAJAAAAAAAAAAHAAAAAAAAAAAAAAAAAAAAAAAAAAAAAAAAAAAAf39/ACUAAABYAAAAAAAAAAAAAAAAAAAAAAAAAAAAAAAAAAAAAAAAAAAAAAAAAAAAAAAAAAAAAAA/AAAAAAAAAKCGAQAAAAAAAAAAAAAAAAAMAAAAAQAAAAAAAAAAAAAAAAAAAB8AAABUAAAAu+DjBf///wEAAAAAAAAAAAAAAAAAAAAAAAAAAAAAAAAAAAAAAAAAAAAAAAJ/f38AgICAA8zMzADAwP8Af39/AAAAAAAAAAAAAAAAAAAAAAAAAAAAIQAAABgAAAAUAAAAFSUAACkZAAAcJQAAfBoAAAAAAAAmAAAACAAAAP//////////"/>
               </a:ext>
             </a:extLst>
           </p:cNvCxnSpPr>
@@ -7517,7 +7550,7 @@
             <a:endCxn id="74" idx="0"/>
             <a:extLst>
               <a:ext uri="smNativeData">
-                <pr:smNativeData xmlns:pr="smNativeData" xmlns="smNativeData" val="SMDATA_15_ucsbZBMAAAAlAAAADQAAAA8BAAAAkAAAAEgAAACQAAAASAAAAAAAAAAAAAAAAAAAAAEAAABQAAAAAAAAAAAA4D8AAAAAAADgPwAAAAAAAOA/AAAAAAAA4D8AAAAAAADgPwAAAAAAAOA/AAAAAAAA4D8AAAAAAADgPwAAAAAAAOA/AAAAAAAA4D8CAAAAjAAAAAAAAAAAAAAAu+DjDP///wgAAAAAAAAAAAAAAAAAAAAAAAAAAAAAAAAAAAAAZAAAAAEAAABAAAAAAAAAAAAAAAAAAAAAAAAAAAAAAAAAAAAAAAAAAAAAAAAAAAAAAAAAAAAAAAAAAAAAAAAAAAAAAAAAAAAAAAAAAAAAAAAAAAAAAAAAAAAAAAAAAAAAFAAAADwAAAABAAAAAAAAAAAAAAkUAAAAAQAAABQAAAAUAAAAFAAAAAEAAAAAAAAAZAAAAGQAAAABAAAAlgAAAJYAAAAVAAAAYAAAAAAAAAAAAAAADwAAACADAAAAAAAAAAAAAAEAAACgMgAAVgcAAKr4//8BAAAAf39/AAEAAABkAAAAAAAAABQAAABAHwAAAAAAACYAAAAAAAAAwOD//wAAAAAmAAAAZAAAABYAAABMAAAAAAAAAAAAAAAEAAAAAAAAAAEAAACAgIAKAAAAACgAAAAoAAAAZAAAAGQAAAAAAAAAzMzMAAAAAABQAAAAUAAAAGQAAABkAAAAAAAAABcAAAAUAAAAAAAAAAAAAAD/fwAA/38AAAAAAAAJAAAABAAAAAAAAAAeAAAAaAAAAAAAAAAAAAAAAAAAAAAAAAAAAAAAECcAABAnAAAAAAAAAAAAAAAAAAAAAAAAAAAAAAAAAAAAAAAAAAAAABQAAAAAAAAAwMD/AAAAAABkAAAAMgAAAAAAAABkAAAAAAAAAH9/fwAKAAAAIgAAABgAAAAAAAAAAAAAAAAAAAAAAAAAAAAAAAAAAAAkAAAAJAAAAAAAAAAHAAAAAAAAAAAAAAAAAAAAAAAAAAAAAAAAAAAAf39/ACUAAABYAAAAAAAAAAAAAAAAAAAAAAAAAAAAAAAAAAAAAAAAAAAAAAAAAAAAAAAAAAAAAAA/AAAAAAAAAKCGAQAAAAAAAAAAAAAAAAAMAAAAAQAAAAAAAAAAAAAAAAAAAB8AAABUAAAAu+DjBf///wEAAAAAAAAAAAAAAAAAAAAAAAAAAAAAAAAAAAAAAAAAAAAAAAJ/f38AgICAA8zMzADAwP8Af39/AAAAAAAAAAAAAAAAAAAAAAAAAAAAIQAAABgAAAAUAAAAHCUAAHUeAAAcJQAAFCAAAAAAAAAmAAAACAAAAP//////////"/>
+                <pr:smNativeData xmlns:pr="smNativeData" xmlns="smNativeData" val="SMDATA_15_NygcZBMAAAAlAAAADQAAAA8BAAAAkAAAAEgAAACQAAAASAAAAAAAAAAAAAAAAAAAAAEAAABQAAAAAAAAAAAA4D8AAAAAAADgPwAAAAAAAOA/AAAAAAAA4D8AAAAAAADgPwAAAAAAAOA/AAAAAAAA4D8AAAAAAADgPwAAAAAAAOA/AAAAAAAA4D8CAAAAjAAAAAAAAAAAAAAAu+DjDP///wgAAAAAAAAAAAAAAAAAAAAAAAAAAAAAAAAAAAAAZAAAAAEAAABAAAAAAAAAAAAAAAAAAAAAAAAAAAAAAAAAAAAAAAAAAAAAAAAAAAAAAAAAAAAAAAAAAAAAAAAAAAAAAAAAAAAAAAAAAAAAAAAAAAAAAAAAAAAAAAAAAAAAFAAAADwAAAABAAAAAAAAAAAAAAkUAAAAAQAAABQAAAAUAAAAFAAAAAEAAAAAAAAAZAAAAGQAAAABAAAAlgAAAJYAAAAVAAAAYAAAAAAAAAAAAAAADwAAACADAAAAAAAAAAAAAAEAAACgMgAAVgcAAKr4//8BAAAAf39/AAEAAABkAAAAAAAAABQAAABAHwAAAAAAACYAAAAAAAAAwOD//wAAAAAmAAAAZAAAABYAAABMAAAAAAAAAAAAAAAEAAAAAAAAAAEAAACAgIAKAAAAACgAAAAoAAAAZAAAAGQAAAAAAAAAzMzMAAAAAABQAAAAUAAAAGQAAABkAAAAAAAAABcAAAAUAAAAAAAAAAAAAAD/fwAA/38AAAAAAAAJAAAABAAAAAAAAAAeAAAAaAAAAAAAAAAAAAAAAAAAAAAAAAAAAAAAECcAABAnAAAAAAAAAAAAAAAAAAAAAAAAAAAAAAAAAAAAAAAAAAAAABQAAAAAAAAAwMD/AAAAAABkAAAAMgAAAAAAAABkAAAAAAAAAH9/fwAKAAAAIgAAABgAAAAAAAAAAAAAAAAAAAAAAAAAAAAAAAAAAAAkAAAAJAAAAAAAAAAHAAAAAAAAAAAAAAAAAAAAAAAAAAAAAAAAAAAAf39/ACUAAABYAAAAAAAAAAAAAAAAAAAAAAAAAAAAAAAAAAAAAAAAAAAAAAAAAAAAAAAAAAAAAAA/AAAAAAAAAKCGAQAAAAAAAAAAAAAAAAAMAAAAAQAAAAAAAAAAAAAAAAAAAB8AAABUAAAAu+DjBf///wEAAAAAAAAAAAAAAAAAAAAAAAAAAAAAAAAAAAAAAAAAAAAAAAJ/f38AgICAA8zMzADAwP8Af39/AAAAAAAAAAAAAAAAAAAAAAAAAAAAIQAAABgAAAAUAAAAHCUAAHUeAAAcJQAAFCAAAAAAAAAmAAAACAAAAP//////////"/>
               </a:ext>
             </a:extLst>
           </p:cNvCxnSpPr>
@@ -7543,6 +7576,123 @@
           <a:effectLst/>
         </p:spPr>
       </p:cxnSp>
+      <p:sp>
+        <p:nvSpPr>
+          <p:cNvPr id="91" name="텍스트상자35"/>
+          <p:cNvSpPr txBox="1">
+            <a:extLst>
+              <a:ext uri="smNativeData">
+                <pr:smNativeData xmlns:pr="smNativeData" xmlns="smNativeData" val="SMDATA_15_NygcZBMAAAAlAAAAEgAAAA8BAAAAkAAAAEgAAACQAAAASAAAAAAAAAAAAAAAAAAAAAEAAABQAAAAAAAAAAAA4D8AAAAAAADgPwAAAAAAAOA/AAAAAAAA4D8AAAAAAADgPwAAAAAAAOA/AAAAAAAA4D8AAAAAAADgPwAAAAAAAOA/AAAAAAAA4D8CAAAAjAAAAAAAAAAAAAAAu+DjDP///wgAAAAAAAAAAAAAAAAAAAAAAAAAAAAAAAAAAAAAZAAAAAEAAABAAAAAAAAAAAAAAAAAAAAAAAAAAAAAAAAAAAAAAAAAAAAAAAAAAAAAAAAAAAAAAAAAAAAAAAAAAAAAAAAAAAAAAAAAAAAAAAAAAAAAAAAAAAAAAAAAAAAAFAAAADwAAAAAAAAAAAAAAAAAAAkUAAAAAQAAABQAAAAUAAAAFAAAAAEAAAAAAAAAZAAAAGQAAAAAAAAAZAAAAGQAAAAVAAAAYAAAAAAAAAAAAAAADwAAACADAAAAAAAAAAAAAAEAAACgMgAAVgcAAKr4//8BAAAAf39/AAEAAABkAAAAAAAAABQAAABAHwAAAAAAACYAAAAAAAAAwOD//wAAAAAmAAAAZAAAABYAAABMAAAAAAAAAAAAAAAEAAAAAAAAAAEAAACAgIAKAAAAACgAAAAoAAAAZAAAAGQAAAAAAAAAzMzMAAAAAABQAAAAUAAAAGQAAABkAAAAAAAAABcAAAAUAAAAAAAAANwIAAD/fwAA/38AAAAAAAAJAAAABAAAAAAAAAAeAAAAaAAAAAAAAAAAAAAAAAAAAAAAAAAAAAAAECcAABAnAAAAAAAAAAAAAAAAAAAAAAAAAAAAAAAAAAAAAAAAAAAAABQAAAAAAAAAwMD/AAAAAABkAAAAMgAAAAAAAABkAAAAAAAAAH9/fwAKAAAAIgAAABgAAAAAAAAAAAAAAAAAAAAAAAAAAAAAAAAAAAAkAAAAJAAAAAAAAAAHAAAAAAAAAAAAAAAAAAAAAAAAAAAAAAAAAAAAf39/ACUAAABYAAAAAAAAAAAAAAAAAAAAAAAAAAAAAAAAAAAAAAAAAAAAAAAAAAAAAAAAAAAAAAA/AAAAAAAAAKCGAQAAAAAAAAAAAAAAAAAMAAAAAQAAAAAAAAAAAAAAAAAAAB8AAABUAAAAu+DjBf///wEAAAAAAAAAAAAAAAAAAAAAAAAAAAAAAAAAAAAAAAAAAAAAAAJ/f38AgICAA8zMzADAwP8Af39/AAAAAAAAAAAAAAAAAAAAAAAAAAAAIQAAABgAAAAUAAAA1AgAAOIAAACwEQAAFwMAAAAAAAAmAAAACAAAAP//////////"/>
+              </a:ext>
+            </a:extLst>
+          </p:cNvSpPr>
+          <p:nvPr/>
+        </p:nvSpPr>
+        <p:spPr>
+          <a:xfrm>
+            <a:off x="1435100" y="143510"/>
+            <a:ext cx="1440180" cy="358775"/>
+          </a:xfrm>
+          <a:prstGeom prst="rect">
+            <a:avLst/>
+          </a:prstGeom>
+          <a:noFill/>
+          <a:ln>
+            <a:noFill/>
+          </a:ln>
+          <a:effectLst/>
+        </p:spPr>
+        <p:txBody>
+          <a:bodyPr vert="horz" wrap="square" numCol="1" spcCol="215900" anchor="t"/>
+          <a:lstStyle/>
+          <a:p>
+            <a:pPr>
+              <a:defRPr sz="1800" cap="none"/>
+            </a:pPr>
+            <a:r>
+              <a:t>Backbone</a:t>
+            </a:r>
+          </a:p>
+        </p:txBody>
+      </p:sp>
+      <p:sp>
+        <p:nvSpPr>
+          <p:cNvPr id="92" name="텍스트상자36"/>
+          <p:cNvSpPr txBox="1">
+            <a:extLst>
+              <a:ext uri="smNativeData">
+                <pr:smNativeData xmlns:pr="smNativeData" xmlns="smNativeData" val="SMDATA_15_NygcZBMAAAAlAAAAEgAAAA8BAAAAkAAAAEgAAACQAAAASAAAAAAAAAAAAAAAAAAAAAEAAABQAAAAAAAAAAAA4D8AAAAAAADgPwAAAAAAAOA/AAAAAAAA4D8AAAAAAADgPwAAAAAAAOA/AAAAAAAA4D8AAAAAAADgPwAAAAAAAOA/AAAAAAAA4D8CAAAAjAAAAAAAAAAAAAAAu+DjDP///wgAAAAAAAAAAAAAAAAAAAAAAAAAAAAAAAAAAAAAZAAAAAEAAABAAAAAAAAAAAAAAAAAAAAAAAAAAAAAAAAAAAAAAAAAAAAAAAAAAAAAAAAAAAAAAAAAAAAAAAAAAAAAAAAAAAAAAAAAAAAAAAAAAAAAAAAAAAAAAAAAAAAAFAAAADwAAAAAAAAAAAAAAAAAAAkUAAAAAQAAABQAAAAUAAAAFAAAAAEAAAAAAAAAZAAAAGQAAAAAAAAAZAAAAGQAAAAVAAAAYAAAAAAAAAAAAAAADwAAACADAAAAAAAAAAAAAAEAAACgMgAAVgcAAKr4//8BAAAAf39/AAEAAABkAAAAAAAAABQAAABAHwAAAAAAACYAAAAAAAAAwOD//wAAAAAmAAAAZAAAABYAAABMAAAAAAAAAAAAAAAEAAAAAAAAAAEAAACAgIAKAAAAACgAAAAoAAAAZAAAAGQAAAAAAAAAzMzMAAAAAABQAAAAUAAAAGQAAABkAAAAAAAAABcAAAAUAAAAAAAAANwIAAD/fwAA/38AAAAAAAAJAAAABAAAAAAAAAAeAAAAaAAAAAAAAAAAAAAAAAAAAAAAAAAAAAAAECcAABAnAAAAAAAAAAAAAAAAAAAAAAAAAAAAAAAAAAAAAAAAAAAAABQAAAAAAAAAwMD/AAAAAABkAAAAMgAAAAAAAABkAAAAAAAAAH9/fwAKAAAAIgAAABgAAAAAAAAAAAAAAAAAAAAAAAAAAAAAAAAAAAAkAAAAJAAAAAAAAAAHAAAAAAAAAAAAAAAAAAAAAAAAAAAAAAAAAAAAf39/ACUAAABYAAAAAAAAAAAAAAAAAAAAAAAAAAAAAAAAAAAAAAAAAAAAAAAAAAAAAAAAAAAAAAA/AAAAAAAAAKCGAQAAAAAAAAAAAAAAAAAMAAAAAQAAAAAAAAAAAAAAAAAAAB8AAABUAAAAu+DjBf///wEAAAAAAAAAAAAAAAAAAAAAAAAAAAAAAAAAAAAAAAAAAAAAAAJ/f38AgICAA8zMzADAwP8Af39/AAAAAAAAAAAAAAAAAAAAAAAAAAAAIQAAABgAAAAUAAAAEyEAAOIAAADvKQAAFwMAAAAAAAAmAAAACAAAAP//////////"/>
+              </a:ext>
+            </a:extLst>
+          </p:cNvSpPr>
+          <p:nvPr/>
+        </p:nvSpPr>
+        <p:spPr>
+          <a:xfrm>
+            <a:off x="5376545" y="143510"/>
+            <a:ext cx="1440180" cy="358775"/>
+          </a:xfrm>
+          <a:prstGeom prst="rect">
+            <a:avLst/>
+          </a:prstGeom>
+          <a:noFill/>
+          <a:ln>
+            <a:noFill/>
+          </a:ln>
+          <a:effectLst/>
+        </p:spPr>
+        <p:txBody>
+          <a:bodyPr vert="horz" wrap="square" numCol="1" spcCol="215900" anchor="t"/>
+          <a:lstStyle/>
+          <a:p>
+            <a:pPr>
+              <a:defRPr sz="1800" cap="none"/>
+            </a:pPr>
+            <a:r>
+              <a:t>Extra</a:t>
+            </a:r>
+          </a:p>
+        </p:txBody>
+      </p:sp>
+      <p:sp>
+        <p:nvSpPr>
+          <p:cNvPr id="93" name="텍스트상자37"/>
+          <p:cNvSpPr txBox="1">
+            <a:extLst>
+              <a:ext uri="smNativeData">
+                <pr:smNativeData xmlns:pr="smNativeData" xmlns="smNativeData" val="SMDATA_15_NygcZBMAAAAlAAAAEgAAAA8BAAAAkAAAAEgAAACQAAAASAAAAAAAAAAAAAAAAAAAAAEAAABQAAAAAAAAAAAA4D8AAAAAAADgPwAAAAAAAOA/AAAAAAAA4D8AAAAAAADgPwAAAAAAAOA/AAAAAAAA4D8AAAAAAADgPwAAAAAAAOA/AAAAAAAA4D8CAAAAjAAAAAAAAAAAAAAAu+DjDP///wgAAAAAAAAAAAAAAAAAAAAAAAAAAAAAAAAAAAAAZAAAAAEAAABAAAAAAAAAAAAAAAAAAAAAAAAAAAAAAAAAAAAAAAAAAAAAAAAAAAAAAAAAAAAAAAAAAAAAAAAAAAAAAAAAAAAAAAAAAAAAAAAAAAAAAAAAAAAAAAAAAAAAFAAAADwAAAAAAAAAAAAAAAAAAAkUAAAAAQAAABQAAAAUAAAAFAAAAAEAAAAAAAAAZAAAAGQAAAAAAAAAZAAAAGQAAAAVAAAAYAAAAAAAAAAAAAAADwAAACADAAAAAAAAAAAAAAEAAACgMgAAVgcAAKr4//8BAAAAf39/AAEAAABkAAAAAAAAABQAAABAHwAAAAAAACYAAAAAAAAAwOD//wAAAAAmAAAAZAAAABYAAABMAAAAAAAAAAAAAAAEAAAAAAAAAAEAAACAgIAKAAAAACgAAAAoAAAAZAAAAGQAAAAAAAAAzMzMAAAAAABQAAAAUAAAAGQAAABkAAAAAAAAABcAAAAUAAAAAAAAANwIAAD/fwAA/38AAAAAAAAJAAAABAAAAAAAAAAeAAAAaAAAAAAAAAAAAAAAAAAAAAAAAAAAAAAAECcAABAnAAAAAAAAAAAAAAAAAAAAAAAAAAAAAAAAAAAAAAAAAAAAABQAAAAAAAAAwMD/AAAAAABkAAAAMgAAAAAAAABkAAAAAAAAAH9/fwAKAAAAIgAAABgAAAAAAAAAAAAAAAAAAAAAAAAAAAAAAAAAAAAkAAAAJAAAAAAAAAAHAAAAAAAAAAAAAAAAAAAAAAAAAAAAAAAAAAAAf39/ACUAAABYAAAAAAAAAAAAAAAAAAAAAAAAAAAAAAAAAAAAAAAAAAAAAAAAAAAAAAAAAAAAAAA/AAAAAAAAAKCGAQAAAAAAAAAAAAAAAAAMAAAAAQAAAAAAAAAAAAAAAAAAAB8AAABUAAAAu+DjBf///wEAAAAAAAAAAAAAAAAAAAAAAAAAAAAAAAAAAAAAAAAAAAAAAAJ/f38AgICAA8zMzADAwP8Af39/AAAAAAAAAAAAAAAAAAAAAAAAAAAAIQAAABgAAAAUAAAAgDgAAOIAAABcQQAAFwMAAAAAAAAmAAAACAAAAP//////////"/>
+              </a:ext>
+            </a:extLst>
+          </p:cNvSpPr>
+          <p:nvPr/>
+        </p:nvSpPr>
+        <p:spPr>
+          <a:xfrm>
+            <a:off x="9184640" y="143510"/>
+            <a:ext cx="1440180" cy="358775"/>
+          </a:xfrm>
+          <a:prstGeom prst="rect">
+            <a:avLst/>
+          </a:prstGeom>
+          <a:noFill/>
+          <a:ln>
+            <a:noFill/>
+          </a:ln>
+          <a:effectLst/>
+        </p:spPr>
+        <p:txBody>
+          <a:bodyPr vert="horz" wrap="square" numCol="1" spcCol="215900" anchor="t"/>
+          <a:lstStyle/>
+          <a:p>
+            <a:pPr>
+              <a:defRPr sz="1800" cap="none"/>
+            </a:pPr>
+            <a:r>
+              <a:t>Head</a:t>
+            </a:r>
+          </a:p>
+        </p:txBody>
+      </p:sp>
     </p:spTree>
   </p:cSld>
   <p:clrMapOvr>

</xml_diff>